<commit_message>
Relationship between g and fold function.
</commit_message>
<xml_diff>
--- a/marple.pptx
+++ b/marple.pptx
@@ -2556,6 +2556,15 @@
             <a:r>
               <a:rPr lang="en-US" dirty="0"/>
               <a:t>But how do I merge an old and new value for a given key? What does that even mean? Let’s look at this problem more formally. We want to merge the two values, old and new, so that it is as if the statistics function ran over the entire packet stream without any evictions. That way we can retain full accuracy while merging. Let’s introduce some notation for this. Let’s represent the statistics function as a function g over the packet sequence. For a simple counter, the function is the sum of the packet lengths (or any other packet header).</a:t>
+            </a:r>
+          </a:p>
+          <a:p>
+            <a:endParaRPr lang="en-US" dirty="0"/>
+          </a:p>
+          <a:p>
+            <a:r>
+              <a:rPr lang="en-US" dirty="0"/>
+              <a:t>The fold function that we talked about earlier is just an incremental version of the same g.</a:t>
             </a:r>
           </a:p>
         </p:txBody>
@@ -12205,7 +12214,7 @@
           <a:effectLst/>
           <a:extLst>
             <a:ext uri="{909E8E84-426E-40dd-AFC4-6F175D3DCCD1}">
-              <a14:hiddenFill xmlns:a14="http://schemas.microsoft.com/office/drawing/2010/main" xmlns="">
+              <a14:hiddenFill xmlns="" xmlns:a14="http://schemas.microsoft.com/office/drawing/2010/main">
                 <a:blipFill dpi="0" rotWithShape="0">
                   <a:blip/>
                   <a:srcRect/>
@@ -12216,7 +12225,7 @@
               </a14:hiddenFill>
             </a:ext>
             <a:ext uri="{91240B29-F687-4f45-9708-019B960494DF}">
-              <a14:hiddenLine xmlns:a14="http://schemas.microsoft.com/office/drawing/2010/main" xmlns="" w="9525">
+              <a14:hiddenLine xmlns="" xmlns:a14="http://schemas.microsoft.com/office/drawing/2010/main" w="9525">
                 <a:solidFill>
                   <a:srgbClr val="000000"/>
                 </a:solidFill>
@@ -12226,7 +12235,7 @@
               </a14:hiddenLine>
             </a:ext>
             <a:ext uri="{AF507438-7753-43e0-B8FC-AC1667EBCBE1}">
-              <a14:hiddenEffects xmlns:a14="http://schemas.microsoft.com/office/drawing/2010/main" xmlns="">
+              <a14:hiddenEffects xmlns="" xmlns:a14="http://schemas.microsoft.com/office/drawing/2010/main">
                 <a:effectLst>
                   <a:outerShdw blurRad="63500" dist="38099" dir="2700000" algn="ctr" rotWithShape="0">
                     <a:srgbClr val="000000">
@@ -12275,7 +12284,7 @@
           <a:effectLst/>
           <a:extLst>
             <a:ext uri="{909E8E84-426E-40dd-AFC4-6F175D3DCCD1}">
-              <a14:hiddenFill xmlns:a14="http://schemas.microsoft.com/office/drawing/2010/main" xmlns="">
+              <a14:hiddenFill xmlns="" xmlns:a14="http://schemas.microsoft.com/office/drawing/2010/main">
                 <a:blipFill dpi="0" rotWithShape="0">
                   <a:blip/>
                   <a:srcRect/>
@@ -12286,7 +12295,7 @@
               </a14:hiddenFill>
             </a:ext>
             <a:ext uri="{91240B29-F687-4f45-9708-019B960494DF}">
-              <a14:hiddenLine xmlns:a14="http://schemas.microsoft.com/office/drawing/2010/main" xmlns="" w="9525">
+              <a14:hiddenLine xmlns="" xmlns:a14="http://schemas.microsoft.com/office/drawing/2010/main" w="9525">
                 <a:solidFill>
                   <a:srgbClr val="000000"/>
                 </a:solidFill>
@@ -12296,7 +12305,7 @@
               </a14:hiddenLine>
             </a:ext>
             <a:ext uri="{AF507438-7753-43e0-B8FC-AC1667EBCBE1}">
-              <a14:hiddenEffects xmlns:a14="http://schemas.microsoft.com/office/drawing/2010/main" xmlns="">
+              <a14:hiddenEffects xmlns="" xmlns:a14="http://schemas.microsoft.com/office/drawing/2010/main">
                 <a:effectLst>
                   <a:outerShdw blurRad="63500" dist="38099" dir="2700000" algn="ctr" rotWithShape="0">
                     <a:srgbClr val="000000">
@@ -12431,7 +12440,7 @@
             <a:effectLst/>
             <a:extLst>
               <a:ext uri="{909E8E84-426E-40dd-AFC4-6F175D3DCCD1}">
-                <a14:hiddenFill xmlns="" xmlns:a14="http://schemas.microsoft.com/office/drawing/2010/main">
+                <a14:hiddenFill xmlns:a14="http://schemas.microsoft.com/office/drawing/2010/main" xmlns="">
                   <a:blipFill dpi="0" rotWithShape="0">
                     <a:blip/>
                     <a:srcRect/>
@@ -12442,7 +12451,7 @@
                 </a14:hiddenFill>
               </a:ext>
               <a:ext uri="{91240B29-F687-4f45-9708-019B960494DF}">
-                <a14:hiddenLine xmlns="" xmlns:a14="http://schemas.microsoft.com/office/drawing/2010/main" w="9525">
+                <a14:hiddenLine xmlns:a14="http://schemas.microsoft.com/office/drawing/2010/main" xmlns="" w="9525">
                   <a:solidFill>
                     <a:srgbClr val="000000"/>
                   </a:solidFill>
@@ -12452,7 +12461,7 @@
                 </a14:hiddenLine>
               </a:ext>
               <a:ext uri="{AF507438-7753-43e0-B8FC-AC1667EBCBE1}">
-                <a14:hiddenEffects xmlns="" xmlns:a14="http://schemas.microsoft.com/office/drawing/2010/main">
+                <a14:hiddenEffects xmlns:a14="http://schemas.microsoft.com/office/drawing/2010/main" xmlns="">
                   <a:effectLst>
                     <a:outerShdw blurRad="63500" dist="38099" dir="2700000" algn="ctr" rotWithShape="0">
                       <a:srgbClr val="000000">
@@ -12501,7 +12510,7 @@
             <a:effectLst/>
             <a:extLst>
               <a:ext uri="{909E8E84-426E-40dd-AFC4-6F175D3DCCD1}">
-                <a14:hiddenFill xmlns="" xmlns:a14="http://schemas.microsoft.com/office/drawing/2010/main">
+                <a14:hiddenFill xmlns:a14="http://schemas.microsoft.com/office/drawing/2010/main" xmlns="">
                   <a:blipFill dpi="0" rotWithShape="0">
                     <a:blip/>
                     <a:srcRect/>
@@ -12512,7 +12521,7 @@
                 </a14:hiddenFill>
               </a:ext>
               <a:ext uri="{91240B29-F687-4f45-9708-019B960494DF}">
-                <a14:hiddenLine xmlns="" xmlns:a14="http://schemas.microsoft.com/office/drawing/2010/main" w="9525">
+                <a14:hiddenLine xmlns:a14="http://schemas.microsoft.com/office/drawing/2010/main" xmlns="" w="9525">
                   <a:solidFill>
                     <a:srgbClr val="000000"/>
                   </a:solidFill>
@@ -12522,7 +12531,7 @@
                 </a14:hiddenLine>
               </a:ext>
               <a:ext uri="{AF507438-7753-43e0-B8FC-AC1667EBCBE1}">
-                <a14:hiddenEffects xmlns="" xmlns:a14="http://schemas.microsoft.com/office/drawing/2010/main">
+                <a14:hiddenEffects xmlns:a14="http://schemas.microsoft.com/office/drawing/2010/main" xmlns="">
                   <a:effectLst>
                     <a:outerShdw blurRad="63500" dist="38099" dir="2700000" algn="ctr" rotWithShape="0">
                       <a:srgbClr val="000000">
@@ -12571,7 +12580,7 @@
             <a:effectLst/>
             <a:extLst>
               <a:ext uri="{909E8E84-426E-40dd-AFC4-6F175D3DCCD1}">
-                <a14:hiddenFill xmlns="" xmlns:a14="http://schemas.microsoft.com/office/drawing/2010/main">
+                <a14:hiddenFill xmlns:a14="http://schemas.microsoft.com/office/drawing/2010/main" xmlns="">
                   <a:blipFill dpi="0" rotWithShape="0">
                     <a:blip/>
                     <a:srcRect/>
@@ -12582,7 +12591,7 @@
                 </a14:hiddenFill>
               </a:ext>
               <a:ext uri="{91240B29-F687-4f45-9708-019B960494DF}">
-                <a14:hiddenLine xmlns="" xmlns:a14="http://schemas.microsoft.com/office/drawing/2010/main" w="9525">
+                <a14:hiddenLine xmlns:a14="http://schemas.microsoft.com/office/drawing/2010/main" xmlns="" w="9525">
                   <a:solidFill>
                     <a:srgbClr val="000000"/>
                   </a:solidFill>
@@ -12592,7 +12601,7 @@
                 </a14:hiddenLine>
               </a:ext>
               <a:ext uri="{AF507438-7753-43e0-B8FC-AC1667EBCBE1}">
-                <a14:hiddenEffects xmlns="" xmlns:a14="http://schemas.microsoft.com/office/drawing/2010/main">
+                <a14:hiddenEffects xmlns:a14="http://schemas.microsoft.com/office/drawing/2010/main" xmlns="">
                   <a:effectLst>
                     <a:outerShdw blurRad="63500" dist="38099" dir="2700000" algn="ctr" rotWithShape="0">
                       <a:srgbClr val="000000">
@@ -12633,12 +12642,12 @@
             <a:effectLst/>
             <a:extLst>
               <a:ext uri="{909E8E84-426E-40dd-AFC4-6F175D3DCCD1}">
-                <a14:hiddenFill xmlns="" xmlns:a14="http://schemas.microsoft.com/office/drawing/2010/main">
+                <a14:hiddenFill xmlns:a14="http://schemas.microsoft.com/office/drawing/2010/main" xmlns="">
                   <a:noFill/>
                 </a14:hiddenFill>
               </a:ext>
               <a:ext uri="{AF507438-7753-43e0-B8FC-AC1667EBCBE1}">
-                <a14:hiddenEffects xmlns="" xmlns:a14="http://schemas.microsoft.com/office/drawing/2010/main">
+                <a14:hiddenEffects xmlns:a14="http://schemas.microsoft.com/office/drawing/2010/main" xmlns="">
                   <a:effectLst>
                     <a:outerShdw blurRad="63500" dist="38099" dir="2700000" algn="ctr" rotWithShape="0">
                       <a:srgbClr val="000000">
@@ -12691,12 +12700,12 @@
             <a:effectLst/>
             <a:extLst>
               <a:ext uri="{909E8E84-426E-40dd-AFC4-6F175D3DCCD1}">
-                <a14:hiddenFill xmlns="" xmlns:a14="http://schemas.microsoft.com/office/drawing/2010/main">
+                <a14:hiddenFill xmlns:a14="http://schemas.microsoft.com/office/drawing/2010/main" xmlns="">
                   <a:noFill/>
                 </a14:hiddenFill>
               </a:ext>
               <a:ext uri="{AF507438-7753-43e0-B8FC-AC1667EBCBE1}">
-                <a14:hiddenEffects xmlns="" xmlns:a14="http://schemas.microsoft.com/office/drawing/2010/main">
+                <a14:hiddenEffects xmlns:a14="http://schemas.microsoft.com/office/drawing/2010/main" xmlns="">
                   <a:effectLst>
                     <a:outerShdw blurRad="63500" dist="38099" dir="2700000" algn="ctr" rotWithShape="0">
                       <a:srgbClr val="000000">
@@ -12749,12 +12758,12 @@
             <a:effectLst/>
             <a:extLst>
               <a:ext uri="{909E8E84-426E-40dd-AFC4-6F175D3DCCD1}">
-                <a14:hiddenFill xmlns="" xmlns:a14="http://schemas.microsoft.com/office/drawing/2010/main">
+                <a14:hiddenFill xmlns:a14="http://schemas.microsoft.com/office/drawing/2010/main" xmlns="">
                   <a:noFill/>
                 </a14:hiddenFill>
               </a:ext>
               <a:ext uri="{AF507438-7753-43e0-B8FC-AC1667EBCBE1}">
-                <a14:hiddenEffects xmlns="" xmlns:a14="http://schemas.microsoft.com/office/drawing/2010/main">
+                <a14:hiddenEffects xmlns:a14="http://schemas.microsoft.com/office/drawing/2010/main" xmlns="">
                   <a:effectLst>
                     <a:outerShdw blurRad="63500" dist="38099" dir="2700000" algn="ctr" rotWithShape="0">
                       <a:srgbClr val="000000">
@@ -12807,12 +12816,12 @@
             <a:effectLst/>
             <a:extLst>
               <a:ext uri="{909E8E84-426E-40dd-AFC4-6F175D3DCCD1}">
-                <a14:hiddenFill xmlns="" xmlns:a14="http://schemas.microsoft.com/office/drawing/2010/main">
+                <a14:hiddenFill xmlns:a14="http://schemas.microsoft.com/office/drawing/2010/main" xmlns="">
                   <a:noFill/>
                 </a14:hiddenFill>
               </a:ext>
               <a:ext uri="{AF507438-7753-43e0-B8FC-AC1667EBCBE1}">
-                <a14:hiddenEffects xmlns="" xmlns:a14="http://schemas.microsoft.com/office/drawing/2010/main">
+                <a14:hiddenEffects xmlns:a14="http://schemas.microsoft.com/office/drawing/2010/main" xmlns="">
                   <a:effectLst>
                     <a:outerShdw blurRad="63500" dist="38099" dir="2700000" algn="ctr" rotWithShape="0">
                       <a:srgbClr val="000000">
@@ -12865,12 +12874,12 @@
             <a:effectLst/>
             <a:extLst>
               <a:ext uri="{909E8E84-426E-40dd-AFC4-6F175D3DCCD1}">
-                <a14:hiddenFill xmlns="" xmlns:a14="http://schemas.microsoft.com/office/drawing/2010/main">
+                <a14:hiddenFill xmlns:a14="http://schemas.microsoft.com/office/drawing/2010/main" xmlns="">
                   <a:noFill/>
                 </a14:hiddenFill>
               </a:ext>
               <a:ext uri="{AF507438-7753-43e0-B8FC-AC1667EBCBE1}">
-                <a14:hiddenEffects xmlns="" xmlns:a14="http://schemas.microsoft.com/office/drawing/2010/main">
+                <a14:hiddenEffects xmlns:a14="http://schemas.microsoft.com/office/drawing/2010/main" xmlns="">
                   <a:effectLst>
                     <a:outerShdw blurRad="63500" dist="38099" dir="2700000" algn="ctr" rotWithShape="0">
                       <a:srgbClr val="000000">
@@ -12923,12 +12932,12 @@
             <a:effectLst/>
             <a:extLst>
               <a:ext uri="{909E8E84-426E-40dd-AFC4-6F175D3DCCD1}">
-                <a14:hiddenFill xmlns="" xmlns:a14="http://schemas.microsoft.com/office/drawing/2010/main">
+                <a14:hiddenFill xmlns:a14="http://schemas.microsoft.com/office/drawing/2010/main" xmlns="">
                   <a:noFill/>
                 </a14:hiddenFill>
               </a:ext>
               <a:ext uri="{AF507438-7753-43e0-B8FC-AC1667EBCBE1}">
-                <a14:hiddenEffects xmlns="" xmlns:a14="http://schemas.microsoft.com/office/drawing/2010/main">
+                <a14:hiddenEffects xmlns:a14="http://schemas.microsoft.com/office/drawing/2010/main" xmlns="">
                   <a:effectLst>
                     <a:outerShdw blurRad="63500" dist="38099" dir="2700000" algn="ctr" rotWithShape="0">
                       <a:srgbClr val="000000">
@@ -12981,12 +12990,12 @@
             <a:effectLst/>
             <a:extLst>
               <a:ext uri="{909E8E84-426E-40dd-AFC4-6F175D3DCCD1}">
-                <a14:hiddenFill xmlns="" xmlns:a14="http://schemas.microsoft.com/office/drawing/2010/main">
+                <a14:hiddenFill xmlns:a14="http://schemas.microsoft.com/office/drawing/2010/main" xmlns="">
                   <a:noFill/>
                 </a14:hiddenFill>
               </a:ext>
               <a:ext uri="{AF507438-7753-43e0-B8FC-AC1667EBCBE1}">
-                <a14:hiddenEffects xmlns="" xmlns:a14="http://schemas.microsoft.com/office/drawing/2010/main">
+                <a14:hiddenEffects xmlns:a14="http://schemas.microsoft.com/office/drawing/2010/main" xmlns="">
                   <a:effectLst>
                     <a:outerShdw blurRad="63500" dist="38099" dir="2700000" algn="ctr" rotWithShape="0">
                       <a:srgbClr val="000000">
@@ -13039,12 +13048,12 @@
             <a:effectLst/>
             <a:extLst>
               <a:ext uri="{909E8E84-426E-40dd-AFC4-6F175D3DCCD1}">
-                <a14:hiddenFill xmlns="" xmlns:a14="http://schemas.microsoft.com/office/drawing/2010/main">
+                <a14:hiddenFill xmlns:a14="http://schemas.microsoft.com/office/drawing/2010/main" xmlns="">
                   <a:noFill/>
                 </a14:hiddenFill>
               </a:ext>
               <a:ext uri="{AF507438-7753-43e0-B8FC-AC1667EBCBE1}">
-                <a14:hiddenEffects xmlns="" xmlns:a14="http://schemas.microsoft.com/office/drawing/2010/main">
+                <a14:hiddenEffects xmlns:a14="http://schemas.microsoft.com/office/drawing/2010/main" xmlns="">
                   <a:effectLst>
                     <a:outerShdw blurRad="63500" dist="38099" dir="2700000" algn="ctr" rotWithShape="0">
                       <a:srgbClr val="000000">
@@ -13097,12 +13106,12 @@
             <a:effectLst/>
             <a:extLst>
               <a:ext uri="{909E8E84-426E-40dd-AFC4-6F175D3DCCD1}">
-                <a14:hiddenFill xmlns="" xmlns:a14="http://schemas.microsoft.com/office/drawing/2010/main">
+                <a14:hiddenFill xmlns:a14="http://schemas.microsoft.com/office/drawing/2010/main" xmlns="">
                   <a:noFill/>
                 </a14:hiddenFill>
               </a:ext>
               <a:ext uri="{AF507438-7753-43e0-B8FC-AC1667EBCBE1}">
-                <a14:hiddenEffects xmlns="" xmlns:a14="http://schemas.microsoft.com/office/drawing/2010/main">
+                <a14:hiddenEffects xmlns:a14="http://schemas.microsoft.com/office/drawing/2010/main" xmlns="">
                   <a:effectLst>
                     <a:outerShdw blurRad="63500" dist="38099" dir="2700000" algn="ctr" rotWithShape="0">
                       <a:srgbClr val="000000">
@@ -13155,12 +13164,12 @@
             <a:effectLst/>
             <a:extLst>
               <a:ext uri="{909E8E84-426E-40dd-AFC4-6F175D3DCCD1}">
-                <a14:hiddenFill xmlns="" xmlns:a14="http://schemas.microsoft.com/office/drawing/2010/main">
+                <a14:hiddenFill xmlns:a14="http://schemas.microsoft.com/office/drawing/2010/main" xmlns="">
                   <a:noFill/>
                 </a14:hiddenFill>
               </a:ext>
               <a:ext uri="{AF507438-7753-43e0-B8FC-AC1667EBCBE1}">
-                <a14:hiddenEffects xmlns="" xmlns:a14="http://schemas.microsoft.com/office/drawing/2010/main">
+                <a14:hiddenEffects xmlns:a14="http://schemas.microsoft.com/office/drawing/2010/main" xmlns="">
                   <a:effectLst>
                     <a:outerShdw blurRad="63500" dist="38099" dir="2700000" algn="ctr" rotWithShape="0">
                       <a:srgbClr val="000000">
@@ -13221,7 +13230,7 @@
             <a:effectLst/>
             <a:extLst>
               <a:ext uri="{909E8E84-426E-40dd-AFC4-6F175D3DCCD1}">
-                <a14:hiddenFill xmlns="" xmlns:a14="http://schemas.microsoft.com/office/drawing/2010/main">
+                <a14:hiddenFill xmlns:a14="http://schemas.microsoft.com/office/drawing/2010/main" xmlns="">
                   <a:blipFill dpi="0" rotWithShape="0">
                     <a:blip/>
                     <a:srcRect/>
@@ -13232,7 +13241,7 @@
                 </a14:hiddenFill>
               </a:ext>
               <a:ext uri="{91240B29-F687-4f45-9708-019B960494DF}">
-                <a14:hiddenLine xmlns="" xmlns:a14="http://schemas.microsoft.com/office/drawing/2010/main" w="9525">
+                <a14:hiddenLine xmlns:a14="http://schemas.microsoft.com/office/drawing/2010/main" xmlns="" w="9525">
                   <a:solidFill>
                     <a:srgbClr val="000000"/>
                   </a:solidFill>
@@ -13242,7 +13251,7 @@
                 </a14:hiddenLine>
               </a:ext>
               <a:ext uri="{AF507438-7753-43e0-B8FC-AC1667EBCBE1}">
-                <a14:hiddenEffects xmlns="" xmlns:a14="http://schemas.microsoft.com/office/drawing/2010/main">
+                <a14:hiddenEffects xmlns:a14="http://schemas.microsoft.com/office/drawing/2010/main" xmlns="">
                   <a:effectLst>
                     <a:outerShdw blurRad="63500" dist="38099" dir="2700000" algn="ctr" rotWithShape="0">
                       <a:srgbClr val="000000">
@@ -13291,7 +13300,7 @@
             <a:effectLst/>
             <a:extLst>
               <a:ext uri="{909E8E84-426E-40dd-AFC4-6F175D3DCCD1}">
-                <a14:hiddenFill xmlns="" xmlns:a14="http://schemas.microsoft.com/office/drawing/2010/main">
+                <a14:hiddenFill xmlns:a14="http://schemas.microsoft.com/office/drawing/2010/main" xmlns="">
                   <a:blipFill dpi="0" rotWithShape="0">
                     <a:blip/>
                     <a:srcRect/>
@@ -13302,7 +13311,7 @@
                 </a14:hiddenFill>
               </a:ext>
               <a:ext uri="{91240B29-F687-4f45-9708-019B960494DF}">
-                <a14:hiddenLine xmlns="" xmlns:a14="http://schemas.microsoft.com/office/drawing/2010/main" w="9525">
+                <a14:hiddenLine xmlns:a14="http://schemas.microsoft.com/office/drawing/2010/main" xmlns="" w="9525">
                   <a:solidFill>
                     <a:srgbClr val="000000"/>
                   </a:solidFill>
@@ -13312,7 +13321,7 @@
                 </a14:hiddenLine>
               </a:ext>
               <a:ext uri="{AF507438-7753-43e0-B8FC-AC1667EBCBE1}">
-                <a14:hiddenEffects xmlns="" xmlns:a14="http://schemas.microsoft.com/office/drawing/2010/main">
+                <a14:hiddenEffects xmlns:a14="http://schemas.microsoft.com/office/drawing/2010/main" xmlns="">
                   <a:effectLst>
                     <a:outerShdw blurRad="63500" dist="38099" dir="2700000" algn="ctr" rotWithShape="0">
                       <a:srgbClr val="000000">
@@ -13361,7 +13370,7 @@
             <a:effectLst/>
             <a:extLst>
               <a:ext uri="{909E8E84-426E-40dd-AFC4-6F175D3DCCD1}">
-                <a14:hiddenFill xmlns="" xmlns:a14="http://schemas.microsoft.com/office/drawing/2010/main">
+                <a14:hiddenFill xmlns:a14="http://schemas.microsoft.com/office/drawing/2010/main" xmlns="">
                   <a:blipFill dpi="0" rotWithShape="0">
                     <a:blip/>
                     <a:srcRect/>
@@ -13372,7 +13381,7 @@
                 </a14:hiddenFill>
               </a:ext>
               <a:ext uri="{91240B29-F687-4f45-9708-019B960494DF}">
-                <a14:hiddenLine xmlns="" xmlns:a14="http://schemas.microsoft.com/office/drawing/2010/main" w="9525">
+                <a14:hiddenLine xmlns:a14="http://schemas.microsoft.com/office/drawing/2010/main" xmlns="" w="9525">
                   <a:solidFill>
                     <a:srgbClr val="000000"/>
                   </a:solidFill>
@@ -13382,7 +13391,7 @@
                 </a14:hiddenLine>
               </a:ext>
               <a:ext uri="{AF507438-7753-43e0-B8FC-AC1667EBCBE1}">
-                <a14:hiddenEffects xmlns="" xmlns:a14="http://schemas.microsoft.com/office/drawing/2010/main">
+                <a14:hiddenEffects xmlns:a14="http://schemas.microsoft.com/office/drawing/2010/main" xmlns="">
                   <a:effectLst>
                     <a:outerShdw blurRad="63500" dist="38099" dir="2700000" algn="ctr" rotWithShape="0">
                       <a:srgbClr val="000000">
@@ -13431,7 +13440,7 @@
             <a:effectLst/>
             <a:extLst>
               <a:ext uri="{909E8E84-426E-40dd-AFC4-6F175D3DCCD1}">
-                <a14:hiddenFill xmlns="" xmlns:a14="http://schemas.microsoft.com/office/drawing/2010/main">
+                <a14:hiddenFill xmlns:a14="http://schemas.microsoft.com/office/drawing/2010/main" xmlns="">
                   <a:blipFill dpi="0" rotWithShape="0">
                     <a:blip/>
                     <a:srcRect/>
@@ -13442,7 +13451,7 @@
                 </a14:hiddenFill>
               </a:ext>
               <a:ext uri="{91240B29-F687-4f45-9708-019B960494DF}">
-                <a14:hiddenLine xmlns="" xmlns:a14="http://schemas.microsoft.com/office/drawing/2010/main" w="9525">
+                <a14:hiddenLine xmlns:a14="http://schemas.microsoft.com/office/drawing/2010/main" xmlns="" w="9525">
                   <a:solidFill>
                     <a:srgbClr val="000000"/>
                   </a:solidFill>
@@ -13452,7 +13461,7 @@
                 </a14:hiddenLine>
               </a:ext>
               <a:ext uri="{AF507438-7753-43e0-B8FC-AC1667EBCBE1}">
-                <a14:hiddenEffects xmlns="" xmlns:a14="http://schemas.microsoft.com/office/drawing/2010/main">
+                <a14:hiddenEffects xmlns:a14="http://schemas.microsoft.com/office/drawing/2010/main" xmlns="">
                   <a:effectLst>
                     <a:outerShdw blurRad="63500" dist="38099" dir="2700000" algn="ctr" rotWithShape="0">
                       <a:srgbClr val="000000">
@@ -13501,7 +13510,7 @@
             <a:effectLst/>
             <a:extLst>
               <a:ext uri="{909E8E84-426E-40dd-AFC4-6F175D3DCCD1}">
-                <a14:hiddenFill xmlns="" xmlns:a14="http://schemas.microsoft.com/office/drawing/2010/main">
+                <a14:hiddenFill xmlns:a14="http://schemas.microsoft.com/office/drawing/2010/main" xmlns="">
                   <a:blipFill dpi="0" rotWithShape="0">
                     <a:blip/>
                     <a:srcRect/>
@@ -13512,7 +13521,7 @@
                 </a14:hiddenFill>
               </a:ext>
               <a:ext uri="{91240B29-F687-4f45-9708-019B960494DF}">
-                <a14:hiddenLine xmlns="" xmlns:a14="http://schemas.microsoft.com/office/drawing/2010/main" w="9525">
+                <a14:hiddenLine xmlns:a14="http://schemas.microsoft.com/office/drawing/2010/main" xmlns="" w="9525">
                   <a:solidFill>
                     <a:srgbClr val="000000"/>
                   </a:solidFill>
@@ -13522,7 +13531,7 @@
                 </a14:hiddenLine>
               </a:ext>
               <a:ext uri="{AF507438-7753-43e0-B8FC-AC1667EBCBE1}">
-                <a14:hiddenEffects xmlns="" xmlns:a14="http://schemas.microsoft.com/office/drawing/2010/main">
+                <a14:hiddenEffects xmlns:a14="http://schemas.microsoft.com/office/drawing/2010/main" xmlns="">
                   <a:effectLst>
                     <a:outerShdw blurRad="63500" dist="38099" dir="2700000" algn="ctr" rotWithShape="0">
                       <a:srgbClr val="000000">
@@ -13563,12 +13572,12 @@
             <a:effectLst/>
             <a:extLst>
               <a:ext uri="{909E8E84-426E-40dd-AFC4-6F175D3DCCD1}">
-                <a14:hiddenFill xmlns="" xmlns:a14="http://schemas.microsoft.com/office/drawing/2010/main">
+                <a14:hiddenFill xmlns:a14="http://schemas.microsoft.com/office/drawing/2010/main" xmlns="">
                   <a:noFill/>
                 </a14:hiddenFill>
               </a:ext>
               <a:ext uri="{AF507438-7753-43e0-B8FC-AC1667EBCBE1}">
-                <a14:hiddenEffects xmlns="" xmlns:a14="http://schemas.microsoft.com/office/drawing/2010/main">
+                <a14:hiddenEffects xmlns:a14="http://schemas.microsoft.com/office/drawing/2010/main" xmlns="">
                   <a:effectLst>
                     <a:outerShdw blurRad="63500" dist="38099" dir="2700000" algn="ctr" rotWithShape="0">
                       <a:srgbClr val="000000">
@@ -13621,12 +13630,12 @@
             <a:effectLst/>
             <a:extLst>
               <a:ext uri="{909E8E84-426E-40dd-AFC4-6F175D3DCCD1}">
-                <a14:hiddenFill xmlns="" xmlns:a14="http://schemas.microsoft.com/office/drawing/2010/main">
+                <a14:hiddenFill xmlns:a14="http://schemas.microsoft.com/office/drawing/2010/main" xmlns="">
                   <a:noFill/>
                 </a14:hiddenFill>
               </a:ext>
               <a:ext uri="{AF507438-7753-43e0-B8FC-AC1667EBCBE1}">
-                <a14:hiddenEffects xmlns="" xmlns:a14="http://schemas.microsoft.com/office/drawing/2010/main">
+                <a14:hiddenEffects xmlns:a14="http://schemas.microsoft.com/office/drawing/2010/main" xmlns="">
                   <a:effectLst>
                     <a:outerShdw blurRad="63500" dist="38099" dir="2700000" algn="ctr" rotWithShape="0">
                       <a:srgbClr val="000000">
@@ -13687,7 +13696,7 @@
             <a:effectLst/>
             <a:extLst>
               <a:ext uri="{909E8E84-426E-40dd-AFC4-6F175D3DCCD1}">
-                <a14:hiddenFill xmlns="" xmlns:a14="http://schemas.microsoft.com/office/drawing/2010/main">
+                <a14:hiddenFill xmlns:a14="http://schemas.microsoft.com/office/drawing/2010/main" xmlns="">
                   <a:blipFill dpi="0" rotWithShape="0">
                     <a:blip/>
                     <a:srcRect/>
@@ -13698,7 +13707,7 @@
                 </a14:hiddenFill>
               </a:ext>
               <a:ext uri="{91240B29-F687-4f45-9708-019B960494DF}">
-                <a14:hiddenLine xmlns="" xmlns:a14="http://schemas.microsoft.com/office/drawing/2010/main" w="9525">
+                <a14:hiddenLine xmlns:a14="http://schemas.microsoft.com/office/drawing/2010/main" xmlns="" w="9525">
                   <a:solidFill>
                     <a:srgbClr val="000000"/>
                   </a:solidFill>
@@ -13708,7 +13717,7 @@
                 </a14:hiddenLine>
               </a:ext>
               <a:ext uri="{AF507438-7753-43e0-B8FC-AC1667EBCBE1}">
-                <a14:hiddenEffects xmlns="" xmlns:a14="http://schemas.microsoft.com/office/drawing/2010/main">
+                <a14:hiddenEffects xmlns:a14="http://schemas.microsoft.com/office/drawing/2010/main" xmlns="">
                   <a:effectLst>
                     <a:outerShdw blurRad="63500" dist="38099" dir="2700000" algn="ctr" rotWithShape="0">
                       <a:srgbClr val="000000">
@@ -13841,7 +13850,7 @@
           <a:effectLst/>
           <a:extLst>
             <a:ext uri="{909E8E84-426E-40dd-AFC4-6F175D3DCCD1}">
-              <a14:hiddenFill xmlns:a14="http://schemas.microsoft.com/office/drawing/2010/main" xmlns="">
+              <a14:hiddenFill xmlns="" xmlns:a14="http://schemas.microsoft.com/office/drawing/2010/main">
                 <a:blipFill dpi="0" rotWithShape="0">
                   <a:blip/>
                   <a:srcRect/>
@@ -13852,7 +13861,7 @@
               </a14:hiddenFill>
             </a:ext>
             <a:ext uri="{91240B29-F687-4f45-9708-019B960494DF}">
-              <a14:hiddenLine xmlns:a14="http://schemas.microsoft.com/office/drawing/2010/main" xmlns="" w="9525">
+              <a14:hiddenLine xmlns="" xmlns:a14="http://schemas.microsoft.com/office/drawing/2010/main" w="9525">
                 <a:solidFill>
                   <a:srgbClr val="000000"/>
                 </a:solidFill>
@@ -13862,7 +13871,7 @@
               </a14:hiddenLine>
             </a:ext>
             <a:ext uri="{AF507438-7753-43e0-B8FC-AC1667EBCBE1}">
-              <a14:hiddenEffects xmlns:a14="http://schemas.microsoft.com/office/drawing/2010/main" xmlns="">
+              <a14:hiddenEffects xmlns="" xmlns:a14="http://schemas.microsoft.com/office/drawing/2010/main">
                 <a:effectLst>
                   <a:outerShdw blurRad="63500" dist="38099" dir="2700000" algn="ctr" rotWithShape="0">
                     <a:srgbClr val="000000">
@@ -13947,7 +13956,7 @@
           <a:effectLst/>
           <a:extLst>
             <a:ext uri="{909E8E84-426E-40dd-AFC4-6F175D3DCCD1}">
-              <a14:hiddenFill xmlns:a14="http://schemas.microsoft.com/office/drawing/2010/main" xmlns="">
+              <a14:hiddenFill xmlns="" xmlns:a14="http://schemas.microsoft.com/office/drawing/2010/main">
                 <a:blipFill dpi="0" rotWithShape="0">
                   <a:blip/>
                   <a:srcRect/>
@@ -13958,7 +13967,7 @@
               </a14:hiddenFill>
             </a:ext>
             <a:ext uri="{91240B29-F687-4f45-9708-019B960494DF}">
-              <a14:hiddenLine xmlns:a14="http://schemas.microsoft.com/office/drawing/2010/main" xmlns="" w="9525">
+              <a14:hiddenLine xmlns="" xmlns:a14="http://schemas.microsoft.com/office/drawing/2010/main" w="9525">
                 <a:solidFill>
                   <a:srgbClr val="000000"/>
                 </a:solidFill>
@@ -13968,7 +13977,7 @@
               </a14:hiddenLine>
             </a:ext>
             <a:ext uri="{AF507438-7753-43e0-B8FC-AC1667EBCBE1}">
-              <a14:hiddenEffects xmlns:a14="http://schemas.microsoft.com/office/drawing/2010/main" xmlns="">
+              <a14:hiddenEffects xmlns="" xmlns:a14="http://schemas.microsoft.com/office/drawing/2010/main">
                 <a:effectLst>
                   <a:outerShdw blurRad="63500" dist="38099" dir="2700000" algn="ctr" rotWithShape="0">
                     <a:srgbClr val="000000">
@@ -14053,7 +14062,7 @@
           <a:effectLst/>
           <a:extLst>
             <a:ext uri="{909E8E84-426E-40dd-AFC4-6F175D3DCCD1}">
-              <a14:hiddenFill xmlns:a14="http://schemas.microsoft.com/office/drawing/2010/main" xmlns="">
+              <a14:hiddenFill xmlns="" xmlns:a14="http://schemas.microsoft.com/office/drawing/2010/main">
                 <a:blipFill dpi="0" rotWithShape="0">
                   <a:blip/>
                   <a:srcRect/>
@@ -14064,7 +14073,7 @@
               </a14:hiddenFill>
             </a:ext>
             <a:ext uri="{91240B29-F687-4f45-9708-019B960494DF}">
-              <a14:hiddenLine xmlns:a14="http://schemas.microsoft.com/office/drawing/2010/main" xmlns="" w="9525">
+              <a14:hiddenLine xmlns="" xmlns:a14="http://schemas.microsoft.com/office/drawing/2010/main" w="9525">
                 <a:solidFill>
                   <a:srgbClr val="000000"/>
                 </a:solidFill>
@@ -14074,7 +14083,7 @@
               </a14:hiddenLine>
             </a:ext>
             <a:ext uri="{AF507438-7753-43e0-B8FC-AC1667EBCBE1}">
-              <a14:hiddenEffects xmlns:a14="http://schemas.microsoft.com/office/drawing/2010/main" xmlns="">
+              <a14:hiddenEffects xmlns="" xmlns:a14="http://schemas.microsoft.com/office/drawing/2010/main">
                 <a:effectLst>
                   <a:outerShdw blurRad="63500" dist="38099" dir="2700000" algn="ctr" rotWithShape="0">
                     <a:srgbClr val="000000">
@@ -14253,7 +14262,7 @@
           <a:effectLst/>
           <a:extLst>
             <a:ext uri="{909E8E84-426E-40dd-AFC4-6F175D3DCCD1}">
-              <a14:hiddenFill xmlns:a14="http://schemas.microsoft.com/office/drawing/2010/main" xmlns="">
+              <a14:hiddenFill xmlns="" xmlns:a14="http://schemas.microsoft.com/office/drawing/2010/main">
                 <a:blipFill dpi="0" rotWithShape="0">
                   <a:blip/>
                   <a:srcRect/>
@@ -14264,7 +14273,7 @@
               </a14:hiddenFill>
             </a:ext>
             <a:ext uri="{91240B29-F687-4f45-9708-019B960494DF}">
-              <a14:hiddenLine xmlns:a14="http://schemas.microsoft.com/office/drawing/2010/main" xmlns="" w="9525">
+              <a14:hiddenLine xmlns="" xmlns:a14="http://schemas.microsoft.com/office/drawing/2010/main" w="9525">
                 <a:solidFill>
                   <a:srgbClr val="000000"/>
                 </a:solidFill>
@@ -14274,7 +14283,7 @@
               </a14:hiddenLine>
             </a:ext>
             <a:ext uri="{AF507438-7753-43e0-B8FC-AC1667EBCBE1}">
-              <a14:hiddenEffects xmlns:a14="http://schemas.microsoft.com/office/drawing/2010/main" xmlns="">
+              <a14:hiddenEffects xmlns="" xmlns:a14="http://schemas.microsoft.com/office/drawing/2010/main">
                 <a:effectLst>
                   <a:outerShdw blurRad="63500" dist="38099" dir="2700000" algn="ctr" rotWithShape="0">
                     <a:srgbClr val="000000">
@@ -14352,7 +14361,7 @@
           <a:effectLst/>
           <a:extLst>
             <a:ext uri="{909E8E84-426E-40dd-AFC4-6F175D3DCCD1}">
-              <a14:hiddenFill xmlns:a14="http://schemas.microsoft.com/office/drawing/2010/main" xmlns="">
+              <a14:hiddenFill xmlns="" xmlns:a14="http://schemas.microsoft.com/office/drawing/2010/main">
                 <a:blipFill dpi="0" rotWithShape="0">
                   <a:blip/>
                   <a:srcRect/>
@@ -14363,7 +14372,7 @@
               </a14:hiddenFill>
             </a:ext>
             <a:ext uri="{91240B29-F687-4f45-9708-019B960494DF}">
-              <a14:hiddenLine xmlns:a14="http://schemas.microsoft.com/office/drawing/2010/main" xmlns="" w="9525">
+              <a14:hiddenLine xmlns="" xmlns:a14="http://schemas.microsoft.com/office/drawing/2010/main" w="9525">
                 <a:solidFill>
                   <a:srgbClr val="000000"/>
                 </a:solidFill>
@@ -14373,7 +14382,7 @@
               </a14:hiddenLine>
             </a:ext>
             <a:ext uri="{AF507438-7753-43e0-B8FC-AC1667EBCBE1}">
-              <a14:hiddenEffects xmlns:a14="http://schemas.microsoft.com/office/drawing/2010/main" xmlns="">
+              <a14:hiddenEffects xmlns="" xmlns:a14="http://schemas.microsoft.com/office/drawing/2010/main">
                 <a:effectLst>
                   <a:outerShdw blurRad="63500" dist="38099" dir="2700000" algn="ctr" rotWithShape="0">
                     <a:srgbClr val="000000">
@@ -16535,7 +16544,7 @@
           <a:effectLst/>
           <a:extLst>
             <a:ext uri="{909E8E84-426E-40dd-AFC4-6F175D3DCCD1}">
-              <a14:hiddenFill xmlns="" xmlns:a14="http://schemas.microsoft.com/office/drawing/2010/main">
+              <a14:hiddenFill xmlns:a14="http://schemas.microsoft.com/office/drawing/2010/main" xmlns="">
                 <a:blipFill dpi="0" rotWithShape="0">
                   <a:blip/>
                   <a:srcRect/>
@@ -16546,7 +16555,7 @@
               </a14:hiddenFill>
             </a:ext>
             <a:ext uri="{91240B29-F687-4f45-9708-019B960494DF}">
-              <a14:hiddenLine xmlns="" xmlns:a14="http://schemas.microsoft.com/office/drawing/2010/main" w="9525">
+              <a14:hiddenLine xmlns:a14="http://schemas.microsoft.com/office/drawing/2010/main" xmlns="" w="9525">
                 <a:solidFill>
                   <a:srgbClr val="000000"/>
                 </a:solidFill>
@@ -16556,7 +16565,7 @@
               </a14:hiddenLine>
             </a:ext>
             <a:ext uri="{AF507438-7753-43e0-B8FC-AC1667EBCBE1}">
-              <a14:hiddenEffects xmlns="" xmlns:a14="http://schemas.microsoft.com/office/drawing/2010/main">
+              <a14:hiddenEffects xmlns:a14="http://schemas.microsoft.com/office/drawing/2010/main" xmlns="">
                 <a:effectLst>
                   <a:outerShdw blurRad="63500" dist="38099" dir="2700000" algn="ctr" rotWithShape="0">
                     <a:srgbClr val="000000">
@@ -16710,7 +16719,7 @@
           <a:effectLst/>
           <a:extLst>
             <a:ext uri="{909E8E84-426E-40dd-AFC4-6F175D3DCCD1}">
-              <a14:hiddenFill xmlns="" xmlns:a14="http://schemas.microsoft.com/office/drawing/2010/main">
+              <a14:hiddenFill xmlns:a14="http://schemas.microsoft.com/office/drawing/2010/main" xmlns="">
                 <a:blipFill dpi="0" rotWithShape="0">
                   <a:blip/>
                   <a:srcRect/>
@@ -16721,7 +16730,7 @@
               </a14:hiddenFill>
             </a:ext>
             <a:ext uri="{91240B29-F687-4f45-9708-019B960494DF}">
-              <a14:hiddenLine xmlns="" xmlns:a14="http://schemas.microsoft.com/office/drawing/2010/main" w="9525">
+              <a14:hiddenLine xmlns:a14="http://schemas.microsoft.com/office/drawing/2010/main" xmlns="" w="9525">
                 <a:solidFill>
                   <a:srgbClr val="000000"/>
                 </a:solidFill>
@@ -16731,7 +16740,7 @@
               </a14:hiddenLine>
             </a:ext>
             <a:ext uri="{AF507438-7753-43e0-B8FC-AC1667EBCBE1}">
-              <a14:hiddenEffects xmlns="" xmlns:a14="http://schemas.microsoft.com/office/drawing/2010/main">
+              <a14:hiddenEffects xmlns:a14="http://schemas.microsoft.com/office/drawing/2010/main" xmlns="">
                 <a:effectLst>
                   <a:outerShdw blurRad="63500" dist="38099" dir="2700000" algn="ctr" rotWithShape="0">
                     <a:srgbClr val="000000">
@@ -18524,7 +18533,7 @@
           <a:effectLst/>
           <a:extLst>
             <a:ext uri="{909E8E84-426E-40dd-AFC4-6F175D3DCCD1}">
-              <a14:hiddenFill xmlns="" xmlns:a14="http://schemas.microsoft.com/office/drawing/2010/main">
+              <a14:hiddenFill xmlns:a14="http://schemas.microsoft.com/office/drawing/2010/main" xmlns="">
                 <a:blipFill dpi="0" rotWithShape="0">
                   <a:blip/>
                   <a:srcRect/>
@@ -18535,7 +18544,7 @@
               </a14:hiddenFill>
             </a:ext>
             <a:ext uri="{91240B29-F687-4f45-9708-019B960494DF}">
-              <a14:hiddenLine xmlns="" xmlns:a14="http://schemas.microsoft.com/office/drawing/2010/main" w="9525">
+              <a14:hiddenLine xmlns:a14="http://schemas.microsoft.com/office/drawing/2010/main" xmlns="" w="9525">
                 <a:solidFill>
                   <a:srgbClr val="000000"/>
                 </a:solidFill>
@@ -18545,7 +18554,7 @@
               </a14:hiddenLine>
             </a:ext>
             <a:ext uri="{AF507438-7753-43e0-B8FC-AC1667EBCBE1}">
-              <a14:hiddenEffects xmlns="" xmlns:a14="http://schemas.microsoft.com/office/drawing/2010/main">
+              <a14:hiddenEffects xmlns:a14="http://schemas.microsoft.com/office/drawing/2010/main" xmlns="">
                 <a:effectLst>
                   <a:outerShdw blurRad="63500" dist="38099" dir="2700000" algn="ctr" rotWithShape="0">
                     <a:srgbClr val="000000">
@@ -21455,7 +21464,7 @@
           <a:effectLst/>
           <a:extLst>
             <a:ext uri="{909E8E84-426E-40dd-AFC4-6F175D3DCCD1}">
-              <a14:hiddenFill xmlns="" xmlns:a14="http://schemas.microsoft.com/office/drawing/2010/main">
+              <a14:hiddenFill xmlns:a14="http://schemas.microsoft.com/office/drawing/2010/main" xmlns="">
                 <a:blipFill dpi="0" rotWithShape="0">
                   <a:blip/>
                   <a:srcRect/>
@@ -21466,7 +21475,7 @@
               </a14:hiddenFill>
             </a:ext>
             <a:ext uri="{91240B29-F687-4f45-9708-019B960494DF}">
-              <a14:hiddenLine xmlns="" xmlns:a14="http://schemas.microsoft.com/office/drawing/2010/main" w="9525">
+              <a14:hiddenLine xmlns:a14="http://schemas.microsoft.com/office/drawing/2010/main" xmlns="" w="9525">
                 <a:solidFill>
                   <a:srgbClr val="000000"/>
                 </a:solidFill>
@@ -21476,7 +21485,7 @@
               </a14:hiddenLine>
             </a:ext>
             <a:ext uri="{AF507438-7753-43e0-B8FC-AC1667EBCBE1}">
-              <a14:hiddenEffects xmlns="" xmlns:a14="http://schemas.microsoft.com/office/drawing/2010/main">
+              <a14:hiddenEffects xmlns:a14="http://schemas.microsoft.com/office/drawing/2010/main" xmlns="">
                 <a:effectLst>
                   <a:outerShdw blurRad="63500" dist="38099" dir="2700000" algn="ctr" rotWithShape="0">
                     <a:srgbClr val="000000">
@@ -21555,7 +21564,7 @@
           <a:effectLst/>
           <a:extLst>
             <a:ext uri="{909E8E84-426E-40dd-AFC4-6F175D3DCCD1}">
-              <a14:hiddenFill xmlns="" xmlns:a14="http://schemas.microsoft.com/office/drawing/2010/main">
+              <a14:hiddenFill xmlns:a14="http://schemas.microsoft.com/office/drawing/2010/main" xmlns="">
                 <a:blipFill dpi="0" rotWithShape="0">
                   <a:blip/>
                   <a:srcRect/>
@@ -21566,7 +21575,7 @@
               </a14:hiddenFill>
             </a:ext>
             <a:ext uri="{91240B29-F687-4f45-9708-019B960494DF}">
-              <a14:hiddenLine xmlns="" xmlns:a14="http://schemas.microsoft.com/office/drawing/2010/main" w="9525">
+              <a14:hiddenLine xmlns:a14="http://schemas.microsoft.com/office/drawing/2010/main" xmlns="" w="9525">
                 <a:solidFill>
                   <a:srgbClr val="000000"/>
                 </a:solidFill>
@@ -21576,7 +21585,7 @@
               </a14:hiddenLine>
             </a:ext>
             <a:ext uri="{AF507438-7753-43e0-B8FC-AC1667EBCBE1}">
-              <a14:hiddenEffects xmlns="" xmlns:a14="http://schemas.microsoft.com/office/drawing/2010/main">
+              <a14:hiddenEffects xmlns:a14="http://schemas.microsoft.com/office/drawing/2010/main" xmlns="">
                 <a:effectLst>
                   <a:outerShdw blurRad="63500" dist="38099" dir="2700000" algn="ctr" rotWithShape="0">
                     <a:srgbClr val="000000">
@@ -23171,7 +23180,7 @@
           <a:effectLst/>
           <a:extLst>
             <a:ext uri="{909E8E84-426E-40dd-AFC4-6F175D3DCCD1}">
-              <a14:hiddenFill xmlns="" xmlns:a14="http://schemas.microsoft.com/office/drawing/2010/main">
+              <a14:hiddenFill xmlns:a14="http://schemas.microsoft.com/office/drawing/2010/main" xmlns="">
                 <a:blipFill dpi="0" rotWithShape="0">
                   <a:blip/>
                   <a:srcRect/>
@@ -23182,7 +23191,7 @@
               </a14:hiddenFill>
             </a:ext>
             <a:ext uri="{91240B29-F687-4f45-9708-019B960494DF}">
-              <a14:hiddenLine xmlns="" xmlns:a14="http://schemas.microsoft.com/office/drawing/2010/main" w="9525">
+              <a14:hiddenLine xmlns:a14="http://schemas.microsoft.com/office/drawing/2010/main" xmlns="" w="9525">
                 <a:solidFill>
                   <a:srgbClr val="000000"/>
                 </a:solidFill>
@@ -23192,7 +23201,7 @@
               </a14:hiddenLine>
             </a:ext>
             <a:ext uri="{AF507438-7753-43e0-B8FC-AC1667EBCBE1}">
-              <a14:hiddenEffects xmlns="" xmlns:a14="http://schemas.microsoft.com/office/drawing/2010/main">
+              <a14:hiddenEffects xmlns:a14="http://schemas.microsoft.com/office/drawing/2010/main" xmlns="">
                 <a:effectLst>
                   <a:outerShdw blurRad="63500" dist="38099" dir="2700000" algn="ctr" rotWithShape="0">
                     <a:srgbClr val="000000">
@@ -24840,7 +24849,7 @@
           <a:effectLst/>
           <a:extLst>
             <a:ext uri="{909E8E84-426E-40dd-AFC4-6F175D3DCCD1}">
-              <a14:hiddenFill xmlns="" xmlns:a14="http://schemas.microsoft.com/office/drawing/2010/main">
+              <a14:hiddenFill xmlns:a14="http://schemas.microsoft.com/office/drawing/2010/main" xmlns="">
                 <a:blipFill dpi="0" rotWithShape="0">
                   <a:blip/>
                   <a:srcRect/>
@@ -24851,7 +24860,7 @@
               </a14:hiddenFill>
             </a:ext>
             <a:ext uri="{91240B29-F687-4f45-9708-019B960494DF}">
-              <a14:hiddenLine xmlns="" xmlns:a14="http://schemas.microsoft.com/office/drawing/2010/main" w="9525">
+              <a14:hiddenLine xmlns:a14="http://schemas.microsoft.com/office/drawing/2010/main" xmlns="" w="9525">
                 <a:solidFill>
                   <a:srgbClr val="000000"/>
                 </a:solidFill>
@@ -24861,7 +24870,7 @@
               </a14:hiddenLine>
             </a:ext>
             <a:ext uri="{AF507438-7753-43e0-B8FC-AC1667EBCBE1}">
-              <a14:hiddenEffects xmlns="" xmlns:a14="http://schemas.microsoft.com/office/drawing/2010/main">
+              <a14:hiddenEffects xmlns:a14="http://schemas.microsoft.com/office/drawing/2010/main" xmlns="">
                 <a:effectLst>
                   <a:outerShdw blurRad="63500" dist="38099" dir="2700000" algn="ctr" rotWithShape="0">
                     <a:srgbClr val="000000">
@@ -26223,7 +26232,7 @@
           <a:effectLst/>
           <a:extLst>
             <a:ext uri="{909E8E84-426E-40dd-AFC4-6F175D3DCCD1}">
-              <a14:hiddenFill xmlns="" xmlns:a14="http://schemas.microsoft.com/office/drawing/2010/main">
+              <a14:hiddenFill xmlns:a14="http://schemas.microsoft.com/office/drawing/2010/main" xmlns="">
                 <a:blipFill dpi="0" rotWithShape="0">
                   <a:blip/>
                   <a:srcRect/>
@@ -26234,7 +26243,7 @@
               </a14:hiddenFill>
             </a:ext>
             <a:ext uri="{91240B29-F687-4f45-9708-019B960494DF}">
-              <a14:hiddenLine xmlns="" xmlns:a14="http://schemas.microsoft.com/office/drawing/2010/main" w="9525">
+              <a14:hiddenLine xmlns:a14="http://schemas.microsoft.com/office/drawing/2010/main" xmlns="" w="9525">
                 <a:solidFill>
                   <a:srgbClr val="000000"/>
                 </a:solidFill>
@@ -26244,7 +26253,7 @@
               </a14:hiddenLine>
             </a:ext>
             <a:ext uri="{AF507438-7753-43e0-B8FC-AC1667EBCBE1}">
-              <a14:hiddenEffects xmlns="" xmlns:a14="http://schemas.microsoft.com/office/drawing/2010/main">
+              <a14:hiddenEffects xmlns:a14="http://schemas.microsoft.com/office/drawing/2010/main" xmlns="">
                 <a:effectLst>
                   <a:outerShdw blurRad="63500" dist="38099" dir="2700000" algn="ctr" rotWithShape="0">
                     <a:srgbClr val="000000">
@@ -26375,7 +26384,7 @@
           <a:effectLst/>
           <a:extLst>
             <a:ext uri="{909E8E84-426E-40dd-AFC4-6F175D3DCCD1}">
-              <a14:hiddenFill xmlns="" xmlns:a14="http://schemas.microsoft.com/office/drawing/2010/main">
+              <a14:hiddenFill xmlns:a14="http://schemas.microsoft.com/office/drawing/2010/main" xmlns="">
                 <a:blipFill dpi="0" rotWithShape="0">
                   <a:blip/>
                   <a:srcRect/>
@@ -26386,7 +26395,7 @@
               </a14:hiddenFill>
             </a:ext>
             <a:ext uri="{91240B29-F687-4f45-9708-019B960494DF}">
-              <a14:hiddenLine xmlns="" xmlns:a14="http://schemas.microsoft.com/office/drawing/2010/main" w="9525">
+              <a14:hiddenLine xmlns:a14="http://schemas.microsoft.com/office/drawing/2010/main" xmlns="" w="9525">
                 <a:solidFill>
                   <a:srgbClr val="000000"/>
                 </a:solidFill>
@@ -26396,7 +26405,7 @@
               </a14:hiddenLine>
             </a:ext>
             <a:ext uri="{AF507438-7753-43e0-B8FC-AC1667EBCBE1}">
-              <a14:hiddenEffects xmlns="" xmlns:a14="http://schemas.microsoft.com/office/drawing/2010/main">
+              <a14:hiddenEffects xmlns:a14="http://schemas.microsoft.com/office/drawing/2010/main" xmlns="">
                 <a:effectLst>
                   <a:outerShdw blurRad="63500" dist="38099" dir="2700000" algn="ctr" rotWithShape="0">
                     <a:srgbClr val="000000">
@@ -29122,8 +29131,8 @@
           </a:p>
         </p:txBody>
       </p:sp>
-      <mc:AlternateContent xmlns:mc="http://schemas.openxmlformats.org/markup-compatibility/2006">
-        <mc:Choice xmlns:a14="http://schemas.microsoft.com/office/drawing/2010/main" Requires="a14">
+      <mc:AlternateContent xmlns:mc="http://schemas.openxmlformats.org/markup-compatibility/2006" xmlns:a14="http://schemas.microsoft.com/office/drawing/2010/main">
+        <mc:Choice Requires="a14">
           <p:sp>
             <p:nvSpPr>
               <p:cNvPr id="3" name="Content Placeholder 2"/>
@@ -29932,7 +29941,7 @@
             </p:txBody>
           </p:sp>
         </mc:Choice>
-        <mc:Fallback>
+        <mc:Fallback xmlns="">
           <p:sp>
             <p:nvSpPr>
               <p:cNvPr id="3" name="Content Placeholder 2"/>
@@ -33941,7 +33950,7 @@
           <a:effectLst/>
           <a:extLst>
             <a:ext uri="{909E8E84-426E-40dd-AFC4-6F175D3DCCD1}">
-              <a14:hiddenFill xmlns:a14="http://schemas.microsoft.com/office/drawing/2010/main" xmlns="">
+              <a14:hiddenFill xmlns="" xmlns:a14="http://schemas.microsoft.com/office/drawing/2010/main">
                 <a:blipFill dpi="0" rotWithShape="0">
                   <a:blip/>
                   <a:srcRect/>
@@ -33952,7 +33961,7 @@
               </a14:hiddenFill>
             </a:ext>
             <a:ext uri="{91240B29-F687-4f45-9708-019B960494DF}">
-              <a14:hiddenLine xmlns:a14="http://schemas.microsoft.com/office/drawing/2010/main" xmlns="" w="9525">
+              <a14:hiddenLine xmlns="" xmlns:a14="http://schemas.microsoft.com/office/drawing/2010/main" w="9525">
                 <a:solidFill>
                   <a:srgbClr val="000000"/>
                 </a:solidFill>
@@ -33962,7 +33971,7 @@
               </a14:hiddenLine>
             </a:ext>
             <a:ext uri="{AF507438-7753-43e0-B8FC-AC1667EBCBE1}">
-              <a14:hiddenEffects xmlns:a14="http://schemas.microsoft.com/office/drawing/2010/main" xmlns="">
+              <a14:hiddenEffects xmlns="" xmlns:a14="http://schemas.microsoft.com/office/drawing/2010/main">
                 <a:effectLst>
                   <a:outerShdw blurRad="63500" dist="38099" dir="2700000" algn="ctr" rotWithShape="0">
                     <a:srgbClr val="000000">

</xml_diff>

<commit_message>
Remove eval from talk; simplify some slides.
Still need to streamline linear-in-state explanation
</commit_message>
<xml_diff>
--- a/marple.pptx
+++ b/marple.pptx
@@ -43,12 +43,12 @@
     <p:sldId id="622" r:id="rId34"/>
     <p:sldId id="634" r:id="rId35"/>
     <p:sldId id="624" r:id="rId36"/>
-    <p:sldId id="580" r:id="rId37"/>
-    <p:sldId id="347" r:id="rId38"/>
-    <p:sldId id="500" r:id="rId39"/>
-    <p:sldId id="501" r:id="rId40"/>
-    <p:sldId id="581" r:id="rId41"/>
-    <p:sldId id="305" r:id="rId42"/>
+    <p:sldId id="305" r:id="rId37"/>
+    <p:sldId id="580" r:id="rId38"/>
+    <p:sldId id="347" r:id="rId39"/>
+    <p:sldId id="500" r:id="rId40"/>
+    <p:sldId id="501" r:id="rId41"/>
+    <p:sldId id="581" r:id="rId42"/>
   </p:sldIdLst>
   <p:sldSz cx="12192000" cy="6858000"/>
   <p:notesSz cx="6858000" cy="9144000"/>
@@ -671,15 +671,7 @@
             </a:r>
             <a:r>
               <a:rPr lang="en-US" baseline="0" dirty="0"/>
-              <a:t>, which allow you to restrict the stream, transform it, </a:t>
-            </a:r>
-            <a:r>
-              <a:rPr lang="en-US" baseline="0"/>
-              <a:t>and maintain </a:t>
-            </a:r>
-            <a:r>
-              <a:rPr lang="en-US" baseline="0" dirty="0"/>
-              <a:t>state across tuples in the stream.</a:t>
+              <a:t>, which allow you to restrict the stream, transform it, and maintain state across tuples in the stream.</a:t>
             </a:r>
           </a:p>
         </p:txBody>
@@ -3433,26 +3425,10 @@
           <a:bodyPr/>
           <a:lstStyle/>
           <a:p>
-            <a:pPr marL="0" marR="0" lvl="0" indent="0" algn="l" defTabSz="914400" rtl="0" eaLnBrk="1" fontAlgn="auto" latinLnBrk="0" hangingPunct="1">
-              <a:lnSpc>
-                <a:spcPct val="100000"/>
-              </a:lnSpc>
-              <a:spcBef>
-                <a:spcPts val="0"/>
-              </a:spcBef>
-              <a:spcAft>
-                <a:spcPts val="0"/>
-              </a:spcAft>
-              <a:buClrTx/>
-              <a:buSzTx/>
-              <a:buFontTx/>
-              <a:buNone/>
-              <a:tabLst/>
-              <a:defRPr/>
-            </a:pPr>
+            <a:pPr lvl="1"/>
             <a:r>
               <a:rPr lang="en-US" dirty="0"/>
-              <a:t>Finally, I’ll talk about some evaluation results. Our main question is how much benefit the cache brings us in terms of reducing the number of key-value-store pairs that are sent to the backing store.</a:t>
+              <a:t>So in summary this talk was about two main ideas: (1) a query language for network performance monitoring that is designed to capture a variety of new and old network monitoring use cases and (2) a hardware design that supports this query language at high speeds. The full paper and supporting code are available at this web site, and I am happy to take questions.</a:t>
             </a:r>
           </a:p>
         </p:txBody>
@@ -3483,7 +3459,7 @@
     </p:spTree>
     <p:extLst>
       <p:ext uri="{BB962C8B-B14F-4D97-AF65-F5344CB8AC3E}">
-        <p14:creationId xmlns:p14="http://schemas.microsoft.com/office/powerpoint/2010/main" val="1582905122"/>
+        <p14:creationId xmlns:p14="http://schemas.microsoft.com/office/powerpoint/2010/main" val="1117120813"/>
       </p:ext>
     </p:extLst>
   </p:cSld>
@@ -3537,34 +3513,26 @@
           <a:bodyPr/>
           <a:lstStyle/>
           <a:p>
+            <a:pPr marL="0" marR="0" lvl="0" indent="0" algn="l" defTabSz="914400" rtl="0" eaLnBrk="1" fontAlgn="auto" latinLnBrk="0" hangingPunct="1">
+              <a:lnSpc>
+                <a:spcPct val="100000"/>
+              </a:lnSpc>
+              <a:spcBef>
+                <a:spcPts val="0"/>
+              </a:spcBef>
+              <a:spcAft>
+                <a:spcPts val="0"/>
+              </a:spcAft>
+              <a:buClrTx/>
+              <a:buSzTx/>
+              <a:buFontTx/>
+              <a:buNone/>
+              <a:tabLst/>
+              <a:defRPr/>
+            </a:pPr>
             <a:r>
               <a:rPr lang="en-US" dirty="0"/>
-              <a:t>Here are some relevant experimental setup details for our evaluation of the cache eviction rate. We used trace-based evaluation to evaluate the eviction rate using a core router and a data center trace. Our query was a </a:t>
-            </a:r>
-            <a:r>
-              <a:rPr lang="en-US" dirty="0" err="1"/>
-              <a:t>groupby</a:t>
-            </a:r>
-            <a:r>
-              <a:rPr lang="en-US" dirty="0"/>
-              <a:t> that partitioned by 5-tuple. The caching eviction policy was 8-way LRU similar to many processor caches simply because it is easy to implement.</a:t>
-            </a:r>
-          </a:p>
-          <a:p>
-            <a:endParaRPr lang="en-US" dirty="0"/>
-          </a:p>
-          <a:p>
-            <a:r>
-              <a:rPr lang="en-US" dirty="0"/>
-              <a:t>We first measure the eviction ratio because this doesn’t depend on the packet rate or the size of keys and values. We then translate this into a concrete eviction rate for some specific packet rates and </a:t>
-            </a:r>
-            <a:r>
-              <a:rPr lang="en-US" dirty="0" err="1"/>
-              <a:t>key+value</a:t>
-            </a:r>
-            <a:r>
-              <a:rPr lang="en-US" dirty="0"/>
-              <a:t> sizes.</a:t>
+              <a:t>Finally, I’ll talk about some evaluation results. Our main question is how much benefit the cache brings us in terms of reducing the number of key-value-store pairs that are sent to the backing store.</a:t>
             </a:r>
           </a:p>
         </p:txBody>
@@ -3595,7 +3563,7 @@
     </p:spTree>
     <p:extLst>
       <p:ext uri="{BB962C8B-B14F-4D97-AF65-F5344CB8AC3E}">
-        <p14:creationId xmlns:p14="http://schemas.microsoft.com/office/powerpoint/2010/main" val="996105604"/>
+        <p14:creationId xmlns:p14="http://schemas.microsoft.com/office/powerpoint/2010/main" val="1582905122"/>
       </p:ext>
     </p:extLst>
   </p:cSld>
@@ -3651,7 +3619,32 @@
           <a:p>
             <a:r>
               <a:rPr lang="en-US" dirty="0"/>
-              <a:t>So here’s the result. As expected, the eviction ratio goes down as the number of cache slots increases. One other interesting takeaway is that a dc environment has much more locality allowing us to get away with a much smaller size cache.</a:t>
+              <a:t>Here are some relevant experimental setup details for our evaluation of the cache eviction rate. We used trace-based evaluation to evaluate the eviction rate using a core router and a data center trace. Our query was a </a:t>
+            </a:r>
+            <a:r>
+              <a:rPr lang="en-US" dirty="0" err="1"/>
+              <a:t>groupby</a:t>
+            </a:r>
+            <a:r>
+              <a:rPr lang="en-US" dirty="0"/>
+              <a:t> that partitioned by 5-tuple. The caching eviction policy was 8-way LRU similar to many processor caches simply because it is easy to implement.</a:t>
+            </a:r>
+          </a:p>
+          <a:p>
+            <a:endParaRPr lang="en-US" dirty="0"/>
+          </a:p>
+          <a:p>
+            <a:r>
+              <a:rPr lang="en-US" dirty="0"/>
+              <a:t>We first measure the eviction ratio because this doesn’t depend on the packet rate or the size of keys and values. We then translate this into a concrete eviction rate for some specific packet rates and </a:t>
+            </a:r>
+            <a:r>
+              <a:rPr lang="en-US" dirty="0" err="1"/>
+              <a:t>key+value</a:t>
+            </a:r>
+            <a:r>
+              <a:rPr lang="en-US" dirty="0"/>
+              <a:t> sizes.</a:t>
             </a:r>
           </a:p>
         </p:txBody>
@@ -3682,7 +3675,7 @@
     </p:spTree>
     <p:extLst>
       <p:ext uri="{BB962C8B-B14F-4D97-AF65-F5344CB8AC3E}">
-        <p14:creationId xmlns:p14="http://schemas.microsoft.com/office/powerpoint/2010/main" val="3768091958"/>
+        <p14:creationId xmlns:p14="http://schemas.microsoft.com/office/powerpoint/2010/main" val="4269550850"/>
       </p:ext>
     </p:extLst>
   </p:cSld>
@@ -3738,15 +3731,7 @@
           <a:p>
             <a:r>
               <a:rPr lang="en-US" dirty="0"/>
-              <a:t>Now, let’s translate this into a concrete number. Let’s pick 2**18 keys. Assuming a combined key and value size of 256 bits, that corresponds to 64 </a:t>
-            </a:r>
-            <a:r>
-              <a:rPr lang="en-US" dirty="0" err="1"/>
-              <a:t>Mbits</a:t>
-            </a:r>
-            <a:r>
-              <a:rPr lang="en-US" dirty="0"/>
-              <a:t>. That’s a 4% packet eviction ratio, which means it’s 25X smaller than processing every packet at a collection server directly.</a:t>
+              <a:t>So here’s the result. As expected, the eviction ratio goes down as the number of cache slots increases. One other interesting takeaway is that a dc environment has much more locality allowing us to get away with a much smaller size cache.</a:t>
             </a:r>
           </a:p>
         </p:txBody>
@@ -3777,7 +3762,7 @@
     </p:spTree>
     <p:extLst>
       <p:ext uri="{BB962C8B-B14F-4D97-AF65-F5344CB8AC3E}">
-        <p14:creationId xmlns:p14="http://schemas.microsoft.com/office/powerpoint/2010/main" val="4082612346"/>
+        <p14:creationId xmlns:p14="http://schemas.microsoft.com/office/powerpoint/2010/main" val="3299793430"/>
       </p:ext>
     </p:extLst>
   </p:cSld>
@@ -3833,7 +3818,7 @@
           <a:p>
             <a:r>
               <a:rPr lang="en-US" dirty="0"/>
-              <a:t>TO put this into context. For a 64-poort 100-Gbits/switch, if we assume 2**20 slots, that’s a memory requirement of 256 </a:t>
+              <a:t>Now, let’s translate this into a concrete number. Let’s pick 2**18 keys. Assuming a combined key and value size of 256 bits, that corresponds to 64 </a:t>
             </a:r>
             <a:r>
               <a:rPr lang="en-US" dirty="0" err="1"/>
@@ -3841,7 +3826,7 @@
             </a:r>
             <a:r>
               <a:rPr lang="en-US" dirty="0"/>
-              <a:t>, which is about 7.5% of the switching chip’s area. Assuming typical traffic patterns for this switch, this translates into an eviction rate of 8M records every second, which we estimate can be handled by a 32-core server. So the way to think about this is that we can service the eviction rate for a 64 server cluster connected to a TOR switch by using a single 32-core server for typical workloads. This is a simplified summary of the results. The paper has many more details on this.</a:t>
+              <a:t>. That’s a 4% packet eviction ratio, which means it’s 25X smaller than processing every packet at a collection server directly.</a:t>
             </a:r>
           </a:p>
         </p:txBody>
@@ -3872,7 +3857,7 @@
     </p:spTree>
     <p:extLst>
       <p:ext uri="{BB962C8B-B14F-4D97-AF65-F5344CB8AC3E}">
-        <p14:creationId xmlns:p14="http://schemas.microsoft.com/office/powerpoint/2010/main" val="8400029"/>
+        <p14:creationId xmlns:p14="http://schemas.microsoft.com/office/powerpoint/2010/main" val="2642239952"/>
       </p:ext>
     </p:extLst>
   </p:cSld>
@@ -4013,10 +3998,17 @@
           <a:bodyPr/>
           <a:lstStyle/>
           <a:p>
-            <a:pPr lvl="1"/>
             <a:r>
               <a:rPr lang="en-US" dirty="0"/>
-              <a:t>So in summary this talk was about two main ideas: (1) a query language for network performance monitoring that is designed to capture a variety of new and old network monitoring use cases and (2) a hardware design that supports this query language at high speeds. The full paper and supporting code are available at this web site, and I am happy to take questions.</a:t>
+              <a:t>TO put this into context. For a 64-poort 100-Gbits/switch, if we assume 2**20 slots, that’s a memory requirement of 256 </a:t>
+            </a:r>
+            <a:r>
+              <a:rPr lang="en-US" dirty="0" err="1"/>
+              <a:t>Mbits</a:t>
+            </a:r>
+            <a:r>
+              <a:rPr lang="en-US" dirty="0"/>
+              <a:t>, which is about 7.5% of the switching chip’s area. Assuming typical traffic patterns for this switch, this translates into an eviction rate of 8M records every second, which we estimate can be handled by a 32-core server. So the way to think about this is that we can service the eviction rate for a 64 server cluster connected to a TOR switch by using a single 32-core server for typical workloads. This is a simplified summary of the results. The paper has many more details on this.</a:t>
             </a:r>
           </a:p>
         </p:txBody>
@@ -4047,7 +4039,7 @@
     </p:spTree>
     <p:extLst>
       <p:ext uri="{BB962C8B-B14F-4D97-AF65-F5344CB8AC3E}">
-        <p14:creationId xmlns:p14="http://schemas.microsoft.com/office/powerpoint/2010/main" val="1117120813"/>
+        <p14:creationId xmlns:p14="http://schemas.microsoft.com/office/powerpoint/2010/main" val="1066101504"/>
       </p:ext>
     </p:extLst>
   </p:cSld>
@@ -7522,8 +7514,8 @@
         </p:nvSpPr>
         <p:spPr>
           <a:xfrm>
-            <a:off x="4067239" y="2693713"/>
-            <a:ext cx="4057521" cy="584775"/>
+            <a:off x="4261202" y="2693713"/>
+            <a:ext cx="3669594" cy="584775"/>
           </a:xfrm>
           <a:prstGeom prst="rect">
             <a:avLst/>
@@ -7536,10 +7528,9 @@
           <a:lstStyle/>
           <a:p>
             <a:r>
-              <a:rPr lang="en-US" sz="3200" b="1" dirty="0"/>
+              <a:rPr lang="en-US" sz="3200" dirty="0"/>
               <a:t>Anirudh Sivaraman</a:t>
             </a:r>
-            <a:endParaRPr lang="en-US" sz="3200" dirty="0"/>
           </a:p>
         </p:txBody>
       </p:sp>
@@ -7598,151 +7589,7 @@
           <a:p>
             <a:r>
               <a:rPr lang="en-US" dirty="0"/>
-              <a:t>Marple: Performance query language</a:t>
-            </a:r>
-          </a:p>
-        </p:txBody>
-      </p:sp>
-      <p:sp>
-        <p:nvSpPr>
-          <p:cNvPr id="3" name="Content Placeholder 2"/>
-          <p:cNvSpPr>
-            <a:spLocks noGrp="1"/>
-          </p:cNvSpPr>
-          <p:nvPr>
-            <p:ph idx="1"/>
-          </p:nvPr>
-        </p:nvSpPr>
-        <p:spPr/>
-        <p:txBody>
-          <a:bodyPr/>
-          <a:lstStyle/>
-          <a:p>
-            <a:pPr marL="0" indent="0" algn="ctr">
-              <a:buNone/>
-            </a:pPr>
-            <a:r>
-              <a:rPr lang="en-US" dirty="0"/>
-              <a:t>Stream: For </a:t>
-            </a:r>
-            <a:r>
-              <a:rPr lang="en-US" i="1" dirty="0"/>
-              <a:t>each </a:t>
-            </a:r>
-            <a:r>
-              <a:rPr lang="en-US" dirty="0"/>
-              <a:t>packet at </a:t>
-            </a:r>
-            <a:r>
-              <a:rPr lang="en-US" i="1" dirty="0"/>
-              <a:t>each </a:t>
-            </a:r>
-            <a:r>
-              <a:rPr lang="en-US" dirty="0"/>
-              <a:t>queue,</a:t>
-            </a:r>
-          </a:p>
-          <a:p>
-            <a:pPr lvl="1"/>
-            <a:endParaRPr lang="en-US" dirty="0">
-              <a:latin typeface="Ayuthaya" charset="-34"/>
-              <a:ea typeface="Ayuthaya" charset="-34"/>
-              <a:cs typeface="Ayuthaya" charset="-34"/>
-            </a:endParaRPr>
-          </a:p>
-          <a:p>
-            <a:pPr marL="457200" lvl="1" indent="0" algn="ctr">
-              <a:buNone/>
-            </a:pPr>
-            <a:r>
-              <a:rPr lang="en-US" sz="2800" dirty="0">
-                <a:latin typeface="Ayuthaya" charset="-34"/>
-                <a:ea typeface="Ayuthaya" charset="-34"/>
-                <a:cs typeface="Ayuthaya" charset="-34"/>
-              </a:rPr>
-              <a:t>S:= (switch, </a:t>
-            </a:r>
-            <a:r>
-              <a:rPr lang="en-US" sz="2800" dirty="0" err="1">
-                <a:latin typeface="Ayuthaya" charset="-34"/>
-                <a:ea typeface="Ayuthaya" charset="-34"/>
-                <a:cs typeface="Ayuthaya" charset="-34"/>
-              </a:rPr>
-              <a:t>qid</a:t>
-            </a:r>
-            <a:r>
-              <a:rPr lang="en-US" sz="2800" dirty="0">
-                <a:latin typeface="Ayuthaya" charset="-34"/>
-                <a:ea typeface="Ayuthaya" charset="-34"/>
-                <a:cs typeface="Ayuthaya" charset="-34"/>
-              </a:rPr>
-              <a:t>, </a:t>
-            </a:r>
-            <a:r>
-              <a:rPr lang="en-US" sz="2800" dirty="0" err="1">
-                <a:latin typeface="Ayuthaya" charset="-34"/>
-                <a:ea typeface="Ayuthaya" charset="-34"/>
-                <a:cs typeface="Ayuthaya" charset="-34"/>
-              </a:rPr>
-              <a:t>hdrs</a:t>
-            </a:r>
-            <a:r>
-              <a:rPr lang="en-US" sz="2800" dirty="0">
-                <a:latin typeface="Ayuthaya" charset="-34"/>
-                <a:ea typeface="Ayuthaya" charset="-34"/>
-                <a:cs typeface="Ayuthaya" charset="-34"/>
-              </a:rPr>
-              <a:t>, </a:t>
-            </a:r>
-            <a:r>
-              <a:rPr lang="en-US" sz="2800" dirty="0" err="1">
-                <a:latin typeface="Ayuthaya" charset="-34"/>
-                <a:ea typeface="Ayuthaya" charset="-34"/>
-                <a:cs typeface="Ayuthaya" charset="-34"/>
-              </a:rPr>
-              <a:t>uid</a:t>
-            </a:r>
-            <a:r>
-              <a:rPr lang="en-US" sz="2800" dirty="0">
-                <a:latin typeface="Ayuthaya" charset="-34"/>
-                <a:ea typeface="Ayuthaya" charset="-34"/>
-                <a:cs typeface="Ayuthaya" charset="-34"/>
-              </a:rPr>
-              <a:t>, tin, tout, </a:t>
-            </a:r>
-            <a:r>
-              <a:rPr lang="en-US" sz="2800" dirty="0" err="1">
-                <a:latin typeface="Ayuthaya" charset="-34"/>
-                <a:ea typeface="Ayuthaya" charset="-34"/>
-                <a:cs typeface="Ayuthaya" charset="-34"/>
-              </a:rPr>
-              <a:t>qsize</a:t>
-            </a:r>
-            <a:r>
-              <a:rPr lang="en-US" sz="2800" dirty="0">
-                <a:latin typeface="Ayuthaya" charset="-34"/>
-                <a:ea typeface="Ayuthaya" charset="-34"/>
-                <a:cs typeface="Ayuthaya" charset="-34"/>
-              </a:rPr>
-              <a:t>) </a:t>
-            </a:r>
-          </a:p>
-          <a:p>
-            <a:endParaRPr lang="en-US" dirty="0"/>
-          </a:p>
-          <a:p>
-            <a:endParaRPr lang="en-US" dirty="0"/>
-          </a:p>
-          <a:p>
-            <a:endParaRPr lang="en-US" dirty="0"/>
-          </a:p>
-          <a:p>
-            <a:pPr marL="0" indent="0" algn="ctr">
-              <a:buNone/>
-            </a:pPr>
-            <a:r>
-              <a:rPr lang="en-US" dirty="0"/>
-              <a:t>Familiar functional operators</a:t>
+              <a:t>Marple: Functional operators</a:t>
             </a:r>
           </a:p>
         </p:txBody>
@@ -7755,7 +7602,7 @@
         </p:nvGrpSpPr>
         <p:grpSpPr>
           <a:xfrm>
-            <a:off x="1821575" y="5430032"/>
+            <a:off x="1821575" y="3303398"/>
             <a:ext cx="8594717" cy="881868"/>
             <a:chOff x="838200" y="5430032"/>
             <a:chExt cx="8594717" cy="881868"/>
@@ -8095,8 +7942,8 @@
         </p:nvSpPr>
         <p:spPr>
           <a:xfrm>
-            <a:off x="5260562" y="3400040"/>
-            <a:ext cx="1716745" cy="1033175"/>
+            <a:off x="5260562" y="2463340"/>
+            <a:ext cx="1716745" cy="725911"/>
           </a:xfrm>
           <a:prstGeom prst="downArrow">
             <a:avLst/>
@@ -8143,7 +7990,12 @@
             <p:ph type="sldNum" sz="quarter" idx="12"/>
           </p:nvPr>
         </p:nvSpPr>
-        <p:spPr/>
+        <p:spPr>
+          <a:xfrm>
+            <a:off x="8610600" y="6356350"/>
+            <a:ext cx="2743200" cy="365125"/>
+          </a:xfrm>
+        </p:spPr>
         <p:txBody>
           <a:bodyPr/>
           <a:lstStyle/>
@@ -8153,6 +8005,128 @@
               <a:t>10</a:t>
             </a:fld>
             <a:endParaRPr lang="en-US"/>
+          </a:p>
+        </p:txBody>
+      </p:sp>
+      <p:sp>
+        <p:nvSpPr>
+          <p:cNvPr id="15" name="Down Arrow 14">
+            <a:extLst>
+              <a:ext uri="{FF2B5EF4-FFF2-40B4-BE49-F238E27FC236}">
+                <a16:creationId xmlns:a16="http://schemas.microsoft.com/office/drawing/2014/main" id="{EE666E19-EE9F-CC41-86E0-74292640F6E4}"/>
+              </a:ext>
+            </a:extLst>
+          </p:cNvPr>
+          <p:cNvSpPr/>
+          <p:nvPr/>
+        </p:nvSpPr>
+        <p:spPr>
+          <a:xfrm>
+            <a:off x="5237627" y="4274282"/>
+            <a:ext cx="1716745" cy="720659"/>
+          </a:xfrm>
+          <a:prstGeom prst="downArrow">
+            <a:avLst/>
+          </a:prstGeom>
+          <a:noFill/>
+          <a:ln w="63500">
+            <a:solidFill>
+              <a:schemeClr val="tx1"/>
+            </a:solidFill>
+          </a:ln>
+        </p:spPr>
+        <p:style>
+          <a:lnRef idx="2">
+            <a:schemeClr val="accent1">
+              <a:shade val="50000"/>
+            </a:schemeClr>
+          </a:lnRef>
+          <a:fillRef idx="1">
+            <a:schemeClr val="accent1"/>
+          </a:fillRef>
+          <a:effectRef idx="0">
+            <a:schemeClr val="accent1"/>
+          </a:effectRef>
+          <a:fontRef idx="minor">
+            <a:schemeClr val="lt1"/>
+          </a:fontRef>
+        </p:style>
+        <p:txBody>
+          <a:bodyPr rtlCol="0" anchor="ctr"/>
+          <a:lstStyle/>
+          <a:p>
+            <a:pPr algn="ctr"/>
+            <a:endParaRPr lang="en-US"/>
+          </a:p>
+        </p:txBody>
+      </p:sp>
+      <p:sp>
+        <p:nvSpPr>
+          <p:cNvPr id="8" name="TextBox 7">
+            <a:extLst>
+              <a:ext uri="{FF2B5EF4-FFF2-40B4-BE49-F238E27FC236}">
+                <a16:creationId xmlns:a16="http://schemas.microsoft.com/office/drawing/2014/main" id="{D824FD55-6178-5F4E-902E-B6978CFAF166}"/>
+              </a:ext>
+            </a:extLst>
+          </p:cNvPr>
+          <p:cNvSpPr txBox="1"/>
+          <p:nvPr/>
+        </p:nvSpPr>
+        <p:spPr>
+          <a:xfrm>
+            <a:off x="5176515" y="1677259"/>
+            <a:ext cx="1838965" cy="707886"/>
+          </a:xfrm>
+          <a:prstGeom prst="rect">
+            <a:avLst/>
+          </a:prstGeom>
+          <a:noFill/>
+        </p:spPr>
+        <p:txBody>
+          <a:bodyPr wrap="none" rtlCol="0">
+            <a:spAutoFit/>
+          </a:bodyPr>
+          <a:lstStyle/>
+          <a:p>
+            <a:r>
+              <a:rPr lang="en-US" sz="4000" dirty="0"/>
+              <a:t>Stream</a:t>
+            </a:r>
+          </a:p>
+        </p:txBody>
+      </p:sp>
+      <p:sp>
+        <p:nvSpPr>
+          <p:cNvPr id="24" name="TextBox 23">
+            <a:extLst>
+              <a:ext uri="{FF2B5EF4-FFF2-40B4-BE49-F238E27FC236}">
+                <a16:creationId xmlns:a16="http://schemas.microsoft.com/office/drawing/2014/main" id="{BA4665E4-0883-6646-B6B7-D3EF0F7649F2}"/>
+              </a:ext>
+            </a:extLst>
+          </p:cNvPr>
+          <p:cNvSpPr txBox="1"/>
+          <p:nvPr/>
+        </p:nvSpPr>
+        <p:spPr>
+          <a:xfrm>
+            <a:off x="5176516" y="5131779"/>
+            <a:ext cx="1838965" cy="707886"/>
+          </a:xfrm>
+          <a:prstGeom prst="rect">
+            <a:avLst/>
+          </a:prstGeom>
+          <a:noFill/>
+        </p:spPr>
+        <p:txBody>
+          <a:bodyPr wrap="none" rtlCol="0">
+            <a:spAutoFit/>
+          </a:bodyPr>
+          <a:lstStyle/>
+          <a:p>
+            <a:r>
+              <a:rPr lang="en-US" sz="4000" dirty="0"/>
+              <a:t>Stream</a:t>
+            </a:r>
           </a:p>
         </p:txBody>
       </p:sp>
@@ -8198,7 +8172,7 @@
                             </p:stCondLst>
                             <p:childTnLst>
                               <p:par>
-                                <p:cTn id="5" presetID="1" presetClass="entr" presetSubtype="0" fill="hold" nodeType="clickEffect">
+                                <p:cTn id="5" presetID="1" presetClass="entr" presetSubtype="0" fill="hold" grpId="0" nodeType="clickEffect">
                                   <p:stCondLst>
                                     <p:cond delay="0"/>
                                   </p:stCondLst>
@@ -8206,6 +8180,114 @@
                                     <p:set>
                                       <p:cBhvr>
                                         <p:cTn id="6" dur="1" fill="hold">
+                                          <p:stCondLst>
+                                            <p:cond delay="0"/>
+                                          </p:stCondLst>
+                                        </p:cTn>
+                                        <p:tgtEl>
+                                          <p:spTgt spid="28"/>
+                                        </p:tgtEl>
+                                        <p:attrNameLst>
+                                          <p:attrName>style.visibility</p:attrName>
+                                        </p:attrNameLst>
+                                      </p:cBhvr>
+                                      <p:to>
+                                        <p:strVal val="visible"/>
+                                      </p:to>
+                                    </p:set>
+                                  </p:childTnLst>
+                                </p:cTn>
+                              </p:par>
+                              <p:par>
+                                <p:cTn id="7" presetID="1" presetClass="entr" presetSubtype="0" fill="hold" grpId="0" nodeType="withEffect">
+                                  <p:stCondLst>
+                                    <p:cond delay="0"/>
+                                  </p:stCondLst>
+                                  <p:childTnLst>
+                                    <p:set>
+                                      <p:cBhvr>
+                                        <p:cTn id="8" dur="1" fill="hold">
+                                          <p:stCondLst>
+                                            <p:cond delay="0"/>
+                                          </p:stCondLst>
+                                        </p:cTn>
+                                        <p:tgtEl>
+                                          <p:spTgt spid="15"/>
+                                        </p:tgtEl>
+                                        <p:attrNameLst>
+                                          <p:attrName>style.visibility</p:attrName>
+                                        </p:attrNameLst>
+                                      </p:cBhvr>
+                                      <p:to>
+                                        <p:strVal val="visible"/>
+                                      </p:to>
+                                    </p:set>
+                                  </p:childTnLst>
+                                </p:cTn>
+                              </p:par>
+                              <p:par>
+                                <p:cTn id="9" presetID="1" presetClass="entr" presetSubtype="0" fill="hold" grpId="0" nodeType="withEffect">
+                                  <p:stCondLst>
+                                    <p:cond delay="0"/>
+                                  </p:stCondLst>
+                                  <p:childTnLst>
+                                    <p:set>
+                                      <p:cBhvr>
+                                        <p:cTn id="10" dur="1" fill="hold">
+                                          <p:stCondLst>
+                                            <p:cond delay="0"/>
+                                          </p:stCondLst>
+                                        </p:cTn>
+                                        <p:tgtEl>
+                                          <p:spTgt spid="24"/>
+                                        </p:tgtEl>
+                                        <p:attrNameLst>
+                                          <p:attrName>style.visibility</p:attrName>
+                                        </p:attrNameLst>
+                                      </p:cBhvr>
+                                      <p:to>
+                                        <p:strVal val="visible"/>
+                                      </p:to>
+                                    </p:set>
+                                  </p:childTnLst>
+                                </p:cTn>
+                              </p:par>
+                              <p:par>
+                                <p:cTn id="11" presetID="1" presetClass="entr" presetSubtype="0" fill="hold" grpId="0" nodeType="withEffect">
+                                  <p:stCondLst>
+                                    <p:cond delay="0"/>
+                                  </p:stCondLst>
+                                  <p:childTnLst>
+                                    <p:set>
+                                      <p:cBhvr>
+                                        <p:cTn id="12" dur="1" fill="hold">
+                                          <p:stCondLst>
+                                            <p:cond delay="0"/>
+                                          </p:stCondLst>
+                                        </p:cTn>
+                                        <p:tgtEl>
+                                          <p:spTgt spid="8"/>
+                                        </p:tgtEl>
+                                        <p:attrNameLst>
+                                          <p:attrName>style.visibility</p:attrName>
+                                        </p:attrNameLst>
+                                      </p:cBhvr>
+                                      <p:to>
+                                        <p:strVal val="visible"/>
+                                      </p:to>
+                                    </p:set>
+                                  </p:childTnLst>
+                                </p:cTn>
+                              </p:par>
+                              <p:par>
+                                <p:cTn id="13" presetID="1" presetClass="entr" presetSubtype="0" fill="hold" nodeType="withEffect">
+                                  <p:stCondLst>
+                                    <p:cond delay="0"/>
+                                  </p:stCondLst>
+                                  <p:childTnLst>
+                                    <p:set>
+                                      <p:cBhvr>
+                                        <p:cTn id="14" dur="1" fill="hold">
                                           <p:stCondLst>
                                             <p:cond delay="0"/>
                                           </p:stCondLst>
@@ -8251,6 +8333,12 @@
         </p:cTn>
       </p:par>
     </p:tnLst>
+    <p:bldLst>
+      <p:bldP spid="28" grpId="0" animBg="1"/>
+      <p:bldP spid="15" grpId="0" animBg="1"/>
+      <p:bldP spid="8" grpId="0"/>
+      <p:bldP spid="24" grpId="0"/>
+    </p:bldLst>
   </p:timing>
 </p:sld>
 </file>
@@ -12214,7 +12302,7 @@
           <a:effectLst/>
           <a:extLst>
             <a:ext uri="{909E8E84-426E-40dd-AFC4-6F175D3DCCD1}">
-              <a14:hiddenFill xmlns="" xmlns:a14="http://schemas.microsoft.com/office/drawing/2010/main">
+              <a14:hiddenFill xmlns:a14="http://schemas.microsoft.com/office/drawing/2010/main" xmlns="">
                 <a:blipFill dpi="0" rotWithShape="0">
                   <a:blip/>
                   <a:srcRect/>
@@ -12225,7 +12313,7 @@
               </a14:hiddenFill>
             </a:ext>
             <a:ext uri="{91240B29-F687-4f45-9708-019B960494DF}">
-              <a14:hiddenLine xmlns="" xmlns:a14="http://schemas.microsoft.com/office/drawing/2010/main" w="9525">
+              <a14:hiddenLine xmlns:a14="http://schemas.microsoft.com/office/drawing/2010/main" xmlns="" w="9525">
                 <a:solidFill>
                   <a:srgbClr val="000000"/>
                 </a:solidFill>
@@ -12235,7 +12323,7 @@
               </a14:hiddenLine>
             </a:ext>
             <a:ext uri="{AF507438-7753-43e0-B8FC-AC1667EBCBE1}">
-              <a14:hiddenEffects xmlns="" xmlns:a14="http://schemas.microsoft.com/office/drawing/2010/main">
+              <a14:hiddenEffects xmlns:a14="http://schemas.microsoft.com/office/drawing/2010/main" xmlns="">
                 <a:effectLst>
                   <a:outerShdw blurRad="63500" dist="38099" dir="2700000" algn="ctr" rotWithShape="0">
                     <a:srgbClr val="000000">
@@ -12284,7 +12372,7 @@
           <a:effectLst/>
           <a:extLst>
             <a:ext uri="{909E8E84-426E-40dd-AFC4-6F175D3DCCD1}">
-              <a14:hiddenFill xmlns="" xmlns:a14="http://schemas.microsoft.com/office/drawing/2010/main">
+              <a14:hiddenFill xmlns:a14="http://schemas.microsoft.com/office/drawing/2010/main" xmlns="">
                 <a:blipFill dpi="0" rotWithShape="0">
                   <a:blip/>
                   <a:srcRect/>
@@ -12295,7 +12383,7 @@
               </a14:hiddenFill>
             </a:ext>
             <a:ext uri="{91240B29-F687-4f45-9708-019B960494DF}">
-              <a14:hiddenLine xmlns="" xmlns:a14="http://schemas.microsoft.com/office/drawing/2010/main" w="9525">
+              <a14:hiddenLine xmlns:a14="http://schemas.microsoft.com/office/drawing/2010/main" xmlns="" w="9525">
                 <a:solidFill>
                   <a:srgbClr val="000000"/>
                 </a:solidFill>
@@ -12305,7 +12393,7 @@
               </a14:hiddenLine>
             </a:ext>
             <a:ext uri="{AF507438-7753-43e0-B8FC-AC1667EBCBE1}">
-              <a14:hiddenEffects xmlns="" xmlns:a14="http://schemas.microsoft.com/office/drawing/2010/main">
+              <a14:hiddenEffects xmlns:a14="http://schemas.microsoft.com/office/drawing/2010/main" xmlns="">
                 <a:effectLst>
                   <a:outerShdw blurRad="63500" dist="38099" dir="2700000" algn="ctr" rotWithShape="0">
                     <a:srgbClr val="000000">
@@ -12440,7 +12528,7 @@
             <a:effectLst/>
             <a:extLst>
               <a:ext uri="{909E8E84-426E-40dd-AFC4-6F175D3DCCD1}">
-                <a14:hiddenFill xmlns:a14="http://schemas.microsoft.com/office/drawing/2010/main" xmlns="">
+                <a14:hiddenFill xmlns="" xmlns:a14="http://schemas.microsoft.com/office/drawing/2010/main">
                   <a:blipFill dpi="0" rotWithShape="0">
                     <a:blip/>
                     <a:srcRect/>
@@ -12451,7 +12539,7 @@
                 </a14:hiddenFill>
               </a:ext>
               <a:ext uri="{91240B29-F687-4f45-9708-019B960494DF}">
-                <a14:hiddenLine xmlns:a14="http://schemas.microsoft.com/office/drawing/2010/main" xmlns="" w="9525">
+                <a14:hiddenLine xmlns="" xmlns:a14="http://schemas.microsoft.com/office/drawing/2010/main" w="9525">
                   <a:solidFill>
                     <a:srgbClr val="000000"/>
                   </a:solidFill>
@@ -12461,7 +12549,7 @@
                 </a14:hiddenLine>
               </a:ext>
               <a:ext uri="{AF507438-7753-43e0-B8FC-AC1667EBCBE1}">
-                <a14:hiddenEffects xmlns:a14="http://schemas.microsoft.com/office/drawing/2010/main" xmlns="">
+                <a14:hiddenEffects xmlns="" xmlns:a14="http://schemas.microsoft.com/office/drawing/2010/main">
                   <a:effectLst>
                     <a:outerShdw blurRad="63500" dist="38099" dir="2700000" algn="ctr" rotWithShape="0">
                       <a:srgbClr val="000000">
@@ -12510,7 +12598,7 @@
             <a:effectLst/>
             <a:extLst>
               <a:ext uri="{909E8E84-426E-40dd-AFC4-6F175D3DCCD1}">
-                <a14:hiddenFill xmlns:a14="http://schemas.microsoft.com/office/drawing/2010/main" xmlns="">
+                <a14:hiddenFill xmlns="" xmlns:a14="http://schemas.microsoft.com/office/drawing/2010/main">
                   <a:blipFill dpi="0" rotWithShape="0">
                     <a:blip/>
                     <a:srcRect/>
@@ -12521,7 +12609,7 @@
                 </a14:hiddenFill>
               </a:ext>
               <a:ext uri="{91240B29-F687-4f45-9708-019B960494DF}">
-                <a14:hiddenLine xmlns:a14="http://schemas.microsoft.com/office/drawing/2010/main" xmlns="" w="9525">
+                <a14:hiddenLine xmlns="" xmlns:a14="http://schemas.microsoft.com/office/drawing/2010/main" w="9525">
                   <a:solidFill>
                     <a:srgbClr val="000000"/>
                   </a:solidFill>
@@ -12531,7 +12619,7 @@
                 </a14:hiddenLine>
               </a:ext>
               <a:ext uri="{AF507438-7753-43e0-B8FC-AC1667EBCBE1}">
-                <a14:hiddenEffects xmlns:a14="http://schemas.microsoft.com/office/drawing/2010/main" xmlns="">
+                <a14:hiddenEffects xmlns="" xmlns:a14="http://schemas.microsoft.com/office/drawing/2010/main">
                   <a:effectLst>
                     <a:outerShdw blurRad="63500" dist="38099" dir="2700000" algn="ctr" rotWithShape="0">
                       <a:srgbClr val="000000">
@@ -12580,7 +12668,7 @@
             <a:effectLst/>
             <a:extLst>
               <a:ext uri="{909E8E84-426E-40dd-AFC4-6F175D3DCCD1}">
-                <a14:hiddenFill xmlns:a14="http://schemas.microsoft.com/office/drawing/2010/main" xmlns="">
+                <a14:hiddenFill xmlns="" xmlns:a14="http://schemas.microsoft.com/office/drawing/2010/main">
                   <a:blipFill dpi="0" rotWithShape="0">
                     <a:blip/>
                     <a:srcRect/>
@@ -12591,7 +12679,7 @@
                 </a14:hiddenFill>
               </a:ext>
               <a:ext uri="{91240B29-F687-4f45-9708-019B960494DF}">
-                <a14:hiddenLine xmlns:a14="http://schemas.microsoft.com/office/drawing/2010/main" xmlns="" w="9525">
+                <a14:hiddenLine xmlns="" xmlns:a14="http://schemas.microsoft.com/office/drawing/2010/main" w="9525">
                   <a:solidFill>
                     <a:srgbClr val="000000"/>
                   </a:solidFill>
@@ -12601,7 +12689,7 @@
                 </a14:hiddenLine>
               </a:ext>
               <a:ext uri="{AF507438-7753-43e0-B8FC-AC1667EBCBE1}">
-                <a14:hiddenEffects xmlns:a14="http://schemas.microsoft.com/office/drawing/2010/main" xmlns="">
+                <a14:hiddenEffects xmlns="" xmlns:a14="http://schemas.microsoft.com/office/drawing/2010/main">
                   <a:effectLst>
                     <a:outerShdw blurRad="63500" dist="38099" dir="2700000" algn="ctr" rotWithShape="0">
                       <a:srgbClr val="000000">
@@ -12642,12 +12730,12 @@
             <a:effectLst/>
             <a:extLst>
               <a:ext uri="{909E8E84-426E-40dd-AFC4-6F175D3DCCD1}">
-                <a14:hiddenFill xmlns:a14="http://schemas.microsoft.com/office/drawing/2010/main" xmlns="">
+                <a14:hiddenFill xmlns="" xmlns:a14="http://schemas.microsoft.com/office/drawing/2010/main">
                   <a:noFill/>
                 </a14:hiddenFill>
               </a:ext>
               <a:ext uri="{AF507438-7753-43e0-B8FC-AC1667EBCBE1}">
-                <a14:hiddenEffects xmlns:a14="http://schemas.microsoft.com/office/drawing/2010/main" xmlns="">
+                <a14:hiddenEffects xmlns="" xmlns:a14="http://schemas.microsoft.com/office/drawing/2010/main">
                   <a:effectLst>
                     <a:outerShdw blurRad="63500" dist="38099" dir="2700000" algn="ctr" rotWithShape="0">
                       <a:srgbClr val="000000">
@@ -12700,12 +12788,12 @@
             <a:effectLst/>
             <a:extLst>
               <a:ext uri="{909E8E84-426E-40dd-AFC4-6F175D3DCCD1}">
-                <a14:hiddenFill xmlns:a14="http://schemas.microsoft.com/office/drawing/2010/main" xmlns="">
+                <a14:hiddenFill xmlns="" xmlns:a14="http://schemas.microsoft.com/office/drawing/2010/main">
                   <a:noFill/>
                 </a14:hiddenFill>
               </a:ext>
               <a:ext uri="{AF507438-7753-43e0-B8FC-AC1667EBCBE1}">
-                <a14:hiddenEffects xmlns:a14="http://schemas.microsoft.com/office/drawing/2010/main" xmlns="">
+                <a14:hiddenEffects xmlns="" xmlns:a14="http://schemas.microsoft.com/office/drawing/2010/main">
                   <a:effectLst>
                     <a:outerShdw blurRad="63500" dist="38099" dir="2700000" algn="ctr" rotWithShape="0">
                       <a:srgbClr val="000000">
@@ -12758,12 +12846,12 @@
             <a:effectLst/>
             <a:extLst>
               <a:ext uri="{909E8E84-426E-40dd-AFC4-6F175D3DCCD1}">
-                <a14:hiddenFill xmlns:a14="http://schemas.microsoft.com/office/drawing/2010/main" xmlns="">
+                <a14:hiddenFill xmlns="" xmlns:a14="http://schemas.microsoft.com/office/drawing/2010/main">
                   <a:noFill/>
                 </a14:hiddenFill>
               </a:ext>
               <a:ext uri="{AF507438-7753-43e0-B8FC-AC1667EBCBE1}">
-                <a14:hiddenEffects xmlns:a14="http://schemas.microsoft.com/office/drawing/2010/main" xmlns="">
+                <a14:hiddenEffects xmlns="" xmlns:a14="http://schemas.microsoft.com/office/drawing/2010/main">
                   <a:effectLst>
                     <a:outerShdw blurRad="63500" dist="38099" dir="2700000" algn="ctr" rotWithShape="0">
                       <a:srgbClr val="000000">
@@ -12816,12 +12904,12 @@
             <a:effectLst/>
             <a:extLst>
               <a:ext uri="{909E8E84-426E-40dd-AFC4-6F175D3DCCD1}">
-                <a14:hiddenFill xmlns:a14="http://schemas.microsoft.com/office/drawing/2010/main" xmlns="">
+                <a14:hiddenFill xmlns="" xmlns:a14="http://schemas.microsoft.com/office/drawing/2010/main">
                   <a:noFill/>
                 </a14:hiddenFill>
               </a:ext>
               <a:ext uri="{AF507438-7753-43e0-B8FC-AC1667EBCBE1}">
-                <a14:hiddenEffects xmlns:a14="http://schemas.microsoft.com/office/drawing/2010/main" xmlns="">
+                <a14:hiddenEffects xmlns="" xmlns:a14="http://schemas.microsoft.com/office/drawing/2010/main">
                   <a:effectLst>
                     <a:outerShdw blurRad="63500" dist="38099" dir="2700000" algn="ctr" rotWithShape="0">
                       <a:srgbClr val="000000">
@@ -12874,12 +12962,12 @@
             <a:effectLst/>
             <a:extLst>
               <a:ext uri="{909E8E84-426E-40dd-AFC4-6F175D3DCCD1}">
-                <a14:hiddenFill xmlns:a14="http://schemas.microsoft.com/office/drawing/2010/main" xmlns="">
+                <a14:hiddenFill xmlns="" xmlns:a14="http://schemas.microsoft.com/office/drawing/2010/main">
                   <a:noFill/>
                 </a14:hiddenFill>
               </a:ext>
               <a:ext uri="{AF507438-7753-43e0-B8FC-AC1667EBCBE1}">
-                <a14:hiddenEffects xmlns:a14="http://schemas.microsoft.com/office/drawing/2010/main" xmlns="">
+                <a14:hiddenEffects xmlns="" xmlns:a14="http://schemas.microsoft.com/office/drawing/2010/main">
                   <a:effectLst>
                     <a:outerShdw blurRad="63500" dist="38099" dir="2700000" algn="ctr" rotWithShape="0">
                       <a:srgbClr val="000000">
@@ -12932,12 +13020,12 @@
             <a:effectLst/>
             <a:extLst>
               <a:ext uri="{909E8E84-426E-40dd-AFC4-6F175D3DCCD1}">
-                <a14:hiddenFill xmlns:a14="http://schemas.microsoft.com/office/drawing/2010/main" xmlns="">
+                <a14:hiddenFill xmlns="" xmlns:a14="http://schemas.microsoft.com/office/drawing/2010/main">
                   <a:noFill/>
                 </a14:hiddenFill>
               </a:ext>
               <a:ext uri="{AF507438-7753-43e0-B8FC-AC1667EBCBE1}">
-                <a14:hiddenEffects xmlns:a14="http://schemas.microsoft.com/office/drawing/2010/main" xmlns="">
+                <a14:hiddenEffects xmlns="" xmlns:a14="http://schemas.microsoft.com/office/drawing/2010/main">
                   <a:effectLst>
                     <a:outerShdw blurRad="63500" dist="38099" dir="2700000" algn="ctr" rotWithShape="0">
                       <a:srgbClr val="000000">
@@ -12990,12 +13078,12 @@
             <a:effectLst/>
             <a:extLst>
               <a:ext uri="{909E8E84-426E-40dd-AFC4-6F175D3DCCD1}">
-                <a14:hiddenFill xmlns:a14="http://schemas.microsoft.com/office/drawing/2010/main" xmlns="">
+                <a14:hiddenFill xmlns="" xmlns:a14="http://schemas.microsoft.com/office/drawing/2010/main">
                   <a:noFill/>
                 </a14:hiddenFill>
               </a:ext>
               <a:ext uri="{AF507438-7753-43e0-B8FC-AC1667EBCBE1}">
-                <a14:hiddenEffects xmlns:a14="http://schemas.microsoft.com/office/drawing/2010/main" xmlns="">
+                <a14:hiddenEffects xmlns="" xmlns:a14="http://schemas.microsoft.com/office/drawing/2010/main">
                   <a:effectLst>
                     <a:outerShdw blurRad="63500" dist="38099" dir="2700000" algn="ctr" rotWithShape="0">
                       <a:srgbClr val="000000">
@@ -13048,12 +13136,12 @@
             <a:effectLst/>
             <a:extLst>
               <a:ext uri="{909E8E84-426E-40dd-AFC4-6F175D3DCCD1}">
-                <a14:hiddenFill xmlns:a14="http://schemas.microsoft.com/office/drawing/2010/main" xmlns="">
+                <a14:hiddenFill xmlns="" xmlns:a14="http://schemas.microsoft.com/office/drawing/2010/main">
                   <a:noFill/>
                 </a14:hiddenFill>
               </a:ext>
               <a:ext uri="{AF507438-7753-43e0-B8FC-AC1667EBCBE1}">
-                <a14:hiddenEffects xmlns:a14="http://schemas.microsoft.com/office/drawing/2010/main" xmlns="">
+                <a14:hiddenEffects xmlns="" xmlns:a14="http://schemas.microsoft.com/office/drawing/2010/main">
                   <a:effectLst>
                     <a:outerShdw blurRad="63500" dist="38099" dir="2700000" algn="ctr" rotWithShape="0">
                       <a:srgbClr val="000000">
@@ -13106,12 +13194,12 @@
             <a:effectLst/>
             <a:extLst>
               <a:ext uri="{909E8E84-426E-40dd-AFC4-6F175D3DCCD1}">
-                <a14:hiddenFill xmlns:a14="http://schemas.microsoft.com/office/drawing/2010/main" xmlns="">
+                <a14:hiddenFill xmlns="" xmlns:a14="http://schemas.microsoft.com/office/drawing/2010/main">
                   <a:noFill/>
                 </a14:hiddenFill>
               </a:ext>
               <a:ext uri="{AF507438-7753-43e0-B8FC-AC1667EBCBE1}">
-                <a14:hiddenEffects xmlns:a14="http://schemas.microsoft.com/office/drawing/2010/main" xmlns="">
+                <a14:hiddenEffects xmlns="" xmlns:a14="http://schemas.microsoft.com/office/drawing/2010/main">
                   <a:effectLst>
                     <a:outerShdw blurRad="63500" dist="38099" dir="2700000" algn="ctr" rotWithShape="0">
                       <a:srgbClr val="000000">
@@ -13164,12 +13252,12 @@
             <a:effectLst/>
             <a:extLst>
               <a:ext uri="{909E8E84-426E-40dd-AFC4-6F175D3DCCD1}">
-                <a14:hiddenFill xmlns:a14="http://schemas.microsoft.com/office/drawing/2010/main" xmlns="">
+                <a14:hiddenFill xmlns="" xmlns:a14="http://schemas.microsoft.com/office/drawing/2010/main">
                   <a:noFill/>
                 </a14:hiddenFill>
               </a:ext>
               <a:ext uri="{AF507438-7753-43e0-B8FC-AC1667EBCBE1}">
-                <a14:hiddenEffects xmlns:a14="http://schemas.microsoft.com/office/drawing/2010/main" xmlns="">
+                <a14:hiddenEffects xmlns="" xmlns:a14="http://schemas.microsoft.com/office/drawing/2010/main">
                   <a:effectLst>
                     <a:outerShdw blurRad="63500" dist="38099" dir="2700000" algn="ctr" rotWithShape="0">
                       <a:srgbClr val="000000">
@@ -13230,7 +13318,7 @@
             <a:effectLst/>
             <a:extLst>
               <a:ext uri="{909E8E84-426E-40dd-AFC4-6F175D3DCCD1}">
-                <a14:hiddenFill xmlns:a14="http://schemas.microsoft.com/office/drawing/2010/main" xmlns="">
+                <a14:hiddenFill xmlns="" xmlns:a14="http://schemas.microsoft.com/office/drawing/2010/main">
                   <a:blipFill dpi="0" rotWithShape="0">
                     <a:blip/>
                     <a:srcRect/>
@@ -13241,7 +13329,7 @@
                 </a14:hiddenFill>
               </a:ext>
               <a:ext uri="{91240B29-F687-4f45-9708-019B960494DF}">
-                <a14:hiddenLine xmlns:a14="http://schemas.microsoft.com/office/drawing/2010/main" xmlns="" w="9525">
+                <a14:hiddenLine xmlns="" xmlns:a14="http://schemas.microsoft.com/office/drawing/2010/main" w="9525">
                   <a:solidFill>
                     <a:srgbClr val="000000"/>
                   </a:solidFill>
@@ -13251,7 +13339,7 @@
                 </a14:hiddenLine>
               </a:ext>
               <a:ext uri="{AF507438-7753-43e0-B8FC-AC1667EBCBE1}">
-                <a14:hiddenEffects xmlns:a14="http://schemas.microsoft.com/office/drawing/2010/main" xmlns="">
+                <a14:hiddenEffects xmlns="" xmlns:a14="http://schemas.microsoft.com/office/drawing/2010/main">
                   <a:effectLst>
                     <a:outerShdw blurRad="63500" dist="38099" dir="2700000" algn="ctr" rotWithShape="0">
                       <a:srgbClr val="000000">
@@ -13300,7 +13388,7 @@
             <a:effectLst/>
             <a:extLst>
               <a:ext uri="{909E8E84-426E-40dd-AFC4-6F175D3DCCD1}">
-                <a14:hiddenFill xmlns:a14="http://schemas.microsoft.com/office/drawing/2010/main" xmlns="">
+                <a14:hiddenFill xmlns="" xmlns:a14="http://schemas.microsoft.com/office/drawing/2010/main">
                   <a:blipFill dpi="0" rotWithShape="0">
                     <a:blip/>
                     <a:srcRect/>
@@ -13311,7 +13399,7 @@
                 </a14:hiddenFill>
               </a:ext>
               <a:ext uri="{91240B29-F687-4f45-9708-019B960494DF}">
-                <a14:hiddenLine xmlns:a14="http://schemas.microsoft.com/office/drawing/2010/main" xmlns="" w="9525">
+                <a14:hiddenLine xmlns="" xmlns:a14="http://schemas.microsoft.com/office/drawing/2010/main" w="9525">
                   <a:solidFill>
                     <a:srgbClr val="000000"/>
                   </a:solidFill>
@@ -13321,7 +13409,7 @@
                 </a14:hiddenLine>
               </a:ext>
               <a:ext uri="{AF507438-7753-43e0-B8FC-AC1667EBCBE1}">
-                <a14:hiddenEffects xmlns:a14="http://schemas.microsoft.com/office/drawing/2010/main" xmlns="">
+                <a14:hiddenEffects xmlns="" xmlns:a14="http://schemas.microsoft.com/office/drawing/2010/main">
                   <a:effectLst>
                     <a:outerShdw blurRad="63500" dist="38099" dir="2700000" algn="ctr" rotWithShape="0">
                       <a:srgbClr val="000000">
@@ -13370,7 +13458,7 @@
             <a:effectLst/>
             <a:extLst>
               <a:ext uri="{909E8E84-426E-40dd-AFC4-6F175D3DCCD1}">
-                <a14:hiddenFill xmlns:a14="http://schemas.microsoft.com/office/drawing/2010/main" xmlns="">
+                <a14:hiddenFill xmlns="" xmlns:a14="http://schemas.microsoft.com/office/drawing/2010/main">
                   <a:blipFill dpi="0" rotWithShape="0">
                     <a:blip/>
                     <a:srcRect/>
@@ -13381,7 +13469,7 @@
                 </a14:hiddenFill>
               </a:ext>
               <a:ext uri="{91240B29-F687-4f45-9708-019B960494DF}">
-                <a14:hiddenLine xmlns:a14="http://schemas.microsoft.com/office/drawing/2010/main" xmlns="" w="9525">
+                <a14:hiddenLine xmlns="" xmlns:a14="http://schemas.microsoft.com/office/drawing/2010/main" w="9525">
                   <a:solidFill>
                     <a:srgbClr val="000000"/>
                   </a:solidFill>
@@ -13391,7 +13479,7 @@
                 </a14:hiddenLine>
               </a:ext>
               <a:ext uri="{AF507438-7753-43e0-B8FC-AC1667EBCBE1}">
-                <a14:hiddenEffects xmlns:a14="http://schemas.microsoft.com/office/drawing/2010/main" xmlns="">
+                <a14:hiddenEffects xmlns="" xmlns:a14="http://schemas.microsoft.com/office/drawing/2010/main">
                   <a:effectLst>
                     <a:outerShdw blurRad="63500" dist="38099" dir="2700000" algn="ctr" rotWithShape="0">
                       <a:srgbClr val="000000">
@@ -13440,7 +13528,7 @@
             <a:effectLst/>
             <a:extLst>
               <a:ext uri="{909E8E84-426E-40dd-AFC4-6F175D3DCCD1}">
-                <a14:hiddenFill xmlns:a14="http://schemas.microsoft.com/office/drawing/2010/main" xmlns="">
+                <a14:hiddenFill xmlns="" xmlns:a14="http://schemas.microsoft.com/office/drawing/2010/main">
                   <a:blipFill dpi="0" rotWithShape="0">
                     <a:blip/>
                     <a:srcRect/>
@@ -13451,7 +13539,7 @@
                 </a14:hiddenFill>
               </a:ext>
               <a:ext uri="{91240B29-F687-4f45-9708-019B960494DF}">
-                <a14:hiddenLine xmlns:a14="http://schemas.microsoft.com/office/drawing/2010/main" xmlns="" w="9525">
+                <a14:hiddenLine xmlns="" xmlns:a14="http://schemas.microsoft.com/office/drawing/2010/main" w="9525">
                   <a:solidFill>
                     <a:srgbClr val="000000"/>
                   </a:solidFill>
@@ -13461,7 +13549,7 @@
                 </a14:hiddenLine>
               </a:ext>
               <a:ext uri="{AF507438-7753-43e0-B8FC-AC1667EBCBE1}">
-                <a14:hiddenEffects xmlns:a14="http://schemas.microsoft.com/office/drawing/2010/main" xmlns="">
+                <a14:hiddenEffects xmlns="" xmlns:a14="http://schemas.microsoft.com/office/drawing/2010/main">
                   <a:effectLst>
                     <a:outerShdw blurRad="63500" dist="38099" dir="2700000" algn="ctr" rotWithShape="0">
                       <a:srgbClr val="000000">
@@ -13510,7 +13598,7 @@
             <a:effectLst/>
             <a:extLst>
               <a:ext uri="{909E8E84-426E-40dd-AFC4-6F175D3DCCD1}">
-                <a14:hiddenFill xmlns:a14="http://schemas.microsoft.com/office/drawing/2010/main" xmlns="">
+                <a14:hiddenFill xmlns="" xmlns:a14="http://schemas.microsoft.com/office/drawing/2010/main">
                   <a:blipFill dpi="0" rotWithShape="0">
                     <a:blip/>
                     <a:srcRect/>
@@ -13521,7 +13609,7 @@
                 </a14:hiddenFill>
               </a:ext>
               <a:ext uri="{91240B29-F687-4f45-9708-019B960494DF}">
-                <a14:hiddenLine xmlns:a14="http://schemas.microsoft.com/office/drawing/2010/main" xmlns="" w="9525">
+                <a14:hiddenLine xmlns="" xmlns:a14="http://schemas.microsoft.com/office/drawing/2010/main" w="9525">
                   <a:solidFill>
                     <a:srgbClr val="000000"/>
                   </a:solidFill>
@@ -13531,7 +13619,7 @@
                 </a14:hiddenLine>
               </a:ext>
               <a:ext uri="{AF507438-7753-43e0-B8FC-AC1667EBCBE1}">
-                <a14:hiddenEffects xmlns:a14="http://schemas.microsoft.com/office/drawing/2010/main" xmlns="">
+                <a14:hiddenEffects xmlns="" xmlns:a14="http://schemas.microsoft.com/office/drawing/2010/main">
                   <a:effectLst>
                     <a:outerShdw blurRad="63500" dist="38099" dir="2700000" algn="ctr" rotWithShape="0">
                       <a:srgbClr val="000000">
@@ -13572,12 +13660,12 @@
             <a:effectLst/>
             <a:extLst>
               <a:ext uri="{909E8E84-426E-40dd-AFC4-6F175D3DCCD1}">
-                <a14:hiddenFill xmlns:a14="http://schemas.microsoft.com/office/drawing/2010/main" xmlns="">
+                <a14:hiddenFill xmlns="" xmlns:a14="http://schemas.microsoft.com/office/drawing/2010/main">
                   <a:noFill/>
                 </a14:hiddenFill>
               </a:ext>
               <a:ext uri="{AF507438-7753-43e0-B8FC-AC1667EBCBE1}">
-                <a14:hiddenEffects xmlns:a14="http://schemas.microsoft.com/office/drawing/2010/main" xmlns="">
+                <a14:hiddenEffects xmlns="" xmlns:a14="http://schemas.microsoft.com/office/drawing/2010/main">
                   <a:effectLst>
                     <a:outerShdw blurRad="63500" dist="38099" dir="2700000" algn="ctr" rotWithShape="0">
                       <a:srgbClr val="000000">
@@ -13630,12 +13718,12 @@
             <a:effectLst/>
             <a:extLst>
               <a:ext uri="{909E8E84-426E-40dd-AFC4-6F175D3DCCD1}">
-                <a14:hiddenFill xmlns:a14="http://schemas.microsoft.com/office/drawing/2010/main" xmlns="">
+                <a14:hiddenFill xmlns="" xmlns:a14="http://schemas.microsoft.com/office/drawing/2010/main">
                   <a:noFill/>
                 </a14:hiddenFill>
               </a:ext>
               <a:ext uri="{AF507438-7753-43e0-B8FC-AC1667EBCBE1}">
-                <a14:hiddenEffects xmlns:a14="http://schemas.microsoft.com/office/drawing/2010/main" xmlns="">
+                <a14:hiddenEffects xmlns="" xmlns:a14="http://schemas.microsoft.com/office/drawing/2010/main">
                   <a:effectLst>
                     <a:outerShdw blurRad="63500" dist="38099" dir="2700000" algn="ctr" rotWithShape="0">
                       <a:srgbClr val="000000">
@@ -13696,7 +13784,7 @@
             <a:effectLst/>
             <a:extLst>
               <a:ext uri="{909E8E84-426E-40dd-AFC4-6F175D3DCCD1}">
-                <a14:hiddenFill xmlns:a14="http://schemas.microsoft.com/office/drawing/2010/main" xmlns="">
+                <a14:hiddenFill xmlns="" xmlns:a14="http://schemas.microsoft.com/office/drawing/2010/main">
                   <a:blipFill dpi="0" rotWithShape="0">
                     <a:blip/>
                     <a:srcRect/>
@@ -13707,7 +13795,7 @@
                 </a14:hiddenFill>
               </a:ext>
               <a:ext uri="{91240B29-F687-4f45-9708-019B960494DF}">
-                <a14:hiddenLine xmlns:a14="http://schemas.microsoft.com/office/drawing/2010/main" xmlns="" w="9525">
+                <a14:hiddenLine xmlns="" xmlns:a14="http://schemas.microsoft.com/office/drawing/2010/main" w="9525">
                   <a:solidFill>
                     <a:srgbClr val="000000"/>
                   </a:solidFill>
@@ -13717,7 +13805,7 @@
                 </a14:hiddenLine>
               </a:ext>
               <a:ext uri="{AF507438-7753-43e0-B8FC-AC1667EBCBE1}">
-                <a14:hiddenEffects xmlns:a14="http://schemas.microsoft.com/office/drawing/2010/main" xmlns="">
+                <a14:hiddenEffects xmlns="" xmlns:a14="http://schemas.microsoft.com/office/drawing/2010/main">
                   <a:effectLst>
                     <a:outerShdw blurRad="63500" dist="38099" dir="2700000" algn="ctr" rotWithShape="0">
                       <a:srgbClr val="000000">
@@ -13850,7 +13938,7 @@
           <a:effectLst/>
           <a:extLst>
             <a:ext uri="{909E8E84-426E-40dd-AFC4-6F175D3DCCD1}">
-              <a14:hiddenFill xmlns="" xmlns:a14="http://schemas.microsoft.com/office/drawing/2010/main">
+              <a14:hiddenFill xmlns:a14="http://schemas.microsoft.com/office/drawing/2010/main" xmlns="">
                 <a:blipFill dpi="0" rotWithShape="0">
                   <a:blip/>
                   <a:srcRect/>
@@ -13861,7 +13949,7 @@
               </a14:hiddenFill>
             </a:ext>
             <a:ext uri="{91240B29-F687-4f45-9708-019B960494DF}">
-              <a14:hiddenLine xmlns="" xmlns:a14="http://schemas.microsoft.com/office/drawing/2010/main" w="9525">
+              <a14:hiddenLine xmlns:a14="http://schemas.microsoft.com/office/drawing/2010/main" xmlns="" w="9525">
                 <a:solidFill>
                   <a:srgbClr val="000000"/>
                 </a:solidFill>
@@ -13871,7 +13959,7 @@
               </a14:hiddenLine>
             </a:ext>
             <a:ext uri="{AF507438-7753-43e0-B8FC-AC1667EBCBE1}">
-              <a14:hiddenEffects xmlns="" xmlns:a14="http://schemas.microsoft.com/office/drawing/2010/main">
+              <a14:hiddenEffects xmlns:a14="http://schemas.microsoft.com/office/drawing/2010/main" xmlns="">
                 <a:effectLst>
                   <a:outerShdw blurRad="63500" dist="38099" dir="2700000" algn="ctr" rotWithShape="0">
                     <a:srgbClr val="000000">
@@ -13956,7 +14044,7 @@
           <a:effectLst/>
           <a:extLst>
             <a:ext uri="{909E8E84-426E-40dd-AFC4-6F175D3DCCD1}">
-              <a14:hiddenFill xmlns="" xmlns:a14="http://schemas.microsoft.com/office/drawing/2010/main">
+              <a14:hiddenFill xmlns:a14="http://schemas.microsoft.com/office/drawing/2010/main" xmlns="">
                 <a:blipFill dpi="0" rotWithShape="0">
                   <a:blip/>
                   <a:srcRect/>
@@ -13967,7 +14055,7 @@
               </a14:hiddenFill>
             </a:ext>
             <a:ext uri="{91240B29-F687-4f45-9708-019B960494DF}">
-              <a14:hiddenLine xmlns="" xmlns:a14="http://schemas.microsoft.com/office/drawing/2010/main" w="9525">
+              <a14:hiddenLine xmlns:a14="http://schemas.microsoft.com/office/drawing/2010/main" xmlns="" w="9525">
                 <a:solidFill>
                   <a:srgbClr val="000000"/>
                 </a:solidFill>
@@ -13977,7 +14065,7 @@
               </a14:hiddenLine>
             </a:ext>
             <a:ext uri="{AF507438-7753-43e0-B8FC-AC1667EBCBE1}">
-              <a14:hiddenEffects xmlns="" xmlns:a14="http://schemas.microsoft.com/office/drawing/2010/main">
+              <a14:hiddenEffects xmlns:a14="http://schemas.microsoft.com/office/drawing/2010/main" xmlns="">
                 <a:effectLst>
                   <a:outerShdw blurRad="63500" dist="38099" dir="2700000" algn="ctr" rotWithShape="0">
                     <a:srgbClr val="000000">
@@ -14062,7 +14150,7 @@
           <a:effectLst/>
           <a:extLst>
             <a:ext uri="{909E8E84-426E-40dd-AFC4-6F175D3DCCD1}">
-              <a14:hiddenFill xmlns="" xmlns:a14="http://schemas.microsoft.com/office/drawing/2010/main">
+              <a14:hiddenFill xmlns:a14="http://schemas.microsoft.com/office/drawing/2010/main" xmlns="">
                 <a:blipFill dpi="0" rotWithShape="0">
                   <a:blip/>
                   <a:srcRect/>
@@ -14073,7 +14161,7 @@
               </a14:hiddenFill>
             </a:ext>
             <a:ext uri="{91240B29-F687-4f45-9708-019B960494DF}">
-              <a14:hiddenLine xmlns="" xmlns:a14="http://schemas.microsoft.com/office/drawing/2010/main" w="9525">
+              <a14:hiddenLine xmlns:a14="http://schemas.microsoft.com/office/drawing/2010/main" xmlns="" w="9525">
                 <a:solidFill>
                   <a:srgbClr val="000000"/>
                 </a:solidFill>
@@ -14083,7 +14171,7 @@
               </a14:hiddenLine>
             </a:ext>
             <a:ext uri="{AF507438-7753-43e0-B8FC-AC1667EBCBE1}">
-              <a14:hiddenEffects xmlns="" xmlns:a14="http://schemas.microsoft.com/office/drawing/2010/main">
+              <a14:hiddenEffects xmlns:a14="http://schemas.microsoft.com/office/drawing/2010/main" xmlns="">
                 <a:effectLst>
                   <a:outerShdw blurRad="63500" dist="38099" dir="2700000" algn="ctr" rotWithShape="0">
                     <a:srgbClr val="000000">
@@ -14262,7 +14350,7 @@
           <a:effectLst/>
           <a:extLst>
             <a:ext uri="{909E8E84-426E-40dd-AFC4-6F175D3DCCD1}">
-              <a14:hiddenFill xmlns="" xmlns:a14="http://schemas.microsoft.com/office/drawing/2010/main">
+              <a14:hiddenFill xmlns:a14="http://schemas.microsoft.com/office/drawing/2010/main" xmlns="">
                 <a:blipFill dpi="0" rotWithShape="0">
                   <a:blip/>
                   <a:srcRect/>
@@ -14273,7 +14361,7 @@
               </a14:hiddenFill>
             </a:ext>
             <a:ext uri="{91240B29-F687-4f45-9708-019B960494DF}">
-              <a14:hiddenLine xmlns="" xmlns:a14="http://schemas.microsoft.com/office/drawing/2010/main" w="9525">
+              <a14:hiddenLine xmlns:a14="http://schemas.microsoft.com/office/drawing/2010/main" xmlns="" w="9525">
                 <a:solidFill>
                   <a:srgbClr val="000000"/>
                 </a:solidFill>
@@ -14283,7 +14371,7 @@
               </a14:hiddenLine>
             </a:ext>
             <a:ext uri="{AF507438-7753-43e0-B8FC-AC1667EBCBE1}">
-              <a14:hiddenEffects xmlns="" xmlns:a14="http://schemas.microsoft.com/office/drawing/2010/main">
+              <a14:hiddenEffects xmlns:a14="http://schemas.microsoft.com/office/drawing/2010/main" xmlns="">
                 <a:effectLst>
                   <a:outerShdw blurRad="63500" dist="38099" dir="2700000" algn="ctr" rotWithShape="0">
                     <a:srgbClr val="000000">
@@ -14361,7 +14449,7 @@
           <a:effectLst/>
           <a:extLst>
             <a:ext uri="{909E8E84-426E-40dd-AFC4-6F175D3DCCD1}">
-              <a14:hiddenFill xmlns="" xmlns:a14="http://schemas.microsoft.com/office/drawing/2010/main">
+              <a14:hiddenFill xmlns:a14="http://schemas.microsoft.com/office/drawing/2010/main" xmlns="">
                 <a:blipFill dpi="0" rotWithShape="0">
                   <a:blip/>
                   <a:srcRect/>
@@ -14372,7 +14460,7 @@
               </a14:hiddenFill>
             </a:ext>
             <a:ext uri="{91240B29-F687-4f45-9708-019B960494DF}">
-              <a14:hiddenLine xmlns="" xmlns:a14="http://schemas.microsoft.com/office/drawing/2010/main" w="9525">
+              <a14:hiddenLine xmlns:a14="http://schemas.microsoft.com/office/drawing/2010/main" xmlns="" w="9525">
                 <a:solidFill>
                   <a:srgbClr val="000000"/>
                 </a:solidFill>
@@ -14382,7 +14470,7 @@
               </a14:hiddenLine>
             </a:ext>
             <a:ext uri="{AF507438-7753-43e0-B8FC-AC1667EBCBE1}">
-              <a14:hiddenEffects xmlns="" xmlns:a14="http://schemas.microsoft.com/office/drawing/2010/main">
+              <a14:hiddenEffects xmlns:a14="http://schemas.microsoft.com/office/drawing/2010/main" xmlns="">
                 <a:effectLst>
                   <a:outerShdw blurRad="63500" dist="38099" dir="2700000" algn="ctr" rotWithShape="0">
                     <a:srgbClr val="000000">
@@ -16544,7 +16632,7 @@
           <a:effectLst/>
           <a:extLst>
             <a:ext uri="{909E8E84-426E-40dd-AFC4-6F175D3DCCD1}">
-              <a14:hiddenFill xmlns:a14="http://schemas.microsoft.com/office/drawing/2010/main" xmlns="">
+              <a14:hiddenFill xmlns="" xmlns:a14="http://schemas.microsoft.com/office/drawing/2010/main">
                 <a:blipFill dpi="0" rotWithShape="0">
                   <a:blip/>
                   <a:srcRect/>
@@ -16555,7 +16643,7 @@
               </a14:hiddenFill>
             </a:ext>
             <a:ext uri="{91240B29-F687-4f45-9708-019B960494DF}">
-              <a14:hiddenLine xmlns:a14="http://schemas.microsoft.com/office/drawing/2010/main" xmlns="" w="9525">
+              <a14:hiddenLine xmlns="" xmlns:a14="http://schemas.microsoft.com/office/drawing/2010/main" w="9525">
                 <a:solidFill>
                   <a:srgbClr val="000000"/>
                 </a:solidFill>
@@ -16565,7 +16653,7 @@
               </a14:hiddenLine>
             </a:ext>
             <a:ext uri="{AF507438-7753-43e0-B8FC-AC1667EBCBE1}">
-              <a14:hiddenEffects xmlns:a14="http://schemas.microsoft.com/office/drawing/2010/main" xmlns="">
+              <a14:hiddenEffects xmlns="" xmlns:a14="http://schemas.microsoft.com/office/drawing/2010/main">
                 <a:effectLst>
                   <a:outerShdw blurRad="63500" dist="38099" dir="2700000" algn="ctr" rotWithShape="0">
                     <a:srgbClr val="000000">
@@ -16685,7 +16773,13 @@
       </p:pic>
       <p:pic>
         <p:nvPicPr>
-          <p:cNvPr id="45" name="Picture 25"/>
+          <p:cNvPr id="47" name="Picture 25">
+            <a:extLst>
+              <a:ext uri="{FF2B5EF4-FFF2-40B4-BE49-F238E27FC236}">
+                <a16:creationId xmlns:a16="http://schemas.microsoft.com/office/drawing/2014/main" id="{A0C26053-C3EB-1C4F-8977-8922D859DAD6}"/>
+              </a:ext>
+            </a:extLst>
+          </p:cNvPr>
           <p:cNvPicPr>
             <a:picLocks noChangeAspect="1" noChangeArrowheads="1"/>
           </p:cNvPicPr>
@@ -16706,7 +16800,7 @@
         </p:blipFill>
         <p:spPr bwMode="auto">
           <a:xfrm>
-            <a:off x="6886200" y="947018"/>
+            <a:off x="10883376" y="1073824"/>
             <a:ext cx="1014181" cy="1343947"/>
           </a:xfrm>
           <a:prstGeom prst="rect">
@@ -16719,7 +16813,7 @@
           <a:effectLst/>
           <a:extLst>
             <a:ext uri="{909E8E84-426E-40dd-AFC4-6F175D3DCCD1}">
-              <a14:hiddenFill xmlns:a14="http://schemas.microsoft.com/office/drawing/2010/main" xmlns="">
+              <a14:hiddenFill xmlns="" xmlns:a14="http://schemas.microsoft.com/office/drawing/2010/main">
                 <a:blipFill dpi="0" rotWithShape="0">
                   <a:blip/>
                   <a:srcRect/>
@@ -16730,7 +16824,7 @@
               </a14:hiddenFill>
             </a:ext>
             <a:ext uri="{91240B29-F687-4f45-9708-019B960494DF}">
-              <a14:hiddenLine xmlns:a14="http://schemas.microsoft.com/office/drawing/2010/main" xmlns="" w="9525">
+              <a14:hiddenLine xmlns="" xmlns:a14="http://schemas.microsoft.com/office/drawing/2010/main" w="9525">
                 <a:solidFill>
                   <a:srgbClr val="000000"/>
                 </a:solidFill>
@@ -16740,7 +16834,7 @@
               </a14:hiddenLine>
             </a:ext>
             <a:ext uri="{AF507438-7753-43e0-B8FC-AC1667EBCBE1}">
-              <a14:hiddenEffects xmlns:a14="http://schemas.microsoft.com/office/drawing/2010/main" xmlns="">
+              <a14:hiddenEffects xmlns="" xmlns:a14="http://schemas.microsoft.com/office/drawing/2010/main">
                 <a:effectLst>
                   <a:outerShdw blurRad="63500" dist="38099" dir="2700000" algn="ctr" rotWithShape="0">
                     <a:srgbClr val="000000">
@@ -18499,7 +18593,13 @@
       </p:pic>
       <p:pic>
         <p:nvPicPr>
-          <p:cNvPr id="46" name="Picture 25"/>
+          <p:cNvPr id="50" name="Picture 25">
+            <a:extLst>
+              <a:ext uri="{FF2B5EF4-FFF2-40B4-BE49-F238E27FC236}">
+                <a16:creationId xmlns:a16="http://schemas.microsoft.com/office/drawing/2014/main" id="{C599B286-96C5-9846-8822-C0D7903FC766}"/>
+              </a:ext>
+            </a:extLst>
+          </p:cNvPr>
           <p:cNvPicPr>
             <a:picLocks noChangeAspect="1" noChangeArrowheads="1"/>
           </p:cNvPicPr>
@@ -18520,7 +18620,7 @@
         </p:blipFill>
         <p:spPr bwMode="auto">
           <a:xfrm>
-            <a:off x="6886200" y="947018"/>
+            <a:off x="10883376" y="1073824"/>
             <a:ext cx="1014181" cy="1343947"/>
           </a:xfrm>
           <a:prstGeom prst="rect">
@@ -18533,7 +18633,7 @@
           <a:effectLst/>
           <a:extLst>
             <a:ext uri="{909E8E84-426E-40dd-AFC4-6F175D3DCCD1}">
-              <a14:hiddenFill xmlns:a14="http://schemas.microsoft.com/office/drawing/2010/main" xmlns="">
+              <a14:hiddenFill xmlns="" xmlns:a14="http://schemas.microsoft.com/office/drawing/2010/main">
                 <a:blipFill dpi="0" rotWithShape="0">
                   <a:blip/>
                   <a:srcRect/>
@@ -18544,7 +18644,7 @@
               </a14:hiddenFill>
             </a:ext>
             <a:ext uri="{91240B29-F687-4f45-9708-019B960494DF}">
-              <a14:hiddenLine xmlns:a14="http://schemas.microsoft.com/office/drawing/2010/main" xmlns="" w="9525">
+              <a14:hiddenLine xmlns="" xmlns:a14="http://schemas.microsoft.com/office/drawing/2010/main" w="9525">
                 <a:solidFill>
                   <a:srgbClr val="000000"/>
                 </a:solidFill>
@@ -18554,7 +18654,7 @@
               </a14:hiddenLine>
             </a:ext>
             <a:ext uri="{AF507438-7753-43e0-B8FC-AC1667EBCBE1}">
-              <a14:hiddenEffects xmlns:a14="http://schemas.microsoft.com/office/drawing/2010/main" xmlns="">
+              <a14:hiddenEffects xmlns="" xmlns:a14="http://schemas.microsoft.com/office/drawing/2010/main">
                 <a:effectLst>
                   <a:outerShdw blurRad="63500" dist="38099" dir="2700000" algn="ctr" rotWithShape="0">
                     <a:srgbClr val="000000">
@@ -18605,6 +18705,82 @@
           <a:chExt cx="0" cy="0"/>
         </a:xfrm>
       </p:grpSpPr>
+      <p:pic>
+        <p:nvPicPr>
+          <p:cNvPr id="49" name="Picture 25">
+            <a:extLst>
+              <a:ext uri="{FF2B5EF4-FFF2-40B4-BE49-F238E27FC236}">
+                <a16:creationId xmlns:a16="http://schemas.microsoft.com/office/drawing/2014/main" id="{127063D3-0184-B242-A613-EF0C8E06ECB0}"/>
+              </a:ext>
+            </a:extLst>
+          </p:cNvPr>
+          <p:cNvPicPr>
+            <a:picLocks noChangeAspect="1" noChangeArrowheads="1"/>
+          </p:cNvPicPr>
+          <p:nvPr/>
+        </p:nvPicPr>
+        <p:blipFill>
+          <a:blip r:embed="rId4">
+            <a:extLst>
+              <a:ext uri="{28A0092B-C50C-407E-A947-70E740481C1C}">
+                <a14:useLocalDpi xmlns:a14="http://schemas.microsoft.com/office/drawing/2010/main" val="0"/>
+              </a:ext>
+            </a:extLst>
+          </a:blip>
+          <a:srcRect/>
+          <a:stretch>
+            <a:fillRect/>
+          </a:stretch>
+        </p:blipFill>
+        <p:spPr bwMode="auto">
+          <a:xfrm>
+            <a:off x="10883376" y="1073824"/>
+            <a:ext cx="1014181" cy="1343947"/>
+          </a:xfrm>
+          <a:prstGeom prst="rect">
+            <a:avLst/>
+          </a:prstGeom>
+          <a:noFill/>
+          <a:ln>
+            <a:noFill/>
+          </a:ln>
+          <a:effectLst/>
+          <a:extLst>
+            <a:ext uri="{909E8E84-426E-40dd-AFC4-6F175D3DCCD1}">
+              <a14:hiddenFill xmlns="" xmlns:a14="http://schemas.microsoft.com/office/drawing/2010/main">
+                <a:blipFill dpi="0" rotWithShape="0">
+                  <a:blip/>
+                  <a:srcRect/>
+                  <a:stretch>
+                    <a:fillRect/>
+                  </a:stretch>
+                </a:blipFill>
+              </a14:hiddenFill>
+            </a:ext>
+            <a:ext uri="{91240B29-F687-4f45-9708-019B960494DF}">
+              <a14:hiddenLine xmlns="" xmlns:a14="http://schemas.microsoft.com/office/drawing/2010/main" w="9525">
+                <a:solidFill>
+                  <a:srgbClr val="000000"/>
+                </a:solidFill>
+                <a:round/>
+                <a:headEnd/>
+                <a:tailEnd/>
+              </a14:hiddenLine>
+            </a:ext>
+            <a:ext uri="{AF507438-7753-43e0-B8FC-AC1667EBCBE1}">
+              <a14:hiddenEffects xmlns="" xmlns:a14="http://schemas.microsoft.com/office/drawing/2010/main">
+                <a:effectLst>
+                  <a:outerShdw blurRad="63500" dist="38099" dir="2700000" algn="ctr" rotWithShape="0">
+                    <a:srgbClr val="000000">
+                      <a:alpha val="74998"/>
+                    </a:srgbClr>
+                  </a:outerShdw>
+                </a:effectLst>
+              </a14:hiddenEffects>
+            </a:ext>
+          </a:extLst>
+        </p:spPr>
+      </p:pic>
       <p:sp>
         <p:nvSpPr>
           <p:cNvPr id="2" name="Title 1"/>
@@ -21464,7 +21640,7 @@
           <a:effectLst/>
           <a:extLst>
             <a:ext uri="{909E8E84-426E-40dd-AFC4-6F175D3DCCD1}">
-              <a14:hiddenFill xmlns:a14="http://schemas.microsoft.com/office/drawing/2010/main" xmlns="">
+              <a14:hiddenFill xmlns="" xmlns:a14="http://schemas.microsoft.com/office/drawing/2010/main">
                 <a:blipFill dpi="0" rotWithShape="0">
                   <a:blip/>
                   <a:srcRect/>
@@ -21475,7 +21651,7 @@
               </a14:hiddenFill>
             </a:ext>
             <a:ext uri="{91240B29-F687-4f45-9708-019B960494DF}">
-              <a14:hiddenLine xmlns:a14="http://schemas.microsoft.com/office/drawing/2010/main" xmlns="" w="9525">
+              <a14:hiddenLine xmlns="" xmlns:a14="http://schemas.microsoft.com/office/drawing/2010/main" w="9525">
                 <a:solidFill>
                   <a:srgbClr val="000000"/>
                 </a:solidFill>
@@ -21485,7 +21661,7 @@
               </a14:hiddenLine>
             </a:ext>
             <a:ext uri="{AF507438-7753-43e0-B8FC-AC1667EBCBE1}">
-              <a14:hiddenEffects xmlns:a14="http://schemas.microsoft.com/office/drawing/2010/main" xmlns="">
+              <a14:hiddenEffects xmlns="" xmlns:a14="http://schemas.microsoft.com/office/drawing/2010/main">
                 <a:effectLst>
                   <a:outerShdw blurRad="63500" dist="38099" dir="2700000" algn="ctr" rotWithShape="0">
                     <a:srgbClr val="000000">
@@ -21564,7 +21740,7 @@
           <a:effectLst/>
           <a:extLst>
             <a:ext uri="{909E8E84-426E-40dd-AFC4-6F175D3DCCD1}">
-              <a14:hiddenFill xmlns:a14="http://schemas.microsoft.com/office/drawing/2010/main" xmlns="">
+              <a14:hiddenFill xmlns="" xmlns:a14="http://schemas.microsoft.com/office/drawing/2010/main">
                 <a:blipFill dpi="0" rotWithShape="0">
                   <a:blip/>
                   <a:srcRect/>
@@ -21575,7 +21751,7 @@
               </a14:hiddenFill>
             </a:ext>
             <a:ext uri="{91240B29-F687-4f45-9708-019B960494DF}">
-              <a14:hiddenLine xmlns:a14="http://schemas.microsoft.com/office/drawing/2010/main" xmlns="" w="9525">
+              <a14:hiddenLine xmlns="" xmlns:a14="http://schemas.microsoft.com/office/drawing/2010/main" w="9525">
                 <a:solidFill>
                   <a:srgbClr val="000000"/>
                 </a:solidFill>
@@ -21585,7 +21761,7 @@
               </a14:hiddenLine>
             </a:ext>
             <a:ext uri="{AF507438-7753-43e0-B8FC-AC1667EBCBE1}">
-              <a14:hiddenEffects xmlns:a14="http://schemas.microsoft.com/office/drawing/2010/main" xmlns="">
+              <a14:hiddenEffects xmlns="" xmlns:a14="http://schemas.microsoft.com/office/drawing/2010/main">
                 <a:effectLst>
                   <a:outerShdw blurRad="63500" dist="38099" dir="2700000" algn="ctr" rotWithShape="0">
                     <a:srgbClr val="000000">
@@ -23180,7 +23356,7 @@
           <a:effectLst/>
           <a:extLst>
             <a:ext uri="{909E8E84-426E-40dd-AFC4-6F175D3DCCD1}">
-              <a14:hiddenFill xmlns:a14="http://schemas.microsoft.com/office/drawing/2010/main" xmlns="">
+              <a14:hiddenFill xmlns="" xmlns:a14="http://schemas.microsoft.com/office/drawing/2010/main">
                 <a:blipFill dpi="0" rotWithShape="0">
                   <a:blip/>
                   <a:srcRect/>
@@ -23191,7 +23367,7 @@
               </a14:hiddenFill>
             </a:ext>
             <a:ext uri="{91240B29-F687-4f45-9708-019B960494DF}">
-              <a14:hiddenLine xmlns:a14="http://schemas.microsoft.com/office/drawing/2010/main" xmlns="" w="9525">
+              <a14:hiddenLine xmlns="" xmlns:a14="http://schemas.microsoft.com/office/drawing/2010/main" w="9525">
                 <a:solidFill>
                   <a:srgbClr val="000000"/>
                 </a:solidFill>
@@ -23201,7 +23377,7 @@
               </a14:hiddenLine>
             </a:ext>
             <a:ext uri="{AF507438-7753-43e0-B8FC-AC1667EBCBE1}">
-              <a14:hiddenEffects xmlns:a14="http://schemas.microsoft.com/office/drawing/2010/main" xmlns="">
+              <a14:hiddenEffects xmlns="" xmlns:a14="http://schemas.microsoft.com/office/drawing/2010/main">
                 <a:effectLst>
                   <a:outerShdw blurRad="63500" dist="38099" dir="2700000" algn="ctr" rotWithShape="0">
                     <a:srgbClr val="000000">
@@ -24849,7 +25025,7 @@
           <a:effectLst/>
           <a:extLst>
             <a:ext uri="{909E8E84-426E-40dd-AFC4-6F175D3DCCD1}">
-              <a14:hiddenFill xmlns:a14="http://schemas.microsoft.com/office/drawing/2010/main" xmlns="">
+              <a14:hiddenFill xmlns="" xmlns:a14="http://schemas.microsoft.com/office/drawing/2010/main">
                 <a:blipFill dpi="0" rotWithShape="0">
                   <a:blip/>
                   <a:srcRect/>
@@ -24860,7 +25036,7 @@
               </a14:hiddenFill>
             </a:ext>
             <a:ext uri="{91240B29-F687-4f45-9708-019B960494DF}">
-              <a14:hiddenLine xmlns:a14="http://schemas.microsoft.com/office/drawing/2010/main" xmlns="" w="9525">
+              <a14:hiddenLine xmlns="" xmlns:a14="http://schemas.microsoft.com/office/drawing/2010/main" w="9525">
                 <a:solidFill>
                   <a:srgbClr val="000000"/>
                 </a:solidFill>
@@ -24870,7 +25046,7 @@
               </a14:hiddenLine>
             </a:ext>
             <a:ext uri="{AF507438-7753-43e0-B8FC-AC1667EBCBE1}">
-              <a14:hiddenEffects xmlns:a14="http://schemas.microsoft.com/office/drawing/2010/main" xmlns="">
+              <a14:hiddenEffects xmlns="" xmlns:a14="http://schemas.microsoft.com/office/drawing/2010/main">
                 <a:effectLst>
                   <a:outerShdw blurRad="63500" dist="38099" dir="2700000" algn="ctr" rotWithShape="0">
                     <a:srgbClr val="000000">
@@ -26232,7 +26408,7 @@
           <a:effectLst/>
           <a:extLst>
             <a:ext uri="{909E8E84-426E-40dd-AFC4-6F175D3DCCD1}">
-              <a14:hiddenFill xmlns:a14="http://schemas.microsoft.com/office/drawing/2010/main" xmlns="">
+              <a14:hiddenFill xmlns="" xmlns:a14="http://schemas.microsoft.com/office/drawing/2010/main">
                 <a:blipFill dpi="0" rotWithShape="0">
                   <a:blip/>
                   <a:srcRect/>
@@ -26243,7 +26419,7 @@
               </a14:hiddenFill>
             </a:ext>
             <a:ext uri="{91240B29-F687-4f45-9708-019B960494DF}">
-              <a14:hiddenLine xmlns:a14="http://schemas.microsoft.com/office/drawing/2010/main" xmlns="" w="9525">
+              <a14:hiddenLine xmlns="" xmlns:a14="http://schemas.microsoft.com/office/drawing/2010/main" w="9525">
                 <a:solidFill>
                   <a:srgbClr val="000000"/>
                 </a:solidFill>
@@ -26253,7 +26429,7 @@
               </a14:hiddenLine>
             </a:ext>
             <a:ext uri="{AF507438-7753-43e0-B8FC-AC1667EBCBE1}">
-              <a14:hiddenEffects xmlns:a14="http://schemas.microsoft.com/office/drawing/2010/main" xmlns="">
+              <a14:hiddenEffects xmlns="" xmlns:a14="http://schemas.microsoft.com/office/drawing/2010/main">
                 <a:effectLst>
                   <a:outerShdw blurRad="63500" dist="38099" dir="2700000" algn="ctr" rotWithShape="0">
                     <a:srgbClr val="000000">
@@ -26384,7 +26560,7 @@
           <a:effectLst/>
           <a:extLst>
             <a:ext uri="{909E8E84-426E-40dd-AFC4-6F175D3DCCD1}">
-              <a14:hiddenFill xmlns:a14="http://schemas.microsoft.com/office/drawing/2010/main" xmlns="">
+              <a14:hiddenFill xmlns="" xmlns:a14="http://schemas.microsoft.com/office/drawing/2010/main">
                 <a:blipFill dpi="0" rotWithShape="0">
                   <a:blip/>
                   <a:srcRect/>
@@ -26395,7 +26571,7 @@
               </a14:hiddenFill>
             </a:ext>
             <a:ext uri="{91240B29-F687-4f45-9708-019B960494DF}">
-              <a14:hiddenLine xmlns:a14="http://schemas.microsoft.com/office/drawing/2010/main" xmlns="" w="9525">
+              <a14:hiddenLine xmlns="" xmlns:a14="http://schemas.microsoft.com/office/drawing/2010/main" w="9525">
                 <a:solidFill>
                   <a:srgbClr val="000000"/>
                 </a:solidFill>
@@ -26405,7 +26581,7 @@
               </a14:hiddenLine>
             </a:ext>
             <a:ext uri="{AF507438-7753-43e0-B8FC-AC1667EBCBE1}">
-              <a14:hiddenEffects xmlns:a14="http://schemas.microsoft.com/office/drawing/2010/main" xmlns="">
+              <a14:hiddenEffects xmlns="" xmlns:a14="http://schemas.microsoft.com/office/drawing/2010/main">
                 <a:effectLst>
                   <a:outerShdw blurRad="63500" dist="38099" dir="2700000" algn="ctr" rotWithShape="0">
                     <a:srgbClr val="000000">
@@ -32633,6 +32809,159 @@
         </p:nvSpPr>
         <p:spPr/>
         <p:txBody>
+          <a:bodyPr/>
+          <a:lstStyle/>
+          <a:p>
+            <a:r>
+              <a:rPr lang="en-US" dirty="0"/>
+              <a:t>Summary</a:t>
+            </a:r>
+          </a:p>
+        </p:txBody>
+      </p:sp>
+      <p:sp>
+        <p:nvSpPr>
+          <p:cNvPr id="3" name="Content Placeholder 2"/>
+          <p:cNvSpPr>
+            <a:spLocks noGrp="1"/>
+          </p:cNvSpPr>
+          <p:nvPr>
+            <p:ph idx="1"/>
+          </p:nvPr>
+        </p:nvSpPr>
+        <p:spPr>
+          <a:xfrm>
+            <a:off x="838200" y="1825625"/>
+            <a:ext cx="11201400" cy="4710642"/>
+          </a:xfrm>
+        </p:spPr>
+        <p:txBody>
+          <a:bodyPr>
+            <a:normAutofit/>
+          </a:bodyPr>
+          <a:lstStyle/>
+          <a:p>
+            <a:r>
+              <a:rPr lang="en-US" dirty="0"/>
+              <a:t>Query language for network performance monitoring</a:t>
+            </a:r>
+          </a:p>
+          <a:p>
+            <a:r>
+              <a:rPr lang="en-US" dirty="0"/>
+              <a:t>Hardware design to support query language</a:t>
+            </a:r>
+          </a:p>
+          <a:p>
+            <a:r>
+              <a:rPr lang="en-US" dirty="0">
+                <a:solidFill>
+                  <a:srgbClr val="A31E34"/>
+                </a:solidFill>
+              </a:rPr>
+              <a:t>Paper and code available at http://</a:t>
+            </a:r>
+            <a:r>
+              <a:rPr lang="en-US" dirty="0" err="1">
+                <a:solidFill>
+                  <a:srgbClr val="A31E34"/>
+                </a:solidFill>
+              </a:rPr>
+              <a:t>web.mit.edu</a:t>
+            </a:r>
+            <a:r>
+              <a:rPr lang="en-US" dirty="0">
+                <a:solidFill>
+                  <a:srgbClr val="A31E34"/>
+                </a:solidFill>
+              </a:rPr>
+              <a:t>/</a:t>
+            </a:r>
+            <a:r>
+              <a:rPr lang="en-US" dirty="0" err="1">
+                <a:solidFill>
+                  <a:srgbClr val="A31E34"/>
+                </a:solidFill>
+              </a:rPr>
+              <a:t>marple</a:t>
+            </a:r>
+            <a:endParaRPr lang="en-US" dirty="0">
+              <a:solidFill>
+                <a:srgbClr val="A31E34"/>
+              </a:solidFill>
+            </a:endParaRPr>
+          </a:p>
+          <a:p>
+            <a:endParaRPr lang="en-US" dirty="0">
+              <a:solidFill>
+                <a:srgbClr val="C00000"/>
+              </a:solidFill>
+            </a:endParaRPr>
+          </a:p>
+          <a:p>
+            <a:pPr marL="0" indent="0" algn="ctr">
+              <a:buNone/>
+            </a:pPr>
+            <a:endParaRPr lang="en-US" dirty="0"/>
+          </a:p>
+          <a:p>
+            <a:endParaRPr lang="en-US" dirty="0"/>
+          </a:p>
+        </p:txBody>
+      </p:sp>
+    </p:spTree>
+    <p:custDataLst>
+      <p:tags r:id="rId1"/>
+    </p:custDataLst>
+    <p:extLst>
+      <p:ext uri="{BB962C8B-B14F-4D97-AF65-F5344CB8AC3E}">
+        <p14:creationId xmlns:p14="http://schemas.microsoft.com/office/powerpoint/2010/main" val="417757982"/>
+      </p:ext>
+    </p:extLst>
+  </p:cSld>
+  <p:clrMapOvr>
+    <a:masterClrMapping/>
+  </p:clrMapOvr>
+  <mc:AlternateContent xmlns:mc="http://schemas.openxmlformats.org/markup-compatibility/2006" xmlns:p14="http://schemas.microsoft.com/office/powerpoint/2010/main">
+    <mc:Choice Requires="p14">
+      <p:transition spd="slow" p14:dur="2000" advTm="48667"/>
+    </mc:Choice>
+    <mc:Fallback xmlns="">
+      <p:transition spd="slow" advTm="48667"/>
+    </mc:Fallback>
+  </mc:AlternateContent>
+</p:sld>
+</file>
+
+<file path=ppt/slides/slide37.xml><?xml version="1.0" encoding="utf-8"?>
+<p:sld xmlns:a="http://schemas.openxmlformats.org/drawingml/2006/main" xmlns:r="http://schemas.openxmlformats.org/officeDocument/2006/relationships" xmlns:p="http://schemas.openxmlformats.org/presentationml/2006/main">
+  <p:cSld>
+    <p:spTree>
+      <p:nvGrpSpPr>
+        <p:cNvPr id="1" name=""/>
+        <p:cNvGrpSpPr/>
+        <p:nvPr/>
+      </p:nvGrpSpPr>
+      <p:grpSpPr>
+        <a:xfrm>
+          <a:off x="0" y="0"/>
+          <a:ext cx="0" cy="0"/>
+          <a:chOff x="0" y="0"/>
+          <a:chExt cx="0" cy="0"/>
+        </a:xfrm>
+      </p:grpSpPr>
+      <p:sp>
+        <p:nvSpPr>
+          <p:cNvPr id="2" name="Title 1"/>
+          <p:cNvSpPr>
+            <a:spLocks noGrp="1"/>
+          </p:cNvSpPr>
+          <p:nvPr>
+            <p:ph type="title"/>
+          </p:nvPr>
+        </p:nvSpPr>
+        <p:spPr/>
+        <p:txBody>
           <a:bodyPr>
             <a:normAutofit/>
           </a:bodyPr>
@@ -33878,7 +34207,7 @@
           <a:p>
             <a:fld id="{7ADDFCCE-7BFB-9F43-8A65-C6CBBDF8F088}" type="slidenum">
               <a:rPr lang="en-US" smtClean="0"/>
-              <a:t>36</a:t>
+              <a:t>37</a:t>
             </a:fld>
             <a:endParaRPr lang="en-US"/>
           </a:p>
@@ -33950,7 +34279,7 @@
           <a:effectLst/>
           <a:extLst>
             <a:ext uri="{909E8E84-426E-40dd-AFC4-6F175D3DCCD1}">
-              <a14:hiddenFill xmlns="" xmlns:a14="http://schemas.microsoft.com/office/drawing/2010/main">
+              <a14:hiddenFill xmlns:a14="http://schemas.microsoft.com/office/drawing/2010/main" xmlns="">
                 <a:blipFill dpi="0" rotWithShape="0">
                   <a:blip/>
                   <a:srcRect/>
@@ -33961,7 +34290,7 @@
               </a14:hiddenFill>
             </a:ext>
             <a:ext uri="{91240B29-F687-4f45-9708-019B960494DF}">
-              <a14:hiddenLine xmlns="" xmlns:a14="http://schemas.microsoft.com/office/drawing/2010/main" w="9525">
+              <a14:hiddenLine xmlns:a14="http://schemas.microsoft.com/office/drawing/2010/main" xmlns="" w="9525">
                 <a:solidFill>
                   <a:srgbClr val="000000"/>
                 </a:solidFill>
@@ -33971,7 +34300,7 @@
               </a14:hiddenLine>
             </a:ext>
             <a:ext uri="{AF507438-7753-43e0-B8FC-AC1667EBCBE1}">
-              <a14:hiddenEffects xmlns="" xmlns:a14="http://schemas.microsoft.com/office/drawing/2010/main">
+              <a14:hiddenEffects xmlns:a14="http://schemas.microsoft.com/office/drawing/2010/main" xmlns="">
                 <a:effectLst>
                   <a:outerShdw blurRad="63500" dist="38099" dir="2700000" algn="ctr" rotWithShape="0">
                     <a:srgbClr val="000000">
@@ -34116,7 +34445,7 @@
 </p:sld>
 </file>
 
-<file path=ppt/slides/slide37.xml><?xml version="1.0" encoding="utf-8"?>
+<file path=ppt/slides/slide38.xml><?xml version="1.0" encoding="utf-8"?>
 <p:sld xmlns:a="http://schemas.openxmlformats.org/drawingml/2006/main" xmlns:r="http://schemas.openxmlformats.org/officeDocument/2006/relationships" xmlns:p="http://schemas.openxmlformats.org/presentationml/2006/main">
   <p:cSld>
     <p:spTree>
@@ -34282,7 +34611,7 @@
           <a:p>
             <a:fld id="{7ADDFCCE-7BFB-9F43-8A65-C6CBBDF8F088}" type="slidenum">
               <a:rPr lang="en-US" smtClean="0"/>
-              <a:t>37</a:t>
+              <a:t>38</a:t>
             </a:fld>
             <a:endParaRPr lang="en-US"/>
           </a:p>
@@ -34294,7 +34623,7 @@
     </p:custDataLst>
     <p:extLst>
       <p:ext uri="{BB962C8B-B14F-4D97-AF65-F5344CB8AC3E}">
-        <p14:creationId xmlns:p14="http://schemas.microsoft.com/office/powerpoint/2010/main" val="1378631781"/>
+        <p14:creationId xmlns:p14="http://schemas.microsoft.com/office/powerpoint/2010/main" val="3281887673"/>
       </p:ext>
     </p:extLst>
   </p:cSld>
@@ -34613,7 +34942,7 @@
 </p:sld>
 </file>
 
-<file path=ppt/slides/slide38.xml><?xml version="1.0" encoding="utf-8"?>
+<file path=ppt/slides/slide39.xml><?xml version="1.0" encoding="utf-8"?>
 <p:sld xmlns:a="http://schemas.openxmlformats.org/drawingml/2006/main" xmlns:r="http://schemas.openxmlformats.org/officeDocument/2006/relationships" xmlns:p="http://schemas.openxmlformats.org/presentationml/2006/main">
   <p:cSld>
     <p:spTree>
@@ -34699,7 +35028,7 @@
           <a:p>
             <a:fld id="{7ADDFCCE-7BFB-9F43-8A65-C6CBBDF8F088}" type="slidenum">
               <a:rPr lang="en-US" smtClean="0"/>
-              <a:t>38</a:t>
+              <a:t>39</a:t>
             </a:fld>
             <a:endParaRPr lang="en-US"/>
           </a:p>
@@ -34708,7 +35037,7 @@
     </p:spTree>
     <p:extLst>
       <p:ext uri="{BB962C8B-B14F-4D97-AF65-F5344CB8AC3E}">
-        <p14:creationId xmlns:p14="http://schemas.microsoft.com/office/powerpoint/2010/main" val="220871179"/>
+        <p14:creationId xmlns:p14="http://schemas.microsoft.com/office/powerpoint/2010/main" val="3873332105"/>
       </p:ext>
     </p:extLst>
   </p:cSld>
@@ -34726,7 +35055,109 @@
 </p:sld>
 </file>
 
-<file path=ppt/slides/slide39.xml><?xml version="1.0" encoding="utf-8"?>
+<file path=ppt/slides/slide4.xml><?xml version="1.0" encoding="utf-8"?>
+<p:sld xmlns:a="http://schemas.openxmlformats.org/drawingml/2006/main" xmlns:r="http://schemas.openxmlformats.org/officeDocument/2006/relationships" xmlns:p="http://schemas.openxmlformats.org/presentationml/2006/main">
+  <p:cSld>
+    <p:spTree>
+      <p:nvGrpSpPr>
+        <p:cNvPr id="1" name=""/>
+        <p:cNvGrpSpPr/>
+        <p:nvPr/>
+      </p:nvGrpSpPr>
+      <p:grpSpPr>
+        <a:xfrm>
+          <a:off x="0" y="0"/>
+          <a:ext cx="0" cy="0"/>
+          <a:chOff x="0" y="0"/>
+          <a:chExt cx="0" cy="0"/>
+        </a:xfrm>
+      </p:grpSpPr>
+      <p:sp>
+        <p:nvSpPr>
+          <p:cNvPr id="4" name="TextBox 3"/>
+          <p:cNvSpPr txBox="1"/>
+          <p:nvPr/>
+        </p:nvSpPr>
+        <p:spPr>
+          <a:xfrm>
+            <a:off x="405860" y="2169272"/>
+            <a:ext cx="11317826" cy="1938992"/>
+          </a:xfrm>
+          <a:prstGeom prst="rect">
+            <a:avLst/>
+          </a:prstGeom>
+          <a:noFill/>
+        </p:spPr>
+        <p:txBody>
+          <a:bodyPr wrap="square" rtlCol="0">
+            <a:spAutoFit/>
+          </a:bodyPr>
+          <a:lstStyle/>
+          <a:p>
+            <a:pPr algn="ctr"/>
+            <a:r>
+              <a:rPr lang="en-US" sz="4000" dirty="0"/>
+              <a:t>We want to build future-proof switch hardware:</a:t>
+            </a:r>
+          </a:p>
+          <a:p>
+            <a:pPr algn="ctr"/>
+            <a:endParaRPr lang="en-US" sz="4000" dirty="0"/>
+          </a:p>
+          <a:p>
+            <a:pPr algn="ctr"/>
+            <a:r>
+              <a:rPr lang="en-US" sz="4000" dirty="0"/>
+              <a:t>Language-directed hardware design</a:t>
+            </a:r>
+          </a:p>
+        </p:txBody>
+      </p:sp>
+      <p:sp>
+        <p:nvSpPr>
+          <p:cNvPr id="2" name="Slide Number Placeholder 1"/>
+          <p:cNvSpPr>
+            <a:spLocks noGrp="1"/>
+          </p:cNvSpPr>
+          <p:nvPr>
+            <p:ph type="sldNum" sz="quarter" idx="12"/>
+          </p:nvPr>
+        </p:nvSpPr>
+        <p:spPr/>
+        <p:txBody>
+          <a:bodyPr/>
+          <a:lstStyle/>
+          <a:p>
+            <a:fld id="{7ADDFCCE-7BFB-9F43-8A65-C6CBBDF8F088}" type="slidenum">
+              <a:rPr lang="en-US" smtClean="0"/>
+              <a:t>4</a:t>
+            </a:fld>
+            <a:endParaRPr lang="en-US"/>
+          </a:p>
+        </p:txBody>
+      </p:sp>
+    </p:spTree>
+    <p:extLst>
+      <p:ext uri="{BB962C8B-B14F-4D97-AF65-F5344CB8AC3E}">
+        <p14:creationId xmlns:p14="http://schemas.microsoft.com/office/powerpoint/2010/main" val="605997881"/>
+      </p:ext>
+    </p:extLst>
+  </p:cSld>
+  <p:clrMapOvr>
+    <a:masterClrMapping/>
+  </p:clrMapOvr>
+  <mc:AlternateContent xmlns:mc="http://schemas.openxmlformats.org/markup-compatibility/2006" xmlns:p14="http://schemas.microsoft.com/office/powerpoint/2010/main">
+    <mc:Choice Requires="p14">
+      <p:transition spd="slow" p14:dur="2000" advTm="21014"/>
+    </mc:Choice>
+    <mc:Fallback xmlns="">
+      <p:transition spd="slow" advTm="21014"/>
+    </mc:Fallback>
+  </mc:AlternateContent>
+</p:sld>
+</file>
+
+<file path=ppt/slides/slide40.xml><?xml version="1.0" encoding="utf-8"?>
 <p:sld xmlns:a="http://schemas.openxmlformats.org/drawingml/2006/main" xmlns:r="http://schemas.openxmlformats.org/officeDocument/2006/relationships" xmlns:p="http://schemas.openxmlformats.org/presentationml/2006/main">
   <p:cSld>
     <p:spTree>
@@ -34910,7 +35341,7 @@
           <a:p>
             <a:fld id="{7ADDFCCE-7BFB-9F43-8A65-C6CBBDF8F088}" type="slidenum">
               <a:rPr lang="en-US" smtClean="0"/>
-              <a:t>39</a:t>
+              <a:t>40</a:t>
             </a:fld>
             <a:endParaRPr lang="en-US" dirty="0"/>
           </a:p>
@@ -34994,7 +35425,7 @@
     </p:custDataLst>
     <p:extLst>
       <p:ext uri="{BB962C8B-B14F-4D97-AF65-F5344CB8AC3E}">
-        <p14:creationId xmlns:p14="http://schemas.microsoft.com/office/powerpoint/2010/main" val="1740921523"/>
+        <p14:creationId xmlns:p14="http://schemas.microsoft.com/office/powerpoint/2010/main" val="1740020908"/>
       </p:ext>
     </p:extLst>
   </p:cSld>
@@ -35090,109 +35521,7 @@
 </p:sld>
 </file>
 
-<file path=ppt/slides/slide4.xml><?xml version="1.0" encoding="utf-8"?>
-<p:sld xmlns:a="http://schemas.openxmlformats.org/drawingml/2006/main" xmlns:r="http://schemas.openxmlformats.org/officeDocument/2006/relationships" xmlns:p="http://schemas.openxmlformats.org/presentationml/2006/main">
-  <p:cSld>
-    <p:spTree>
-      <p:nvGrpSpPr>
-        <p:cNvPr id="1" name=""/>
-        <p:cNvGrpSpPr/>
-        <p:nvPr/>
-      </p:nvGrpSpPr>
-      <p:grpSpPr>
-        <a:xfrm>
-          <a:off x="0" y="0"/>
-          <a:ext cx="0" cy="0"/>
-          <a:chOff x="0" y="0"/>
-          <a:chExt cx="0" cy="0"/>
-        </a:xfrm>
-      </p:grpSpPr>
-      <p:sp>
-        <p:nvSpPr>
-          <p:cNvPr id="4" name="TextBox 3"/>
-          <p:cNvSpPr txBox="1"/>
-          <p:nvPr/>
-        </p:nvSpPr>
-        <p:spPr>
-          <a:xfrm>
-            <a:off x="405860" y="2169272"/>
-            <a:ext cx="11317826" cy="1938992"/>
-          </a:xfrm>
-          <a:prstGeom prst="rect">
-            <a:avLst/>
-          </a:prstGeom>
-          <a:noFill/>
-        </p:spPr>
-        <p:txBody>
-          <a:bodyPr wrap="square" rtlCol="0">
-            <a:spAutoFit/>
-          </a:bodyPr>
-          <a:lstStyle/>
-          <a:p>
-            <a:pPr algn="ctr"/>
-            <a:r>
-              <a:rPr lang="en-US" sz="4000" dirty="0"/>
-              <a:t>We want to build future-proof switch hardware:</a:t>
-            </a:r>
-          </a:p>
-          <a:p>
-            <a:pPr algn="ctr"/>
-            <a:endParaRPr lang="en-US" sz="4000" dirty="0"/>
-          </a:p>
-          <a:p>
-            <a:pPr algn="ctr"/>
-            <a:r>
-              <a:rPr lang="en-US" sz="4000" dirty="0"/>
-              <a:t>Language-directed hardware design</a:t>
-            </a:r>
-          </a:p>
-        </p:txBody>
-      </p:sp>
-      <p:sp>
-        <p:nvSpPr>
-          <p:cNvPr id="2" name="Slide Number Placeholder 1"/>
-          <p:cNvSpPr>
-            <a:spLocks noGrp="1"/>
-          </p:cNvSpPr>
-          <p:nvPr>
-            <p:ph type="sldNum" sz="quarter" idx="12"/>
-          </p:nvPr>
-        </p:nvSpPr>
-        <p:spPr/>
-        <p:txBody>
-          <a:bodyPr/>
-          <a:lstStyle/>
-          <a:p>
-            <a:fld id="{7ADDFCCE-7BFB-9F43-8A65-C6CBBDF8F088}" type="slidenum">
-              <a:rPr lang="en-US" smtClean="0"/>
-              <a:t>4</a:t>
-            </a:fld>
-            <a:endParaRPr lang="en-US"/>
-          </a:p>
-        </p:txBody>
-      </p:sp>
-    </p:spTree>
-    <p:extLst>
-      <p:ext uri="{BB962C8B-B14F-4D97-AF65-F5344CB8AC3E}">
-        <p14:creationId xmlns:p14="http://schemas.microsoft.com/office/powerpoint/2010/main" val="605997881"/>
-      </p:ext>
-    </p:extLst>
-  </p:cSld>
-  <p:clrMapOvr>
-    <a:masterClrMapping/>
-  </p:clrMapOvr>
-  <mc:AlternateContent xmlns:mc="http://schemas.openxmlformats.org/markup-compatibility/2006" xmlns:p14="http://schemas.microsoft.com/office/powerpoint/2010/main">
-    <mc:Choice Requires="p14">
-      <p:transition spd="slow" p14:dur="2000" advTm="21014"/>
-    </mc:Choice>
-    <mc:Fallback xmlns="">
-      <p:transition spd="slow" advTm="21014"/>
-    </mc:Fallback>
-  </mc:AlternateContent>
-</p:sld>
-</file>
-
-<file path=ppt/slides/slide40.xml><?xml version="1.0" encoding="utf-8"?>
+<file path=ppt/slides/slide41.xml><?xml version="1.0" encoding="utf-8"?>
 <p:sld xmlns:a="http://schemas.openxmlformats.org/drawingml/2006/main" xmlns:r="http://schemas.openxmlformats.org/officeDocument/2006/relationships" xmlns:p="http://schemas.openxmlformats.org/presentationml/2006/main">
   <p:cSld>
     <p:spTree>
@@ -35361,7 +35690,7 @@
           <a:p>
             <a:fld id="{7ADDFCCE-7BFB-9F43-8A65-C6CBBDF8F088}" type="slidenum">
               <a:rPr lang="en-US" smtClean="0"/>
-              <a:t>40</a:t>
+              <a:t>41</a:t>
             </a:fld>
             <a:endParaRPr lang="en-US"/>
           </a:p>
@@ -35442,7 +35771,7 @@
     </p:spTree>
     <p:extLst>
       <p:ext uri="{BB962C8B-B14F-4D97-AF65-F5344CB8AC3E}">
-        <p14:creationId xmlns:p14="http://schemas.microsoft.com/office/powerpoint/2010/main" val="1625914072"/>
+        <p14:creationId xmlns:p14="http://schemas.microsoft.com/office/powerpoint/2010/main" val="472843973"/>
       </p:ext>
     </p:extLst>
   </p:cSld>
@@ -35455,159 +35784,6 @@
     </mc:Choice>
     <mc:Fallback xmlns="">
       <p:transition spd="slow" advTm="32470"/>
-    </mc:Fallback>
-  </mc:AlternateContent>
-</p:sld>
-</file>
-
-<file path=ppt/slides/slide41.xml><?xml version="1.0" encoding="utf-8"?>
-<p:sld xmlns:a="http://schemas.openxmlformats.org/drawingml/2006/main" xmlns:r="http://schemas.openxmlformats.org/officeDocument/2006/relationships" xmlns:p="http://schemas.openxmlformats.org/presentationml/2006/main">
-  <p:cSld>
-    <p:spTree>
-      <p:nvGrpSpPr>
-        <p:cNvPr id="1" name=""/>
-        <p:cNvGrpSpPr/>
-        <p:nvPr/>
-      </p:nvGrpSpPr>
-      <p:grpSpPr>
-        <a:xfrm>
-          <a:off x="0" y="0"/>
-          <a:ext cx="0" cy="0"/>
-          <a:chOff x="0" y="0"/>
-          <a:chExt cx="0" cy="0"/>
-        </a:xfrm>
-      </p:grpSpPr>
-      <p:sp>
-        <p:nvSpPr>
-          <p:cNvPr id="2" name="Title 1"/>
-          <p:cNvSpPr>
-            <a:spLocks noGrp="1"/>
-          </p:cNvSpPr>
-          <p:nvPr>
-            <p:ph type="title"/>
-          </p:nvPr>
-        </p:nvSpPr>
-        <p:spPr/>
-        <p:txBody>
-          <a:bodyPr/>
-          <a:lstStyle/>
-          <a:p>
-            <a:r>
-              <a:rPr lang="en-US" dirty="0"/>
-              <a:t>Summary</a:t>
-            </a:r>
-          </a:p>
-        </p:txBody>
-      </p:sp>
-      <p:sp>
-        <p:nvSpPr>
-          <p:cNvPr id="3" name="Content Placeholder 2"/>
-          <p:cNvSpPr>
-            <a:spLocks noGrp="1"/>
-          </p:cNvSpPr>
-          <p:nvPr>
-            <p:ph idx="1"/>
-          </p:nvPr>
-        </p:nvSpPr>
-        <p:spPr>
-          <a:xfrm>
-            <a:off x="838200" y="1825625"/>
-            <a:ext cx="11201400" cy="4710642"/>
-          </a:xfrm>
-        </p:spPr>
-        <p:txBody>
-          <a:bodyPr>
-            <a:normAutofit/>
-          </a:bodyPr>
-          <a:lstStyle/>
-          <a:p>
-            <a:r>
-              <a:rPr lang="en-US" dirty="0"/>
-              <a:t>Query language for network performance monitoring</a:t>
-            </a:r>
-          </a:p>
-          <a:p>
-            <a:r>
-              <a:rPr lang="en-US" dirty="0"/>
-              <a:t>Hardware design to support query language</a:t>
-            </a:r>
-          </a:p>
-          <a:p>
-            <a:r>
-              <a:rPr lang="en-US" dirty="0">
-                <a:solidFill>
-                  <a:srgbClr val="A31E34"/>
-                </a:solidFill>
-              </a:rPr>
-              <a:t>Paper and code available at http://</a:t>
-            </a:r>
-            <a:r>
-              <a:rPr lang="en-US" dirty="0" err="1">
-                <a:solidFill>
-                  <a:srgbClr val="A31E34"/>
-                </a:solidFill>
-              </a:rPr>
-              <a:t>web.mit.edu</a:t>
-            </a:r>
-            <a:r>
-              <a:rPr lang="en-US" dirty="0">
-                <a:solidFill>
-                  <a:srgbClr val="A31E34"/>
-                </a:solidFill>
-              </a:rPr>
-              <a:t>/</a:t>
-            </a:r>
-            <a:r>
-              <a:rPr lang="en-US" dirty="0" err="1">
-                <a:solidFill>
-                  <a:srgbClr val="A31E34"/>
-                </a:solidFill>
-              </a:rPr>
-              <a:t>marple</a:t>
-            </a:r>
-            <a:endParaRPr lang="en-US" dirty="0">
-              <a:solidFill>
-                <a:srgbClr val="A31E34"/>
-              </a:solidFill>
-            </a:endParaRPr>
-          </a:p>
-          <a:p>
-            <a:endParaRPr lang="en-US" dirty="0">
-              <a:solidFill>
-                <a:srgbClr val="C00000"/>
-              </a:solidFill>
-            </a:endParaRPr>
-          </a:p>
-          <a:p>
-            <a:pPr marL="0" indent="0" algn="ctr">
-              <a:buNone/>
-            </a:pPr>
-            <a:endParaRPr lang="en-US" dirty="0"/>
-          </a:p>
-          <a:p>
-            <a:endParaRPr lang="en-US" dirty="0"/>
-          </a:p>
-        </p:txBody>
-      </p:sp>
-    </p:spTree>
-    <p:custDataLst>
-      <p:tags r:id="rId1"/>
-    </p:custDataLst>
-    <p:extLst>
-      <p:ext uri="{BB962C8B-B14F-4D97-AF65-F5344CB8AC3E}">
-        <p14:creationId xmlns:p14="http://schemas.microsoft.com/office/powerpoint/2010/main" val="417757982"/>
-      </p:ext>
-    </p:extLst>
-  </p:cSld>
-  <p:clrMapOvr>
-    <a:masterClrMapping/>
-  </p:clrMapOvr>
-  <mc:AlternateContent xmlns:mc="http://schemas.openxmlformats.org/markup-compatibility/2006" xmlns:p14="http://schemas.microsoft.com/office/powerpoint/2010/main">
-    <mc:Choice Requires="p14">
-      <p:transition spd="slow" p14:dur="2000" advTm="48667"/>
-    </mc:Choice>
-    <mc:Fallback xmlns="">
-      <p:transition spd="slow" advTm="48667"/>
     </mc:Fallback>
   </mc:AlternateContent>
 </p:sld>
@@ -37833,7 +38009,7 @@
           <a:p>
             <a:r>
               <a:rPr lang="en-US" dirty="0"/>
-              <a:t>Marple: Performance query language</a:t>
+              <a:t>Marple: Streams</a:t>
             </a:r>
           </a:p>
         </p:txBody>
@@ -37848,7 +38024,12 @@
             <p:ph idx="1"/>
           </p:nvPr>
         </p:nvSpPr>
-        <p:spPr/>
+        <p:spPr>
+          <a:xfrm>
+            <a:off x="838200" y="1825625"/>
+            <a:ext cx="10515600" cy="4351338"/>
+          </a:xfrm>
+        </p:spPr>
         <p:txBody>
           <a:bodyPr/>
           <a:lstStyle/>
@@ -37858,23 +38039,7 @@
             </a:pPr>
             <a:r>
               <a:rPr lang="en-US" dirty="0"/>
-              <a:t>Stream: For </a:t>
-            </a:r>
-            <a:r>
-              <a:rPr lang="en-US" i="1" dirty="0"/>
-              <a:t>each </a:t>
-            </a:r>
-            <a:r>
-              <a:rPr lang="en-US" dirty="0"/>
-              <a:t>packet at </a:t>
-            </a:r>
-            <a:r>
-              <a:rPr lang="en-US" i="1" dirty="0"/>
-              <a:t>each </a:t>
-            </a:r>
-            <a:r>
-              <a:rPr lang="en-US" dirty="0"/>
-              <a:t>queue,</a:t>
+              <a:t>Core language construct: streams of tuples</a:t>
             </a:r>
           </a:p>
           <a:p>
@@ -37895,7 +38060,20 @@
                 <a:ea typeface="Ayuthaya" charset="-34"/>
                 <a:cs typeface="Ayuthaya" charset="-34"/>
               </a:rPr>
-              <a:t>S:= (switch, </a:t>
+              <a:t>INPUT PACKET STREAM:= </a:t>
+            </a:r>
+          </a:p>
+          <a:p>
+            <a:pPr marL="457200" lvl="1" indent="0" algn="ctr">
+              <a:buNone/>
+            </a:pPr>
+            <a:r>
+              <a:rPr lang="en-US" sz="2800" dirty="0">
+                <a:latin typeface="Ayuthaya" charset="-34"/>
+                <a:ea typeface="Ayuthaya" charset="-34"/>
+                <a:cs typeface="Ayuthaya" charset="-34"/>
+              </a:rPr>
+              <a:t>    (switch, </a:t>
             </a:r>
             <a:r>
               <a:rPr lang="en-US" sz="2800" dirty="0" err="1">
@@ -37975,7 +38153,7 @@
         </p:nvSpPr>
         <p:spPr>
           <a:xfrm>
-            <a:off x="804333" y="4350802"/>
+            <a:off x="1220620" y="4926814"/>
             <a:ext cx="1982492" cy="523220"/>
           </a:xfrm>
           <a:prstGeom prst="rect">
@@ -38004,7 +38182,7 @@
         </p:nvSpPr>
         <p:spPr>
           <a:xfrm>
-            <a:off x="2971512" y="4350802"/>
+            <a:off x="3510171" y="4924992"/>
             <a:ext cx="2326037" cy="954107"/>
           </a:xfrm>
           <a:prstGeom prst="rect">
@@ -38033,7 +38211,7 @@
         </p:nvSpPr>
         <p:spPr>
           <a:xfrm>
-            <a:off x="5541646" y="4321159"/>
+            <a:off x="5781962" y="4924988"/>
             <a:ext cx="2933056" cy="954107"/>
           </a:xfrm>
           <a:prstGeom prst="rect">
@@ -38062,7 +38240,7 @@
         </p:nvSpPr>
         <p:spPr>
           <a:xfrm>
-            <a:off x="8571564" y="4321158"/>
+            <a:off x="9060105" y="4924987"/>
             <a:ext cx="2933056" cy="954107"/>
           </a:xfrm>
           <a:prstGeom prst="rect">
@@ -38091,7 +38269,7 @@
         </p:nvSpPr>
         <p:spPr>
           <a:xfrm rot="5400000">
-            <a:off x="3456530" y="2107425"/>
+            <a:off x="3545738" y="2821099"/>
             <a:ext cx="462748" cy="2506373"/>
           </a:xfrm>
           <a:prstGeom prst="rightBrace">
@@ -38134,7 +38312,7 @@
         </p:nvSpPr>
         <p:spPr>
           <a:xfrm rot="5400000">
-            <a:off x="5989477" y="2284103"/>
+            <a:off x="6078685" y="2997777"/>
             <a:ext cx="431220" cy="2121496"/>
           </a:xfrm>
           <a:prstGeom prst="rightBrace">
@@ -38177,7 +38355,7 @@
         </p:nvSpPr>
         <p:spPr>
           <a:xfrm rot="5400000">
-            <a:off x="8435627" y="2284099"/>
+            <a:off x="8524835" y="2997773"/>
             <a:ext cx="431220" cy="2121496"/>
           </a:xfrm>
           <a:prstGeom prst="rightBrace">
@@ -38220,7 +38398,7 @@
         </p:nvCxnSpPr>
         <p:spPr>
           <a:xfrm flipH="1">
-            <a:off x="2434718" y="3544959"/>
+            <a:off x="2523926" y="4258633"/>
             <a:ext cx="1253187" cy="666359"/>
           </a:xfrm>
           <a:prstGeom prst="straightConnector1">
@@ -38256,7 +38434,7 @@
         </p:nvCxnSpPr>
         <p:spPr>
           <a:xfrm flipH="1">
-            <a:off x="4583982" y="3560457"/>
+            <a:off x="4673190" y="4274131"/>
             <a:ext cx="1631439" cy="790345"/>
           </a:xfrm>
           <a:prstGeom prst="straightConnector1">
@@ -38292,7 +38470,7 @@
         </p:nvCxnSpPr>
         <p:spPr>
           <a:xfrm flipH="1">
-            <a:off x="7590489" y="3515317"/>
+            <a:off x="7679697" y="4228991"/>
             <a:ext cx="1068176" cy="759275"/>
           </a:xfrm>
           <a:prstGeom prst="straightConnector1">
@@ -38328,7 +38506,7 @@
         </p:nvCxnSpPr>
         <p:spPr>
           <a:xfrm flipH="1">
-            <a:off x="10164018" y="3174460"/>
+            <a:off x="10565458" y="3888134"/>
             <a:ext cx="326" cy="1100131"/>
           </a:xfrm>
           <a:prstGeom prst="straightConnector1">
@@ -38436,7 +38614,7 @@
                                         <p:tgtEl>
                                           <p:spTgt spid="3">
                                             <p:txEl>
-                                              <p:pRg st="2" end="2"/>
+                                              <p:pRg st="0" end="0"/>
                                             </p:txEl>
                                           </p:spTgt>
                                         </p:tgtEl>
@@ -38470,7 +38648,7 @@
                             </p:stCondLst>
                             <p:childTnLst>
                               <p:par>
-                                <p:cTn id="9" presetID="1" presetClass="entr" presetSubtype="0" fill="hold" grpId="0" nodeType="clickEffect">
+                                <p:cTn id="9" presetID="1" presetClass="entr" presetSubtype="0" fill="hold" nodeType="clickEffect">
                                   <p:stCondLst>
                                     <p:cond delay="0"/>
                                   </p:stCondLst>
@@ -38483,7 +38661,11 @@
                                           </p:stCondLst>
                                         </p:cTn>
                                         <p:tgtEl>
-                                          <p:spTgt spid="8"/>
+                                          <p:spTgt spid="3">
+                                            <p:txEl>
+                                              <p:pRg st="2" end="2"/>
+                                            </p:txEl>
+                                          </p:spTgt>
                                         </p:tgtEl>
                                         <p:attrNameLst>
                                           <p:attrName>style.visibility</p:attrName>
@@ -38496,35 +38678,26 @@
                                   </p:childTnLst>
                                 </p:cTn>
                               </p:par>
+                            </p:childTnLst>
+                          </p:cTn>
+                        </p:par>
+                      </p:childTnLst>
+                    </p:cTn>
+                  </p:par>
+                  <p:par>
+                    <p:cTn id="11" fill="hold">
+                      <p:stCondLst>
+                        <p:cond delay="indefinite"/>
+                      </p:stCondLst>
+                      <p:childTnLst>
+                        <p:par>
+                          <p:cTn id="12" fill="hold">
+                            <p:stCondLst>
+                              <p:cond delay="0"/>
+                            </p:stCondLst>
+                            <p:childTnLst>
                               <p:par>
-                                <p:cTn id="11" presetID="1" presetClass="entr" presetSubtype="0" fill="hold" nodeType="withEffect">
-                                  <p:stCondLst>
-                                    <p:cond delay="0"/>
-                                  </p:stCondLst>
-                                  <p:childTnLst>
-                                    <p:set>
-                                      <p:cBhvr>
-                                        <p:cTn id="12" dur="1" fill="hold">
-                                          <p:stCondLst>
-                                            <p:cond delay="0"/>
-                                          </p:stCondLst>
-                                        </p:cTn>
-                                        <p:tgtEl>
-                                          <p:spTgt spid="12"/>
-                                        </p:tgtEl>
-                                        <p:attrNameLst>
-                                          <p:attrName>style.visibility</p:attrName>
-                                        </p:attrNameLst>
-                                      </p:cBhvr>
-                                      <p:to>
-                                        <p:strVal val="visible"/>
-                                      </p:to>
-                                    </p:set>
-                                  </p:childTnLst>
-                                </p:cTn>
-                              </p:par>
-                              <p:par>
-                                <p:cTn id="13" presetID="1" presetClass="entr" presetSubtype="0" fill="hold" grpId="0" nodeType="withEffect">
+                                <p:cTn id="13" presetID="1" presetClass="entr" presetSubtype="0" fill="hold" nodeType="clickEffect">
                                   <p:stCondLst>
                                     <p:cond delay="0"/>
                                   </p:stCondLst>
@@ -38537,7 +38710,11 @@
                                           </p:stCondLst>
                                         </p:cTn>
                                         <p:tgtEl>
-                                          <p:spTgt spid="4"/>
+                                          <p:spTgt spid="3">
+                                            <p:txEl>
+                                              <p:pRg st="3" end="3"/>
+                                            </p:txEl>
+                                          </p:spTgt>
                                         </p:tgtEl>
                                         <p:attrNameLst>
                                           <p:attrName>style.visibility</p:attrName>
@@ -38569,7 +38746,7 @@
                             </p:stCondLst>
                             <p:childTnLst>
                               <p:par>
-                                <p:cTn id="17" presetID="1" presetClass="entr" presetSubtype="0" fill="hold" nodeType="clickEffect">
+                                <p:cTn id="17" presetID="1" presetClass="entr" presetSubtype="0" fill="hold" grpId="0" nodeType="clickEffect">
                                   <p:stCondLst>
                                     <p:cond delay="0"/>
                                   </p:stCondLst>
@@ -38582,7 +38759,7 @@
                                           </p:stCondLst>
                                         </p:cTn>
                                         <p:tgtEl>
-                                          <p:spTgt spid="13"/>
+                                          <p:spTgt spid="8"/>
                                         </p:tgtEl>
                                         <p:attrNameLst>
                                           <p:attrName>style.visibility</p:attrName>
@@ -38596,7 +38773,7 @@
                                 </p:cTn>
                               </p:par>
                               <p:par>
-                                <p:cTn id="19" presetID="1" presetClass="entr" presetSubtype="0" fill="hold" grpId="0" nodeType="withEffect">
+                                <p:cTn id="19" presetID="1" presetClass="entr" presetSubtype="0" fill="hold" nodeType="withEffect">
                                   <p:stCondLst>
                                     <p:cond delay="0"/>
                                   </p:stCondLst>
@@ -38609,7 +38786,7 @@
                                           </p:stCondLst>
                                         </p:cTn>
                                         <p:tgtEl>
-                                          <p:spTgt spid="9"/>
+                                          <p:spTgt spid="12"/>
                                         </p:tgtEl>
                                         <p:attrNameLst>
                                           <p:attrName>style.visibility</p:attrName>
@@ -38636,7 +38813,7 @@
                                           </p:stCondLst>
                                         </p:cTn>
                                         <p:tgtEl>
-                                          <p:spTgt spid="5"/>
+                                          <p:spTgt spid="4"/>
                                         </p:tgtEl>
                                         <p:attrNameLst>
                                           <p:attrName>style.visibility</p:attrName>
@@ -38668,7 +38845,7 @@
                             </p:stCondLst>
                             <p:childTnLst>
                               <p:par>
-                                <p:cTn id="25" presetID="1" presetClass="entr" presetSubtype="0" fill="hold" grpId="0" nodeType="clickEffect">
+                                <p:cTn id="25" presetID="1" presetClass="entr" presetSubtype="0" fill="hold" nodeType="clickEffect">
                                   <p:stCondLst>
                                     <p:cond delay="0"/>
                                   </p:stCondLst>
@@ -38681,7 +38858,7 @@
                                           </p:stCondLst>
                                         </p:cTn>
                                         <p:tgtEl>
-                                          <p:spTgt spid="10"/>
+                                          <p:spTgt spid="13"/>
                                         </p:tgtEl>
                                         <p:attrNameLst>
                                           <p:attrName>style.visibility</p:attrName>
@@ -38695,7 +38872,7 @@
                                 </p:cTn>
                               </p:par>
                               <p:par>
-                                <p:cTn id="27" presetID="1" presetClass="entr" presetSubtype="0" fill="hold" nodeType="withEffect">
+                                <p:cTn id="27" presetID="1" presetClass="entr" presetSubtype="0" fill="hold" grpId="0" nodeType="withEffect">
                                   <p:stCondLst>
                                     <p:cond delay="0"/>
                                   </p:stCondLst>
@@ -38708,7 +38885,7 @@
                                           </p:stCondLst>
                                         </p:cTn>
                                         <p:tgtEl>
-                                          <p:spTgt spid="15"/>
+                                          <p:spTgt spid="9"/>
                                         </p:tgtEl>
                                         <p:attrNameLst>
                                           <p:attrName>style.visibility</p:attrName>
@@ -38735,7 +38912,7 @@
                                           </p:stCondLst>
                                         </p:cTn>
                                         <p:tgtEl>
-                                          <p:spTgt spid="6"/>
+                                          <p:spTgt spid="5"/>
                                         </p:tgtEl>
                                         <p:attrNameLst>
                                           <p:attrName>style.visibility</p:attrName>
@@ -38767,7 +38944,7 @@
                             </p:stCondLst>
                             <p:childTnLst>
                               <p:par>
-                                <p:cTn id="33" presetID="1" presetClass="entr" presetSubtype="0" fill="hold" nodeType="clickEffect">
+                                <p:cTn id="33" presetID="1" presetClass="entr" presetSubtype="0" fill="hold" grpId="0" nodeType="clickEffect">
                                   <p:stCondLst>
                                     <p:cond delay="0"/>
                                   </p:stCondLst>
@@ -38775,6 +38952,105 @@
                                     <p:set>
                                       <p:cBhvr>
                                         <p:cTn id="34" dur="1" fill="hold">
+                                          <p:stCondLst>
+                                            <p:cond delay="0"/>
+                                          </p:stCondLst>
+                                        </p:cTn>
+                                        <p:tgtEl>
+                                          <p:spTgt spid="10"/>
+                                        </p:tgtEl>
+                                        <p:attrNameLst>
+                                          <p:attrName>style.visibility</p:attrName>
+                                        </p:attrNameLst>
+                                      </p:cBhvr>
+                                      <p:to>
+                                        <p:strVal val="visible"/>
+                                      </p:to>
+                                    </p:set>
+                                  </p:childTnLst>
+                                </p:cTn>
+                              </p:par>
+                              <p:par>
+                                <p:cTn id="35" presetID="1" presetClass="entr" presetSubtype="0" fill="hold" nodeType="withEffect">
+                                  <p:stCondLst>
+                                    <p:cond delay="0"/>
+                                  </p:stCondLst>
+                                  <p:childTnLst>
+                                    <p:set>
+                                      <p:cBhvr>
+                                        <p:cTn id="36" dur="1" fill="hold">
+                                          <p:stCondLst>
+                                            <p:cond delay="0"/>
+                                          </p:stCondLst>
+                                        </p:cTn>
+                                        <p:tgtEl>
+                                          <p:spTgt spid="15"/>
+                                        </p:tgtEl>
+                                        <p:attrNameLst>
+                                          <p:attrName>style.visibility</p:attrName>
+                                        </p:attrNameLst>
+                                      </p:cBhvr>
+                                      <p:to>
+                                        <p:strVal val="visible"/>
+                                      </p:to>
+                                    </p:set>
+                                  </p:childTnLst>
+                                </p:cTn>
+                              </p:par>
+                              <p:par>
+                                <p:cTn id="37" presetID="1" presetClass="entr" presetSubtype="0" fill="hold" grpId="0" nodeType="withEffect">
+                                  <p:stCondLst>
+                                    <p:cond delay="0"/>
+                                  </p:stCondLst>
+                                  <p:childTnLst>
+                                    <p:set>
+                                      <p:cBhvr>
+                                        <p:cTn id="38" dur="1" fill="hold">
+                                          <p:stCondLst>
+                                            <p:cond delay="0"/>
+                                          </p:stCondLst>
+                                        </p:cTn>
+                                        <p:tgtEl>
+                                          <p:spTgt spid="6"/>
+                                        </p:tgtEl>
+                                        <p:attrNameLst>
+                                          <p:attrName>style.visibility</p:attrName>
+                                        </p:attrNameLst>
+                                      </p:cBhvr>
+                                      <p:to>
+                                        <p:strVal val="visible"/>
+                                      </p:to>
+                                    </p:set>
+                                  </p:childTnLst>
+                                </p:cTn>
+                              </p:par>
+                            </p:childTnLst>
+                          </p:cTn>
+                        </p:par>
+                      </p:childTnLst>
+                    </p:cTn>
+                  </p:par>
+                  <p:par>
+                    <p:cTn id="39" fill="hold">
+                      <p:stCondLst>
+                        <p:cond delay="indefinite"/>
+                      </p:stCondLst>
+                      <p:childTnLst>
+                        <p:par>
+                          <p:cTn id="40" fill="hold">
+                            <p:stCondLst>
+                              <p:cond delay="0"/>
+                            </p:stCondLst>
+                            <p:childTnLst>
+                              <p:par>
+                                <p:cTn id="41" presetID="1" presetClass="entr" presetSubtype="0" fill="hold" nodeType="clickEffect">
+                                  <p:stCondLst>
+                                    <p:cond delay="0"/>
+                                  </p:stCondLst>
+                                  <p:childTnLst>
+                                    <p:set>
+                                      <p:cBhvr>
+                                        <p:cTn id="42" dur="1" fill="hold">
                                           <p:stCondLst>
                                             <p:cond delay="0"/>
                                           </p:stCondLst>
@@ -38794,14 +39070,14 @@
                                 </p:cTn>
                               </p:par>
                               <p:par>
-                                <p:cTn id="35" presetID="1" presetClass="entr" presetSubtype="0" fill="hold" grpId="0" nodeType="withEffect">
+                                <p:cTn id="43" presetID="1" presetClass="entr" presetSubtype="0" fill="hold" grpId="0" nodeType="withEffect">
                                   <p:stCondLst>
                                     <p:cond delay="0"/>
                                   </p:stCondLst>
                                   <p:childTnLst>
                                     <p:set>
                                       <p:cBhvr>
-                                        <p:cTn id="36" dur="1" fill="hold">
+                                        <p:cTn id="44" dur="1" fill="hold">
                                           <p:stCondLst>
                                             <p:cond delay="0"/>
                                           </p:stCondLst>
@@ -38922,7 +39198,7 @@
 
 <file path=ppt/tags/tag19.xml><?xml version="1.0" encoding="utf-8"?>
 <p:tagLst xmlns:a="http://schemas.openxmlformats.org/drawingml/2006/main" xmlns:r="http://schemas.openxmlformats.org/officeDocument/2006/relationships" xmlns:p="http://schemas.openxmlformats.org/presentationml/2006/main">
-  <p:tag name="TIMING" val="|6.7"/>
+  <p:tag name="TIMING" val="|27.8|3.9|10.8"/>
 </p:tagLst>
 </file>
 
@@ -38934,19 +39210,19 @@
 
 <file path=ppt/tags/tag20.xml><?xml version="1.0" encoding="utf-8"?>
 <p:tagLst xmlns:a="http://schemas.openxmlformats.org/drawingml/2006/main" xmlns:r="http://schemas.openxmlformats.org/officeDocument/2006/relationships" xmlns:p="http://schemas.openxmlformats.org/presentationml/2006/main">
-  <p:tag name="TIMING" val="|3.6|38"/>
+  <p:tag name="TIMING" val="|6.7"/>
 </p:tagLst>
 </file>
 
 <file path=ppt/tags/tag21.xml><?xml version="1.0" encoding="utf-8"?>
 <p:tagLst xmlns:a="http://schemas.openxmlformats.org/drawingml/2006/main" xmlns:r="http://schemas.openxmlformats.org/officeDocument/2006/relationships" xmlns:p="http://schemas.openxmlformats.org/presentationml/2006/main">
-  <p:tag name="TIMING" val="|2.5"/>
+  <p:tag name="TIMING" val="|3.6|38"/>
 </p:tagLst>
 </file>
 
 <file path=ppt/tags/tag22.xml><?xml version="1.0" encoding="utf-8"?>
 <p:tagLst xmlns:a="http://schemas.openxmlformats.org/drawingml/2006/main" xmlns:r="http://schemas.openxmlformats.org/officeDocument/2006/relationships" xmlns:p="http://schemas.openxmlformats.org/presentationml/2006/main">
-  <p:tag name="TIMING" val="|27.8|3.9|10.8"/>
+  <p:tag name="TIMING" val="|2.5"/>
 </p:tagLst>
 </file>
 

</xml_diff>

<commit_message>
Rehearsed to about 25 minutes.
Need to reconcile state/value/statistic/etc.
</commit_message>
<xml_diff>
--- a/marple.pptx
+++ b/marple.pptx
@@ -5,7 +5,7 @@
     <p:sldMasterId id="2147483648" r:id="rId1"/>
   </p:sldMasterIdLst>
   <p:notesMasterIdLst>
-    <p:notesMasterId r:id="rId43"/>
+    <p:notesMasterId r:id="rId42"/>
   </p:notesMasterIdLst>
   <p:sldIdLst>
     <p:sldId id="256" r:id="rId2"/>
@@ -24,31 +24,30 @@
     <p:sldId id="545" r:id="rId15"/>
     <p:sldId id="538" r:id="rId16"/>
     <p:sldId id="537" r:id="rId17"/>
-    <p:sldId id="539" r:id="rId18"/>
-    <p:sldId id="566" r:id="rId19"/>
-    <p:sldId id="567" r:id="rId20"/>
-    <p:sldId id="605" r:id="rId21"/>
-    <p:sldId id="608" r:id="rId22"/>
-    <p:sldId id="609" r:id="rId23"/>
-    <p:sldId id="610" r:id="rId24"/>
-    <p:sldId id="611" r:id="rId25"/>
-    <p:sldId id="612" r:id="rId26"/>
-    <p:sldId id="613" r:id="rId27"/>
-    <p:sldId id="614" r:id="rId28"/>
-    <p:sldId id="615" r:id="rId29"/>
-    <p:sldId id="617" r:id="rId30"/>
-    <p:sldId id="618" r:id="rId31"/>
-    <p:sldId id="619" r:id="rId32"/>
-    <p:sldId id="621" r:id="rId33"/>
-    <p:sldId id="622" r:id="rId34"/>
-    <p:sldId id="634" r:id="rId35"/>
-    <p:sldId id="624" r:id="rId36"/>
-    <p:sldId id="305" r:id="rId37"/>
-    <p:sldId id="580" r:id="rId38"/>
-    <p:sldId id="347" r:id="rId39"/>
-    <p:sldId id="500" r:id="rId40"/>
-    <p:sldId id="501" r:id="rId41"/>
-    <p:sldId id="581" r:id="rId42"/>
+    <p:sldId id="566" r:id="rId18"/>
+    <p:sldId id="567" r:id="rId19"/>
+    <p:sldId id="605" r:id="rId20"/>
+    <p:sldId id="608" r:id="rId21"/>
+    <p:sldId id="609" r:id="rId22"/>
+    <p:sldId id="610" r:id="rId23"/>
+    <p:sldId id="611" r:id="rId24"/>
+    <p:sldId id="612" r:id="rId25"/>
+    <p:sldId id="613" r:id="rId26"/>
+    <p:sldId id="614" r:id="rId27"/>
+    <p:sldId id="615" r:id="rId28"/>
+    <p:sldId id="617" r:id="rId29"/>
+    <p:sldId id="618" r:id="rId30"/>
+    <p:sldId id="619" r:id="rId31"/>
+    <p:sldId id="621" r:id="rId32"/>
+    <p:sldId id="622" r:id="rId33"/>
+    <p:sldId id="634" r:id="rId34"/>
+    <p:sldId id="624" r:id="rId35"/>
+    <p:sldId id="305" r:id="rId36"/>
+    <p:sldId id="580" r:id="rId37"/>
+    <p:sldId id="347" r:id="rId38"/>
+    <p:sldId id="500" r:id="rId39"/>
+    <p:sldId id="501" r:id="rId40"/>
+    <p:sldId id="581" r:id="rId41"/>
   </p:sldIdLst>
   <p:sldSz cx="12192000" cy="6858000"/>
   <p:notesSz cx="6858000" cy="9144000"/>
@@ -1399,7 +1398,7 @@
           <a:p>
             <a:r>
               <a:rPr lang="en-US" dirty="0"/>
-              <a:t>So now let’s turn to the Marple language construct </a:t>
+              <a:t>Let’s look at the EWMA </a:t>
             </a:r>
             <a:r>
               <a:rPr lang="en-US" dirty="0" err="1"/>
@@ -1407,7 +1406,31 @@
             </a:r>
             <a:r>
               <a:rPr lang="en-US" dirty="0"/>
-              <a:t>. Unlike the previous constructs, the </a:t>
+              <a:t> query to understand the challenges involved in implementing </a:t>
+            </a:r>
+            <a:r>
+              <a:rPr lang="en-US" dirty="0" err="1"/>
+              <a:t>groupbys</a:t>
+            </a:r>
+            <a:r>
+              <a:rPr lang="en-US" dirty="0"/>
+              <a:t> efficiently in switch hardware. This query needs to do two things: it needs to be fast so that it can compute and update the </a:t>
+            </a:r>
+            <a:r>
+              <a:rPr lang="en-US" dirty="0" err="1"/>
+              <a:t>ewma</a:t>
+            </a:r>
+            <a:r>
+              <a:rPr lang="en-US" dirty="0"/>
+              <a:t> value </a:t>
+            </a:r>
+            <a:r>
+              <a:rPr lang="en-US" dirty="0" err="1"/>
+              <a:t>avg</a:t>
+            </a:r>
+            <a:r>
+              <a:rPr lang="en-US" dirty="0"/>
+              <a:t> every packet, which is roughly every ns on high-end switches today. It also needs to have sufficient space to store a large number of </a:t>
             </a:r>
             <a:r>
               <a:rPr lang="en-US" dirty="0" err="1"/>
@@ -1415,7 +1438,23 @@
             </a:r>
             <a:r>
               <a:rPr lang="en-US" dirty="0"/>
-              <a:t> construct _cannot_ be efficiently supported by programmable switches as they stand today. In other words, we need to design a new hardware instruction for this construct. Let’s look at how we do that.</a:t>
+              <a:t> partitions because the </a:t>
+            </a:r>
+            <a:r>
+              <a:rPr lang="en-US" dirty="0" err="1"/>
+              <a:t>groupby</a:t>
+            </a:r>
+            <a:r>
+              <a:rPr lang="en-US" dirty="0"/>
+              <a:t> can run at very fine granularity such as a 5-tuple. In other words, we need the memory implementing this </a:t>
+            </a:r>
+            <a:r>
+              <a:rPr lang="en-US" dirty="0" err="1"/>
+              <a:t>groupby</a:t>
+            </a:r>
+            <a:r>
+              <a:rPr lang="en-US" dirty="0"/>
+              <a:t> to be both fast to support quick updates and large to store the average for a large number of flows.</a:t>
             </a:r>
           </a:p>
         </p:txBody>
@@ -1446,7 +1485,7 @@
     </p:spTree>
     <p:extLst>
       <p:ext uri="{BB962C8B-B14F-4D97-AF65-F5344CB8AC3E}">
-        <p14:creationId xmlns:p14="http://schemas.microsoft.com/office/powerpoint/2010/main" val="4081407173"/>
+        <p14:creationId xmlns:p14="http://schemas.microsoft.com/office/powerpoint/2010/main" val="1038519295"/>
       </p:ext>
     </p:extLst>
   </p:cSld>
@@ -1502,63 +1541,7 @@
           <a:p>
             <a:r>
               <a:rPr lang="en-US" dirty="0"/>
-              <a:t>Let’s look at the EWMA </a:t>
-            </a:r>
-            <a:r>
-              <a:rPr lang="en-US" dirty="0" err="1"/>
-              <a:t>groupby</a:t>
-            </a:r>
-            <a:r>
-              <a:rPr lang="en-US" dirty="0"/>
-              <a:t> query to understand the challenges involved in implementing </a:t>
-            </a:r>
-            <a:r>
-              <a:rPr lang="en-US" dirty="0" err="1"/>
-              <a:t>groupbys</a:t>
-            </a:r>
-            <a:r>
-              <a:rPr lang="en-US" dirty="0"/>
-              <a:t> efficiently in switch hardware. This query needs to do two things: it needs to be fast so that it can compute and update the </a:t>
-            </a:r>
-            <a:r>
-              <a:rPr lang="en-US" dirty="0" err="1"/>
-              <a:t>ewma</a:t>
-            </a:r>
-            <a:r>
-              <a:rPr lang="en-US" dirty="0"/>
-              <a:t> value </a:t>
-            </a:r>
-            <a:r>
-              <a:rPr lang="en-US" dirty="0" err="1"/>
-              <a:t>avg</a:t>
-            </a:r>
-            <a:r>
-              <a:rPr lang="en-US" dirty="0"/>
-              <a:t> every packet, which is roughly every ns on high-end switches today. It also needs to have sufficient space to store a large number of </a:t>
-            </a:r>
-            <a:r>
-              <a:rPr lang="en-US" dirty="0" err="1"/>
-              <a:t>groupby</a:t>
-            </a:r>
-            <a:r>
-              <a:rPr lang="en-US" dirty="0"/>
-              <a:t> partitions because the </a:t>
-            </a:r>
-            <a:r>
-              <a:rPr lang="en-US" dirty="0" err="1"/>
-              <a:t>groupby</a:t>
-            </a:r>
-            <a:r>
-              <a:rPr lang="en-US" dirty="0"/>
-              <a:t> can run at very fine granularity such as a 5-tuple. In other words, we need the memory implementing this </a:t>
-            </a:r>
-            <a:r>
-              <a:rPr lang="en-US" dirty="0" err="1"/>
-              <a:t>groupby</a:t>
-            </a:r>
-            <a:r>
-              <a:rPr lang="en-US" dirty="0"/>
-              <a:t> to be both fast to support quick updates and large to store the average for a large number of flows.</a:t>
+              <a:t>But the problem is no existing mainstream memory technology guarantees both fast access and is sufficiently dense to store a large number of flows. SRAM is fast, but you can’t store too many flow entries in SRAM. DRAM is dense and allows you to store many entries, but DRAM is slow.</a:t>
             </a:r>
           </a:p>
         </p:txBody>
@@ -1589,7 +1572,7 @@
     </p:spTree>
     <p:extLst>
       <p:ext uri="{BB962C8B-B14F-4D97-AF65-F5344CB8AC3E}">
-        <p14:creationId xmlns:p14="http://schemas.microsoft.com/office/powerpoint/2010/main" val="1038519295"/>
+        <p14:creationId xmlns:p14="http://schemas.microsoft.com/office/powerpoint/2010/main" val="347832182"/>
       </p:ext>
     </p:extLst>
   </p:cSld>
@@ -1645,7 +1628,7 @@
           <a:p>
             <a:r>
               <a:rPr lang="en-US" dirty="0"/>
-              <a:t>But the problem is no existing mainstream memory technology guarantees both fast access and is sufficiently dense to store a large number of flows. SRAM is fast, but you can’t store too many flow entries in SRAM. DRAM is dense and allows you to store many entries, but DRAM is slow.</a:t>
+              <a:t>Now, let’s look at what happens on a cache miss. You don’t find the key, So you go to the backing store to request it. It sends it back. You insert it into the cache as you would in a processor cache. Then you update it in place.</a:t>
             </a:r>
           </a:p>
         </p:txBody>
@@ -1667,7 +1650,7 @@
           <a:p>
             <a:fld id="{33793ACE-A489-1C41-B163-D1FF0130F898}" type="slidenum">
               <a:rPr lang="en-US" smtClean="0"/>
-              <a:t>19</a:t>
+              <a:t>20</a:t>
             </a:fld>
             <a:endParaRPr lang="en-US"/>
           </a:p>
@@ -1676,7 +1659,7 @@
     </p:spTree>
     <p:extLst>
       <p:ext uri="{BB962C8B-B14F-4D97-AF65-F5344CB8AC3E}">
-        <p14:creationId xmlns:p14="http://schemas.microsoft.com/office/powerpoint/2010/main" val="347832182"/>
+        <p14:creationId xmlns:p14="http://schemas.microsoft.com/office/powerpoint/2010/main" val="1921291454"/>
       </p:ext>
     </p:extLst>
   </p:cSld>
@@ -1844,10 +1827,7 @@
           <a:bodyPr/>
           <a:lstStyle/>
           <a:p>
-            <a:r>
-              <a:rPr lang="en-US" dirty="0"/>
-              <a:t>Now, let’s look at what happens on a cache miss. You don’t find the key, So you go to the backing store to request it. It sends it back. You insert it into the cache as you would in a processor cache. Then you update it in place.</a:t>
-            </a:r>
+            <a:endParaRPr lang="en-US" dirty="0"/>
           </a:p>
         </p:txBody>
       </p:sp>
@@ -1877,7 +1857,7 @@
     </p:spTree>
     <p:extLst>
       <p:ext uri="{BB962C8B-B14F-4D97-AF65-F5344CB8AC3E}">
-        <p14:creationId xmlns:p14="http://schemas.microsoft.com/office/powerpoint/2010/main" val="1921291454"/>
+        <p14:creationId xmlns:p14="http://schemas.microsoft.com/office/powerpoint/2010/main" val="2251208279"/>
       </p:ext>
     </p:extLst>
   </p:cSld>
@@ -1931,7 +1911,10 @@
           <a:bodyPr/>
           <a:lstStyle/>
           <a:p>
-            <a:endParaRPr lang="en-US" dirty="0"/>
+            <a:r>
+              <a:rPr lang="en-US" dirty="0"/>
+              <a:t>The problem is that the modify and write must wait for the DRAM access latency to fetch the backing store’s information and insert it into the cache. DRAM access latencies are highly variable depending on the access pattern. This is because DRAMs are typically built for good average case performance and the worst-case performance can be quite bad.</a:t>
+            </a:r>
           </a:p>
         </p:txBody>
       </p:sp>
@@ -1961,7 +1944,7 @@
     </p:spTree>
     <p:extLst>
       <p:ext uri="{BB962C8B-B14F-4D97-AF65-F5344CB8AC3E}">
-        <p14:creationId xmlns:p14="http://schemas.microsoft.com/office/powerpoint/2010/main" val="2251208279"/>
+        <p14:creationId xmlns:p14="http://schemas.microsoft.com/office/powerpoint/2010/main" val="155879679"/>
       </p:ext>
     </p:extLst>
   </p:cSld>
@@ -2017,7 +2000,7 @@
           <a:p>
             <a:r>
               <a:rPr lang="en-US" dirty="0"/>
-              <a:t>The problem is that the modify and write must wait for the DRAM access latency to fetch the backing store’s information and insert it into the cache. DRAM access latencies are highly variable depending on the access pattern. This is because DRAMs are typically built for good average case performance and the worst-case performance can be quite bad.</a:t>
+              <a:t>Instead, our main design difference in the key-value store is to treat cache misses as packets from new flows.</a:t>
             </a:r>
           </a:p>
         </p:txBody>
@@ -2048,7 +2031,7 @@
     </p:spTree>
     <p:extLst>
       <p:ext uri="{BB962C8B-B14F-4D97-AF65-F5344CB8AC3E}">
-        <p14:creationId xmlns:p14="http://schemas.microsoft.com/office/powerpoint/2010/main" val="155879679"/>
+        <p14:creationId xmlns:p14="http://schemas.microsoft.com/office/powerpoint/2010/main" val="4165394555"/>
       </p:ext>
     </p:extLst>
   </p:cSld>
@@ -2104,7 +2087,7 @@
           <a:p>
             <a:r>
               <a:rPr lang="en-US" dirty="0"/>
-              <a:t>Instead, our main design difference in the key-value store is to treat cache misses as packets from new flows.</a:t>
+              <a:t>What does this mean? When a key that isn’t present in the key-value store shows up, we treat it like a new key-–even if this key was previously evicted and written to the backing store.</a:t>
             </a:r>
           </a:p>
         </p:txBody>
@@ -2135,7 +2118,7 @@
     </p:spTree>
     <p:extLst>
       <p:ext uri="{BB962C8B-B14F-4D97-AF65-F5344CB8AC3E}">
-        <p14:creationId xmlns:p14="http://schemas.microsoft.com/office/powerpoint/2010/main" val="4165394555"/>
+        <p14:creationId xmlns:p14="http://schemas.microsoft.com/office/powerpoint/2010/main" val="3055367160"/>
       </p:ext>
     </p:extLst>
   </p:cSld>
@@ -2191,7 +2174,7 @@
           <a:p>
             <a:r>
               <a:rPr lang="en-US" dirty="0"/>
-              <a:t>What does this mean? When a key that isn’t present in the key-value store shows up, we treat it like a new key-–even if this key was previously evicted and written to the backing store.</a:t>
+              <a:t>Then, eventually at some point, this key will be evicted to the backing store to make room for a new key.</a:t>
             </a:r>
           </a:p>
         </p:txBody>
@@ -2222,7 +2205,7 @@
     </p:spTree>
     <p:extLst>
       <p:ext uri="{BB962C8B-B14F-4D97-AF65-F5344CB8AC3E}">
-        <p14:creationId xmlns:p14="http://schemas.microsoft.com/office/powerpoint/2010/main" val="3055367160"/>
+        <p14:creationId xmlns:p14="http://schemas.microsoft.com/office/powerpoint/2010/main" val="3217026311"/>
       </p:ext>
     </p:extLst>
   </p:cSld>
@@ -2278,7 +2261,15 @@
           <a:p>
             <a:r>
               <a:rPr lang="en-US" dirty="0"/>
-              <a:t>Then, eventually at some point, this key will be evicted to the backing store to make room for a new key.</a:t>
+              <a:t>At this point, we merge the key’s value with the old value for the same key in the backing store. If the key doesn’t already exist in the backing store, we just write the </a:t>
+            </a:r>
+            <a:r>
+              <a:rPr lang="en-US" dirty="0" err="1"/>
+              <a:t>evlcted</a:t>
+            </a:r>
+            <a:r>
+              <a:rPr lang="en-US" dirty="0"/>
+              <a:t> value into the backing store.</a:t>
             </a:r>
           </a:p>
         </p:txBody>
@@ -2309,7 +2300,7 @@
     </p:spTree>
     <p:extLst>
       <p:ext uri="{BB962C8B-B14F-4D97-AF65-F5344CB8AC3E}">
-        <p14:creationId xmlns:p14="http://schemas.microsoft.com/office/powerpoint/2010/main" val="3217026311"/>
+        <p14:creationId xmlns:p14="http://schemas.microsoft.com/office/powerpoint/2010/main" val="1298857703"/>
       </p:ext>
     </p:extLst>
   </p:cSld>
@@ -2365,15 +2356,7 @@
           <a:p>
             <a:r>
               <a:rPr lang="en-US" dirty="0"/>
-              <a:t>At this point, we merge the key’s value with the old value for the same key in the backing store. If the key doesn’t already exist in the backing store, we just write the </a:t>
-            </a:r>
-            <a:r>
-              <a:rPr lang="en-US" dirty="0" err="1"/>
-              <a:t>evlcted</a:t>
-            </a:r>
-            <a:r>
-              <a:rPr lang="en-US" dirty="0"/>
-              <a:t> value into the backing store.</a:t>
+              <a:t>The benefit of this design  is that there is no waiting on the critical path of packet processing and packet processing can proceed as usual.</a:t>
             </a:r>
           </a:p>
         </p:txBody>
@@ -2404,7 +2387,7 @@
     </p:spTree>
     <p:extLst>
       <p:ext uri="{BB962C8B-B14F-4D97-AF65-F5344CB8AC3E}">
-        <p14:creationId xmlns:p14="http://schemas.microsoft.com/office/powerpoint/2010/main" val="1298857703"/>
+        <p14:creationId xmlns:p14="http://schemas.microsoft.com/office/powerpoint/2010/main" val="3954136354"/>
       </p:ext>
     </p:extLst>
   </p:cSld>
@@ -2460,7 +2443,16 @@
           <a:p>
             <a:r>
               <a:rPr lang="en-US" dirty="0"/>
-              <a:t>The benefit of this design  is that there is no waiting on the critical path of packet processing and packet processing can proceed as usual.</a:t>
+              <a:t>But how do I merge an old and new value for a given key? What does that even mean? Let’s look at this problem more formally. We want to merge the two values, old and new, so that it is as if the statistics function ran over the entire packet stream without any evictions. That way we can retain full accuracy while merging. Let’s introduce some notation for this. Let’s represent the statistics function as a function g over the packet sequence. For a simple counter, the function is the sum of the packet lengths (or any other packet header).</a:t>
+            </a:r>
+          </a:p>
+          <a:p>
+            <a:endParaRPr lang="en-US" dirty="0"/>
+          </a:p>
+          <a:p>
+            <a:r>
+              <a:rPr lang="en-US" dirty="0"/>
+              <a:t>The fold function that we talked about earlier is just an incremental version of the same g.</a:t>
             </a:r>
           </a:p>
         </p:txBody>
@@ -2491,7 +2483,7 @@
     </p:spTree>
     <p:extLst>
       <p:ext uri="{BB962C8B-B14F-4D97-AF65-F5344CB8AC3E}">
-        <p14:creationId xmlns:p14="http://schemas.microsoft.com/office/powerpoint/2010/main" val="3954136354"/>
+        <p14:creationId xmlns:p14="http://schemas.microsoft.com/office/powerpoint/2010/main" val="1598310205"/>
       </p:ext>
     </p:extLst>
   </p:cSld>
@@ -2547,7 +2539,13 @@
           <a:p>
             <a:r>
               <a:rPr lang="en-US" dirty="0"/>
-              <a:t>But how do I merge an old and new value for a given key? What does that even mean? Let’s look at this problem more formally. We want to merge the two values, old and new, so that it is as if the statistics function ran over the entire packet stream without any evictions. That way we can retain full accuracy while merging. Let’s introduce some notation for this. Let’s represent the statistics function as a function g over the packet sequence. For a simple counter, the function is the sum of the packet lengths (or any other packet header).</a:t>
+              <a:t>Now what does it formally mean to merge the old and new values of a key?</a:t>
+            </a:r>
+          </a:p>
+          <a:p>
+            <a:r>
+              <a:rPr lang="en-US" dirty="0"/>
+              <a:t>Mathematically, it means this. That if you computed the statistics function over the first sequence of packets and computed the statistics over the second sequence of the packets and then merged them, it is equivalent to computing the statistics over the entire packet sequence.</a:t>
             </a:r>
           </a:p>
           <a:p>
@@ -2556,8 +2554,47 @@
           <a:p>
             <a:r>
               <a:rPr lang="en-US" dirty="0"/>
-              <a:t>The fold function that we talked about earlier is just an incremental version of the same g.</a:t>
-            </a:r>
+              <a:t>In our context, what is the physical interpretation of this? The first packet sequence is the sequence of packets before the first time the key-value pair was evicted. The second packet sequence is the sequence of packets seen in the cache.</a:t>
+            </a:r>
+          </a:p>
+          <a:p>
+            <a:endParaRPr lang="en-US" dirty="0"/>
+          </a:p>
+          <a:p>
+            <a:r>
+              <a:rPr lang="en-US" dirty="0"/>
+              <a:t>Let’s take a simple example. If g is a counter, the merge is a simple addition. You can probably see that this is easily generalizable to other associative </a:t>
+            </a:r>
+            <a:r>
+              <a:rPr lang="en-US" dirty="0" err="1"/>
+              <a:t>statisticss</a:t>
+            </a:r>
+            <a:r>
+              <a:rPr lang="en-US" dirty="0"/>
+              <a:t> such as min/max/product, etc. Essentially, you track the minimum in the cache and take the minimum of the new value in the cache and the old value in the backing store.</a:t>
+            </a:r>
+          </a:p>
+          <a:p>
+            <a:endParaRPr lang="en-US" dirty="0"/>
+          </a:p>
+          <a:p>
+            <a:r>
+              <a:rPr lang="en-US" dirty="0"/>
+              <a:t>TODO: Diagram for </a:t>
+            </a:r>
+            <a:r>
+              <a:rPr lang="en-US" dirty="0" err="1"/>
+              <a:t>V_back</a:t>
+            </a:r>
+            <a:r>
+              <a:rPr lang="en-US" dirty="0"/>
+              <a:t> and </a:t>
+            </a:r>
+            <a:r>
+              <a:rPr lang="en-US" dirty="0" err="1"/>
+              <a:t>V_cache</a:t>
+            </a:r>
+            <a:endParaRPr lang="en-US" dirty="0"/>
           </a:p>
         </p:txBody>
       </p:sp>
@@ -2587,7 +2624,7 @@
     </p:spTree>
     <p:extLst>
       <p:ext uri="{BB962C8B-B14F-4D97-AF65-F5344CB8AC3E}">
-        <p14:creationId xmlns:p14="http://schemas.microsoft.com/office/powerpoint/2010/main" val="1598310205"/>
+        <p14:creationId xmlns:p14="http://schemas.microsoft.com/office/powerpoint/2010/main" val="3300278867"/>
       </p:ext>
     </p:extLst>
   </p:cSld>
@@ -2643,13 +2680,16 @@
           <a:p>
             <a:r>
               <a:rPr lang="en-US" dirty="0"/>
-              <a:t>Now what does it formally mean to merge the old and new values of a key?</a:t>
-            </a:r>
+              <a:t>But what about operations that are not associative? Let’s think about this for a bit. We can merge any arbitrary statistics by storing the entire sequence of packets in the cache, sending this sequence of packets to the backing store upon eviction, and merging by simply replaying the statistics computation over this sequence of packets.</a:t>
+            </a:r>
+          </a:p>
+          <a:p>
+            <a:endParaRPr lang="en-US" dirty="0"/>
           </a:p>
           <a:p>
             <a:r>
               <a:rPr lang="en-US" dirty="0"/>
-              <a:t>Mathematically, it means this. That if you computed the statistics function over the first sequence of packets and computed the statistics over the second sequence of the packets and then merged them, it is equivalent to computing the statistics over the entire packet sequence.</a:t>
+              <a:t>But that’s a lot of additional state just for merging and it grows with the number of packets that have been processed so far. In fact, this is no better than just sending a copy of every packet to a collection server, which is what we wanted to avoid in the first place.</a:t>
             </a:r>
           </a:p>
           <a:p>
@@ -2658,46 +2698,13 @@
           <a:p>
             <a:r>
               <a:rPr lang="en-US" dirty="0"/>
-              <a:t>In our context, what is the physical interpretation of this? The first packet sequence is the sequence of packets before the first time the key-value pair was evicted. The second packet sequence is the sequence of packets seen in the cache.</a:t>
+              <a:t>So the real question is whether we can merge with a small amount of extra state over and above the state that is being tracked by the statistics function itself? More precisely, we want the extra state to have size similar to the state being tracked.</a:t>
             </a:r>
           </a:p>
           <a:p>
             <a:endParaRPr lang="en-US" dirty="0"/>
           </a:p>
           <a:p>
-            <a:r>
-              <a:rPr lang="en-US" dirty="0"/>
-              <a:t>Let’s take a simple example. If g is a counter, the merge is a simple addition. You can probably see that this is easily generalizable to other associative </a:t>
-            </a:r>
-            <a:r>
-              <a:rPr lang="en-US" dirty="0" err="1"/>
-              <a:t>statisticss</a:t>
-            </a:r>
-            <a:r>
-              <a:rPr lang="en-US" dirty="0"/>
-              <a:t> such as min/max/product, etc. Essentially, you track the minimum in the cache and take the minimum of the new value in the cache and the old value in the backing store.</a:t>
-            </a:r>
-          </a:p>
-          <a:p>
-            <a:endParaRPr lang="en-US" dirty="0"/>
-          </a:p>
-          <a:p>
-            <a:r>
-              <a:rPr lang="en-US" dirty="0"/>
-              <a:t>TODO: Diagram for </a:t>
-            </a:r>
-            <a:r>
-              <a:rPr lang="en-US" dirty="0" err="1"/>
-              <a:t>V_back</a:t>
-            </a:r>
-            <a:r>
-              <a:rPr lang="en-US" dirty="0"/>
-              <a:t> and </a:t>
-            </a:r>
-            <a:r>
-              <a:rPr lang="en-US" dirty="0" err="1"/>
-              <a:t>V_cache</a:t>
-            </a:r>
             <a:endParaRPr lang="en-US" dirty="0"/>
           </a:p>
         </p:txBody>
@@ -2728,7 +2735,7 @@
     </p:spTree>
     <p:extLst>
       <p:ext uri="{BB962C8B-B14F-4D97-AF65-F5344CB8AC3E}">
-        <p14:creationId xmlns:p14="http://schemas.microsoft.com/office/powerpoint/2010/main" val="3300278867"/>
+        <p14:creationId xmlns:p14="http://schemas.microsoft.com/office/powerpoint/2010/main" val="1653060950"/>
       </p:ext>
     </p:extLst>
   </p:cSld>
@@ -2871,7 +2878,7 @@
           <a:p>
             <a:r>
               <a:rPr lang="en-US" dirty="0"/>
-              <a:t>But what about operations that are not associative? Let’s think about this for a bit. We can merge any arbitrary statistics by storing the entire sequence of packets in the cache, sending this sequence of packets to the backing store upon eviction, and merging by simply replaying the statistics computation over this sequence of packets.</a:t>
+              <a:t>One theoretical contribution of this work was identifying a class of statistics functions where we could in fact carry out the merge using a small amount of additional state. This class we call the linear-in-state class of statistics functions. The reason for this name should be clear from looking at the form of the state update in these statistics functions: the updated state is a linear function of the previous state. Here the coefficients A and B can either be constants or functions of a bounded number of packets in the past starting from the current packet. S can also be generalized to a vector and A and B can be matrices.</a:t>
             </a:r>
           </a:p>
           <a:p>
@@ -2880,23 +2887,8 @@
           <a:p>
             <a:r>
               <a:rPr lang="en-US" dirty="0"/>
-              <a:t>But that’s a lot of additional state just for merging and it grows with the number of packets that have been processed so far. In fact, this is no better than just sending a copy of every packet to a collection server, which is what we wanted to avoid in the first place.</a:t>
-            </a:r>
-          </a:p>
-          <a:p>
-            <a:endParaRPr lang="en-US" dirty="0"/>
-          </a:p>
-          <a:p>
-            <a:r>
-              <a:rPr lang="en-US" dirty="0"/>
-              <a:t>So the real question is whether we can merge with a small amount of extra state over and above the state that is being tracked by the statistics function itself? More precisely, we want the extra state to have size similar to the state being tracked.</a:t>
-            </a:r>
-          </a:p>
-          <a:p>
-            <a:endParaRPr lang="en-US" dirty="0"/>
-          </a:p>
-          <a:p>
-            <a:endParaRPr lang="en-US" dirty="0"/>
+              <a:t>As a few quick examples, you can imagine a packet counter, where A is 1 and B is 1. You can have a byte counter where A is 1 and B is the packet’s length field. Or you could have the EWMA which we have seen a few times so far, where A is (1 – alpha) and B is alpha times the packet’s queueing latency. You can also have degenerate cases where A is 0 and B is a function of the last k packets like a windowed average.</a:t>
+            </a:r>
           </a:p>
         </p:txBody>
       </p:sp>
@@ -2926,7 +2918,7 @@
     </p:spTree>
     <p:extLst>
       <p:ext uri="{BB962C8B-B14F-4D97-AF65-F5344CB8AC3E}">
-        <p14:creationId xmlns:p14="http://schemas.microsoft.com/office/powerpoint/2010/main" val="1653060950"/>
+        <p14:creationId xmlns:p14="http://schemas.microsoft.com/office/powerpoint/2010/main" val="2199483374"/>
       </p:ext>
     </p:extLst>
   </p:cSld>
@@ -2982,7 +2974,7 @@
           <a:p>
             <a:r>
               <a:rPr lang="en-US" dirty="0"/>
-              <a:t>One theoretical contribution of this work was identifying a class of statistics functions where we could in fact carry out the merge using a small amount of additional state. This class we call the linear-in-state class of statistics functions. The reason for this name should be clear from looking at the form of the state update in these statistics functions: the updated state is a linear function of the previous state. Here the coefficients A and B can either be constants or functions of a bounded number of packets in the past starting from the current packet. S can also be generalized to a vector and A and B can be matrices.</a:t>
+              <a:t>Why does this work. Let me provide some intuition for this linear-in-state property. Suppose we are tracking an EWMA that takes the packet’s length, multiplies it by a gain alpha, and adds it to 1 – alpha  times the previous value of the EWMA. Now, let’s say the EWMA starts at I1 or I2 and ends at F1 or F2 after N packets, then the following equation holds. You can see why this is true by recursively expanding the equation for the EWMA above where S is written in terms of the previous value of S and the packet’s length.</a:t>
             </a:r>
           </a:p>
           <a:p>
@@ -2991,7 +2983,7 @@
           <a:p>
             <a:r>
               <a:rPr lang="en-US" dirty="0"/>
-              <a:t>As a few quick examples, you can imagine a packet counter, where A is 1 and B is 1. You can have a byte counter where A is 1 and B is the packet’s length field. Or you could have the EWMA which we have seen a few times so far, where A is (1 – alpha) and B is alpha times the packet’s queueing latency. You can also have degenerate cases where A is 0 and B is a function of the last k packets like a windowed average.</a:t>
+              <a:t>OK, what does this equation tell us? It tells us that we can take a final value F1 calculate from an initial value I1 and then ask what the final value F2 would have been for an initial state I2 using a very simple computation.</a:t>
             </a:r>
           </a:p>
         </p:txBody>
@@ -3022,7 +3014,7 @@
     </p:spTree>
     <p:extLst>
       <p:ext uri="{BB962C8B-B14F-4D97-AF65-F5344CB8AC3E}">
-        <p14:creationId xmlns:p14="http://schemas.microsoft.com/office/powerpoint/2010/main" val="2199483374"/>
+        <p14:creationId xmlns:p14="http://schemas.microsoft.com/office/powerpoint/2010/main" val="2056802710"/>
       </p:ext>
     </p:extLst>
   </p:cSld>
@@ -3078,7 +3070,23 @@
           <a:p>
             <a:r>
               <a:rPr lang="en-US" dirty="0"/>
-              <a:t>Why does this work. Let me provide some intuition for this linear-in-state property. Suppose we are tracking an EWMA that takes the packet’s length, multiplies it by a gain alpha, and adds it to 1 – alpha  times the previous value of the EWMA. Now, let’s say the EWMA starts at I1 or I2 and ends at F1 or F2 after N packets, then the following equation holds. You can see why this is true by recursively expanding the equation for the EWMA above where S is written in terms of the previous value of S and the packet’s length.</a:t>
+              <a:t>How does it help here? Let’s map the initial and final values to our problem setting. The initial value for the EWMA in the cache is V0 and the final value is </a:t>
+            </a:r>
+            <a:r>
+              <a:rPr lang="en-US" dirty="0" err="1"/>
+              <a:t>Vcache</a:t>
+            </a:r>
+            <a:r>
+              <a:rPr lang="en-US" dirty="0"/>
+              <a:t>. Now we want to calculate what the final value should have been if the initial value was the value in the backing store and the entry had never been evicted. So I2 is </a:t>
+            </a:r>
+            <a:r>
+              <a:rPr lang="en-US" dirty="0" err="1"/>
+              <a:t>Vback</a:t>
+            </a:r>
+            <a:r>
+              <a:rPr lang="en-US" dirty="0"/>
+              <a:t>. Then what will F2 be. We can just substitute variables in the equation from the last slide and get this equation.</a:t>
             </a:r>
           </a:p>
           <a:p>
@@ -3087,7 +3095,64 @@
           <a:p>
             <a:r>
               <a:rPr lang="en-US" dirty="0"/>
-              <a:t>OK, what does this equation tell us? It tells us that we can take a final value F1 calculate from an initial value I1 and then ask what the final value F2 would have been for an initial state I2 using a very simple computation.</a:t>
+              <a:t>The implication of this is that we have just found our merge function to merge the old value (</a:t>
+            </a:r>
+            <a:r>
+              <a:rPr lang="en-US" dirty="0" err="1"/>
+              <a:t>Vback</a:t>
+            </a:r>
+            <a:r>
+              <a:rPr lang="en-US" dirty="0"/>
+              <a:t>) and the new value (</a:t>
+            </a:r>
+            <a:r>
+              <a:rPr lang="en-US" dirty="0" err="1"/>
+              <a:t>Vcache</a:t>
+            </a:r>
+            <a:r>
+              <a:rPr lang="en-US" dirty="0"/>
+              <a:t>) using some additional state: the number of packets seen in the cache.</a:t>
+            </a:r>
+          </a:p>
+          <a:p>
+            <a:endParaRPr lang="en-US" dirty="0"/>
+          </a:p>
+          <a:p>
+            <a:r>
+              <a:rPr lang="en-US" dirty="0"/>
+              <a:t>The key point is that this additional state is small. It is only the number of packets (N), and doesn’t include some value per packet.</a:t>
+            </a:r>
+          </a:p>
+          <a:p>
+            <a:endParaRPr lang="en-US" dirty="0"/>
+          </a:p>
+          <a:p>
+            <a:endParaRPr lang="en-US" dirty="0"/>
+          </a:p>
+          <a:p>
+            <a:r>
+              <a:rPr lang="en-US" dirty="0"/>
+              <a:t>TODO: Diagram for </a:t>
+            </a:r>
+            <a:r>
+              <a:rPr lang="en-US" dirty="0" err="1"/>
+              <a:t>V_back</a:t>
+            </a:r>
+            <a:r>
+              <a:rPr lang="en-US" dirty="0"/>
+              <a:t> and </a:t>
+            </a:r>
+            <a:r>
+              <a:rPr lang="en-US" dirty="0" err="1"/>
+              <a:t>V</a:t>
+            </a:r>
+            <a:r>
+              <a:rPr lang="en-US" err="1"/>
+              <a:t>_</a:t>
+            </a:r>
+            <a:r>
+              <a:rPr lang="en-US"/>
+              <a:t>cache</a:t>
             </a:r>
           </a:p>
         </p:txBody>
@@ -3118,7 +3183,7 @@
     </p:spTree>
     <p:extLst>
       <p:ext uri="{BB962C8B-B14F-4D97-AF65-F5344CB8AC3E}">
-        <p14:creationId xmlns:p14="http://schemas.microsoft.com/office/powerpoint/2010/main" val="2056802710"/>
+        <p14:creationId xmlns:p14="http://schemas.microsoft.com/office/powerpoint/2010/main" val="307923882"/>
       </p:ext>
     </p:extLst>
   </p:cSld>
@@ -3172,92 +3237,7 @@
           <a:bodyPr/>
           <a:lstStyle/>
           <a:p>
-            <a:r>
-              <a:rPr lang="en-US" dirty="0"/>
-              <a:t>How does it help here? Let’s map the initial and final values to our problem setting. The initial value for the EWMA in the cache is V0 and the final value is </a:t>
-            </a:r>
-            <a:r>
-              <a:rPr lang="en-US" dirty="0" err="1"/>
-              <a:t>Vcache</a:t>
-            </a:r>
-            <a:r>
-              <a:rPr lang="en-US" dirty="0"/>
-              <a:t>. Now we want to calculate what the final value should have been if the initial value was the value in the backing store and the entry had never been evicted. So I2 is </a:t>
-            </a:r>
-            <a:r>
-              <a:rPr lang="en-US" dirty="0" err="1"/>
-              <a:t>Vback</a:t>
-            </a:r>
-            <a:r>
-              <a:rPr lang="en-US" dirty="0"/>
-              <a:t>. Then what will F2 be. We can just substitute variables in the equation from the last slide and get this equation.</a:t>
-            </a:r>
-          </a:p>
-          <a:p>
             <a:endParaRPr lang="en-US" dirty="0"/>
-          </a:p>
-          <a:p>
-            <a:r>
-              <a:rPr lang="en-US" dirty="0"/>
-              <a:t>The implication of this is that we have just found our merge function to merge the old value (</a:t>
-            </a:r>
-            <a:r>
-              <a:rPr lang="en-US" dirty="0" err="1"/>
-              <a:t>Vback</a:t>
-            </a:r>
-            <a:r>
-              <a:rPr lang="en-US" dirty="0"/>
-              <a:t>) and the new value (</a:t>
-            </a:r>
-            <a:r>
-              <a:rPr lang="en-US" dirty="0" err="1"/>
-              <a:t>Vcache</a:t>
-            </a:r>
-            <a:r>
-              <a:rPr lang="en-US" dirty="0"/>
-              <a:t>) using some additional state: the number of packets seen in the cache.</a:t>
-            </a:r>
-          </a:p>
-          <a:p>
-            <a:endParaRPr lang="en-US" dirty="0"/>
-          </a:p>
-          <a:p>
-            <a:r>
-              <a:rPr lang="en-US" dirty="0"/>
-              <a:t>The key point is that this additional state is small. It is only the number of packets (N), and doesn’t include some value per packet.</a:t>
-            </a:r>
-          </a:p>
-          <a:p>
-            <a:endParaRPr lang="en-US" dirty="0"/>
-          </a:p>
-          <a:p>
-            <a:endParaRPr lang="en-US" dirty="0"/>
-          </a:p>
-          <a:p>
-            <a:r>
-              <a:rPr lang="en-US" dirty="0"/>
-              <a:t>TODO: Diagram for </a:t>
-            </a:r>
-            <a:r>
-              <a:rPr lang="en-US" dirty="0" err="1"/>
-              <a:t>V_back</a:t>
-            </a:r>
-            <a:r>
-              <a:rPr lang="en-US" dirty="0"/>
-              <a:t> and </a:t>
-            </a:r>
-            <a:r>
-              <a:rPr lang="en-US" dirty="0" err="1"/>
-              <a:t>V</a:t>
-            </a:r>
-            <a:r>
-              <a:rPr lang="en-US" err="1"/>
-              <a:t>_</a:t>
-            </a:r>
-            <a:r>
-              <a:rPr lang="en-US"/>
-              <a:t>cache</a:t>
-            </a:r>
           </a:p>
         </p:txBody>
       </p:sp>
@@ -3276,7 +3256,7 @@
           <a:bodyPr/>
           <a:lstStyle/>
           <a:p>
-            <a:fld id="{33793ACE-A489-1C41-B163-D1FF0130F898}" type="slidenum">
+            <a:fld id="{16B09458-7AEF-4AD3-A567-0F11380064BE}" type="slidenum">
               <a:rPr lang="en-US" smtClean="0"/>
               <a:t>34</a:t>
             </a:fld>
@@ -3287,7 +3267,7 @@
     </p:spTree>
     <p:extLst>
       <p:ext uri="{BB962C8B-B14F-4D97-AF65-F5344CB8AC3E}">
-        <p14:creationId xmlns:p14="http://schemas.microsoft.com/office/powerpoint/2010/main" val="307923882"/>
+        <p14:creationId xmlns:p14="http://schemas.microsoft.com/office/powerpoint/2010/main" val="2595555429"/>
       </p:ext>
     </p:extLst>
   </p:cSld>
@@ -3341,7 +3321,11 @@
           <a:bodyPr/>
           <a:lstStyle/>
           <a:p>
-            <a:endParaRPr lang="en-US" dirty="0"/>
+            <a:pPr lvl="1"/>
+            <a:r>
+              <a:rPr lang="en-US" dirty="0"/>
+              <a:t>So in summary this talk was about two main ideas: (1) a query language for network performance monitoring that is designed to capture a variety of new and old network monitoring use cases and (2) a hardware design that supports this query language at high speeds. The full paper and supporting code are available at this web site, and I am happy to take questions.</a:t>
+            </a:r>
           </a:p>
         </p:txBody>
       </p:sp>
@@ -3360,7 +3344,7 @@
           <a:bodyPr/>
           <a:lstStyle/>
           <a:p>
-            <a:fld id="{16B09458-7AEF-4AD3-A567-0F11380064BE}" type="slidenum">
+            <a:fld id="{33793ACE-A489-1C41-B163-D1FF0130F898}" type="slidenum">
               <a:rPr lang="en-US" smtClean="0"/>
               <a:t>35</a:t>
             </a:fld>
@@ -3371,7 +3355,7 @@
     </p:spTree>
     <p:extLst>
       <p:ext uri="{BB962C8B-B14F-4D97-AF65-F5344CB8AC3E}">
-        <p14:creationId xmlns:p14="http://schemas.microsoft.com/office/powerpoint/2010/main" val="2595555429"/>
+        <p14:creationId xmlns:p14="http://schemas.microsoft.com/office/powerpoint/2010/main" val="1117120813"/>
       </p:ext>
     </p:extLst>
   </p:cSld>
@@ -3425,10 +3409,26 @@
           <a:bodyPr/>
           <a:lstStyle/>
           <a:p>
-            <a:pPr lvl="1"/>
+            <a:pPr marL="0" marR="0" lvl="0" indent="0" algn="l" defTabSz="914400" rtl="0" eaLnBrk="1" fontAlgn="auto" latinLnBrk="0" hangingPunct="1">
+              <a:lnSpc>
+                <a:spcPct val="100000"/>
+              </a:lnSpc>
+              <a:spcBef>
+                <a:spcPts val="0"/>
+              </a:spcBef>
+              <a:spcAft>
+                <a:spcPts val="0"/>
+              </a:spcAft>
+              <a:buClrTx/>
+              <a:buSzTx/>
+              <a:buFontTx/>
+              <a:buNone/>
+              <a:tabLst/>
+              <a:defRPr/>
+            </a:pPr>
             <a:r>
               <a:rPr lang="en-US" dirty="0"/>
-              <a:t>So in summary this talk was about two main ideas: (1) a query language for network performance monitoring that is designed to capture a variety of new and old network monitoring use cases and (2) a hardware design that supports this query language at high speeds. The full paper and supporting code are available at this web site, and I am happy to take questions.</a:t>
+              <a:t>Finally, I’ll talk about some evaluation results. Our main question is how much benefit the cache brings us in terms of reducing the number of key-value-store pairs that are sent to the backing store.</a:t>
             </a:r>
           </a:p>
         </p:txBody>
@@ -3459,7 +3459,7 @@
     </p:spTree>
     <p:extLst>
       <p:ext uri="{BB962C8B-B14F-4D97-AF65-F5344CB8AC3E}">
-        <p14:creationId xmlns:p14="http://schemas.microsoft.com/office/powerpoint/2010/main" val="1117120813"/>
+        <p14:creationId xmlns:p14="http://schemas.microsoft.com/office/powerpoint/2010/main" val="1582905122"/>
       </p:ext>
     </p:extLst>
   </p:cSld>
@@ -3513,26 +3513,34 @@
           <a:bodyPr/>
           <a:lstStyle/>
           <a:p>
-            <a:pPr marL="0" marR="0" lvl="0" indent="0" algn="l" defTabSz="914400" rtl="0" eaLnBrk="1" fontAlgn="auto" latinLnBrk="0" hangingPunct="1">
-              <a:lnSpc>
-                <a:spcPct val="100000"/>
-              </a:lnSpc>
-              <a:spcBef>
-                <a:spcPts val="0"/>
-              </a:spcBef>
-              <a:spcAft>
-                <a:spcPts val="0"/>
-              </a:spcAft>
-              <a:buClrTx/>
-              <a:buSzTx/>
-              <a:buFontTx/>
-              <a:buNone/>
-              <a:tabLst/>
-              <a:defRPr/>
-            </a:pPr>
             <a:r>
               <a:rPr lang="en-US" dirty="0"/>
-              <a:t>Finally, I’ll talk about some evaluation results. Our main question is how much benefit the cache brings us in terms of reducing the number of key-value-store pairs that are sent to the backing store.</a:t>
+              <a:t>Here are some relevant experimental setup details for our evaluation of the cache eviction rate. We used trace-based evaluation to evaluate the eviction rate using a core router and a data center trace. Our query was a </a:t>
+            </a:r>
+            <a:r>
+              <a:rPr lang="en-US" dirty="0" err="1"/>
+              <a:t>groupby</a:t>
+            </a:r>
+            <a:r>
+              <a:rPr lang="en-US" dirty="0"/>
+              <a:t> that partitioned by 5-tuple. The caching eviction policy was 8-way LRU similar to many processor caches simply because it is easy to implement.</a:t>
+            </a:r>
+          </a:p>
+          <a:p>
+            <a:endParaRPr lang="en-US" dirty="0"/>
+          </a:p>
+          <a:p>
+            <a:r>
+              <a:rPr lang="en-US" dirty="0"/>
+              <a:t>We first measure the eviction ratio because this doesn’t depend on the packet rate or the size of keys and values. We then translate this into a concrete eviction rate for some specific packet rates and </a:t>
+            </a:r>
+            <a:r>
+              <a:rPr lang="en-US" dirty="0" err="1"/>
+              <a:t>key+value</a:t>
+            </a:r>
+            <a:r>
+              <a:rPr lang="en-US" dirty="0"/>
+              <a:t> sizes.</a:t>
             </a:r>
           </a:p>
         </p:txBody>
@@ -3563,7 +3571,7 @@
     </p:spTree>
     <p:extLst>
       <p:ext uri="{BB962C8B-B14F-4D97-AF65-F5344CB8AC3E}">
-        <p14:creationId xmlns:p14="http://schemas.microsoft.com/office/powerpoint/2010/main" val="1582905122"/>
+        <p14:creationId xmlns:p14="http://schemas.microsoft.com/office/powerpoint/2010/main" val="4269550850"/>
       </p:ext>
     </p:extLst>
   </p:cSld>
@@ -3619,32 +3627,7 @@
           <a:p>
             <a:r>
               <a:rPr lang="en-US" dirty="0"/>
-              <a:t>Here are some relevant experimental setup details for our evaluation of the cache eviction rate. We used trace-based evaluation to evaluate the eviction rate using a core router and a data center trace. Our query was a </a:t>
-            </a:r>
-            <a:r>
-              <a:rPr lang="en-US" dirty="0" err="1"/>
-              <a:t>groupby</a:t>
-            </a:r>
-            <a:r>
-              <a:rPr lang="en-US" dirty="0"/>
-              <a:t> that partitioned by 5-tuple. The caching eviction policy was 8-way LRU similar to many processor caches simply because it is easy to implement.</a:t>
-            </a:r>
-          </a:p>
-          <a:p>
-            <a:endParaRPr lang="en-US" dirty="0"/>
-          </a:p>
-          <a:p>
-            <a:r>
-              <a:rPr lang="en-US" dirty="0"/>
-              <a:t>We first measure the eviction ratio because this doesn’t depend on the packet rate or the size of keys and values. We then translate this into a concrete eviction rate for some specific packet rates and </a:t>
-            </a:r>
-            <a:r>
-              <a:rPr lang="en-US" dirty="0" err="1"/>
-              <a:t>key+value</a:t>
-            </a:r>
-            <a:r>
-              <a:rPr lang="en-US" dirty="0"/>
-              <a:t> sizes.</a:t>
+              <a:t>So here’s the result. As expected, the eviction ratio goes down as the number of cache slots increases. One other interesting takeaway is that a dc environment has much more locality allowing us to get away with a much smaller size cache.</a:t>
             </a:r>
           </a:p>
         </p:txBody>
@@ -3675,7 +3658,7 @@
     </p:spTree>
     <p:extLst>
       <p:ext uri="{BB962C8B-B14F-4D97-AF65-F5344CB8AC3E}">
-        <p14:creationId xmlns:p14="http://schemas.microsoft.com/office/powerpoint/2010/main" val="4269550850"/>
+        <p14:creationId xmlns:p14="http://schemas.microsoft.com/office/powerpoint/2010/main" val="3299793430"/>
       </p:ext>
     </p:extLst>
   </p:cSld>
@@ -3731,7 +3714,15 @@
           <a:p>
             <a:r>
               <a:rPr lang="en-US" dirty="0"/>
-              <a:t>So here’s the result. As expected, the eviction ratio goes down as the number of cache slots increases. One other interesting takeaway is that a dc environment has much more locality allowing us to get away with a much smaller size cache.</a:t>
+              <a:t>Now, let’s translate this into a concrete number. Let’s pick 2**18 keys. Assuming a combined key and value size of 256 bits, that corresponds to 64 </a:t>
+            </a:r>
+            <a:r>
+              <a:rPr lang="en-US" dirty="0" err="1"/>
+              <a:t>Mbits</a:t>
+            </a:r>
+            <a:r>
+              <a:rPr lang="en-US" dirty="0"/>
+              <a:t>. That’s a 4% packet eviction ratio, which means it’s 25X smaller than processing every packet at a collection server directly.</a:t>
             </a:r>
           </a:p>
         </p:txBody>
@@ -3762,7 +3753,7 @@
     </p:spTree>
     <p:extLst>
       <p:ext uri="{BB962C8B-B14F-4D97-AF65-F5344CB8AC3E}">
-        <p14:creationId xmlns:p14="http://schemas.microsoft.com/office/powerpoint/2010/main" val="3299793430"/>
+        <p14:creationId xmlns:p14="http://schemas.microsoft.com/office/powerpoint/2010/main" val="2642239952"/>
       </p:ext>
     </p:extLst>
   </p:cSld>
@@ -3818,7 +3809,7 @@
           <a:p>
             <a:r>
               <a:rPr lang="en-US" dirty="0"/>
-              <a:t>Now, let’s translate this into a concrete number. Let’s pick 2**18 keys. Assuming a combined key and value size of 256 bits, that corresponds to 64 </a:t>
+              <a:t>TO put this into context. For a 64-poort 100-Gbits/switch, if we assume 2**20 slots, that’s a memory requirement of 256 </a:t>
             </a:r>
             <a:r>
               <a:rPr lang="en-US" dirty="0" err="1"/>
@@ -3826,7 +3817,7 @@
             </a:r>
             <a:r>
               <a:rPr lang="en-US" dirty="0"/>
-              <a:t>. That’s a 4% packet eviction ratio, which means it’s 25X smaller than processing every packet at a collection server directly.</a:t>
+              <a:t>, which is about 7.5% of the switching chip’s area. Assuming typical traffic patterns for this switch, this translates into an eviction rate of 8M records every second, which we estimate can be handled by a 32-core server. So the way to think about this is that we can service the eviction rate for a 64 server cluster connected to a TOR switch by using a single 32-core server for typical workloads. This is a simplified summary of the results. The paper has many more details on this.</a:t>
             </a:r>
           </a:p>
         </p:txBody>
@@ -3857,7 +3848,7 @@
     </p:spTree>
     <p:extLst>
       <p:ext uri="{BB962C8B-B14F-4D97-AF65-F5344CB8AC3E}">
-        <p14:creationId xmlns:p14="http://schemas.microsoft.com/office/powerpoint/2010/main" val="2642239952"/>
+        <p14:creationId xmlns:p14="http://schemas.microsoft.com/office/powerpoint/2010/main" val="1066101504"/>
       </p:ext>
     </p:extLst>
   </p:cSld>
@@ -3945,101 +3936,6 @@
     <p:extLst>
       <p:ext uri="{BB962C8B-B14F-4D97-AF65-F5344CB8AC3E}">
         <p14:creationId xmlns:p14="http://schemas.microsoft.com/office/powerpoint/2010/main" val="1638931893"/>
-      </p:ext>
-    </p:extLst>
-  </p:cSld>
-  <p:clrMapOvr>
-    <a:masterClrMapping/>
-  </p:clrMapOvr>
-</p:notes>
-</file>
-
-<file path=ppt/notesSlides/notesSlide40.xml><?xml version="1.0" encoding="utf-8"?>
-<p:notes xmlns:a="http://schemas.openxmlformats.org/drawingml/2006/main" xmlns:r="http://schemas.openxmlformats.org/officeDocument/2006/relationships" xmlns:p="http://schemas.openxmlformats.org/presentationml/2006/main">
-  <p:cSld>
-    <p:spTree>
-      <p:nvGrpSpPr>
-        <p:cNvPr id="1" name=""/>
-        <p:cNvGrpSpPr/>
-        <p:nvPr/>
-      </p:nvGrpSpPr>
-      <p:grpSpPr>
-        <a:xfrm>
-          <a:off x="0" y="0"/>
-          <a:ext cx="0" cy="0"/>
-          <a:chOff x="0" y="0"/>
-          <a:chExt cx="0" cy="0"/>
-        </a:xfrm>
-      </p:grpSpPr>
-      <p:sp>
-        <p:nvSpPr>
-          <p:cNvPr id="2" name="Slide Image Placeholder 1"/>
-          <p:cNvSpPr>
-            <a:spLocks noGrp="1" noRot="1" noChangeAspect="1"/>
-          </p:cNvSpPr>
-          <p:nvPr>
-            <p:ph type="sldImg"/>
-          </p:nvPr>
-        </p:nvSpPr>
-        <p:spPr/>
-      </p:sp>
-      <p:sp>
-        <p:nvSpPr>
-          <p:cNvPr id="3" name="Notes Placeholder 2"/>
-          <p:cNvSpPr>
-            <a:spLocks noGrp="1"/>
-          </p:cNvSpPr>
-          <p:nvPr>
-            <p:ph type="body" idx="1"/>
-          </p:nvPr>
-        </p:nvSpPr>
-        <p:spPr/>
-        <p:txBody>
-          <a:bodyPr/>
-          <a:lstStyle/>
-          <a:p>
-            <a:r>
-              <a:rPr lang="en-US" dirty="0"/>
-              <a:t>TO put this into context. For a 64-poort 100-Gbits/switch, if we assume 2**20 slots, that’s a memory requirement of 256 </a:t>
-            </a:r>
-            <a:r>
-              <a:rPr lang="en-US" dirty="0" err="1"/>
-              <a:t>Mbits</a:t>
-            </a:r>
-            <a:r>
-              <a:rPr lang="en-US" dirty="0"/>
-              <a:t>, which is about 7.5% of the switching chip’s area. Assuming typical traffic patterns for this switch, this translates into an eviction rate of 8M records every second, which we estimate can be handled by a 32-core server. So the way to think about this is that we can service the eviction rate for a 64 server cluster connected to a TOR switch by using a single 32-core server for typical workloads. This is a simplified summary of the results. The paper has many more details on this.</a:t>
-            </a:r>
-          </a:p>
-        </p:txBody>
-      </p:sp>
-      <p:sp>
-        <p:nvSpPr>
-          <p:cNvPr id="4" name="Slide Number Placeholder 3"/>
-          <p:cNvSpPr>
-            <a:spLocks noGrp="1"/>
-          </p:cNvSpPr>
-          <p:nvPr>
-            <p:ph type="sldNum" sz="quarter" idx="10"/>
-          </p:nvPr>
-        </p:nvSpPr>
-        <p:spPr/>
-        <p:txBody>
-          <a:bodyPr/>
-          <a:lstStyle/>
-          <a:p>
-            <a:fld id="{33793ACE-A489-1C41-B163-D1FF0130F898}" type="slidenum">
-              <a:rPr lang="en-US" smtClean="0"/>
-              <a:t>41</a:t>
-            </a:fld>
-            <a:endParaRPr lang="en-US"/>
-          </a:p>
-        </p:txBody>
-      </p:sp>
-    </p:spTree>
-    <p:extLst>
-      <p:ext uri="{BB962C8B-B14F-4D97-AF65-F5344CB8AC3E}">
-        <p14:creationId xmlns:p14="http://schemas.microsoft.com/office/powerpoint/2010/main" val="1066101504"/>
       </p:ext>
     </p:extLst>
   </p:cSld>
@@ -10679,6 +10575,215 @@
           </a:p>
         </p:txBody>
       </p:sp>
+      <p:sp>
+        <p:nvSpPr>
+          <p:cNvPr id="19" name="Oval 18">
+            <a:extLst>
+              <a:ext uri="{FF2B5EF4-FFF2-40B4-BE49-F238E27FC236}">
+                <a16:creationId xmlns:a16="http://schemas.microsoft.com/office/drawing/2014/main" id="{54A18775-B0F0-F743-B351-5195A239B725}"/>
+              </a:ext>
+            </a:extLst>
+          </p:cNvPr>
+          <p:cNvSpPr/>
+          <p:nvPr/>
+        </p:nvSpPr>
+        <p:spPr>
+          <a:xfrm>
+            <a:off x="2426711" y="1579640"/>
+            <a:ext cx="3807181" cy="1210870"/>
+          </a:xfrm>
+          <a:prstGeom prst="ellipse">
+            <a:avLst/>
+          </a:prstGeom>
+          <a:noFill/>
+          <a:ln w="50800">
+            <a:solidFill>
+              <a:srgbClr val="A31E34"/>
+            </a:solidFill>
+          </a:ln>
+        </p:spPr>
+        <p:style>
+          <a:lnRef idx="2">
+            <a:schemeClr val="accent1">
+              <a:shade val="50000"/>
+            </a:schemeClr>
+          </a:lnRef>
+          <a:fillRef idx="1">
+            <a:schemeClr val="accent1"/>
+          </a:fillRef>
+          <a:effectRef idx="0">
+            <a:schemeClr val="accent1"/>
+          </a:effectRef>
+          <a:fontRef idx="minor">
+            <a:schemeClr val="lt1"/>
+          </a:fontRef>
+        </p:style>
+        <p:txBody>
+          <a:bodyPr rtlCol="0" anchor="ctr"/>
+          <a:lstStyle/>
+          <a:p>
+            <a:pPr algn="ctr"/>
+            <a:endParaRPr lang="en-US"/>
+          </a:p>
+        </p:txBody>
+      </p:sp>
+      <p:sp>
+        <p:nvSpPr>
+          <p:cNvPr id="21" name="TextBox 20">
+            <a:extLst>
+              <a:ext uri="{FF2B5EF4-FFF2-40B4-BE49-F238E27FC236}">
+                <a16:creationId xmlns:a16="http://schemas.microsoft.com/office/drawing/2014/main" id="{F5C4F86C-2166-2047-8CA3-69175F54D6E4}"/>
+              </a:ext>
+            </a:extLst>
+          </p:cNvPr>
+          <p:cNvSpPr txBox="1"/>
+          <p:nvPr/>
+        </p:nvSpPr>
+        <p:spPr>
+          <a:xfrm>
+            <a:off x="1509067" y="2810516"/>
+            <a:ext cx="3504464" cy="523220"/>
+          </a:xfrm>
+          <a:prstGeom prst="rect">
+            <a:avLst/>
+          </a:prstGeom>
+          <a:noFill/>
+        </p:spPr>
+        <p:txBody>
+          <a:bodyPr wrap="square" rtlCol="0">
+            <a:spAutoFit/>
+          </a:bodyPr>
+          <a:lstStyle/>
+          <a:p>
+            <a:pPr algn="ctr"/>
+            <a:r>
+              <a:rPr lang="en-US" sz="2800" dirty="0"/>
+              <a:t>Part of the packet</a:t>
+            </a:r>
+            <a:endParaRPr lang="en-US" sz="2000" dirty="0"/>
+          </a:p>
+        </p:txBody>
+      </p:sp>
+      <p:grpSp>
+        <p:nvGrpSpPr>
+          <p:cNvPr id="3" name="Group 2">
+            <a:extLst>
+              <a:ext uri="{FF2B5EF4-FFF2-40B4-BE49-F238E27FC236}">
+                <a16:creationId xmlns:a16="http://schemas.microsoft.com/office/drawing/2014/main" id="{AAEC4E06-A858-DD4C-9964-584651BF6D5E}"/>
+              </a:ext>
+            </a:extLst>
+          </p:cNvPr>
+          <p:cNvGrpSpPr/>
+          <p:nvPr/>
+        </p:nvGrpSpPr>
+        <p:grpSpPr>
+          <a:xfrm>
+            <a:off x="8192350" y="4343860"/>
+            <a:ext cx="2348759" cy="874596"/>
+            <a:chOff x="8328421" y="4482054"/>
+            <a:chExt cx="2348759" cy="874596"/>
+          </a:xfrm>
+        </p:grpSpPr>
+        <p:sp>
+          <p:nvSpPr>
+            <p:cNvPr id="26" name="Rounded Rectangle 25">
+              <a:extLst>
+                <a:ext uri="{FF2B5EF4-FFF2-40B4-BE49-F238E27FC236}">
+                  <a16:creationId xmlns:a16="http://schemas.microsoft.com/office/drawing/2014/main" id="{43D20B74-91DC-5A4B-BD31-9924A0720549}"/>
+                </a:ext>
+              </a:extLst>
+            </p:cNvPr>
+            <p:cNvSpPr/>
+            <p:nvPr/>
+          </p:nvSpPr>
+          <p:spPr>
+            <a:xfrm>
+              <a:off x="8328421" y="4482054"/>
+              <a:ext cx="2348759" cy="874596"/>
+            </a:xfrm>
+            <a:prstGeom prst="roundRect">
+              <a:avLst/>
+            </a:prstGeom>
+            <a:solidFill>
+              <a:srgbClr val="A31E34"/>
+            </a:solidFill>
+            <a:ln w="50800">
+              <a:solidFill>
+                <a:srgbClr val="A31E34"/>
+              </a:solidFill>
+            </a:ln>
+          </p:spPr>
+          <p:style>
+            <a:lnRef idx="2">
+              <a:schemeClr val="accent1">
+                <a:shade val="50000"/>
+              </a:schemeClr>
+            </a:lnRef>
+            <a:fillRef idx="1">
+              <a:schemeClr val="accent1"/>
+            </a:fillRef>
+            <a:effectRef idx="0">
+              <a:schemeClr val="accent1"/>
+            </a:effectRef>
+            <a:fontRef idx="minor">
+              <a:schemeClr val="lt1"/>
+            </a:fontRef>
+          </p:style>
+          <p:txBody>
+            <a:bodyPr rtlCol="0" anchor="ctr"/>
+            <a:lstStyle/>
+            <a:p>
+              <a:pPr algn="ctr"/>
+              <a:endParaRPr lang="en-US"/>
+            </a:p>
+          </p:txBody>
+        </p:sp>
+        <p:sp>
+          <p:nvSpPr>
+            <p:cNvPr id="27" name="TextBox 26">
+              <a:extLst>
+                <a:ext uri="{FF2B5EF4-FFF2-40B4-BE49-F238E27FC236}">
+                  <a16:creationId xmlns:a16="http://schemas.microsoft.com/office/drawing/2014/main" id="{F34A5DD6-C41D-3745-9446-CD76BA64ED20}"/>
+                </a:ext>
+              </a:extLst>
+            </p:cNvPr>
+            <p:cNvSpPr txBox="1"/>
+            <p:nvPr/>
+          </p:nvSpPr>
+          <p:spPr>
+            <a:xfrm>
+              <a:off x="8489622" y="4638444"/>
+              <a:ext cx="2026355" cy="584775"/>
+            </a:xfrm>
+            <a:prstGeom prst="rect">
+              <a:avLst/>
+            </a:prstGeom>
+            <a:noFill/>
+          </p:spPr>
+          <p:txBody>
+            <a:bodyPr wrap="square" rtlCol="0">
+              <a:spAutoFit/>
+            </a:bodyPr>
+            <a:lstStyle/>
+            <a:p>
+              <a:pPr algn="ctr"/>
+              <a:r>
+                <a:rPr lang="en-US" sz="3200" dirty="0" err="1">
+                  <a:solidFill>
+                    <a:schemeClr val="bg1"/>
+                  </a:solidFill>
+                </a:rPr>
+                <a:t>groupby</a:t>
+              </a:r>
+              <a:endParaRPr lang="en-US" sz="3200" dirty="0">
+                <a:solidFill>
+                  <a:schemeClr val="bg1"/>
+                </a:solidFill>
+              </a:endParaRPr>
+            </a:p>
+          </p:txBody>
+        </p:sp>
+      </p:grpSp>
     </p:spTree>
     <p:custDataLst>
       <p:tags r:id="rId1"/>
@@ -10721,7 +10826,7 @@
                             </p:stCondLst>
                             <p:childTnLst>
                               <p:par>
-                                <p:cTn id="5" presetID="1" presetClass="entr" presetSubtype="0" fill="hold" grpId="0" nodeType="clickEffect">
+                                <p:cTn id="5" presetID="1" presetClass="entr" presetSubtype="0" fill="hold" grpId="1" nodeType="clickEffect">
                                   <p:stCondLst>
                                     <p:cond delay="0"/>
                                   </p:stCondLst>
@@ -10734,7 +10839,7 @@
                                           </p:stCondLst>
                                         </p:cTn>
                                         <p:tgtEl>
-                                          <p:spTgt spid="18"/>
+                                          <p:spTgt spid="19"/>
                                         </p:tgtEl>
                                         <p:attrNameLst>
                                           <p:attrName>style.visibility</p:attrName>
@@ -10761,7 +10866,7 @@
                                           </p:stCondLst>
                                         </p:cTn>
                                         <p:tgtEl>
-                                          <p:spTgt spid="20"/>
+                                          <p:spTgt spid="21"/>
                                         </p:tgtEl>
                                         <p:attrNameLst>
                                           <p:attrName>style.visibility</p:attrName>
@@ -10806,7 +10911,7 @@
                                           </p:stCondLst>
                                         </p:cTn>
                                         <p:tgtEl>
-                                          <p:spTgt spid="14"/>
+                                          <p:spTgt spid="18"/>
                                         </p:tgtEl>
                                         <p:attrNameLst>
                                           <p:attrName>style.visibility</p:attrName>
@@ -10833,7 +10938,124 @@
                                           </p:stCondLst>
                                         </p:cTn>
                                         <p:tgtEl>
+                                          <p:spTgt spid="20"/>
+                                        </p:tgtEl>
+                                        <p:attrNameLst>
+                                          <p:attrName>style.visibility</p:attrName>
+                                        </p:attrNameLst>
+                                      </p:cBhvr>
+                                      <p:to>
+                                        <p:strVal val="visible"/>
+                                      </p:to>
+                                    </p:set>
+                                  </p:childTnLst>
+                                </p:cTn>
+                              </p:par>
+                            </p:childTnLst>
+                          </p:cTn>
+                        </p:par>
+                      </p:childTnLst>
+                    </p:cTn>
+                  </p:par>
+                  <p:par>
+                    <p:cTn id="15" fill="hold">
+                      <p:stCondLst>
+                        <p:cond delay="indefinite"/>
+                      </p:stCondLst>
+                      <p:childTnLst>
+                        <p:par>
+                          <p:cTn id="16" fill="hold">
+                            <p:stCondLst>
+                              <p:cond delay="0"/>
+                            </p:stCondLst>
+                            <p:childTnLst>
+                              <p:par>
+                                <p:cTn id="17" presetID="1" presetClass="entr" presetSubtype="0" fill="hold" grpId="0" nodeType="clickEffect">
+                                  <p:stCondLst>
+                                    <p:cond delay="0"/>
+                                  </p:stCondLst>
+                                  <p:childTnLst>
+                                    <p:set>
+                                      <p:cBhvr>
+                                        <p:cTn id="18" dur="1" fill="hold">
+                                          <p:stCondLst>
+                                            <p:cond delay="0"/>
+                                          </p:stCondLst>
+                                        </p:cTn>
+                                        <p:tgtEl>
+                                          <p:spTgt spid="14"/>
+                                        </p:tgtEl>
+                                        <p:attrNameLst>
+                                          <p:attrName>style.visibility</p:attrName>
+                                        </p:attrNameLst>
+                                      </p:cBhvr>
+                                      <p:to>
+                                        <p:strVal val="visible"/>
+                                      </p:to>
+                                    </p:set>
+                                  </p:childTnLst>
+                                </p:cTn>
+                              </p:par>
+                              <p:par>
+                                <p:cTn id="19" presetID="1" presetClass="entr" presetSubtype="0" fill="hold" grpId="0" nodeType="withEffect">
+                                  <p:stCondLst>
+                                    <p:cond delay="0"/>
+                                  </p:stCondLst>
+                                  <p:childTnLst>
+                                    <p:set>
+                                      <p:cBhvr>
+                                        <p:cTn id="20" dur="1" fill="hold">
+                                          <p:stCondLst>
+                                            <p:cond delay="0"/>
+                                          </p:stCondLst>
+                                        </p:cTn>
+                                        <p:tgtEl>
                                           <p:spTgt spid="15"/>
+                                        </p:tgtEl>
+                                        <p:attrNameLst>
+                                          <p:attrName>style.visibility</p:attrName>
+                                        </p:attrNameLst>
+                                      </p:cBhvr>
+                                      <p:to>
+                                        <p:strVal val="visible"/>
+                                      </p:to>
+                                    </p:set>
+                                  </p:childTnLst>
+                                </p:cTn>
+                              </p:par>
+                            </p:childTnLst>
+                          </p:cTn>
+                        </p:par>
+                      </p:childTnLst>
+                    </p:cTn>
+                  </p:par>
+                  <p:par>
+                    <p:cTn id="21" fill="hold">
+                      <p:stCondLst>
+                        <p:cond delay="indefinite"/>
+                      </p:stCondLst>
+                      <p:childTnLst>
+                        <p:par>
+                          <p:cTn id="22" fill="hold">
+                            <p:stCondLst>
+                              <p:cond delay="0"/>
+                            </p:stCondLst>
+                            <p:childTnLst>
+                              <p:par>
+                                <p:cTn id="23" presetID="1" presetClass="entr" presetSubtype="0" fill="hold" nodeType="clickEffect">
+                                  <p:stCondLst>
+                                    <p:cond delay="0"/>
+                                  </p:stCondLst>
+                                  <p:childTnLst>
+                                    <p:set>
+                                      <p:cBhvr>
+                                        <p:cTn id="24" dur="1" fill="hold">
+                                          <p:stCondLst>
+                                            <p:cond delay="0"/>
+                                          </p:stCondLst>
+                                        </p:cTn>
+                                        <p:tgtEl>
+                                          <p:spTgt spid="3"/>
                                         </p:tgtEl>
                                         <p:attrNameLst>
                                           <p:attrName>style.visibility</p:attrName>
@@ -10878,738 +11100,14 @@
       <p:bldP spid="15" grpId="0"/>
       <p:bldP spid="18" grpId="0" animBg="1"/>
       <p:bldP spid="20" grpId="0"/>
+      <p:bldP spid="19" grpId="1" animBg="1"/>
+      <p:bldP spid="21" grpId="0"/>
     </p:bldLst>
   </p:timing>
 </p:sld>
 </file>
 
 <file path=ppt/slides/slide17.xml><?xml version="1.0" encoding="utf-8"?>
-<p:sld xmlns:a="http://schemas.openxmlformats.org/drawingml/2006/main" xmlns:r="http://schemas.openxmlformats.org/officeDocument/2006/relationships" xmlns:p="http://schemas.openxmlformats.org/presentationml/2006/main">
-  <p:cSld>
-    <p:spTree>
-      <p:nvGrpSpPr>
-        <p:cNvPr id="1" name=""/>
-        <p:cNvGrpSpPr/>
-        <p:nvPr/>
-      </p:nvGrpSpPr>
-      <p:grpSpPr>
-        <a:xfrm>
-          <a:off x="0" y="0"/>
-          <a:ext cx="0" cy="0"/>
-          <a:chOff x="0" y="0"/>
-          <a:chExt cx="0" cy="0"/>
-        </a:xfrm>
-      </p:grpSpPr>
-      <p:sp>
-        <p:nvSpPr>
-          <p:cNvPr id="5" name="Rounded Rectangle 4"/>
-          <p:cNvSpPr/>
-          <p:nvPr/>
-        </p:nvSpPr>
-        <p:spPr>
-          <a:xfrm>
-            <a:off x="1930063" y="4329654"/>
-            <a:ext cx="1958458" cy="874596"/>
-          </a:xfrm>
-          <a:prstGeom prst="roundRect">
-            <a:avLst/>
-          </a:prstGeom>
-          <a:noFill/>
-          <a:ln w="50800">
-            <a:solidFill>
-              <a:srgbClr val="A31E34"/>
-            </a:solidFill>
-          </a:ln>
-        </p:spPr>
-        <p:style>
-          <a:lnRef idx="2">
-            <a:schemeClr val="accent1">
-              <a:shade val="50000"/>
-            </a:schemeClr>
-          </a:lnRef>
-          <a:fillRef idx="1">
-            <a:schemeClr val="accent1"/>
-          </a:fillRef>
-          <a:effectRef idx="0">
-            <a:schemeClr val="accent1"/>
-          </a:effectRef>
-          <a:fontRef idx="minor">
-            <a:schemeClr val="lt1"/>
-          </a:fontRef>
-        </p:style>
-        <p:txBody>
-          <a:bodyPr rtlCol="0" anchor="ctr"/>
-          <a:lstStyle/>
-          <a:p>
-            <a:pPr algn="ctr"/>
-            <a:endParaRPr lang="en-US"/>
-          </a:p>
-        </p:txBody>
-      </p:sp>
-      <p:sp>
-        <p:nvSpPr>
-          <p:cNvPr id="6" name="TextBox 5"/>
-          <p:cNvSpPr txBox="1"/>
-          <p:nvPr/>
-        </p:nvSpPr>
-        <p:spPr>
-          <a:xfrm>
-            <a:off x="2064477" y="4486044"/>
-            <a:ext cx="1689629" cy="584775"/>
-          </a:xfrm>
-          <a:prstGeom prst="rect">
-            <a:avLst/>
-          </a:prstGeom>
-          <a:noFill/>
-        </p:spPr>
-        <p:txBody>
-          <a:bodyPr wrap="square" rtlCol="0">
-            <a:spAutoFit/>
-          </a:bodyPr>
-          <a:lstStyle/>
-          <a:p>
-            <a:pPr algn="ctr"/>
-            <a:r>
-              <a:rPr lang="en-US" sz="3200" dirty="0">
-                <a:solidFill>
-                  <a:srgbClr val="C00000"/>
-                </a:solidFill>
-              </a:rPr>
-              <a:t>filter</a:t>
-            </a:r>
-          </a:p>
-        </p:txBody>
-      </p:sp>
-      <p:sp>
-        <p:nvSpPr>
-          <p:cNvPr id="7" name="Rounded Rectangle 6"/>
-          <p:cNvSpPr/>
-          <p:nvPr/>
-        </p:nvSpPr>
-        <p:spPr>
-          <a:xfrm>
-            <a:off x="4022935" y="4336926"/>
-            <a:ext cx="1958458" cy="874596"/>
-          </a:xfrm>
-          <a:prstGeom prst="roundRect">
-            <a:avLst/>
-          </a:prstGeom>
-          <a:noFill/>
-          <a:ln w="50800">
-            <a:solidFill>
-              <a:srgbClr val="A31E34"/>
-            </a:solidFill>
-          </a:ln>
-        </p:spPr>
-        <p:style>
-          <a:lnRef idx="2">
-            <a:schemeClr val="accent1">
-              <a:shade val="50000"/>
-            </a:schemeClr>
-          </a:lnRef>
-          <a:fillRef idx="1">
-            <a:schemeClr val="accent1"/>
-          </a:fillRef>
-          <a:effectRef idx="0">
-            <a:schemeClr val="accent1"/>
-          </a:effectRef>
-          <a:fontRef idx="minor">
-            <a:schemeClr val="lt1"/>
-          </a:fontRef>
-        </p:style>
-        <p:txBody>
-          <a:bodyPr rtlCol="0" anchor="ctr"/>
-          <a:lstStyle/>
-          <a:p>
-            <a:pPr algn="ctr"/>
-            <a:endParaRPr lang="en-US"/>
-          </a:p>
-        </p:txBody>
-      </p:sp>
-      <p:sp>
-        <p:nvSpPr>
-          <p:cNvPr id="8" name="TextBox 7"/>
-          <p:cNvSpPr txBox="1"/>
-          <p:nvPr/>
-        </p:nvSpPr>
-        <p:spPr>
-          <a:xfrm>
-            <a:off x="4157349" y="4493316"/>
-            <a:ext cx="1689629" cy="584775"/>
-          </a:xfrm>
-          <a:prstGeom prst="rect">
-            <a:avLst/>
-          </a:prstGeom>
-          <a:noFill/>
-        </p:spPr>
-        <p:txBody>
-          <a:bodyPr wrap="square" rtlCol="0">
-            <a:spAutoFit/>
-          </a:bodyPr>
-          <a:lstStyle/>
-          <a:p>
-            <a:pPr algn="ctr"/>
-            <a:r>
-              <a:rPr lang="en-US" sz="3200" dirty="0">
-                <a:solidFill>
-                  <a:srgbClr val="C00000"/>
-                </a:solidFill>
-              </a:rPr>
-              <a:t>map</a:t>
-            </a:r>
-          </a:p>
-        </p:txBody>
-      </p:sp>
-      <p:sp>
-        <p:nvSpPr>
-          <p:cNvPr id="9" name="Rounded Rectangle 8"/>
-          <p:cNvSpPr/>
-          <p:nvPr/>
-        </p:nvSpPr>
-        <p:spPr>
-          <a:xfrm>
-            <a:off x="6099478" y="4332381"/>
-            <a:ext cx="1958458" cy="874596"/>
-          </a:xfrm>
-          <a:prstGeom prst="roundRect">
-            <a:avLst/>
-          </a:prstGeom>
-          <a:noFill/>
-          <a:ln w="50800">
-            <a:solidFill>
-              <a:srgbClr val="A31E34"/>
-            </a:solidFill>
-          </a:ln>
-        </p:spPr>
-        <p:style>
-          <a:lnRef idx="2">
-            <a:schemeClr val="accent1">
-              <a:shade val="50000"/>
-            </a:schemeClr>
-          </a:lnRef>
-          <a:fillRef idx="1">
-            <a:schemeClr val="accent1"/>
-          </a:fillRef>
-          <a:effectRef idx="0">
-            <a:schemeClr val="accent1"/>
-          </a:effectRef>
-          <a:fontRef idx="minor">
-            <a:schemeClr val="lt1"/>
-          </a:fontRef>
-        </p:style>
-        <p:txBody>
-          <a:bodyPr rtlCol="0" anchor="ctr"/>
-          <a:lstStyle/>
-          <a:p>
-            <a:pPr algn="ctr"/>
-            <a:endParaRPr lang="en-US"/>
-          </a:p>
-        </p:txBody>
-      </p:sp>
-      <p:sp>
-        <p:nvSpPr>
-          <p:cNvPr id="10" name="TextBox 9"/>
-          <p:cNvSpPr txBox="1"/>
-          <p:nvPr/>
-        </p:nvSpPr>
-        <p:spPr>
-          <a:xfrm>
-            <a:off x="6233892" y="4488771"/>
-            <a:ext cx="1689629" cy="584775"/>
-          </a:xfrm>
-          <a:prstGeom prst="rect">
-            <a:avLst/>
-          </a:prstGeom>
-          <a:noFill/>
-        </p:spPr>
-        <p:txBody>
-          <a:bodyPr wrap="square" rtlCol="0">
-            <a:spAutoFit/>
-          </a:bodyPr>
-          <a:lstStyle/>
-          <a:p>
-            <a:pPr algn="ctr"/>
-            <a:r>
-              <a:rPr lang="en-US" sz="3200" dirty="0">
-                <a:solidFill>
-                  <a:srgbClr val="C00000"/>
-                </a:solidFill>
-              </a:rPr>
-              <a:t>zip</a:t>
-            </a:r>
-          </a:p>
-        </p:txBody>
-      </p:sp>
-      <p:sp>
-        <p:nvSpPr>
-          <p:cNvPr id="11" name="Rounded Rectangle 10"/>
-          <p:cNvSpPr/>
-          <p:nvPr/>
-        </p:nvSpPr>
-        <p:spPr>
-          <a:xfrm>
-            <a:off x="8176021" y="4329654"/>
-            <a:ext cx="2348759" cy="874596"/>
-          </a:xfrm>
-          <a:prstGeom prst="roundRect">
-            <a:avLst/>
-          </a:prstGeom>
-          <a:solidFill>
-            <a:srgbClr val="A31E34"/>
-          </a:solidFill>
-          <a:ln w="50800">
-            <a:solidFill>
-              <a:srgbClr val="A31E34"/>
-            </a:solidFill>
-          </a:ln>
-        </p:spPr>
-        <p:style>
-          <a:lnRef idx="2">
-            <a:schemeClr val="accent1">
-              <a:shade val="50000"/>
-            </a:schemeClr>
-          </a:lnRef>
-          <a:fillRef idx="1">
-            <a:schemeClr val="accent1"/>
-          </a:fillRef>
-          <a:effectRef idx="0">
-            <a:schemeClr val="accent1"/>
-          </a:effectRef>
-          <a:fontRef idx="minor">
-            <a:schemeClr val="lt1"/>
-          </a:fontRef>
-        </p:style>
-        <p:txBody>
-          <a:bodyPr rtlCol="0" anchor="ctr"/>
-          <a:lstStyle/>
-          <a:p>
-            <a:pPr algn="ctr"/>
-            <a:endParaRPr lang="en-US"/>
-          </a:p>
-        </p:txBody>
-      </p:sp>
-      <p:sp>
-        <p:nvSpPr>
-          <p:cNvPr id="12" name="TextBox 11"/>
-          <p:cNvSpPr txBox="1"/>
-          <p:nvPr/>
-        </p:nvSpPr>
-        <p:spPr>
-          <a:xfrm>
-            <a:off x="8337222" y="4486044"/>
-            <a:ext cx="2026355" cy="584775"/>
-          </a:xfrm>
-          <a:prstGeom prst="rect">
-            <a:avLst/>
-          </a:prstGeom>
-          <a:noFill/>
-        </p:spPr>
-        <p:txBody>
-          <a:bodyPr wrap="square" rtlCol="0">
-            <a:spAutoFit/>
-          </a:bodyPr>
-          <a:lstStyle/>
-          <a:p>
-            <a:pPr algn="ctr"/>
-            <a:r>
-              <a:rPr lang="en-US" sz="3200" dirty="0" err="1">
-                <a:solidFill>
-                  <a:schemeClr val="bg1"/>
-                </a:solidFill>
-              </a:rPr>
-              <a:t>groupby</a:t>
-            </a:r>
-            <a:endParaRPr lang="en-US" sz="3200" dirty="0">
-              <a:solidFill>
-                <a:schemeClr val="bg1"/>
-              </a:solidFill>
-            </a:endParaRPr>
-          </a:p>
-        </p:txBody>
-      </p:sp>
-      <p:sp>
-        <p:nvSpPr>
-          <p:cNvPr id="13" name="Title 1"/>
-          <p:cNvSpPr>
-            <a:spLocks noGrp="1"/>
-          </p:cNvSpPr>
-          <p:nvPr>
-            <p:ph type="title"/>
-          </p:nvPr>
-        </p:nvSpPr>
-        <p:spPr>
-          <a:xfrm>
-            <a:off x="838200" y="365125"/>
-            <a:ext cx="10515600" cy="1325563"/>
-          </a:xfrm>
-        </p:spPr>
-        <p:txBody>
-          <a:bodyPr/>
-          <a:lstStyle/>
-          <a:p>
-            <a:r>
-              <a:rPr lang="en-US" dirty="0"/>
-              <a:t>Implementing Marple on switches</a:t>
-            </a:r>
-          </a:p>
-        </p:txBody>
-      </p:sp>
-      <p:sp>
-        <p:nvSpPr>
-          <p:cNvPr id="14" name="Right Brace 13"/>
-          <p:cNvSpPr/>
-          <p:nvPr/>
-        </p:nvSpPr>
-        <p:spPr>
-          <a:xfrm rot="5400000">
-            <a:off x="4687104" y="2510654"/>
-            <a:ext cx="613790" cy="6127873"/>
-          </a:xfrm>
-          <a:prstGeom prst="rightBrace">
-            <a:avLst/>
-          </a:prstGeom>
-          <a:ln w="44450">
-            <a:solidFill>
-              <a:schemeClr val="tx1"/>
-            </a:solidFill>
-          </a:ln>
-        </p:spPr>
-        <p:style>
-          <a:lnRef idx="1">
-            <a:schemeClr val="accent1"/>
-          </a:lnRef>
-          <a:fillRef idx="0">
-            <a:schemeClr val="accent1"/>
-          </a:fillRef>
-          <a:effectRef idx="0">
-            <a:schemeClr val="accent1"/>
-          </a:effectRef>
-          <a:fontRef idx="minor">
-            <a:schemeClr val="tx1"/>
-          </a:fontRef>
-        </p:style>
-        <p:txBody>
-          <a:bodyPr rtlCol="0" anchor="ctr"/>
-          <a:lstStyle/>
-          <a:p>
-            <a:pPr algn="ctr"/>
-            <a:endParaRPr lang="en-US"/>
-          </a:p>
-        </p:txBody>
-      </p:sp>
-      <p:sp>
-        <p:nvSpPr>
-          <p:cNvPr id="15" name="TextBox 14"/>
-          <p:cNvSpPr txBox="1"/>
-          <p:nvPr/>
-        </p:nvSpPr>
-        <p:spPr>
-          <a:xfrm>
-            <a:off x="1509067" y="5901493"/>
-            <a:ext cx="6969863" cy="1261884"/>
-          </a:xfrm>
-          <a:prstGeom prst="rect">
-            <a:avLst/>
-          </a:prstGeom>
-          <a:noFill/>
-        </p:spPr>
-        <p:txBody>
-          <a:bodyPr wrap="square" rtlCol="0">
-            <a:spAutoFit/>
-          </a:bodyPr>
-          <a:lstStyle/>
-          <a:p>
-            <a:pPr algn="ctr"/>
-            <a:r>
-              <a:rPr lang="en-US" sz="2800"/>
-              <a:t>Stateless match-action rules</a:t>
-            </a:r>
-            <a:endParaRPr lang="en-US" sz="2800" dirty="0"/>
-          </a:p>
-          <a:p>
-            <a:pPr algn="ctr"/>
-            <a:r>
-              <a:rPr lang="en-US" sz="2000" dirty="0"/>
-              <a:t>[RMT SIGCOMM’13]</a:t>
-            </a:r>
-          </a:p>
-          <a:p>
-            <a:pPr algn="ctr"/>
-            <a:endParaRPr lang="en-US" sz="2800" dirty="0"/>
-          </a:p>
-        </p:txBody>
-      </p:sp>
-      <p:sp>
-        <p:nvSpPr>
-          <p:cNvPr id="16" name="Rectangle 15"/>
-          <p:cNvSpPr/>
-          <p:nvPr/>
-        </p:nvSpPr>
-        <p:spPr>
-          <a:xfrm>
-            <a:off x="840521" y="1911089"/>
-            <a:ext cx="10513279" cy="523220"/>
-          </a:xfrm>
-          <a:prstGeom prst="rect">
-            <a:avLst/>
-          </a:prstGeom>
-        </p:spPr>
-        <p:txBody>
-          <a:bodyPr wrap="square">
-            <a:spAutoFit/>
-          </a:bodyPr>
-          <a:lstStyle/>
-          <a:p>
-            <a:pPr lvl="1" algn="ctr"/>
-            <a:r>
-              <a:rPr lang="en-US" sz="2800" dirty="0">
-                <a:latin typeface="Ayuthaya" charset="-34"/>
-                <a:ea typeface="Ayuthaya" charset="-34"/>
-                <a:cs typeface="Ayuthaya" charset="-34"/>
-              </a:rPr>
-              <a:t>S:= (switch, </a:t>
-            </a:r>
-            <a:r>
-              <a:rPr lang="en-US" sz="2800" dirty="0" err="1">
-                <a:latin typeface="Ayuthaya" charset="-34"/>
-                <a:ea typeface="Ayuthaya" charset="-34"/>
-                <a:cs typeface="Ayuthaya" charset="-34"/>
-              </a:rPr>
-              <a:t>hdrs</a:t>
-            </a:r>
-            <a:r>
-              <a:rPr lang="en-US" sz="2800" dirty="0">
-                <a:latin typeface="Ayuthaya" charset="-34"/>
-                <a:ea typeface="Ayuthaya" charset="-34"/>
-                <a:cs typeface="Ayuthaya" charset="-34"/>
-              </a:rPr>
-              <a:t>, </a:t>
-            </a:r>
-            <a:r>
-              <a:rPr lang="en-US" sz="2800" dirty="0" err="1">
-                <a:latin typeface="Ayuthaya" charset="-34"/>
-                <a:ea typeface="Ayuthaya" charset="-34"/>
-                <a:cs typeface="Ayuthaya" charset="-34"/>
-              </a:rPr>
-              <a:t>uid</a:t>
-            </a:r>
-            <a:r>
-              <a:rPr lang="en-US" sz="2800" dirty="0">
-                <a:latin typeface="Ayuthaya" charset="-34"/>
-                <a:ea typeface="Ayuthaya" charset="-34"/>
-                <a:cs typeface="Ayuthaya" charset="-34"/>
-              </a:rPr>
-              <a:t>, </a:t>
-            </a:r>
-            <a:r>
-              <a:rPr lang="en-US" sz="2800" dirty="0" err="1">
-                <a:latin typeface="Ayuthaya" charset="-34"/>
-                <a:ea typeface="Ayuthaya" charset="-34"/>
-                <a:cs typeface="Ayuthaya" charset="-34"/>
-              </a:rPr>
-              <a:t>qid</a:t>
-            </a:r>
-            <a:r>
-              <a:rPr lang="en-US" sz="2800" dirty="0">
-                <a:latin typeface="Ayuthaya" charset="-34"/>
-                <a:ea typeface="Ayuthaya" charset="-34"/>
-                <a:cs typeface="Ayuthaya" charset="-34"/>
-              </a:rPr>
-              <a:t>, tin, tout, </a:t>
-            </a:r>
-            <a:r>
-              <a:rPr lang="en-US" sz="2800" dirty="0" err="1">
-                <a:latin typeface="Ayuthaya" charset="-34"/>
-                <a:ea typeface="Ayuthaya" charset="-34"/>
-                <a:cs typeface="Ayuthaya" charset="-34"/>
-              </a:rPr>
-              <a:t>qsize</a:t>
-            </a:r>
-            <a:r>
-              <a:rPr lang="en-US" sz="2800" dirty="0">
-                <a:latin typeface="Ayuthaya" charset="-34"/>
-                <a:ea typeface="Ayuthaya" charset="-34"/>
-                <a:cs typeface="Ayuthaya" charset="-34"/>
-              </a:rPr>
-              <a:t>) </a:t>
-            </a:r>
-          </a:p>
-        </p:txBody>
-      </p:sp>
-      <p:sp>
-        <p:nvSpPr>
-          <p:cNvPr id="17" name="Down Arrow 16"/>
-          <p:cNvSpPr/>
-          <p:nvPr/>
-        </p:nvSpPr>
-        <p:spPr>
-          <a:xfrm>
-            <a:off x="5257434" y="2856190"/>
-            <a:ext cx="1716745" cy="1033175"/>
-          </a:xfrm>
-          <a:prstGeom prst="downArrow">
-            <a:avLst/>
-          </a:prstGeom>
-          <a:noFill/>
-          <a:ln w="63500">
-            <a:solidFill>
-              <a:schemeClr val="tx1"/>
-            </a:solidFill>
-          </a:ln>
-        </p:spPr>
-        <p:style>
-          <a:lnRef idx="2">
-            <a:schemeClr val="accent1">
-              <a:shade val="50000"/>
-            </a:schemeClr>
-          </a:lnRef>
-          <a:fillRef idx="1">
-            <a:schemeClr val="accent1"/>
-          </a:fillRef>
-          <a:effectRef idx="0">
-            <a:schemeClr val="accent1"/>
-          </a:effectRef>
-          <a:fontRef idx="minor">
-            <a:schemeClr val="lt1"/>
-          </a:fontRef>
-        </p:style>
-        <p:txBody>
-          <a:bodyPr rtlCol="0" anchor="ctr"/>
-          <a:lstStyle/>
-          <a:p>
-            <a:pPr algn="ctr"/>
-            <a:endParaRPr lang="en-US"/>
-          </a:p>
-        </p:txBody>
-      </p:sp>
-      <p:sp>
-        <p:nvSpPr>
-          <p:cNvPr id="20" name="TextBox 19"/>
-          <p:cNvSpPr txBox="1"/>
-          <p:nvPr/>
-        </p:nvSpPr>
-        <p:spPr>
-          <a:xfrm>
-            <a:off x="6936385" y="2787198"/>
-            <a:ext cx="5136793" cy="830997"/>
-          </a:xfrm>
-          <a:prstGeom prst="rect">
-            <a:avLst/>
-          </a:prstGeom>
-          <a:noFill/>
-        </p:spPr>
-        <p:txBody>
-          <a:bodyPr wrap="square" rtlCol="0">
-            <a:spAutoFit/>
-          </a:bodyPr>
-          <a:lstStyle/>
-          <a:p>
-            <a:pPr algn="ctr"/>
-            <a:r>
-              <a:rPr lang="en-US" sz="2800" dirty="0"/>
-              <a:t>Switch telemetry</a:t>
-            </a:r>
-          </a:p>
-          <a:p>
-            <a:pPr algn="ctr"/>
-            <a:r>
-              <a:rPr lang="en-US" sz="2000" dirty="0"/>
-              <a:t>[INT SOSR’15]</a:t>
-            </a:r>
-          </a:p>
-        </p:txBody>
-      </p:sp>
-      <p:sp>
-        <p:nvSpPr>
-          <p:cNvPr id="19" name="Oval 18"/>
-          <p:cNvSpPr/>
-          <p:nvPr/>
-        </p:nvSpPr>
-        <p:spPr>
-          <a:xfrm>
-            <a:off x="6233893" y="1582952"/>
-            <a:ext cx="5150904" cy="1210870"/>
-          </a:xfrm>
-          <a:prstGeom prst="ellipse">
-            <a:avLst/>
-          </a:prstGeom>
-          <a:noFill/>
-          <a:ln w="50800">
-            <a:solidFill>
-              <a:srgbClr val="A31E34"/>
-            </a:solidFill>
-          </a:ln>
-        </p:spPr>
-        <p:style>
-          <a:lnRef idx="2">
-            <a:schemeClr val="accent1">
-              <a:shade val="50000"/>
-            </a:schemeClr>
-          </a:lnRef>
-          <a:fillRef idx="1">
-            <a:schemeClr val="accent1"/>
-          </a:fillRef>
-          <a:effectRef idx="0">
-            <a:schemeClr val="accent1"/>
-          </a:effectRef>
-          <a:fontRef idx="minor">
-            <a:schemeClr val="lt1"/>
-          </a:fontRef>
-        </p:style>
-        <p:txBody>
-          <a:bodyPr rtlCol="0" anchor="ctr"/>
-          <a:lstStyle/>
-          <a:p>
-            <a:pPr algn="ctr"/>
-            <a:endParaRPr lang="en-US"/>
-          </a:p>
-        </p:txBody>
-      </p:sp>
-      <p:sp>
-        <p:nvSpPr>
-          <p:cNvPr id="2" name="Slide Number Placeholder 1"/>
-          <p:cNvSpPr>
-            <a:spLocks noGrp="1"/>
-          </p:cNvSpPr>
-          <p:nvPr>
-            <p:ph type="sldNum" sz="quarter" idx="12"/>
-          </p:nvPr>
-        </p:nvSpPr>
-        <p:spPr/>
-        <p:txBody>
-          <a:bodyPr/>
-          <a:lstStyle/>
-          <a:p>
-            <a:fld id="{7ADDFCCE-7BFB-9F43-8A65-C6CBBDF8F088}" type="slidenum">
-              <a:rPr lang="en-US" smtClean="0"/>
-              <a:t>17</a:t>
-            </a:fld>
-            <a:endParaRPr lang="en-US"/>
-          </a:p>
-        </p:txBody>
-      </p:sp>
-    </p:spTree>
-    <p:extLst>
-      <p:ext uri="{BB962C8B-B14F-4D97-AF65-F5344CB8AC3E}">
-        <p14:creationId xmlns:p14="http://schemas.microsoft.com/office/powerpoint/2010/main" val="1330700229"/>
-      </p:ext>
-    </p:extLst>
-  </p:cSld>
-  <p:clrMapOvr>
-    <a:masterClrMapping/>
-  </p:clrMapOvr>
-  <mc:AlternateContent xmlns:mc="http://schemas.openxmlformats.org/markup-compatibility/2006" xmlns:p14="http://schemas.microsoft.com/office/powerpoint/2010/main">
-    <mc:Choice Requires="p14">
-      <p:transition spd="slow" p14:dur="2000" advTm="5900"/>
-    </mc:Choice>
-    <mc:Fallback xmlns="">
-      <p:transition spd="slow" advTm="5900"/>
-    </mc:Fallback>
-  </mc:AlternateContent>
-</p:sld>
-</file>
-
-<file path=ppt/slides/slide18.xml><?xml version="1.0" encoding="utf-8"?>
 <p:sld xmlns:a="http://schemas.openxmlformats.org/drawingml/2006/main" xmlns:r="http://schemas.openxmlformats.org/officeDocument/2006/relationships" xmlns:p="http://schemas.openxmlformats.org/presentationml/2006/main">
   <p:cSld>
     <p:spTree>
@@ -11923,7 +11421,7 @@
           <a:p>
             <a:fld id="{7ADDFCCE-7BFB-9F43-8A65-C6CBBDF8F088}" type="slidenum">
               <a:rPr lang="en-US" smtClean="0"/>
-              <a:t>18</a:t>
+              <a:t>17</a:t>
             </a:fld>
             <a:endParaRPr lang="en-US"/>
           </a:p>
@@ -12081,7 +11579,7 @@
 </p:sld>
 </file>
 
-<file path=ppt/slides/slide19.xml><?xml version="1.0" encoding="utf-8"?>
+<file path=ppt/slides/slide18.xml><?xml version="1.0" encoding="utf-8"?>
 <p:sld xmlns:a="http://schemas.openxmlformats.org/drawingml/2006/main" xmlns:r="http://schemas.openxmlformats.org/officeDocument/2006/relationships" xmlns:p="http://schemas.openxmlformats.org/presentationml/2006/main">
   <p:cSld>
     <p:spTree>
@@ -12115,7 +11613,7 @@
           <a:p>
             <a:fld id="{7ADDFCCE-7BFB-9F43-8A65-C6CBBDF8F088}" type="slidenum">
               <a:rPr lang="en-US" smtClean="0"/>
-              <a:t>19</a:t>
+              <a:t>18</a:t>
             </a:fld>
             <a:endParaRPr lang="en-US"/>
           </a:p>
@@ -12188,6 +11686,303 @@
   <p:clrMapOvr>
     <a:masterClrMapping/>
   </p:clrMapOvr>
+</p:sld>
+</file>
+
+<file path=ppt/slides/slide19.xml><?xml version="1.0" encoding="utf-8"?>
+<p:sld xmlns:a="http://schemas.openxmlformats.org/drawingml/2006/main" xmlns:r="http://schemas.openxmlformats.org/officeDocument/2006/relationships" xmlns:p="http://schemas.openxmlformats.org/presentationml/2006/main">
+  <p:cSld>
+    <p:spTree>
+      <p:nvGrpSpPr>
+        <p:cNvPr id="1" name=""/>
+        <p:cNvGrpSpPr/>
+        <p:nvPr/>
+      </p:nvGrpSpPr>
+      <p:grpSpPr>
+        <a:xfrm>
+          <a:off x="0" y="0"/>
+          <a:ext cx="0" cy="0"/>
+          <a:chOff x="0" y="0"/>
+          <a:chExt cx="0" cy="0"/>
+        </a:xfrm>
+      </p:grpSpPr>
+      <p:sp>
+        <p:nvSpPr>
+          <p:cNvPr id="5" name="Title 1">
+            <a:extLst>
+              <a:ext uri="{FF2B5EF4-FFF2-40B4-BE49-F238E27FC236}">
+                <a16:creationId xmlns:a16="http://schemas.microsoft.com/office/drawing/2014/main" id="{7F22244B-F93B-D849-B790-051D3AA07B61}"/>
+              </a:ext>
+            </a:extLst>
+          </p:cNvPr>
+          <p:cNvSpPr>
+            <a:spLocks noGrp="1"/>
+          </p:cNvSpPr>
+          <p:nvPr>
+            <p:ph type="title"/>
+          </p:nvPr>
+        </p:nvSpPr>
+        <p:spPr/>
+        <p:txBody>
+          <a:bodyPr/>
+          <a:lstStyle/>
+          <a:p>
+            <a:r>
+              <a:rPr lang="en-US" dirty="0"/>
+              <a:t>The classical solution: caching</a:t>
+            </a:r>
+          </a:p>
+        </p:txBody>
+      </p:sp>
+      <p:sp>
+        <p:nvSpPr>
+          <p:cNvPr id="6" name="Content Placeholder 2">
+            <a:extLst>
+              <a:ext uri="{FF2B5EF4-FFF2-40B4-BE49-F238E27FC236}">
+                <a16:creationId xmlns:a16="http://schemas.microsoft.com/office/drawing/2014/main" id="{12D1FCC3-AB60-2741-A18D-022996429B6A}"/>
+              </a:ext>
+            </a:extLst>
+          </p:cNvPr>
+          <p:cNvSpPr>
+            <a:spLocks noGrp="1"/>
+          </p:cNvSpPr>
+          <p:nvPr>
+            <p:ph idx="1"/>
+          </p:nvPr>
+        </p:nvSpPr>
+        <p:spPr/>
+        <p:txBody>
+          <a:bodyPr>
+            <a:normAutofit/>
+          </a:bodyPr>
+          <a:lstStyle/>
+          <a:p>
+            <a:r>
+              <a:rPr lang="en-US" dirty="0"/>
+              <a:t>Structure stats measurement as key-value store</a:t>
+            </a:r>
+          </a:p>
+          <a:p>
+            <a:endParaRPr lang="en-US" dirty="0"/>
+          </a:p>
+          <a:p>
+            <a:r>
+              <a:rPr lang="en-US" dirty="0"/>
+              <a:t>Key=flow, value=statistic being measured</a:t>
+            </a:r>
+          </a:p>
+          <a:p>
+            <a:endParaRPr lang="en-US" dirty="0"/>
+          </a:p>
+          <a:p>
+            <a:r>
+              <a:rPr lang="en-US" dirty="0"/>
+              <a:t>Cache key-value store in SRAM; maintain authoritative copy in DRAM.</a:t>
+            </a:r>
+          </a:p>
+          <a:p>
+            <a:endParaRPr lang="en-US" dirty="0"/>
+          </a:p>
+          <a:p>
+            <a:endParaRPr lang="en-US" dirty="0"/>
+          </a:p>
+        </p:txBody>
+      </p:sp>
+    </p:spTree>
+    <p:extLst>
+      <p:ext uri="{BB962C8B-B14F-4D97-AF65-F5344CB8AC3E}">
+        <p14:creationId xmlns:p14="http://schemas.microsoft.com/office/powerpoint/2010/main" val="521330179"/>
+      </p:ext>
+    </p:extLst>
+  </p:cSld>
+  <p:clrMapOvr>
+    <a:masterClrMapping/>
+  </p:clrMapOvr>
+  <mc:AlternateContent xmlns:mc="http://schemas.openxmlformats.org/markup-compatibility/2006" xmlns:p14="http://schemas.microsoft.com/office/powerpoint/2010/main">
+    <mc:Choice Requires="p14">
+      <p:transition spd="slow" p14:dur="2000" advTm="9896"/>
+    </mc:Choice>
+    <mc:Fallback xmlns="">
+      <p:transition spd="slow" advTm="9896"/>
+    </mc:Fallback>
+  </mc:AlternateContent>
+  <p:timing>
+    <p:tnLst>
+      <p:par>
+        <p:cTn id="1" dur="indefinite" restart="never" nodeType="tmRoot">
+          <p:childTnLst>
+            <p:seq concurrent="1" nextAc="seek">
+              <p:cTn id="2" dur="indefinite" nodeType="mainSeq">
+                <p:childTnLst>
+                  <p:par>
+                    <p:cTn id="3" fill="hold">
+                      <p:stCondLst>
+                        <p:cond delay="indefinite"/>
+                      </p:stCondLst>
+                      <p:childTnLst>
+                        <p:par>
+                          <p:cTn id="4" fill="hold">
+                            <p:stCondLst>
+                              <p:cond delay="0"/>
+                            </p:stCondLst>
+                            <p:childTnLst>
+                              <p:par>
+                                <p:cTn id="5" presetID="1" presetClass="entr" presetSubtype="0" fill="hold" nodeType="clickEffect">
+                                  <p:stCondLst>
+                                    <p:cond delay="0"/>
+                                  </p:stCondLst>
+                                  <p:childTnLst>
+                                    <p:set>
+                                      <p:cBhvr>
+                                        <p:cTn id="6" dur="1" fill="hold">
+                                          <p:stCondLst>
+                                            <p:cond delay="0"/>
+                                          </p:stCondLst>
+                                        </p:cTn>
+                                        <p:tgtEl>
+                                          <p:spTgt spid="6">
+                                            <p:txEl>
+                                              <p:pRg st="0" end="0"/>
+                                            </p:txEl>
+                                          </p:spTgt>
+                                        </p:tgtEl>
+                                        <p:attrNameLst>
+                                          <p:attrName>style.visibility</p:attrName>
+                                        </p:attrNameLst>
+                                      </p:cBhvr>
+                                      <p:to>
+                                        <p:strVal val="visible"/>
+                                      </p:to>
+                                    </p:set>
+                                  </p:childTnLst>
+                                </p:cTn>
+                              </p:par>
+                            </p:childTnLst>
+                          </p:cTn>
+                        </p:par>
+                      </p:childTnLst>
+                    </p:cTn>
+                  </p:par>
+                  <p:par>
+                    <p:cTn id="7" fill="hold">
+                      <p:stCondLst>
+                        <p:cond delay="indefinite"/>
+                      </p:stCondLst>
+                      <p:childTnLst>
+                        <p:par>
+                          <p:cTn id="8" fill="hold">
+                            <p:stCondLst>
+                              <p:cond delay="0"/>
+                            </p:stCondLst>
+                            <p:childTnLst>
+                              <p:par>
+                                <p:cTn id="9" presetID="1" presetClass="entr" presetSubtype="0" fill="hold" nodeType="clickEffect">
+                                  <p:stCondLst>
+                                    <p:cond delay="0"/>
+                                  </p:stCondLst>
+                                  <p:childTnLst>
+                                    <p:set>
+                                      <p:cBhvr>
+                                        <p:cTn id="10" dur="1" fill="hold">
+                                          <p:stCondLst>
+                                            <p:cond delay="0"/>
+                                          </p:stCondLst>
+                                        </p:cTn>
+                                        <p:tgtEl>
+                                          <p:spTgt spid="6">
+                                            <p:txEl>
+                                              <p:pRg st="2" end="2"/>
+                                            </p:txEl>
+                                          </p:spTgt>
+                                        </p:tgtEl>
+                                        <p:attrNameLst>
+                                          <p:attrName>style.visibility</p:attrName>
+                                        </p:attrNameLst>
+                                      </p:cBhvr>
+                                      <p:to>
+                                        <p:strVal val="visible"/>
+                                      </p:to>
+                                    </p:set>
+                                  </p:childTnLst>
+                                </p:cTn>
+                              </p:par>
+                            </p:childTnLst>
+                          </p:cTn>
+                        </p:par>
+                      </p:childTnLst>
+                    </p:cTn>
+                  </p:par>
+                  <p:par>
+                    <p:cTn id="11" fill="hold">
+                      <p:stCondLst>
+                        <p:cond delay="indefinite"/>
+                      </p:stCondLst>
+                      <p:childTnLst>
+                        <p:par>
+                          <p:cTn id="12" fill="hold">
+                            <p:stCondLst>
+                              <p:cond delay="0"/>
+                            </p:stCondLst>
+                            <p:childTnLst>
+                              <p:par>
+                                <p:cTn id="13" presetID="1" presetClass="entr" presetSubtype="0" fill="hold" nodeType="clickEffect">
+                                  <p:stCondLst>
+                                    <p:cond delay="0"/>
+                                  </p:stCondLst>
+                                  <p:childTnLst>
+                                    <p:set>
+                                      <p:cBhvr>
+                                        <p:cTn id="14" dur="1" fill="hold">
+                                          <p:stCondLst>
+                                            <p:cond delay="0"/>
+                                          </p:stCondLst>
+                                        </p:cTn>
+                                        <p:tgtEl>
+                                          <p:spTgt spid="6">
+                                            <p:txEl>
+                                              <p:pRg st="4" end="4"/>
+                                            </p:txEl>
+                                          </p:spTgt>
+                                        </p:tgtEl>
+                                        <p:attrNameLst>
+                                          <p:attrName>style.visibility</p:attrName>
+                                        </p:attrNameLst>
+                                      </p:cBhvr>
+                                      <p:to>
+                                        <p:strVal val="visible"/>
+                                      </p:to>
+                                    </p:set>
+                                  </p:childTnLst>
+                                </p:cTn>
+                              </p:par>
+                            </p:childTnLst>
+                          </p:cTn>
+                        </p:par>
+                      </p:childTnLst>
+                    </p:cTn>
+                  </p:par>
+                </p:childTnLst>
+              </p:cTn>
+              <p:prevCondLst>
+                <p:cond evt="onPrev" delay="0">
+                  <p:tgtEl>
+                    <p:sldTgt/>
+                  </p:tgtEl>
+                </p:cond>
+              </p:prevCondLst>
+              <p:nextCondLst>
+                <p:cond evt="onNext" delay="0">
+                  <p:tgtEl>
+                    <p:sldTgt/>
+                  </p:tgtEl>
+                </p:cond>
+              </p:nextCondLst>
+            </p:seq>
+          </p:childTnLst>
+        </p:cTn>
+      </p:par>
+    </p:tnLst>
+  </p:timing>
 </p:sld>
 </file>
 
@@ -15075,303 +14870,6 @@
       </p:grpSpPr>
       <p:sp>
         <p:nvSpPr>
-          <p:cNvPr id="5" name="Title 1">
-            <a:extLst>
-              <a:ext uri="{FF2B5EF4-FFF2-40B4-BE49-F238E27FC236}">
-                <a16:creationId xmlns:a16="http://schemas.microsoft.com/office/drawing/2014/main" id="{7F22244B-F93B-D849-B790-051D3AA07B61}"/>
-              </a:ext>
-            </a:extLst>
-          </p:cNvPr>
-          <p:cNvSpPr>
-            <a:spLocks noGrp="1"/>
-          </p:cNvSpPr>
-          <p:nvPr>
-            <p:ph type="title"/>
-          </p:nvPr>
-        </p:nvSpPr>
-        <p:spPr/>
-        <p:txBody>
-          <a:bodyPr/>
-          <a:lstStyle/>
-          <a:p>
-            <a:r>
-              <a:rPr lang="en-US" dirty="0"/>
-              <a:t>The classical solution: caching</a:t>
-            </a:r>
-          </a:p>
-        </p:txBody>
-      </p:sp>
-      <p:sp>
-        <p:nvSpPr>
-          <p:cNvPr id="6" name="Content Placeholder 2">
-            <a:extLst>
-              <a:ext uri="{FF2B5EF4-FFF2-40B4-BE49-F238E27FC236}">
-                <a16:creationId xmlns:a16="http://schemas.microsoft.com/office/drawing/2014/main" id="{12D1FCC3-AB60-2741-A18D-022996429B6A}"/>
-              </a:ext>
-            </a:extLst>
-          </p:cNvPr>
-          <p:cNvSpPr>
-            <a:spLocks noGrp="1"/>
-          </p:cNvSpPr>
-          <p:nvPr>
-            <p:ph idx="1"/>
-          </p:nvPr>
-        </p:nvSpPr>
-        <p:spPr/>
-        <p:txBody>
-          <a:bodyPr>
-            <a:normAutofit/>
-          </a:bodyPr>
-          <a:lstStyle/>
-          <a:p>
-            <a:r>
-              <a:rPr lang="en-US" dirty="0"/>
-              <a:t>Structure stats measurement as key-value store</a:t>
-            </a:r>
-          </a:p>
-          <a:p>
-            <a:endParaRPr lang="en-US" dirty="0"/>
-          </a:p>
-          <a:p>
-            <a:r>
-              <a:rPr lang="en-US" dirty="0"/>
-              <a:t>Key=flow, value=statistic being measured</a:t>
-            </a:r>
-          </a:p>
-          <a:p>
-            <a:endParaRPr lang="en-US" dirty="0"/>
-          </a:p>
-          <a:p>
-            <a:r>
-              <a:rPr lang="en-US" dirty="0"/>
-              <a:t>Cache key-value store in SRAM; maintain authoritative copy in DRAM.</a:t>
-            </a:r>
-          </a:p>
-          <a:p>
-            <a:endParaRPr lang="en-US" dirty="0"/>
-          </a:p>
-          <a:p>
-            <a:endParaRPr lang="en-US" dirty="0"/>
-          </a:p>
-        </p:txBody>
-      </p:sp>
-    </p:spTree>
-    <p:extLst>
-      <p:ext uri="{BB962C8B-B14F-4D97-AF65-F5344CB8AC3E}">
-        <p14:creationId xmlns:p14="http://schemas.microsoft.com/office/powerpoint/2010/main" val="521330179"/>
-      </p:ext>
-    </p:extLst>
-  </p:cSld>
-  <p:clrMapOvr>
-    <a:masterClrMapping/>
-  </p:clrMapOvr>
-  <mc:AlternateContent xmlns:mc="http://schemas.openxmlformats.org/markup-compatibility/2006" xmlns:p14="http://schemas.microsoft.com/office/powerpoint/2010/main">
-    <mc:Choice Requires="p14">
-      <p:transition spd="slow" p14:dur="2000" advTm="9896"/>
-    </mc:Choice>
-    <mc:Fallback xmlns="">
-      <p:transition spd="slow" advTm="9896"/>
-    </mc:Fallback>
-  </mc:AlternateContent>
-  <p:timing>
-    <p:tnLst>
-      <p:par>
-        <p:cTn id="1" dur="indefinite" restart="never" nodeType="tmRoot">
-          <p:childTnLst>
-            <p:seq concurrent="1" nextAc="seek">
-              <p:cTn id="2" dur="indefinite" nodeType="mainSeq">
-                <p:childTnLst>
-                  <p:par>
-                    <p:cTn id="3" fill="hold">
-                      <p:stCondLst>
-                        <p:cond delay="indefinite"/>
-                      </p:stCondLst>
-                      <p:childTnLst>
-                        <p:par>
-                          <p:cTn id="4" fill="hold">
-                            <p:stCondLst>
-                              <p:cond delay="0"/>
-                            </p:stCondLst>
-                            <p:childTnLst>
-                              <p:par>
-                                <p:cTn id="5" presetID="1" presetClass="entr" presetSubtype="0" fill="hold" nodeType="clickEffect">
-                                  <p:stCondLst>
-                                    <p:cond delay="0"/>
-                                  </p:stCondLst>
-                                  <p:childTnLst>
-                                    <p:set>
-                                      <p:cBhvr>
-                                        <p:cTn id="6" dur="1" fill="hold">
-                                          <p:stCondLst>
-                                            <p:cond delay="0"/>
-                                          </p:stCondLst>
-                                        </p:cTn>
-                                        <p:tgtEl>
-                                          <p:spTgt spid="6">
-                                            <p:txEl>
-                                              <p:pRg st="0" end="0"/>
-                                            </p:txEl>
-                                          </p:spTgt>
-                                        </p:tgtEl>
-                                        <p:attrNameLst>
-                                          <p:attrName>style.visibility</p:attrName>
-                                        </p:attrNameLst>
-                                      </p:cBhvr>
-                                      <p:to>
-                                        <p:strVal val="visible"/>
-                                      </p:to>
-                                    </p:set>
-                                  </p:childTnLst>
-                                </p:cTn>
-                              </p:par>
-                            </p:childTnLst>
-                          </p:cTn>
-                        </p:par>
-                      </p:childTnLst>
-                    </p:cTn>
-                  </p:par>
-                  <p:par>
-                    <p:cTn id="7" fill="hold">
-                      <p:stCondLst>
-                        <p:cond delay="indefinite"/>
-                      </p:stCondLst>
-                      <p:childTnLst>
-                        <p:par>
-                          <p:cTn id="8" fill="hold">
-                            <p:stCondLst>
-                              <p:cond delay="0"/>
-                            </p:stCondLst>
-                            <p:childTnLst>
-                              <p:par>
-                                <p:cTn id="9" presetID="1" presetClass="entr" presetSubtype="0" fill="hold" nodeType="clickEffect">
-                                  <p:stCondLst>
-                                    <p:cond delay="0"/>
-                                  </p:stCondLst>
-                                  <p:childTnLst>
-                                    <p:set>
-                                      <p:cBhvr>
-                                        <p:cTn id="10" dur="1" fill="hold">
-                                          <p:stCondLst>
-                                            <p:cond delay="0"/>
-                                          </p:stCondLst>
-                                        </p:cTn>
-                                        <p:tgtEl>
-                                          <p:spTgt spid="6">
-                                            <p:txEl>
-                                              <p:pRg st="2" end="2"/>
-                                            </p:txEl>
-                                          </p:spTgt>
-                                        </p:tgtEl>
-                                        <p:attrNameLst>
-                                          <p:attrName>style.visibility</p:attrName>
-                                        </p:attrNameLst>
-                                      </p:cBhvr>
-                                      <p:to>
-                                        <p:strVal val="visible"/>
-                                      </p:to>
-                                    </p:set>
-                                  </p:childTnLst>
-                                </p:cTn>
-                              </p:par>
-                            </p:childTnLst>
-                          </p:cTn>
-                        </p:par>
-                      </p:childTnLst>
-                    </p:cTn>
-                  </p:par>
-                  <p:par>
-                    <p:cTn id="11" fill="hold">
-                      <p:stCondLst>
-                        <p:cond delay="indefinite"/>
-                      </p:stCondLst>
-                      <p:childTnLst>
-                        <p:par>
-                          <p:cTn id="12" fill="hold">
-                            <p:stCondLst>
-                              <p:cond delay="0"/>
-                            </p:stCondLst>
-                            <p:childTnLst>
-                              <p:par>
-                                <p:cTn id="13" presetID="1" presetClass="entr" presetSubtype="0" fill="hold" nodeType="clickEffect">
-                                  <p:stCondLst>
-                                    <p:cond delay="0"/>
-                                  </p:stCondLst>
-                                  <p:childTnLst>
-                                    <p:set>
-                                      <p:cBhvr>
-                                        <p:cTn id="14" dur="1" fill="hold">
-                                          <p:stCondLst>
-                                            <p:cond delay="0"/>
-                                          </p:stCondLst>
-                                        </p:cTn>
-                                        <p:tgtEl>
-                                          <p:spTgt spid="6">
-                                            <p:txEl>
-                                              <p:pRg st="4" end="4"/>
-                                            </p:txEl>
-                                          </p:spTgt>
-                                        </p:tgtEl>
-                                        <p:attrNameLst>
-                                          <p:attrName>style.visibility</p:attrName>
-                                        </p:attrNameLst>
-                                      </p:cBhvr>
-                                      <p:to>
-                                        <p:strVal val="visible"/>
-                                      </p:to>
-                                    </p:set>
-                                  </p:childTnLst>
-                                </p:cTn>
-                              </p:par>
-                            </p:childTnLst>
-                          </p:cTn>
-                        </p:par>
-                      </p:childTnLst>
-                    </p:cTn>
-                  </p:par>
-                </p:childTnLst>
-              </p:cTn>
-              <p:prevCondLst>
-                <p:cond evt="onPrev" delay="0">
-                  <p:tgtEl>
-                    <p:sldTgt/>
-                  </p:tgtEl>
-                </p:cond>
-              </p:prevCondLst>
-              <p:nextCondLst>
-                <p:cond evt="onNext" delay="0">
-                  <p:tgtEl>
-                    <p:sldTgt/>
-                  </p:tgtEl>
-                </p:cond>
-              </p:nextCondLst>
-            </p:seq>
-          </p:childTnLst>
-        </p:cTn>
-      </p:par>
-    </p:tnLst>
-  </p:timing>
-</p:sld>
-</file>
-
-<file path=ppt/slides/slide21.xml><?xml version="1.0" encoding="utf-8"?>
-<p:sld xmlns:a="http://schemas.openxmlformats.org/drawingml/2006/main" xmlns:r="http://schemas.openxmlformats.org/officeDocument/2006/relationships" xmlns:p="http://schemas.openxmlformats.org/presentationml/2006/main">
-  <p:cSld>
-    <p:spTree>
-      <p:nvGrpSpPr>
-        <p:cNvPr id="1" name=""/>
-        <p:cNvGrpSpPr/>
-        <p:nvPr/>
-      </p:nvGrpSpPr>
-      <p:grpSpPr>
-        <a:xfrm>
-          <a:off x="0" y="0"/>
-          <a:ext cx="0" cy="0"/>
-          <a:chOff x="0" y="0"/>
-          <a:chExt cx="0" cy="0"/>
-        </a:xfrm>
-      </p:grpSpPr>
-      <p:sp>
-        <p:nvSpPr>
           <p:cNvPr id="2" name="Title 1"/>
           <p:cNvSpPr>
             <a:spLocks noGrp="1"/>
@@ -17168,7 +16666,7 @@
 </p:sld>
 </file>
 
-<file path=ppt/slides/slide22.xml><?xml version="1.0" encoding="utf-8"?>
+<file path=ppt/slides/slide21.xml><?xml version="1.0" encoding="utf-8"?>
 <p:sld xmlns:a="http://schemas.openxmlformats.org/drawingml/2006/main" xmlns:r="http://schemas.openxmlformats.org/officeDocument/2006/relationships" xmlns:p="http://schemas.openxmlformats.org/presentationml/2006/main">
   <p:cSld>
     <p:spTree>
@@ -18688,7 +18186,7 @@
 </p:sld>
 </file>
 
-<file path=ppt/slides/slide23.xml><?xml version="1.0" encoding="utf-8"?>
+<file path=ppt/slides/slide22.xml><?xml version="1.0" encoding="utf-8"?>
 <p:sld xmlns:a="http://schemas.openxmlformats.org/drawingml/2006/main" xmlns:r="http://schemas.openxmlformats.org/officeDocument/2006/relationships" xmlns:p="http://schemas.openxmlformats.org/presentationml/2006/main">
   <p:cSld>
     <p:spTree>
@@ -20329,7 +19827,7 @@
 </p:sld>
 </file>
 
-<file path=ppt/slides/slide24.xml><?xml version="1.0" encoding="utf-8"?>
+<file path=ppt/slides/slide23.xml><?xml version="1.0" encoding="utf-8"?>
 <p:sld xmlns:a="http://schemas.openxmlformats.org/drawingml/2006/main" xmlns:r="http://schemas.openxmlformats.org/officeDocument/2006/relationships" xmlns:p="http://schemas.openxmlformats.org/presentationml/2006/main">
   <p:cSld>
     <p:spTree>
@@ -20430,7 +19928,7 @@
 </p:sld>
 </file>
 
-<file path=ppt/slides/slide25.xml><?xml version="1.0" encoding="utf-8"?>
+<file path=ppt/slides/slide24.xml><?xml version="1.0" encoding="utf-8"?>
 <p:sld xmlns:a="http://schemas.openxmlformats.org/drawingml/2006/main" xmlns:r="http://schemas.openxmlformats.org/officeDocument/2006/relationships" xmlns:p="http://schemas.openxmlformats.org/presentationml/2006/main">
   <p:cSld>
     <p:spTree>
@@ -21931,7 +21429,7 @@
 </p:sld>
 </file>
 
-<file path=ppt/slides/slide26.xml><?xml version="1.0" encoding="utf-8"?>
+<file path=ppt/slides/slide25.xml><?xml version="1.0" encoding="utf-8"?>
 <p:sld xmlns:a="http://schemas.openxmlformats.org/drawingml/2006/main" xmlns:r="http://schemas.openxmlformats.org/officeDocument/2006/relationships" xmlns:p="http://schemas.openxmlformats.org/presentationml/2006/main">
   <p:cSld>
     <p:spTree>
@@ -23520,7 +23018,7 @@
 </p:sld>
 </file>
 
-<file path=ppt/slides/slide27.xml><?xml version="1.0" encoding="utf-8"?>
+<file path=ppt/slides/slide26.xml><?xml version="1.0" encoding="utf-8"?>
 <p:sld xmlns:a="http://schemas.openxmlformats.org/drawingml/2006/main" xmlns:r="http://schemas.openxmlformats.org/officeDocument/2006/relationships" xmlns:p="http://schemas.openxmlformats.org/presentationml/2006/main">
   <p:cSld>
     <p:spTree>
@@ -25080,7 +24578,7 @@
 </p:sld>
 </file>
 
-<file path=ppt/slides/slide28.xml><?xml version="1.0" encoding="utf-8"?>
+<file path=ppt/slides/slide27.xml><?xml version="1.0" encoding="utf-8"?>
 <p:sld xmlns:a="http://schemas.openxmlformats.org/drawingml/2006/main" xmlns:r="http://schemas.openxmlformats.org/officeDocument/2006/relationships" xmlns:p="http://schemas.openxmlformats.org/presentationml/2006/main">
   <p:cSld>
     <p:spTree>
@@ -26698,7 +26196,7 @@
 </p:sld>
 </file>
 
-<file path=ppt/slides/slide29.xml><?xml version="1.0" encoding="utf-8"?>
+<file path=ppt/slides/slide28.xml><?xml version="1.0" encoding="utf-8"?>
 <p:sld xmlns:a="http://schemas.openxmlformats.org/drawingml/2006/main" xmlns:r="http://schemas.openxmlformats.org/officeDocument/2006/relationships" xmlns:p="http://schemas.openxmlformats.org/presentationml/2006/main">
   <p:cSld>
     <p:spTree>
@@ -27264,90 +26762,7 @@
 </p:sld>
 </file>
 
-<file path=ppt/slides/slide3.xml><?xml version="1.0" encoding="utf-8"?>
-<p:sld xmlns:a="http://schemas.openxmlformats.org/drawingml/2006/main" xmlns:r="http://schemas.openxmlformats.org/officeDocument/2006/relationships" xmlns:p="http://schemas.openxmlformats.org/presentationml/2006/main">
-  <p:cSld>
-    <p:spTree>
-      <p:nvGrpSpPr>
-        <p:cNvPr id="1" name=""/>
-        <p:cNvGrpSpPr/>
-        <p:nvPr/>
-      </p:nvGrpSpPr>
-      <p:grpSpPr>
-        <a:xfrm>
-          <a:off x="0" y="0"/>
-          <a:ext cx="0" cy="0"/>
-          <a:chOff x="0" y="0"/>
-          <a:chExt cx="0" cy="0"/>
-        </a:xfrm>
-      </p:grpSpPr>
-      <p:sp>
-        <p:nvSpPr>
-          <p:cNvPr id="4" name="Slide Number Placeholder 3"/>
-          <p:cNvSpPr>
-            <a:spLocks noGrp="1"/>
-          </p:cNvSpPr>
-          <p:nvPr>
-            <p:ph type="sldNum" sz="quarter" idx="12"/>
-          </p:nvPr>
-        </p:nvSpPr>
-        <p:spPr/>
-        <p:txBody>
-          <a:bodyPr/>
-          <a:lstStyle/>
-          <a:p>
-            <a:fld id="{7ADDFCCE-7BFB-9F43-8A65-C6CBBDF8F088}" type="slidenum">
-              <a:rPr lang="en-US" smtClean="0"/>
-              <a:t>3</a:t>
-            </a:fld>
-            <a:endParaRPr lang="en-US"/>
-          </a:p>
-        </p:txBody>
-      </p:sp>
-      <p:sp>
-        <p:nvSpPr>
-          <p:cNvPr id="5" name="TextBox 4"/>
-          <p:cNvSpPr txBox="1"/>
-          <p:nvPr/>
-        </p:nvSpPr>
-        <p:spPr>
-          <a:xfrm>
-            <a:off x="589935" y="2645031"/>
-            <a:ext cx="10913807" cy="1446550"/>
-          </a:xfrm>
-          <a:prstGeom prst="rect">
-            <a:avLst/>
-          </a:prstGeom>
-          <a:noFill/>
-        </p:spPr>
-        <p:txBody>
-          <a:bodyPr wrap="square" rtlCol="0">
-            <a:spAutoFit/>
-          </a:bodyPr>
-          <a:lstStyle/>
-          <a:p>
-            <a:pPr algn="ctr"/>
-            <a:r>
-              <a:rPr lang="en-US" sz="4400" dirty="0"/>
-              <a:t>Switches should be first-class citizens in performance monitoring.</a:t>
-            </a:r>
-          </a:p>
-        </p:txBody>
-      </p:sp>
-    </p:spTree>
-    <p:extLst>
-      <p:ext uri="{BB962C8B-B14F-4D97-AF65-F5344CB8AC3E}">
-        <p14:creationId xmlns:p14="http://schemas.microsoft.com/office/powerpoint/2010/main" val="711579087"/>
-      </p:ext>
-    </p:extLst>
-  </p:cSld>
-  <p:clrMapOvr>
-    <a:masterClrMapping/>
-  </p:clrMapOvr>
-</p:sld>
-</file>
-
-<file path=ppt/slides/slide30.xml><?xml version="1.0" encoding="utf-8"?>
+<file path=ppt/slides/slide29.xml><?xml version="1.0" encoding="utf-8"?>
 <p:sld xmlns:a="http://schemas.openxmlformats.org/drawingml/2006/main" xmlns:r="http://schemas.openxmlformats.org/officeDocument/2006/relationships" xmlns:p="http://schemas.openxmlformats.org/presentationml/2006/main">
   <p:cSld>
     <p:spTree>
@@ -28352,7 +27767,90 @@
 </p:sld>
 </file>
 
-<file path=ppt/slides/slide31.xml><?xml version="1.0" encoding="utf-8"?>
+<file path=ppt/slides/slide3.xml><?xml version="1.0" encoding="utf-8"?>
+<p:sld xmlns:a="http://schemas.openxmlformats.org/drawingml/2006/main" xmlns:r="http://schemas.openxmlformats.org/officeDocument/2006/relationships" xmlns:p="http://schemas.openxmlformats.org/presentationml/2006/main">
+  <p:cSld>
+    <p:spTree>
+      <p:nvGrpSpPr>
+        <p:cNvPr id="1" name=""/>
+        <p:cNvGrpSpPr/>
+        <p:nvPr/>
+      </p:nvGrpSpPr>
+      <p:grpSpPr>
+        <a:xfrm>
+          <a:off x="0" y="0"/>
+          <a:ext cx="0" cy="0"/>
+          <a:chOff x="0" y="0"/>
+          <a:chExt cx="0" cy="0"/>
+        </a:xfrm>
+      </p:grpSpPr>
+      <p:sp>
+        <p:nvSpPr>
+          <p:cNvPr id="4" name="Slide Number Placeholder 3"/>
+          <p:cNvSpPr>
+            <a:spLocks noGrp="1"/>
+          </p:cNvSpPr>
+          <p:nvPr>
+            <p:ph type="sldNum" sz="quarter" idx="12"/>
+          </p:nvPr>
+        </p:nvSpPr>
+        <p:spPr/>
+        <p:txBody>
+          <a:bodyPr/>
+          <a:lstStyle/>
+          <a:p>
+            <a:fld id="{7ADDFCCE-7BFB-9F43-8A65-C6CBBDF8F088}" type="slidenum">
+              <a:rPr lang="en-US" smtClean="0"/>
+              <a:t>3</a:t>
+            </a:fld>
+            <a:endParaRPr lang="en-US"/>
+          </a:p>
+        </p:txBody>
+      </p:sp>
+      <p:sp>
+        <p:nvSpPr>
+          <p:cNvPr id="5" name="TextBox 4"/>
+          <p:cNvSpPr txBox="1"/>
+          <p:nvPr/>
+        </p:nvSpPr>
+        <p:spPr>
+          <a:xfrm>
+            <a:off x="589935" y="2645031"/>
+            <a:ext cx="10913807" cy="1446550"/>
+          </a:xfrm>
+          <a:prstGeom prst="rect">
+            <a:avLst/>
+          </a:prstGeom>
+          <a:noFill/>
+        </p:spPr>
+        <p:txBody>
+          <a:bodyPr wrap="square" rtlCol="0">
+            <a:spAutoFit/>
+          </a:bodyPr>
+          <a:lstStyle/>
+          <a:p>
+            <a:pPr algn="ctr"/>
+            <a:r>
+              <a:rPr lang="en-US" sz="4400" dirty="0"/>
+              <a:t>Switches should be first-class citizens in performance monitoring.</a:t>
+            </a:r>
+          </a:p>
+        </p:txBody>
+      </p:sp>
+    </p:spTree>
+    <p:extLst>
+      <p:ext uri="{BB962C8B-B14F-4D97-AF65-F5344CB8AC3E}">
+        <p14:creationId xmlns:p14="http://schemas.microsoft.com/office/powerpoint/2010/main" val="711579087"/>
+      </p:ext>
+    </p:extLst>
+  </p:cSld>
+  <p:clrMapOvr>
+    <a:masterClrMapping/>
+  </p:clrMapOvr>
+</p:sld>
+</file>
+
+<file path=ppt/slides/slide30.xml><?xml version="1.0" encoding="utf-8"?>
 <p:sld xmlns:a="http://schemas.openxmlformats.org/drawingml/2006/main" xmlns:r="http://schemas.openxmlformats.org/officeDocument/2006/relationships" xmlns:p="http://schemas.openxmlformats.org/presentationml/2006/main">
   <p:cSld>
     <p:spTree>
@@ -28695,7 +28193,7 @@
 </p:sld>
 </file>
 
-<file path=ppt/slides/slide32.xml><?xml version="1.0" encoding="utf-8"?>
+<file path=ppt/slides/slide31.xml><?xml version="1.0" encoding="utf-8"?>
 <p:sld xmlns:a="http://schemas.openxmlformats.org/drawingml/2006/main" xmlns:r="http://schemas.openxmlformats.org/officeDocument/2006/relationships" xmlns:p="http://schemas.openxmlformats.org/presentationml/2006/main">
   <p:cSld>
     <p:spTree>
@@ -29268,7 +28766,7 @@
 </p:sld>
 </file>
 
-<file path=ppt/slides/slide33.xml><?xml version="1.0" encoding="utf-8"?>
+<file path=ppt/slides/slide32.xml><?xml version="1.0" encoding="utf-8"?>
 <p:sld xmlns:a="http://schemas.openxmlformats.org/drawingml/2006/main" xmlns:r="http://schemas.openxmlformats.org/officeDocument/2006/relationships" xmlns:p="http://schemas.openxmlformats.org/presentationml/2006/main">
   <p:cSld>
     <p:spTree>
@@ -30944,7 +30442,7 @@
 </p:sld>
 </file>
 
-<file path=ppt/slides/slide34.xml><?xml version="1.0" encoding="utf-8"?>
+<file path=ppt/slides/slide33.xml><?xml version="1.0" encoding="utf-8"?>
 <p:sld xmlns:a="http://schemas.openxmlformats.org/drawingml/2006/main" xmlns:r="http://schemas.openxmlformats.org/officeDocument/2006/relationships" xmlns:p="http://schemas.openxmlformats.org/presentationml/2006/main">
   <p:cSld>
     <p:spTree>
@@ -32382,7 +31880,7 @@
 </p:sld>
 </file>
 
-<file path=ppt/slides/slide35.xml><?xml version="1.0" encoding="utf-8"?>
+<file path=ppt/slides/slide34.xml><?xml version="1.0" encoding="utf-8"?>
 <p:sld xmlns:a="http://schemas.openxmlformats.org/drawingml/2006/main" xmlns:r="http://schemas.openxmlformats.org/officeDocument/2006/relationships" xmlns:p="http://schemas.openxmlformats.org/presentationml/2006/main">
   <p:cSld>
     <p:spTree>
@@ -32501,7 +31999,7 @@
           <a:p>
             <a:fld id="{7ADDFCCE-7BFB-9F43-8A65-C6CBBDF8F088}" type="slidenum">
               <a:rPr lang="en-US" smtClean="0"/>
-              <a:t>35</a:t>
+              <a:t>34</a:t>
             </a:fld>
             <a:endParaRPr lang="en-US"/>
           </a:p>
@@ -32780,7 +32278,7 @@
 </p:sld>
 </file>
 
-<file path=ppt/slides/slide36.xml><?xml version="1.0" encoding="utf-8"?>
+<file path=ppt/slides/slide35.xml><?xml version="1.0" encoding="utf-8"?>
 <p:sld xmlns:a="http://schemas.openxmlformats.org/drawingml/2006/main" xmlns:r="http://schemas.openxmlformats.org/officeDocument/2006/relationships" xmlns:p="http://schemas.openxmlformats.org/presentationml/2006/main">
   <p:cSld>
     <p:spTree>
@@ -32933,7 +32431,7 @@
 </p:sld>
 </file>
 
-<file path=ppt/slides/slide37.xml><?xml version="1.0" encoding="utf-8"?>
+<file path=ppt/slides/slide36.xml><?xml version="1.0" encoding="utf-8"?>
 <p:sld xmlns:a="http://schemas.openxmlformats.org/drawingml/2006/main" xmlns:r="http://schemas.openxmlformats.org/officeDocument/2006/relationships" xmlns:p="http://schemas.openxmlformats.org/presentationml/2006/main">
   <p:cSld>
     <p:spTree>
@@ -34207,7 +33705,7 @@
           <a:p>
             <a:fld id="{7ADDFCCE-7BFB-9F43-8A65-C6CBBDF8F088}" type="slidenum">
               <a:rPr lang="en-US" smtClean="0"/>
-              <a:t>37</a:t>
+              <a:t>36</a:t>
             </a:fld>
             <a:endParaRPr lang="en-US"/>
           </a:p>
@@ -34445,7 +33943,7 @@
 </p:sld>
 </file>
 
-<file path=ppt/slides/slide38.xml><?xml version="1.0" encoding="utf-8"?>
+<file path=ppt/slides/slide37.xml><?xml version="1.0" encoding="utf-8"?>
 <p:sld xmlns:a="http://schemas.openxmlformats.org/drawingml/2006/main" xmlns:r="http://schemas.openxmlformats.org/officeDocument/2006/relationships" xmlns:p="http://schemas.openxmlformats.org/presentationml/2006/main">
   <p:cSld>
     <p:spTree>
@@ -34611,7 +34109,7 @@
           <a:p>
             <a:fld id="{7ADDFCCE-7BFB-9F43-8A65-C6CBBDF8F088}" type="slidenum">
               <a:rPr lang="en-US" smtClean="0"/>
-              <a:t>38</a:t>
+              <a:t>37</a:t>
             </a:fld>
             <a:endParaRPr lang="en-US"/>
           </a:p>
@@ -34942,7 +34440,7 @@
 </p:sld>
 </file>
 
-<file path=ppt/slides/slide39.xml><?xml version="1.0" encoding="utf-8"?>
+<file path=ppt/slides/slide38.xml><?xml version="1.0" encoding="utf-8"?>
 <p:sld xmlns:a="http://schemas.openxmlformats.org/drawingml/2006/main" xmlns:r="http://schemas.openxmlformats.org/officeDocument/2006/relationships" xmlns:p="http://schemas.openxmlformats.org/presentationml/2006/main">
   <p:cSld>
     <p:spTree>
@@ -35028,7 +34526,7 @@
           <a:p>
             <a:fld id="{7ADDFCCE-7BFB-9F43-8A65-C6CBBDF8F088}" type="slidenum">
               <a:rPr lang="en-US" smtClean="0"/>
-              <a:t>39</a:t>
+              <a:t>38</a:t>
             </a:fld>
             <a:endParaRPr lang="en-US"/>
           </a:p>
@@ -35055,109 +34553,7 @@
 </p:sld>
 </file>
 
-<file path=ppt/slides/slide4.xml><?xml version="1.0" encoding="utf-8"?>
-<p:sld xmlns:a="http://schemas.openxmlformats.org/drawingml/2006/main" xmlns:r="http://schemas.openxmlformats.org/officeDocument/2006/relationships" xmlns:p="http://schemas.openxmlformats.org/presentationml/2006/main">
-  <p:cSld>
-    <p:spTree>
-      <p:nvGrpSpPr>
-        <p:cNvPr id="1" name=""/>
-        <p:cNvGrpSpPr/>
-        <p:nvPr/>
-      </p:nvGrpSpPr>
-      <p:grpSpPr>
-        <a:xfrm>
-          <a:off x="0" y="0"/>
-          <a:ext cx="0" cy="0"/>
-          <a:chOff x="0" y="0"/>
-          <a:chExt cx="0" cy="0"/>
-        </a:xfrm>
-      </p:grpSpPr>
-      <p:sp>
-        <p:nvSpPr>
-          <p:cNvPr id="4" name="TextBox 3"/>
-          <p:cNvSpPr txBox="1"/>
-          <p:nvPr/>
-        </p:nvSpPr>
-        <p:spPr>
-          <a:xfrm>
-            <a:off x="405860" y="2169272"/>
-            <a:ext cx="11317826" cy="1938992"/>
-          </a:xfrm>
-          <a:prstGeom prst="rect">
-            <a:avLst/>
-          </a:prstGeom>
-          <a:noFill/>
-        </p:spPr>
-        <p:txBody>
-          <a:bodyPr wrap="square" rtlCol="0">
-            <a:spAutoFit/>
-          </a:bodyPr>
-          <a:lstStyle/>
-          <a:p>
-            <a:pPr algn="ctr"/>
-            <a:r>
-              <a:rPr lang="en-US" sz="4000" dirty="0"/>
-              <a:t>We want to build future-proof switch hardware:</a:t>
-            </a:r>
-          </a:p>
-          <a:p>
-            <a:pPr algn="ctr"/>
-            <a:endParaRPr lang="en-US" sz="4000" dirty="0"/>
-          </a:p>
-          <a:p>
-            <a:pPr algn="ctr"/>
-            <a:r>
-              <a:rPr lang="en-US" sz="4000" dirty="0"/>
-              <a:t>Language-directed hardware design</a:t>
-            </a:r>
-          </a:p>
-        </p:txBody>
-      </p:sp>
-      <p:sp>
-        <p:nvSpPr>
-          <p:cNvPr id="2" name="Slide Number Placeholder 1"/>
-          <p:cNvSpPr>
-            <a:spLocks noGrp="1"/>
-          </p:cNvSpPr>
-          <p:nvPr>
-            <p:ph type="sldNum" sz="quarter" idx="12"/>
-          </p:nvPr>
-        </p:nvSpPr>
-        <p:spPr/>
-        <p:txBody>
-          <a:bodyPr/>
-          <a:lstStyle/>
-          <a:p>
-            <a:fld id="{7ADDFCCE-7BFB-9F43-8A65-C6CBBDF8F088}" type="slidenum">
-              <a:rPr lang="en-US" smtClean="0"/>
-              <a:t>4</a:t>
-            </a:fld>
-            <a:endParaRPr lang="en-US"/>
-          </a:p>
-        </p:txBody>
-      </p:sp>
-    </p:spTree>
-    <p:extLst>
-      <p:ext uri="{BB962C8B-B14F-4D97-AF65-F5344CB8AC3E}">
-        <p14:creationId xmlns:p14="http://schemas.microsoft.com/office/powerpoint/2010/main" val="605997881"/>
-      </p:ext>
-    </p:extLst>
-  </p:cSld>
-  <p:clrMapOvr>
-    <a:masterClrMapping/>
-  </p:clrMapOvr>
-  <mc:AlternateContent xmlns:mc="http://schemas.openxmlformats.org/markup-compatibility/2006" xmlns:p14="http://schemas.microsoft.com/office/powerpoint/2010/main">
-    <mc:Choice Requires="p14">
-      <p:transition spd="slow" p14:dur="2000" advTm="21014"/>
-    </mc:Choice>
-    <mc:Fallback xmlns="">
-      <p:transition spd="slow" advTm="21014"/>
-    </mc:Fallback>
-  </mc:AlternateContent>
-</p:sld>
-</file>
-
-<file path=ppt/slides/slide40.xml><?xml version="1.0" encoding="utf-8"?>
+<file path=ppt/slides/slide39.xml><?xml version="1.0" encoding="utf-8"?>
 <p:sld xmlns:a="http://schemas.openxmlformats.org/drawingml/2006/main" xmlns:r="http://schemas.openxmlformats.org/officeDocument/2006/relationships" xmlns:p="http://schemas.openxmlformats.org/presentationml/2006/main">
   <p:cSld>
     <p:spTree>
@@ -35341,7 +34737,7 @@
           <a:p>
             <a:fld id="{7ADDFCCE-7BFB-9F43-8A65-C6CBBDF8F088}" type="slidenum">
               <a:rPr lang="en-US" smtClean="0"/>
-              <a:t>40</a:t>
+              <a:t>39</a:t>
             </a:fld>
             <a:endParaRPr lang="en-US" dirty="0"/>
           </a:p>
@@ -35521,7 +34917,109 @@
 </p:sld>
 </file>
 
-<file path=ppt/slides/slide41.xml><?xml version="1.0" encoding="utf-8"?>
+<file path=ppt/slides/slide4.xml><?xml version="1.0" encoding="utf-8"?>
+<p:sld xmlns:a="http://schemas.openxmlformats.org/drawingml/2006/main" xmlns:r="http://schemas.openxmlformats.org/officeDocument/2006/relationships" xmlns:p="http://schemas.openxmlformats.org/presentationml/2006/main">
+  <p:cSld>
+    <p:spTree>
+      <p:nvGrpSpPr>
+        <p:cNvPr id="1" name=""/>
+        <p:cNvGrpSpPr/>
+        <p:nvPr/>
+      </p:nvGrpSpPr>
+      <p:grpSpPr>
+        <a:xfrm>
+          <a:off x="0" y="0"/>
+          <a:ext cx="0" cy="0"/>
+          <a:chOff x="0" y="0"/>
+          <a:chExt cx="0" cy="0"/>
+        </a:xfrm>
+      </p:grpSpPr>
+      <p:sp>
+        <p:nvSpPr>
+          <p:cNvPr id="4" name="TextBox 3"/>
+          <p:cNvSpPr txBox="1"/>
+          <p:nvPr/>
+        </p:nvSpPr>
+        <p:spPr>
+          <a:xfrm>
+            <a:off x="405860" y="2169272"/>
+            <a:ext cx="11317826" cy="1938992"/>
+          </a:xfrm>
+          <a:prstGeom prst="rect">
+            <a:avLst/>
+          </a:prstGeom>
+          <a:noFill/>
+        </p:spPr>
+        <p:txBody>
+          <a:bodyPr wrap="square" rtlCol="0">
+            <a:spAutoFit/>
+          </a:bodyPr>
+          <a:lstStyle/>
+          <a:p>
+            <a:pPr algn="ctr"/>
+            <a:r>
+              <a:rPr lang="en-US" sz="4000" dirty="0"/>
+              <a:t>We want to build future-proof switch hardware:</a:t>
+            </a:r>
+          </a:p>
+          <a:p>
+            <a:pPr algn="ctr"/>
+            <a:endParaRPr lang="en-US" sz="4000" dirty="0"/>
+          </a:p>
+          <a:p>
+            <a:pPr algn="ctr"/>
+            <a:r>
+              <a:rPr lang="en-US" sz="4000" dirty="0"/>
+              <a:t>Language-directed hardware design</a:t>
+            </a:r>
+          </a:p>
+        </p:txBody>
+      </p:sp>
+      <p:sp>
+        <p:nvSpPr>
+          <p:cNvPr id="2" name="Slide Number Placeholder 1"/>
+          <p:cNvSpPr>
+            <a:spLocks noGrp="1"/>
+          </p:cNvSpPr>
+          <p:nvPr>
+            <p:ph type="sldNum" sz="quarter" idx="12"/>
+          </p:nvPr>
+        </p:nvSpPr>
+        <p:spPr/>
+        <p:txBody>
+          <a:bodyPr/>
+          <a:lstStyle/>
+          <a:p>
+            <a:fld id="{7ADDFCCE-7BFB-9F43-8A65-C6CBBDF8F088}" type="slidenum">
+              <a:rPr lang="en-US" smtClean="0"/>
+              <a:t>4</a:t>
+            </a:fld>
+            <a:endParaRPr lang="en-US"/>
+          </a:p>
+        </p:txBody>
+      </p:sp>
+    </p:spTree>
+    <p:extLst>
+      <p:ext uri="{BB962C8B-B14F-4D97-AF65-F5344CB8AC3E}">
+        <p14:creationId xmlns:p14="http://schemas.microsoft.com/office/powerpoint/2010/main" val="605997881"/>
+      </p:ext>
+    </p:extLst>
+  </p:cSld>
+  <p:clrMapOvr>
+    <a:masterClrMapping/>
+  </p:clrMapOvr>
+  <mc:AlternateContent xmlns:mc="http://schemas.openxmlformats.org/markup-compatibility/2006" xmlns:p14="http://schemas.microsoft.com/office/powerpoint/2010/main">
+    <mc:Choice Requires="p14">
+      <p:transition spd="slow" p14:dur="2000" advTm="21014"/>
+    </mc:Choice>
+    <mc:Fallback xmlns="">
+      <p:transition spd="slow" advTm="21014"/>
+    </mc:Fallback>
+  </mc:AlternateContent>
+</p:sld>
+</file>
+
+<file path=ppt/slides/slide40.xml><?xml version="1.0" encoding="utf-8"?>
 <p:sld xmlns:a="http://schemas.openxmlformats.org/drawingml/2006/main" xmlns:r="http://schemas.openxmlformats.org/officeDocument/2006/relationships" xmlns:p="http://schemas.openxmlformats.org/presentationml/2006/main">
   <p:cSld>
     <p:spTree>
@@ -35690,7 +35188,7 @@
           <a:p>
             <a:fld id="{7ADDFCCE-7BFB-9F43-8A65-C6CBBDF8F088}" type="slidenum">
               <a:rPr lang="en-US" smtClean="0"/>
-              <a:t>41</a:t>
+              <a:t>40</a:t>
             </a:fld>
             <a:endParaRPr lang="en-US"/>
           </a:p>
@@ -35908,7 +35406,7 @@
           <a:lstStyle/>
           <a:p>
             <a:pPr algn="ctr"/>
-            <a:endParaRPr lang="en-US"/>
+            <a:endParaRPr lang="en-US" dirty="0"/>
           </a:p>
         </p:txBody>
       </p:sp>
@@ -36008,6 +35506,68 @@
           <a:p>
             <a:pPr algn="ctr"/>
             <a:endParaRPr lang="en-US"/>
+          </a:p>
+        </p:txBody>
+      </p:sp>
+      <p:sp>
+        <p:nvSpPr>
+          <p:cNvPr id="12" name="U-Turn Arrow 11">
+            <a:extLst>
+              <a:ext uri="{FF2B5EF4-FFF2-40B4-BE49-F238E27FC236}">
+                <a16:creationId xmlns:a16="http://schemas.microsoft.com/office/drawing/2014/main" id="{49E0B08E-DF37-1840-89A2-39B3AB2E2FAC}"/>
+              </a:ext>
+            </a:extLst>
+          </p:cNvPr>
+          <p:cNvSpPr/>
+          <p:nvPr/>
+        </p:nvSpPr>
+        <p:spPr>
+          <a:xfrm rot="16200000" flipV="1">
+            <a:off x="9726723" y="3934450"/>
+            <a:ext cx="2903955" cy="967503"/>
+          </a:xfrm>
+          <a:prstGeom prst="uturnArrow">
+            <a:avLst>
+              <a:gd name="adj1" fmla="val 25000"/>
+              <a:gd name="adj2" fmla="val 25000"/>
+              <a:gd name="adj3" fmla="val 25000"/>
+              <a:gd name="adj4" fmla="val 43750"/>
+              <a:gd name="adj5" fmla="val 100000"/>
+            </a:avLst>
+          </a:prstGeom>
+          <a:noFill/>
+          <a:ln w="63500">
+            <a:solidFill>
+              <a:schemeClr val="tx1"/>
+            </a:solidFill>
+          </a:ln>
+        </p:spPr>
+        <p:style>
+          <a:lnRef idx="2">
+            <a:schemeClr val="accent1">
+              <a:shade val="50000"/>
+            </a:schemeClr>
+          </a:lnRef>
+          <a:fillRef idx="1">
+            <a:schemeClr val="accent1"/>
+          </a:fillRef>
+          <a:effectRef idx="0">
+            <a:schemeClr val="accent1"/>
+          </a:effectRef>
+          <a:fontRef idx="minor">
+            <a:schemeClr val="lt1"/>
+          </a:fontRef>
+        </p:style>
+        <p:txBody>
+          <a:bodyPr rtlCol="0" anchor="ctr"/>
+          <a:lstStyle/>
+          <a:p>
+            <a:pPr algn="ctr"/>
+            <a:endParaRPr lang="en-US" dirty="0">
+              <a:solidFill>
+                <a:schemeClr val="tx1"/>
+              </a:solidFill>
+            </a:endParaRPr>
           </a:p>
         </p:txBody>
       </p:sp>

</xml_diff>

<commit_message>
Simplify and remove the word fold function.
</commit_message>
<xml_diff>
--- a/marple.pptx
+++ b/marple.pptx
@@ -865,7 +865,7 @@
             </a:r>
             <a:r>
               <a:rPr lang="en-US" dirty="0"/>
-              <a:t> tells you how to partition the original stream into sub-streams. Here, you partition the filtered stream R1 using the packet’s 5 tuple. Then you supply what’s called a fold function that tells you how to maintain and update state across packets in each sub stream. Here, the fold function maintains an exponentially weighted moving average filter over the packets of each sub stream by applying a gain of alpha to the queuing latency of each packet and a gain of 1-alpha to the previous value of the exponentially weight moving average.</a:t>
+              <a:t> tells you how to partition the original stream into sub-streams. Here, you partition the filtered stream R1 using the packet’s 5 tuple. Then you supply a function that tells you what per-sub-stream state to maintain and how to update it when a new packet arrives. Here, the function maintains an exponentially weighted moving average filter over the packets of each sub stream by applying a gain of alpha to the queuing latency of each packet and a gain of 1-alpha to the previous value of the exponentially weight moving average.</a:t>
             </a:r>
           </a:p>
         </p:txBody>
@@ -960,7 +960,7 @@
             </a:r>
             <a:r>
               <a:rPr lang="en-US" baseline="0" dirty="0"/>
-              <a:t> construct. Again, we divide up the packet stream by 5tuple like the previous example. The fold function is different now and we use the fold function </a:t>
+              <a:t> construct. Again, we divide up the packet stream by 5tuple like the previous example. The function is different now and we use the function </a:t>
             </a:r>
             <a:r>
               <a:rPr lang="en-US" baseline="0" dirty="0" err="1"/>
@@ -2444,15 +2444,6 @@
             <a:r>
               <a:rPr lang="en-US" dirty="0"/>
               <a:t>But how do I merge an old and new value for a given key? What does that even mean? Let’s look at this problem more formally. We want to merge the two values, old and new, so that it is as if the statistics function ran over the entire packet stream without any evictions. That way we can retain full accuracy while merging. Let’s introduce some notation for this. Let’s represent the statistics function as a function g over the packet sequence. For a simple counter, the function is the sum of the packet lengths (or any other packet header).</a:t>
-            </a:r>
-          </a:p>
-          <a:p>
-            <a:endParaRPr lang="en-US" dirty="0"/>
-          </a:p>
-          <a:p>
-            <a:r>
-              <a:rPr lang="en-US" dirty="0"/>
-              <a:t>The fold function that we talked about earlier is just an incremental version of the same g.</a:t>
             </a:r>
           </a:p>
         </p:txBody>
@@ -8848,103 +8839,6 @@
           </a:p>
         </p:txBody>
       </p:sp>
-      <p:grpSp>
-        <p:nvGrpSpPr>
-          <p:cNvPr id="6" name="Group 5"/>
-          <p:cNvGrpSpPr/>
-          <p:nvPr/>
-        </p:nvGrpSpPr>
-        <p:grpSpPr>
-          <a:xfrm>
-            <a:off x="7911735" y="3357175"/>
-            <a:ext cx="3720359" cy="1397398"/>
-            <a:chOff x="8351715" y="3793358"/>
-            <a:chExt cx="2348759" cy="1233609"/>
-          </a:xfrm>
-        </p:grpSpPr>
-        <p:sp>
-          <p:nvSpPr>
-            <p:cNvPr id="7" name="Rounded Rectangle 6"/>
-            <p:cNvSpPr/>
-            <p:nvPr/>
-          </p:nvSpPr>
-          <p:spPr>
-            <a:xfrm>
-              <a:off x="8351715" y="3793358"/>
-              <a:ext cx="2348759" cy="874596"/>
-            </a:xfrm>
-            <a:prstGeom prst="roundRect">
-              <a:avLst/>
-            </a:prstGeom>
-            <a:solidFill>
-              <a:srgbClr val="A31E34"/>
-            </a:solidFill>
-            <a:ln w="50800">
-              <a:solidFill>
-                <a:srgbClr val="A31E34"/>
-              </a:solidFill>
-            </a:ln>
-          </p:spPr>
-          <p:style>
-            <a:lnRef idx="2">
-              <a:schemeClr val="accent1">
-                <a:shade val="50000"/>
-              </a:schemeClr>
-            </a:lnRef>
-            <a:fillRef idx="1">
-              <a:schemeClr val="accent1"/>
-            </a:fillRef>
-            <a:effectRef idx="0">
-              <a:schemeClr val="accent1"/>
-            </a:effectRef>
-            <a:fontRef idx="minor">
-              <a:schemeClr val="lt1"/>
-            </a:fontRef>
-          </p:style>
-          <p:txBody>
-            <a:bodyPr rtlCol="0" anchor="ctr"/>
-            <a:lstStyle/>
-            <a:p>
-              <a:pPr algn="ctr"/>
-              <a:endParaRPr lang="en-US"/>
-            </a:p>
-          </p:txBody>
-        </p:sp>
-        <p:sp>
-          <p:nvSpPr>
-            <p:cNvPr id="8" name="TextBox 7"/>
-            <p:cNvSpPr txBox="1"/>
-            <p:nvPr/>
-          </p:nvSpPr>
-          <p:spPr>
-            <a:xfrm>
-              <a:off x="8512917" y="3949749"/>
-              <a:ext cx="2026355" cy="1077218"/>
-            </a:xfrm>
-            <a:prstGeom prst="rect">
-              <a:avLst/>
-            </a:prstGeom>
-            <a:noFill/>
-          </p:spPr>
-          <p:txBody>
-            <a:bodyPr wrap="square" rtlCol="0">
-              <a:spAutoFit/>
-            </a:bodyPr>
-            <a:lstStyle/>
-            <a:p>
-              <a:pPr algn="ctr"/>
-              <a:r>
-                <a:rPr lang="en-US" sz="3200" dirty="0">
-                  <a:solidFill>
-                    <a:schemeClr val="bg1"/>
-                  </a:solidFill>
-                </a:rPr>
-                <a:t>Fold function</a:t>
-              </a:r>
-            </a:p>
-          </p:txBody>
-        </p:sp>
-      </p:grpSp>
     </p:spTree>
     <p:custDataLst>
       <p:tags r:id="rId1"/>
@@ -9000,51 +8894,6 @@
                                           </p:stCondLst>
                                         </p:cTn>
                                         <p:tgtEl>
-                                          <p:spTgt spid="6"/>
-                                        </p:tgtEl>
-                                        <p:attrNameLst>
-                                          <p:attrName>style.visibility</p:attrName>
-                                        </p:attrNameLst>
-                                      </p:cBhvr>
-                                      <p:to>
-                                        <p:strVal val="visible"/>
-                                      </p:to>
-                                    </p:set>
-                                  </p:childTnLst>
-                                </p:cTn>
-                              </p:par>
-                            </p:childTnLst>
-                          </p:cTn>
-                        </p:par>
-                      </p:childTnLst>
-                    </p:cTn>
-                  </p:par>
-                  <p:par>
-                    <p:cTn id="7" fill="hold">
-                      <p:stCondLst>
-                        <p:cond delay="indefinite"/>
-                      </p:stCondLst>
-                      <p:childTnLst>
-                        <p:par>
-                          <p:cTn id="8" fill="hold">
-                            <p:stCondLst>
-                              <p:cond delay="0"/>
-                            </p:stCondLst>
-                            <p:childTnLst>
-                              <p:par>
-                                <p:cTn id="9" presetID="1" presetClass="entr" presetSubtype="0" fill="hold" nodeType="clickEffect">
-                                  <p:stCondLst>
-                                    <p:cond delay="0"/>
-                                  </p:stCondLst>
-                                  <p:childTnLst>
-                                    <p:set>
-                                      <p:cBhvr>
-                                        <p:cTn id="10" dur="1" fill="hold">
-                                          <p:stCondLst>
-                                            <p:cond delay="0"/>
-                                          </p:stCondLst>
-                                        </p:cTn>
-                                        <p:tgtEl>
                                           <p:spTgt spid="10"/>
                                         </p:tgtEl>
                                         <p:attrNameLst>
@@ -9059,14 +8908,14 @@
                                 </p:cTn>
                               </p:par>
                               <p:par>
-                                <p:cTn id="11" presetID="1" presetClass="entr" presetSubtype="0" fill="hold" nodeType="withEffect">
+                                <p:cTn id="7" presetID="1" presetClass="entr" presetSubtype="0" fill="hold" nodeType="withEffect">
                                   <p:stCondLst>
                                     <p:cond delay="0"/>
                                   </p:stCondLst>
                                   <p:childTnLst>
                                     <p:set>
                                       <p:cBhvr>
-                                        <p:cTn id="12" dur="1" fill="hold">
+                                        <p:cTn id="8" dur="1" fill="hold">
                                           <p:stCondLst>
                                             <p:cond delay="0"/>
                                           </p:stCondLst>
@@ -9090,14 +8939,14 @@
                                 </p:cTn>
                               </p:par>
                               <p:par>
-                                <p:cTn id="13" presetID="1" presetClass="entr" presetSubtype="0" fill="hold" nodeType="withEffect">
+                                <p:cTn id="9" presetID="1" presetClass="entr" presetSubtype="0" fill="hold" nodeType="withEffect">
                                   <p:stCondLst>
                                     <p:cond delay="0"/>
                                   </p:stCondLst>
                                   <p:childTnLst>
                                     <p:set>
                                       <p:cBhvr>
-                                        <p:cTn id="14" dur="1" fill="hold">
+                                        <p:cTn id="10" dur="1" fill="hold">
                                           <p:stCondLst>
                                             <p:cond delay="0"/>
                                           </p:stCondLst>
@@ -9121,14 +8970,14 @@
                                 </p:cTn>
                               </p:par>
                               <p:par>
-                                <p:cTn id="15" presetID="1" presetClass="entr" presetSubtype="0" fill="hold" nodeType="withEffect">
+                                <p:cTn id="11" presetID="1" presetClass="entr" presetSubtype="0" fill="hold" nodeType="withEffect">
                                   <p:stCondLst>
                                     <p:cond delay="0"/>
                                   </p:stCondLst>
                                   <p:childTnLst>
                                     <p:set>
                                       <p:cBhvr>
-                                        <p:cTn id="16" dur="1" fill="hold">
+                                        <p:cTn id="12" dur="1" fill="hold">
                                           <p:stCondLst>
                                             <p:cond delay="0"/>
                                           </p:stCondLst>
@@ -9242,12 +9091,39 @@
               <a:buNone/>
             </a:pPr>
             <a:r>
+              <a:rPr lang="en-US" sz="3200" dirty="0">
+                <a:latin typeface="Ayuthaya" charset="-34"/>
+                <a:ea typeface="Ayuthaya" charset="-34"/>
+                <a:cs typeface="Ayuthaya" charset="-34"/>
+              </a:rPr>
+              <a:t>result = </a:t>
+            </a:r>
+            <a:r>
+              <a:rPr lang="en-US" sz="3200" dirty="0" err="1">
+                <a:solidFill>
+                  <a:srgbClr val="A31E34"/>
+                </a:solidFill>
+                <a:latin typeface="Ayuthaya" charset="-34"/>
+                <a:ea typeface="Ayuthaya" charset="-34"/>
+                <a:cs typeface="Ayuthaya" charset="-34"/>
+              </a:rPr>
+              <a:t>groupby</a:t>
+            </a:r>
+            <a:r>
+              <a:rPr lang="en-US" sz="3200" dirty="0">
+                <a:latin typeface="Ayuthaya" charset="-34"/>
+                <a:ea typeface="Ayuthaya" charset="-34"/>
+                <a:cs typeface="Ayuthaya" charset="-34"/>
+              </a:rPr>
+              <a:t>(S, 5tuple, </a:t>
+            </a:r>
+            <a:r>
               <a:rPr lang="en-US" sz="3200" dirty="0" err="1">
                 <a:latin typeface="Ayuthaya" charset="-34"/>
                 <a:ea typeface="Ayuthaya" charset="-34"/>
                 <a:cs typeface="Ayuthaya" charset="-34"/>
               </a:rPr>
-              <a:t>def</a:t>
+              <a:t>bursty</a:t>
             </a:r>
             <a:r>
               <a:rPr lang="en-US" sz="3200" dirty="0">
@@ -9255,7 +9131,30 @@
                 <a:ea typeface="Ayuthaya" charset="-34"/>
                 <a:cs typeface="Ayuthaya" charset="-34"/>
               </a:rPr>
-              <a:t> </a:t>
+              <a:t>) </a:t>
+            </a:r>
+          </a:p>
+          <a:p>
+            <a:pPr marL="0" indent="0">
+              <a:buNone/>
+            </a:pPr>
+            <a:endParaRPr lang="en-US" sz="3200" dirty="0">
+              <a:latin typeface="Ayuthaya" charset="-34"/>
+              <a:ea typeface="Ayuthaya" charset="-34"/>
+              <a:cs typeface="Ayuthaya" charset="-34"/>
+            </a:endParaRPr>
+          </a:p>
+          <a:p>
+            <a:pPr marL="0" indent="0">
+              <a:buNone/>
+            </a:pPr>
+            <a:r>
+              <a:rPr lang="en-US" sz="3200" dirty="0">
+                <a:latin typeface="Ayuthaya" charset="-34"/>
+                <a:ea typeface="Ayuthaya" charset="-34"/>
+                <a:cs typeface="Ayuthaya" charset="-34"/>
+              </a:rPr>
+              <a:t>def </a:t>
             </a:r>
             <a:r>
               <a:rPr lang="en-US" sz="3200" dirty="0" err="1">
@@ -9437,54 +9336,6 @@
               <a:ea typeface="Ayuthaya" charset="-34"/>
               <a:cs typeface="Ayuthaya" charset="-34"/>
             </a:endParaRPr>
-          </a:p>
-          <a:p>
-            <a:pPr marL="0" indent="0">
-              <a:buNone/>
-            </a:pPr>
-            <a:r>
-              <a:rPr lang="en-US" sz="3200" dirty="0">
-                <a:latin typeface="Ayuthaya" charset="-34"/>
-                <a:ea typeface="Ayuthaya" charset="-34"/>
-                <a:cs typeface="Ayuthaya" charset="-34"/>
-              </a:rPr>
-              <a:t>result = </a:t>
-            </a:r>
-            <a:r>
-              <a:rPr lang="en-US" sz="3200" dirty="0" err="1">
-                <a:solidFill>
-                  <a:srgbClr val="A31E34"/>
-                </a:solidFill>
-                <a:latin typeface="Ayuthaya" charset="-34"/>
-                <a:ea typeface="Ayuthaya" charset="-34"/>
-                <a:cs typeface="Ayuthaya" charset="-34"/>
-              </a:rPr>
-              <a:t>groupby</a:t>
-            </a:r>
-            <a:r>
-              <a:rPr lang="en-US" sz="3200" dirty="0">
-                <a:latin typeface="Ayuthaya" charset="-34"/>
-                <a:ea typeface="Ayuthaya" charset="-34"/>
-                <a:cs typeface="Ayuthaya" charset="-34"/>
-              </a:rPr>
-              <a:t>(S, 5tuple, </a:t>
-            </a:r>
-            <a:r>
-              <a:rPr lang="en-US" sz="3200" dirty="0" err="1">
-                <a:latin typeface="Ayuthaya" charset="-34"/>
-                <a:ea typeface="Ayuthaya" charset="-34"/>
-                <a:cs typeface="Ayuthaya" charset="-34"/>
-              </a:rPr>
-              <a:t>bursty</a:t>
-            </a:r>
-            <a:r>
-              <a:rPr lang="en-US" sz="3200" dirty="0">
-                <a:latin typeface="Ayuthaya" charset="-34"/>
-                <a:ea typeface="Ayuthaya" charset="-34"/>
-                <a:cs typeface="Ayuthaya" charset="-34"/>
-              </a:rPr>
-              <a:t>) </a:t>
-            </a:r>
           </a:p>
           <a:p>
             <a:pPr marL="0" indent="0">
@@ -9521,6 +9372,50 @@
           </a:p>
         </p:txBody>
       </p:sp>
+      <p:cxnSp>
+        <p:nvCxnSpPr>
+          <p:cNvPr id="7" name="Straight Arrow Connector 6">
+            <a:extLst>
+              <a:ext uri="{FF2B5EF4-FFF2-40B4-BE49-F238E27FC236}">
+                <a16:creationId xmlns:a16="http://schemas.microsoft.com/office/drawing/2014/main" id="{79F8185C-1BAA-0D4B-8DEE-563F4226BD37}"/>
+              </a:ext>
+            </a:extLst>
+          </p:cNvPr>
+          <p:cNvCxnSpPr>
+            <a:cxnSpLocks/>
+          </p:cNvCxnSpPr>
+          <p:nvPr/>
+        </p:nvCxnSpPr>
+        <p:spPr>
+          <a:xfrm flipH="1">
+            <a:off x="3122341" y="2207941"/>
+            <a:ext cx="4638908" cy="825191"/>
+          </a:xfrm>
+          <a:prstGeom prst="straightConnector1">
+            <a:avLst/>
+          </a:prstGeom>
+          <a:ln w="50800">
+            <a:solidFill>
+              <a:schemeClr val="tx1"/>
+            </a:solidFill>
+            <a:tailEnd type="triangle" w="lg" len="med"/>
+          </a:ln>
+        </p:spPr>
+        <p:style>
+          <a:lnRef idx="1">
+            <a:schemeClr val="accent1"/>
+          </a:lnRef>
+          <a:fillRef idx="0">
+            <a:schemeClr val="accent1"/>
+          </a:fillRef>
+          <a:effectRef idx="0">
+            <a:schemeClr val="accent1"/>
+          </a:effectRef>
+          <a:fontRef idx="minor">
+            <a:schemeClr val="tx1"/>
+          </a:fontRef>
+        </p:style>
+      </p:cxnSp>
     </p:spTree>
     <p:custDataLst>
       <p:tags r:id="rId1"/>
@@ -11729,7 +11624,7 @@
           <a:p>
             <a:r>
               <a:rPr lang="en-US" dirty="0"/>
-              <a:t>The classical solution: caching</a:t>
+              <a:t>The standard solution: caching</a:t>
             </a:r>
           </a:p>
         </p:txBody>
@@ -12097,7 +11992,7 @@
           <a:effectLst/>
           <a:extLst>
             <a:ext uri="{909E8E84-426E-40dd-AFC4-6F175D3DCCD1}">
-              <a14:hiddenFill xmlns:a14="http://schemas.microsoft.com/office/drawing/2010/main" xmlns="">
+              <a14:hiddenFill xmlns="" xmlns:a14="http://schemas.microsoft.com/office/drawing/2010/main">
                 <a:blipFill dpi="0" rotWithShape="0">
                   <a:blip/>
                   <a:srcRect/>
@@ -12108,7 +12003,7 @@
               </a14:hiddenFill>
             </a:ext>
             <a:ext uri="{91240B29-F687-4f45-9708-019B960494DF}">
-              <a14:hiddenLine xmlns:a14="http://schemas.microsoft.com/office/drawing/2010/main" xmlns="" w="9525">
+              <a14:hiddenLine xmlns="" xmlns:a14="http://schemas.microsoft.com/office/drawing/2010/main" w="9525">
                 <a:solidFill>
                   <a:srgbClr val="000000"/>
                 </a:solidFill>
@@ -12118,7 +12013,7 @@
               </a14:hiddenLine>
             </a:ext>
             <a:ext uri="{AF507438-7753-43e0-B8FC-AC1667EBCBE1}">
-              <a14:hiddenEffects xmlns:a14="http://schemas.microsoft.com/office/drawing/2010/main" xmlns="">
+              <a14:hiddenEffects xmlns="" xmlns:a14="http://schemas.microsoft.com/office/drawing/2010/main">
                 <a:effectLst>
                   <a:outerShdw blurRad="63500" dist="38099" dir="2700000" algn="ctr" rotWithShape="0">
                     <a:srgbClr val="000000">
@@ -12167,7 +12062,7 @@
           <a:effectLst/>
           <a:extLst>
             <a:ext uri="{909E8E84-426E-40dd-AFC4-6F175D3DCCD1}">
-              <a14:hiddenFill xmlns:a14="http://schemas.microsoft.com/office/drawing/2010/main" xmlns="">
+              <a14:hiddenFill xmlns="" xmlns:a14="http://schemas.microsoft.com/office/drawing/2010/main">
                 <a:blipFill dpi="0" rotWithShape="0">
                   <a:blip/>
                   <a:srcRect/>
@@ -12178,7 +12073,7 @@
               </a14:hiddenFill>
             </a:ext>
             <a:ext uri="{91240B29-F687-4f45-9708-019B960494DF}">
-              <a14:hiddenLine xmlns:a14="http://schemas.microsoft.com/office/drawing/2010/main" xmlns="" w="9525">
+              <a14:hiddenLine xmlns="" xmlns:a14="http://schemas.microsoft.com/office/drawing/2010/main" w="9525">
                 <a:solidFill>
                   <a:srgbClr val="000000"/>
                 </a:solidFill>
@@ -12188,7 +12083,7 @@
               </a14:hiddenLine>
             </a:ext>
             <a:ext uri="{AF507438-7753-43e0-B8FC-AC1667EBCBE1}">
-              <a14:hiddenEffects xmlns:a14="http://schemas.microsoft.com/office/drawing/2010/main" xmlns="">
+              <a14:hiddenEffects xmlns="" xmlns:a14="http://schemas.microsoft.com/office/drawing/2010/main">
                 <a:effectLst>
                   <a:outerShdw blurRad="63500" dist="38099" dir="2700000" algn="ctr" rotWithShape="0">
                     <a:srgbClr val="000000">
@@ -12323,7 +12218,7 @@
             <a:effectLst/>
             <a:extLst>
               <a:ext uri="{909E8E84-426E-40dd-AFC4-6F175D3DCCD1}">
-                <a14:hiddenFill xmlns="" xmlns:a14="http://schemas.microsoft.com/office/drawing/2010/main">
+                <a14:hiddenFill xmlns:a14="http://schemas.microsoft.com/office/drawing/2010/main" xmlns="">
                   <a:blipFill dpi="0" rotWithShape="0">
                     <a:blip/>
                     <a:srcRect/>
@@ -12334,7 +12229,7 @@
                 </a14:hiddenFill>
               </a:ext>
               <a:ext uri="{91240B29-F687-4f45-9708-019B960494DF}">
-                <a14:hiddenLine xmlns="" xmlns:a14="http://schemas.microsoft.com/office/drawing/2010/main" w="9525">
+                <a14:hiddenLine xmlns:a14="http://schemas.microsoft.com/office/drawing/2010/main" xmlns="" w="9525">
                   <a:solidFill>
                     <a:srgbClr val="000000"/>
                   </a:solidFill>
@@ -12344,7 +12239,7 @@
                 </a14:hiddenLine>
               </a:ext>
               <a:ext uri="{AF507438-7753-43e0-B8FC-AC1667EBCBE1}">
-                <a14:hiddenEffects xmlns="" xmlns:a14="http://schemas.microsoft.com/office/drawing/2010/main">
+                <a14:hiddenEffects xmlns:a14="http://schemas.microsoft.com/office/drawing/2010/main" xmlns="">
                   <a:effectLst>
                     <a:outerShdw blurRad="63500" dist="38099" dir="2700000" algn="ctr" rotWithShape="0">
                       <a:srgbClr val="000000">
@@ -12393,7 +12288,7 @@
             <a:effectLst/>
             <a:extLst>
               <a:ext uri="{909E8E84-426E-40dd-AFC4-6F175D3DCCD1}">
-                <a14:hiddenFill xmlns="" xmlns:a14="http://schemas.microsoft.com/office/drawing/2010/main">
+                <a14:hiddenFill xmlns:a14="http://schemas.microsoft.com/office/drawing/2010/main" xmlns="">
                   <a:blipFill dpi="0" rotWithShape="0">
                     <a:blip/>
                     <a:srcRect/>
@@ -12404,7 +12299,7 @@
                 </a14:hiddenFill>
               </a:ext>
               <a:ext uri="{91240B29-F687-4f45-9708-019B960494DF}">
-                <a14:hiddenLine xmlns="" xmlns:a14="http://schemas.microsoft.com/office/drawing/2010/main" w="9525">
+                <a14:hiddenLine xmlns:a14="http://schemas.microsoft.com/office/drawing/2010/main" xmlns="" w="9525">
                   <a:solidFill>
                     <a:srgbClr val="000000"/>
                   </a:solidFill>
@@ -12414,7 +12309,7 @@
                 </a14:hiddenLine>
               </a:ext>
               <a:ext uri="{AF507438-7753-43e0-B8FC-AC1667EBCBE1}">
-                <a14:hiddenEffects xmlns="" xmlns:a14="http://schemas.microsoft.com/office/drawing/2010/main">
+                <a14:hiddenEffects xmlns:a14="http://schemas.microsoft.com/office/drawing/2010/main" xmlns="">
                   <a:effectLst>
                     <a:outerShdw blurRad="63500" dist="38099" dir="2700000" algn="ctr" rotWithShape="0">
                       <a:srgbClr val="000000">
@@ -12463,7 +12358,7 @@
             <a:effectLst/>
             <a:extLst>
               <a:ext uri="{909E8E84-426E-40dd-AFC4-6F175D3DCCD1}">
-                <a14:hiddenFill xmlns="" xmlns:a14="http://schemas.microsoft.com/office/drawing/2010/main">
+                <a14:hiddenFill xmlns:a14="http://schemas.microsoft.com/office/drawing/2010/main" xmlns="">
                   <a:blipFill dpi="0" rotWithShape="0">
                     <a:blip/>
                     <a:srcRect/>
@@ -12474,7 +12369,7 @@
                 </a14:hiddenFill>
               </a:ext>
               <a:ext uri="{91240B29-F687-4f45-9708-019B960494DF}">
-                <a14:hiddenLine xmlns="" xmlns:a14="http://schemas.microsoft.com/office/drawing/2010/main" w="9525">
+                <a14:hiddenLine xmlns:a14="http://schemas.microsoft.com/office/drawing/2010/main" xmlns="" w="9525">
                   <a:solidFill>
                     <a:srgbClr val="000000"/>
                   </a:solidFill>
@@ -12484,7 +12379,7 @@
                 </a14:hiddenLine>
               </a:ext>
               <a:ext uri="{AF507438-7753-43e0-B8FC-AC1667EBCBE1}">
-                <a14:hiddenEffects xmlns="" xmlns:a14="http://schemas.microsoft.com/office/drawing/2010/main">
+                <a14:hiddenEffects xmlns:a14="http://schemas.microsoft.com/office/drawing/2010/main" xmlns="">
                   <a:effectLst>
                     <a:outerShdw blurRad="63500" dist="38099" dir="2700000" algn="ctr" rotWithShape="0">
                       <a:srgbClr val="000000">
@@ -12525,12 +12420,12 @@
             <a:effectLst/>
             <a:extLst>
               <a:ext uri="{909E8E84-426E-40dd-AFC4-6F175D3DCCD1}">
-                <a14:hiddenFill xmlns="" xmlns:a14="http://schemas.microsoft.com/office/drawing/2010/main">
+                <a14:hiddenFill xmlns:a14="http://schemas.microsoft.com/office/drawing/2010/main" xmlns="">
                   <a:noFill/>
                 </a14:hiddenFill>
               </a:ext>
               <a:ext uri="{AF507438-7753-43e0-B8FC-AC1667EBCBE1}">
-                <a14:hiddenEffects xmlns="" xmlns:a14="http://schemas.microsoft.com/office/drawing/2010/main">
+                <a14:hiddenEffects xmlns:a14="http://schemas.microsoft.com/office/drawing/2010/main" xmlns="">
                   <a:effectLst>
                     <a:outerShdw blurRad="63500" dist="38099" dir="2700000" algn="ctr" rotWithShape="0">
                       <a:srgbClr val="000000">
@@ -12583,12 +12478,12 @@
             <a:effectLst/>
             <a:extLst>
               <a:ext uri="{909E8E84-426E-40dd-AFC4-6F175D3DCCD1}">
-                <a14:hiddenFill xmlns="" xmlns:a14="http://schemas.microsoft.com/office/drawing/2010/main">
+                <a14:hiddenFill xmlns:a14="http://schemas.microsoft.com/office/drawing/2010/main" xmlns="">
                   <a:noFill/>
                 </a14:hiddenFill>
               </a:ext>
               <a:ext uri="{AF507438-7753-43e0-B8FC-AC1667EBCBE1}">
-                <a14:hiddenEffects xmlns="" xmlns:a14="http://schemas.microsoft.com/office/drawing/2010/main">
+                <a14:hiddenEffects xmlns:a14="http://schemas.microsoft.com/office/drawing/2010/main" xmlns="">
                   <a:effectLst>
                     <a:outerShdw blurRad="63500" dist="38099" dir="2700000" algn="ctr" rotWithShape="0">
                       <a:srgbClr val="000000">
@@ -12641,12 +12536,12 @@
             <a:effectLst/>
             <a:extLst>
               <a:ext uri="{909E8E84-426E-40dd-AFC4-6F175D3DCCD1}">
-                <a14:hiddenFill xmlns="" xmlns:a14="http://schemas.microsoft.com/office/drawing/2010/main">
+                <a14:hiddenFill xmlns:a14="http://schemas.microsoft.com/office/drawing/2010/main" xmlns="">
                   <a:noFill/>
                 </a14:hiddenFill>
               </a:ext>
               <a:ext uri="{AF507438-7753-43e0-B8FC-AC1667EBCBE1}">
-                <a14:hiddenEffects xmlns="" xmlns:a14="http://schemas.microsoft.com/office/drawing/2010/main">
+                <a14:hiddenEffects xmlns:a14="http://schemas.microsoft.com/office/drawing/2010/main" xmlns="">
                   <a:effectLst>
                     <a:outerShdw blurRad="63500" dist="38099" dir="2700000" algn="ctr" rotWithShape="0">
                       <a:srgbClr val="000000">
@@ -12699,12 +12594,12 @@
             <a:effectLst/>
             <a:extLst>
               <a:ext uri="{909E8E84-426E-40dd-AFC4-6F175D3DCCD1}">
-                <a14:hiddenFill xmlns="" xmlns:a14="http://schemas.microsoft.com/office/drawing/2010/main">
+                <a14:hiddenFill xmlns:a14="http://schemas.microsoft.com/office/drawing/2010/main" xmlns="">
                   <a:noFill/>
                 </a14:hiddenFill>
               </a:ext>
               <a:ext uri="{AF507438-7753-43e0-B8FC-AC1667EBCBE1}">
-                <a14:hiddenEffects xmlns="" xmlns:a14="http://schemas.microsoft.com/office/drawing/2010/main">
+                <a14:hiddenEffects xmlns:a14="http://schemas.microsoft.com/office/drawing/2010/main" xmlns="">
                   <a:effectLst>
                     <a:outerShdw blurRad="63500" dist="38099" dir="2700000" algn="ctr" rotWithShape="0">
                       <a:srgbClr val="000000">
@@ -12757,12 +12652,12 @@
             <a:effectLst/>
             <a:extLst>
               <a:ext uri="{909E8E84-426E-40dd-AFC4-6F175D3DCCD1}">
-                <a14:hiddenFill xmlns="" xmlns:a14="http://schemas.microsoft.com/office/drawing/2010/main">
+                <a14:hiddenFill xmlns:a14="http://schemas.microsoft.com/office/drawing/2010/main" xmlns="">
                   <a:noFill/>
                 </a14:hiddenFill>
               </a:ext>
               <a:ext uri="{AF507438-7753-43e0-B8FC-AC1667EBCBE1}">
-                <a14:hiddenEffects xmlns="" xmlns:a14="http://schemas.microsoft.com/office/drawing/2010/main">
+                <a14:hiddenEffects xmlns:a14="http://schemas.microsoft.com/office/drawing/2010/main" xmlns="">
                   <a:effectLst>
                     <a:outerShdw blurRad="63500" dist="38099" dir="2700000" algn="ctr" rotWithShape="0">
                       <a:srgbClr val="000000">
@@ -12815,12 +12710,12 @@
             <a:effectLst/>
             <a:extLst>
               <a:ext uri="{909E8E84-426E-40dd-AFC4-6F175D3DCCD1}">
-                <a14:hiddenFill xmlns="" xmlns:a14="http://schemas.microsoft.com/office/drawing/2010/main">
+                <a14:hiddenFill xmlns:a14="http://schemas.microsoft.com/office/drawing/2010/main" xmlns="">
                   <a:noFill/>
                 </a14:hiddenFill>
               </a:ext>
               <a:ext uri="{AF507438-7753-43e0-B8FC-AC1667EBCBE1}">
-                <a14:hiddenEffects xmlns="" xmlns:a14="http://schemas.microsoft.com/office/drawing/2010/main">
+                <a14:hiddenEffects xmlns:a14="http://schemas.microsoft.com/office/drawing/2010/main" xmlns="">
                   <a:effectLst>
                     <a:outerShdw blurRad="63500" dist="38099" dir="2700000" algn="ctr" rotWithShape="0">
                       <a:srgbClr val="000000">
@@ -12873,12 +12768,12 @@
             <a:effectLst/>
             <a:extLst>
               <a:ext uri="{909E8E84-426E-40dd-AFC4-6F175D3DCCD1}">
-                <a14:hiddenFill xmlns="" xmlns:a14="http://schemas.microsoft.com/office/drawing/2010/main">
+                <a14:hiddenFill xmlns:a14="http://schemas.microsoft.com/office/drawing/2010/main" xmlns="">
                   <a:noFill/>
                 </a14:hiddenFill>
               </a:ext>
               <a:ext uri="{AF507438-7753-43e0-B8FC-AC1667EBCBE1}">
-                <a14:hiddenEffects xmlns="" xmlns:a14="http://schemas.microsoft.com/office/drawing/2010/main">
+                <a14:hiddenEffects xmlns:a14="http://schemas.microsoft.com/office/drawing/2010/main" xmlns="">
                   <a:effectLst>
                     <a:outerShdw blurRad="63500" dist="38099" dir="2700000" algn="ctr" rotWithShape="0">
                       <a:srgbClr val="000000">
@@ -12931,12 +12826,12 @@
             <a:effectLst/>
             <a:extLst>
               <a:ext uri="{909E8E84-426E-40dd-AFC4-6F175D3DCCD1}">
-                <a14:hiddenFill xmlns="" xmlns:a14="http://schemas.microsoft.com/office/drawing/2010/main">
+                <a14:hiddenFill xmlns:a14="http://schemas.microsoft.com/office/drawing/2010/main" xmlns="">
                   <a:noFill/>
                 </a14:hiddenFill>
               </a:ext>
               <a:ext uri="{AF507438-7753-43e0-B8FC-AC1667EBCBE1}">
-                <a14:hiddenEffects xmlns="" xmlns:a14="http://schemas.microsoft.com/office/drawing/2010/main">
+                <a14:hiddenEffects xmlns:a14="http://schemas.microsoft.com/office/drawing/2010/main" xmlns="">
                   <a:effectLst>
                     <a:outerShdw blurRad="63500" dist="38099" dir="2700000" algn="ctr" rotWithShape="0">
                       <a:srgbClr val="000000">
@@ -12989,12 +12884,12 @@
             <a:effectLst/>
             <a:extLst>
               <a:ext uri="{909E8E84-426E-40dd-AFC4-6F175D3DCCD1}">
-                <a14:hiddenFill xmlns="" xmlns:a14="http://schemas.microsoft.com/office/drawing/2010/main">
+                <a14:hiddenFill xmlns:a14="http://schemas.microsoft.com/office/drawing/2010/main" xmlns="">
                   <a:noFill/>
                 </a14:hiddenFill>
               </a:ext>
               <a:ext uri="{AF507438-7753-43e0-B8FC-AC1667EBCBE1}">
-                <a14:hiddenEffects xmlns="" xmlns:a14="http://schemas.microsoft.com/office/drawing/2010/main">
+                <a14:hiddenEffects xmlns:a14="http://schemas.microsoft.com/office/drawing/2010/main" xmlns="">
                   <a:effectLst>
                     <a:outerShdw blurRad="63500" dist="38099" dir="2700000" algn="ctr" rotWithShape="0">
                       <a:srgbClr val="000000">
@@ -13047,12 +12942,12 @@
             <a:effectLst/>
             <a:extLst>
               <a:ext uri="{909E8E84-426E-40dd-AFC4-6F175D3DCCD1}">
-                <a14:hiddenFill xmlns="" xmlns:a14="http://schemas.microsoft.com/office/drawing/2010/main">
+                <a14:hiddenFill xmlns:a14="http://schemas.microsoft.com/office/drawing/2010/main" xmlns="">
                   <a:noFill/>
                 </a14:hiddenFill>
               </a:ext>
               <a:ext uri="{AF507438-7753-43e0-B8FC-AC1667EBCBE1}">
-                <a14:hiddenEffects xmlns="" xmlns:a14="http://schemas.microsoft.com/office/drawing/2010/main">
+                <a14:hiddenEffects xmlns:a14="http://schemas.microsoft.com/office/drawing/2010/main" xmlns="">
                   <a:effectLst>
                     <a:outerShdw blurRad="63500" dist="38099" dir="2700000" algn="ctr" rotWithShape="0">
                       <a:srgbClr val="000000">
@@ -13113,7 +13008,7 @@
             <a:effectLst/>
             <a:extLst>
               <a:ext uri="{909E8E84-426E-40dd-AFC4-6F175D3DCCD1}">
-                <a14:hiddenFill xmlns="" xmlns:a14="http://schemas.microsoft.com/office/drawing/2010/main">
+                <a14:hiddenFill xmlns:a14="http://schemas.microsoft.com/office/drawing/2010/main" xmlns="">
                   <a:blipFill dpi="0" rotWithShape="0">
                     <a:blip/>
                     <a:srcRect/>
@@ -13124,7 +13019,7 @@
                 </a14:hiddenFill>
               </a:ext>
               <a:ext uri="{91240B29-F687-4f45-9708-019B960494DF}">
-                <a14:hiddenLine xmlns="" xmlns:a14="http://schemas.microsoft.com/office/drawing/2010/main" w="9525">
+                <a14:hiddenLine xmlns:a14="http://schemas.microsoft.com/office/drawing/2010/main" xmlns="" w="9525">
                   <a:solidFill>
                     <a:srgbClr val="000000"/>
                   </a:solidFill>
@@ -13134,7 +13029,7 @@
                 </a14:hiddenLine>
               </a:ext>
               <a:ext uri="{AF507438-7753-43e0-B8FC-AC1667EBCBE1}">
-                <a14:hiddenEffects xmlns="" xmlns:a14="http://schemas.microsoft.com/office/drawing/2010/main">
+                <a14:hiddenEffects xmlns:a14="http://schemas.microsoft.com/office/drawing/2010/main" xmlns="">
                   <a:effectLst>
                     <a:outerShdw blurRad="63500" dist="38099" dir="2700000" algn="ctr" rotWithShape="0">
                       <a:srgbClr val="000000">
@@ -13183,7 +13078,7 @@
             <a:effectLst/>
             <a:extLst>
               <a:ext uri="{909E8E84-426E-40dd-AFC4-6F175D3DCCD1}">
-                <a14:hiddenFill xmlns="" xmlns:a14="http://schemas.microsoft.com/office/drawing/2010/main">
+                <a14:hiddenFill xmlns:a14="http://schemas.microsoft.com/office/drawing/2010/main" xmlns="">
                   <a:blipFill dpi="0" rotWithShape="0">
                     <a:blip/>
                     <a:srcRect/>
@@ -13194,7 +13089,7 @@
                 </a14:hiddenFill>
               </a:ext>
               <a:ext uri="{91240B29-F687-4f45-9708-019B960494DF}">
-                <a14:hiddenLine xmlns="" xmlns:a14="http://schemas.microsoft.com/office/drawing/2010/main" w="9525">
+                <a14:hiddenLine xmlns:a14="http://schemas.microsoft.com/office/drawing/2010/main" xmlns="" w="9525">
                   <a:solidFill>
                     <a:srgbClr val="000000"/>
                   </a:solidFill>
@@ -13204,7 +13099,7 @@
                 </a14:hiddenLine>
               </a:ext>
               <a:ext uri="{AF507438-7753-43e0-B8FC-AC1667EBCBE1}">
-                <a14:hiddenEffects xmlns="" xmlns:a14="http://schemas.microsoft.com/office/drawing/2010/main">
+                <a14:hiddenEffects xmlns:a14="http://schemas.microsoft.com/office/drawing/2010/main" xmlns="">
                   <a:effectLst>
                     <a:outerShdw blurRad="63500" dist="38099" dir="2700000" algn="ctr" rotWithShape="0">
                       <a:srgbClr val="000000">
@@ -13253,7 +13148,7 @@
             <a:effectLst/>
             <a:extLst>
               <a:ext uri="{909E8E84-426E-40dd-AFC4-6F175D3DCCD1}">
-                <a14:hiddenFill xmlns="" xmlns:a14="http://schemas.microsoft.com/office/drawing/2010/main">
+                <a14:hiddenFill xmlns:a14="http://schemas.microsoft.com/office/drawing/2010/main" xmlns="">
                   <a:blipFill dpi="0" rotWithShape="0">
                     <a:blip/>
                     <a:srcRect/>
@@ -13264,7 +13159,7 @@
                 </a14:hiddenFill>
               </a:ext>
               <a:ext uri="{91240B29-F687-4f45-9708-019B960494DF}">
-                <a14:hiddenLine xmlns="" xmlns:a14="http://schemas.microsoft.com/office/drawing/2010/main" w="9525">
+                <a14:hiddenLine xmlns:a14="http://schemas.microsoft.com/office/drawing/2010/main" xmlns="" w="9525">
                   <a:solidFill>
                     <a:srgbClr val="000000"/>
                   </a:solidFill>
@@ -13274,7 +13169,7 @@
                 </a14:hiddenLine>
               </a:ext>
               <a:ext uri="{AF507438-7753-43e0-B8FC-AC1667EBCBE1}">
-                <a14:hiddenEffects xmlns="" xmlns:a14="http://schemas.microsoft.com/office/drawing/2010/main">
+                <a14:hiddenEffects xmlns:a14="http://schemas.microsoft.com/office/drawing/2010/main" xmlns="">
                   <a:effectLst>
                     <a:outerShdw blurRad="63500" dist="38099" dir="2700000" algn="ctr" rotWithShape="0">
                       <a:srgbClr val="000000">
@@ -13323,7 +13218,7 @@
             <a:effectLst/>
             <a:extLst>
               <a:ext uri="{909E8E84-426E-40dd-AFC4-6F175D3DCCD1}">
-                <a14:hiddenFill xmlns="" xmlns:a14="http://schemas.microsoft.com/office/drawing/2010/main">
+                <a14:hiddenFill xmlns:a14="http://schemas.microsoft.com/office/drawing/2010/main" xmlns="">
                   <a:blipFill dpi="0" rotWithShape="0">
                     <a:blip/>
                     <a:srcRect/>
@@ -13334,7 +13229,7 @@
                 </a14:hiddenFill>
               </a:ext>
               <a:ext uri="{91240B29-F687-4f45-9708-019B960494DF}">
-                <a14:hiddenLine xmlns="" xmlns:a14="http://schemas.microsoft.com/office/drawing/2010/main" w="9525">
+                <a14:hiddenLine xmlns:a14="http://schemas.microsoft.com/office/drawing/2010/main" xmlns="" w="9525">
                   <a:solidFill>
                     <a:srgbClr val="000000"/>
                   </a:solidFill>
@@ -13344,7 +13239,7 @@
                 </a14:hiddenLine>
               </a:ext>
               <a:ext uri="{AF507438-7753-43e0-B8FC-AC1667EBCBE1}">
-                <a14:hiddenEffects xmlns="" xmlns:a14="http://schemas.microsoft.com/office/drawing/2010/main">
+                <a14:hiddenEffects xmlns:a14="http://schemas.microsoft.com/office/drawing/2010/main" xmlns="">
                   <a:effectLst>
                     <a:outerShdw blurRad="63500" dist="38099" dir="2700000" algn="ctr" rotWithShape="0">
                       <a:srgbClr val="000000">
@@ -13393,7 +13288,7 @@
             <a:effectLst/>
             <a:extLst>
               <a:ext uri="{909E8E84-426E-40dd-AFC4-6F175D3DCCD1}">
-                <a14:hiddenFill xmlns="" xmlns:a14="http://schemas.microsoft.com/office/drawing/2010/main">
+                <a14:hiddenFill xmlns:a14="http://schemas.microsoft.com/office/drawing/2010/main" xmlns="">
                   <a:blipFill dpi="0" rotWithShape="0">
                     <a:blip/>
                     <a:srcRect/>
@@ -13404,7 +13299,7 @@
                 </a14:hiddenFill>
               </a:ext>
               <a:ext uri="{91240B29-F687-4f45-9708-019B960494DF}">
-                <a14:hiddenLine xmlns="" xmlns:a14="http://schemas.microsoft.com/office/drawing/2010/main" w="9525">
+                <a14:hiddenLine xmlns:a14="http://schemas.microsoft.com/office/drawing/2010/main" xmlns="" w="9525">
                   <a:solidFill>
                     <a:srgbClr val="000000"/>
                   </a:solidFill>
@@ -13414,7 +13309,7 @@
                 </a14:hiddenLine>
               </a:ext>
               <a:ext uri="{AF507438-7753-43e0-B8FC-AC1667EBCBE1}">
-                <a14:hiddenEffects xmlns="" xmlns:a14="http://schemas.microsoft.com/office/drawing/2010/main">
+                <a14:hiddenEffects xmlns:a14="http://schemas.microsoft.com/office/drawing/2010/main" xmlns="">
                   <a:effectLst>
                     <a:outerShdw blurRad="63500" dist="38099" dir="2700000" algn="ctr" rotWithShape="0">
                       <a:srgbClr val="000000">
@@ -13455,12 +13350,12 @@
             <a:effectLst/>
             <a:extLst>
               <a:ext uri="{909E8E84-426E-40dd-AFC4-6F175D3DCCD1}">
-                <a14:hiddenFill xmlns="" xmlns:a14="http://schemas.microsoft.com/office/drawing/2010/main">
+                <a14:hiddenFill xmlns:a14="http://schemas.microsoft.com/office/drawing/2010/main" xmlns="">
                   <a:noFill/>
                 </a14:hiddenFill>
               </a:ext>
               <a:ext uri="{AF507438-7753-43e0-B8FC-AC1667EBCBE1}">
-                <a14:hiddenEffects xmlns="" xmlns:a14="http://schemas.microsoft.com/office/drawing/2010/main">
+                <a14:hiddenEffects xmlns:a14="http://schemas.microsoft.com/office/drawing/2010/main" xmlns="">
                   <a:effectLst>
                     <a:outerShdw blurRad="63500" dist="38099" dir="2700000" algn="ctr" rotWithShape="0">
                       <a:srgbClr val="000000">
@@ -13513,12 +13408,12 @@
             <a:effectLst/>
             <a:extLst>
               <a:ext uri="{909E8E84-426E-40dd-AFC4-6F175D3DCCD1}">
-                <a14:hiddenFill xmlns="" xmlns:a14="http://schemas.microsoft.com/office/drawing/2010/main">
+                <a14:hiddenFill xmlns:a14="http://schemas.microsoft.com/office/drawing/2010/main" xmlns="">
                   <a:noFill/>
                 </a14:hiddenFill>
               </a:ext>
               <a:ext uri="{AF507438-7753-43e0-B8FC-AC1667EBCBE1}">
-                <a14:hiddenEffects xmlns="" xmlns:a14="http://schemas.microsoft.com/office/drawing/2010/main">
+                <a14:hiddenEffects xmlns:a14="http://schemas.microsoft.com/office/drawing/2010/main" xmlns="">
                   <a:effectLst>
                     <a:outerShdw blurRad="63500" dist="38099" dir="2700000" algn="ctr" rotWithShape="0">
                       <a:srgbClr val="000000">
@@ -13579,7 +13474,7 @@
             <a:effectLst/>
             <a:extLst>
               <a:ext uri="{909E8E84-426E-40dd-AFC4-6F175D3DCCD1}">
-                <a14:hiddenFill xmlns="" xmlns:a14="http://schemas.microsoft.com/office/drawing/2010/main">
+                <a14:hiddenFill xmlns:a14="http://schemas.microsoft.com/office/drawing/2010/main" xmlns="">
                   <a:blipFill dpi="0" rotWithShape="0">
                     <a:blip/>
                     <a:srcRect/>
@@ -13590,7 +13485,7 @@
                 </a14:hiddenFill>
               </a:ext>
               <a:ext uri="{91240B29-F687-4f45-9708-019B960494DF}">
-                <a14:hiddenLine xmlns="" xmlns:a14="http://schemas.microsoft.com/office/drawing/2010/main" w="9525">
+                <a14:hiddenLine xmlns:a14="http://schemas.microsoft.com/office/drawing/2010/main" xmlns="" w="9525">
                   <a:solidFill>
                     <a:srgbClr val="000000"/>
                   </a:solidFill>
@@ -13600,7 +13495,7 @@
                 </a14:hiddenLine>
               </a:ext>
               <a:ext uri="{AF507438-7753-43e0-B8FC-AC1667EBCBE1}">
-                <a14:hiddenEffects xmlns="" xmlns:a14="http://schemas.microsoft.com/office/drawing/2010/main">
+                <a14:hiddenEffects xmlns:a14="http://schemas.microsoft.com/office/drawing/2010/main" xmlns="">
                   <a:effectLst>
                     <a:outerShdw blurRad="63500" dist="38099" dir="2700000" algn="ctr" rotWithShape="0">
                       <a:srgbClr val="000000">
@@ -13733,7 +13628,7 @@
           <a:effectLst/>
           <a:extLst>
             <a:ext uri="{909E8E84-426E-40dd-AFC4-6F175D3DCCD1}">
-              <a14:hiddenFill xmlns:a14="http://schemas.microsoft.com/office/drawing/2010/main" xmlns="">
+              <a14:hiddenFill xmlns="" xmlns:a14="http://schemas.microsoft.com/office/drawing/2010/main">
                 <a:blipFill dpi="0" rotWithShape="0">
                   <a:blip/>
                   <a:srcRect/>
@@ -13744,7 +13639,7 @@
               </a14:hiddenFill>
             </a:ext>
             <a:ext uri="{91240B29-F687-4f45-9708-019B960494DF}">
-              <a14:hiddenLine xmlns:a14="http://schemas.microsoft.com/office/drawing/2010/main" xmlns="" w="9525">
+              <a14:hiddenLine xmlns="" xmlns:a14="http://schemas.microsoft.com/office/drawing/2010/main" w="9525">
                 <a:solidFill>
                   <a:srgbClr val="000000"/>
                 </a:solidFill>
@@ -13754,7 +13649,7 @@
               </a14:hiddenLine>
             </a:ext>
             <a:ext uri="{AF507438-7753-43e0-B8FC-AC1667EBCBE1}">
-              <a14:hiddenEffects xmlns:a14="http://schemas.microsoft.com/office/drawing/2010/main" xmlns="">
+              <a14:hiddenEffects xmlns="" xmlns:a14="http://schemas.microsoft.com/office/drawing/2010/main">
                 <a:effectLst>
                   <a:outerShdw blurRad="63500" dist="38099" dir="2700000" algn="ctr" rotWithShape="0">
                     <a:srgbClr val="000000">
@@ -13839,7 +13734,7 @@
           <a:effectLst/>
           <a:extLst>
             <a:ext uri="{909E8E84-426E-40dd-AFC4-6F175D3DCCD1}">
-              <a14:hiddenFill xmlns:a14="http://schemas.microsoft.com/office/drawing/2010/main" xmlns="">
+              <a14:hiddenFill xmlns="" xmlns:a14="http://schemas.microsoft.com/office/drawing/2010/main">
                 <a:blipFill dpi="0" rotWithShape="0">
                   <a:blip/>
                   <a:srcRect/>
@@ -13850,7 +13745,7 @@
               </a14:hiddenFill>
             </a:ext>
             <a:ext uri="{91240B29-F687-4f45-9708-019B960494DF}">
-              <a14:hiddenLine xmlns:a14="http://schemas.microsoft.com/office/drawing/2010/main" xmlns="" w="9525">
+              <a14:hiddenLine xmlns="" xmlns:a14="http://schemas.microsoft.com/office/drawing/2010/main" w="9525">
                 <a:solidFill>
                   <a:srgbClr val="000000"/>
                 </a:solidFill>
@@ -13860,7 +13755,7 @@
               </a14:hiddenLine>
             </a:ext>
             <a:ext uri="{AF507438-7753-43e0-B8FC-AC1667EBCBE1}">
-              <a14:hiddenEffects xmlns:a14="http://schemas.microsoft.com/office/drawing/2010/main" xmlns="">
+              <a14:hiddenEffects xmlns="" xmlns:a14="http://schemas.microsoft.com/office/drawing/2010/main">
                 <a:effectLst>
                   <a:outerShdw blurRad="63500" dist="38099" dir="2700000" algn="ctr" rotWithShape="0">
                     <a:srgbClr val="000000">
@@ -13945,7 +13840,7 @@
           <a:effectLst/>
           <a:extLst>
             <a:ext uri="{909E8E84-426E-40dd-AFC4-6F175D3DCCD1}">
-              <a14:hiddenFill xmlns:a14="http://schemas.microsoft.com/office/drawing/2010/main" xmlns="">
+              <a14:hiddenFill xmlns="" xmlns:a14="http://schemas.microsoft.com/office/drawing/2010/main">
                 <a:blipFill dpi="0" rotWithShape="0">
                   <a:blip/>
                   <a:srcRect/>
@@ -13956,7 +13851,7 @@
               </a14:hiddenFill>
             </a:ext>
             <a:ext uri="{91240B29-F687-4f45-9708-019B960494DF}">
-              <a14:hiddenLine xmlns:a14="http://schemas.microsoft.com/office/drawing/2010/main" xmlns="" w="9525">
+              <a14:hiddenLine xmlns="" xmlns:a14="http://schemas.microsoft.com/office/drawing/2010/main" w="9525">
                 <a:solidFill>
                   <a:srgbClr val="000000"/>
                 </a:solidFill>
@@ -13966,7 +13861,7 @@
               </a14:hiddenLine>
             </a:ext>
             <a:ext uri="{AF507438-7753-43e0-B8FC-AC1667EBCBE1}">
-              <a14:hiddenEffects xmlns:a14="http://schemas.microsoft.com/office/drawing/2010/main" xmlns="">
+              <a14:hiddenEffects xmlns="" xmlns:a14="http://schemas.microsoft.com/office/drawing/2010/main">
                 <a:effectLst>
                   <a:outerShdw blurRad="63500" dist="38099" dir="2700000" algn="ctr" rotWithShape="0">
                     <a:srgbClr val="000000">
@@ -14145,7 +14040,7 @@
           <a:effectLst/>
           <a:extLst>
             <a:ext uri="{909E8E84-426E-40dd-AFC4-6F175D3DCCD1}">
-              <a14:hiddenFill xmlns:a14="http://schemas.microsoft.com/office/drawing/2010/main" xmlns="">
+              <a14:hiddenFill xmlns="" xmlns:a14="http://schemas.microsoft.com/office/drawing/2010/main">
                 <a:blipFill dpi="0" rotWithShape="0">
                   <a:blip/>
                   <a:srcRect/>
@@ -14156,7 +14051,7 @@
               </a14:hiddenFill>
             </a:ext>
             <a:ext uri="{91240B29-F687-4f45-9708-019B960494DF}">
-              <a14:hiddenLine xmlns:a14="http://schemas.microsoft.com/office/drawing/2010/main" xmlns="" w="9525">
+              <a14:hiddenLine xmlns="" xmlns:a14="http://schemas.microsoft.com/office/drawing/2010/main" w="9525">
                 <a:solidFill>
                   <a:srgbClr val="000000"/>
                 </a:solidFill>
@@ -14166,7 +14061,7 @@
               </a14:hiddenLine>
             </a:ext>
             <a:ext uri="{AF507438-7753-43e0-B8FC-AC1667EBCBE1}">
-              <a14:hiddenEffects xmlns:a14="http://schemas.microsoft.com/office/drawing/2010/main" xmlns="">
+              <a14:hiddenEffects xmlns="" xmlns:a14="http://schemas.microsoft.com/office/drawing/2010/main">
                 <a:effectLst>
                   <a:outerShdw blurRad="63500" dist="38099" dir="2700000" algn="ctr" rotWithShape="0">
                     <a:srgbClr val="000000">
@@ -14244,7 +14139,7 @@
           <a:effectLst/>
           <a:extLst>
             <a:ext uri="{909E8E84-426E-40dd-AFC4-6F175D3DCCD1}">
-              <a14:hiddenFill xmlns:a14="http://schemas.microsoft.com/office/drawing/2010/main" xmlns="">
+              <a14:hiddenFill xmlns="" xmlns:a14="http://schemas.microsoft.com/office/drawing/2010/main">
                 <a:blipFill dpi="0" rotWithShape="0">
                   <a:blip/>
                   <a:srcRect/>
@@ -14255,7 +14150,7 @@
               </a14:hiddenFill>
             </a:ext>
             <a:ext uri="{91240B29-F687-4f45-9708-019B960494DF}">
-              <a14:hiddenLine xmlns:a14="http://schemas.microsoft.com/office/drawing/2010/main" xmlns="" w="9525">
+              <a14:hiddenLine xmlns="" xmlns:a14="http://schemas.microsoft.com/office/drawing/2010/main" w="9525">
                 <a:solidFill>
                   <a:srgbClr val="000000"/>
                 </a:solidFill>
@@ -14265,7 +14160,7 @@
               </a14:hiddenLine>
             </a:ext>
             <a:ext uri="{AF507438-7753-43e0-B8FC-AC1667EBCBE1}">
-              <a14:hiddenEffects xmlns:a14="http://schemas.microsoft.com/office/drawing/2010/main" xmlns="">
+              <a14:hiddenEffects xmlns="" xmlns:a14="http://schemas.microsoft.com/office/drawing/2010/main">
                 <a:effectLst>
                   <a:outerShdw blurRad="63500" dist="38099" dir="2700000" algn="ctr" rotWithShape="0">
                     <a:srgbClr val="000000">
@@ -16130,7 +16025,7 @@
           <a:effectLst/>
           <a:extLst>
             <a:ext uri="{909E8E84-426E-40dd-AFC4-6F175D3DCCD1}">
-              <a14:hiddenFill xmlns="" xmlns:a14="http://schemas.microsoft.com/office/drawing/2010/main">
+              <a14:hiddenFill xmlns:a14="http://schemas.microsoft.com/office/drawing/2010/main" xmlns="">
                 <a:blipFill dpi="0" rotWithShape="0">
                   <a:blip/>
                   <a:srcRect/>
@@ -16141,7 +16036,7 @@
               </a14:hiddenFill>
             </a:ext>
             <a:ext uri="{91240B29-F687-4f45-9708-019B960494DF}">
-              <a14:hiddenLine xmlns="" xmlns:a14="http://schemas.microsoft.com/office/drawing/2010/main" w="9525">
+              <a14:hiddenLine xmlns:a14="http://schemas.microsoft.com/office/drawing/2010/main" xmlns="" w="9525">
                 <a:solidFill>
                   <a:srgbClr val="000000"/>
                 </a:solidFill>
@@ -16151,7 +16046,7 @@
               </a14:hiddenLine>
             </a:ext>
             <a:ext uri="{AF507438-7753-43e0-B8FC-AC1667EBCBE1}">
-              <a14:hiddenEffects xmlns="" xmlns:a14="http://schemas.microsoft.com/office/drawing/2010/main">
+              <a14:hiddenEffects xmlns:a14="http://schemas.microsoft.com/office/drawing/2010/main" xmlns="">
                 <a:effectLst>
                   <a:outerShdw blurRad="63500" dist="38099" dir="2700000" algn="ctr" rotWithShape="0">
                     <a:srgbClr val="000000">
@@ -16311,7 +16206,7 @@
           <a:effectLst/>
           <a:extLst>
             <a:ext uri="{909E8E84-426E-40dd-AFC4-6F175D3DCCD1}">
-              <a14:hiddenFill xmlns="" xmlns:a14="http://schemas.microsoft.com/office/drawing/2010/main">
+              <a14:hiddenFill xmlns:a14="http://schemas.microsoft.com/office/drawing/2010/main" xmlns="">
                 <a:blipFill dpi="0" rotWithShape="0">
                   <a:blip/>
                   <a:srcRect/>
@@ -16322,7 +16217,7 @@
               </a14:hiddenFill>
             </a:ext>
             <a:ext uri="{91240B29-F687-4f45-9708-019B960494DF}">
-              <a14:hiddenLine xmlns="" xmlns:a14="http://schemas.microsoft.com/office/drawing/2010/main" w="9525">
+              <a14:hiddenLine xmlns:a14="http://schemas.microsoft.com/office/drawing/2010/main" xmlns="" w="9525">
                 <a:solidFill>
                   <a:srgbClr val="000000"/>
                 </a:solidFill>
@@ -16332,7 +16227,7 @@
               </a14:hiddenLine>
             </a:ext>
             <a:ext uri="{AF507438-7753-43e0-B8FC-AC1667EBCBE1}">
-              <a14:hiddenEffects xmlns="" xmlns:a14="http://schemas.microsoft.com/office/drawing/2010/main">
+              <a14:hiddenEffects xmlns:a14="http://schemas.microsoft.com/office/drawing/2010/main" xmlns="">
                 <a:effectLst>
                   <a:outerShdw blurRad="63500" dist="38099" dir="2700000" algn="ctr" rotWithShape="0">
                     <a:srgbClr val="000000">
@@ -18131,7 +18026,7 @@
           <a:effectLst/>
           <a:extLst>
             <a:ext uri="{909E8E84-426E-40dd-AFC4-6F175D3DCCD1}">
-              <a14:hiddenFill xmlns="" xmlns:a14="http://schemas.microsoft.com/office/drawing/2010/main">
+              <a14:hiddenFill xmlns:a14="http://schemas.microsoft.com/office/drawing/2010/main" xmlns="">
                 <a:blipFill dpi="0" rotWithShape="0">
                   <a:blip/>
                   <a:srcRect/>
@@ -18142,7 +18037,7 @@
               </a14:hiddenFill>
             </a:ext>
             <a:ext uri="{91240B29-F687-4f45-9708-019B960494DF}">
-              <a14:hiddenLine xmlns="" xmlns:a14="http://schemas.microsoft.com/office/drawing/2010/main" w="9525">
+              <a14:hiddenLine xmlns:a14="http://schemas.microsoft.com/office/drawing/2010/main" xmlns="" w="9525">
                 <a:solidFill>
                   <a:srgbClr val="000000"/>
                 </a:solidFill>
@@ -18152,7 +18047,7 @@
               </a14:hiddenLine>
             </a:ext>
             <a:ext uri="{AF507438-7753-43e0-B8FC-AC1667EBCBE1}">
-              <a14:hiddenEffects xmlns="" xmlns:a14="http://schemas.microsoft.com/office/drawing/2010/main">
+              <a14:hiddenEffects xmlns:a14="http://schemas.microsoft.com/office/drawing/2010/main" xmlns="">
                 <a:effectLst>
                   <a:outerShdw blurRad="63500" dist="38099" dir="2700000" algn="ctr" rotWithShape="0">
                     <a:srgbClr val="000000">
@@ -18245,7 +18140,7 @@
           <a:effectLst/>
           <a:extLst>
             <a:ext uri="{909E8E84-426E-40dd-AFC4-6F175D3DCCD1}">
-              <a14:hiddenFill xmlns="" xmlns:a14="http://schemas.microsoft.com/office/drawing/2010/main">
+              <a14:hiddenFill xmlns:a14="http://schemas.microsoft.com/office/drawing/2010/main" xmlns="">
                 <a:blipFill dpi="0" rotWithShape="0">
                   <a:blip/>
                   <a:srcRect/>
@@ -18256,7 +18151,7 @@
               </a14:hiddenFill>
             </a:ext>
             <a:ext uri="{91240B29-F687-4f45-9708-019B960494DF}">
-              <a14:hiddenLine xmlns="" xmlns:a14="http://schemas.microsoft.com/office/drawing/2010/main" w="9525">
+              <a14:hiddenLine xmlns:a14="http://schemas.microsoft.com/office/drawing/2010/main" xmlns="" w="9525">
                 <a:solidFill>
                   <a:srgbClr val="000000"/>
                 </a:solidFill>
@@ -18266,7 +18161,7 @@
               </a14:hiddenLine>
             </a:ext>
             <a:ext uri="{AF507438-7753-43e0-B8FC-AC1667EBCBE1}">
-              <a14:hiddenEffects xmlns="" xmlns:a14="http://schemas.microsoft.com/office/drawing/2010/main">
+              <a14:hiddenEffects xmlns:a14="http://schemas.microsoft.com/office/drawing/2010/main" xmlns="">
                 <a:effectLst>
                   <a:outerShdw blurRad="63500" dist="38099" dir="2700000" algn="ctr" rotWithShape="0">
                     <a:srgbClr val="000000">
@@ -21138,7 +21033,7 @@
           <a:effectLst/>
           <a:extLst>
             <a:ext uri="{909E8E84-426E-40dd-AFC4-6F175D3DCCD1}">
-              <a14:hiddenFill xmlns="" xmlns:a14="http://schemas.microsoft.com/office/drawing/2010/main">
+              <a14:hiddenFill xmlns:a14="http://schemas.microsoft.com/office/drawing/2010/main" xmlns="">
                 <a:blipFill dpi="0" rotWithShape="0">
                   <a:blip/>
                   <a:srcRect/>
@@ -21149,7 +21044,7 @@
               </a14:hiddenFill>
             </a:ext>
             <a:ext uri="{91240B29-F687-4f45-9708-019B960494DF}">
-              <a14:hiddenLine xmlns="" xmlns:a14="http://schemas.microsoft.com/office/drawing/2010/main" w="9525">
+              <a14:hiddenLine xmlns:a14="http://schemas.microsoft.com/office/drawing/2010/main" xmlns="" w="9525">
                 <a:solidFill>
                   <a:srgbClr val="000000"/>
                 </a:solidFill>
@@ -21159,7 +21054,7 @@
               </a14:hiddenLine>
             </a:ext>
             <a:ext uri="{AF507438-7753-43e0-B8FC-AC1667EBCBE1}">
-              <a14:hiddenEffects xmlns="" xmlns:a14="http://schemas.microsoft.com/office/drawing/2010/main">
+              <a14:hiddenEffects xmlns:a14="http://schemas.microsoft.com/office/drawing/2010/main" xmlns="">
                 <a:effectLst>
                   <a:outerShdw blurRad="63500" dist="38099" dir="2700000" algn="ctr" rotWithShape="0">
                     <a:srgbClr val="000000">
@@ -21238,7 +21133,7 @@
           <a:effectLst/>
           <a:extLst>
             <a:ext uri="{909E8E84-426E-40dd-AFC4-6F175D3DCCD1}">
-              <a14:hiddenFill xmlns="" xmlns:a14="http://schemas.microsoft.com/office/drawing/2010/main">
+              <a14:hiddenFill xmlns:a14="http://schemas.microsoft.com/office/drawing/2010/main" xmlns="">
                 <a:blipFill dpi="0" rotWithShape="0">
                   <a:blip/>
                   <a:srcRect/>
@@ -21249,7 +21144,7 @@
               </a14:hiddenFill>
             </a:ext>
             <a:ext uri="{91240B29-F687-4f45-9708-019B960494DF}">
-              <a14:hiddenLine xmlns="" xmlns:a14="http://schemas.microsoft.com/office/drawing/2010/main" w="9525">
+              <a14:hiddenLine xmlns:a14="http://schemas.microsoft.com/office/drawing/2010/main" xmlns="" w="9525">
                 <a:solidFill>
                   <a:srgbClr val="000000"/>
                 </a:solidFill>
@@ -21259,7 +21154,7 @@
               </a14:hiddenLine>
             </a:ext>
             <a:ext uri="{AF507438-7753-43e0-B8FC-AC1667EBCBE1}">
-              <a14:hiddenEffects xmlns="" xmlns:a14="http://schemas.microsoft.com/office/drawing/2010/main">
+              <a14:hiddenEffects xmlns:a14="http://schemas.microsoft.com/office/drawing/2010/main" xmlns="">
                 <a:effectLst>
                   <a:outerShdw blurRad="63500" dist="38099" dir="2700000" algn="ctr" rotWithShape="0">
                     <a:srgbClr val="000000">
@@ -22854,7 +22749,7 @@
           <a:effectLst/>
           <a:extLst>
             <a:ext uri="{909E8E84-426E-40dd-AFC4-6F175D3DCCD1}">
-              <a14:hiddenFill xmlns="" xmlns:a14="http://schemas.microsoft.com/office/drawing/2010/main">
+              <a14:hiddenFill xmlns:a14="http://schemas.microsoft.com/office/drawing/2010/main" xmlns="">
                 <a:blipFill dpi="0" rotWithShape="0">
                   <a:blip/>
                   <a:srcRect/>
@@ -22865,7 +22760,7 @@
               </a14:hiddenFill>
             </a:ext>
             <a:ext uri="{91240B29-F687-4f45-9708-019B960494DF}">
-              <a14:hiddenLine xmlns="" xmlns:a14="http://schemas.microsoft.com/office/drawing/2010/main" w="9525">
+              <a14:hiddenLine xmlns:a14="http://schemas.microsoft.com/office/drawing/2010/main" xmlns="" w="9525">
                 <a:solidFill>
                   <a:srgbClr val="000000"/>
                 </a:solidFill>
@@ -22875,7 +22770,7 @@
               </a14:hiddenLine>
             </a:ext>
             <a:ext uri="{AF507438-7753-43e0-B8FC-AC1667EBCBE1}">
-              <a14:hiddenEffects xmlns="" xmlns:a14="http://schemas.microsoft.com/office/drawing/2010/main">
+              <a14:hiddenEffects xmlns:a14="http://schemas.microsoft.com/office/drawing/2010/main" xmlns="">
                 <a:effectLst>
                   <a:outerShdw blurRad="63500" dist="38099" dir="2700000" algn="ctr" rotWithShape="0">
                     <a:srgbClr val="000000">
@@ -24523,7 +24418,7 @@
           <a:effectLst/>
           <a:extLst>
             <a:ext uri="{909E8E84-426E-40dd-AFC4-6F175D3DCCD1}">
-              <a14:hiddenFill xmlns="" xmlns:a14="http://schemas.microsoft.com/office/drawing/2010/main">
+              <a14:hiddenFill xmlns:a14="http://schemas.microsoft.com/office/drawing/2010/main" xmlns="">
                 <a:blipFill dpi="0" rotWithShape="0">
                   <a:blip/>
                   <a:srcRect/>
@@ -24534,7 +24429,7 @@
               </a14:hiddenFill>
             </a:ext>
             <a:ext uri="{91240B29-F687-4f45-9708-019B960494DF}">
-              <a14:hiddenLine xmlns="" xmlns:a14="http://schemas.microsoft.com/office/drawing/2010/main" w="9525">
+              <a14:hiddenLine xmlns:a14="http://schemas.microsoft.com/office/drawing/2010/main" xmlns="" w="9525">
                 <a:solidFill>
                   <a:srgbClr val="000000"/>
                 </a:solidFill>
@@ -24544,7 +24439,7 @@
               </a14:hiddenLine>
             </a:ext>
             <a:ext uri="{AF507438-7753-43e0-B8FC-AC1667EBCBE1}">
-              <a14:hiddenEffects xmlns="" xmlns:a14="http://schemas.microsoft.com/office/drawing/2010/main">
+              <a14:hiddenEffects xmlns:a14="http://schemas.microsoft.com/office/drawing/2010/main" xmlns="">
                 <a:effectLst>
                   <a:outerShdw blurRad="63500" dist="38099" dir="2700000" algn="ctr" rotWithShape="0">
                     <a:srgbClr val="000000">
@@ -25906,7 +25801,7 @@
           <a:effectLst/>
           <a:extLst>
             <a:ext uri="{909E8E84-426E-40dd-AFC4-6F175D3DCCD1}">
-              <a14:hiddenFill xmlns="" xmlns:a14="http://schemas.microsoft.com/office/drawing/2010/main">
+              <a14:hiddenFill xmlns:a14="http://schemas.microsoft.com/office/drawing/2010/main" xmlns="">
                 <a:blipFill dpi="0" rotWithShape="0">
                   <a:blip/>
                   <a:srcRect/>
@@ -25917,7 +25812,7 @@
               </a14:hiddenFill>
             </a:ext>
             <a:ext uri="{91240B29-F687-4f45-9708-019B960494DF}">
-              <a14:hiddenLine xmlns="" xmlns:a14="http://schemas.microsoft.com/office/drawing/2010/main" w="9525">
+              <a14:hiddenLine xmlns:a14="http://schemas.microsoft.com/office/drawing/2010/main" xmlns="" w="9525">
                 <a:solidFill>
                   <a:srgbClr val="000000"/>
                 </a:solidFill>
@@ -25927,7 +25822,7 @@
               </a14:hiddenLine>
             </a:ext>
             <a:ext uri="{AF507438-7753-43e0-B8FC-AC1667EBCBE1}">
-              <a14:hiddenEffects xmlns="" xmlns:a14="http://schemas.microsoft.com/office/drawing/2010/main">
+              <a14:hiddenEffects xmlns:a14="http://schemas.microsoft.com/office/drawing/2010/main" xmlns="">
                 <a:effectLst>
                   <a:outerShdw blurRad="63500" dist="38099" dir="2700000" algn="ctr" rotWithShape="0">
                     <a:srgbClr val="000000">
@@ -26058,7 +25953,7 @@
           <a:effectLst/>
           <a:extLst>
             <a:ext uri="{909E8E84-426E-40dd-AFC4-6F175D3DCCD1}">
-              <a14:hiddenFill xmlns="" xmlns:a14="http://schemas.microsoft.com/office/drawing/2010/main">
+              <a14:hiddenFill xmlns:a14="http://schemas.microsoft.com/office/drawing/2010/main" xmlns="">
                 <a:blipFill dpi="0" rotWithShape="0">
                   <a:blip/>
                   <a:srcRect/>
@@ -26069,7 +25964,7 @@
               </a14:hiddenFill>
             </a:ext>
             <a:ext uri="{91240B29-F687-4f45-9708-019B960494DF}">
-              <a14:hiddenLine xmlns="" xmlns:a14="http://schemas.microsoft.com/office/drawing/2010/main" w="9525">
+              <a14:hiddenLine xmlns:a14="http://schemas.microsoft.com/office/drawing/2010/main" xmlns="" w="9525">
                 <a:solidFill>
                   <a:srgbClr val="000000"/>
                 </a:solidFill>
@@ -26079,7 +25974,7 @@
               </a14:hiddenLine>
             </a:ext>
             <a:ext uri="{AF507438-7753-43e0-B8FC-AC1667EBCBE1}">
-              <a14:hiddenEffects xmlns="" xmlns:a14="http://schemas.microsoft.com/office/drawing/2010/main">
+              <a14:hiddenEffects xmlns:a14="http://schemas.microsoft.com/office/drawing/2010/main" xmlns="">
                 <a:effectLst>
                   <a:outerShdw blurRad="63500" dist="38099" dir="2700000" algn="ctr" rotWithShape="0">
                     <a:srgbClr val="000000">
@@ -33777,7 +33672,7 @@
           <a:effectLst/>
           <a:extLst>
             <a:ext uri="{909E8E84-426E-40dd-AFC4-6F175D3DCCD1}">
-              <a14:hiddenFill xmlns:a14="http://schemas.microsoft.com/office/drawing/2010/main" xmlns="">
+              <a14:hiddenFill xmlns="" xmlns:a14="http://schemas.microsoft.com/office/drawing/2010/main">
                 <a:blipFill dpi="0" rotWithShape="0">
                   <a:blip/>
                   <a:srcRect/>
@@ -33788,7 +33683,7 @@
               </a14:hiddenFill>
             </a:ext>
             <a:ext uri="{91240B29-F687-4f45-9708-019B960494DF}">
-              <a14:hiddenLine xmlns:a14="http://schemas.microsoft.com/office/drawing/2010/main" xmlns="" w="9525">
+              <a14:hiddenLine xmlns="" xmlns:a14="http://schemas.microsoft.com/office/drawing/2010/main" w="9525">
                 <a:solidFill>
                   <a:srgbClr val="000000"/>
                 </a:solidFill>
@@ -33798,7 +33693,7 @@
               </a14:hiddenLine>
             </a:ext>
             <a:ext uri="{AF507438-7753-43e0-B8FC-AC1667EBCBE1}">
-              <a14:hiddenEffects xmlns:a14="http://schemas.microsoft.com/office/drawing/2010/main" xmlns="">
+              <a14:hiddenEffects xmlns="" xmlns:a14="http://schemas.microsoft.com/office/drawing/2010/main">
                 <a:effectLst>
                   <a:outerShdw blurRad="63500" dist="38099" dir="2700000" algn="ctr" rotWithShape="0">
                     <a:srgbClr val="000000">

</xml_diff>

<commit_message>
Some more tweaks; 25:22
</commit_message>
<xml_diff>
--- a/marple.pptx
+++ b/marple.pptx
@@ -8839,6 +8839,116 @@
           </a:p>
         </p:txBody>
       </p:sp>
+      <p:grpSp>
+        <p:nvGrpSpPr>
+          <p:cNvPr id="6" name="Group 5">
+            <a:extLst>
+              <a:ext uri="{FF2B5EF4-FFF2-40B4-BE49-F238E27FC236}">
+                <a16:creationId xmlns:a16="http://schemas.microsoft.com/office/drawing/2014/main" id="{F8DCEB60-FA2E-824E-9C84-B06AB639D0E0}"/>
+              </a:ext>
+            </a:extLst>
+          </p:cNvPr>
+          <p:cNvGrpSpPr/>
+          <p:nvPr/>
+        </p:nvGrpSpPr>
+        <p:grpSpPr>
+          <a:xfrm>
+            <a:off x="8287132" y="3220875"/>
+            <a:ext cx="3066668" cy="1219198"/>
+            <a:chOff x="5896254" y="3905507"/>
+            <a:chExt cx="3066668" cy="1219198"/>
+          </a:xfrm>
+        </p:grpSpPr>
+        <p:sp>
+          <p:nvSpPr>
+            <p:cNvPr id="7" name="Rectangle 6">
+              <a:extLst>
+                <a:ext uri="{FF2B5EF4-FFF2-40B4-BE49-F238E27FC236}">
+                  <a16:creationId xmlns:a16="http://schemas.microsoft.com/office/drawing/2014/main" id="{358A2329-492D-CE40-8EC3-B5C12FA8962E}"/>
+                </a:ext>
+              </a:extLst>
+            </p:cNvPr>
+            <p:cNvSpPr/>
+            <p:nvPr/>
+          </p:nvSpPr>
+          <p:spPr>
+            <a:xfrm>
+              <a:off x="5896254" y="3905507"/>
+              <a:ext cx="3066668" cy="1219197"/>
+            </a:xfrm>
+            <a:prstGeom prst="rect">
+              <a:avLst/>
+            </a:prstGeom>
+            <a:solidFill>
+              <a:srgbClr val="A31E34"/>
+            </a:solidFill>
+          </p:spPr>
+          <p:style>
+            <a:lnRef idx="2">
+              <a:schemeClr val="accent1">
+                <a:shade val="50000"/>
+              </a:schemeClr>
+            </a:lnRef>
+            <a:fillRef idx="1">
+              <a:schemeClr val="accent1"/>
+            </a:fillRef>
+            <a:effectRef idx="0">
+              <a:schemeClr val="accent1"/>
+            </a:effectRef>
+            <a:fontRef idx="minor">
+              <a:schemeClr val="lt1"/>
+            </a:fontRef>
+          </p:style>
+          <p:txBody>
+            <a:bodyPr rtlCol="0" anchor="ctr"/>
+            <a:lstStyle/>
+            <a:p>
+              <a:pPr algn="ctr"/>
+              <a:endParaRPr lang="en-US"/>
+            </a:p>
+          </p:txBody>
+        </p:sp>
+        <p:sp>
+          <p:nvSpPr>
+            <p:cNvPr id="8" name="TextBox 7">
+              <a:extLst>
+                <a:ext uri="{FF2B5EF4-FFF2-40B4-BE49-F238E27FC236}">
+                  <a16:creationId xmlns:a16="http://schemas.microsoft.com/office/drawing/2014/main" id="{7AB5DCAE-169C-4249-8E10-8CB825058817}"/>
+                </a:ext>
+              </a:extLst>
+            </p:cNvPr>
+            <p:cNvSpPr txBox="1"/>
+            <p:nvPr/>
+          </p:nvSpPr>
+          <p:spPr>
+            <a:xfrm>
+              <a:off x="6139318" y="4047487"/>
+              <a:ext cx="2643326" cy="1077218"/>
+            </a:xfrm>
+            <a:prstGeom prst="rect">
+              <a:avLst/>
+            </a:prstGeom>
+            <a:noFill/>
+          </p:spPr>
+          <p:txBody>
+            <a:bodyPr wrap="square" rtlCol="0">
+              <a:spAutoFit/>
+            </a:bodyPr>
+            <a:lstStyle/>
+            <a:p>
+              <a:pPr algn="ctr"/>
+              <a:r>
+                <a:rPr lang="en-US" sz="3200" dirty="0">
+                  <a:solidFill>
+                    <a:schemeClr val="bg1"/>
+                  </a:solidFill>
+                </a:rPr>
+                <a:t>Aggregation Function</a:t>
+              </a:r>
+            </a:p>
+          </p:txBody>
+        </p:sp>
+      </p:grpSp>
     </p:spTree>
     <p:custDataLst>
       <p:tags r:id="rId1"/>
@@ -8894,6 +9004,51 @@
                                           </p:stCondLst>
                                         </p:cTn>
                                         <p:tgtEl>
+                                          <p:spTgt spid="6"/>
+                                        </p:tgtEl>
+                                        <p:attrNameLst>
+                                          <p:attrName>style.visibility</p:attrName>
+                                        </p:attrNameLst>
+                                      </p:cBhvr>
+                                      <p:to>
+                                        <p:strVal val="visible"/>
+                                      </p:to>
+                                    </p:set>
+                                  </p:childTnLst>
+                                </p:cTn>
+                              </p:par>
+                            </p:childTnLst>
+                          </p:cTn>
+                        </p:par>
+                      </p:childTnLst>
+                    </p:cTn>
+                  </p:par>
+                  <p:par>
+                    <p:cTn id="7" fill="hold">
+                      <p:stCondLst>
+                        <p:cond delay="indefinite"/>
+                      </p:stCondLst>
+                      <p:childTnLst>
+                        <p:par>
+                          <p:cTn id="8" fill="hold">
+                            <p:stCondLst>
+                              <p:cond delay="0"/>
+                            </p:stCondLst>
+                            <p:childTnLst>
+                              <p:par>
+                                <p:cTn id="9" presetID="1" presetClass="entr" presetSubtype="0" fill="hold" nodeType="clickEffect">
+                                  <p:stCondLst>
+                                    <p:cond delay="0"/>
+                                  </p:stCondLst>
+                                  <p:childTnLst>
+                                    <p:set>
+                                      <p:cBhvr>
+                                        <p:cTn id="10" dur="1" fill="hold">
+                                          <p:stCondLst>
+                                            <p:cond delay="0"/>
+                                          </p:stCondLst>
+                                        </p:cTn>
+                                        <p:tgtEl>
                                           <p:spTgt spid="10"/>
                                         </p:tgtEl>
                                         <p:attrNameLst>
@@ -8908,14 +9063,14 @@
                                 </p:cTn>
                               </p:par>
                               <p:par>
-                                <p:cTn id="7" presetID="1" presetClass="entr" presetSubtype="0" fill="hold" nodeType="withEffect">
+                                <p:cTn id="11" presetID="1" presetClass="entr" presetSubtype="0" fill="hold" nodeType="withEffect">
                                   <p:stCondLst>
                                     <p:cond delay="0"/>
                                   </p:stCondLst>
                                   <p:childTnLst>
                                     <p:set>
                                       <p:cBhvr>
-                                        <p:cTn id="8" dur="1" fill="hold">
+                                        <p:cTn id="12" dur="1" fill="hold">
                                           <p:stCondLst>
                                             <p:cond delay="0"/>
                                           </p:stCondLst>
@@ -8939,14 +9094,14 @@
                                 </p:cTn>
                               </p:par>
                               <p:par>
-                                <p:cTn id="9" presetID="1" presetClass="entr" presetSubtype="0" fill="hold" nodeType="withEffect">
+                                <p:cTn id="13" presetID="1" presetClass="entr" presetSubtype="0" fill="hold" nodeType="withEffect">
                                   <p:stCondLst>
                                     <p:cond delay="0"/>
                                   </p:stCondLst>
                                   <p:childTnLst>
                                     <p:set>
                                       <p:cBhvr>
-                                        <p:cTn id="10" dur="1" fill="hold">
+                                        <p:cTn id="14" dur="1" fill="hold">
                                           <p:stCondLst>
                                             <p:cond delay="0"/>
                                           </p:stCondLst>
@@ -8970,14 +9125,14 @@
                                 </p:cTn>
                               </p:par>
                               <p:par>
-                                <p:cTn id="11" presetID="1" presetClass="entr" presetSubtype="0" fill="hold" nodeType="withEffect">
+                                <p:cTn id="15" presetID="1" presetClass="entr" presetSubtype="0" fill="hold" nodeType="withEffect">
                                   <p:stCondLst>
                                     <p:cond delay="0"/>
                                   </p:stCondLst>
                                   <p:childTnLst>
                                     <p:set>
                                       <p:cBhvr>
-                                        <p:cTn id="12" dur="1" fill="hold">
+                                        <p:cTn id="16" dur="1" fill="hold">
                                           <p:stCondLst>
                                             <p:cond delay="0"/>
                                           </p:stCondLst>
@@ -9372,50 +9527,6 @@
           </a:p>
         </p:txBody>
       </p:sp>
-      <p:cxnSp>
-        <p:nvCxnSpPr>
-          <p:cNvPr id="7" name="Straight Arrow Connector 6">
-            <a:extLst>
-              <a:ext uri="{FF2B5EF4-FFF2-40B4-BE49-F238E27FC236}">
-                <a16:creationId xmlns:a16="http://schemas.microsoft.com/office/drawing/2014/main" id="{79F8185C-1BAA-0D4B-8DEE-563F4226BD37}"/>
-              </a:ext>
-            </a:extLst>
-          </p:cNvPr>
-          <p:cNvCxnSpPr>
-            <a:cxnSpLocks/>
-          </p:cNvCxnSpPr>
-          <p:nvPr/>
-        </p:nvCxnSpPr>
-        <p:spPr>
-          <a:xfrm flipH="1">
-            <a:off x="3122341" y="2207941"/>
-            <a:ext cx="4638908" cy="825191"/>
-          </a:xfrm>
-          <a:prstGeom prst="straightConnector1">
-            <a:avLst/>
-          </a:prstGeom>
-          <a:ln w="50800">
-            <a:solidFill>
-              <a:schemeClr val="tx1"/>
-            </a:solidFill>
-            <a:tailEnd type="triangle" w="lg" len="med"/>
-          </a:ln>
-        </p:spPr>
-        <p:style>
-          <a:lnRef idx="1">
-            <a:schemeClr val="accent1"/>
-          </a:lnRef>
-          <a:fillRef idx="0">
-            <a:schemeClr val="accent1"/>
-          </a:fillRef>
-          <a:effectRef idx="0">
-            <a:schemeClr val="accent1"/>
-          </a:effectRef>
-          <a:fontRef idx="minor">
-            <a:schemeClr val="tx1"/>
-          </a:fontRef>
-        </p:style>
-      </p:cxnSp>
     </p:spTree>
     <p:custDataLst>
       <p:tags r:id="rId1"/>
@@ -11270,11 +11381,11 @@
           <a:p>
             <a:r>
               <a:rPr lang="en-US" dirty="0"/>
-              <a:t>Compute &amp; update values </a:t>
+              <a:t>Aggregate state </a:t>
             </a:r>
             <a:r>
               <a:rPr lang="is-IS" dirty="0"/>
-              <a:t>at switch line rate (1 pkt/ns)</a:t>
+              <a:t>at switch‘s line rate (1 pkt/ns)</a:t>
             </a:r>
           </a:p>
           <a:p>
@@ -11693,7 +11804,15 @@
           <a:p>
             <a:r>
               <a:rPr lang="en-US" dirty="0"/>
-              <a:t>Value=state being tracked (e.g., count)</a:t>
+              <a:t>Value=state being tracked (e.g., count, </a:t>
+            </a:r>
+            <a:r>
+              <a:rPr lang="en-US" dirty="0" err="1"/>
+              <a:t>ewma</a:t>
+            </a:r>
+            <a:r>
+              <a:rPr lang="en-US" dirty="0"/>
+              <a:t>)</a:t>
             </a:r>
           </a:p>
           <a:p>
@@ -12071,7 +12190,7 @@
           <a:effectLst/>
           <a:extLst>
             <a:ext uri="{909E8E84-426E-40dd-AFC4-6F175D3DCCD1}">
-              <a14:hiddenFill xmlns="" xmlns:a14="http://schemas.microsoft.com/office/drawing/2010/main">
+              <a14:hiddenFill xmlns:a14="http://schemas.microsoft.com/office/drawing/2010/main" xmlns="">
                 <a:blipFill dpi="0" rotWithShape="0">
                   <a:blip/>
                   <a:srcRect/>
@@ -12082,7 +12201,7 @@
               </a14:hiddenFill>
             </a:ext>
             <a:ext uri="{91240B29-F687-4f45-9708-019B960494DF}">
-              <a14:hiddenLine xmlns="" xmlns:a14="http://schemas.microsoft.com/office/drawing/2010/main" w="9525">
+              <a14:hiddenLine xmlns:a14="http://schemas.microsoft.com/office/drawing/2010/main" xmlns="" w="9525">
                 <a:solidFill>
                   <a:srgbClr val="000000"/>
                 </a:solidFill>
@@ -12092,7 +12211,7 @@
               </a14:hiddenLine>
             </a:ext>
             <a:ext uri="{AF507438-7753-43e0-B8FC-AC1667EBCBE1}">
-              <a14:hiddenEffects xmlns="" xmlns:a14="http://schemas.microsoft.com/office/drawing/2010/main">
+              <a14:hiddenEffects xmlns:a14="http://schemas.microsoft.com/office/drawing/2010/main" xmlns="">
                 <a:effectLst>
                   <a:outerShdw blurRad="63500" dist="38099" dir="2700000" algn="ctr" rotWithShape="0">
                     <a:srgbClr val="000000">
@@ -12141,7 +12260,7 @@
           <a:effectLst/>
           <a:extLst>
             <a:ext uri="{909E8E84-426E-40dd-AFC4-6F175D3DCCD1}">
-              <a14:hiddenFill xmlns="" xmlns:a14="http://schemas.microsoft.com/office/drawing/2010/main">
+              <a14:hiddenFill xmlns:a14="http://schemas.microsoft.com/office/drawing/2010/main" xmlns="">
                 <a:blipFill dpi="0" rotWithShape="0">
                   <a:blip/>
                   <a:srcRect/>
@@ -12152,7 +12271,7 @@
               </a14:hiddenFill>
             </a:ext>
             <a:ext uri="{91240B29-F687-4f45-9708-019B960494DF}">
-              <a14:hiddenLine xmlns="" xmlns:a14="http://schemas.microsoft.com/office/drawing/2010/main" w="9525">
+              <a14:hiddenLine xmlns:a14="http://schemas.microsoft.com/office/drawing/2010/main" xmlns="" w="9525">
                 <a:solidFill>
                   <a:srgbClr val="000000"/>
                 </a:solidFill>
@@ -12162,7 +12281,7 @@
               </a14:hiddenLine>
             </a:ext>
             <a:ext uri="{AF507438-7753-43e0-B8FC-AC1667EBCBE1}">
-              <a14:hiddenEffects xmlns="" xmlns:a14="http://schemas.microsoft.com/office/drawing/2010/main">
+              <a14:hiddenEffects xmlns:a14="http://schemas.microsoft.com/office/drawing/2010/main" xmlns="">
                 <a:effectLst>
                   <a:outerShdw blurRad="63500" dist="38099" dir="2700000" algn="ctr" rotWithShape="0">
                     <a:srgbClr val="000000">
@@ -12297,7 +12416,7 @@
             <a:effectLst/>
             <a:extLst>
               <a:ext uri="{909E8E84-426E-40dd-AFC4-6F175D3DCCD1}">
-                <a14:hiddenFill xmlns:a14="http://schemas.microsoft.com/office/drawing/2010/main" xmlns="">
+                <a14:hiddenFill xmlns="" xmlns:a14="http://schemas.microsoft.com/office/drawing/2010/main">
                   <a:blipFill dpi="0" rotWithShape="0">
                     <a:blip/>
                     <a:srcRect/>
@@ -12308,7 +12427,7 @@
                 </a14:hiddenFill>
               </a:ext>
               <a:ext uri="{91240B29-F687-4f45-9708-019B960494DF}">
-                <a14:hiddenLine xmlns:a14="http://schemas.microsoft.com/office/drawing/2010/main" xmlns="" w="9525">
+                <a14:hiddenLine xmlns="" xmlns:a14="http://schemas.microsoft.com/office/drawing/2010/main" w="9525">
                   <a:solidFill>
                     <a:srgbClr val="000000"/>
                   </a:solidFill>
@@ -12318,7 +12437,7 @@
                 </a14:hiddenLine>
               </a:ext>
               <a:ext uri="{AF507438-7753-43e0-B8FC-AC1667EBCBE1}">
-                <a14:hiddenEffects xmlns:a14="http://schemas.microsoft.com/office/drawing/2010/main" xmlns="">
+                <a14:hiddenEffects xmlns="" xmlns:a14="http://schemas.microsoft.com/office/drawing/2010/main">
                   <a:effectLst>
                     <a:outerShdw blurRad="63500" dist="38099" dir="2700000" algn="ctr" rotWithShape="0">
                       <a:srgbClr val="000000">
@@ -12367,7 +12486,7 @@
             <a:effectLst/>
             <a:extLst>
               <a:ext uri="{909E8E84-426E-40dd-AFC4-6F175D3DCCD1}">
-                <a14:hiddenFill xmlns:a14="http://schemas.microsoft.com/office/drawing/2010/main" xmlns="">
+                <a14:hiddenFill xmlns="" xmlns:a14="http://schemas.microsoft.com/office/drawing/2010/main">
                   <a:blipFill dpi="0" rotWithShape="0">
                     <a:blip/>
                     <a:srcRect/>
@@ -12378,7 +12497,7 @@
                 </a14:hiddenFill>
               </a:ext>
               <a:ext uri="{91240B29-F687-4f45-9708-019B960494DF}">
-                <a14:hiddenLine xmlns:a14="http://schemas.microsoft.com/office/drawing/2010/main" xmlns="" w="9525">
+                <a14:hiddenLine xmlns="" xmlns:a14="http://schemas.microsoft.com/office/drawing/2010/main" w="9525">
                   <a:solidFill>
                     <a:srgbClr val="000000"/>
                   </a:solidFill>
@@ -12388,7 +12507,7 @@
                 </a14:hiddenLine>
               </a:ext>
               <a:ext uri="{AF507438-7753-43e0-B8FC-AC1667EBCBE1}">
-                <a14:hiddenEffects xmlns:a14="http://schemas.microsoft.com/office/drawing/2010/main" xmlns="">
+                <a14:hiddenEffects xmlns="" xmlns:a14="http://schemas.microsoft.com/office/drawing/2010/main">
                   <a:effectLst>
                     <a:outerShdw blurRad="63500" dist="38099" dir="2700000" algn="ctr" rotWithShape="0">
                       <a:srgbClr val="000000">
@@ -12437,7 +12556,7 @@
             <a:effectLst/>
             <a:extLst>
               <a:ext uri="{909E8E84-426E-40dd-AFC4-6F175D3DCCD1}">
-                <a14:hiddenFill xmlns:a14="http://schemas.microsoft.com/office/drawing/2010/main" xmlns="">
+                <a14:hiddenFill xmlns="" xmlns:a14="http://schemas.microsoft.com/office/drawing/2010/main">
                   <a:blipFill dpi="0" rotWithShape="0">
                     <a:blip/>
                     <a:srcRect/>
@@ -12448,7 +12567,7 @@
                 </a14:hiddenFill>
               </a:ext>
               <a:ext uri="{91240B29-F687-4f45-9708-019B960494DF}">
-                <a14:hiddenLine xmlns:a14="http://schemas.microsoft.com/office/drawing/2010/main" xmlns="" w="9525">
+                <a14:hiddenLine xmlns="" xmlns:a14="http://schemas.microsoft.com/office/drawing/2010/main" w="9525">
                   <a:solidFill>
                     <a:srgbClr val="000000"/>
                   </a:solidFill>
@@ -12458,7 +12577,7 @@
                 </a14:hiddenLine>
               </a:ext>
               <a:ext uri="{AF507438-7753-43e0-B8FC-AC1667EBCBE1}">
-                <a14:hiddenEffects xmlns:a14="http://schemas.microsoft.com/office/drawing/2010/main" xmlns="">
+                <a14:hiddenEffects xmlns="" xmlns:a14="http://schemas.microsoft.com/office/drawing/2010/main">
                   <a:effectLst>
                     <a:outerShdw blurRad="63500" dist="38099" dir="2700000" algn="ctr" rotWithShape="0">
                       <a:srgbClr val="000000">
@@ -12499,12 +12618,12 @@
             <a:effectLst/>
             <a:extLst>
               <a:ext uri="{909E8E84-426E-40dd-AFC4-6F175D3DCCD1}">
-                <a14:hiddenFill xmlns:a14="http://schemas.microsoft.com/office/drawing/2010/main" xmlns="">
+                <a14:hiddenFill xmlns="" xmlns:a14="http://schemas.microsoft.com/office/drawing/2010/main">
                   <a:noFill/>
                 </a14:hiddenFill>
               </a:ext>
               <a:ext uri="{AF507438-7753-43e0-B8FC-AC1667EBCBE1}">
-                <a14:hiddenEffects xmlns:a14="http://schemas.microsoft.com/office/drawing/2010/main" xmlns="">
+                <a14:hiddenEffects xmlns="" xmlns:a14="http://schemas.microsoft.com/office/drawing/2010/main">
                   <a:effectLst>
                     <a:outerShdw blurRad="63500" dist="38099" dir="2700000" algn="ctr" rotWithShape="0">
                       <a:srgbClr val="000000">
@@ -12557,12 +12676,12 @@
             <a:effectLst/>
             <a:extLst>
               <a:ext uri="{909E8E84-426E-40dd-AFC4-6F175D3DCCD1}">
-                <a14:hiddenFill xmlns:a14="http://schemas.microsoft.com/office/drawing/2010/main" xmlns="">
+                <a14:hiddenFill xmlns="" xmlns:a14="http://schemas.microsoft.com/office/drawing/2010/main">
                   <a:noFill/>
                 </a14:hiddenFill>
               </a:ext>
               <a:ext uri="{AF507438-7753-43e0-B8FC-AC1667EBCBE1}">
-                <a14:hiddenEffects xmlns:a14="http://schemas.microsoft.com/office/drawing/2010/main" xmlns="">
+                <a14:hiddenEffects xmlns="" xmlns:a14="http://schemas.microsoft.com/office/drawing/2010/main">
                   <a:effectLst>
                     <a:outerShdw blurRad="63500" dist="38099" dir="2700000" algn="ctr" rotWithShape="0">
                       <a:srgbClr val="000000">
@@ -12615,12 +12734,12 @@
             <a:effectLst/>
             <a:extLst>
               <a:ext uri="{909E8E84-426E-40dd-AFC4-6F175D3DCCD1}">
-                <a14:hiddenFill xmlns:a14="http://schemas.microsoft.com/office/drawing/2010/main" xmlns="">
+                <a14:hiddenFill xmlns="" xmlns:a14="http://schemas.microsoft.com/office/drawing/2010/main">
                   <a:noFill/>
                 </a14:hiddenFill>
               </a:ext>
               <a:ext uri="{AF507438-7753-43e0-B8FC-AC1667EBCBE1}">
-                <a14:hiddenEffects xmlns:a14="http://schemas.microsoft.com/office/drawing/2010/main" xmlns="">
+                <a14:hiddenEffects xmlns="" xmlns:a14="http://schemas.microsoft.com/office/drawing/2010/main">
                   <a:effectLst>
                     <a:outerShdw blurRad="63500" dist="38099" dir="2700000" algn="ctr" rotWithShape="0">
                       <a:srgbClr val="000000">
@@ -12673,12 +12792,12 @@
             <a:effectLst/>
             <a:extLst>
               <a:ext uri="{909E8E84-426E-40dd-AFC4-6F175D3DCCD1}">
-                <a14:hiddenFill xmlns:a14="http://schemas.microsoft.com/office/drawing/2010/main" xmlns="">
+                <a14:hiddenFill xmlns="" xmlns:a14="http://schemas.microsoft.com/office/drawing/2010/main">
                   <a:noFill/>
                 </a14:hiddenFill>
               </a:ext>
               <a:ext uri="{AF507438-7753-43e0-B8FC-AC1667EBCBE1}">
-                <a14:hiddenEffects xmlns:a14="http://schemas.microsoft.com/office/drawing/2010/main" xmlns="">
+                <a14:hiddenEffects xmlns="" xmlns:a14="http://schemas.microsoft.com/office/drawing/2010/main">
                   <a:effectLst>
                     <a:outerShdw blurRad="63500" dist="38099" dir="2700000" algn="ctr" rotWithShape="0">
                       <a:srgbClr val="000000">
@@ -12731,12 +12850,12 @@
             <a:effectLst/>
             <a:extLst>
               <a:ext uri="{909E8E84-426E-40dd-AFC4-6F175D3DCCD1}">
-                <a14:hiddenFill xmlns:a14="http://schemas.microsoft.com/office/drawing/2010/main" xmlns="">
+                <a14:hiddenFill xmlns="" xmlns:a14="http://schemas.microsoft.com/office/drawing/2010/main">
                   <a:noFill/>
                 </a14:hiddenFill>
               </a:ext>
               <a:ext uri="{AF507438-7753-43e0-B8FC-AC1667EBCBE1}">
-                <a14:hiddenEffects xmlns:a14="http://schemas.microsoft.com/office/drawing/2010/main" xmlns="">
+                <a14:hiddenEffects xmlns="" xmlns:a14="http://schemas.microsoft.com/office/drawing/2010/main">
                   <a:effectLst>
                     <a:outerShdw blurRad="63500" dist="38099" dir="2700000" algn="ctr" rotWithShape="0">
                       <a:srgbClr val="000000">
@@ -12789,12 +12908,12 @@
             <a:effectLst/>
             <a:extLst>
               <a:ext uri="{909E8E84-426E-40dd-AFC4-6F175D3DCCD1}">
-                <a14:hiddenFill xmlns:a14="http://schemas.microsoft.com/office/drawing/2010/main" xmlns="">
+                <a14:hiddenFill xmlns="" xmlns:a14="http://schemas.microsoft.com/office/drawing/2010/main">
                   <a:noFill/>
                 </a14:hiddenFill>
               </a:ext>
               <a:ext uri="{AF507438-7753-43e0-B8FC-AC1667EBCBE1}">
-                <a14:hiddenEffects xmlns:a14="http://schemas.microsoft.com/office/drawing/2010/main" xmlns="">
+                <a14:hiddenEffects xmlns="" xmlns:a14="http://schemas.microsoft.com/office/drawing/2010/main">
                   <a:effectLst>
                     <a:outerShdw blurRad="63500" dist="38099" dir="2700000" algn="ctr" rotWithShape="0">
                       <a:srgbClr val="000000">
@@ -12847,12 +12966,12 @@
             <a:effectLst/>
             <a:extLst>
               <a:ext uri="{909E8E84-426E-40dd-AFC4-6F175D3DCCD1}">
-                <a14:hiddenFill xmlns:a14="http://schemas.microsoft.com/office/drawing/2010/main" xmlns="">
+                <a14:hiddenFill xmlns="" xmlns:a14="http://schemas.microsoft.com/office/drawing/2010/main">
                   <a:noFill/>
                 </a14:hiddenFill>
               </a:ext>
               <a:ext uri="{AF507438-7753-43e0-B8FC-AC1667EBCBE1}">
-                <a14:hiddenEffects xmlns:a14="http://schemas.microsoft.com/office/drawing/2010/main" xmlns="">
+                <a14:hiddenEffects xmlns="" xmlns:a14="http://schemas.microsoft.com/office/drawing/2010/main">
                   <a:effectLst>
                     <a:outerShdw blurRad="63500" dist="38099" dir="2700000" algn="ctr" rotWithShape="0">
                       <a:srgbClr val="000000">
@@ -12905,12 +13024,12 @@
             <a:effectLst/>
             <a:extLst>
               <a:ext uri="{909E8E84-426E-40dd-AFC4-6F175D3DCCD1}">
-                <a14:hiddenFill xmlns:a14="http://schemas.microsoft.com/office/drawing/2010/main" xmlns="">
+                <a14:hiddenFill xmlns="" xmlns:a14="http://schemas.microsoft.com/office/drawing/2010/main">
                   <a:noFill/>
                 </a14:hiddenFill>
               </a:ext>
               <a:ext uri="{AF507438-7753-43e0-B8FC-AC1667EBCBE1}">
-                <a14:hiddenEffects xmlns:a14="http://schemas.microsoft.com/office/drawing/2010/main" xmlns="">
+                <a14:hiddenEffects xmlns="" xmlns:a14="http://schemas.microsoft.com/office/drawing/2010/main">
                   <a:effectLst>
                     <a:outerShdw blurRad="63500" dist="38099" dir="2700000" algn="ctr" rotWithShape="0">
                       <a:srgbClr val="000000">
@@ -12963,12 +13082,12 @@
             <a:effectLst/>
             <a:extLst>
               <a:ext uri="{909E8E84-426E-40dd-AFC4-6F175D3DCCD1}">
-                <a14:hiddenFill xmlns:a14="http://schemas.microsoft.com/office/drawing/2010/main" xmlns="">
+                <a14:hiddenFill xmlns="" xmlns:a14="http://schemas.microsoft.com/office/drawing/2010/main">
                   <a:noFill/>
                 </a14:hiddenFill>
               </a:ext>
               <a:ext uri="{AF507438-7753-43e0-B8FC-AC1667EBCBE1}">
-                <a14:hiddenEffects xmlns:a14="http://schemas.microsoft.com/office/drawing/2010/main" xmlns="">
+                <a14:hiddenEffects xmlns="" xmlns:a14="http://schemas.microsoft.com/office/drawing/2010/main">
                   <a:effectLst>
                     <a:outerShdw blurRad="63500" dist="38099" dir="2700000" algn="ctr" rotWithShape="0">
                       <a:srgbClr val="000000">
@@ -13021,12 +13140,12 @@
             <a:effectLst/>
             <a:extLst>
               <a:ext uri="{909E8E84-426E-40dd-AFC4-6F175D3DCCD1}">
-                <a14:hiddenFill xmlns:a14="http://schemas.microsoft.com/office/drawing/2010/main" xmlns="">
+                <a14:hiddenFill xmlns="" xmlns:a14="http://schemas.microsoft.com/office/drawing/2010/main">
                   <a:noFill/>
                 </a14:hiddenFill>
               </a:ext>
               <a:ext uri="{AF507438-7753-43e0-B8FC-AC1667EBCBE1}">
-                <a14:hiddenEffects xmlns:a14="http://schemas.microsoft.com/office/drawing/2010/main" xmlns="">
+                <a14:hiddenEffects xmlns="" xmlns:a14="http://schemas.microsoft.com/office/drawing/2010/main">
                   <a:effectLst>
                     <a:outerShdw blurRad="63500" dist="38099" dir="2700000" algn="ctr" rotWithShape="0">
                       <a:srgbClr val="000000">
@@ -13087,7 +13206,7 @@
             <a:effectLst/>
             <a:extLst>
               <a:ext uri="{909E8E84-426E-40dd-AFC4-6F175D3DCCD1}">
-                <a14:hiddenFill xmlns:a14="http://schemas.microsoft.com/office/drawing/2010/main" xmlns="">
+                <a14:hiddenFill xmlns="" xmlns:a14="http://schemas.microsoft.com/office/drawing/2010/main">
                   <a:blipFill dpi="0" rotWithShape="0">
                     <a:blip/>
                     <a:srcRect/>
@@ -13098,7 +13217,7 @@
                 </a14:hiddenFill>
               </a:ext>
               <a:ext uri="{91240B29-F687-4f45-9708-019B960494DF}">
-                <a14:hiddenLine xmlns:a14="http://schemas.microsoft.com/office/drawing/2010/main" xmlns="" w="9525">
+                <a14:hiddenLine xmlns="" xmlns:a14="http://schemas.microsoft.com/office/drawing/2010/main" w="9525">
                   <a:solidFill>
                     <a:srgbClr val="000000"/>
                   </a:solidFill>
@@ -13108,7 +13227,7 @@
                 </a14:hiddenLine>
               </a:ext>
               <a:ext uri="{AF507438-7753-43e0-B8FC-AC1667EBCBE1}">
-                <a14:hiddenEffects xmlns:a14="http://schemas.microsoft.com/office/drawing/2010/main" xmlns="">
+                <a14:hiddenEffects xmlns="" xmlns:a14="http://schemas.microsoft.com/office/drawing/2010/main">
                   <a:effectLst>
                     <a:outerShdw blurRad="63500" dist="38099" dir="2700000" algn="ctr" rotWithShape="0">
                       <a:srgbClr val="000000">
@@ -13157,7 +13276,7 @@
             <a:effectLst/>
             <a:extLst>
               <a:ext uri="{909E8E84-426E-40dd-AFC4-6F175D3DCCD1}">
-                <a14:hiddenFill xmlns:a14="http://schemas.microsoft.com/office/drawing/2010/main" xmlns="">
+                <a14:hiddenFill xmlns="" xmlns:a14="http://schemas.microsoft.com/office/drawing/2010/main">
                   <a:blipFill dpi="0" rotWithShape="0">
                     <a:blip/>
                     <a:srcRect/>
@@ -13168,7 +13287,7 @@
                 </a14:hiddenFill>
               </a:ext>
               <a:ext uri="{91240B29-F687-4f45-9708-019B960494DF}">
-                <a14:hiddenLine xmlns:a14="http://schemas.microsoft.com/office/drawing/2010/main" xmlns="" w="9525">
+                <a14:hiddenLine xmlns="" xmlns:a14="http://schemas.microsoft.com/office/drawing/2010/main" w="9525">
                   <a:solidFill>
                     <a:srgbClr val="000000"/>
                   </a:solidFill>
@@ -13178,7 +13297,7 @@
                 </a14:hiddenLine>
               </a:ext>
               <a:ext uri="{AF507438-7753-43e0-B8FC-AC1667EBCBE1}">
-                <a14:hiddenEffects xmlns:a14="http://schemas.microsoft.com/office/drawing/2010/main" xmlns="">
+                <a14:hiddenEffects xmlns="" xmlns:a14="http://schemas.microsoft.com/office/drawing/2010/main">
                   <a:effectLst>
                     <a:outerShdw blurRad="63500" dist="38099" dir="2700000" algn="ctr" rotWithShape="0">
                       <a:srgbClr val="000000">
@@ -13227,7 +13346,7 @@
             <a:effectLst/>
             <a:extLst>
               <a:ext uri="{909E8E84-426E-40dd-AFC4-6F175D3DCCD1}">
-                <a14:hiddenFill xmlns:a14="http://schemas.microsoft.com/office/drawing/2010/main" xmlns="">
+                <a14:hiddenFill xmlns="" xmlns:a14="http://schemas.microsoft.com/office/drawing/2010/main">
                   <a:blipFill dpi="0" rotWithShape="0">
                     <a:blip/>
                     <a:srcRect/>
@@ -13238,7 +13357,7 @@
                 </a14:hiddenFill>
               </a:ext>
               <a:ext uri="{91240B29-F687-4f45-9708-019B960494DF}">
-                <a14:hiddenLine xmlns:a14="http://schemas.microsoft.com/office/drawing/2010/main" xmlns="" w="9525">
+                <a14:hiddenLine xmlns="" xmlns:a14="http://schemas.microsoft.com/office/drawing/2010/main" w="9525">
                   <a:solidFill>
                     <a:srgbClr val="000000"/>
                   </a:solidFill>
@@ -13248,7 +13367,7 @@
                 </a14:hiddenLine>
               </a:ext>
               <a:ext uri="{AF507438-7753-43e0-B8FC-AC1667EBCBE1}">
-                <a14:hiddenEffects xmlns:a14="http://schemas.microsoft.com/office/drawing/2010/main" xmlns="">
+                <a14:hiddenEffects xmlns="" xmlns:a14="http://schemas.microsoft.com/office/drawing/2010/main">
                   <a:effectLst>
                     <a:outerShdw blurRad="63500" dist="38099" dir="2700000" algn="ctr" rotWithShape="0">
                       <a:srgbClr val="000000">
@@ -13297,7 +13416,7 @@
             <a:effectLst/>
             <a:extLst>
               <a:ext uri="{909E8E84-426E-40dd-AFC4-6F175D3DCCD1}">
-                <a14:hiddenFill xmlns:a14="http://schemas.microsoft.com/office/drawing/2010/main" xmlns="">
+                <a14:hiddenFill xmlns="" xmlns:a14="http://schemas.microsoft.com/office/drawing/2010/main">
                   <a:blipFill dpi="0" rotWithShape="0">
                     <a:blip/>
                     <a:srcRect/>
@@ -13308,7 +13427,7 @@
                 </a14:hiddenFill>
               </a:ext>
               <a:ext uri="{91240B29-F687-4f45-9708-019B960494DF}">
-                <a14:hiddenLine xmlns:a14="http://schemas.microsoft.com/office/drawing/2010/main" xmlns="" w="9525">
+                <a14:hiddenLine xmlns="" xmlns:a14="http://schemas.microsoft.com/office/drawing/2010/main" w="9525">
                   <a:solidFill>
                     <a:srgbClr val="000000"/>
                   </a:solidFill>
@@ -13318,7 +13437,7 @@
                 </a14:hiddenLine>
               </a:ext>
               <a:ext uri="{AF507438-7753-43e0-B8FC-AC1667EBCBE1}">
-                <a14:hiddenEffects xmlns:a14="http://schemas.microsoft.com/office/drawing/2010/main" xmlns="">
+                <a14:hiddenEffects xmlns="" xmlns:a14="http://schemas.microsoft.com/office/drawing/2010/main">
                   <a:effectLst>
                     <a:outerShdw blurRad="63500" dist="38099" dir="2700000" algn="ctr" rotWithShape="0">
                       <a:srgbClr val="000000">
@@ -13367,7 +13486,7 @@
             <a:effectLst/>
             <a:extLst>
               <a:ext uri="{909E8E84-426E-40dd-AFC4-6F175D3DCCD1}">
-                <a14:hiddenFill xmlns:a14="http://schemas.microsoft.com/office/drawing/2010/main" xmlns="">
+                <a14:hiddenFill xmlns="" xmlns:a14="http://schemas.microsoft.com/office/drawing/2010/main">
                   <a:blipFill dpi="0" rotWithShape="0">
                     <a:blip/>
                     <a:srcRect/>
@@ -13378,7 +13497,7 @@
                 </a14:hiddenFill>
               </a:ext>
               <a:ext uri="{91240B29-F687-4f45-9708-019B960494DF}">
-                <a14:hiddenLine xmlns:a14="http://schemas.microsoft.com/office/drawing/2010/main" xmlns="" w="9525">
+                <a14:hiddenLine xmlns="" xmlns:a14="http://schemas.microsoft.com/office/drawing/2010/main" w="9525">
                   <a:solidFill>
                     <a:srgbClr val="000000"/>
                   </a:solidFill>
@@ -13388,7 +13507,7 @@
                 </a14:hiddenLine>
               </a:ext>
               <a:ext uri="{AF507438-7753-43e0-B8FC-AC1667EBCBE1}">
-                <a14:hiddenEffects xmlns:a14="http://schemas.microsoft.com/office/drawing/2010/main" xmlns="">
+                <a14:hiddenEffects xmlns="" xmlns:a14="http://schemas.microsoft.com/office/drawing/2010/main">
                   <a:effectLst>
                     <a:outerShdw blurRad="63500" dist="38099" dir="2700000" algn="ctr" rotWithShape="0">
                       <a:srgbClr val="000000">
@@ -13429,12 +13548,12 @@
             <a:effectLst/>
             <a:extLst>
               <a:ext uri="{909E8E84-426E-40dd-AFC4-6F175D3DCCD1}">
-                <a14:hiddenFill xmlns:a14="http://schemas.microsoft.com/office/drawing/2010/main" xmlns="">
+                <a14:hiddenFill xmlns="" xmlns:a14="http://schemas.microsoft.com/office/drawing/2010/main">
                   <a:noFill/>
                 </a14:hiddenFill>
               </a:ext>
               <a:ext uri="{AF507438-7753-43e0-B8FC-AC1667EBCBE1}">
-                <a14:hiddenEffects xmlns:a14="http://schemas.microsoft.com/office/drawing/2010/main" xmlns="">
+                <a14:hiddenEffects xmlns="" xmlns:a14="http://schemas.microsoft.com/office/drawing/2010/main">
                   <a:effectLst>
                     <a:outerShdw blurRad="63500" dist="38099" dir="2700000" algn="ctr" rotWithShape="0">
                       <a:srgbClr val="000000">
@@ -13487,12 +13606,12 @@
             <a:effectLst/>
             <a:extLst>
               <a:ext uri="{909E8E84-426E-40dd-AFC4-6F175D3DCCD1}">
-                <a14:hiddenFill xmlns:a14="http://schemas.microsoft.com/office/drawing/2010/main" xmlns="">
+                <a14:hiddenFill xmlns="" xmlns:a14="http://schemas.microsoft.com/office/drawing/2010/main">
                   <a:noFill/>
                 </a14:hiddenFill>
               </a:ext>
               <a:ext uri="{AF507438-7753-43e0-B8FC-AC1667EBCBE1}">
-                <a14:hiddenEffects xmlns:a14="http://schemas.microsoft.com/office/drawing/2010/main" xmlns="">
+                <a14:hiddenEffects xmlns="" xmlns:a14="http://schemas.microsoft.com/office/drawing/2010/main">
                   <a:effectLst>
                     <a:outerShdw blurRad="63500" dist="38099" dir="2700000" algn="ctr" rotWithShape="0">
                       <a:srgbClr val="000000">
@@ -13553,7 +13672,7 @@
             <a:effectLst/>
             <a:extLst>
               <a:ext uri="{909E8E84-426E-40dd-AFC4-6F175D3DCCD1}">
-                <a14:hiddenFill xmlns:a14="http://schemas.microsoft.com/office/drawing/2010/main" xmlns="">
+                <a14:hiddenFill xmlns="" xmlns:a14="http://schemas.microsoft.com/office/drawing/2010/main">
                   <a:blipFill dpi="0" rotWithShape="0">
                     <a:blip/>
                     <a:srcRect/>
@@ -13564,7 +13683,7 @@
                 </a14:hiddenFill>
               </a:ext>
               <a:ext uri="{91240B29-F687-4f45-9708-019B960494DF}">
-                <a14:hiddenLine xmlns:a14="http://schemas.microsoft.com/office/drawing/2010/main" xmlns="" w="9525">
+                <a14:hiddenLine xmlns="" xmlns:a14="http://schemas.microsoft.com/office/drawing/2010/main" w="9525">
                   <a:solidFill>
                     <a:srgbClr val="000000"/>
                   </a:solidFill>
@@ -13574,7 +13693,7 @@
                 </a14:hiddenLine>
               </a:ext>
               <a:ext uri="{AF507438-7753-43e0-B8FC-AC1667EBCBE1}">
-                <a14:hiddenEffects xmlns:a14="http://schemas.microsoft.com/office/drawing/2010/main" xmlns="">
+                <a14:hiddenEffects xmlns="" xmlns:a14="http://schemas.microsoft.com/office/drawing/2010/main">
                   <a:effectLst>
                     <a:outerShdw blurRad="63500" dist="38099" dir="2700000" algn="ctr" rotWithShape="0">
                       <a:srgbClr val="000000">
@@ -13707,7 +13826,7 @@
           <a:effectLst/>
           <a:extLst>
             <a:ext uri="{909E8E84-426E-40dd-AFC4-6F175D3DCCD1}">
-              <a14:hiddenFill xmlns="" xmlns:a14="http://schemas.microsoft.com/office/drawing/2010/main">
+              <a14:hiddenFill xmlns:a14="http://schemas.microsoft.com/office/drawing/2010/main" xmlns="">
                 <a:blipFill dpi="0" rotWithShape="0">
                   <a:blip/>
                   <a:srcRect/>
@@ -13718,7 +13837,7 @@
               </a14:hiddenFill>
             </a:ext>
             <a:ext uri="{91240B29-F687-4f45-9708-019B960494DF}">
-              <a14:hiddenLine xmlns="" xmlns:a14="http://schemas.microsoft.com/office/drawing/2010/main" w="9525">
+              <a14:hiddenLine xmlns:a14="http://schemas.microsoft.com/office/drawing/2010/main" xmlns="" w="9525">
                 <a:solidFill>
                   <a:srgbClr val="000000"/>
                 </a:solidFill>
@@ -13728,7 +13847,7 @@
               </a14:hiddenLine>
             </a:ext>
             <a:ext uri="{AF507438-7753-43e0-B8FC-AC1667EBCBE1}">
-              <a14:hiddenEffects xmlns="" xmlns:a14="http://schemas.microsoft.com/office/drawing/2010/main">
+              <a14:hiddenEffects xmlns:a14="http://schemas.microsoft.com/office/drawing/2010/main" xmlns="">
                 <a:effectLst>
                   <a:outerShdw blurRad="63500" dist="38099" dir="2700000" algn="ctr" rotWithShape="0">
                     <a:srgbClr val="000000">
@@ -13813,7 +13932,7 @@
           <a:effectLst/>
           <a:extLst>
             <a:ext uri="{909E8E84-426E-40dd-AFC4-6F175D3DCCD1}">
-              <a14:hiddenFill xmlns="" xmlns:a14="http://schemas.microsoft.com/office/drawing/2010/main">
+              <a14:hiddenFill xmlns:a14="http://schemas.microsoft.com/office/drawing/2010/main" xmlns="">
                 <a:blipFill dpi="0" rotWithShape="0">
                   <a:blip/>
                   <a:srcRect/>
@@ -13824,7 +13943,7 @@
               </a14:hiddenFill>
             </a:ext>
             <a:ext uri="{91240B29-F687-4f45-9708-019B960494DF}">
-              <a14:hiddenLine xmlns="" xmlns:a14="http://schemas.microsoft.com/office/drawing/2010/main" w="9525">
+              <a14:hiddenLine xmlns:a14="http://schemas.microsoft.com/office/drawing/2010/main" xmlns="" w="9525">
                 <a:solidFill>
                   <a:srgbClr val="000000"/>
                 </a:solidFill>
@@ -13834,7 +13953,7 @@
               </a14:hiddenLine>
             </a:ext>
             <a:ext uri="{AF507438-7753-43e0-B8FC-AC1667EBCBE1}">
-              <a14:hiddenEffects xmlns="" xmlns:a14="http://schemas.microsoft.com/office/drawing/2010/main">
+              <a14:hiddenEffects xmlns:a14="http://schemas.microsoft.com/office/drawing/2010/main" xmlns="">
                 <a:effectLst>
                   <a:outerShdw blurRad="63500" dist="38099" dir="2700000" algn="ctr" rotWithShape="0">
                     <a:srgbClr val="000000">
@@ -13919,7 +14038,7 @@
           <a:effectLst/>
           <a:extLst>
             <a:ext uri="{909E8E84-426E-40dd-AFC4-6F175D3DCCD1}">
-              <a14:hiddenFill xmlns="" xmlns:a14="http://schemas.microsoft.com/office/drawing/2010/main">
+              <a14:hiddenFill xmlns:a14="http://schemas.microsoft.com/office/drawing/2010/main" xmlns="">
                 <a:blipFill dpi="0" rotWithShape="0">
                   <a:blip/>
                   <a:srcRect/>
@@ -13930,7 +14049,7 @@
               </a14:hiddenFill>
             </a:ext>
             <a:ext uri="{91240B29-F687-4f45-9708-019B960494DF}">
-              <a14:hiddenLine xmlns="" xmlns:a14="http://schemas.microsoft.com/office/drawing/2010/main" w="9525">
+              <a14:hiddenLine xmlns:a14="http://schemas.microsoft.com/office/drawing/2010/main" xmlns="" w="9525">
                 <a:solidFill>
                   <a:srgbClr val="000000"/>
                 </a:solidFill>
@@ -13940,7 +14059,7 @@
               </a14:hiddenLine>
             </a:ext>
             <a:ext uri="{AF507438-7753-43e0-B8FC-AC1667EBCBE1}">
-              <a14:hiddenEffects xmlns="" xmlns:a14="http://schemas.microsoft.com/office/drawing/2010/main">
+              <a14:hiddenEffects xmlns:a14="http://schemas.microsoft.com/office/drawing/2010/main" xmlns="">
                 <a:effectLst>
                   <a:outerShdw blurRad="63500" dist="38099" dir="2700000" algn="ctr" rotWithShape="0">
                     <a:srgbClr val="000000">
@@ -14119,7 +14238,7 @@
           <a:effectLst/>
           <a:extLst>
             <a:ext uri="{909E8E84-426E-40dd-AFC4-6F175D3DCCD1}">
-              <a14:hiddenFill xmlns="" xmlns:a14="http://schemas.microsoft.com/office/drawing/2010/main">
+              <a14:hiddenFill xmlns:a14="http://schemas.microsoft.com/office/drawing/2010/main" xmlns="">
                 <a:blipFill dpi="0" rotWithShape="0">
                   <a:blip/>
                   <a:srcRect/>
@@ -14130,7 +14249,7 @@
               </a14:hiddenFill>
             </a:ext>
             <a:ext uri="{91240B29-F687-4f45-9708-019B960494DF}">
-              <a14:hiddenLine xmlns="" xmlns:a14="http://schemas.microsoft.com/office/drawing/2010/main" w="9525">
+              <a14:hiddenLine xmlns:a14="http://schemas.microsoft.com/office/drawing/2010/main" xmlns="" w="9525">
                 <a:solidFill>
                   <a:srgbClr val="000000"/>
                 </a:solidFill>
@@ -14140,7 +14259,7 @@
               </a14:hiddenLine>
             </a:ext>
             <a:ext uri="{AF507438-7753-43e0-B8FC-AC1667EBCBE1}">
-              <a14:hiddenEffects xmlns="" xmlns:a14="http://schemas.microsoft.com/office/drawing/2010/main">
+              <a14:hiddenEffects xmlns:a14="http://schemas.microsoft.com/office/drawing/2010/main" xmlns="">
                 <a:effectLst>
                   <a:outerShdw blurRad="63500" dist="38099" dir="2700000" algn="ctr" rotWithShape="0">
                     <a:srgbClr val="000000">
@@ -14218,7 +14337,7 @@
           <a:effectLst/>
           <a:extLst>
             <a:ext uri="{909E8E84-426E-40dd-AFC4-6F175D3DCCD1}">
-              <a14:hiddenFill xmlns="" xmlns:a14="http://schemas.microsoft.com/office/drawing/2010/main">
+              <a14:hiddenFill xmlns:a14="http://schemas.microsoft.com/office/drawing/2010/main" xmlns="">
                 <a:blipFill dpi="0" rotWithShape="0">
                   <a:blip/>
                   <a:srcRect/>
@@ -14229,7 +14348,7 @@
               </a14:hiddenFill>
             </a:ext>
             <a:ext uri="{91240B29-F687-4f45-9708-019B960494DF}">
-              <a14:hiddenLine xmlns="" xmlns:a14="http://schemas.microsoft.com/office/drawing/2010/main" w="9525">
+              <a14:hiddenLine xmlns:a14="http://schemas.microsoft.com/office/drawing/2010/main" xmlns="" w="9525">
                 <a:solidFill>
                   <a:srgbClr val="000000"/>
                 </a:solidFill>
@@ -14239,7 +14358,7 @@
               </a14:hiddenLine>
             </a:ext>
             <a:ext uri="{AF507438-7753-43e0-B8FC-AC1667EBCBE1}">
-              <a14:hiddenEffects xmlns="" xmlns:a14="http://schemas.microsoft.com/office/drawing/2010/main">
+              <a14:hiddenEffects xmlns:a14="http://schemas.microsoft.com/office/drawing/2010/main" xmlns="">
                 <a:effectLst>
                   <a:outerShdw blurRad="63500" dist="38099" dir="2700000" algn="ctr" rotWithShape="0">
                     <a:srgbClr val="000000">
@@ -15988,7 +16107,7 @@
           <a:p>
             <a:r>
               <a:rPr lang="en-US" sz="2800" dirty="0"/>
-              <a:t>Req. key T</a:t>
+              <a:t>Req.  T</a:t>
             </a:r>
           </a:p>
         </p:txBody>
@@ -16104,7 +16223,7 @@
           <a:effectLst/>
           <a:extLst>
             <a:ext uri="{909E8E84-426E-40dd-AFC4-6F175D3DCCD1}">
-              <a14:hiddenFill xmlns:a14="http://schemas.microsoft.com/office/drawing/2010/main" xmlns="">
+              <a14:hiddenFill xmlns="" xmlns:a14="http://schemas.microsoft.com/office/drawing/2010/main">
                 <a:blipFill dpi="0" rotWithShape="0">
                   <a:blip/>
                   <a:srcRect/>
@@ -16115,7 +16234,7 @@
               </a14:hiddenFill>
             </a:ext>
             <a:ext uri="{91240B29-F687-4f45-9708-019B960494DF}">
-              <a14:hiddenLine xmlns:a14="http://schemas.microsoft.com/office/drawing/2010/main" xmlns="" w="9525">
+              <a14:hiddenLine xmlns="" xmlns:a14="http://schemas.microsoft.com/office/drawing/2010/main" w="9525">
                 <a:solidFill>
                   <a:srgbClr val="000000"/>
                 </a:solidFill>
@@ -16125,7 +16244,7 @@
               </a14:hiddenLine>
             </a:ext>
             <a:ext uri="{AF507438-7753-43e0-B8FC-AC1667EBCBE1}">
-              <a14:hiddenEffects xmlns:a14="http://schemas.microsoft.com/office/drawing/2010/main" xmlns="">
+              <a14:hiddenEffects xmlns="" xmlns:a14="http://schemas.microsoft.com/office/drawing/2010/main">
                 <a:effectLst>
                   <a:outerShdw blurRad="63500" dist="38099" dir="2700000" algn="ctr" rotWithShape="0">
                     <a:srgbClr val="000000">
@@ -16285,7 +16404,7 @@
           <a:effectLst/>
           <a:extLst>
             <a:ext uri="{909E8E84-426E-40dd-AFC4-6F175D3DCCD1}">
-              <a14:hiddenFill xmlns:a14="http://schemas.microsoft.com/office/drawing/2010/main" xmlns="">
+              <a14:hiddenFill xmlns="" xmlns:a14="http://schemas.microsoft.com/office/drawing/2010/main">
                 <a:blipFill dpi="0" rotWithShape="0">
                   <a:blip/>
                   <a:srcRect/>
@@ -16296,7 +16415,7 @@
               </a14:hiddenFill>
             </a:ext>
             <a:ext uri="{91240B29-F687-4f45-9708-019B960494DF}">
-              <a14:hiddenLine xmlns:a14="http://schemas.microsoft.com/office/drawing/2010/main" xmlns="" w="9525">
+              <a14:hiddenLine xmlns="" xmlns:a14="http://schemas.microsoft.com/office/drawing/2010/main" w="9525">
                 <a:solidFill>
                   <a:srgbClr val="000000"/>
                 </a:solidFill>
@@ -16306,7 +16425,7 @@
               </a14:hiddenLine>
             </a:ext>
             <a:ext uri="{AF507438-7753-43e0-B8FC-AC1667EBCBE1}">
-              <a14:hiddenEffects xmlns:a14="http://schemas.microsoft.com/office/drawing/2010/main" xmlns="">
+              <a14:hiddenEffects xmlns="" xmlns:a14="http://schemas.microsoft.com/office/drawing/2010/main">
                 <a:effectLst>
                   <a:outerShdw blurRad="63500" dist="38099" dir="2700000" algn="ctr" rotWithShape="0">
                     <a:srgbClr val="000000">
@@ -17740,7 +17859,7 @@
           <a:p>
             <a:r>
               <a:rPr lang="en-US" sz="2800" dirty="0"/>
-              <a:t>Req. key T</a:t>
+              <a:t>Req. T</a:t>
             </a:r>
           </a:p>
         </p:txBody>
@@ -18105,7 +18224,7 @@
           <a:effectLst/>
           <a:extLst>
             <a:ext uri="{909E8E84-426E-40dd-AFC4-6F175D3DCCD1}">
-              <a14:hiddenFill xmlns:a14="http://schemas.microsoft.com/office/drawing/2010/main" xmlns="">
+              <a14:hiddenFill xmlns="" xmlns:a14="http://schemas.microsoft.com/office/drawing/2010/main">
                 <a:blipFill dpi="0" rotWithShape="0">
                   <a:blip/>
                   <a:srcRect/>
@@ -18116,7 +18235,7 @@
               </a14:hiddenFill>
             </a:ext>
             <a:ext uri="{91240B29-F687-4f45-9708-019B960494DF}">
-              <a14:hiddenLine xmlns:a14="http://schemas.microsoft.com/office/drawing/2010/main" xmlns="" w="9525">
+              <a14:hiddenLine xmlns="" xmlns:a14="http://schemas.microsoft.com/office/drawing/2010/main" w="9525">
                 <a:solidFill>
                   <a:srgbClr val="000000"/>
                 </a:solidFill>
@@ -18126,7 +18245,7 @@
               </a14:hiddenLine>
             </a:ext>
             <a:ext uri="{AF507438-7753-43e0-B8FC-AC1667EBCBE1}">
-              <a14:hiddenEffects xmlns:a14="http://schemas.microsoft.com/office/drawing/2010/main" xmlns="">
+              <a14:hiddenEffects xmlns="" xmlns:a14="http://schemas.microsoft.com/office/drawing/2010/main">
                 <a:effectLst>
                   <a:outerShdw blurRad="63500" dist="38099" dir="2700000" algn="ctr" rotWithShape="0">
                     <a:srgbClr val="000000">
@@ -18219,7 +18338,7 @@
           <a:effectLst/>
           <a:extLst>
             <a:ext uri="{909E8E84-426E-40dd-AFC4-6F175D3DCCD1}">
-              <a14:hiddenFill xmlns:a14="http://schemas.microsoft.com/office/drawing/2010/main" xmlns="">
+              <a14:hiddenFill xmlns="" xmlns:a14="http://schemas.microsoft.com/office/drawing/2010/main">
                 <a:blipFill dpi="0" rotWithShape="0">
                   <a:blip/>
                   <a:srcRect/>
@@ -18230,7 +18349,7 @@
               </a14:hiddenFill>
             </a:ext>
             <a:ext uri="{91240B29-F687-4f45-9708-019B960494DF}">
-              <a14:hiddenLine xmlns:a14="http://schemas.microsoft.com/office/drawing/2010/main" xmlns="" w="9525">
+              <a14:hiddenLine xmlns="" xmlns:a14="http://schemas.microsoft.com/office/drawing/2010/main" w="9525">
                 <a:solidFill>
                   <a:srgbClr val="000000"/>
                 </a:solidFill>
@@ -18240,7 +18359,7 @@
               </a14:hiddenLine>
             </a:ext>
             <a:ext uri="{AF507438-7753-43e0-B8FC-AC1667EBCBE1}">
-              <a14:hiddenEffects xmlns:a14="http://schemas.microsoft.com/office/drawing/2010/main" xmlns="">
+              <a14:hiddenEffects xmlns="" xmlns:a14="http://schemas.microsoft.com/office/drawing/2010/main">
                 <a:effectLst>
                   <a:outerShdw blurRad="63500" dist="38099" dir="2700000" algn="ctr" rotWithShape="0">
                     <a:srgbClr val="000000">
@@ -21112,7 +21231,7 @@
           <a:effectLst/>
           <a:extLst>
             <a:ext uri="{909E8E84-426E-40dd-AFC4-6F175D3DCCD1}">
-              <a14:hiddenFill xmlns:a14="http://schemas.microsoft.com/office/drawing/2010/main" xmlns="">
+              <a14:hiddenFill xmlns="" xmlns:a14="http://schemas.microsoft.com/office/drawing/2010/main">
                 <a:blipFill dpi="0" rotWithShape="0">
                   <a:blip/>
                   <a:srcRect/>
@@ -21123,7 +21242,7 @@
               </a14:hiddenFill>
             </a:ext>
             <a:ext uri="{91240B29-F687-4f45-9708-019B960494DF}">
-              <a14:hiddenLine xmlns:a14="http://schemas.microsoft.com/office/drawing/2010/main" xmlns="" w="9525">
+              <a14:hiddenLine xmlns="" xmlns:a14="http://schemas.microsoft.com/office/drawing/2010/main" w="9525">
                 <a:solidFill>
                   <a:srgbClr val="000000"/>
                 </a:solidFill>
@@ -21133,7 +21252,7 @@
               </a14:hiddenLine>
             </a:ext>
             <a:ext uri="{AF507438-7753-43e0-B8FC-AC1667EBCBE1}">
-              <a14:hiddenEffects xmlns:a14="http://schemas.microsoft.com/office/drawing/2010/main" xmlns="">
+              <a14:hiddenEffects xmlns="" xmlns:a14="http://schemas.microsoft.com/office/drawing/2010/main">
                 <a:effectLst>
                   <a:outerShdw blurRad="63500" dist="38099" dir="2700000" algn="ctr" rotWithShape="0">
                     <a:srgbClr val="000000">
@@ -21212,7 +21331,7 @@
           <a:effectLst/>
           <a:extLst>
             <a:ext uri="{909E8E84-426E-40dd-AFC4-6F175D3DCCD1}">
-              <a14:hiddenFill xmlns:a14="http://schemas.microsoft.com/office/drawing/2010/main" xmlns="">
+              <a14:hiddenFill xmlns="" xmlns:a14="http://schemas.microsoft.com/office/drawing/2010/main">
                 <a:blipFill dpi="0" rotWithShape="0">
                   <a:blip/>
                   <a:srcRect/>
@@ -21223,7 +21342,7 @@
               </a14:hiddenFill>
             </a:ext>
             <a:ext uri="{91240B29-F687-4f45-9708-019B960494DF}">
-              <a14:hiddenLine xmlns:a14="http://schemas.microsoft.com/office/drawing/2010/main" xmlns="" w="9525">
+              <a14:hiddenLine xmlns="" xmlns:a14="http://schemas.microsoft.com/office/drawing/2010/main" w="9525">
                 <a:solidFill>
                   <a:srgbClr val="000000"/>
                 </a:solidFill>
@@ -21233,7 +21352,7 @@
               </a14:hiddenLine>
             </a:ext>
             <a:ext uri="{AF507438-7753-43e0-B8FC-AC1667EBCBE1}">
-              <a14:hiddenEffects xmlns:a14="http://schemas.microsoft.com/office/drawing/2010/main" xmlns="">
+              <a14:hiddenEffects xmlns="" xmlns:a14="http://schemas.microsoft.com/office/drawing/2010/main">
                 <a:effectLst>
                   <a:outerShdw blurRad="63500" dist="38099" dir="2700000" algn="ctr" rotWithShape="0">
                     <a:srgbClr val="000000">
@@ -22511,19 +22630,7 @@
                   <a:srgbClr val="FF0000"/>
                 </a:solidFill>
               </a:rPr>
-              <a:t>T</a:t>
-            </a:r>
-            <a:r>
-              <a:rPr lang="en-US" sz="2800" dirty="0" err="1"/>
-              <a:t>,</a:t>
-            </a:r>
-            <a:r>
-              <a:rPr lang="en-US" sz="2800" dirty="0" err="1">
-                <a:solidFill>
-                  <a:srgbClr val="FF0000"/>
-                </a:solidFill>
-              </a:rPr>
-              <a:t>S</a:t>
+              <a:t>T,S</a:t>
             </a:r>
             <a:r>
               <a:rPr lang="en-US" sz="2800" baseline="-25000" dirty="0" err="1">
@@ -22828,7 +22935,7 @@
           <a:effectLst/>
           <a:extLst>
             <a:ext uri="{909E8E84-426E-40dd-AFC4-6F175D3DCCD1}">
-              <a14:hiddenFill xmlns:a14="http://schemas.microsoft.com/office/drawing/2010/main" xmlns="">
+              <a14:hiddenFill xmlns="" xmlns:a14="http://schemas.microsoft.com/office/drawing/2010/main">
                 <a:blipFill dpi="0" rotWithShape="0">
                   <a:blip/>
                   <a:srcRect/>
@@ -22839,7 +22946,7 @@
               </a14:hiddenFill>
             </a:ext>
             <a:ext uri="{91240B29-F687-4f45-9708-019B960494DF}">
-              <a14:hiddenLine xmlns:a14="http://schemas.microsoft.com/office/drawing/2010/main" xmlns="" w="9525">
+              <a14:hiddenLine xmlns="" xmlns:a14="http://schemas.microsoft.com/office/drawing/2010/main" w="9525">
                 <a:solidFill>
                   <a:srgbClr val="000000"/>
                 </a:solidFill>
@@ -22849,7 +22956,7 @@
               </a14:hiddenLine>
             </a:ext>
             <a:ext uri="{AF507438-7753-43e0-B8FC-AC1667EBCBE1}">
-              <a14:hiddenEffects xmlns:a14="http://schemas.microsoft.com/office/drawing/2010/main" xmlns="">
+              <a14:hiddenEffects xmlns="" xmlns:a14="http://schemas.microsoft.com/office/drawing/2010/main">
                 <a:effectLst>
                   <a:outerShdw blurRad="63500" dist="38099" dir="2700000" algn="ctr" rotWithShape="0">
                     <a:srgbClr val="000000">
@@ -24497,7 +24604,7 @@
           <a:effectLst/>
           <a:extLst>
             <a:ext uri="{909E8E84-426E-40dd-AFC4-6F175D3DCCD1}">
-              <a14:hiddenFill xmlns:a14="http://schemas.microsoft.com/office/drawing/2010/main" xmlns="">
+              <a14:hiddenFill xmlns="" xmlns:a14="http://schemas.microsoft.com/office/drawing/2010/main">
                 <a:blipFill dpi="0" rotWithShape="0">
                   <a:blip/>
                   <a:srcRect/>
@@ -24508,7 +24615,7 @@
               </a14:hiddenFill>
             </a:ext>
             <a:ext uri="{91240B29-F687-4f45-9708-019B960494DF}">
-              <a14:hiddenLine xmlns:a14="http://schemas.microsoft.com/office/drawing/2010/main" xmlns="" w="9525">
+              <a14:hiddenLine xmlns="" xmlns:a14="http://schemas.microsoft.com/office/drawing/2010/main" w="9525">
                 <a:solidFill>
                   <a:srgbClr val="000000"/>
                 </a:solidFill>
@@ -24518,7 +24625,7 @@
               </a14:hiddenLine>
             </a:ext>
             <a:ext uri="{AF507438-7753-43e0-B8FC-AC1667EBCBE1}">
-              <a14:hiddenEffects xmlns:a14="http://schemas.microsoft.com/office/drawing/2010/main" xmlns="">
+              <a14:hiddenEffects xmlns="" xmlns:a14="http://schemas.microsoft.com/office/drawing/2010/main">
                 <a:effectLst>
                   <a:outerShdw blurRad="63500" dist="38099" dir="2700000" algn="ctr" rotWithShape="0">
                     <a:srgbClr val="000000">
@@ -25880,7 +25987,7 @@
           <a:effectLst/>
           <a:extLst>
             <a:ext uri="{909E8E84-426E-40dd-AFC4-6F175D3DCCD1}">
-              <a14:hiddenFill xmlns:a14="http://schemas.microsoft.com/office/drawing/2010/main" xmlns="">
+              <a14:hiddenFill xmlns="" xmlns:a14="http://schemas.microsoft.com/office/drawing/2010/main">
                 <a:blipFill dpi="0" rotWithShape="0">
                   <a:blip/>
                   <a:srcRect/>
@@ -25891,7 +25998,7 @@
               </a14:hiddenFill>
             </a:ext>
             <a:ext uri="{91240B29-F687-4f45-9708-019B960494DF}">
-              <a14:hiddenLine xmlns:a14="http://schemas.microsoft.com/office/drawing/2010/main" xmlns="" w="9525">
+              <a14:hiddenLine xmlns="" xmlns:a14="http://schemas.microsoft.com/office/drawing/2010/main" w="9525">
                 <a:solidFill>
                   <a:srgbClr val="000000"/>
                 </a:solidFill>
@@ -25901,7 +26008,7 @@
               </a14:hiddenLine>
             </a:ext>
             <a:ext uri="{AF507438-7753-43e0-B8FC-AC1667EBCBE1}">
-              <a14:hiddenEffects xmlns:a14="http://schemas.microsoft.com/office/drawing/2010/main" xmlns="">
+              <a14:hiddenEffects xmlns="" xmlns:a14="http://schemas.microsoft.com/office/drawing/2010/main">
                 <a:effectLst>
                   <a:outerShdw blurRad="63500" dist="38099" dir="2700000" algn="ctr" rotWithShape="0">
                     <a:srgbClr val="000000">
@@ -26032,7 +26139,7 @@
           <a:effectLst/>
           <a:extLst>
             <a:ext uri="{909E8E84-426E-40dd-AFC4-6F175D3DCCD1}">
-              <a14:hiddenFill xmlns:a14="http://schemas.microsoft.com/office/drawing/2010/main" xmlns="">
+              <a14:hiddenFill xmlns="" xmlns:a14="http://schemas.microsoft.com/office/drawing/2010/main">
                 <a:blipFill dpi="0" rotWithShape="0">
                   <a:blip/>
                   <a:srcRect/>
@@ -26043,7 +26150,7 @@
               </a14:hiddenFill>
             </a:ext>
             <a:ext uri="{91240B29-F687-4f45-9708-019B960494DF}">
-              <a14:hiddenLine xmlns:a14="http://schemas.microsoft.com/office/drawing/2010/main" xmlns="" w="9525">
+              <a14:hiddenLine xmlns="" xmlns:a14="http://schemas.microsoft.com/office/drawing/2010/main" w="9525">
                 <a:solidFill>
                   <a:srgbClr val="000000"/>
                 </a:solidFill>
@@ -26053,7 +26160,7 @@
               </a14:hiddenLine>
             </a:ext>
             <a:ext uri="{AF507438-7753-43e0-B8FC-AC1667EBCBE1}">
-              <a14:hiddenEffects xmlns:a14="http://schemas.microsoft.com/office/drawing/2010/main" xmlns="">
+              <a14:hiddenEffects xmlns="" xmlns:a14="http://schemas.microsoft.com/office/drawing/2010/main">
                 <a:effectLst>
                   <a:outerShdw blurRad="63500" dist="38099" dir="2700000" algn="ctr" rotWithShape="0">
                     <a:srgbClr val="000000">
@@ -26237,7 +26344,7 @@
           <a:p>
             <a:r>
               <a:rPr lang="en-US" dirty="0"/>
-              <a:t>Let’s represent the state update function as a function </a:t>
+              <a:t>Let’s represent the aggregation function as a function </a:t>
             </a:r>
             <a:r>
               <a:rPr lang="en-US" dirty="0">
@@ -28388,10 +28495,9 @@
           <a:lstStyle/>
           <a:p>
             <a:r>
-              <a:rPr lang="en-US" sz="2800"/>
-              <a:t>Functions of a bounded number of packets in the past</a:t>
-            </a:r>
-            <a:endParaRPr lang="en-US" sz="2800" dirty="0"/>
+              <a:rPr lang="en-US" sz="2800" dirty="0"/>
+              <a:t>Functions of a constant number of packets in the past</a:t>
+            </a:r>
           </a:p>
         </p:txBody>
       </p:sp>
@@ -30586,12 +30692,12 @@
                         <m:t> </m:t>
                       </m:r>
                       <m:r>
-                        <a:rPr lang="en-US" sz="2800" i="1" dirty="0">
+                        <a:rPr lang="en-US" sz="2800" b="0" i="1" dirty="0" smtClean="0">
                           <a:latin typeface="Cambria Math" panose="02040503050406030204" pitchFamily="18" charset="0"/>
                           <a:ea typeface="Ayuthaya" charset="-34"/>
                           <a:cs typeface="Consolas" charset="0"/>
                         </a:rPr>
-                        <m:t>𝑣𝑎𝑙𝑢𝑒</m:t>
+                        <m:t>𝑠𝑡𝑎𝑡𝑒</m:t>
                       </m:r>
                       <m:r>
                         <a:rPr lang="en-US" sz="2800" i="1" dirty="0">
@@ -31085,7 +31191,7 @@
                     <a:ea typeface="Ayuthaya" charset="-34"/>
                     <a:cs typeface="Consolas" charset="0"/>
                   </a:rPr>
-                  <a:t>Small extra state: only number of packets (N), instead of storing each packet</a:t>
+                  <a:t>Small extra state: only number of packets (N), instead of storing per-packet information</a:t>
                 </a:r>
               </a:p>
               <a:p>
@@ -31570,11 +31676,7 @@
                                           </p:stCondLst>
                                         </p:cTn>
                                         <p:tgtEl>
-                                          <p:spTgt spid="3">
-                                            <p:txEl>
-                                              <p:pRg st="1" end="1"/>
-                                            </p:txEl>
-                                          </p:spTgt>
+                                          <p:spTgt spid="13"/>
                                         </p:tgtEl>
                                         <p:attrNameLst>
                                           <p:attrName>style.visibility</p:attrName>
@@ -31621,7 +31723,7 @@
                                         <p:tgtEl>
                                           <p:spTgt spid="3">
                                             <p:txEl>
-                                              <p:pRg st="2" end="2"/>
+                                              <p:pRg st="1" end="1"/>
                                             </p:txEl>
                                           </p:spTgt>
                                         </p:tgtEl>
@@ -31670,7 +31772,7 @@
                                         <p:tgtEl>
                                           <p:spTgt spid="3">
                                             <p:txEl>
-                                              <p:pRg st="3" end="3"/>
+                                              <p:pRg st="2" end="2"/>
                                             </p:txEl>
                                           </p:spTgt>
                                         </p:tgtEl>
@@ -31719,7 +31821,7 @@
                                         <p:tgtEl>
                                           <p:spTgt spid="3">
                                             <p:txEl>
-                                              <p:pRg st="4" end="4"/>
+                                              <p:pRg st="3" end="3"/>
                                             </p:txEl>
                                           </p:spTgt>
                                         </p:tgtEl>
@@ -31768,7 +31870,7 @@
                                         <p:tgtEl>
                                           <p:spTgt spid="3">
                                             <p:txEl>
-                                              <p:pRg st="6" end="6"/>
+                                              <p:pRg st="4" end="4"/>
                                             </p:txEl>
                                           </p:spTgt>
                                         </p:tgtEl>
@@ -31815,7 +31917,11 @@
                                           </p:stCondLst>
                                         </p:cTn>
                                         <p:tgtEl>
-                                          <p:spTgt spid="13"/>
+                                          <p:spTgt spid="3">
+                                            <p:txEl>
+                                              <p:pRg st="6" end="6"/>
+                                            </p:txEl>
+                                          </p:spTgt>
                                         </p:tgtEl>
                                         <p:attrNameLst>
                                           <p:attrName>style.visibility</p:attrName>
@@ -33756,7 +33862,7 @@
           <a:effectLst/>
           <a:extLst>
             <a:ext uri="{909E8E84-426E-40dd-AFC4-6F175D3DCCD1}">
-              <a14:hiddenFill xmlns="" xmlns:a14="http://schemas.microsoft.com/office/drawing/2010/main">
+              <a14:hiddenFill xmlns:a14="http://schemas.microsoft.com/office/drawing/2010/main" xmlns="">
                 <a:blipFill dpi="0" rotWithShape="0">
                   <a:blip/>
                   <a:srcRect/>
@@ -33767,7 +33873,7 @@
               </a14:hiddenFill>
             </a:ext>
             <a:ext uri="{91240B29-F687-4f45-9708-019B960494DF}">
-              <a14:hiddenLine xmlns="" xmlns:a14="http://schemas.microsoft.com/office/drawing/2010/main" w="9525">
+              <a14:hiddenLine xmlns:a14="http://schemas.microsoft.com/office/drawing/2010/main" xmlns="" w="9525">
                 <a:solidFill>
                   <a:srgbClr val="000000"/>
                 </a:solidFill>
@@ -33777,7 +33883,7 @@
               </a14:hiddenLine>
             </a:ext>
             <a:ext uri="{AF507438-7753-43e0-B8FC-AC1667EBCBE1}">
-              <a14:hiddenEffects xmlns="" xmlns:a14="http://schemas.microsoft.com/office/drawing/2010/main">
+              <a14:hiddenEffects xmlns:a14="http://schemas.microsoft.com/office/drawing/2010/main" xmlns="">
                 <a:effectLst>
                   <a:outerShdw blurRad="63500" dist="38099" dir="2700000" algn="ctr" rotWithShape="0">
                     <a:srgbClr val="000000">

</xml_diff>

<commit_message>
Some more minor fixes
</commit_message>
<xml_diff>
--- a/marple.pptx
+++ b/marple.pptx
@@ -11385,7 +11385,7 @@
             </a:r>
             <a:r>
               <a:rPr lang="is-IS" dirty="0"/>
-              <a:t>at switch‘s line rate (1 pkt/ns)</a:t>
+              <a:t>at line rate (1 pkt/ns)</a:t>
             </a:r>
           </a:p>
           <a:p>
@@ -12190,7 +12190,7 @@
           <a:effectLst/>
           <a:extLst>
             <a:ext uri="{909E8E84-426E-40dd-AFC4-6F175D3DCCD1}">
-              <a14:hiddenFill xmlns:a14="http://schemas.microsoft.com/office/drawing/2010/main" xmlns="">
+              <a14:hiddenFill xmlns="" xmlns:a14="http://schemas.microsoft.com/office/drawing/2010/main">
                 <a:blipFill dpi="0" rotWithShape="0">
                   <a:blip/>
                   <a:srcRect/>
@@ -12201,7 +12201,7 @@
               </a14:hiddenFill>
             </a:ext>
             <a:ext uri="{91240B29-F687-4f45-9708-019B960494DF}">
-              <a14:hiddenLine xmlns:a14="http://schemas.microsoft.com/office/drawing/2010/main" xmlns="" w="9525">
+              <a14:hiddenLine xmlns="" xmlns:a14="http://schemas.microsoft.com/office/drawing/2010/main" w="9525">
                 <a:solidFill>
                   <a:srgbClr val="000000"/>
                 </a:solidFill>
@@ -12211,7 +12211,7 @@
               </a14:hiddenLine>
             </a:ext>
             <a:ext uri="{AF507438-7753-43e0-B8FC-AC1667EBCBE1}">
-              <a14:hiddenEffects xmlns:a14="http://schemas.microsoft.com/office/drawing/2010/main" xmlns="">
+              <a14:hiddenEffects xmlns="" xmlns:a14="http://schemas.microsoft.com/office/drawing/2010/main">
                 <a:effectLst>
                   <a:outerShdw blurRad="63500" dist="38099" dir="2700000" algn="ctr" rotWithShape="0">
                     <a:srgbClr val="000000">
@@ -12260,7 +12260,7 @@
           <a:effectLst/>
           <a:extLst>
             <a:ext uri="{909E8E84-426E-40dd-AFC4-6F175D3DCCD1}">
-              <a14:hiddenFill xmlns:a14="http://schemas.microsoft.com/office/drawing/2010/main" xmlns="">
+              <a14:hiddenFill xmlns="" xmlns:a14="http://schemas.microsoft.com/office/drawing/2010/main">
                 <a:blipFill dpi="0" rotWithShape="0">
                   <a:blip/>
                   <a:srcRect/>
@@ -12271,7 +12271,7 @@
               </a14:hiddenFill>
             </a:ext>
             <a:ext uri="{91240B29-F687-4f45-9708-019B960494DF}">
-              <a14:hiddenLine xmlns:a14="http://schemas.microsoft.com/office/drawing/2010/main" xmlns="" w="9525">
+              <a14:hiddenLine xmlns="" xmlns:a14="http://schemas.microsoft.com/office/drawing/2010/main" w="9525">
                 <a:solidFill>
                   <a:srgbClr val="000000"/>
                 </a:solidFill>
@@ -12281,7 +12281,7 @@
               </a14:hiddenLine>
             </a:ext>
             <a:ext uri="{AF507438-7753-43e0-B8FC-AC1667EBCBE1}">
-              <a14:hiddenEffects xmlns:a14="http://schemas.microsoft.com/office/drawing/2010/main" xmlns="">
+              <a14:hiddenEffects xmlns="" xmlns:a14="http://schemas.microsoft.com/office/drawing/2010/main">
                 <a:effectLst>
                   <a:outerShdw blurRad="63500" dist="38099" dir="2700000" algn="ctr" rotWithShape="0">
                     <a:srgbClr val="000000">
@@ -12416,7 +12416,7 @@
             <a:effectLst/>
             <a:extLst>
               <a:ext uri="{909E8E84-426E-40dd-AFC4-6F175D3DCCD1}">
-                <a14:hiddenFill xmlns="" xmlns:a14="http://schemas.microsoft.com/office/drawing/2010/main">
+                <a14:hiddenFill xmlns:a14="http://schemas.microsoft.com/office/drawing/2010/main" xmlns="">
                   <a:blipFill dpi="0" rotWithShape="0">
                     <a:blip/>
                     <a:srcRect/>
@@ -12427,7 +12427,7 @@
                 </a14:hiddenFill>
               </a:ext>
               <a:ext uri="{91240B29-F687-4f45-9708-019B960494DF}">
-                <a14:hiddenLine xmlns="" xmlns:a14="http://schemas.microsoft.com/office/drawing/2010/main" w="9525">
+                <a14:hiddenLine xmlns:a14="http://schemas.microsoft.com/office/drawing/2010/main" xmlns="" w="9525">
                   <a:solidFill>
                     <a:srgbClr val="000000"/>
                   </a:solidFill>
@@ -12437,7 +12437,7 @@
                 </a14:hiddenLine>
               </a:ext>
               <a:ext uri="{AF507438-7753-43e0-B8FC-AC1667EBCBE1}">
-                <a14:hiddenEffects xmlns="" xmlns:a14="http://schemas.microsoft.com/office/drawing/2010/main">
+                <a14:hiddenEffects xmlns:a14="http://schemas.microsoft.com/office/drawing/2010/main" xmlns="">
                   <a:effectLst>
                     <a:outerShdw blurRad="63500" dist="38099" dir="2700000" algn="ctr" rotWithShape="0">
                       <a:srgbClr val="000000">
@@ -12486,7 +12486,7 @@
             <a:effectLst/>
             <a:extLst>
               <a:ext uri="{909E8E84-426E-40dd-AFC4-6F175D3DCCD1}">
-                <a14:hiddenFill xmlns="" xmlns:a14="http://schemas.microsoft.com/office/drawing/2010/main">
+                <a14:hiddenFill xmlns:a14="http://schemas.microsoft.com/office/drawing/2010/main" xmlns="">
                   <a:blipFill dpi="0" rotWithShape="0">
                     <a:blip/>
                     <a:srcRect/>
@@ -12497,7 +12497,7 @@
                 </a14:hiddenFill>
               </a:ext>
               <a:ext uri="{91240B29-F687-4f45-9708-019B960494DF}">
-                <a14:hiddenLine xmlns="" xmlns:a14="http://schemas.microsoft.com/office/drawing/2010/main" w="9525">
+                <a14:hiddenLine xmlns:a14="http://schemas.microsoft.com/office/drawing/2010/main" xmlns="" w="9525">
                   <a:solidFill>
                     <a:srgbClr val="000000"/>
                   </a:solidFill>
@@ -12507,7 +12507,7 @@
                 </a14:hiddenLine>
               </a:ext>
               <a:ext uri="{AF507438-7753-43e0-B8FC-AC1667EBCBE1}">
-                <a14:hiddenEffects xmlns="" xmlns:a14="http://schemas.microsoft.com/office/drawing/2010/main">
+                <a14:hiddenEffects xmlns:a14="http://schemas.microsoft.com/office/drawing/2010/main" xmlns="">
                   <a:effectLst>
                     <a:outerShdw blurRad="63500" dist="38099" dir="2700000" algn="ctr" rotWithShape="0">
                       <a:srgbClr val="000000">
@@ -12556,7 +12556,7 @@
             <a:effectLst/>
             <a:extLst>
               <a:ext uri="{909E8E84-426E-40dd-AFC4-6F175D3DCCD1}">
-                <a14:hiddenFill xmlns="" xmlns:a14="http://schemas.microsoft.com/office/drawing/2010/main">
+                <a14:hiddenFill xmlns:a14="http://schemas.microsoft.com/office/drawing/2010/main" xmlns="">
                   <a:blipFill dpi="0" rotWithShape="0">
                     <a:blip/>
                     <a:srcRect/>
@@ -12567,7 +12567,7 @@
                 </a14:hiddenFill>
               </a:ext>
               <a:ext uri="{91240B29-F687-4f45-9708-019B960494DF}">
-                <a14:hiddenLine xmlns="" xmlns:a14="http://schemas.microsoft.com/office/drawing/2010/main" w="9525">
+                <a14:hiddenLine xmlns:a14="http://schemas.microsoft.com/office/drawing/2010/main" xmlns="" w="9525">
                   <a:solidFill>
                     <a:srgbClr val="000000"/>
                   </a:solidFill>
@@ -12577,7 +12577,7 @@
                 </a14:hiddenLine>
               </a:ext>
               <a:ext uri="{AF507438-7753-43e0-B8FC-AC1667EBCBE1}">
-                <a14:hiddenEffects xmlns="" xmlns:a14="http://schemas.microsoft.com/office/drawing/2010/main">
+                <a14:hiddenEffects xmlns:a14="http://schemas.microsoft.com/office/drawing/2010/main" xmlns="">
                   <a:effectLst>
                     <a:outerShdw blurRad="63500" dist="38099" dir="2700000" algn="ctr" rotWithShape="0">
                       <a:srgbClr val="000000">
@@ -12618,12 +12618,12 @@
             <a:effectLst/>
             <a:extLst>
               <a:ext uri="{909E8E84-426E-40dd-AFC4-6F175D3DCCD1}">
-                <a14:hiddenFill xmlns="" xmlns:a14="http://schemas.microsoft.com/office/drawing/2010/main">
+                <a14:hiddenFill xmlns:a14="http://schemas.microsoft.com/office/drawing/2010/main" xmlns="">
                   <a:noFill/>
                 </a14:hiddenFill>
               </a:ext>
               <a:ext uri="{AF507438-7753-43e0-B8FC-AC1667EBCBE1}">
-                <a14:hiddenEffects xmlns="" xmlns:a14="http://schemas.microsoft.com/office/drawing/2010/main">
+                <a14:hiddenEffects xmlns:a14="http://schemas.microsoft.com/office/drawing/2010/main" xmlns="">
                   <a:effectLst>
                     <a:outerShdw blurRad="63500" dist="38099" dir="2700000" algn="ctr" rotWithShape="0">
                       <a:srgbClr val="000000">
@@ -12676,12 +12676,12 @@
             <a:effectLst/>
             <a:extLst>
               <a:ext uri="{909E8E84-426E-40dd-AFC4-6F175D3DCCD1}">
-                <a14:hiddenFill xmlns="" xmlns:a14="http://schemas.microsoft.com/office/drawing/2010/main">
+                <a14:hiddenFill xmlns:a14="http://schemas.microsoft.com/office/drawing/2010/main" xmlns="">
                   <a:noFill/>
                 </a14:hiddenFill>
               </a:ext>
               <a:ext uri="{AF507438-7753-43e0-B8FC-AC1667EBCBE1}">
-                <a14:hiddenEffects xmlns="" xmlns:a14="http://schemas.microsoft.com/office/drawing/2010/main">
+                <a14:hiddenEffects xmlns:a14="http://schemas.microsoft.com/office/drawing/2010/main" xmlns="">
                   <a:effectLst>
                     <a:outerShdw blurRad="63500" dist="38099" dir="2700000" algn="ctr" rotWithShape="0">
                       <a:srgbClr val="000000">
@@ -12734,12 +12734,12 @@
             <a:effectLst/>
             <a:extLst>
               <a:ext uri="{909E8E84-426E-40dd-AFC4-6F175D3DCCD1}">
-                <a14:hiddenFill xmlns="" xmlns:a14="http://schemas.microsoft.com/office/drawing/2010/main">
+                <a14:hiddenFill xmlns:a14="http://schemas.microsoft.com/office/drawing/2010/main" xmlns="">
                   <a:noFill/>
                 </a14:hiddenFill>
               </a:ext>
               <a:ext uri="{AF507438-7753-43e0-B8FC-AC1667EBCBE1}">
-                <a14:hiddenEffects xmlns="" xmlns:a14="http://schemas.microsoft.com/office/drawing/2010/main">
+                <a14:hiddenEffects xmlns:a14="http://schemas.microsoft.com/office/drawing/2010/main" xmlns="">
                   <a:effectLst>
                     <a:outerShdw blurRad="63500" dist="38099" dir="2700000" algn="ctr" rotWithShape="0">
                       <a:srgbClr val="000000">
@@ -12792,12 +12792,12 @@
             <a:effectLst/>
             <a:extLst>
               <a:ext uri="{909E8E84-426E-40dd-AFC4-6F175D3DCCD1}">
-                <a14:hiddenFill xmlns="" xmlns:a14="http://schemas.microsoft.com/office/drawing/2010/main">
+                <a14:hiddenFill xmlns:a14="http://schemas.microsoft.com/office/drawing/2010/main" xmlns="">
                   <a:noFill/>
                 </a14:hiddenFill>
               </a:ext>
               <a:ext uri="{AF507438-7753-43e0-B8FC-AC1667EBCBE1}">
-                <a14:hiddenEffects xmlns="" xmlns:a14="http://schemas.microsoft.com/office/drawing/2010/main">
+                <a14:hiddenEffects xmlns:a14="http://schemas.microsoft.com/office/drawing/2010/main" xmlns="">
                   <a:effectLst>
                     <a:outerShdw blurRad="63500" dist="38099" dir="2700000" algn="ctr" rotWithShape="0">
                       <a:srgbClr val="000000">
@@ -12850,12 +12850,12 @@
             <a:effectLst/>
             <a:extLst>
               <a:ext uri="{909E8E84-426E-40dd-AFC4-6F175D3DCCD1}">
-                <a14:hiddenFill xmlns="" xmlns:a14="http://schemas.microsoft.com/office/drawing/2010/main">
+                <a14:hiddenFill xmlns:a14="http://schemas.microsoft.com/office/drawing/2010/main" xmlns="">
                   <a:noFill/>
                 </a14:hiddenFill>
               </a:ext>
               <a:ext uri="{AF507438-7753-43e0-B8FC-AC1667EBCBE1}">
-                <a14:hiddenEffects xmlns="" xmlns:a14="http://schemas.microsoft.com/office/drawing/2010/main">
+                <a14:hiddenEffects xmlns:a14="http://schemas.microsoft.com/office/drawing/2010/main" xmlns="">
                   <a:effectLst>
                     <a:outerShdw blurRad="63500" dist="38099" dir="2700000" algn="ctr" rotWithShape="0">
                       <a:srgbClr val="000000">
@@ -12908,12 +12908,12 @@
             <a:effectLst/>
             <a:extLst>
               <a:ext uri="{909E8E84-426E-40dd-AFC4-6F175D3DCCD1}">
-                <a14:hiddenFill xmlns="" xmlns:a14="http://schemas.microsoft.com/office/drawing/2010/main">
+                <a14:hiddenFill xmlns:a14="http://schemas.microsoft.com/office/drawing/2010/main" xmlns="">
                   <a:noFill/>
                 </a14:hiddenFill>
               </a:ext>
               <a:ext uri="{AF507438-7753-43e0-B8FC-AC1667EBCBE1}">
-                <a14:hiddenEffects xmlns="" xmlns:a14="http://schemas.microsoft.com/office/drawing/2010/main">
+                <a14:hiddenEffects xmlns:a14="http://schemas.microsoft.com/office/drawing/2010/main" xmlns="">
                   <a:effectLst>
                     <a:outerShdw blurRad="63500" dist="38099" dir="2700000" algn="ctr" rotWithShape="0">
                       <a:srgbClr val="000000">
@@ -12966,12 +12966,12 @@
             <a:effectLst/>
             <a:extLst>
               <a:ext uri="{909E8E84-426E-40dd-AFC4-6F175D3DCCD1}">
-                <a14:hiddenFill xmlns="" xmlns:a14="http://schemas.microsoft.com/office/drawing/2010/main">
+                <a14:hiddenFill xmlns:a14="http://schemas.microsoft.com/office/drawing/2010/main" xmlns="">
                   <a:noFill/>
                 </a14:hiddenFill>
               </a:ext>
               <a:ext uri="{AF507438-7753-43e0-B8FC-AC1667EBCBE1}">
-                <a14:hiddenEffects xmlns="" xmlns:a14="http://schemas.microsoft.com/office/drawing/2010/main">
+                <a14:hiddenEffects xmlns:a14="http://schemas.microsoft.com/office/drawing/2010/main" xmlns="">
                   <a:effectLst>
                     <a:outerShdw blurRad="63500" dist="38099" dir="2700000" algn="ctr" rotWithShape="0">
                       <a:srgbClr val="000000">
@@ -13024,12 +13024,12 @@
             <a:effectLst/>
             <a:extLst>
               <a:ext uri="{909E8E84-426E-40dd-AFC4-6F175D3DCCD1}">
-                <a14:hiddenFill xmlns="" xmlns:a14="http://schemas.microsoft.com/office/drawing/2010/main">
+                <a14:hiddenFill xmlns:a14="http://schemas.microsoft.com/office/drawing/2010/main" xmlns="">
                   <a:noFill/>
                 </a14:hiddenFill>
               </a:ext>
               <a:ext uri="{AF507438-7753-43e0-B8FC-AC1667EBCBE1}">
-                <a14:hiddenEffects xmlns="" xmlns:a14="http://schemas.microsoft.com/office/drawing/2010/main">
+                <a14:hiddenEffects xmlns:a14="http://schemas.microsoft.com/office/drawing/2010/main" xmlns="">
                   <a:effectLst>
                     <a:outerShdw blurRad="63500" dist="38099" dir="2700000" algn="ctr" rotWithShape="0">
                       <a:srgbClr val="000000">
@@ -13082,12 +13082,12 @@
             <a:effectLst/>
             <a:extLst>
               <a:ext uri="{909E8E84-426E-40dd-AFC4-6F175D3DCCD1}">
-                <a14:hiddenFill xmlns="" xmlns:a14="http://schemas.microsoft.com/office/drawing/2010/main">
+                <a14:hiddenFill xmlns:a14="http://schemas.microsoft.com/office/drawing/2010/main" xmlns="">
                   <a:noFill/>
                 </a14:hiddenFill>
               </a:ext>
               <a:ext uri="{AF507438-7753-43e0-B8FC-AC1667EBCBE1}">
-                <a14:hiddenEffects xmlns="" xmlns:a14="http://schemas.microsoft.com/office/drawing/2010/main">
+                <a14:hiddenEffects xmlns:a14="http://schemas.microsoft.com/office/drawing/2010/main" xmlns="">
                   <a:effectLst>
                     <a:outerShdw blurRad="63500" dist="38099" dir="2700000" algn="ctr" rotWithShape="0">
                       <a:srgbClr val="000000">
@@ -13140,12 +13140,12 @@
             <a:effectLst/>
             <a:extLst>
               <a:ext uri="{909E8E84-426E-40dd-AFC4-6F175D3DCCD1}">
-                <a14:hiddenFill xmlns="" xmlns:a14="http://schemas.microsoft.com/office/drawing/2010/main">
+                <a14:hiddenFill xmlns:a14="http://schemas.microsoft.com/office/drawing/2010/main" xmlns="">
                   <a:noFill/>
                 </a14:hiddenFill>
               </a:ext>
               <a:ext uri="{AF507438-7753-43e0-B8FC-AC1667EBCBE1}">
-                <a14:hiddenEffects xmlns="" xmlns:a14="http://schemas.microsoft.com/office/drawing/2010/main">
+                <a14:hiddenEffects xmlns:a14="http://schemas.microsoft.com/office/drawing/2010/main" xmlns="">
                   <a:effectLst>
                     <a:outerShdw blurRad="63500" dist="38099" dir="2700000" algn="ctr" rotWithShape="0">
                       <a:srgbClr val="000000">
@@ -13206,7 +13206,7 @@
             <a:effectLst/>
             <a:extLst>
               <a:ext uri="{909E8E84-426E-40dd-AFC4-6F175D3DCCD1}">
-                <a14:hiddenFill xmlns="" xmlns:a14="http://schemas.microsoft.com/office/drawing/2010/main">
+                <a14:hiddenFill xmlns:a14="http://schemas.microsoft.com/office/drawing/2010/main" xmlns="">
                   <a:blipFill dpi="0" rotWithShape="0">
                     <a:blip/>
                     <a:srcRect/>
@@ -13217,7 +13217,7 @@
                 </a14:hiddenFill>
               </a:ext>
               <a:ext uri="{91240B29-F687-4f45-9708-019B960494DF}">
-                <a14:hiddenLine xmlns="" xmlns:a14="http://schemas.microsoft.com/office/drawing/2010/main" w="9525">
+                <a14:hiddenLine xmlns:a14="http://schemas.microsoft.com/office/drawing/2010/main" xmlns="" w="9525">
                   <a:solidFill>
                     <a:srgbClr val="000000"/>
                   </a:solidFill>
@@ -13227,7 +13227,7 @@
                 </a14:hiddenLine>
               </a:ext>
               <a:ext uri="{AF507438-7753-43e0-B8FC-AC1667EBCBE1}">
-                <a14:hiddenEffects xmlns="" xmlns:a14="http://schemas.microsoft.com/office/drawing/2010/main">
+                <a14:hiddenEffects xmlns:a14="http://schemas.microsoft.com/office/drawing/2010/main" xmlns="">
                   <a:effectLst>
                     <a:outerShdw blurRad="63500" dist="38099" dir="2700000" algn="ctr" rotWithShape="0">
                       <a:srgbClr val="000000">
@@ -13276,7 +13276,7 @@
             <a:effectLst/>
             <a:extLst>
               <a:ext uri="{909E8E84-426E-40dd-AFC4-6F175D3DCCD1}">
-                <a14:hiddenFill xmlns="" xmlns:a14="http://schemas.microsoft.com/office/drawing/2010/main">
+                <a14:hiddenFill xmlns:a14="http://schemas.microsoft.com/office/drawing/2010/main" xmlns="">
                   <a:blipFill dpi="0" rotWithShape="0">
                     <a:blip/>
                     <a:srcRect/>
@@ -13287,7 +13287,7 @@
                 </a14:hiddenFill>
               </a:ext>
               <a:ext uri="{91240B29-F687-4f45-9708-019B960494DF}">
-                <a14:hiddenLine xmlns="" xmlns:a14="http://schemas.microsoft.com/office/drawing/2010/main" w="9525">
+                <a14:hiddenLine xmlns:a14="http://schemas.microsoft.com/office/drawing/2010/main" xmlns="" w="9525">
                   <a:solidFill>
                     <a:srgbClr val="000000"/>
                   </a:solidFill>
@@ -13297,7 +13297,7 @@
                 </a14:hiddenLine>
               </a:ext>
               <a:ext uri="{AF507438-7753-43e0-B8FC-AC1667EBCBE1}">
-                <a14:hiddenEffects xmlns="" xmlns:a14="http://schemas.microsoft.com/office/drawing/2010/main">
+                <a14:hiddenEffects xmlns:a14="http://schemas.microsoft.com/office/drawing/2010/main" xmlns="">
                   <a:effectLst>
                     <a:outerShdw blurRad="63500" dist="38099" dir="2700000" algn="ctr" rotWithShape="0">
                       <a:srgbClr val="000000">
@@ -13346,7 +13346,7 @@
             <a:effectLst/>
             <a:extLst>
               <a:ext uri="{909E8E84-426E-40dd-AFC4-6F175D3DCCD1}">
-                <a14:hiddenFill xmlns="" xmlns:a14="http://schemas.microsoft.com/office/drawing/2010/main">
+                <a14:hiddenFill xmlns:a14="http://schemas.microsoft.com/office/drawing/2010/main" xmlns="">
                   <a:blipFill dpi="0" rotWithShape="0">
                     <a:blip/>
                     <a:srcRect/>
@@ -13357,7 +13357,7 @@
                 </a14:hiddenFill>
               </a:ext>
               <a:ext uri="{91240B29-F687-4f45-9708-019B960494DF}">
-                <a14:hiddenLine xmlns="" xmlns:a14="http://schemas.microsoft.com/office/drawing/2010/main" w="9525">
+                <a14:hiddenLine xmlns:a14="http://schemas.microsoft.com/office/drawing/2010/main" xmlns="" w="9525">
                   <a:solidFill>
                     <a:srgbClr val="000000"/>
                   </a:solidFill>
@@ -13367,7 +13367,7 @@
                 </a14:hiddenLine>
               </a:ext>
               <a:ext uri="{AF507438-7753-43e0-B8FC-AC1667EBCBE1}">
-                <a14:hiddenEffects xmlns="" xmlns:a14="http://schemas.microsoft.com/office/drawing/2010/main">
+                <a14:hiddenEffects xmlns:a14="http://schemas.microsoft.com/office/drawing/2010/main" xmlns="">
                   <a:effectLst>
                     <a:outerShdw blurRad="63500" dist="38099" dir="2700000" algn="ctr" rotWithShape="0">
                       <a:srgbClr val="000000">
@@ -13416,7 +13416,7 @@
             <a:effectLst/>
             <a:extLst>
               <a:ext uri="{909E8E84-426E-40dd-AFC4-6F175D3DCCD1}">
-                <a14:hiddenFill xmlns="" xmlns:a14="http://schemas.microsoft.com/office/drawing/2010/main">
+                <a14:hiddenFill xmlns:a14="http://schemas.microsoft.com/office/drawing/2010/main" xmlns="">
                   <a:blipFill dpi="0" rotWithShape="0">
                     <a:blip/>
                     <a:srcRect/>
@@ -13427,7 +13427,7 @@
                 </a14:hiddenFill>
               </a:ext>
               <a:ext uri="{91240B29-F687-4f45-9708-019B960494DF}">
-                <a14:hiddenLine xmlns="" xmlns:a14="http://schemas.microsoft.com/office/drawing/2010/main" w="9525">
+                <a14:hiddenLine xmlns:a14="http://schemas.microsoft.com/office/drawing/2010/main" xmlns="" w="9525">
                   <a:solidFill>
                     <a:srgbClr val="000000"/>
                   </a:solidFill>
@@ -13437,7 +13437,7 @@
                 </a14:hiddenLine>
               </a:ext>
               <a:ext uri="{AF507438-7753-43e0-B8FC-AC1667EBCBE1}">
-                <a14:hiddenEffects xmlns="" xmlns:a14="http://schemas.microsoft.com/office/drawing/2010/main">
+                <a14:hiddenEffects xmlns:a14="http://schemas.microsoft.com/office/drawing/2010/main" xmlns="">
                   <a:effectLst>
                     <a:outerShdw blurRad="63500" dist="38099" dir="2700000" algn="ctr" rotWithShape="0">
                       <a:srgbClr val="000000">
@@ -13486,7 +13486,7 @@
             <a:effectLst/>
             <a:extLst>
               <a:ext uri="{909E8E84-426E-40dd-AFC4-6F175D3DCCD1}">
-                <a14:hiddenFill xmlns="" xmlns:a14="http://schemas.microsoft.com/office/drawing/2010/main">
+                <a14:hiddenFill xmlns:a14="http://schemas.microsoft.com/office/drawing/2010/main" xmlns="">
                   <a:blipFill dpi="0" rotWithShape="0">
                     <a:blip/>
                     <a:srcRect/>
@@ -13497,7 +13497,7 @@
                 </a14:hiddenFill>
               </a:ext>
               <a:ext uri="{91240B29-F687-4f45-9708-019B960494DF}">
-                <a14:hiddenLine xmlns="" xmlns:a14="http://schemas.microsoft.com/office/drawing/2010/main" w="9525">
+                <a14:hiddenLine xmlns:a14="http://schemas.microsoft.com/office/drawing/2010/main" xmlns="" w="9525">
                   <a:solidFill>
                     <a:srgbClr val="000000"/>
                   </a:solidFill>
@@ -13507,7 +13507,7 @@
                 </a14:hiddenLine>
               </a:ext>
               <a:ext uri="{AF507438-7753-43e0-B8FC-AC1667EBCBE1}">
-                <a14:hiddenEffects xmlns="" xmlns:a14="http://schemas.microsoft.com/office/drawing/2010/main">
+                <a14:hiddenEffects xmlns:a14="http://schemas.microsoft.com/office/drawing/2010/main" xmlns="">
                   <a:effectLst>
                     <a:outerShdw blurRad="63500" dist="38099" dir="2700000" algn="ctr" rotWithShape="0">
                       <a:srgbClr val="000000">
@@ -13548,12 +13548,12 @@
             <a:effectLst/>
             <a:extLst>
               <a:ext uri="{909E8E84-426E-40dd-AFC4-6F175D3DCCD1}">
-                <a14:hiddenFill xmlns="" xmlns:a14="http://schemas.microsoft.com/office/drawing/2010/main">
+                <a14:hiddenFill xmlns:a14="http://schemas.microsoft.com/office/drawing/2010/main" xmlns="">
                   <a:noFill/>
                 </a14:hiddenFill>
               </a:ext>
               <a:ext uri="{AF507438-7753-43e0-B8FC-AC1667EBCBE1}">
-                <a14:hiddenEffects xmlns="" xmlns:a14="http://schemas.microsoft.com/office/drawing/2010/main">
+                <a14:hiddenEffects xmlns:a14="http://schemas.microsoft.com/office/drawing/2010/main" xmlns="">
                   <a:effectLst>
                     <a:outerShdw blurRad="63500" dist="38099" dir="2700000" algn="ctr" rotWithShape="0">
                       <a:srgbClr val="000000">
@@ -13606,12 +13606,12 @@
             <a:effectLst/>
             <a:extLst>
               <a:ext uri="{909E8E84-426E-40dd-AFC4-6F175D3DCCD1}">
-                <a14:hiddenFill xmlns="" xmlns:a14="http://schemas.microsoft.com/office/drawing/2010/main">
+                <a14:hiddenFill xmlns:a14="http://schemas.microsoft.com/office/drawing/2010/main" xmlns="">
                   <a:noFill/>
                 </a14:hiddenFill>
               </a:ext>
               <a:ext uri="{AF507438-7753-43e0-B8FC-AC1667EBCBE1}">
-                <a14:hiddenEffects xmlns="" xmlns:a14="http://schemas.microsoft.com/office/drawing/2010/main">
+                <a14:hiddenEffects xmlns:a14="http://schemas.microsoft.com/office/drawing/2010/main" xmlns="">
                   <a:effectLst>
                     <a:outerShdw blurRad="63500" dist="38099" dir="2700000" algn="ctr" rotWithShape="0">
                       <a:srgbClr val="000000">
@@ -13672,7 +13672,7 @@
             <a:effectLst/>
             <a:extLst>
               <a:ext uri="{909E8E84-426E-40dd-AFC4-6F175D3DCCD1}">
-                <a14:hiddenFill xmlns="" xmlns:a14="http://schemas.microsoft.com/office/drawing/2010/main">
+                <a14:hiddenFill xmlns:a14="http://schemas.microsoft.com/office/drawing/2010/main" xmlns="">
                   <a:blipFill dpi="0" rotWithShape="0">
                     <a:blip/>
                     <a:srcRect/>
@@ -13683,7 +13683,7 @@
                 </a14:hiddenFill>
               </a:ext>
               <a:ext uri="{91240B29-F687-4f45-9708-019B960494DF}">
-                <a14:hiddenLine xmlns="" xmlns:a14="http://schemas.microsoft.com/office/drawing/2010/main" w="9525">
+                <a14:hiddenLine xmlns:a14="http://schemas.microsoft.com/office/drawing/2010/main" xmlns="" w="9525">
                   <a:solidFill>
                     <a:srgbClr val="000000"/>
                   </a:solidFill>
@@ -13693,7 +13693,7 @@
                 </a14:hiddenLine>
               </a:ext>
               <a:ext uri="{AF507438-7753-43e0-B8FC-AC1667EBCBE1}">
-                <a14:hiddenEffects xmlns="" xmlns:a14="http://schemas.microsoft.com/office/drawing/2010/main">
+                <a14:hiddenEffects xmlns:a14="http://schemas.microsoft.com/office/drawing/2010/main" xmlns="">
                   <a:effectLst>
                     <a:outerShdw blurRad="63500" dist="38099" dir="2700000" algn="ctr" rotWithShape="0">
                       <a:srgbClr val="000000">
@@ -13826,7 +13826,7 @@
           <a:effectLst/>
           <a:extLst>
             <a:ext uri="{909E8E84-426E-40dd-AFC4-6F175D3DCCD1}">
-              <a14:hiddenFill xmlns:a14="http://schemas.microsoft.com/office/drawing/2010/main" xmlns="">
+              <a14:hiddenFill xmlns="" xmlns:a14="http://schemas.microsoft.com/office/drawing/2010/main">
                 <a:blipFill dpi="0" rotWithShape="0">
                   <a:blip/>
                   <a:srcRect/>
@@ -13837,7 +13837,7 @@
               </a14:hiddenFill>
             </a:ext>
             <a:ext uri="{91240B29-F687-4f45-9708-019B960494DF}">
-              <a14:hiddenLine xmlns:a14="http://schemas.microsoft.com/office/drawing/2010/main" xmlns="" w="9525">
+              <a14:hiddenLine xmlns="" xmlns:a14="http://schemas.microsoft.com/office/drawing/2010/main" w="9525">
                 <a:solidFill>
                   <a:srgbClr val="000000"/>
                 </a:solidFill>
@@ -13847,7 +13847,7 @@
               </a14:hiddenLine>
             </a:ext>
             <a:ext uri="{AF507438-7753-43e0-B8FC-AC1667EBCBE1}">
-              <a14:hiddenEffects xmlns:a14="http://schemas.microsoft.com/office/drawing/2010/main" xmlns="">
+              <a14:hiddenEffects xmlns="" xmlns:a14="http://schemas.microsoft.com/office/drawing/2010/main">
                 <a:effectLst>
                   <a:outerShdw blurRad="63500" dist="38099" dir="2700000" algn="ctr" rotWithShape="0">
                     <a:srgbClr val="000000">
@@ -13932,7 +13932,7 @@
           <a:effectLst/>
           <a:extLst>
             <a:ext uri="{909E8E84-426E-40dd-AFC4-6F175D3DCCD1}">
-              <a14:hiddenFill xmlns:a14="http://schemas.microsoft.com/office/drawing/2010/main" xmlns="">
+              <a14:hiddenFill xmlns="" xmlns:a14="http://schemas.microsoft.com/office/drawing/2010/main">
                 <a:blipFill dpi="0" rotWithShape="0">
                   <a:blip/>
                   <a:srcRect/>
@@ -13943,7 +13943,7 @@
               </a14:hiddenFill>
             </a:ext>
             <a:ext uri="{91240B29-F687-4f45-9708-019B960494DF}">
-              <a14:hiddenLine xmlns:a14="http://schemas.microsoft.com/office/drawing/2010/main" xmlns="" w="9525">
+              <a14:hiddenLine xmlns="" xmlns:a14="http://schemas.microsoft.com/office/drawing/2010/main" w="9525">
                 <a:solidFill>
                   <a:srgbClr val="000000"/>
                 </a:solidFill>
@@ -13953,7 +13953,7 @@
               </a14:hiddenLine>
             </a:ext>
             <a:ext uri="{AF507438-7753-43e0-B8FC-AC1667EBCBE1}">
-              <a14:hiddenEffects xmlns:a14="http://schemas.microsoft.com/office/drawing/2010/main" xmlns="">
+              <a14:hiddenEffects xmlns="" xmlns:a14="http://schemas.microsoft.com/office/drawing/2010/main">
                 <a:effectLst>
                   <a:outerShdw blurRad="63500" dist="38099" dir="2700000" algn="ctr" rotWithShape="0">
                     <a:srgbClr val="000000">
@@ -14038,7 +14038,7 @@
           <a:effectLst/>
           <a:extLst>
             <a:ext uri="{909E8E84-426E-40dd-AFC4-6F175D3DCCD1}">
-              <a14:hiddenFill xmlns:a14="http://schemas.microsoft.com/office/drawing/2010/main" xmlns="">
+              <a14:hiddenFill xmlns="" xmlns:a14="http://schemas.microsoft.com/office/drawing/2010/main">
                 <a:blipFill dpi="0" rotWithShape="0">
                   <a:blip/>
                   <a:srcRect/>
@@ -14049,7 +14049,7 @@
               </a14:hiddenFill>
             </a:ext>
             <a:ext uri="{91240B29-F687-4f45-9708-019B960494DF}">
-              <a14:hiddenLine xmlns:a14="http://schemas.microsoft.com/office/drawing/2010/main" xmlns="" w="9525">
+              <a14:hiddenLine xmlns="" xmlns:a14="http://schemas.microsoft.com/office/drawing/2010/main" w="9525">
                 <a:solidFill>
                   <a:srgbClr val="000000"/>
                 </a:solidFill>
@@ -14059,7 +14059,7 @@
               </a14:hiddenLine>
             </a:ext>
             <a:ext uri="{AF507438-7753-43e0-B8FC-AC1667EBCBE1}">
-              <a14:hiddenEffects xmlns:a14="http://schemas.microsoft.com/office/drawing/2010/main" xmlns="">
+              <a14:hiddenEffects xmlns="" xmlns:a14="http://schemas.microsoft.com/office/drawing/2010/main">
                 <a:effectLst>
                   <a:outerShdw blurRad="63500" dist="38099" dir="2700000" algn="ctr" rotWithShape="0">
                     <a:srgbClr val="000000">
@@ -14238,7 +14238,7 @@
           <a:effectLst/>
           <a:extLst>
             <a:ext uri="{909E8E84-426E-40dd-AFC4-6F175D3DCCD1}">
-              <a14:hiddenFill xmlns:a14="http://schemas.microsoft.com/office/drawing/2010/main" xmlns="">
+              <a14:hiddenFill xmlns="" xmlns:a14="http://schemas.microsoft.com/office/drawing/2010/main">
                 <a:blipFill dpi="0" rotWithShape="0">
                   <a:blip/>
                   <a:srcRect/>
@@ -14249,7 +14249,7 @@
               </a14:hiddenFill>
             </a:ext>
             <a:ext uri="{91240B29-F687-4f45-9708-019B960494DF}">
-              <a14:hiddenLine xmlns:a14="http://schemas.microsoft.com/office/drawing/2010/main" xmlns="" w="9525">
+              <a14:hiddenLine xmlns="" xmlns:a14="http://schemas.microsoft.com/office/drawing/2010/main" w="9525">
                 <a:solidFill>
                   <a:srgbClr val="000000"/>
                 </a:solidFill>
@@ -14259,7 +14259,7 @@
               </a14:hiddenLine>
             </a:ext>
             <a:ext uri="{AF507438-7753-43e0-B8FC-AC1667EBCBE1}">
-              <a14:hiddenEffects xmlns:a14="http://schemas.microsoft.com/office/drawing/2010/main" xmlns="">
+              <a14:hiddenEffects xmlns="" xmlns:a14="http://schemas.microsoft.com/office/drawing/2010/main">
                 <a:effectLst>
                   <a:outerShdw blurRad="63500" dist="38099" dir="2700000" algn="ctr" rotWithShape="0">
                     <a:srgbClr val="000000">
@@ -14337,7 +14337,7 @@
           <a:effectLst/>
           <a:extLst>
             <a:ext uri="{909E8E84-426E-40dd-AFC4-6F175D3DCCD1}">
-              <a14:hiddenFill xmlns:a14="http://schemas.microsoft.com/office/drawing/2010/main" xmlns="">
+              <a14:hiddenFill xmlns="" xmlns:a14="http://schemas.microsoft.com/office/drawing/2010/main">
                 <a:blipFill dpi="0" rotWithShape="0">
                   <a:blip/>
                   <a:srcRect/>
@@ -14348,7 +14348,7 @@
               </a14:hiddenFill>
             </a:ext>
             <a:ext uri="{91240B29-F687-4f45-9708-019B960494DF}">
-              <a14:hiddenLine xmlns:a14="http://schemas.microsoft.com/office/drawing/2010/main" xmlns="" w="9525">
+              <a14:hiddenLine xmlns="" xmlns:a14="http://schemas.microsoft.com/office/drawing/2010/main" w="9525">
                 <a:solidFill>
                   <a:srgbClr val="000000"/>
                 </a:solidFill>
@@ -14358,7 +14358,7 @@
               </a14:hiddenLine>
             </a:ext>
             <a:ext uri="{AF507438-7753-43e0-B8FC-AC1667EBCBE1}">
-              <a14:hiddenEffects xmlns:a14="http://schemas.microsoft.com/office/drawing/2010/main" xmlns="">
+              <a14:hiddenEffects xmlns="" xmlns:a14="http://schemas.microsoft.com/office/drawing/2010/main">
                 <a:effectLst>
                   <a:outerShdw blurRad="63500" dist="38099" dir="2700000" algn="ctr" rotWithShape="0">
                     <a:srgbClr val="000000">
@@ -16223,7 +16223,7 @@
           <a:effectLst/>
           <a:extLst>
             <a:ext uri="{909E8E84-426E-40dd-AFC4-6F175D3DCCD1}">
-              <a14:hiddenFill xmlns="" xmlns:a14="http://schemas.microsoft.com/office/drawing/2010/main">
+              <a14:hiddenFill xmlns:a14="http://schemas.microsoft.com/office/drawing/2010/main" xmlns="">
                 <a:blipFill dpi="0" rotWithShape="0">
                   <a:blip/>
                   <a:srcRect/>
@@ -16234,7 +16234,7 @@
               </a14:hiddenFill>
             </a:ext>
             <a:ext uri="{91240B29-F687-4f45-9708-019B960494DF}">
-              <a14:hiddenLine xmlns="" xmlns:a14="http://schemas.microsoft.com/office/drawing/2010/main" w="9525">
+              <a14:hiddenLine xmlns:a14="http://schemas.microsoft.com/office/drawing/2010/main" xmlns="" w="9525">
                 <a:solidFill>
                   <a:srgbClr val="000000"/>
                 </a:solidFill>
@@ -16244,7 +16244,7 @@
               </a14:hiddenLine>
             </a:ext>
             <a:ext uri="{AF507438-7753-43e0-B8FC-AC1667EBCBE1}">
-              <a14:hiddenEffects xmlns="" xmlns:a14="http://schemas.microsoft.com/office/drawing/2010/main">
+              <a14:hiddenEffects xmlns:a14="http://schemas.microsoft.com/office/drawing/2010/main" xmlns="">
                 <a:effectLst>
                   <a:outerShdw blurRad="63500" dist="38099" dir="2700000" algn="ctr" rotWithShape="0">
                     <a:srgbClr val="000000">
@@ -16404,7 +16404,7 @@
           <a:effectLst/>
           <a:extLst>
             <a:ext uri="{909E8E84-426E-40dd-AFC4-6F175D3DCCD1}">
-              <a14:hiddenFill xmlns="" xmlns:a14="http://schemas.microsoft.com/office/drawing/2010/main">
+              <a14:hiddenFill xmlns:a14="http://schemas.microsoft.com/office/drawing/2010/main" xmlns="">
                 <a:blipFill dpi="0" rotWithShape="0">
                   <a:blip/>
                   <a:srcRect/>
@@ -16415,7 +16415,7 @@
               </a14:hiddenFill>
             </a:ext>
             <a:ext uri="{91240B29-F687-4f45-9708-019B960494DF}">
-              <a14:hiddenLine xmlns="" xmlns:a14="http://schemas.microsoft.com/office/drawing/2010/main" w="9525">
+              <a14:hiddenLine xmlns:a14="http://schemas.microsoft.com/office/drawing/2010/main" xmlns="" w="9525">
                 <a:solidFill>
                   <a:srgbClr val="000000"/>
                 </a:solidFill>
@@ -16425,7 +16425,7 @@
               </a14:hiddenLine>
             </a:ext>
             <a:ext uri="{AF507438-7753-43e0-B8FC-AC1667EBCBE1}">
-              <a14:hiddenEffects xmlns="" xmlns:a14="http://schemas.microsoft.com/office/drawing/2010/main">
+              <a14:hiddenEffects xmlns:a14="http://schemas.microsoft.com/office/drawing/2010/main" xmlns="">
                 <a:effectLst>
                   <a:outerShdw blurRad="63500" dist="38099" dir="2700000" algn="ctr" rotWithShape="0">
                     <a:srgbClr val="000000">
@@ -17859,7 +17859,7 @@
           <a:p>
             <a:r>
               <a:rPr lang="en-US" sz="2800" dirty="0"/>
-              <a:t>Req. T</a:t>
+              <a:t>Req.  T</a:t>
             </a:r>
           </a:p>
         </p:txBody>
@@ -18224,7 +18224,7 @@
           <a:effectLst/>
           <a:extLst>
             <a:ext uri="{909E8E84-426E-40dd-AFC4-6F175D3DCCD1}">
-              <a14:hiddenFill xmlns="" xmlns:a14="http://schemas.microsoft.com/office/drawing/2010/main">
+              <a14:hiddenFill xmlns:a14="http://schemas.microsoft.com/office/drawing/2010/main" xmlns="">
                 <a:blipFill dpi="0" rotWithShape="0">
                   <a:blip/>
                   <a:srcRect/>
@@ -18235,7 +18235,7 @@
               </a14:hiddenFill>
             </a:ext>
             <a:ext uri="{91240B29-F687-4f45-9708-019B960494DF}">
-              <a14:hiddenLine xmlns="" xmlns:a14="http://schemas.microsoft.com/office/drawing/2010/main" w="9525">
+              <a14:hiddenLine xmlns:a14="http://schemas.microsoft.com/office/drawing/2010/main" xmlns="" w="9525">
                 <a:solidFill>
                   <a:srgbClr val="000000"/>
                 </a:solidFill>
@@ -18245,7 +18245,7 @@
               </a14:hiddenLine>
             </a:ext>
             <a:ext uri="{AF507438-7753-43e0-B8FC-AC1667EBCBE1}">
-              <a14:hiddenEffects xmlns="" xmlns:a14="http://schemas.microsoft.com/office/drawing/2010/main">
+              <a14:hiddenEffects xmlns:a14="http://schemas.microsoft.com/office/drawing/2010/main" xmlns="">
                 <a:effectLst>
                   <a:outerShdw blurRad="63500" dist="38099" dir="2700000" algn="ctr" rotWithShape="0">
                     <a:srgbClr val="000000">
@@ -18338,7 +18338,7 @@
           <a:effectLst/>
           <a:extLst>
             <a:ext uri="{909E8E84-426E-40dd-AFC4-6F175D3DCCD1}">
-              <a14:hiddenFill xmlns="" xmlns:a14="http://schemas.microsoft.com/office/drawing/2010/main">
+              <a14:hiddenFill xmlns:a14="http://schemas.microsoft.com/office/drawing/2010/main" xmlns="">
                 <a:blipFill dpi="0" rotWithShape="0">
                   <a:blip/>
                   <a:srcRect/>
@@ -18349,7 +18349,7 @@
               </a14:hiddenFill>
             </a:ext>
             <a:ext uri="{91240B29-F687-4f45-9708-019B960494DF}">
-              <a14:hiddenLine xmlns="" xmlns:a14="http://schemas.microsoft.com/office/drawing/2010/main" w="9525">
+              <a14:hiddenLine xmlns:a14="http://schemas.microsoft.com/office/drawing/2010/main" xmlns="" w="9525">
                 <a:solidFill>
                   <a:srgbClr val="000000"/>
                 </a:solidFill>
@@ -18359,7 +18359,7 @@
               </a14:hiddenLine>
             </a:ext>
             <a:ext uri="{AF507438-7753-43e0-B8FC-AC1667EBCBE1}">
-              <a14:hiddenEffects xmlns="" xmlns:a14="http://schemas.microsoft.com/office/drawing/2010/main">
+              <a14:hiddenEffects xmlns:a14="http://schemas.microsoft.com/office/drawing/2010/main" xmlns="">
                 <a:effectLst>
                   <a:outerShdw blurRad="63500" dist="38099" dir="2700000" algn="ctr" rotWithShape="0">
                     <a:srgbClr val="000000">
@@ -21231,7 +21231,7 @@
           <a:effectLst/>
           <a:extLst>
             <a:ext uri="{909E8E84-426E-40dd-AFC4-6F175D3DCCD1}">
-              <a14:hiddenFill xmlns="" xmlns:a14="http://schemas.microsoft.com/office/drawing/2010/main">
+              <a14:hiddenFill xmlns:a14="http://schemas.microsoft.com/office/drawing/2010/main" xmlns="">
                 <a:blipFill dpi="0" rotWithShape="0">
                   <a:blip/>
                   <a:srcRect/>
@@ -21242,7 +21242,7 @@
               </a14:hiddenFill>
             </a:ext>
             <a:ext uri="{91240B29-F687-4f45-9708-019B960494DF}">
-              <a14:hiddenLine xmlns="" xmlns:a14="http://schemas.microsoft.com/office/drawing/2010/main" w="9525">
+              <a14:hiddenLine xmlns:a14="http://schemas.microsoft.com/office/drawing/2010/main" xmlns="" w="9525">
                 <a:solidFill>
                   <a:srgbClr val="000000"/>
                 </a:solidFill>
@@ -21252,7 +21252,7 @@
               </a14:hiddenLine>
             </a:ext>
             <a:ext uri="{AF507438-7753-43e0-B8FC-AC1667EBCBE1}">
-              <a14:hiddenEffects xmlns="" xmlns:a14="http://schemas.microsoft.com/office/drawing/2010/main">
+              <a14:hiddenEffects xmlns:a14="http://schemas.microsoft.com/office/drawing/2010/main" xmlns="">
                 <a:effectLst>
                   <a:outerShdw blurRad="63500" dist="38099" dir="2700000" algn="ctr" rotWithShape="0">
                     <a:srgbClr val="000000">
@@ -21331,7 +21331,7 @@
           <a:effectLst/>
           <a:extLst>
             <a:ext uri="{909E8E84-426E-40dd-AFC4-6F175D3DCCD1}">
-              <a14:hiddenFill xmlns="" xmlns:a14="http://schemas.microsoft.com/office/drawing/2010/main">
+              <a14:hiddenFill xmlns:a14="http://schemas.microsoft.com/office/drawing/2010/main" xmlns="">
                 <a:blipFill dpi="0" rotWithShape="0">
                   <a:blip/>
                   <a:srcRect/>
@@ -21342,7 +21342,7 @@
               </a14:hiddenFill>
             </a:ext>
             <a:ext uri="{91240B29-F687-4f45-9708-019B960494DF}">
-              <a14:hiddenLine xmlns="" xmlns:a14="http://schemas.microsoft.com/office/drawing/2010/main" w="9525">
+              <a14:hiddenLine xmlns:a14="http://schemas.microsoft.com/office/drawing/2010/main" xmlns="" w="9525">
                 <a:solidFill>
                   <a:srgbClr val="000000"/>
                 </a:solidFill>
@@ -21352,7 +21352,7 @@
               </a14:hiddenLine>
             </a:ext>
             <a:ext uri="{AF507438-7753-43e0-B8FC-AC1667EBCBE1}">
-              <a14:hiddenEffects xmlns="" xmlns:a14="http://schemas.microsoft.com/office/drawing/2010/main">
+              <a14:hiddenEffects xmlns:a14="http://schemas.microsoft.com/office/drawing/2010/main" xmlns="">
                 <a:effectLst>
                   <a:outerShdw blurRad="63500" dist="38099" dir="2700000" algn="ctr" rotWithShape="0">
                     <a:srgbClr val="000000">
@@ -22935,7 +22935,7 @@
           <a:effectLst/>
           <a:extLst>
             <a:ext uri="{909E8E84-426E-40dd-AFC4-6F175D3DCCD1}">
-              <a14:hiddenFill xmlns="" xmlns:a14="http://schemas.microsoft.com/office/drawing/2010/main">
+              <a14:hiddenFill xmlns:a14="http://schemas.microsoft.com/office/drawing/2010/main" xmlns="">
                 <a:blipFill dpi="0" rotWithShape="0">
                   <a:blip/>
                   <a:srcRect/>
@@ -22946,7 +22946,7 @@
               </a14:hiddenFill>
             </a:ext>
             <a:ext uri="{91240B29-F687-4f45-9708-019B960494DF}">
-              <a14:hiddenLine xmlns="" xmlns:a14="http://schemas.microsoft.com/office/drawing/2010/main" w="9525">
+              <a14:hiddenLine xmlns:a14="http://schemas.microsoft.com/office/drawing/2010/main" xmlns="" w="9525">
                 <a:solidFill>
                   <a:srgbClr val="000000"/>
                 </a:solidFill>
@@ -22956,7 +22956,7 @@
               </a14:hiddenLine>
             </a:ext>
             <a:ext uri="{AF507438-7753-43e0-B8FC-AC1667EBCBE1}">
-              <a14:hiddenEffects xmlns="" xmlns:a14="http://schemas.microsoft.com/office/drawing/2010/main">
+              <a14:hiddenEffects xmlns:a14="http://schemas.microsoft.com/office/drawing/2010/main" xmlns="">
                 <a:effectLst>
                   <a:outerShdw blurRad="63500" dist="38099" dir="2700000" algn="ctr" rotWithShape="0">
                     <a:srgbClr val="000000">
@@ -24604,7 +24604,7 @@
           <a:effectLst/>
           <a:extLst>
             <a:ext uri="{909E8E84-426E-40dd-AFC4-6F175D3DCCD1}">
-              <a14:hiddenFill xmlns="" xmlns:a14="http://schemas.microsoft.com/office/drawing/2010/main">
+              <a14:hiddenFill xmlns:a14="http://schemas.microsoft.com/office/drawing/2010/main" xmlns="">
                 <a:blipFill dpi="0" rotWithShape="0">
                   <a:blip/>
                   <a:srcRect/>
@@ -24615,7 +24615,7 @@
               </a14:hiddenFill>
             </a:ext>
             <a:ext uri="{91240B29-F687-4f45-9708-019B960494DF}">
-              <a14:hiddenLine xmlns="" xmlns:a14="http://schemas.microsoft.com/office/drawing/2010/main" w="9525">
+              <a14:hiddenLine xmlns:a14="http://schemas.microsoft.com/office/drawing/2010/main" xmlns="" w="9525">
                 <a:solidFill>
                   <a:srgbClr val="000000"/>
                 </a:solidFill>
@@ -24625,7 +24625,7 @@
               </a14:hiddenLine>
             </a:ext>
             <a:ext uri="{AF507438-7753-43e0-B8FC-AC1667EBCBE1}">
-              <a14:hiddenEffects xmlns="" xmlns:a14="http://schemas.microsoft.com/office/drawing/2010/main">
+              <a14:hiddenEffects xmlns:a14="http://schemas.microsoft.com/office/drawing/2010/main" xmlns="">
                 <a:effectLst>
                   <a:outerShdw blurRad="63500" dist="38099" dir="2700000" algn="ctr" rotWithShape="0">
                     <a:srgbClr val="000000">
@@ -25987,7 +25987,7 @@
           <a:effectLst/>
           <a:extLst>
             <a:ext uri="{909E8E84-426E-40dd-AFC4-6F175D3DCCD1}">
-              <a14:hiddenFill xmlns="" xmlns:a14="http://schemas.microsoft.com/office/drawing/2010/main">
+              <a14:hiddenFill xmlns:a14="http://schemas.microsoft.com/office/drawing/2010/main" xmlns="">
                 <a:blipFill dpi="0" rotWithShape="0">
                   <a:blip/>
                   <a:srcRect/>
@@ -25998,7 +25998,7 @@
               </a14:hiddenFill>
             </a:ext>
             <a:ext uri="{91240B29-F687-4f45-9708-019B960494DF}">
-              <a14:hiddenLine xmlns="" xmlns:a14="http://schemas.microsoft.com/office/drawing/2010/main" w="9525">
+              <a14:hiddenLine xmlns:a14="http://schemas.microsoft.com/office/drawing/2010/main" xmlns="" w="9525">
                 <a:solidFill>
                   <a:srgbClr val="000000"/>
                 </a:solidFill>
@@ -26008,7 +26008,7 @@
               </a14:hiddenLine>
             </a:ext>
             <a:ext uri="{AF507438-7753-43e0-B8FC-AC1667EBCBE1}">
-              <a14:hiddenEffects xmlns="" xmlns:a14="http://schemas.microsoft.com/office/drawing/2010/main">
+              <a14:hiddenEffects xmlns:a14="http://schemas.microsoft.com/office/drawing/2010/main" xmlns="">
                 <a:effectLst>
                   <a:outerShdw blurRad="63500" dist="38099" dir="2700000" algn="ctr" rotWithShape="0">
                     <a:srgbClr val="000000">
@@ -26139,7 +26139,7 @@
           <a:effectLst/>
           <a:extLst>
             <a:ext uri="{909E8E84-426E-40dd-AFC4-6F175D3DCCD1}">
-              <a14:hiddenFill xmlns="" xmlns:a14="http://schemas.microsoft.com/office/drawing/2010/main">
+              <a14:hiddenFill xmlns:a14="http://schemas.microsoft.com/office/drawing/2010/main" xmlns="">
                 <a:blipFill dpi="0" rotWithShape="0">
                   <a:blip/>
                   <a:srcRect/>
@@ -26150,7 +26150,7 @@
               </a14:hiddenFill>
             </a:ext>
             <a:ext uri="{91240B29-F687-4f45-9708-019B960494DF}">
-              <a14:hiddenLine xmlns="" xmlns:a14="http://schemas.microsoft.com/office/drawing/2010/main" w="9525">
+              <a14:hiddenLine xmlns:a14="http://schemas.microsoft.com/office/drawing/2010/main" xmlns="" w="9525">
                 <a:solidFill>
                   <a:srgbClr val="000000"/>
                 </a:solidFill>
@@ -26160,7 +26160,7 @@
               </a14:hiddenLine>
             </a:ext>
             <a:ext uri="{AF507438-7753-43e0-B8FC-AC1667EBCBE1}">
-              <a14:hiddenEffects xmlns="" xmlns:a14="http://schemas.microsoft.com/office/drawing/2010/main">
+              <a14:hiddenEffects xmlns:a14="http://schemas.microsoft.com/office/drawing/2010/main" xmlns="">
                 <a:effectLst>
                   <a:outerShdw blurRad="63500" dist="38099" dir="2700000" algn="ctr" rotWithShape="0">
                     <a:srgbClr val="000000">
@@ -30566,8 +30566,8 @@
           </a:p>
         </p:txBody>
       </p:sp>
-      <mc:AlternateContent xmlns:mc="http://schemas.openxmlformats.org/markup-compatibility/2006">
-        <mc:Choice xmlns:a14="http://schemas.microsoft.com/office/drawing/2010/main" Requires="a14">
+      <mc:AlternateContent xmlns:mc="http://schemas.openxmlformats.org/markup-compatibility/2006" xmlns:a14="http://schemas.microsoft.com/office/drawing/2010/main">
+        <mc:Choice Requires="a14">
           <p:sp>
             <p:nvSpPr>
               <p:cNvPr id="3" name="Content Placeholder 2"/>
@@ -31200,7 +31200,7 @@
             </p:txBody>
           </p:sp>
         </mc:Choice>
-        <mc:Fallback>
+        <mc:Fallback xmlns="">
           <p:sp>
             <p:nvSpPr>
               <p:cNvPr id="3" name="Content Placeholder 2"/>
@@ -31772,7 +31772,7 @@
                                         <p:tgtEl>
                                           <p:spTgt spid="3">
                                             <p:txEl>
-                                              <p:pRg st="2" end="2"/>
+                                              <p:pRg st="3" end="3"/>
                                             </p:txEl>
                                           </p:spTgt>
                                         </p:tgtEl>
@@ -31821,7 +31821,7 @@
                                         <p:tgtEl>
                                           <p:spTgt spid="3">
                                             <p:txEl>
-                                              <p:pRg st="3" end="3"/>
+                                              <p:pRg st="2" end="2"/>
                                             </p:txEl>
                                           </p:spTgt>
                                         </p:tgtEl>
@@ -33862,7 +33862,7 @@
           <a:effectLst/>
           <a:extLst>
             <a:ext uri="{909E8E84-426E-40dd-AFC4-6F175D3DCCD1}">
-              <a14:hiddenFill xmlns:a14="http://schemas.microsoft.com/office/drawing/2010/main" xmlns="">
+              <a14:hiddenFill xmlns="" xmlns:a14="http://schemas.microsoft.com/office/drawing/2010/main">
                 <a:blipFill dpi="0" rotWithShape="0">
                   <a:blip/>
                   <a:srcRect/>
@@ -33873,7 +33873,7 @@
               </a14:hiddenFill>
             </a:ext>
             <a:ext uri="{91240B29-F687-4f45-9708-019B960494DF}">
-              <a14:hiddenLine xmlns:a14="http://schemas.microsoft.com/office/drawing/2010/main" xmlns="" w="9525">
+              <a14:hiddenLine xmlns="" xmlns:a14="http://schemas.microsoft.com/office/drawing/2010/main" w="9525">
                 <a:solidFill>
                   <a:srgbClr val="000000"/>
                 </a:solidFill>
@@ -33883,7 +33883,7 @@
               </a14:hiddenLine>
             </a:ext>
             <a:ext uri="{AF507438-7753-43e0-B8FC-AC1667EBCBE1}">
-              <a14:hiddenEffects xmlns:a14="http://schemas.microsoft.com/office/drawing/2010/main" xmlns="">
+              <a14:hiddenEffects xmlns="" xmlns:a14="http://schemas.microsoft.com/office/drawing/2010/main">
                 <a:effectLst>
                   <a:outerShdw blurRad="63500" dist="38099" dir="2700000" algn="ctr" rotWithShape="0">
                     <a:srgbClr val="000000">

</xml_diff>

<commit_message>
Check that there are no "group by" or "group-by".
</commit_message>
<xml_diff>
--- a/marple.pptx
+++ b/marple.pptx
@@ -12190,7 +12190,7 @@
           <a:effectLst/>
           <a:extLst>
             <a:ext uri="{909E8E84-426E-40dd-AFC4-6F175D3DCCD1}">
-              <a14:hiddenFill xmlns="" xmlns:a14="http://schemas.microsoft.com/office/drawing/2010/main">
+              <a14:hiddenFill xmlns:a14="http://schemas.microsoft.com/office/drawing/2010/main" xmlns="">
                 <a:blipFill dpi="0" rotWithShape="0">
                   <a:blip/>
                   <a:srcRect/>
@@ -12201,7 +12201,7 @@
               </a14:hiddenFill>
             </a:ext>
             <a:ext uri="{91240B29-F687-4f45-9708-019B960494DF}">
-              <a14:hiddenLine xmlns="" xmlns:a14="http://schemas.microsoft.com/office/drawing/2010/main" w="9525">
+              <a14:hiddenLine xmlns:a14="http://schemas.microsoft.com/office/drawing/2010/main" xmlns="" w="9525">
                 <a:solidFill>
                   <a:srgbClr val="000000"/>
                 </a:solidFill>
@@ -12211,7 +12211,7 @@
               </a14:hiddenLine>
             </a:ext>
             <a:ext uri="{AF507438-7753-43e0-B8FC-AC1667EBCBE1}">
-              <a14:hiddenEffects xmlns="" xmlns:a14="http://schemas.microsoft.com/office/drawing/2010/main">
+              <a14:hiddenEffects xmlns:a14="http://schemas.microsoft.com/office/drawing/2010/main" xmlns="">
                 <a:effectLst>
                   <a:outerShdw blurRad="63500" dist="38099" dir="2700000" algn="ctr" rotWithShape="0">
                     <a:srgbClr val="000000">
@@ -12260,7 +12260,7 @@
           <a:effectLst/>
           <a:extLst>
             <a:ext uri="{909E8E84-426E-40dd-AFC4-6F175D3DCCD1}">
-              <a14:hiddenFill xmlns="" xmlns:a14="http://schemas.microsoft.com/office/drawing/2010/main">
+              <a14:hiddenFill xmlns:a14="http://schemas.microsoft.com/office/drawing/2010/main" xmlns="">
                 <a:blipFill dpi="0" rotWithShape="0">
                   <a:blip/>
                   <a:srcRect/>
@@ -12271,7 +12271,7 @@
               </a14:hiddenFill>
             </a:ext>
             <a:ext uri="{91240B29-F687-4f45-9708-019B960494DF}">
-              <a14:hiddenLine xmlns="" xmlns:a14="http://schemas.microsoft.com/office/drawing/2010/main" w="9525">
+              <a14:hiddenLine xmlns:a14="http://schemas.microsoft.com/office/drawing/2010/main" xmlns="" w="9525">
                 <a:solidFill>
                   <a:srgbClr val="000000"/>
                 </a:solidFill>
@@ -12281,7 +12281,7 @@
               </a14:hiddenLine>
             </a:ext>
             <a:ext uri="{AF507438-7753-43e0-B8FC-AC1667EBCBE1}">
-              <a14:hiddenEffects xmlns="" xmlns:a14="http://schemas.microsoft.com/office/drawing/2010/main">
+              <a14:hiddenEffects xmlns:a14="http://schemas.microsoft.com/office/drawing/2010/main" xmlns="">
                 <a:effectLst>
                   <a:outerShdw blurRad="63500" dist="38099" dir="2700000" algn="ctr" rotWithShape="0">
                     <a:srgbClr val="000000">
@@ -12416,7 +12416,7 @@
             <a:effectLst/>
             <a:extLst>
               <a:ext uri="{909E8E84-426E-40dd-AFC4-6F175D3DCCD1}">
-                <a14:hiddenFill xmlns:a14="http://schemas.microsoft.com/office/drawing/2010/main" xmlns="">
+                <a14:hiddenFill xmlns="" xmlns:a14="http://schemas.microsoft.com/office/drawing/2010/main">
                   <a:blipFill dpi="0" rotWithShape="0">
                     <a:blip/>
                     <a:srcRect/>
@@ -12427,7 +12427,7 @@
                 </a14:hiddenFill>
               </a:ext>
               <a:ext uri="{91240B29-F687-4f45-9708-019B960494DF}">
-                <a14:hiddenLine xmlns:a14="http://schemas.microsoft.com/office/drawing/2010/main" xmlns="" w="9525">
+                <a14:hiddenLine xmlns="" xmlns:a14="http://schemas.microsoft.com/office/drawing/2010/main" w="9525">
                   <a:solidFill>
                     <a:srgbClr val="000000"/>
                   </a:solidFill>
@@ -12437,7 +12437,7 @@
                 </a14:hiddenLine>
               </a:ext>
               <a:ext uri="{AF507438-7753-43e0-B8FC-AC1667EBCBE1}">
-                <a14:hiddenEffects xmlns:a14="http://schemas.microsoft.com/office/drawing/2010/main" xmlns="">
+                <a14:hiddenEffects xmlns="" xmlns:a14="http://schemas.microsoft.com/office/drawing/2010/main">
                   <a:effectLst>
                     <a:outerShdw blurRad="63500" dist="38099" dir="2700000" algn="ctr" rotWithShape="0">
                       <a:srgbClr val="000000">
@@ -12486,7 +12486,7 @@
             <a:effectLst/>
             <a:extLst>
               <a:ext uri="{909E8E84-426E-40dd-AFC4-6F175D3DCCD1}">
-                <a14:hiddenFill xmlns:a14="http://schemas.microsoft.com/office/drawing/2010/main" xmlns="">
+                <a14:hiddenFill xmlns="" xmlns:a14="http://schemas.microsoft.com/office/drawing/2010/main">
                   <a:blipFill dpi="0" rotWithShape="0">
                     <a:blip/>
                     <a:srcRect/>
@@ -12497,7 +12497,7 @@
                 </a14:hiddenFill>
               </a:ext>
               <a:ext uri="{91240B29-F687-4f45-9708-019B960494DF}">
-                <a14:hiddenLine xmlns:a14="http://schemas.microsoft.com/office/drawing/2010/main" xmlns="" w="9525">
+                <a14:hiddenLine xmlns="" xmlns:a14="http://schemas.microsoft.com/office/drawing/2010/main" w="9525">
                   <a:solidFill>
                     <a:srgbClr val="000000"/>
                   </a:solidFill>
@@ -12507,7 +12507,7 @@
                 </a14:hiddenLine>
               </a:ext>
               <a:ext uri="{AF507438-7753-43e0-B8FC-AC1667EBCBE1}">
-                <a14:hiddenEffects xmlns:a14="http://schemas.microsoft.com/office/drawing/2010/main" xmlns="">
+                <a14:hiddenEffects xmlns="" xmlns:a14="http://schemas.microsoft.com/office/drawing/2010/main">
                   <a:effectLst>
                     <a:outerShdw blurRad="63500" dist="38099" dir="2700000" algn="ctr" rotWithShape="0">
                       <a:srgbClr val="000000">
@@ -12556,7 +12556,7 @@
             <a:effectLst/>
             <a:extLst>
               <a:ext uri="{909E8E84-426E-40dd-AFC4-6F175D3DCCD1}">
-                <a14:hiddenFill xmlns:a14="http://schemas.microsoft.com/office/drawing/2010/main" xmlns="">
+                <a14:hiddenFill xmlns="" xmlns:a14="http://schemas.microsoft.com/office/drawing/2010/main">
                   <a:blipFill dpi="0" rotWithShape="0">
                     <a:blip/>
                     <a:srcRect/>
@@ -12567,7 +12567,7 @@
                 </a14:hiddenFill>
               </a:ext>
               <a:ext uri="{91240B29-F687-4f45-9708-019B960494DF}">
-                <a14:hiddenLine xmlns:a14="http://schemas.microsoft.com/office/drawing/2010/main" xmlns="" w="9525">
+                <a14:hiddenLine xmlns="" xmlns:a14="http://schemas.microsoft.com/office/drawing/2010/main" w="9525">
                   <a:solidFill>
                     <a:srgbClr val="000000"/>
                   </a:solidFill>
@@ -12577,7 +12577,7 @@
                 </a14:hiddenLine>
               </a:ext>
               <a:ext uri="{AF507438-7753-43e0-B8FC-AC1667EBCBE1}">
-                <a14:hiddenEffects xmlns:a14="http://schemas.microsoft.com/office/drawing/2010/main" xmlns="">
+                <a14:hiddenEffects xmlns="" xmlns:a14="http://schemas.microsoft.com/office/drawing/2010/main">
                   <a:effectLst>
                     <a:outerShdw blurRad="63500" dist="38099" dir="2700000" algn="ctr" rotWithShape="0">
                       <a:srgbClr val="000000">
@@ -12618,12 +12618,12 @@
             <a:effectLst/>
             <a:extLst>
               <a:ext uri="{909E8E84-426E-40dd-AFC4-6F175D3DCCD1}">
-                <a14:hiddenFill xmlns:a14="http://schemas.microsoft.com/office/drawing/2010/main" xmlns="">
+                <a14:hiddenFill xmlns="" xmlns:a14="http://schemas.microsoft.com/office/drawing/2010/main">
                   <a:noFill/>
                 </a14:hiddenFill>
               </a:ext>
               <a:ext uri="{AF507438-7753-43e0-B8FC-AC1667EBCBE1}">
-                <a14:hiddenEffects xmlns:a14="http://schemas.microsoft.com/office/drawing/2010/main" xmlns="">
+                <a14:hiddenEffects xmlns="" xmlns:a14="http://schemas.microsoft.com/office/drawing/2010/main">
                   <a:effectLst>
                     <a:outerShdw blurRad="63500" dist="38099" dir="2700000" algn="ctr" rotWithShape="0">
                       <a:srgbClr val="000000">
@@ -12676,12 +12676,12 @@
             <a:effectLst/>
             <a:extLst>
               <a:ext uri="{909E8E84-426E-40dd-AFC4-6F175D3DCCD1}">
-                <a14:hiddenFill xmlns:a14="http://schemas.microsoft.com/office/drawing/2010/main" xmlns="">
+                <a14:hiddenFill xmlns="" xmlns:a14="http://schemas.microsoft.com/office/drawing/2010/main">
                   <a:noFill/>
                 </a14:hiddenFill>
               </a:ext>
               <a:ext uri="{AF507438-7753-43e0-B8FC-AC1667EBCBE1}">
-                <a14:hiddenEffects xmlns:a14="http://schemas.microsoft.com/office/drawing/2010/main" xmlns="">
+                <a14:hiddenEffects xmlns="" xmlns:a14="http://schemas.microsoft.com/office/drawing/2010/main">
                   <a:effectLst>
                     <a:outerShdw blurRad="63500" dist="38099" dir="2700000" algn="ctr" rotWithShape="0">
                       <a:srgbClr val="000000">
@@ -12734,12 +12734,12 @@
             <a:effectLst/>
             <a:extLst>
               <a:ext uri="{909E8E84-426E-40dd-AFC4-6F175D3DCCD1}">
-                <a14:hiddenFill xmlns:a14="http://schemas.microsoft.com/office/drawing/2010/main" xmlns="">
+                <a14:hiddenFill xmlns="" xmlns:a14="http://schemas.microsoft.com/office/drawing/2010/main">
                   <a:noFill/>
                 </a14:hiddenFill>
               </a:ext>
               <a:ext uri="{AF507438-7753-43e0-B8FC-AC1667EBCBE1}">
-                <a14:hiddenEffects xmlns:a14="http://schemas.microsoft.com/office/drawing/2010/main" xmlns="">
+                <a14:hiddenEffects xmlns="" xmlns:a14="http://schemas.microsoft.com/office/drawing/2010/main">
                   <a:effectLst>
                     <a:outerShdw blurRad="63500" dist="38099" dir="2700000" algn="ctr" rotWithShape="0">
                       <a:srgbClr val="000000">
@@ -12792,12 +12792,12 @@
             <a:effectLst/>
             <a:extLst>
               <a:ext uri="{909E8E84-426E-40dd-AFC4-6F175D3DCCD1}">
-                <a14:hiddenFill xmlns:a14="http://schemas.microsoft.com/office/drawing/2010/main" xmlns="">
+                <a14:hiddenFill xmlns="" xmlns:a14="http://schemas.microsoft.com/office/drawing/2010/main">
                   <a:noFill/>
                 </a14:hiddenFill>
               </a:ext>
               <a:ext uri="{AF507438-7753-43e0-B8FC-AC1667EBCBE1}">
-                <a14:hiddenEffects xmlns:a14="http://schemas.microsoft.com/office/drawing/2010/main" xmlns="">
+                <a14:hiddenEffects xmlns="" xmlns:a14="http://schemas.microsoft.com/office/drawing/2010/main">
                   <a:effectLst>
                     <a:outerShdw blurRad="63500" dist="38099" dir="2700000" algn="ctr" rotWithShape="0">
                       <a:srgbClr val="000000">
@@ -12850,12 +12850,12 @@
             <a:effectLst/>
             <a:extLst>
               <a:ext uri="{909E8E84-426E-40dd-AFC4-6F175D3DCCD1}">
-                <a14:hiddenFill xmlns:a14="http://schemas.microsoft.com/office/drawing/2010/main" xmlns="">
+                <a14:hiddenFill xmlns="" xmlns:a14="http://schemas.microsoft.com/office/drawing/2010/main">
                   <a:noFill/>
                 </a14:hiddenFill>
               </a:ext>
               <a:ext uri="{AF507438-7753-43e0-B8FC-AC1667EBCBE1}">
-                <a14:hiddenEffects xmlns:a14="http://schemas.microsoft.com/office/drawing/2010/main" xmlns="">
+                <a14:hiddenEffects xmlns="" xmlns:a14="http://schemas.microsoft.com/office/drawing/2010/main">
                   <a:effectLst>
                     <a:outerShdw blurRad="63500" dist="38099" dir="2700000" algn="ctr" rotWithShape="0">
                       <a:srgbClr val="000000">
@@ -12908,12 +12908,12 @@
             <a:effectLst/>
             <a:extLst>
               <a:ext uri="{909E8E84-426E-40dd-AFC4-6F175D3DCCD1}">
-                <a14:hiddenFill xmlns:a14="http://schemas.microsoft.com/office/drawing/2010/main" xmlns="">
+                <a14:hiddenFill xmlns="" xmlns:a14="http://schemas.microsoft.com/office/drawing/2010/main">
                   <a:noFill/>
                 </a14:hiddenFill>
               </a:ext>
               <a:ext uri="{AF507438-7753-43e0-B8FC-AC1667EBCBE1}">
-                <a14:hiddenEffects xmlns:a14="http://schemas.microsoft.com/office/drawing/2010/main" xmlns="">
+                <a14:hiddenEffects xmlns="" xmlns:a14="http://schemas.microsoft.com/office/drawing/2010/main">
                   <a:effectLst>
                     <a:outerShdw blurRad="63500" dist="38099" dir="2700000" algn="ctr" rotWithShape="0">
                       <a:srgbClr val="000000">
@@ -12966,12 +12966,12 @@
             <a:effectLst/>
             <a:extLst>
               <a:ext uri="{909E8E84-426E-40dd-AFC4-6F175D3DCCD1}">
-                <a14:hiddenFill xmlns:a14="http://schemas.microsoft.com/office/drawing/2010/main" xmlns="">
+                <a14:hiddenFill xmlns="" xmlns:a14="http://schemas.microsoft.com/office/drawing/2010/main">
                   <a:noFill/>
                 </a14:hiddenFill>
               </a:ext>
               <a:ext uri="{AF507438-7753-43e0-B8FC-AC1667EBCBE1}">
-                <a14:hiddenEffects xmlns:a14="http://schemas.microsoft.com/office/drawing/2010/main" xmlns="">
+                <a14:hiddenEffects xmlns="" xmlns:a14="http://schemas.microsoft.com/office/drawing/2010/main">
                   <a:effectLst>
                     <a:outerShdw blurRad="63500" dist="38099" dir="2700000" algn="ctr" rotWithShape="0">
                       <a:srgbClr val="000000">
@@ -13024,12 +13024,12 @@
             <a:effectLst/>
             <a:extLst>
               <a:ext uri="{909E8E84-426E-40dd-AFC4-6F175D3DCCD1}">
-                <a14:hiddenFill xmlns:a14="http://schemas.microsoft.com/office/drawing/2010/main" xmlns="">
+                <a14:hiddenFill xmlns="" xmlns:a14="http://schemas.microsoft.com/office/drawing/2010/main">
                   <a:noFill/>
                 </a14:hiddenFill>
               </a:ext>
               <a:ext uri="{AF507438-7753-43e0-B8FC-AC1667EBCBE1}">
-                <a14:hiddenEffects xmlns:a14="http://schemas.microsoft.com/office/drawing/2010/main" xmlns="">
+                <a14:hiddenEffects xmlns="" xmlns:a14="http://schemas.microsoft.com/office/drawing/2010/main">
                   <a:effectLst>
                     <a:outerShdw blurRad="63500" dist="38099" dir="2700000" algn="ctr" rotWithShape="0">
                       <a:srgbClr val="000000">
@@ -13082,12 +13082,12 @@
             <a:effectLst/>
             <a:extLst>
               <a:ext uri="{909E8E84-426E-40dd-AFC4-6F175D3DCCD1}">
-                <a14:hiddenFill xmlns:a14="http://schemas.microsoft.com/office/drawing/2010/main" xmlns="">
+                <a14:hiddenFill xmlns="" xmlns:a14="http://schemas.microsoft.com/office/drawing/2010/main">
                   <a:noFill/>
                 </a14:hiddenFill>
               </a:ext>
               <a:ext uri="{AF507438-7753-43e0-B8FC-AC1667EBCBE1}">
-                <a14:hiddenEffects xmlns:a14="http://schemas.microsoft.com/office/drawing/2010/main" xmlns="">
+                <a14:hiddenEffects xmlns="" xmlns:a14="http://schemas.microsoft.com/office/drawing/2010/main">
                   <a:effectLst>
                     <a:outerShdw blurRad="63500" dist="38099" dir="2700000" algn="ctr" rotWithShape="0">
                       <a:srgbClr val="000000">
@@ -13140,12 +13140,12 @@
             <a:effectLst/>
             <a:extLst>
               <a:ext uri="{909E8E84-426E-40dd-AFC4-6F175D3DCCD1}">
-                <a14:hiddenFill xmlns:a14="http://schemas.microsoft.com/office/drawing/2010/main" xmlns="">
+                <a14:hiddenFill xmlns="" xmlns:a14="http://schemas.microsoft.com/office/drawing/2010/main">
                   <a:noFill/>
                 </a14:hiddenFill>
               </a:ext>
               <a:ext uri="{AF507438-7753-43e0-B8FC-AC1667EBCBE1}">
-                <a14:hiddenEffects xmlns:a14="http://schemas.microsoft.com/office/drawing/2010/main" xmlns="">
+                <a14:hiddenEffects xmlns="" xmlns:a14="http://schemas.microsoft.com/office/drawing/2010/main">
                   <a:effectLst>
                     <a:outerShdw blurRad="63500" dist="38099" dir="2700000" algn="ctr" rotWithShape="0">
                       <a:srgbClr val="000000">
@@ -13206,7 +13206,7 @@
             <a:effectLst/>
             <a:extLst>
               <a:ext uri="{909E8E84-426E-40dd-AFC4-6F175D3DCCD1}">
-                <a14:hiddenFill xmlns:a14="http://schemas.microsoft.com/office/drawing/2010/main" xmlns="">
+                <a14:hiddenFill xmlns="" xmlns:a14="http://schemas.microsoft.com/office/drawing/2010/main">
                   <a:blipFill dpi="0" rotWithShape="0">
                     <a:blip/>
                     <a:srcRect/>
@@ -13217,7 +13217,7 @@
                 </a14:hiddenFill>
               </a:ext>
               <a:ext uri="{91240B29-F687-4f45-9708-019B960494DF}">
-                <a14:hiddenLine xmlns:a14="http://schemas.microsoft.com/office/drawing/2010/main" xmlns="" w="9525">
+                <a14:hiddenLine xmlns="" xmlns:a14="http://schemas.microsoft.com/office/drawing/2010/main" w="9525">
                   <a:solidFill>
                     <a:srgbClr val="000000"/>
                   </a:solidFill>
@@ -13227,7 +13227,7 @@
                 </a14:hiddenLine>
               </a:ext>
               <a:ext uri="{AF507438-7753-43e0-B8FC-AC1667EBCBE1}">
-                <a14:hiddenEffects xmlns:a14="http://schemas.microsoft.com/office/drawing/2010/main" xmlns="">
+                <a14:hiddenEffects xmlns="" xmlns:a14="http://schemas.microsoft.com/office/drawing/2010/main">
                   <a:effectLst>
                     <a:outerShdw blurRad="63500" dist="38099" dir="2700000" algn="ctr" rotWithShape="0">
                       <a:srgbClr val="000000">
@@ -13276,7 +13276,7 @@
             <a:effectLst/>
             <a:extLst>
               <a:ext uri="{909E8E84-426E-40dd-AFC4-6F175D3DCCD1}">
-                <a14:hiddenFill xmlns:a14="http://schemas.microsoft.com/office/drawing/2010/main" xmlns="">
+                <a14:hiddenFill xmlns="" xmlns:a14="http://schemas.microsoft.com/office/drawing/2010/main">
                   <a:blipFill dpi="0" rotWithShape="0">
                     <a:blip/>
                     <a:srcRect/>
@@ -13287,7 +13287,7 @@
                 </a14:hiddenFill>
               </a:ext>
               <a:ext uri="{91240B29-F687-4f45-9708-019B960494DF}">
-                <a14:hiddenLine xmlns:a14="http://schemas.microsoft.com/office/drawing/2010/main" xmlns="" w="9525">
+                <a14:hiddenLine xmlns="" xmlns:a14="http://schemas.microsoft.com/office/drawing/2010/main" w="9525">
                   <a:solidFill>
                     <a:srgbClr val="000000"/>
                   </a:solidFill>
@@ -13297,7 +13297,7 @@
                 </a14:hiddenLine>
               </a:ext>
               <a:ext uri="{AF507438-7753-43e0-B8FC-AC1667EBCBE1}">
-                <a14:hiddenEffects xmlns:a14="http://schemas.microsoft.com/office/drawing/2010/main" xmlns="">
+                <a14:hiddenEffects xmlns="" xmlns:a14="http://schemas.microsoft.com/office/drawing/2010/main">
                   <a:effectLst>
                     <a:outerShdw blurRad="63500" dist="38099" dir="2700000" algn="ctr" rotWithShape="0">
                       <a:srgbClr val="000000">
@@ -13346,7 +13346,7 @@
             <a:effectLst/>
             <a:extLst>
               <a:ext uri="{909E8E84-426E-40dd-AFC4-6F175D3DCCD1}">
-                <a14:hiddenFill xmlns:a14="http://schemas.microsoft.com/office/drawing/2010/main" xmlns="">
+                <a14:hiddenFill xmlns="" xmlns:a14="http://schemas.microsoft.com/office/drawing/2010/main">
                   <a:blipFill dpi="0" rotWithShape="0">
                     <a:blip/>
                     <a:srcRect/>
@@ -13357,7 +13357,7 @@
                 </a14:hiddenFill>
               </a:ext>
               <a:ext uri="{91240B29-F687-4f45-9708-019B960494DF}">
-                <a14:hiddenLine xmlns:a14="http://schemas.microsoft.com/office/drawing/2010/main" xmlns="" w="9525">
+                <a14:hiddenLine xmlns="" xmlns:a14="http://schemas.microsoft.com/office/drawing/2010/main" w="9525">
                   <a:solidFill>
                     <a:srgbClr val="000000"/>
                   </a:solidFill>
@@ -13367,7 +13367,7 @@
                 </a14:hiddenLine>
               </a:ext>
               <a:ext uri="{AF507438-7753-43e0-B8FC-AC1667EBCBE1}">
-                <a14:hiddenEffects xmlns:a14="http://schemas.microsoft.com/office/drawing/2010/main" xmlns="">
+                <a14:hiddenEffects xmlns="" xmlns:a14="http://schemas.microsoft.com/office/drawing/2010/main">
                   <a:effectLst>
                     <a:outerShdw blurRad="63500" dist="38099" dir="2700000" algn="ctr" rotWithShape="0">
                       <a:srgbClr val="000000">
@@ -13416,7 +13416,7 @@
             <a:effectLst/>
             <a:extLst>
               <a:ext uri="{909E8E84-426E-40dd-AFC4-6F175D3DCCD1}">
-                <a14:hiddenFill xmlns:a14="http://schemas.microsoft.com/office/drawing/2010/main" xmlns="">
+                <a14:hiddenFill xmlns="" xmlns:a14="http://schemas.microsoft.com/office/drawing/2010/main">
                   <a:blipFill dpi="0" rotWithShape="0">
                     <a:blip/>
                     <a:srcRect/>
@@ -13427,7 +13427,7 @@
                 </a14:hiddenFill>
               </a:ext>
               <a:ext uri="{91240B29-F687-4f45-9708-019B960494DF}">
-                <a14:hiddenLine xmlns:a14="http://schemas.microsoft.com/office/drawing/2010/main" xmlns="" w="9525">
+                <a14:hiddenLine xmlns="" xmlns:a14="http://schemas.microsoft.com/office/drawing/2010/main" w="9525">
                   <a:solidFill>
                     <a:srgbClr val="000000"/>
                   </a:solidFill>
@@ -13437,7 +13437,7 @@
                 </a14:hiddenLine>
               </a:ext>
               <a:ext uri="{AF507438-7753-43e0-B8FC-AC1667EBCBE1}">
-                <a14:hiddenEffects xmlns:a14="http://schemas.microsoft.com/office/drawing/2010/main" xmlns="">
+                <a14:hiddenEffects xmlns="" xmlns:a14="http://schemas.microsoft.com/office/drawing/2010/main">
                   <a:effectLst>
                     <a:outerShdw blurRad="63500" dist="38099" dir="2700000" algn="ctr" rotWithShape="0">
                       <a:srgbClr val="000000">
@@ -13486,7 +13486,7 @@
             <a:effectLst/>
             <a:extLst>
               <a:ext uri="{909E8E84-426E-40dd-AFC4-6F175D3DCCD1}">
-                <a14:hiddenFill xmlns:a14="http://schemas.microsoft.com/office/drawing/2010/main" xmlns="">
+                <a14:hiddenFill xmlns="" xmlns:a14="http://schemas.microsoft.com/office/drawing/2010/main">
                   <a:blipFill dpi="0" rotWithShape="0">
                     <a:blip/>
                     <a:srcRect/>
@@ -13497,7 +13497,7 @@
                 </a14:hiddenFill>
               </a:ext>
               <a:ext uri="{91240B29-F687-4f45-9708-019B960494DF}">
-                <a14:hiddenLine xmlns:a14="http://schemas.microsoft.com/office/drawing/2010/main" xmlns="" w="9525">
+                <a14:hiddenLine xmlns="" xmlns:a14="http://schemas.microsoft.com/office/drawing/2010/main" w="9525">
                   <a:solidFill>
                     <a:srgbClr val="000000"/>
                   </a:solidFill>
@@ -13507,7 +13507,7 @@
                 </a14:hiddenLine>
               </a:ext>
               <a:ext uri="{AF507438-7753-43e0-B8FC-AC1667EBCBE1}">
-                <a14:hiddenEffects xmlns:a14="http://schemas.microsoft.com/office/drawing/2010/main" xmlns="">
+                <a14:hiddenEffects xmlns="" xmlns:a14="http://schemas.microsoft.com/office/drawing/2010/main">
                   <a:effectLst>
                     <a:outerShdw blurRad="63500" dist="38099" dir="2700000" algn="ctr" rotWithShape="0">
                       <a:srgbClr val="000000">
@@ -13548,12 +13548,12 @@
             <a:effectLst/>
             <a:extLst>
               <a:ext uri="{909E8E84-426E-40dd-AFC4-6F175D3DCCD1}">
-                <a14:hiddenFill xmlns:a14="http://schemas.microsoft.com/office/drawing/2010/main" xmlns="">
+                <a14:hiddenFill xmlns="" xmlns:a14="http://schemas.microsoft.com/office/drawing/2010/main">
                   <a:noFill/>
                 </a14:hiddenFill>
               </a:ext>
               <a:ext uri="{AF507438-7753-43e0-B8FC-AC1667EBCBE1}">
-                <a14:hiddenEffects xmlns:a14="http://schemas.microsoft.com/office/drawing/2010/main" xmlns="">
+                <a14:hiddenEffects xmlns="" xmlns:a14="http://schemas.microsoft.com/office/drawing/2010/main">
                   <a:effectLst>
                     <a:outerShdw blurRad="63500" dist="38099" dir="2700000" algn="ctr" rotWithShape="0">
                       <a:srgbClr val="000000">
@@ -13606,12 +13606,12 @@
             <a:effectLst/>
             <a:extLst>
               <a:ext uri="{909E8E84-426E-40dd-AFC4-6F175D3DCCD1}">
-                <a14:hiddenFill xmlns:a14="http://schemas.microsoft.com/office/drawing/2010/main" xmlns="">
+                <a14:hiddenFill xmlns="" xmlns:a14="http://schemas.microsoft.com/office/drawing/2010/main">
                   <a:noFill/>
                 </a14:hiddenFill>
               </a:ext>
               <a:ext uri="{AF507438-7753-43e0-B8FC-AC1667EBCBE1}">
-                <a14:hiddenEffects xmlns:a14="http://schemas.microsoft.com/office/drawing/2010/main" xmlns="">
+                <a14:hiddenEffects xmlns="" xmlns:a14="http://schemas.microsoft.com/office/drawing/2010/main">
                   <a:effectLst>
                     <a:outerShdw blurRad="63500" dist="38099" dir="2700000" algn="ctr" rotWithShape="0">
                       <a:srgbClr val="000000">
@@ -13672,7 +13672,7 @@
             <a:effectLst/>
             <a:extLst>
               <a:ext uri="{909E8E84-426E-40dd-AFC4-6F175D3DCCD1}">
-                <a14:hiddenFill xmlns:a14="http://schemas.microsoft.com/office/drawing/2010/main" xmlns="">
+                <a14:hiddenFill xmlns="" xmlns:a14="http://schemas.microsoft.com/office/drawing/2010/main">
                   <a:blipFill dpi="0" rotWithShape="0">
                     <a:blip/>
                     <a:srcRect/>
@@ -13683,7 +13683,7 @@
                 </a14:hiddenFill>
               </a:ext>
               <a:ext uri="{91240B29-F687-4f45-9708-019B960494DF}">
-                <a14:hiddenLine xmlns:a14="http://schemas.microsoft.com/office/drawing/2010/main" xmlns="" w="9525">
+                <a14:hiddenLine xmlns="" xmlns:a14="http://schemas.microsoft.com/office/drawing/2010/main" w="9525">
                   <a:solidFill>
                     <a:srgbClr val="000000"/>
                   </a:solidFill>
@@ -13693,7 +13693,7 @@
                 </a14:hiddenLine>
               </a:ext>
               <a:ext uri="{AF507438-7753-43e0-B8FC-AC1667EBCBE1}">
-                <a14:hiddenEffects xmlns:a14="http://schemas.microsoft.com/office/drawing/2010/main" xmlns="">
+                <a14:hiddenEffects xmlns="" xmlns:a14="http://schemas.microsoft.com/office/drawing/2010/main">
                   <a:effectLst>
                     <a:outerShdw blurRad="63500" dist="38099" dir="2700000" algn="ctr" rotWithShape="0">
                       <a:srgbClr val="000000">
@@ -13826,7 +13826,7 @@
           <a:effectLst/>
           <a:extLst>
             <a:ext uri="{909E8E84-426E-40dd-AFC4-6F175D3DCCD1}">
-              <a14:hiddenFill xmlns="" xmlns:a14="http://schemas.microsoft.com/office/drawing/2010/main">
+              <a14:hiddenFill xmlns:a14="http://schemas.microsoft.com/office/drawing/2010/main" xmlns="">
                 <a:blipFill dpi="0" rotWithShape="0">
                   <a:blip/>
                   <a:srcRect/>
@@ -13837,7 +13837,7 @@
               </a14:hiddenFill>
             </a:ext>
             <a:ext uri="{91240B29-F687-4f45-9708-019B960494DF}">
-              <a14:hiddenLine xmlns="" xmlns:a14="http://schemas.microsoft.com/office/drawing/2010/main" w="9525">
+              <a14:hiddenLine xmlns:a14="http://schemas.microsoft.com/office/drawing/2010/main" xmlns="" w="9525">
                 <a:solidFill>
                   <a:srgbClr val="000000"/>
                 </a:solidFill>
@@ -13847,7 +13847,7 @@
               </a14:hiddenLine>
             </a:ext>
             <a:ext uri="{AF507438-7753-43e0-B8FC-AC1667EBCBE1}">
-              <a14:hiddenEffects xmlns="" xmlns:a14="http://schemas.microsoft.com/office/drawing/2010/main">
+              <a14:hiddenEffects xmlns:a14="http://schemas.microsoft.com/office/drawing/2010/main" xmlns="">
                 <a:effectLst>
                   <a:outerShdw blurRad="63500" dist="38099" dir="2700000" algn="ctr" rotWithShape="0">
                     <a:srgbClr val="000000">
@@ -13932,7 +13932,7 @@
           <a:effectLst/>
           <a:extLst>
             <a:ext uri="{909E8E84-426E-40dd-AFC4-6F175D3DCCD1}">
-              <a14:hiddenFill xmlns="" xmlns:a14="http://schemas.microsoft.com/office/drawing/2010/main">
+              <a14:hiddenFill xmlns:a14="http://schemas.microsoft.com/office/drawing/2010/main" xmlns="">
                 <a:blipFill dpi="0" rotWithShape="0">
                   <a:blip/>
                   <a:srcRect/>
@@ -13943,7 +13943,7 @@
               </a14:hiddenFill>
             </a:ext>
             <a:ext uri="{91240B29-F687-4f45-9708-019B960494DF}">
-              <a14:hiddenLine xmlns="" xmlns:a14="http://schemas.microsoft.com/office/drawing/2010/main" w="9525">
+              <a14:hiddenLine xmlns:a14="http://schemas.microsoft.com/office/drawing/2010/main" xmlns="" w="9525">
                 <a:solidFill>
                   <a:srgbClr val="000000"/>
                 </a:solidFill>
@@ -13953,7 +13953,7 @@
               </a14:hiddenLine>
             </a:ext>
             <a:ext uri="{AF507438-7753-43e0-B8FC-AC1667EBCBE1}">
-              <a14:hiddenEffects xmlns="" xmlns:a14="http://schemas.microsoft.com/office/drawing/2010/main">
+              <a14:hiddenEffects xmlns:a14="http://schemas.microsoft.com/office/drawing/2010/main" xmlns="">
                 <a:effectLst>
                   <a:outerShdw blurRad="63500" dist="38099" dir="2700000" algn="ctr" rotWithShape="0">
                     <a:srgbClr val="000000">
@@ -14038,7 +14038,7 @@
           <a:effectLst/>
           <a:extLst>
             <a:ext uri="{909E8E84-426E-40dd-AFC4-6F175D3DCCD1}">
-              <a14:hiddenFill xmlns="" xmlns:a14="http://schemas.microsoft.com/office/drawing/2010/main">
+              <a14:hiddenFill xmlns:a14="http://schemas.microsoft.com/office/drawing/2010/main" xmlns="">
                 <a:blipFill dpi="0" rotWithShape="0">
                   <a:blip/>
                   <a:srcRect/>
@@ -14049,7 +14049,7 @@
               </a14:hiddenFill>
             </a:ext>
             <a:ext uri="{91240B29-F687-4f45-9708-019B960494DF}">
-              <a14:hiddenLine xmlns="" xmlns:a14="http://schemas.microsoft.com/office/drawing/2010/main" w="9525">
+              <a14:hiddenLine xmlns:a14="http://schemas.microsoft.com/office/drawing/2010/main" xmlns="" w="9525">
                 <a:solidFill>
                   <a:srgbClr val="000000"/>
                 </a:solidFill>
@@ -14059,7 +14059,7 @@
               </a14:hiddenLine>
             </a:ext>
             <a:ext uri="{AF507438-7753-43e0-B8FC-AC1667EBCBE1}">
-              <a14:hiddenEffects xmlns="" xmlns:a14="http://schemas.microsoft.com/office/drawing/2010/main">
+              <a14:hiddenEffects xmlns:a14="http://schemas.microsoft.com/office/drawing/2010/main" xmlns="">
                 <a:effectLst>
                   <a:outerShdw blurRad="63500" dist="38099" dir="2700000" algn="ctr" rotWithShape="0">
                     <a:srgbClr val="000000">
@@ -14238,7 +14238,7 @@
           <a:effectLst/>
           <a:extLst>
             <a:ext uri="{909E8E84-426E-40dd-AFC4-6F175D3DCCD1}">
-              <a14:hiddenFill xmlns="" xmlns:a14="http://schemas.microsoft.com/office/drawing/2010/main">
+              <a14:hiddenFill xmlns:a14="http://schemas.microsoft.com/office/drawing/2010/main" xmlns="">
                 <a:blipFill dpi="0" rotWithShape="0">
                   <a:blip/>
                   <a:srcRect/>
@@ -14249,7 +14249,7 @@
               </a14:hiddenFill>
             </a:ext>
             <a:ext uri="{91240B29-F687-4f45-9708-019B960494DF}">
-              <a14:hiddenLine xmlns="" xmlns:a14="http://schemas.microsoft.com/office/drawing/2010/main" w="9525">
+              <a14:hiddenLine xmlns:a14="http://schemas.microsoft.com/office/drawing/2010/main" xmlns="" w="9525">
                 <a:solidFill>
                   <a:srgbClr val="000000"/>
                 </a:solidFill>
@@ -14259,7 +14259,7 @@
               </a14:hiddenLine>
             </a:ext>
             <a:ext uri="{AF507438-7753-43e0-B8FC-AC1667EBCBE1}">
-              <a14:hiddenEffects xmlns="" xmlns:a14="http://schemas.microsoft.com/office/drawing/2010/main">
+              <a14:hiddenEffects xmlns:a14="http://schemas.microsoft.com/office/drawing/2010/main" xmlns="">
                 <a:effectLst>
                   <a:outerShdw blurRad="63500" dist="38099" dir="2700000" algn="ctr" rotWithShape="0">
                     <a:srgbClr val="000000">
@@ -14337,7 +14337,7 @@
           <a:effectLst/>
           <a:extLst>
             <a:ext uri="{909E8E84-426E-40dd-AFC4-6F175D3DCCD1}">
-              <a14:hiddenFill xmlns="" xmlns:a14="http://schemas.microsoft.com/office/drawing/2010/main">
+              <a14:hiddenFill xmlns:a14="http://schemas.microsoft.com/office/drawing/2010/main" xmlns="">
                 <a:blipFill dpi="0" rotWithShape="0">
                   <a:blip/>
                   <a:srcRect/>
@@ -14348,7 +14348,7 @@
               </a14:hiddenFill>
             </a:ext>
             <a:ext uri="{91240B29-F687-4f45-9708-019B960494DF}">
-              <a14:hiddenLine xmlns="" xmlns:a14="http://schemas.microsoft.com/office/drawing/2010/main" w="9525">
+              <a14:hiddenLine xmlns:a14="http://schemas.microsoft.com/office/drawing/2010/main" xmlns="" w="9525">
                 <a:solidFill>
                   <a:srgbClr val="000000"/>
                 </a:solidFill>
@@ -14358,7 +14358,7 @@
               </a14:hiddenLine>
             </a:ext>
             <a:ext uri="{AF507438-7753-43e0-B8FC-AC1667EBCBE1}">
-              <a14:hiddenEffects xmlns="" xmlns:a14="http://schemas.microsoft.com/office/drawing/2010/main">
+              <a14:hiddenEffects xmlns:a14="http://schemas.microsoft.com/office/drawing/2010/main" xmlns="">
                 <a:effectLst>
                   <a:outerShdw blurRad="63500" dist="38099" dir="2700000" algn="ctr" rotWithShape="0">
                     <a:srgbClr val="000000">
@@ -16223,7 +16223,7 @@
           <a:effectLst/>
           <a:extLst>
             <a:ext uri="{909E8E84-426E-40dd-AFC4-6F175D3DCCD1}">
-              <a14:hiddenFill xmlns:a14="http://schemas.microsoft.com/office/drawing/2010/main" xmlns="">
+              <a14:hiddenFill xmlns="" xmlns:a14="http://schemas.microsoft.com/office/drawing/2010/main">
                 <a:blipFill dpi="0" rotWithShape="0">
                   <a:blip/>
                   <a:srcRect/>
@@ -16234,7 +16234,7 @@
               </a14:hiddenFill>
             </a:ext>
             <a:ext uri="{91240B29-F687-4f45-9708-019B960494DF}">
-              <a14:hiddenLine xmlns:a14="http://schemas.microsoft.com/office/drawing/2010/main" xmlns="" w="9525">
+              <a14:hiddenLine xmlns="" xmlns:a14="http://schemas.microsoft.com/office/drawing/2010/main" w="9525">
                 <a:solidFill>
                   <a:srgbClr val="000000"/>
                 </a:solidFill>
@@ -16244,7 +16244,7 @@
               </a14:hiddenLine>
             </a:ext>
             <a:ext uri="{AF507438-7753-43e0-B8FC-AC1667EBCBE1}">
-              <a14:hiddenEffects xmlns:a14="http://schemas.microsoft.com/office/drawing/2010/main" xmlns="">
+              <a14:hiddenEffects xmlns="" xmlns:a14="http://schemas.microsoft.com/office/drawing/2010/main">
                 <a:effectLst>
                   <a:outerShdw blurRad="63500" dist="38099" dir="2700000" algn="ctr" rotWithShape="0">
                     <a:srgbClr val="000000">
@@ -16404,7 +16404,7 @@
           <a:effectLst/>
           <a:extLst>
             <a:ext uri="{909E8E84-426E-40dd-AFC4-6F175D3DCCD1}">
-              <a14:hiddenFill xmlns:a14="http://schemas.microsoft.com/office/drawing/2010/main" xmlns="">
+              <a14:hiddenFill xmlns="" xmlns:a14="http://schemas.microsoft.com/office/drawing/2010/main">
                 <a:blipFill dpi="0" rotWithShape="0">
                   <a:blip/>
                   <a:srcRect/>
@@ -16415,7 +16415,7 @@
               </a14:hiddenFill>
             </a:ext>
             <a:ext uri="{91240B29-F687-4f45-9708-019B960494DF}">
-              <a14:hiddenLine xmlns:a14="http://schemas.microsoft.com/office/drawing/2010/main" xmlns="" w="9525">
+              <a14:hiddenLine xmlns="" xmlns:a14="http://schemas.microsoft.com/office/drawing/2010/main" w="9525">
                 <a:solidFill>
                   <a:srgbClr val="000000"/>
                 </a:solidFill>
@@ -16425,7 +16425,7 @@
               </a14:hiddenLine>
             </a:ext>
             <a:ext uri="{AF507438-7753-43e0-B8FC-AC1667EBCBE1}">
-              <a14:hiddenEffects xmlns:a14="http://schemas.microsoft.com/office/drawing/2010/main" xmlns="">
+              <a14:hiddenEffects xmlns="" xmlns:a14="http://schemas.microsoft.com/office/drawing/2010/main">
                 <a:effectLst>
                   <a:outerShdw blurRad="63500" dist="38099" dir="2700000" algn="ctr" rotWithShape="0">
                     <a:srgbClr val="000000">
@@ -18224,7 +18224,7 @@
           <a:effectLst/>
           <a:extLst>
             <a:ext uri="{909E8E84-426E-40dd-AFC4-6F175D3DCCD1}">
-              <a14:hiddenFill xmlns:a14="http://schemas.microsoft.com/office/drawing/2010/main" xmlns="">
+              <a14:hiddenFill xmlns="" xmlns:a14="http://schemas.microsoft.com/office/drawing/2010/main">
                 <a:blipFill dpi="0" rotWithShape="0">
                   <a:blip/>
                   <a:srcRect/>
@@ -18235,7 +18235,7 @@
               </a14:hiddenFill>
             </a:ext>
             <a:ext uri="{91240B29-F687-4f45-9708-019B960494DF}">
-              <a14:hiddenLine xmlns:a14="http://schemas.microsoft.com/office/drawing/2010/main" xmlns="" w="9525">
+              <a14:hiddenLine xmlns="" xmlns:a14="http://schemas.microsoft.com/office/drawing/2010/main" w="9525">
                 <a:solidFill>
                   <a:srgbClr val="000000"/>
                 </a:solidFill>
@@ -18245,7 +18245,7 @@
               </a14:hiddenLine>
             </a:ext>
             <a:ext uri="{AF507438-7753-43e0-B8FC-AC1667EBCBE1}">
-              <a14:hiddenEffects xmlns:a14="http://schemas.microsoft.com/office/drawing/2010/main" xmlns="">
+              <a14:hiddenEffects xmlns="" xmlns:a14="http://schemas.microsoft.com/office/drawing/2010/main">
                 <a:effectLst>
                   <a:outerShdw blurRad="63500" dist="38099" dir="2700000" algn="ctr" rotWithShape="0">
                     <a:srgbClr val="000000">
@@ -18338,7 +18338,7 @@
           <a:effectLst/>
           <a:extLst>
             <a:ext uri="{909E8E84-426E-40dd-AFC4-6F175D3DCCD1}">
-              <a14:hiddenFill xmlns:a14="http://schemas.microsoft.com/office/drawing/2010/main" xmlns="">
+              <a14:hiddenFill xmlns="" xmlns:a14="http://schemas.microsoft.com/office/drawing/2010/main">
                 <a:blipFill dpi="0" rotWithShape="0">
                   <a:blip/>
                   <a:srcRect/>
@@ -18349,7 +18349,7 @@
               </a14:hiddenFill>
             </a:ext>
             <a:ext uri="{91240B29-F687-4f45-9708-019B960494DF}">
-              <a14:hiddenLine xmlns:a14="http://schemas.microsoft.com/office/drawing/2010/main" xmlns="" w="9525">
+              <a14:hiddenLine xmlns="" xmlns:a14="http://schemas.microsoft.com/office/drawing/2010/main" w="9525">
                 <a:solidFill>
                   <a:srgbClr val="000000"/>
                 </a:solidFill>
@@ -18359,7 +18359,7 @@
               </a14:hiddenLine>
             </a:ext>
             <a:ext uri="{AF507438-7753-43e0-B8FC-AC1667EBCBE1}">
-              <a14:hiddenEffects xmlns:a14="http://schemas.microsoft.com/office/drawing/2010/main" xmlns="">
+              <a14:hiddenEffects xmlns="" xmlns:a14="http://schemas.microsoft.com/office/drawing/2010/main">
                 <a:effectLst>
                   <a:outerShdw blurRad="63500" dist="38099" dir="2700000" algn="ctr" rotWithShape="0">
                     <a:srgbClr val="000000">
@@ -21231,7 +21231,7 @@
           <a:effectLst/>
           <a:extLst>
             <a:ext uri="{909E8E84-426E-40dd-AFC4-6F175D3DCCD1}">
-              <a14:hiddenFill xmlns:a14="http://schemas.microsoft.com/office/drawing/2010/main" xmlns="">
+              <a14:hiddenFill xmlns="" xmlns:a14="http://schemas.microsoft.com/office/drawing/2010/main">
                 <a:blipFill dpi="0" rotWithShape="0">
                   <a:blip/>
                   <a:srcRect/>
@@ -21242,7 +21242,7 @@
               </a14:hiddenFill>
             </a:ext>
             <a:ext uri="{91240B29-F687-4f45-9708-019B960494DF}">
-              <a14:hiddenLine xmlns:a14="http://schemas.microsoft.com/office/drawing/2010/main" xmlns="" w="9525">
+              <a14:hiddenLine xmlns="" xmlns:a14="http://schemas.microsoft.com/office/drawing/2010/main" w="9525">
                 <a:solidFill>
                   <a:srgbClr val="000000"/>
                 </a:solidFill>
@@ -21252,7 +21252,7 @@
               </a14:hiddenLine>
             </a:ext>
             <a:ext uri="{AF507438-7753-43e0-B8FC-AC1667EBCBE1}">
-              <a14:hiddenEffects xmlns:a14="http://schemas.microsoft.com/office/drawing/2010/main" xmlns="">
+              <a14:hiddenEffects xmlns="" xmlns:a14="http://schemas.microsoft.com/office/drawing/2010/main">
                 <a:effectLst>
                   <a:outerShdw blurRad="63500" dist="38099" dir="2700000" algn="ctr" rotWithShape="0">
                     <a:srgbClr val="000000">
@@ -21331,7 +21331,7 @@
           <a:effectLst/>
           <a:extLst>
             <a:ext uri="{909E8E84-426E-40dd-AFC4-6F175D3DCCD1}">
-              <a14:hiddenFill xmlns:a14="http://schemas.microsoft.com/office/drawing/2010/main" xmlns="">
+              <a14:hiddenFill xmlns="" xmlns:a14="http://schemas.microsoft.com/office/drawing/2010/main">
                 <a:blipFill dpi="0" rotWithShape="0">
                   <a:blip/>
                   <a:srcRect/>
@@ -21342,7 +21342,7 @@
               </a14:hiddenFill>
             </a:ext>
             <a:ext uri="{91240B29-F687-4f45-9708-019B960494DF}">
-              <a14:hiddenLine xmlns:a14="http://schemas.microsoft.com/office/drawing/2010/main" xmlns="" w="9525">
+              <a14:hiddenLine xmlns="" xmlns:a14="http://schemas.microsoft.com/office/drawing/2010/main" w="9525">
                 <a:solidFill>
                   <a:srgbClr val="000000"/>
                 </a:solidFill>
@@ -21352,7 +21352,7 @@
               </a14:hiddenLine>
             </a:ext>
             <a:ext uri="{AF507438-7753-43e0-B8FC-AC1667EBCBE1}">
-              <a14:hiddenEffects xmlns:a14="http://schemas.microsoft.com/office/drawing/2010/main" xmlns="">
+              <a14:hiddenEffects xmlns="" xmlns:a14="http://schemas.microsoft.com/office/drawing/2010/main">
                 <a:effectLst>
                   <a:outerShdw blurRad="63500" dist="38099" dir="2700000" algn="ctr" rotWithShape="0">
                     <a:srgbClr val="000000">
@@ -22935,7 +22935,7 @@
           <a:effectLst/>
           <a:extLst>
             <a:ext uri="{909E8E84-426E-40dd-AFC4-6F175D3DCCD1}">
-              <a14:hiddenFill xmlns:a14="http://schemas.microsoft.com/office/drawing/2010/main" xmlns="">
+              <a14:hiddenFill xmlns="" xmlns:a14="http://schemas.microsoft.com/office/drawing/2010/main">
                 <a:blipFill dpi="0" rotWithShape="0">
                   <a:blip/>
                   <a:srcRect/>
@@ -22946,7 +22946,7 @@
               </a14:hiddenFill>
             </a:ext>
             <a:ext uri="{91240B29-F687-4f45-9708-019B960494DF}">
-              <a14:hiddenLine xmlns:a14="http://schemas.microsoft.com/office/drawing/2010/main" xmlns="" w="9525">
+              <a14:hiddenLine xmlns="" xmlns:a14="http://schemas.microsoft.com/office/drawing/2010/main" w="9525">
                 <a:solidFill>
                   <a:srgbClr val="000000"/>
                 </a:solidFill>
@@ -22956,7 +22956,7 @@
               </a14:hiddenLine>
             </a:ext>
             <a:ext uri="{AF507438-7753-43e0-B8FC-AC1667EBCBE1}">
-              <a14:hiddenEffects xmlns:a14="http://schemas.microsoft.com/office/drawing/2010/main" xmlns="">
+              <a14:hiddenEffects xmlns="" xmlns:a14="http://schemas.microsoft.com/office/drawing/2010/main">
                 <a:effectLst>
                   <a:outerShdw blurRad="63500" dist="38099" dir="2700000" algn="ctr" rotWithShape="0">
                     <a:srgbClr val="000000">
@@ -24604,7 +24604,7 @@
           <a:effectLst/>
           <a:extLst>
             <a:ext uri="{909E8E84-426E-40dd-AFC4-6F175D3DCCD1}">
-              <a14:hiddenFill xmlns:a14="http://schemas.microsoft.com/office/drawing/2010/main" xmlns="">
+              <a14:hiddenFill xmlns="" xmlns:a14="http://schemas.microsoft.com/office/drawing/2010/main">
                 <a:blipFill dpi="0" rotWithShape="0">
                   <a:blip/>
                   <a:srcRect/>
@@ -24615,7 +24615,7 @@
               </a14:hiddenFill>
             </a:ext>
             <a:ext uri="{91240B29-F687-4f45-9708-019B960494DF}">
-              <a14:hiddenLine xmlns:a14="http://schemas.microsoft.com/office/drawing/2010/main" xmlns="" w="9525">
+              <a14:hiddenLine xmlns="" xmlns:a14="http://schemas.microsoft.com/office/drawing/2010/main" w="9525">
                 <a:solidFill>
                   <a:srgbClr val="000000"/>
                 </a:solidFill>
@@ -24625,7 +24625,7 @@
               </a14:hiddenLine>
             </a:ext>
             <a:ext uri="{AF507438-7753-43e0-B8FC-AC1667EBCBE1}">
-              <a14:hiddenEffects xmlns:a14="http://schemas.microsoft.com/office/drawing/2010/main" xmlns="">
+              <a14:hiddenEffects xmlns="" xmlns:a14="http://schemas.microsoft.com/office/drawing/2010/main">
                 <a:effectLst>
                   <a:outerShdw blurRad="63500" dist="38099" dir="2700000" algn="ctr" rotWithShape="0">
                     <a:srgbClr val="000000">
@@ -25987,7 +25987,7 @@
           <a:effectLst/>
           <a:extLst>
             <a:ext uri="{909E8E84-426E-40dd-AFC4-6F175D3DCCD1}">
-              <a14:hiddenFill xmlns:a14="http://schemas.microsoft.com/office/drawing/2010/main" xmlns="">
+              <a14:hiddenFill xmlns="" xmlns:a14="http://schemas.microsoft.com/office/drawing/2010/main">
                 <a:blipFill dpi="0" rotWithShape="0">
                   <a:blip/>
                   <a:srcRect/>
@@ -25998,7 +25998,7 @@
               </a14:hiddenFill>
             </a:ext>
             <a:ext uri="{91240B29-F687-4f45-9708-019B960494DF}">
-              <a14:hiddenLine xmlns:a14="http://schemas.microsoft.com/office/drawing/2010/main" xmlns="" w="9525">
+              <a14:hiddenLine xmlns="" xmlns:a14="http://schemas.microsoft.com/office/drawing/2010/main" w="9525">
                 <a:solidFill>
                   <a:srgbClr val="000000"/>
                 </a:solidFill>
@@ -26008,7 +26008,7 @@
               </a14:hiddenLine>
             </a:ext>
             <a:ext uri="{AF507438-7753-43e0-B8FC-AC1667EBCBE1}">
-              <a14:hiddenEffects xmlns:a14="http://schemas.microsoft.com/office/drawing/2010/main" xmlns="">
+              <a14:hiddenEffects xmlns="" xmlns:a14="http://schemas.microsoft.com/office/drawing/2010/main">
                 <a:effectLst>
                   <a:outerShdw blurRad="63500" dist="38099" dir="2700000" algn="ctr" rotWithShape="0">
                     <a:srgbClr val="000000">
@@ -26139,7 +26139,7 @@
           <a:effectLst/>
           <a:extLst>
             <a:ext uri="{909E8E84-426E-40dd-AFC4-6F175D3DCCD1}">
-              <a14:hiddenFill xmlns:a14="http://schemas.microsoft.com/office/drawing/2010/main" xmlns="">
+              <a14:hiddenFill xmlns="" xmlns:a14="http://schemas.microsoft.com/office/drawing/2010/main">
                 <a:blipFill dpi="0" rotWithShape="0">
                   <a:blip/>
                   <a:srcRect/>
@@ -26150,7 +26150,7 @@
               </a14:hiddenFill>
             </a:ext>
             <a:ext uri="{91240B29-F687-4f45-9708-019B960494DF}">
-              <a14:hiddenLine xmlns:a14="http://schemas.microsoft.com/office/drawing/2010/main" xmlns="" w="9525">
+              <a14:hiddenLine xmlns="" xmlns:a14="http://schemas.microsoft.com/office/drawing/2010/main" w="9525">
                 <a:solidFill>
                   <a:srgbClr val="000000"/>
                 </a:solidFill>
@@ -26160,7 +26160,7 @@
               </a14:hiddenLine>
             </a:ext>
             <a:ext uri="{AF507438-7753-43e0-B8FC-AC1667EBCBE1}">
-              <a14:hiddenEffects xmlns:a14="http://schemas.microsoft.com/office/drawing/2010/main" xmlns="">
+              <a14:hiddenEffects xmlns="" xmlns:a14="http://schemas.microsoft.com/office/drawing/2010/main">
                 <a:effectLst>
                   <a:outerShdw blurRad="63500" dist="38099" dir="2700000" algn="ctr" rotWithShape="0">
                     <a:srgbClr val="000000">
@@ -33862,7 +33862,7 @@
           <a:effectLst/>
           <a:extLst>
             <a:ext uri="{909E8E84-426E-40dd-AFC4-6F175D3DCCD1}">
-              <a14:hiddenFill xmlns="" xmlns:a14="http://schemas.microsoft.com/office/drawing/2010/main">
+              <a14:hiddenFill xmlns:a14="http://schemas.microsoft.com/office/drawing/2010/main" xmlns="">
                 <a:blipFill dpi="0" rotWithShape="0">
                   <a:blip/>
                   <a:srcRect/>
@@ -33873,7 +33873,7 @@
               </a14:hiddenFill>
             </a:ext>
             <a:ext uri="{91240B29-F687-4f45-9708-019B960494DF}">
-              <a14:hiddenLine xmlns="" xmlns:a14="http://schemas.microsoft.com/office/drawing/2010/main" w="9525">
+              <a14:hiddenLine xmlns:a14="http://schemas.microsoft.com/office/drawing/2010/main" xmlns="" w="9525">
                 <a:solidFill>
                   <a:srgbClr val="000000"/>
                 </a:solidFill>
@@ -33883,7 +33883,7 @@
               </a14:hiddenLine>
             </a:ext>
             <a:ext uri="{AF507438-7753-43e0-B8FC-AC1667EBCBE1}">
-              <a14:hiddenEffects xmlns="" xmlns:a14="http://schemas.microsoft.com/office/drawing/2010/main">
+              <a14:hiddenEffects xmlns:a14="http://schemas.microsoft.com/office/drawing/2010/main" xmlns="">
                 <a:effectLst>
                   <a:outerShdw blurRad="63500" dist="38099" dir="2700000" algn="ctr" rotWithShape="0">
                     <a:srgbClr val="000000">

</xml_diff>

<commit_message>
Some more minor tweaks; 26:48
Needs to be crisper in places
</commit_message>
<xml_diff>
--- a/marple.pptx
+++ b/marple.pptx
@@ -236,7 +236,7 @@
           <a:p>
             <a:fld id="{4D1C7D58-6592-1846-B3DB-D549DDE8371F}" type="datetimeFigureOut">
               <a:rPr lang="en-US" smtClean="0"/>
-              <a:t>7/8/18</a:t>
+              <a:t>7/9/18</a:t>
             </a:fld>
             <a:endParaRPr lang="en-US"/>
           </a:p>
@@ -4532,7 +4532,7 @@
           <a:p>
             <a:fld id="{322F8514-B853-0C46-A81F-E0731AB349E8}" type="datetime1">
               <a:rPr lang="en-US" smtClean="0"/>
-              <a:t>7/8/18</a:t>
+              <a:t>7/9/18</a:t>
             </a:fld>
             <a:endParaRPr lang="en-US"/>
           </a:p>
@@ -4700,7 +4700,7 @@
           <a:p>
             <a:fld id="{23C5F1DA-22DA-D940-A217-FFBE15E0DDE8}" type="datetime1">
               <a:rPr lang="en-US" smtClean="0"/>
-              <a:t>7/8/18</a:t>
+              <a:t>7/9/18</a:t>
             </a:fld>
             <a:endParaRPr lang="en-US"/>
           </a:p>
@@ -4878,7 +4878,7 @@
           <a:p>
             <a:fld id="{1A558203-445F-D64D-B862-54D95728A44C}" type="datetime1">
               <a:rPr lang="en-US" smtClean="0"/>
-              <a:t>7/8/18</a:t>
+              <a:t>7/9/18</a:t>
             </a:fld>
             <a:endParaRPr lang="en-US"/>
           </a:p>
@@ -5050,7 +5050,7 @@
           <a:p>
             <a:fld id="{A94C3D64-A7CF-E345-8135-82052729E57F}" type="datetime1">
               <a:rPr lang="en-US" smtClean="0"/>
-              <a:t>7/8/18</a:t>
+              <a:t>7/9/18</a:t>
             </a:fld>
             <a:endParaRPr lang="en-US"/>
           </a:p>
@@ -5295,7 +5295,7 @@
           <a:p>
             <a:fld id="{A2360604-B943-F842-B0A2-A9270375B0F4}" type="datetime1">
               <a:rPr lang="en-US" smtClean="0"/>
-              <a:t>7/8/18</a:t>
+              <a:t>7/9/18</a:t>
             </a:fld>
             <a:endParaRPr lang="en-US"/>
           </a:p>
@@ -5524,7 +5524,7 @@
           <a:p>
             <a:fld id="{E98D8315-B472-DE40-9FE5-5E88F15B417F}" type="datetime1">
               <a:rPr lang="en-US" smtClean="0"/>
-              <a:t>7/8/18</a:t>
+              <a:t>7/9/18</a:t>
             </a:fld>
             <a:endParaRPr lang="en-US"/>
           </a:p>
@@ -5888,7 +5888,7 @@
           <a:p>
             <a:fld id="{A67FB5DB-6186-5241-90BB-5F644CFF2E1A}" type="datetime1">
               <a:rPr lang="en-US" smtClean="0"/>
-              <a:t>7/8/18</a:t>
+              <a:t>7/9/18</a:t>
             </a:fld>
             <a:endParaRPr lang="en-US"/>
           </a:p>
@@ -6005,7 +6005,7 @@
           <a:p>
             <a:fld id="{EDF6AEAB-0CFD-5744-A7B0-E3AD8533E672}" type="datetime1">
               <a:rPr lang="en-US" smtClean="0"/>
-              <a:t>7/8/18</a:t>
+              <a:t>7/9/18</a:t>
             </a:fld>
             <a:endParaRPr lang="en-US"/>
           </a:p>
@@ -6100,7 +6100,7 @@
           <a:p>
             <a:fld id="{0FF14B85-2279-734D-A5F8-F7888835E992}" type="datetime1">
               <a:rPr lang="en-US" smtClean="0"/>
-              <a:t>7/8/18</a:t>
+              <a:t>7/9/18</a:t>
             </a:fld>
             <a:endParaRPr lang="en-US"/>
           </a:p>
@@ -6375,7 +6375,7 @@
           <a:p>
             <a:fld id="{A95E9814-BD68-6C42-A851-02A28615CD15}" type="datetime1">
               <a:rPr lang="en-US" smtClean="0"/>
-              <a:t>7/8/18</a:t>
+              <a:t>7/9/18</a:t>
             </a:fld>
             <a:endParaRPr lang="en-US"/>
           </a:p>
@@ -6627,7 +6627,7 @@
           <a:p>
             <a:fld id="{DC1B7620-F13D-D84C-9B55-138232F1E6E3}" type="datetime1">
               <a:rPr lang="en-US" smtClean="0"/>
-              <a:t>7/8/18</a:t>
+              <a:t>7/9/18</a:t>
             </a:fld>
             <a:endParaRPr lang="en-US"/>
           </a:p>
@@ -6838,7 +6838,7 @@
           <a:p>
             <a:fld id="{85935A7D-0949-144C-9583-9EA17A42DAAD}" type="datetime1">
               <a:rPr lang="en-US" smtClean="0"/>
-              <a:t>7/8/18</a:t>
+              <a:t>7/9/18</a:t>
             </a:fld>
             <a:endParaRPr lang="en-US"/>
           </a:p>
@@ -12190,7 +12190,7 @@
           <a:effectLst/>
           <a:extLst>
             <a:ext uri="{909E8E84-426E-40dd-AFC4-6F175D3DCCD1}">
-              <a14:hiddenFill xmlns:a14="http://schemas.microsoft.com/office/drawing/2010/main" xmlns="">
+              <a14:hiddenFill xmlns="" xmlns:a14="http://schemas.microsoft.com/office/drawing/2010/main">
                 <a:blipFill dpi="0" rotWithShape="0">
                   <a:blip/>
                   <a:srcRect/>
@@ -12201,7 +12201,7 @@
               </a14:hiddenFill>
             </a:ext>
             <a:ext uri="{91240B29-F687-4f45-9708-019B960494DF}">
-              <a14:hiddenLine xmlns:a14="http://schemas.microsoft.com/office/drawing/2010/main" xmlns="" w="9525">
+              <a14:hiddenLine xmlns="" xmlns:a14="http://schemas.microsoft.com/office/drawing/2010/main" w="9525">
                 <a:solidFill>
                   <a:srgbClr val="000000"/>
                 </a:solidFill>
@@ -12211,7 +12211,7 @@
               </a14:hiddenLine>
             </a:ext>
             <a:ext uri="{AF507438-7753-43e0-B8FC-AC1667EBCBE1}">
-              <a14:hiddenEffects xmlns:a14="http://schemas.microsoft.com/office/drawing/2010/main" xmlns="">
+              <a14:hiddenEffects xmlns="" xmlns:a14="http://schemas.microsoft.com/office/drawing/2010/main">
                 <a:effectLst>
                   <a:outerShdw blurRad="63500" dist="38099" dir="2700000" algn="ctr" rotWithShape="0">
                     <a:srgbClr val="000000">
@@ -12260,7 +12260,7 @@
           <a:effectLst/>
           <a:extLst>
             <a:ext uri="{909E8E84-426E-40dd-AFC4-6F175D3DCCD1}">
-              <a14:hiddenFill xmlns:a14="http://schemas.microsoft.com/office/drawing/2010/main" xmlns="">
+              <a14:hiddenFill xmlns="" xmlns:a14="http://schemas.microsoft.com/office/drawing/2010/main">
                 <a:blipFill dpi="0" rotWithShape="0">
                   <a:blip/>
                   <a:srcRect/>
@@ -12271,7 +12271,7 @@
               </a14:hiddenFill>
             </a:ext>
             <a:ext uri="{91240B29-F687-4f45-9708-019B960494DF}">
-              <a14:hiddenLine xmlns:a14="http://schemas.microsoft.com/office/drawing/2010/main" xmlns="" w="9525">
+              <a14:hiddenLine xmlns="" xmlns:a14="http://schemas.microsoft.com/office/drawing/2010/main" w="9525">
                 <a:solidFill>
                   <a:srgbClr val="000000"/>
                 </a:solidFill>
@@ -12281,7 +12281,7 @@
               </a14:hiddenLine>
             </a:ext>
             <a:ext uri="{AF507438-7753-43e0-B8FC-AC1667EBCBE1}">
-              <a14:hiddenEffects xmlns:a14="http://schemas.microsoft.com/office/drawing/2010/main" xmlns="">
+              <a14:hiddenEffects xmlns="" xmlns:a14="http://schemas.microsoft.com/office/drawing/2010/main">
                 <a:effectLst>
                   <a:outerShdw blurRad="63500" dist="38099" dir="2700000" algn="ctr" rotWithShape="0">
                     <a:srgbClr val="000000">
@@ -12416,7 +12416,7 @@
             <a:effectLst/>
             <a:extLst>
               <a:ext uri="{909E8E84-426E-40dd-AFC4-6F175D3DCCD1}">
-                <a14:hiddenFill xmlns="" xmlns:a14="http://schemas.microsoft.com/office/drawing/2010/main">
+                <a14:hiddenFill xmlns:a14="http://schemas.microsoft.com/office/drawing/2010/main" xmlns="">
                   <a:blipFill dpi="0" rotWithShape="0">
                     <a:blip/>
                     <a:srcRect/>
@@ -12427,7 +12427,7 @@
                 </a14:hiddenFill>
               </a:ext>
               <a:ext uri="{91240B29-F687-4f45-9708-019B960494DF}">
-                <a14:hiddenLine xmlns="" xmlns:a14="http://schemas.microsoft.com/office/drawing/2010/main" w="9525">
+                <a14:hiddenLine xmlns:a14="http://schemas.microsoft.com/office/drawing/2010/main" xmlns="" w="9525">
                   <a:solidFill>
                     <a:srgbClr val="000000"/>
                   </a:solidFill>
@@ -12437,7 +12437,7 @@
                 </a14:hiddenLine>
               </a:ext>
               <a:ext uri="{AF507438-7753-43e0-B8FC-AC1667EBCBE1}">
-                <a14:hiddenEffects xmlns="" xmlns:a14="http://schemas.microsoft.com/office/drawing/2010/main">
+                <a14:hiddenEffects xmlns:a14="http://schemas.microsoft.com/office/drawing/2010/main" xmlns="">
                   <a:effectLst>
                     <a:outerShdw blurRad="63500" dist="38099" dir="2700000" algn="ctr" rotWithShape="0">
                       <a:srgbClr val="000000">
@@ -12486,7 +12486,7 @@
             <a:effectLst/>
             <a:extLst>
               <a:ext uri="{909E8E84-426E-40dd-AFC4-6F175D3DCCD1}">
-                <a14:hiddenFill xmlns="" xmlns:a14="http://schemas.microsoft.com/office/drawing/2010/main">
+                <a14:hiddenFill xmlns:a14="http://schemas.microsoft.com/office/drawing/2010/main" xmlns="">
                   <a:blipFill dpi="0" rotWithShape="0">
                     <a:blip/>
                     <a:srcRect/>
@@ -12497,7 +12497,7 @@
                 </a14:hiddenFill>
               </a:ext>
               <a:ext uri="{91240B29-F687-4f45-9708-019B960494DF}">
-                <a14:hiddenLine xmlns="" xmlns:a14="http://schemas.microsoft.com/office/drawing/2010/main" w="9525">
+                <a14:hiddenLine xmlns:a14="http://schemas.microsoft.com/office/drawing/2010/main" xmlns="" w="9525">
                   <a:solidFill>
                     <a:srgbClr val="000000"/>
                   </a:solidFill>
@@ -12507,7 +12507,7 @@
                 </a14:hiddenLine>
               </a:ext>
               <a:ext uri="{AF507438-7753-43e0-B8FC-AC1667EBCBE1}">
-                <a14:hiddenEffects xmlns="" xmlns:a14="http://schemas.microsoft.com/office/drawing/2010/main">
+                <a14:hiddenEffects xmlns:a14="http://schemas.microsoft.com/office/drawing/2010/main" xmlns="">
                   <a:effectLst>
                     <a:outerShdw blurRad="63500" dist="38099" dir="2700000" algn="ctr" rotWithShape="0">
                       <a:srgbClr val="000000">
@@ -12556,7 +12556,7 @@
             <a:effectLst/>
             <a:extLst>
               <a:ext uri="{909E8E84-426E-40dd-AFC4-6F175D3DCCD1}">
-                <a14:hiddenFill xmlns="" xmlns:a14="http://schemas.microsoft.com/office/drawing/2010/main">
+                <a14:hiddenFill xmlns:a14="http://schemas.microsoft.com/office/drawing/2010/main" xmlns="">
                   <a:blipFill dpi="0" rotWithShape="0">
                     <a:blip/>
                     <a:srcRect/>
@@ -12567,7 +12567,7 @@
                 </a14:hiddenFill>
               </a:ext>
               <a:ext uri="{91240B29-F687-4f45-9708-019B960494DF}">
-                <a14:hiddenLine xmlns="" xmlns:a14="http://schemas.microsoft.com/office/drawing/2010/main" w="9525">
+                <a14:hiddenLine xmlns:a14="http://schemas.microsoft.com/office/drawing/2010/main" xmlns="" w="9525">
                   <a:solidFill>
                     <a:srgbClr val="000000"/>
                   </a:solidFill>
@@ -12577,7 +12577,7 @@
                 </a14:hiddenLine>
               </a:ext>
               <a:ext uri="{AF507438-7753-43e0-B8FC-AC1667EBCBE1}">
-                <a14:hiddenEffects xmlns="" xmlns:a14="http://schemas.microsoft.com/office/drawing/2010/main">
+                <a14:hiddenEffects xmlns:a14="http://schemas.microsoft.com/office/drawing/2010/main" xmlns="">
                   <a:effectLst>
                     <a:outerShdw blurRad="63500" dist="38099" dir="2700000" algn="ctr" rotWithShape="0">
                       <a:srgbClr val="000000">
@@ -12618,12 +12618,12 @@
             <a:effectLst/>
             <a:extLst>
               <a:ext uri="{909E8E84-426E-40dd-AFC4-6F175D3DCCD1}">
-                <a14:hiddenFill xmlns="" xmlns:a14="http://schemas.microsoft.com/office/drawing/2010/main">
+                <a14:hiddenFill xmlns:a14="http://schemas.microsoft.com/office/drawing/2010/main" xmlns="">
                   <a:noFill/>
                 </a14:hiddenFill>
               </a:ext>
               <a:ext uri="{AF507438-7753-43e0-B8FC-AC1667EBCBE1}">
-                <a14:hiddenEffects xmlns="" xmlns:a14="http://schemas.microsoft.com/office/drawing/2010/main">
+                <a14:hiddenEffects xmlns:a14="http://schemas.microsoft.com/office/drawing/2010/main" xmlns="">
                   <a:effectLst>
                     <a:outerShdw blurRad="63500" dist="38099" dir="2700000" algn="ctr" rotWithShape="0">
                       <a:srgbClr val="000000">
@@ -12676,12 +12676,12 @@
             <a:effectLst/>
             <a:extLst>
               <a:ext uri="{909E8E84-426E-40dd-AFC4-6F175D3DCCD1}">
-                <a14:hiddenFill xmlns="" xmlns:a14="http://schemas.microsoft.com/office/drawing/2010/main">
+                <a14:hiddenFill xmlns:a14="http://schemas.microsoft.com/office/drawing/2010/main" xmlns="">
                   <a:noFill/>
                 </a14:hiddenFill>
               </a:ext>
               <a:ext uri="{AF507438-7753-43e0-B8FC-AC1667EBCBE1}">
-                <a14:hiddenEffects xmlns="" xmlns:a14="http://schemas.microsoft.com/office/drawing/2010/main">
+                <a14:hiddenEffects xmlns:a14="http://schemas.microsoft.com/office/drawing/2010/main" xmlns="">
                   <a:effectLst>
                     <a:outerShdw blurRad="63500" dist="38099" dir="2700000" algn="ctr" rotWithShape="0">
                       <a:srgbClr val="000000">
@@ -12734,12 +12734,12 @@
             <a:effectLst/>
             <a:extLst>
               <a:ext uri="{909E8E84-426E-40dd-AFC4-6F175D3DCCD1}">
-                <a14:hiddenFill xmlns="" xmlns:a14="http://schemas.microsoft.com/office/drawing/2010/main">
+                <a14:hiddenFill xmlns:a14="http://schemas.microsoft.com/office/drawing/2010/main" xmlns="">
                   <a:noFill/>
                 </a14:hiddenFill>
               </a:ext>
               <a:ext uri="{AF507438-7753-43e0-B8FC-AC1667EBCBE1}">
-                <a14:hiddenEffects xmlns="" xmlns:a14="http://schemas.microsoft.com/office/drawing/2010/main">
+                <a14:hiddenEffects xmlns:a14="http://schemas.microsoft.com/office/drawing/2010/main" xmlns="">
                   <a:effectLst>
                     <a:outerShdw blurRad="63500" dist="38099" dir="2700000" algn="ctr" rotWithShape="0">
                       <a:srgbClr val="000000">
@@ -12792,12 +12792,12 @@
             <a:effectLst/>
             <a:extLst>
               <a:ext uri="{909E8E84-426E-40dd-AFC4-6F175D3DCCD1}">
-                <a14:hiddenFill xmlns="" xmlns:a14="http://schemas.microsoft.com/office/drawing/2010/main">
+                <a14:hiddenFill xmlns:a14="http://schemas.microsoft.com/office/drawing/2010/main" xmlns="">
                   <a:noFill/>
                 </a14:hiddenFill>
               </a:ext>
               <a:ext uri="{AF507438-7753-43e0-B8FC-AC1667EBCBE1}">
-                <a14:hiddenEffects xmlns="" xmlns:a14="http://schemas.microsoft.com/office/drawing/2010/main">
+                <a14:hiddenEffects xmlns:a14="http://schemas.microsoft.com/office/drawing/2010/main" xmlns="">
                   <a:effectLst>
                     <a:outerShdw blurRad="63500" dist="38099" dir="2700000" algn="ctr" rotWithShape="0">
                       <a:srgbClr val="000000">
@@ -12850,12 +12850,12 @@
             <a:effectLst/>
             <a:extLst>
               <a:ext uri="{909E8E84-426E-40dd-AFC4-6F175D3DCCD1}">
-                <a14:hiddenFill xmlns="" xmlns:a14="http://schemas.microsoft.com/office/drawing/2010/main">
+                <a14:hiddenFill xmlns:a14="http://schemas.microsoft.com/office/drawing/2010/main" xmlns="">
                   <a:noFill/>
                 </a14:hiddenFill>
               </a:ext>
               <a:ext uri="{AF507438-7753-43e0-B8FC-AC1667EBCBE1}">
-                <a14:hiddenEffects xmlns="" xmlns:a14="http://schemas.microsoft.com/office/drawing/2010/main">
+                <a14:hiddenEffects xmlns:a14="http://schemas.microsoft.com/office/drawing/2010/main" xmlns="">
                   <a:effectLst>
                     <a:outerShdw blurRad="63500" dist="38099" dir="2700000" algn="ctr" rotWithShape="0">
                       <a:srgbClr val="000000">
@@ -12908,12 +12908,12 @@
             <a:effectLst/>
             <a:extLst>
               <a:ext uri="{909E8E84-426E-40dd-AFC4-6F175D3DCCD1}">
-                <a14:hiddenFill xmlns="" xmlns:a14="http://schemas.microsoft.com/office/drawing/2010/main">
+                <a14:hiddenFill xmlns:a14="http://schemas.microsoft.com/office/drawing/2010/main" xmlns="">
                   <a:noFill/>
                 </a14:hiddenFill>
               </a:ext>
               <a:ext uri="{AF507438-7753-43e0-B8FC-AC1667EBCBE1}">
-                <a14:hiddenEffects xmlns="" xmlns:a14="http://schemas.microsoft.com/office/drawing/2010/main">
+                <a14:hiddenEffects xmlns:a14="http://schemas.microsoft.com/office/drawing/2010/main" xmlns="">
                   <a:effectLst>
                     <a:outerShdw blurRad="63500" dist="38099" dir="2700000" algn="ctr" rotWithShape="0">
                       <a:srgbClr val="000000">
@@ -12966,12 +12966,12 @@
             <a:effectLst/>
             <a:extLst>
               <a:ext uri="{909E8E84-426E-40dd-AFC4-6F175D3DCCD1}">
-                <a14:hiddenFill xmlns="" xmlns:a14="http://schemas.microsoft.com/office/drawing/2010/main">
+                <a14:hiddenFill xmlns:a14="http://schemas.microsoft.com/office/drawing/2010/main" xmlns="">
                   <a:noFill/>
                 </a14:hiddenFill>
               </a:ext>
               <a:ext uri="{AF507438-7753-43e0-B8FC-AC1667EBCBE1}">
-                <a14:hiddenEffects xmlns="" xmlns:a14="http://schemas.microsoft.com/office/drawing/2010/main">
+                <a14:hiddenEffects xmlns:a14="http://schemas.microsoft.com/office/drawing/2010/main" xmlns="">
                   <a:effectLst>
                     <a:outerShdw blurRad="63500" dist="38099" dir="2700000" algn="ctr" rotWithShape="0">
                       <a:srgbClr val="000000">
@@ -13024,12 +13024,12 @@
             <a:effectLst/>
             <a:extLst>
               <a:ext uri="{909E8E84-426E-40dd-AFC4-6F175D3DCCD1}">
-                <a14:hiddenFill xmlns="" xmlns:a14="http://schemas.microsoft.com/office/drawing/2010/main">
+                <a14:hiddenFill xmlns:a14="http://schemas.microsoft.com/office/drawing/2010/main" xmlns="">
                   <a:noFill/>
                 </a14:hiddenFill>
               </a:ext>
               <a:ext uri="{AF507438-7753-43e0-B8FC-AC1667EBCBE1}">
-                <a14:hiddenEffects xmlns="" xmlns:a14="http://schemas.microsoft.com/office/drawing/2010/main">
+                <a14:hiddenEffects xmlns:a14="http://schemas.microsoft.com/office/drawing/2010/main" xmlns="">
                   <a:effectLst>
                     <a:outerShdw blurRad="63500" dist="38099" dir="2700000" algn="ctr" rotWithShape="0">
                       <a:srgbClr val="000000">
@@ -13082,12 +13082,12 @@
             <a:effectLst/>
             <a:extLst>
               <a:ext uri="{909E8E84-426E-40dd-AFC4-6F175D3DCCD1}">
-                <a14:hiddenFill xmlns="" xmlns:a14="http://schemas.microsoft.com/office/drawing/2010/main">
+                <a14:hiddenFill xmlns:a14="http://schemas.microsoft.com/office/drawing/2010/main" xmlns="">
                   <a:noFill/>
                 </a14:hiddenFill>
               </a:ext>
               <a:ext uri="{AF507438-7753-43e0-B8FC-AC1667EBCBE1}">
-                <a14:hiddenEffects xmlns="" xmlns:a14="http://schemas.microsoft.com/office/drawing/2010/main">
+                <a14:hiddenEffects xmlns:a14="http://schemas.microsoft.com/office/drawing/2010/main" xmlns="">
                   <a:effectLst>
                     <a:outerShdw blurRad="63500" dist="38099" dir="2700000" algn="ctr" rotWithShape="0">
                       <a:srgbClr val="000000">
@@ -13140,12 +13140,12 @@
             <a:effectLst/>
             <a:extLst>
               <a:ext uri="{909E8E84-426E-40dd-AFC4-6F175D3DCCD1}">
-                <a14:hiddenFill xmlns="" xmlns:a14="http://schemas.microsoft.com/office/drawing/2010/main">
+                <a14:hiddenFill xmlns:a14="http://schemas.microsoft.com/office/drawing/2010/main" xmlns="">
                   <a:noFill/>
                 </a14:hiddenFill>
               </a:ext>
               <a:ext uri="{AF507438-7753-43e0-B8FC-AC1667EBCBE1}">
-                <a14:hiddenEffects xmlns="" xmlns:a14="http://schemas.microsoft.com/office/drawing/2010/main">
+                <a14:hiddenEffects xmlns:a14="http://schemas.microsoft.com/office/drawing/2010/main" xmlns="">
                   <a:effectLst>
                     <a:outerShdw blurRad="63500" dist="38099" dir="2700000" algn="ctr" rotWithShape="0">
                       <a:srgbClr val="000000">
@@ -13206,7 +13206,7 @@
             <a:effectLst/>
             <a:extLst>
               <a:ext uri="{909E8E84-426E-40dd-AFC4-6F175D3DCCD1}">
-                <a14:hiddenFill xmlns="" xmlns:a14="http://schemas.microsoft.com/office/drawing/2010/main">
+                <a14:hiddenFill xmlns:a14="http://schemas.microsoft.com/office/drawing/2010/main" xmlns="">
                   <a:blipFill dpi="0" rotWithShape="0">
                     <a:blip/>
                     <a:srcRect/>
@@ -13217,7 +13217,7 @@
                 </a14:hiddenFill>
               </a:ext>
               <a:ext uri="{91240B29-F687-4f45-9708-019B960494DF}">
-                <a14:hiddenLine xmlns="" xmlns:a14="http://schemas.microsoft.com/office/drawing/2010/main" w="9525">
+                <a14:hiddenLine xmlns:a14="http://schemas.microsoft.com/office/drawing/2010/main" xmlns="" w="9525">
                   <a:solidFill>
                     <a:srgbClr val="000000"/>
                   </a:solidFill>
@@ -13227,7 +13227,7 @@
                 </a14:hiddenLine>
               </a:ext>
               <a:ext uri="{AF507438-7753-43e0-B8FC-AC1667EBCBE1}">
-                <a14:hiddenEffects xmlns="" xmlns:a14="http://schemas.microsoft.com/office/drawing/2010/main">
+                <a14:hiddenEffects xmlns:a14="http://schemas.microsoft.com/office/drawing/2010/main" xmlns="">
                   <a:effectLst>
                     <a:outerShdw blurRad="63500" dist="38099" dir="2700000" algn="ctr" rotWithShape="0">
                       <a:srgbClr val="000000">
@@ -13276,7 +13276,7 @@
             <a:effectLst/>
             <a:extLst>
               <a:ext uri="{909E8E84-426E-40dd-AFC4-6F175D3DCCD1}">
-                <a14:hiddenFill xmlns="" xmlns:a14="http://schemas.microsoft.com/office/drawing/2010/main">
+                <a14:hiddenFill xmlns:a14="http://schemas.microsoft.com/office/drawing/2010/main" xmlns="">
                   <a:blipFill dpi="0" rotWithShape="0">
                     <a:blip/>
                     <a:srcRect/>
@@ -13287,7 +13287,7 @@
                 </a14:hiddenFill>
               </a:ext>
               <a:ext uri="{91240B29-F687-4f45-9708-019B960494DF}">
-                <a14:hiddenLine xmlns="" xmlns:a14="http://schemas.microsoft.com/office/drawing/2010/main" w="9525">
+                <a14:hiddenLine xmlns:a14="http://schemas.microsoft.com/office/drawing/2010/main" xmlns="" w="9525">
                   <a:solidFill>
                     <a:srgbClr val="000000"/>
                   </a:solidFill>
@@ -13297,7 +13297,7 @@
                 </a14:hiddenLine>
               </a:ext>
               <a:ext uri="{AF507438-7753-43e0-B8FC-AC1667EBCBE1}">
-                <a14:hiddenEffects xmlns="" xmlns:a14="http://schemas.microsoft.com/office/drawing/2010/main">
+                <a14:hiddenEffects xmlns:a14="http://schemas.microsoft.com/office/drawing/2010/main" xmlns="">
                   <a:effectLst>
                     <a:outerShdw blurRad="63500" dist="38099" dir="2700000" algn="ctr" rotWithShape="0">
                       <a:srgbClr val="000000">
@@ -13346,7 +13346,7 @@
             <a:effectLst/>
             <a:extLst>
               <a:ext uri="{909E8E84-426E-40dd-AFC4-6F175D3DCCD1}">
-                <a14:hiddenFill xmlns="" xmlns:a14="http://schemas.microsoft.com/office/drawing/2010/main">
+                <a14:hiddenFill xmlns:a14="http://schemas.microsoft.com/office/drawing/2010/main" xmlns="">
                   <a:blipFill dpi="0" rotWithShape="0">
                     <a:blip/>
                     <a:srcRect/>
@@ -13357,7 +13357,7 @@
                 </a14:hiddenFill>
               </a:ext>
               <a:ext uri="{91240B29-F687-4f45-9708-019B960494DF}">
-                <a14:hiddenLine xmlns="" xmlns:a14="http://schemas.microsoft.com/office/drawing/2010/main" w="9525">
+                <a14:hiddenLine xmlns:a14="http://schemas.microsoft.com/office/drawing/2010/main" xmlns="" w="9525">
                   <a:solidFill>
                     <a:srgbClr val="000000"/>
                   </a:solidFill>
@@ -13367,7 +13367,7 @@
                 </a14:hiddenLine>
               </a:ext>
               <a:ext uri="{AF507438-7753-43e0-B8FC-AC1667EBCBE1}">
-                <a14:hiddenEffects xmlns="" xmlns:a14="http://schemas.microsoft.com/office/drawing/2010/main">
+                <a14:hiddenEffects xmlns:a14="http://schemas.microsoft.com/office/drawing/2010/main" xmlns="">
                   <a:effectLst>
                     <a:outerShdw blurRad="63500" dist="38099" dir="2700000" algn="ctr" rotWithShape="0">
                       <a:srgbClr val="000000">
@@ -13416,7 +13416,7 @@
             <a:effectLst/>
             <a:extLst>
               <a:ext uri="{909E8E84-426E-40dd-AFC4-6F175D3DCCD1}">
-                <a14:hiddenFill xmlns="" xmlns:a14="http://schemas.microsoft.com/office/drawing/2010/main">
+                <a14:hiddenFill xmlns:a14="http://schemas.microsoft.com/office/drawing/2010/main" xmlns="">
                   <a:blipFill dpi="0" rotWithShape="0">
                     <a:blip/>
                     <a:srcRect/>
@@ -13427,7 +13427,7 @@
                 </a14:hiddenFill>
               </a:ext>
               <a:ext uri="{91240B29-F687-4f45-9708-019B960494DF}">
-                <a14:hiddenLine xmlns="" xmlns:a14="http://schemas.microsoft.com/office/drawing/2010/main" w="9525">
+                <a14:hiddenLine xmlns:a14="http://schemas.microsoft.com/office/drawing/2010/main" xmlns="" w="9525">
                   <a:solidFill>
                     <a:srgbClr val="000000"/>
                   </a:solidFill>
@@ -13437,7 +13437,7 @@
                 </a14:hiddenLine>
               </a:ext>
               <a:ext uri="{AF507438-7753-43e0-B8FC-AC1667EBCBE1}">
-                <a14:hiddenEffects xmlns="" xmlns:a14="http://schemas.microsoft.com/office/drawing/2010/main">
+                <a14:hiddenEffects xmlns:a14="http://schemas.microsoft.com/office/drawing/2010/main" xmlns="">
                   <a:effectLst>
                     <a:outerShdw blurRad="63500" dist="38099" dir="2700000" algn="ctr" rotWithShape="0">
                       <a:srgbClr val="000000">
@@ -13486,7 +13486,7 @@
             <a:effectLst/>
             <a:extLst>
               <a:ext uri="{909E8E84-426E-40dd-AFC4-6F175D3DCCD1}">
-                <a14:hiddenFill xmlns="" xmlns:a14="http://schemas.microsoft.com/office/drawing/2010/main">
+                <a14:hiddenFill xmlns:a14="http://schemas.microsoft.com/office/drawing/2010/main" xmlns="">
                   <a:blipFill dpi="0" rotWithShape="0">
                     <a:blip/>
                     <a:srcRect/>
@@ -13497,7 +13497,7 @@
                 </a14:hiddenFill>
               </a:ext>
               <a:ext uri="{91240B29-F687-4f45-9708-019B960494DF}">
-                <a14:hiddenLine xmlns="" xmlns:a14="http://schemas.microsoft.com/office/drawing/2010/main" w="9525">
+                <a14:hiddenLine xmlns:a14="http://schemas.microsoft.com/office/drawing/2010/main" xmlns="" w="9525">
                   <a:solidFill>
                     <a:srgbClr val="000000"/>
                   </a:solidFill>
@@ -13507,7 +13507,7 @@
                 </a14:hiddenLine>
               </a:ext>
               <a:ext uri="{AF507438-7753-43e0-B8FC-AC1667EBCBE1}">
-                <a14:hiddenEffects xmlns="" xmlns:a14="http://schemas.microsoft.com/office/drawing/2010/main">
+                <a14:hiddenEffects xmlns:a14="http://schemas.microsoft.com/office/drawing/2010/main" xmlns="">
                   <a:effectLst>
                     <a:outerShdw blurRad="63500" dist="38099" dir="2700000" algn="ctr" rotWithShape="0">
                       <a:srgbClr val="000000">
@@ -13548,12 +13548,12 @@
             <a:effectLst/>
             <a:extLst>
               <a:ext uri="{909E8E84-426E-40dd-AFC4-6F175D3DCCD1}">
-                <a14:hiddenFill xmlns="" xmlns:a14="http://schemas.microsoft.com/office/drawing/2010/main">
+                <a14:hiddenFill xmlns:a14="http://schemas.microsoft.com/office/drawing/2010/main" xmlns="">
                   <a:noFill/>
                 </a14:hiddenFill>
               </a:ext>
               <a:ext uri="{AF507438-7753-43e0-B8FC-AC1667EBCBE1}">
-                <a14:hiddenEffects xmlns="" xmlns:a14="http://schemas.microsoft.com/office/drawing/2010/main">
+                <a14:hiddenEffects xmlns:a14="http://schemas.microsoft.com/office/drawing/2010/main" xmlns="">
                   <a:effectLst>
                     <a:outerShdw blurRad="63500" dist="38099" dir="2700000" algn="ctr" rotWithShape="0">
                       <a:srgbClr val="000000">
@@ -13606,12 +13606,12 @@
             <a:effectLst/>
             <a:extLst>
               <a:ext uri="{909E8E84-426E-40dd-AFC4-6F175D3DCCD1}">
-                <a14:hiddenFill xmlns="" xmlns:a14="http://schemas.microsoft.com/office/drawing/2010/main">
+                <a14:hiddenFill xmlns:a14="http://schemas.microsoft.com/office/drawing/2010/main" xmlns="">
                   <a:noFill/>
                 </a14:hiddenFill>
               </a:ext>
               <a:ext uri="{AF507438-7753-43e0-B8FC-AC1667EBCBE1}">
-                <a14:hiddenEffects xmlns="" xmlns:a14="http://schemas.microsoft.com/office/drawing/2010/main">
+                <a14:hiddenEffects xmlns:a14="http://schemas.microsoft.com/office/drawing/2010/main" xmlns="">
                   <a:effectLst>
                     <a:outerShdw blurRad="63500" dist="38099" dir="2700000" algn="ctr" rotWithShape="0">
                       <a:srgbClr val="000000">
@@ -13672,7 +13672,7 @@
             <a:effectLst/>
             <a:extLst>
               <a:ext uri="{909E8E84-426E-40dd-AFC4-6F175D3DCCD1}">
-                <a14:hiddenFill xmlns="" xmlns:a14="http://schemas.microsoft.com/office/drawing/2010/main">
+                <a14:hiddenFill xmlns:a14="http://schemas.microsoft.com/office/drawing/2010/main" xmlns="">
                   <a:blipFill dpi="0" rotWithShape="0">
                     <a:blip/>
                     <a:srcRect/>
@@ -13683,7 +13683,7 @@
                 </a14:hiddenFill>
               </a:ext>
               <a:ext uri="{91240B29-F687-4f45-9708-019B960494DF}">
-                <a14:hiddenLine xmlns="" xmlns:a14="http://schemas.microsoft.com/office/drawing/2010/main" w="9525">
+                <a14:hiddenLine xmlns:a14="http://schemas.microsoft.com/office/drawing/2010/main" xmlns="" w="9525">
                   <a:solidFill>
                     <a:srgbClr val="000000"/>
                   </a:solidFill>
@@ -13693,7 +13693,7 @@
                 </a14:hiddenLine>
               </a:ext>
               <a:ext uri="{AF507438-7753-43e0-B8FC-AC1667EBCBE1}">
-                <a14:hiddenEffects xmlns="" xmlns:a14="http://schemas.microsoft.com/office/drawing/2010/main">
+                <a14:hiddenEffects xmlns:a14="http://schemas.microsoft.com/office/drawing/2010/main" xmlns="">
                   <a:effectLst>
                     <a:outerShdw blurRad="63500" dist="38099" dir="2700000" algn="ctr" rotWithShape="0">
                       <a:srgbClr val="000000">
@@ -13826,7 +13826,7 @@
           <a:effectLst/>
           <a:extLst>
             <a:ext uri="{909E8E84-426E-40dd-AFC4-6F175D3DCCD1}">
-              <a14:hiddenFill xmlns:a14="http://schemas.microsoft.com/office/drawing/2010/main" xmlns="">
+              <a14:hiddenFill xmlns="" xmlns:a14="http://schemas.microsoft.com/office/drawing/2010/main">
                 <a:blipFill dpi="0" rotWithShape="0">
                   <a:blip/>
                   <a:srcRect/>
@@ -13837,7 +13837,7 @@
               </a14:hiddenFill>
             </a:ext>
             <a:ext uri="{91240B29-F687-4f45-9708-019B960494DF}">
-              <a14:hiddenLine xmlns:a14="http://schemas.microsoft.com/office/drawing/2010/main" xmlns="" w="9525">
+              <a14:hiddenLine xmlns="" xmlns:a14="http://schemas.microsoft.com/office/drawing/2010/main" w="9525">
                 <a:solidFill>
                   <a:srgbClr val="000000"/>
                 </a:solidFill>
@@ -13847,7 +13847,7 @@
               </a14:hiddenLine>
             </a:ext>
             <a:ext uri="{AF507438-7753-43e0-B8FC-AC1667EBCBE1}">
-              <a14:hiddenEffects xmlns:a14="http://schemas.microsoft.com/office/drawing/2010/main" xmlns="">
+              <a14:hiddenEffects xmlns="" xmlns:a14="http://schemas.microsoft.com/office/drawing/2010/main">
                 <a:effectLst>
                   <a:outerShdw blurRad="63500" dist="38099" dir="2700000" algn="ctr" rotWithShape="0">
                     <a:srgbClr val="000000">
@@ -13932,7 +13932,7 @@
           <a:effectLst/>
           <a:extLst>
             <a:ext uri="{909E8E84-426E-40dd-AFC4-6F175D3DCCD1}">
-              <a14:hiddenFill xmlns:a14="http://schemas.microsoft.com/office/drawing/2010/main" xmlns="">
+              <a14:hiddenFill xmlns="" xmlns:a14="http://schemas.microsoft.com/office/drawing/2010/main">
                 <a:blipFill dpi="0" rotWithShape="0">
                   <a:blip/>
                   <a:srcRect/>
@@ -13943,7 +13943,7 @@
               </a14:hiddenFill>
             </a:ext>
             <a:ext uri="{91240B29-F687-4f45-9708-019B960494DF}">
-              <a14:hiddenLine xmlns:a14="http://schemas.microsoft.com/office/drawing/2010/main" xmlns="" w="9525">
+              <a14:hiddenLine xmlns="" xmlns:a14="http://schemas.microsoft.com/office/drawing/2010/main" w="9525">
                 <a:solidFill>
                   <a:srgbClr val="000000"/>
                 </a:solidFill>
@@ -13953,7 +13953,7 @@
               </a14:hiddenLine>
             </a:ext>
             <a:ext uri="{AF507438-7753-43e0-B8FC-AC1667EBCBE1}">
-              <a14:hiddenEffects xmlns:a14="http://schemas.microsoft.com/office/drawing/2010/main" xmlns="">
+              <a14:hiddenEffects xmlns="" xmlns:a14="http://schemas.microsoft.com/office/drawing/2010/main">
                 <a:effectLst>
                   <a:outerShdw blurRad="63500" dist="38099" dir="2700000" algn="ctr" rotWithShape="0">
                     <a:srgbClr val="000000">
@@ -14038,7 +14038,7 @@
           <a:effectLst/>
           <a:extLst>
             <a:ext uri="{909E8E84-426E-40dd-AFC4-6F175D3DCCD1}">
-              <a14:hiddenFill xmlns:a14="http://schemas.microsoft.com/office/drawing/2010/main" xmlns="">
+              <a14:hiddenFill xmlns="" xmlns:a14="http://schemas.microsoft.com/office/drawing/2010/main">
                 <a:blipFill dpi="0" rotWithShape="0">
                   <a:blip/>
                   <a:srcRect/>
@@ -14049,7 +14049,7 @@
               </a14:hiddenFill>
             </a:ext>
             <a:ext uri="{91240B29-F687-4f45-9708-019B960494DF}">
-              <a14:hiddenLine xmlns:a14="http://schemas.microsoft.com/office/drawing/2010/main" xmlns="" w="9525">
+              <a14:hiddenLine xmlns="" xmlns:a14="http://schemas.microsoft.com/office/drawing/2010/main" w="9525">
                 <a:solidFill>
                   <a:srgbClr val="000000"/>
                 </a:solidFill>
@@ -14059,7 +14059,7 @@
               </a14:hiddenLine>
             </a:ext>
             <a:ext uri="{AF507438-7753-43e0-B8FC-AC1667EBCBE1}">
-              <a14:hiddenEffects xmlns:a14="http://schemas.microsoft.com/office/drawing/2010/main" xmlns="">
+              <a14:hiddenEffects xmlns="" xmlns:a14="http://schemas.microsoft.com/office/drawing/2010/main">
                 <a:effectLst>
                   <a:outerShdw blurRad="63500" dist="38099" dir="2700000" algn="ctr" rotWithShape="0">
                     <a:srgbClr val="000000">
@@ -14238,7 +14238,7 @@
           <a:effectLst/>
           <a:extLst>
             <a:ext uri="{909E8E84-426E-40dd-AFC4-6F175D3DCCD1}">
-              <a14:hiddenFill xmlns:a14="http://schemas.microsoft.com/office/drawing/2010/main" xmlns="">
+              <a14:hiddenFill xmlns="" xmlns:a14="http://schemas.microsoft.com/office/drawing/2010/main">
                 <a:blipFill dpi="0" rotWithShape="0">
                   <a:blip/>
                   <a:srcRect/>
@@ -14249,7 +14249,7 @@
               </a14:hiddenFill>
             </a:ext>
             <a:ext uri="{91240B29-F687-4f45-9708-019B960494DF}">
-              <a14:hiddenLine xmlns:a14="http://schemas.microsoft.com/office/drawing/2010/main" xmlns="" w="9525">
+              <a14:hiddenLine xmlns="" xmlns:a14="http://schemas.microsoft.com/office/drawing/2010/main" w="9525">
                 <a:solidFill>
                   <a:srgbClr val="000000"/>
                 </a:solidFill>
@@ -14259,7 +14259,7 @@
               </a14:hiddenLine>
             </a:ext>
             <a:ext uri="{AF507438-7753-43e0-B8FC-AC1667EBCBE1}">
-              <a14:hiddenEffects xmlns:a14="http://schemas.microsoft.com/office/drawing/2010/main" xmlns="">
+              <a14:hiddenEffects xmlns="" xmlns:a14="http://schemas.microsoft.com/office/drawing/2010/main">
                 <a:effectLst>
                   <a:outerShdw blurRad="63500" dist="38099" dir="2700000" algn="ctr" rotWithShape="0">
                     <a:srgbClr val="000000">
@@ -14337,7 +14337,7 @@
           <a:effectLst/>
           <a:extLst>
             <a:ext uri="{909E8E84-426E-40dd-AFC4-6F175D3DCCD1}">
-              <a14:hiddenFill xmlns:a14="http://schemas.microsoft.com/office/drawing/2010/main" xmlns="">
+              <a14:hiddenFill xmlns="" xmlns:a14="http://schemas.microsoft.com/office/drawing/2010/main">
                 <a:blipFill dpi="0" rotWithShape="0">
                   <a:blip/>
                   <a:srcRect/>
@@ -14348,7 +14348,7 @@
               </a14:hiddenFill>
             </a:ext>
             <a:ext uri="{91240B29-F687-4f45-9708-019B960494DF}">
-              <a14:hiddenLine xmlns:a14="http://schemas.microsoft.com/office/drawing/2010/main" xmlns="" w="9525">
+              <a14:hiddenLine xmlns="" xmlns:a14="http://schemas.microsoft.com/office/drawing/2010/main" w="9525">
                 <a:solidFill>
                   <a:srgbClr val="000000"/>
                 </a:solidFill>
@@ -14358,7 +14358,7 @@
               </a14:hiddenLine>
             </a:ext>
             <a:ext uri="{AF507438-7753-43e0-B8FC-AC1667EBCBE1}">
-              <a14:hiddenEffects xmlns:a14="http://schemas.microsoft.com/office/drawing/2010/main" xmlns="">
+              <a14:hiddenEffects xmlns="" xmlns:a14="http://schemas.microsoft.com/office/drawing/2010/main">
                 <a:effectLst>
                   <a:outerShdw blurRad="63500" dist="38099" dir="2700000" algn="ctr" rotWithShape="0">
                     <a:srgbClr val="000000">
@@ -16223,7 +16223,7 @@
           <a:effectLst/>
           <a:extLst>
             <a:ext uri="{909E8E84-426E-40dd-AFC4-6F175D3DCCD1}">
-              <a14:hiddenFill xmlns="" xmlns:a14="http://schemas.microsoft.com/office/drawing/2010/main">
+              <a14:hiddenFill xmlns:a14="http://schemas.microsoft.com/office/drawing/2010/main" xmlns="">
                 <a:blipFill dpi="0" rotWithShape="0">
                   <a:blip/>
                   <a:srcRect/>
@@ -16234,7 +16234,7 @@
               </a14:hiddenFill>
             </a:ext>
             <a:ext uri="{91240B29-F687-4f45-9708-019B960494DF}">
-              <a14:hiddenLine xmlns="" xmlns:a14="http://schemas.microsoft.com/office/drawing/2010/main" w="9525">
+              <a14:hiddenLine xmlns:a14="http://schemas.microsoft.com/office/drawing/2010/main" xmlns="" w="9525">
                 <a:solidFill>
                   <a:srgbClr val="000000"/>
                 </a:solidFill>
@@ -16244,7 +16244,7 @@
               </a14:hiddenLine>
             </a:ext>
             <a:ext uri="{AF507438-7753-43e0-B8FC-AC1667EBCBE1}">
-              <a14:hiddenEffects xmlns="" xmlns:a14="http://schemas.microsoft.com/office/drawing/2010/main">
+              <a14:hiddenEffects xmlns:a14="http://schemas.microsoft.com/office/drawing/2010/main" xmlns="">
                 <a:effectLst>
                   <a:outerShdw blurRad="63500" dist="38099" dir="2700000" algn="ctr" rotWithShape="0">
                     <a:srgbClr val="000000">
@@ -16404,7 +16404,7 @@
           <a:effectLst/>
           <a:extLst>
             <a:ext uri="{909E8E84-426E-40dd-AFC4-6F175D3DCCD1}">
-              <a14:hiddenFill xmlns="" xmlns:a14="http://schemas.microsoft.com/office/drawing/2010/main">
+              <a14:hiddenFill xmlns:a14="http://schemas.microsoft.com/office/drawing/2010/main" xmlns="">
                 <a:blipFill dpi="0" rotWithShape="0">
                   <a:blip/>
                   <a:srcRect/>
@@ -16415,7 +16415,7 @@
               </a14:hiddenFill>
             </a:ext>
             <a:ext uri="{91240B29-F687-4f45-9708-019B960494DF}">
-              <a14:hiddenLine xmlns="" xmlns:a14="http://schemas.microsoft.com/office/drawing/2010/main" w="9525">
+              <a14:hiddenLine xmlns:a14="http://schemas.microsoft.com/office/drawing/2010/main" xmlns="" w="9525">
                 <a:solidFill>
                   <a:srgbClr val="000000"/>
                 </a:solidFill>
@@ -16425,7 +16425,7 @@
               </a14:hiddenLine>
             </a:ext>
             <a:ext uri="{AF507438-7753-43e0-B8FC-AC1667EBCBE1}">
-              <a14:hiddenEffects xmlns="" xmlns:a14="http://schemas.microsoft.com/office/drawing/2010/main">
+              <a14:hiddenEffects xmlns:a14="http://schemas.microsoft.com/office/drawing/2010/main" xmlns="">
                 <a:effectLst>
                   <a:outerShdw blurRad="63500" dist="38099" dir="2700000" algn="ctr" rotWithShape="0">
                     <a:srgbClr val="000000">
@@ -18224,7 +18224,7 @@
           <a:effectLst/>
           <a:extLst>
             <a:ext uri="{909E8E84-426E-40dd-AFC4-6F175D3DCCD1}">
-              <a14:hiddenFill xmlns="" xmlns:a14="http://schemas.microsoft.com/office/drawing/2010/main">
+              <a14:hiddenFill xmlns:a14="http://schemas.microsoft.com/office/drawing/2010/main" xmlns="">
                 <a:blipFill dpi="0" rotWithShape="0">
                   <a:blip/>
                   <a:srcRect/>
@@ -18235,7 +18235,7 @@
               </a14:hiddenFill>
             </a:ext>
             <a:ext uri="{91240B29-F687-4f45-9708-019B960494DF}">
-              <a14:hiddenLine xmlns="" xmlns:a14="http://schemas.microsoft.com/office/drawing/2010/main" w="9525">
+              <a14:hiddenLine xmlns:a14="http://schemas.microsoft.com/office/drawing/2010/main" xmlns="" w="9525">
                 <a:solidFill>
                   <a:srgbClr val="000000"/>
                 </a:solidFill>
@@ -18245,7 +18245,7 @@
               </a14:hiddenLine>
             </a:ext>
             <a:ext uri="{AF507438-7753-43e0-B8FC-AC1667EBCBE1}">
-              <a14:hiddenEffects xmlns="" xmlns:a14="http://schemas.microsoft.com/office/drawing/2010/main">
+              <a14:hiddenEffects xmlns:a14="http://schemas.microsoft.com/office/drawing/2010/main" xmlns="">
                 <a:effectLst>
                   <a:outerShdw blurRad="63500" dist="38099" dir="2700000" algn="ctr" rotWithShape="0">
                     <a:srgbClr val="000000">
@@ -18338,7 +18338,7 @@
           <a:effectLst/>
           <a:extLst>
             <a:ext uri="{909E8E84-426E-40dd-AFC4-6F175D3DCCD1}">
-              <a14:hiddenFill xmlns="" xmlns:a14="http://schemas.microsoft.com/office/drawing/2010/main">
+              <a14:hiddenFill xmlns:a14="http://schemas.microsoft.com/office/drawing/2010/main" xmlns="">
                 <a:blipFill dpi="0" rotWithShape="0">
                   <a:blip/>
                   <a:srcRect/>
@@ -18349,7 +18349,7 @@
               </a14:hiddenFill>
             </a:ext>
             <a:ext uri="{91240B29-F687-4f45-9708-019B960494DF}">
-              <a14:hiddenLine xmlns="" xmlns:a14="http://schemas.microsoft.com/office/drawing/2010/main" w="9525">
+              <a14:hiddenLine xmlns:a14="http://schemas.microsoft.com/office/drawing/2010/main" xmlns="" w="9525">
                 <a:solidFill>
                   <a:srgbClr val="000000"/>
                 </a:solidFill>
@@ -18359,7 +18359,7 @@
               </a14:hiddenLine>
             </a:ext>
             <a:ext uri="{AF507438-7753-43e0-B8FC-AC1667EBCBE1}">
-              <a14:hiddenEffects xmlns="" xmlns:a14="http://schemas.microsoft.com/office/drawing/2010/main">
+              <a14:hiddenEffects xmlns:a14="http://schemas.microsoft.com/office/drawing/2010/main" xmlns="">
                 <a:effectLst>
                   <a:outerShdw blurRad="63500" dist="38099" dir="2700000" algn="ctr" rotWithShape="0">
                     <a:srgbClr val="000000">
@@ -21231,7 +21231,7 @@
           <a:effectLst/>
           <a:extLst>
             <a:ext uri="{909E8E84-426E-40dd-AFC4-6F175D3DCCD1}">
-              <a14:hiddenFill xmlns="" xmlns:a14="http://schemas.microsoft.com/office/drawing/2010/main">
+              <a14:hiddenFill xmlns:a14="http://schemas.microsoft.com/office/drawing/2010/main" xmlns="">
                 <a:blipFill dpi="0" rotWithShape="0">
                   <a:blip/>
                   <a:srcRect/>
@@ -21242,7 +21242,7 @@
               </a14:hiddenFill>
             </a:ext>
             <a:ext uri="{91240B29-F687-4f45-9708-019B960494DF}">
-              <a14:hiddenLine xmlns="" xmlns:a14="http://schemas.microsoft.com/office/drawing/2010/main" w="9525">
+              <a14:hiddenLine xmlns:a14="http://schemas.microsoft.com/office/drawing/2010/main" xmlns="" w="9525">
                 <a:solidFill>
                   <a:srgbClr val="000000"/>
                 </a:solidFill>
@@ -21252,7 +21252,7 @@
               </a14:hiddenLine>
             </a:ext>
             <a:ext uri="{AF507438-7753-43e0-B8FC-AC1667EBCBE1}">
-              <a14:hiddenEffects xmlns="" xmlns:a14="http://schemas.microsoft.com/office/drawing/2010/main">
+              <a14:hiddenEffects xmlns:a14="http://schemas.microsoft.com/office/drawing/2010/main" xmlns="">
                 <a:effectLst>
                   <a:outerShdw blurRad="63500" dist="38099" dir="2700000" algn="ctr" rotWithShape="0">
                     <a:srgbClr val="000000">
@@ -21331,7 +21331,7 @@
           <a:effectLst/>
           <a:extLst>
             <a:ext uri="{909E8E84-426E-40dd-AFC4-6F175D3DCCD1}">
-              <a14:hiddenFill xmlns="" xmlns:a14="http://schemas.microsoft.com/office/drawing/2010/main">
+              <a14:hiddenFill xmlns:a14="http://schemas.microsoft.com/office/drawing/2010/main" xmlns="">
                 <a:blipFill dpi="0" rotWithShape="0">
                   <a:blip/>
                   <a:srcRect/>
@@ -21342,7 +21342,7 @@
               </a14:hiddenFill>
             </a:ext>
             <a:ext uri="{91240B29-F687-4f45-9708-019B960494DF}">
-              <a14:hiddenLine xmlns="" xmlns:a14="http://schemas.microsoft.com/office/drawing/2010/main" w="9525">
+              <a14:hiddenLine xmlns:a14="http://schemas.microsoft.com/office/drawing/2010/main" xmlns="" w="9525">
                 <a:solidFill>
                   <a:srgbClr val="000000"/>
                 </a:solidFill>
@@ -21352,7 +21352,7 @@
               </a14:hiddenLine>
             </a:ext>
             <a:ext uri="{AF507438-7753-43e0-B8FC-AC1667EBCBE1}">
-              <a14:hiddenEffects xmlns="" xmlns:a14="http://schemas.microsoft.com/office/drawing/2010/main">
+              <a14:hiddenEffects xmlns:a14="http://schemas.microsoft.com/office/drawing/2010/main" xmlns="">
                 <a:effectLst>
                   <a:outerShdw blurRad="63500" dist="38099" dir="2700000" algn="ctr" rotWithShape="0">
                     <a:srgbClr val="000000">
@@ -22935,7 +22935,7 @@
           <a:effectLst/>
           <a:extLst>
             <a:ext uri="{909E8E84-426E-40dd-AFC4-6F175D3DCCD1}">
-              <a14:hiddenFill xmlns="" xmlns:a14="http://schemas.microsoft.com/office/drawing/2010/main">
+              <a14:hiddenFill xmlns:a14="http://schemas.microsoft.com/office/drawing/2010/main" xmlns="">
                 <a:blipFill dpi="0" rotWithShape="0">
                   <a:blip/>
                   <a:srcRect/>
@@ -22946,7 +22946,7 @@
               </a14:hiddenFill>
             </a:ext>
             <a:ext uri="{91240B29-F687-4f45-9708-019B960494DF}">
-              <a14:hiddenLine xmlns="" xmlns:a14="http://schemas.microsoft.com/office/drawing/2010/main" w="9525">
+              <a14:hiddenLine xmlns:a14="http://schemas.microsoft.com/office/drawing/2010/main" xmlns="" w="9525">
                 <a:solidFill>
                   <a:srgbClr val="000000"/>
                 </a:solidFill>
@@ -22956,7 +22956,7 @@
               </a14:hiddenLine>
             </a:ext>
             <a:ext uri="{AF507438-7753-43e0-B8FC-AC1667EBCBE1}">
-              <a14:hiddenEffects xmlns="" xmlns:a14="http://schemas.microsoft.com/office/drawing/2010/main">
+              <a14:hiddenEffects xmlns:a14="http://schemas.microsoft.com/office/drawing/2010/main" xmlns="">
                 <a:effectLst>
                   <a:outerShdw blurRad="63500" dist="38099" dir="2700000" algn="ctr" rotWithShape="0">
                     <a:srgbClr val="000000">
@@ -24604,7 +24604,7 @@
           <a:effectLst/>
           <a:extLst>
             <a:ext uri="{909E8E84-426E-40dd-AFC4-6F175D3DCCD1}">
-              <a14:hiddenFill xmlns="" xmlns:a14="http://schemas.microsoft.com/office/drawing/2010/main">
+              <a14:hiddenFill xmlns:a14="http://schemas.microsoft.com/office/drawing/2010/main" xmlns="">
                 <a:blipFill dpi="0" rotWithShape="0">
                   <a:blip/>
                   <a:srcRect/>
@@ -24615,7 +24615,7 @@
               </a14:hiddenFill>
             </a:ext>
             <a:ext uri="{91240B29-F687-4f45-9708-019B960494DF}">
-              <a14:hiddenLine xmlns="" xmlns:a14="http://schemas.microsoft.com/office/drawing/2010/main" w="9525">
+              <a14:hiddenLine xmlns:a14="http://schemas.microsoft.com/office/drawing/2010/main" xmlns="" w="9525">
                 <a:solidFill>
                   <a:srgbClr val="000000"/>
                 </a:solidFill>
@@ -24625,7 +24625,7 @@
               </a14:hiddenLine>
             </a:ext>
             <a:ext uri="{AF507438-7753-43e0-B8FC-AC1667EBCBE1}">
-              <a14:hiddenEffects xmlns="" xmlns:a14="http://schemas.microsoft.com/office/drawing/2010/main">
+              <a14:hiddenEffects xmlns:a14="http://schemas.microsoft.com/office/drawing/2010/main" xmlns="">
                 <a:effectLst>
                   <a:outerShdw blurRad="63500" dist="38099" dir="2700000" algn="ctr" rotWithShape="0">
                     <a:srgbClr val="000000">
@@ -25987,7 +25987,7 @@
           <a:effectLst/>
           <a:extLst>
             <a:ext uri="{909E8E84-426E-40dd-AFC4-6F175D3DCCD1}">
-              <a14:hiddenFill xmlns="" xmlns:a14="http://schemas.microsoft.com/office/drawing/2010/main">
+              <a14:hiddenFill xmlns:a14="http://schemas.microsoft.com/office/drawing/2010/main" xmlns="">
                 <a:blipFill dpi="0" rotWithShape="0">
                   <a:blip/>
                   <a:srcRect/>
@@ -25998,7 +25998,7 @@
               </a14:hiddenFill>
             </a:ext>
             <a:ext uri="{91240B29-F687-4f45-9708-019B960494DF}">
-              <a14:hiddenLine xmlns="" xmlns:a14="http://schemas.microsoft.com/office/drawing/2010/main" w="9525">
+              <a14:hiddenLine xmlns:a14="http://schemas.microsoft.com/office/drawing/2010/main" xmlns="" w="9525">
                 <a:solidFill>
                   <a:srgbClr val="000000"/>
                 </a:solidFill>
@@ -26008,7 +26008,7 @@
               </a14:hiddenLine>
             </a:ext>
             <a:ext uri="{AF507438-7753-43e0-B8FC-AC1667EBCBE1}">
-              <a14:hiddenEffects xmlns="" xmlns:a14="http://schemas.microsoft.com/office/drawing/2010/main">
+              <a14:hiddenEffects xmlns:a14="http://schemas.microsoft.com/office/drawing/2010/main" xmlns="">
                 <a:effectLst>
                   <a:outerShdw blurRad="63500" dist="38099" dir="2700000" algn="ctr" rotWithShape="0">
                     <a:srgbClr val="000000">
@@ -26139,7 +26139,7 @@
           <a:effectLst/>
           <a:extLst>
             <a:ext uri="{909E8E84-426E-40dd-AFC4-6F175D3DCCD1}">
-              <a14:hiddenFill xmlns="" xmlns:a14="http://schemas.microsoft.com/office/drawing/2010/main">
+              <a14:hiddenFill xmlns:a14="http://schemas.microsoft.com/office/drawing/2010/main" xmlns="">
                 <a:blipFill dpi="0" rotWithShape="0">
                   <a:blip/>
                   <a:srcRect/>
@@ -26150,7 +26150,7 @@
               </a14:hiddenFill>
             </a:ext>
             <a:ext uri="{91240B29-F687-4f45-9708-019B960494DF}">
-              <a14:hiddenLine xmlns="" xmlns:a14="http://schemas.microsoft.com/office/drawing/2010/main" w="9525">
+              <a14:hiddenLine xmlns:a14="http://schemas.microsoft.com/office/drawing/2010/main" xmlns="" w="9525">
                 <a:solidFill>
                   <a:srgbClr val="000000"/>
                 </a:solidFill>
@@ -26160,7 +26160,7 @@
               </a14:hiddenLine>
             </a:ext>
             <a:ext uri="{AF507438-7753-43e0-B8FC-AC1667EBCBE1}">
-              <a14:hiddenEffects xmlns="" xmlns:a14="http://schemas.microsoft.com/office/drawing/2010/main">
+              <a14:hiddenEffects xmlns:a14="http://schemas.microsoft.com/office/drawing/2010/main" xmlns="">
                 <a:effectLst>
                   <a:outerShdw blurRad="63500" dist="38099" dir="2700000" algn="ctr" rotWithShape="0">
                     <a:srgbClr val="000000">
@@ -28890,8 +28890,8 @@
           </a:p>
         </p:txBody>
       </p:sp>
-      <mc:AlternateContent xmlns:mc="http://schemas.openxmlformats.org/markup-compatibility/2006" xmlns:a14="http://schemas.microsoft.com/office/drawing/2010/main">
-        <mc:Choice Requires="a14">
+      <mc:AlternateContent xmlns:mc="http://schemas.openxmlformats.org/markup-compatibility/2006">
+        <mc:Choice xmlns:a14="http://schemas.microsoft.com/office/drawing/2010/main" Requires="a14">
           <p:sp>
             <p:nvSpPr>
               <p:cNvPr id="3" name="Content Placeholder 2"/>
@@ -29130,7 +29130,7 @@
                     <a:ea typeface="Ayuthaya" charset="-34"/>
                     <a:cs typeface="Consolas" charset="0"/>
                   </a:rPr>
-                  <a:t>   after </a:t>
+                  <a:t>   after the same sequence of </a:t>
                 </a:r>
                 <a14:m>
                   <m:oMath xmlns:m="http://schemas.openxmlformats.org/officeDocument/2006/math">
@@ -29700,7 +29700,7 @@
             </p:txBody>
           </p:sp>
         </mc:Choice>
-        <mc:Fallback xmlns="">
+        <mc:Fallback>
           <p:sp>
             <p:nvSpPr>
               <p:cNvPr id="3" name="Content Placeholder 2"/>
@@ -30242,39 +30242,26 @@
                                   </p:childTnLst>
                                 </p:cTn>
                               </p:par>
+                            </p:childTnLst>
+                          </p:cTn>
+                        </p:par>
+                      </p:childTnLst>
+                    </p:cTn>
+                  </p:par>
+                  <p:par>
+                    <p:cTn id="15" fill="hold">
+                      <p:stCondLst>
+                        <p:cond delay="indefinite"/>
+                      </p:stCondLst>
+                      <p:childTnLst>
+                        <p:par>
+                          <p:cTn id="16" fill="hold">
+                            <p:stCondLst>
+                              <p:cond delay="0"/>
+                            </p:stCondLst>
+                            <p:childTnLst>
                               <p:par>
-                                <p:cTn id="15" presetID="1" presetClass="entr" presetSubtype="0" fill="hold" nodeType="withEffect">
-                                  <p:stCondLst>
-                                    <p:cond delay="0"/>
-                                  </p:stCondLst>
-                                  <p:childTnLst>
-                                    <p:set>
-                                      <p:cBhvr>
-                                        <p:cTn id="16" dur="1" fill="hold">
-                                          <p:stCondLst>
-                                            <p:cond delay="0"/>
-                                          </p:stCondLst>
-                                        </p:cTn>
-                                        <p:tgtEl>
-                                          <p:spTgt spid="3">
-                                            <p:txEl>
-                                              <p:pRg st="4" end="4"/>
-                                            </p:txEl>
-                                          </p:spTgt>
-                                        </p:tgtEl>
-                                        <p:attrNameLst>
-                                          <p:attrName>style.visibility</p:attrName>
-                                        </p:attrNameLst>
-                                      </p:cBhvr>
-                                      <p:to>
-                                        <p:strVal val="visible"/>
-                                      </p:to>
-                                    </p:set>
-                                  </p:childTnLst>
-                                </p:cTn>
-                              </p:par>
-                              <p:par>
-                                <p:cTn id="17" presetID="1" presetClass="entr" presetSubtype="0" fill="hold" nodeType="withEffect">
+                                <p:cTn id="17" presetID="1" presetClass="entr" presetSubtype="0" fill="hold" nodeType="clickEffect">
                                   <p:stCondLst>
                                     <p:cond delay="0"/>
                                   </p:stCondLst>
@@ -30287,7 +30274,11 @@
                                           </p:stCondLst>
                                         </p:cTn>
                                         <p:tgtEl>
-                                          <p:spTgt spid="12"/>
+                                          <p:spTgt spid="3">
+                                            <p:txEl>
+                                              <p:pRg st="4" end="4"/>
+                                            </p:txEl>
+                                          </p:spTgt>
                                         </p:tgtEl>
                                         <p:attrNameLst>
                                           <p:attrName>style.visibility</p:attrName>
@@ -30484,6 +30475,33 @@
                                               <p:pRg st="8" end="8"/>
                                             </p:txEl>
                                           </p:spTgt>
+                                        </p:tgtEl>
+                                        <p:attrNameLst>
+                                          <p:attrName>style.visibility</p:attrName>
+                                        </p:attrNameLst>
+                                      </p:cBhvr>
+                                      <p:to>
+                                        <p:strVal val="visible"/>
+                                      </p:to>
+                                    </p:set>
+                                  </p:childTnLst>
+                                </p:cTn>
+                              </p:par>
+                              <p:par>
+                                <p:cTn id="35" presetID="1" presetClass="entr" presetSubtype="0" fill="hold" nodeType="withEffect">
+                                  <p:stCondLst>
+                                    <p:cond delay="0"/>
+                                  </p:stCondLst>
+                                  <p:childTnLst>
+                                    <p:set>
+                                      <p:cBhvr>
+                                        <p:cTn id="36" dur="1" fill="hold">
+                                          <p:stCondLst>
+                                            <p:cond delay="0"/>
+                                          </p:stCondLst>
+                                        </p:cTn>
+                                        <p:tgtEl>
+                                          <p:spTgt spid="12"/>
                                         </p:tgtEl>
                                         <p:attrNameLst>
                                           <p:attrName>style.visibility</p:attrName>
@@ -33862,7 +33880,7 @@
           <a:effectLst/>
           <a:extLst>
             <a:ext uri="{909E8E84-426E-40dd-AFC4-6F175D3DCCD1}">
-              <a14:hiddenFill xmlns:a14="http://schemas.microsoft.com/office/drawing/2010/main" xmlns="">
+              <a14:hiddenFill xmlns="" xmlns:a14="http://schemas.microsoft.com/office/drawing/2010/main">
                 <a:blipFill dpi="0" rotWithShape="0">
                   <a:blip/>
                   <a:srcRect/>
@@ -33873,7 +33891,7 @@
               </a14:hiddenFill>
             </a:ext>
             <a:ext uri="{91240B29-F687-4f45-9708-019B960494DF}">
-              <a14:hiddenLine xmlns:a14="http://schemas.microsoft.com/office/drawing/2010/main" xmlns="" w="9525">
+              <a14:hiddenLine xmlns="" xmlns:a14="http://schemas.microsoft.com/office/drawing/2010/main" w="9525">
                 <a:solidFill>
                   <a:srgbClr val="000000"/>
                 </a:solidFill>
@@ -33883,7 +33901,7 @@
               </a14:hiddenLine>
             </a:ext>
             <a:ext uri="{AF507438-7753-43e0-B8FC-AC1667EBCBE1}">
-              <a14:hiddenEffects xmlns:a14="http://schemas.microsoft.com/office/drawing/2010/main" xmlns="">
+              <a14:hiddenEffects xmlns="" xmlns:a14="http://schemas.microsoft.com/office/drawing/2010/main">
                 <a:effectLst>
                   <a:outerShdw blurRad="63500" dist="38099" dir="2700000" algn="ctr" rotWithShape="0">
                     <a:srgbClr val="000000">

</xml_diff>

<commit_message>
Use streams of packets, not streams of tuples.
Tuples is overloaded in the context of 5-tuples.
</commit_message>
<xml_diff>
--- a/marple.pptx
+++ b/marple.pptx
@@ -960,7 +960,7 @@
             </a:r>
             <a:r>
               <a:rPr lang="en-US" baseline="0" dirty="0"/>
-              <a:t> construct. Again, we divide up the packet stream by 5tuple like the previous example. The function is different now and we use the function </a:t>
+              <a:t> construct. Again, we divide up the packet stream by 5-tuple like the previous example. The function is different now and we use the function </a:t>
             </a:r>
             <a:r>
               <a:rPr lang="en-US" baseline="0" dirty="0" err="1"/>
@@ -4344,7 +4344,7 @@
           <a:p>
             <a:r>
               <a:rPr lang="en-US" dirty="0"/>
-              <a:t>Since we wanted the language to be as high level as possible, we chose a query language as the format for expressing these queries. Let me describe the query language’s constructs one by one. The first language construct is that of a stream. You can think of the query language as consisting of operators that take streams of tuples as inputs and produce streams of tuples as outputs---like standard stream processing systems. This allows us to easily compose operators in the language.</a:t>
+              <a:t>Since we wanted the language to be as high level as possible, we chose a query language as the format for expressing these queries. Let me describe the query language’s constructs one by one. The first language construct is that of a stream. You can think of the query language as consisting of operators that take streams as inputs and produce streams as outputs---like standard stream processing systems. This allows us to easily compose operators in the language.</a:t>
             </a:r>
           </a:p>
           <a:p>
@@ -8544,7 +8544,7 @@
                 <a:ea typeface="Ayuthaya" charset="-34"/>
                 <a:cs typeface="Ayuthaya" charset="-34"/>
               </a:rPr>
-              <a:t>(R1, 5tuple, </a:t>
+              <a:t>(R1, 5-tuple, </a:t>
             </a:r>
             <a:r>
               <a:rPr lang="en-US" sz="3200" dirty="0" err="1">
@@ -9270,7 +9270,7 @@
                 <a:ea typeface="Ayuthaya" charset="-34"/>
                 <a:cs typeface="Ayuthaya" charset="-34"/>
               </a:rPr>
-              <a:t>(P, 5tuple, </a:t>
+              <a:t>(P, 5-tuple, </a:t>
             </a:r>
             <a:r>
               <a:rPr lang="en-US" sz="3200" dirty="0" err="1">
@@ -11223,7 +11223,7 @@
                 <a:ea typeface="Ayuthaya" charset="-34"/>
                 <a:cs typeface="Ayuthaya" charset="-34"/>
               </a:rPr>
-              <a:t>(P, 5tuple, </a:t>
+              <a:t>(P, 5-tuple, </a:t>
             </a:r>
             <a:r>
               <a:rPr lang="en-US" dirty="0" err="1">
@@ -12190,7 +12190,7 @@
           <a:effectLst/>
           <a:extLst>
             <a:ext uri="{909E8E84-426E-40dd-AFC4-6F175D3DCCD1}">
-              <a14:hiddenFill xmlns="" xmlns:a14="http://schemas.microsoft.com/office/drawing/2010/main">
+              <a14:hiddenFill xmlns:a14="http://schemas.microsoft.com/office/drawing/2010/main" xmlns="">
                 <a:blipFill dpi="0" rotWithShape="0">
                   <a:blip/>
                   <a:srcRect/>
@@ -12201,7 +12201,7 @@
               </a14:hiddenFill>
             </a:ext>
             <a:ext uri="{91240B29-F687-4f45-9708-019B960494DF}">
-              <a14:hiddenLine xmlns="" xmlns:a14="http://schemas.microsoft.com/office/drawing/2010/main" w="9525">
+              <a14:hiddenLine xmlns:a14="http://schemas.microsoft.com/office/drawing/2010/main" xmlns="" w="9525">
                 <a:solidFill>
                   <a:srgbClr val="000000"/>
                 </a:solidFill>
@@ -12211,7 +12211,7 @@
               </a14:hiddenLine>
             </a:ext>
             <a:ext uri="{AF507438-7753-43e0-B8FC-AC1667EBCBE1}">
-              <a14:hiddenEffects xmlns="" xmlns:a14="http://schemas.microsoft.com/office/drawing/2010/main">
+              <a14:hiddenEffects xmlns:a14="http://schemas.microsoft.com/office/drawing/2010/main" xmlns="">
                 <a:effectLst>
                   <a:outerShdw blurRad="63500" dist="38099" dir="2700000" algn="ctr" rotWithShape="0">
                     <a:srgbClr val="000000">
@@ -12260,7 +12260,7 @@
           <a:effectLst/>
           <a:extLst>
             <a:ext uri="{909E8E84-426E-40dd-AFC4-6F175D3DCCD1}">
-              <a14:hiddenFill xmlns="" xmlns:a14="http://schemas.microsoft.com/office/drawing/2010/main">
+              <a14:hiddenFill xmlns:a14="http://schemas.microsoft.com/office/drawing/2010/main" xmlns="">
                 <a:blipFill dpi="0" rotWithShape="0">
                   <a:blip/>
                   <a:srcRect/>
@@ -12271,7 +12271,7 @@
               </a14:hiddenFill>
             </a:ext>
             <a:ext uri="{91240B29-F687-4f45-9708-019B960494DF}">
-              <a14:hiddenLine xmlns="" xmlns:a14="http://schemas.microsoft.com/office/drawing/2010/main" w="9525">
+              <a14:hiddenLine xmlns:a14="http://schemas.microsoft.com/office/drawing/2010/main" xmlns="" w="9525">
                 <a:solidFill>
                   <a:srgbClr val="000000"/>
                 </a:solidFill>
@@ -12281,7 +12281,7 @@
               </a14:hiddenLine>
             </a:ext>
             <a:ext uri="{AF507438-7753-43e0-B8FC-AC1667EBCBE1}">
-              <a14:hiddenEffects xmlns="" xmlns:a14="http://schemas.microsoft.com/office/drawing/2010/main">
+              <a14:hiddenEffects xmlns:a14="http://schemas.microsoft.com/office/drawing/2010/main" xmlns="">
                 <a:effectLst>
                   <a:outerShdw blurRad="63500" dist="38099" dir="2700000" algn="ctr" rotWithShape="0">
                     <a:srgbClr val="000000">
@@ -12416,7 +12416,7 @@
             <a:effectLst/>
             <a:extLst>
               <a:ext uri="{909E8E84-426E-40dd-AFC4-6F175D3DCCD1}">
-                <a14:hiddenFill xmlns:a14="http://schemas.microsoft.com/office/drawing/2010/main" xmlns="">
+                <a14:hiddenFill xmlns="" xmlns:a14="http://schemas.microsoft.com/office/drawing/2010/main">
                   <a:blipFill dpi="0" rotWithShape="0">
                     <a:blip/>
                     <a:srcRect/>
@@ -12427,7 +12427,7 @@
                 </a14:hiddenFill>
               </a:ext>
               <a:ext uri="{91240B29-F687-4f45-9708-019B960494DF}">
-                <a14:hiddenLine xmlns:a14="http://schemas.microsoft.com/office/drawing/2010/main" xmlns="" w="9525">
+                <a14:hiddenLine xmlns="" xmlns:a14="http://schemas.microsoft.com/office/drawing/2010/main" w="9525">
                   <a:solidFill>
                     <a:srgbClr val="000000"/>
                   </a:solidFill>
@@ -12437,7 +12437,7 @@
                 </a14:hiddenLine>
               </a:ext>
               <a:ext uri="{AF507438-7753-43e0-B8FC-AC1667EBCBE1}">
-                <a14:hiddenEffects xmlns:a14="http://schemas.microsoft.com/office/drawing/2010/main" xmlns="">
+                <a14:hiddenEffects xmlns="" xmlns:a14="http://schemas.microsoft.com/office/drawing/2010/main">
                   <a:effectLst>
                     <a:outerShdw blurRad="63500" dist="38099" dir="2700000" algn="ctr" rotWithShape="0">
                       <a:srgbClr val="000000">
@@ -12486,7 +12486,7 @@
             <a:effectLst/>
             <a:extLst>
               <a:ext uri="{909E8E84-426E-40dd-AFC4-6F175D3DCCD1}">
-                <a14:hiddenFill xmlns:a14="http://schemas.microsoft.com/office/drawing/2010/main" xmlns="">
+                <a14:hiddenFill xmlns="" xmlns:a14="http://schemas.microsoft.com/office/drawing/2010/main">
                   <a:blipFill dpi="0" rotWithShape="0">
                     <a:blip/>
                     <a:srcRect/>
@@ -12497,7 +12497,7 @@
                 </a14:hiddenFill>
               </a:ext>
               <a:ext uri="{91240B29-F687-4f45-9708-019B960494DF}">
-                <a14:hiddenLine xmlns:a14="http://schemas.microsoft.com/office/drawing/2010/main" xmlns="" w="9525">
+                <a14:hiddenLine xmlns="" xmlns:a14="http://schemas.microsoft.com/office/drawing/2010/main" w="9525">
                   <a:solidFill>
                     <a:srgbClr val="000000"/>
                   </a:solidFill>
@@ -12507,7 +12507,7 @@
                 </a14:hiddenLine>
               </a:ext>
               <a:ext uri="{AF507438-7753-43e0-B8FC-AC1667EBCBE1}">
-                <a14:hiddenEffects xmlns:a14="http://schemas.microsoft.com/office/drawing/2010/main" xmlns="">
+                <a14:hiddenEffects xmlns="" xmlns:a14="http://schemas.microsoft.com/office/drawing/2010/main">
                   <a:effectLst>
                     <a:outerShdw blurRad="63500" dist="38099" dir="2700000" algn="ctr" rotWithShape="0">
                       <a:srgbClr val="000000">
@@ -12556,7 +12556,7 @@
             <a:effectLst/>
             <a:extLst>
               <a:ext uri="{909E8E84-426E-40dd-AFC4-6F175D3DCCD1}">
-                <a14:hiddenFill xmlns:a14="http://schemas.microsoft.com/office/drawing/2010/main" xmlns="">
+                <a14:hiddenFill xmlns="" xmlns:a14="http://schemas.microsoft.com/office/drawing/2010/main">
                   <a:blipFill dpi="0" rotWithShape="0">
                     <a:blip/>
                     <a:srcRect/>
@@ -12567,7 +12567,7 @@
                 </a14:hiddenFill>
               </a:ext>
               <a:ext uri="{91240B29-F687-4f45-9708-019B960494DF}">
-                <a14:hiddenLine xmlns:a14="http://schemas.microsoft.com/office/drawing/2010/main" xmlns="" w="9525">
+                <a14:hiddenLine xmlns="" xmlns:a14="http://schemas.microsoft.com/office/drawing/2010/main" w="9525">
                   <a:solidFill>
                     <a:srgbClr val="000000"/>
                   </a:solidFill>
@@ -12577,7 +12577,7 @@
                 </a14:hiddenLine>
               </a:ext>
               <a:ext uri="{AF507438-7753-43e0-B8FC-AC1667EBCBE1}">
-                <a14:hiddenEffects xmlns:a14="http://schemas.microsoft.com/office/drawing/2010/main" xmlns="">
+                <a14:hiddenEffects xmlns="" xmlns:a14="http://schemas.microsoft.com/office/drawing/2010/main">
                   <a:effectLst>
                     <a:outerShdw blurRad="63500" dist="38099" dir="2700000" algn="ctr" rotWithShape="0">
                       <a:srgbClr val="000000">
@@ -12618,12 +12618,12 @@
             <a:effectLst/>
             <a:extLst>
               <a:ext uri="{909E8E84-426E-40dd-AFC4-6F175D3DCCD1}">
-                <a14:hiddenFill xmlns:a14="http://schemas.microsoft.com/office/drawing/2010/main" xmlns="">
+                <a14:hiddenFill xmlns="" xmlns:a14="http://schemas.microsoft.com/office/drawing/2010/main">
                   <a:noFill/>
                 </a14:hiddenFill>
               </a:ext>
               <a:ext uri="{AF507438-7753-43e0-B8FC-AC1667EBCBE1}">
-                <a14:hiddenEffects xmlns:a14="http://schemas.microsoft.com/office/drawing/2010/main" xmlns="">
+                <a14:hiddenEffects xmlns="" xmlns:a14="http://schemas.microsoft.com/office/drawing/2010/main">
                   <a:effectLst>
                     <a:outerShdw blurRad="63500" dist="38099" dir="2700000" algn="ctr" rotWithShape="0">
                       <a:srgbClr val="000000">
@@ -12676,12 +12676,12 @@
             <a:effectLst/>
             <a:extLst>
               <a:ext uri="{909E8E84-426E-40dd-AFC4-6F175D3DCCD1}">
-                <a14:hiddenFill xmlns:a14="http://schemas.microsoft.com/office/drawing/2010/main" xmlns="">
+                <a14:hiddenFill xmlns="" xmlns:a14="http://schemas.microsoft.com/office/drawing/2010/main">
                   <a:noFill/>
                 </a14:hiddenFill>
               </a:ext>
               <a:ext uri="{AF507438-7753-43e0-B8FC-AC1667EBCBE1}">
-                <a14:hiddenEffects xmlns:a14="http://schemas.microsoft.com/office/drawing/2010/main" xmlns="">
+                <a14:hiddenEffects xmlns="" xmlns:a14="http://schemas.microsoft.com/office/drawing/2010/main">
                   <a:effectLst>
                     <a:outerShdw blurRad="63500" dist="38099" dir="2700000" algn="ctr" rotWithShape="0">
                       <a:srgbClr val="000000">
@@ -12734,12 +12734,12 @@
             <a:effectLst/>
             <a:extLst>
               <a:ext uri="{909E8E84-426E-40dd-AFC4-6F175D3DCCD1}">
-                <a14:hiddenFill xmlns:a14="http://schemas.microsoft.com/office/drawing/2010/main" xmlns="">
+                <a14:hiddenFill xmlns="" xmlns:a14="http://schemas.microsoft.com/office/drawing/2010/main">
                   <a:noFill/>
                 </a14:hiddenFill>
               </a:ext>
               <a:ext uri="{AF507438-7753-43e0-B8FC-AC1667EBCBE1}">
-                <a14:hiddenEffects xmlns:a14="http://schemas.microsoft.com/office/drawing/2010/main" xmlns="">
+                <a14:hiddenEffects xmlns="" xmlns:a14="http://schemas.microsoft.com/office/drawing/2010/main">
                   <a:effectLst>
                     <a:outerShdw blurRad="63500" dist="38099" dir="2700000" algn="ctr" rotWithShape="0">
                       <a:srgbClr val="000000">
@@ -12792,12 +12792,12 @@
             <a:effectLst/>
             <a:extLst>
               <a:ext uri="{909E8E84-426E-40dd-AFC4-6F175D3DCCD1}">
-                <a14:hiddenFill xmlns:a14="http://schemas.microsoft.com/office/drawing/2010/main" xmlns="">
+                <a14:hiddenFill xmlns="" xmlns:a14="http://schemas.microsoft.com/office/drawing/2010/main">
                   <a:noFill/>
                 </a14:hiddenFill>
               </a:ext>
               <a:ext uri="{AF507438-7753-43e0-B8FC-AC1667EBCBE1}">
-                <a14:hiddenEffects xmlns:a14="http://schemas.microsoft.com/office/drawing/2010/main" xmlns="">
+                <a14:hiddenEffects xmlns="" xmlns:a14="http://schemas.microsoft.com/office/drawing/2010/main">
                   <a:effectLst>
                     <a:outerShdw blurRad="63500" dist="38099" dir="2700000" algn="ctr" rotWithShape="0">
                       <a:srgbClr val="000000">
@@ -12850,12 +12850,12 @@
             <a:effectLst/>
             <a:extLst>
               <a:ext uri="{909E8E84-426E-40dd-AFC4-6F175D3DCCD1}">
-                <a14:hiddenFill xmlns:a14="http://schemas.microsoft.com/office/drawing/2010/main" xmlns="">
+                <a14:hiddenFill xmlns="" xmlns:a14="http://schemas.microsoft.com/office/drawing/2010/main">
                   <a:noFill/>
                 </a14:hiddenFill>
               </a:ext>
               <a:ext uri="{AF507438-7753-43e0-B8FC-AC1667EBCBE1}">
-                <a14:hiddenEffects xmlns:a14="http://schemas.microsoft.com/office/drawing/2010/main" xmlns="">
+                <a14:hiddenEffects xmlns="" xmlns:a14="http://schemas.microsoft.com/office/drawing/2010/main">
                   <a:effectLst>
                     <a:outerShdw blurRad="63500" dist="38099" dir="2700000" algn="ctr" rotWithShape="0">
                       <a:srgbClr val="000000">
@@ -12908,12 +12908,12 @@
             <a:effectLst/>
             <a:extLst>
               <a:ext uri="{909E8E84-426E-40dd-AFC4-6F175D3DCCD1}">
-                <a14:hiddenFill xmlns:a14="http://schemas.microsoft.com/office/drawing/2010/main" xmlns="">
+                <a14:hiddenFill xmlns="" xmlns:a14="http://schemas.microsoft.com/office/drawing/2010/main">
                   <a:noFill/>
                 </a14:hiddenFill>
               </a:ext>
               <a:ext uri="{AF507438-7753-43e0-B8FC-AC1667EBCBE1}">
-                <a14:hiddenEffects xmlns:a14="http://schemas.microsoft.com/office/drawing/2010/main" xmlns="">
+                <a14:hiddenEffects xmlns="" xmlns:a14="http://schemas.microsoft.com/office/drawing/2010/main">
                   <a:effectLst>
                     <a:outerShdw blurRad="63500" dist="38099" dir="2700000" algn="ctr" rotWithShape="0">
                       <a:srgbClr val="000000">
@@ -12966,12 +12966,12 @@
             <a:effectLst/>
             <a:extLst>
               <a:ext uri="{909E8E84-426E-40dd-AFC4-6F175D3DCCD1}">
-                <a14:hiddenFill xmlns:a14="http://schemas.microsoft.com/office/drawing/2010/main" xmlns="">
+                <a14:hiddenFill xmlns="" xmlns:a14="http://schemas.microsoft.com/office/drawing/2010/main">
                   <a:noFill/>
                 </a14:hiddenFill>
               </a:ext>
               <a:ext uri="{AF507438-7753-43e0-B8FC-AC1667EBCBE1}">
-                <a14:hiddenEffects xmlns:a14="http://schemas.microsoft.com/office/drawing/2010/main" xmlns="">
+                <a14:hiddenEffects xmlns="" xmlns:a14="http://schemas.microsoft.com/office/drawing/2010/main">
                   <a:effectLst>
                     <a:outerShdw blurRad="63500" dist="38099" dir="2700000" algn="ctr" rotWithShape="0">
                       <a:srgbClr val="000000">
@@ -13024,12 +13024,12 @@
             <a:effectLst/>
             <a:extLst>
               <a:ext uri="{909E8E84-426E-40dd-AFC4-6F175D3DCCD1}">
-                <a14:hiddenFill xmlns:a14="http://schemas.microsoft.com/office/drawing/2010/main" xmlns="">
+                <a14:hiddenFill xmlns="" xmlns:a14="http://schemas.microsoft.com/office/drawing/2010/main">
                   <a:noFill/>
                 </a14:hiddenFill>
               </a:ext>
               <a:ext uri="{AF507438-7753-43e0-B8FC-AC1667EBCBE1}">
-                <a14:hiddenEffects xmlns:a14="http://schemas.microsoft.com/office/drawing/2010/main" xmlns="">
+                <a14:hiddenEffects xmlns="" xmlns:a14="http://schemas.microsoft.com/office/drawing/2010/main">
                   <a:effectLst>
                     <a:outerShdw blurRad="63500" dist="38099" dir="2700000" algn="ctr" rotWithShape="0">
                       <a:srgbClr val="000000">
@@ -13082,12 +13082,12 @@
             <a:effectLst/>
             <a:extLst>
               <a:ext uri="{909E8E84-426E-40dd-AFC4-6F175D3DCCD1}">
-                <a14:hiddenFill xmlns:a14="http://schemas.microsoft.com/office/drawing/2010/main" xmlns="">
+                <a14:hiddenFill xmlns="" xmlns:a14="http://schemas.microsoft.com/office/drawing/2010/main">
                   <a:noFill/>
                 </a14:hiddenFill>
               </a:ext>
               <a:ext uri="{AF507438-7753-43e0-B8FC-AC1667EBCBE1}">
-                <a14:hiddenEffects xmlns:a14="http://schemas.microsoft.com/office/drawing/2010/main" xmlns="">
+                <a14:hiddenEffects xmlns="" xmlns:a14="http://schemas.microsoft.com/office/drawing/2010/main">
                   <a:effectLst>
                     <a:outerShdw blurRad="63500" dist="38099" dir="2700000" algn="ctr" rotWithShape="0">
                       <a:srgbClr val="000000">
@@ -13140,12 +13140,12 @@
             <a:effectLst/>
             <a:extLst>
               <a:ext uri="{909E8E84-426E-40dd-AFC4-6F175D3DCCD1}">
-                <a14:hiddenFill xmlns:a14="http://schemas.microsoft.com/office/drawing/2010/main" xmlns="">
+                <a14:hiddenFill xmlns="" xmlns:a14="http://schemas.microsoft.com/office/drawing/2010/main">
                   <a:noFill/>
                 </a14:hiddenFill>
               </a:ext>
               <a:ext uri="{AF507438-7753-43e0-B8FC-AC1667EBCBE1}">
-                <a14:hiddenEffects xmlns:a14="http://schemas.microsoft.com/office/drawing/2010/main" xmlns="">
+                <a14:hiddenEffects xmlns="" xmlns:a14="http://schemas.microsoft.com/office/drawing/2010/main">
                   <a:effectLst>
                     <a:outerShdw blurRad="63500" dist="38099" dir="2700000" algn="ctr" rotWithShape="0">
                       <a:srgbClr val="000000">
@@ -13206,7 +13206,7 @@
             <a:effectLst/>
             <a:extLst>
               <a:ext uri="{909E8E84-426E-40dd-AFC4-6F175D3DCCD1}">
-                <a14:hiddenFill xmlns:a14="http://schemas.microsoft.com/office/drawing/2010/main" xmlns="">
+                <a14:hiddenFill xmlns="" xmlns:a14="http://schemas.microsoft.com/office/drawing/2010/main">
                   <a:blipFill dpi="0" rotWithShape="0">
                     <a:blip/>
                     <a:srcRect/>
@@ -13217,7 +13217,7 @@
                 </a14:hiddenFill>
               </a:ext>
               <a:ext uri="{91240B29-F687-4f45-9708-019B960494DF}">
-                <a14:hiddenLine xmlns:a14="http://schemas.microsoft.com/office/drawing/2010/main" xmlns="" w="9525">
+                <a14:hiddenLine xmlns="" xmlns:a14="http://schemas.microsoft.com/office/drawing/2010/main" w="9525">
                   <a:solidFill>
                     <a:srgbClr val="000000"/>
                   </a:solidFill>
@@ -13227,7 +13227,7 @@
                 </a14:hiddenLine>
               </a:ext>
               <a:ext uri="{AF507438-7753-43e0-B8FC-AC1667EBCBE1}">
-                <a14:hiddenEffects xmlns:a14="http://schemas.microsoft.com/office/drawing/2010/main" xmlns="">
+                <a14:hiddenEffects xmlns="" xmlns:a14="http://schemas.microsoft.com/office/drawing/2010/main">
                   <a:effectLst>
                     <a:outerShdw blurRad="63500" dist="38099" dir="2700000" algn="ctr" rotWithShape="0">
                       <a:srgbClr val="000000">
@@ -13276,7 +13276,7 @@
             <a:effectLst/>
             <a:extLst>
               <a:ext uri="{909E8E84-426E-40dd-AFC4-6F175D3DCCD1}">
-                <a14:hiddenFill xmlns:a14="http://schemas.microsoft.com/office/drawing/2010/main" xmlns="">
+                <a14:hiddenFill xmlns="" xmlns:a14="http://schemas.microsoft.com/office/drawing/2010/main">
                   <a:blipFill dpi="0" rotWithShape="0">
                     <a:blip/>
                     <a:srcRect/>
@@ -13287,7 +13287,7 @@
                 </a14:hiddenFill>
               </a:ext>
               <a:ext uri="{91240B29-F687-4f45-9708-019B960494DF}">
-                <a14:hiddenLine xmlns:a14="http://schemas.microsoft.com/office/drawing/2010/main" xmlns="" w="9525">
+                <a14:hiddenLine xmlns="" xmlns:a14="http://schemas.microsoft.com/office/drawing/2010/main" w="9525">
                   <a:solidFill>
                     <a:srgbClr val="000000"/>
                   </a:solidFill>
@@ -13297,7 +13297,7 @@
                 </a14:hiddenLine>
               </a:ext>
               <a:ext uri="{AF507438-7753-43e0-B8FC-AC1667EBCBE1}">
-                <a14:hiddenEffects xmlns:a14="http://schemas.microsoft.com/office/drawing/2010/main" xmlns="">
+                <a14:hiddenEffects xmlns="" xmlns:a14="http://schemas.microsoft.com/office/drawing/2010/main">
                   <a:effectLst>
                     <a:outerShdw blurRad="63500" dist="38099" dir="2700000" algn="ctr" rotWithShape="0">
                       <a:srgbClr val="000000">
@@ -13346,7 +13346,7 @@
             <a:effectLst/>
             <a:extLst>
               <a:ext uri="{909E8E84-426E-40dd-AFC4-6F175D3DCCD1}">
-                <a14:hiddenFill xmlns:a14="http://schemas.microsoft.com/office/drawing/2010/main" xmlns="">
+                <a14:hiddenFill xmlns="" xmlns:a14="http://schemas.microsoft.com/office/drawing/2010/main">
                   <a:blipFill dpi="0" rotWithShape="0">
                     <a:blip/>
                     <a:srcRect/>
@@ -13357,7 +13357,7 @@
                 </a14:hiddenFill>
               </a:ext>
               <a:ext uri="{91240B29-F687-4f45-9708-019B960494DF}">
-                <a14:hiddenLine xmlns:a14="http://schemas.microsoft.com/office/drawing/2010/main" xmlns="" w="9525">
+                <a14:hiddenLine xmlns="" xmlns:a14="http://schemas.microsoft.com/office/drawing/2010/main" w="9525">
                   <a:solidFill>
                     <a:srgbClr val="000000"/>
                   </a:solidFill>
@@ -13367,7 +13367,7 @@
                 </a14:hiddenLine>
               </a:ext>
               <a:ext uri="{AF507438-7753-43e0-B8FC-AC1667EBCBE1}">
-                <a14:hiddenEffects xmlns:a14="http://schemas.microsoft.com/office/drawing/2010/main" xmlns="">
+                <a14:hiddenEffects xmlns="" xmlns:a14="http://schemas.microsoft.com/office/drawing/2010/main">
                   <a:effectLst>
                     <a:outerShdw blurRad="63500" dist="38099" dir="2700000" algn="ctr" rotWithShape="0">
                       <a:srgbClr val="000000">
@@ -13416,7 +13416,7 @@
             <a:effectLst/>
             <a:extLst>
               <a:ext uri="{909E8E84-426E-40dd-AFC4-6F175D3DCCD1}">
-                <a14:hiddenFill xmlns:a14="http://schemas.microsoft.com/office/drawing/2010/main" xmlns="">
+                <a14:hiddenFill xmlns="" xmlns:a14="http://schemas.microsoft.com/office/drawing/2010/main">
                   <a:blipFill dpi="0" rotWithShape="0">
                     <a:blip/>
                     <a:srcRect/>
@@ -13427,7 +13427,7 @@
                 </a14:hiddenFill>
               </a:ext>
               <a:ext uri="{91240B29-F687-4f45-9708-019B960494DF}">
-                <a14:hiddenLine xmlns:a14="http://schemas.microsoft.com/office/drawing/2010/main" xmlns="" w="9525">
+                <a14:hiddenLine xmlns="" xmlns:a14="http://schemas.microsoft.com/office/drawing/2010/main" w="9525">
                   <a:solidFill>
                     <a:srgbClr val="000000"/>
                   </a:solidFill>
@@ -13437,7 +13437,7 @@
                 </a14:hiddenLine>
               </a:ext>
               <a:ext uri="{AF507438-7753-43e0-B8FC-AC1667EBCBE1}">
-                <a14:hiddenEffects xmlns:a14="http://schemas.microsoft.com/office/drawing/2010/main" xmlns="">
+                <a14:hiddenEffects xmlns="" xmlns:a14="http://schemas.microsoft.com/office/drawing/2010/main">
                   <a:effectLst>
                     <a:outerShdw blurRad="63500" dist="38099" dir="2700000" algn="ctr" rotWithShape="0">
                       <a:srgbClr val="000000">
@@ -13486,7 +13486,7 @@
             <a:effectLst/>
             <a:extLst>
               <a:ext uri="{909E8E84-426E-40dd-AFC4-6F175D3DCCD1}">
-                <a14:hiddenFill xmlns:a14="http://schemas.microsoft.com/office/drawing/2010/main" xmlns="">
+                <a14:hiddenFill xmlns="" xmlns:a14="http://schemas.microsoft.com/office/drawing/2010/main">
                   <a:blipFill dpi="0" rotWithShape="0">
                     <a:blip/>
                     <a:srcRect/>
@@ -13497,7 +13497,7 @@
                 </a14:hiddenFill>
               </a:ext>
               <a:ext uri="{91240B29-F687-4f45-9708-019B960494DF}">
-                <a14:hiddenLine xmlns:a14="http://schemas.microsoft.com/office/drawing/2010/main" xmlns="" w="9525">
+                <a14:hiddenLine xmlns="" xmlns:a14="http://schemas.microsoft.com/office/drawing/2010/main" w="9525">
                   <a:solidFill>
                     <a:srgbClr val="000000"/>
                   </a:solidFill>
@@ -13507,7 +13507,7 @@
                 </a14:hiddenLine>
               </a:ext>
               <a:ext uri="{AF507438-7753-43e0-B8FC-AC1667EBCBE1}">
-                <a14:hiddenEffects xmlns:a14="http://schemas.microsoft.com/office/drawing/2010/main" xmlns="">
+                <a14:hiddenEffects xmlns="" xmlns:a14="http://schemas.microsoft.com/office/drawing/2010/main">
                   <a:effectLst>
                     <a:outerShdw blurRad="63500" dist="38099" dir="2700000" algn="ctr" rotWithShape="0">
                       <a:srgbClr val="000000">
@@ -13548,12 +13548,12 @@
             <a:effectLst/>
             <a:extLst>
               <a:ext uri="{909E8E84-426E-40dd-AFC4-6F175D3DCCD1}">
-                <a14:hiddenFill xmlns:a14="http://schemas.microsoft.com/office/drawing/2010/main" xmlns="">
+                <a14:hiddenFill xmlns="" xmlns:a14="http://schemas.microsoft.com/office/drawing/2010/main">
                   <a:noFill/>
                 </a14:hiddenFill>
               </a:ext>
               <a:ext uri="{AF507438-7753-43e0-B8FC-AC1667EBCBE1}">
-                <a14:hiddenEffects xmlns:a14="http://schemas.microsoft.com/office/drawing/2010/main" xmlns="">
+                <a14:hiddenEffects xmlns="" xmlns:a14="http://schemas.microsoft.com/office/drawing/2010/main">
                   <a:effectLst>
                     <a:outerShdw blurRad="63500" dist="38099" dir="2700000" algn="ctr" rotWithShape="0">
                       <a:srgbClr val="000000">
@@ -13606,12 +13606,12 @@
             <a:effectLst/>
             <a:extLst>
               <a:ext uri="{909E8E84-426E-40dd-AFC4-6F175D3DCCD1}">
-                <a14:hiddenFill xmlns:a14="http://schemas.microsoft.com/office/drawing/2010/main" xmlns="">
+                <a14:hiddenFill xmlns="" xmlns:a14="http://schemas.microsoft.com/office/drawing/2010/main">
                   <a:noFill/>
                 </a14:hiddenFill>
               </a:ext>
               <a:ext uri="{AF507438-7753-43e0-B8FC-AC1667EBCBE1}">
-                <a14:hiddenEffects xmlns:a14="http://schemas.microsoft.com/office/drawing/2010/main" xmlns="">
+                <a14:hiddenEffects xmlns="" xmlns:a14="http://schemas.microsoft.com/office/drawing/2010/main">
                   <a:effectLst>
                     <a:outerShdw blurRad="63500" dist="38099" dir="2700000" algn="ctr" rotWithShape="0">
                       <a:srgbClr val="000000">
@@ -13672,7 +13672,7 @@
             <a:effectLst/>
             <a:extLst>
               <a:ext uri="{909E8E84-426E-40dd-AFC4-6F175D3DCCD1}">
-                <a14:hiddenFill xmlns:a14="http://schemas.microsoft.com/office/drawing/2010/main" xmlns="">
+                <a14:hiddenFill xmlns="" xmlns:a14="http://schemas.microsoft.com/office/drawing/2010/main">
                   <a:blipFill dpi="0" rotWithShape="0">
                     <a:blip/>
                     <a:srcRect/>
@@ -13683,7 +13683,7 @@
                 </a14:hiddenFill>
               </a:ext>
               <a:ext uri="{91240B29-F687-4f45-9708-019B960494DF}">
-                <a14:hiddenLine xmlns:a14="http://schemas.microsoft.com/office/drawing/2010/main" xmlns="" w="9525">
+                <a14:hiddenLine xmlns="" xmlns:a14="http://schemas.microsoft.com/office/drawing/2010/main" w="9525">
                   <a:solidFill>
                     <a:srgbClr val="000000"/>
                   </a:solidFill>
@@ -13693,7 +13693,7 @@
                 </a14:hiddenLine>
               </a:ext>
               <a:ext uri="{AF507438-7753-43e0-B8FC-AC1667EBCBE1}">
-                <a14:hiddenEffects xmlns:a14="http://schemas.microsoft.com/office/drawing/2010/main" xmlns="">
+                <a14:hiddenEffects xmlns="" xmlns:a14="http://schemas.microsoft.com/office/drawing/2010/main">
                   <a:effectLst>
                     <a:outerShdw blurRad="63500" dist="38099" dir="2700000" algn="ctr" rotWithShape="0">
                       <a:srgbClr val="000000">
@@ -13826,7 +13826,7 @@
           <a:effectLst/>
           <a:extLst>
             <a:ext uri="{909E8E84-426E-40dd-AFC4-6F175D3DCCD1}">
-              <a14:hiddenFill xmlns="" xmlns:a14="http://schemas.microsoft.com/office/drawing/2010/main">
+              <a14:hiddenFill xmlns:a14="http://schemas.microsoft.com/office/drawing/2010/main" xmlns="">
                 <a:blipFill dpi="0" rotWithShape="0">
                   <a:blip/>
                   <a:srcRect/>
@@ -13837,7 +13837,7 @@
               </a14:hiddenFill>
             </a:ext>
             <a:ext uri="{91240B29-F687-4f45-9708-019B960494DF}">
-              <a14:hiddenLine xmlns="" xmlns:a14="http://schemas.microsoft.com/office/drawing/2010/main" w="9525">
+              <a14:hiddenLine xmlns:a14="http://schemas.microsoft.com/office/drawing/2010/main" xmlns="" w="9525">
                 <a:solidFill>
                   <a:srgbClr val="000000"/>
                 </a:solidFill>
@@ -13847,7 +13847,7 @@
               </a14:hiddenLine>
             </a:ext>
             <a:ext uri="{AF507438-7753-43e0-B8FC-AC1667EBCBE1}">
-              <a14:hiddenEffects xmlns="" xmlns:a14="http://schemas.microsoft.com/office/drawing/2010/main">
+              <a14:hiddenEffects xmlns:a14="http://schemas.microsoft.com/office/drawing/2010/main" xmlns="">
                 <a:effectLst>
                   <a:outerShdw blurRad="63500" dist="38099" dir="2700000" algn="ctr" rotWithShape="0">
                     <a:srgbClr val="000000">
@@ -13932,7 +13932,7 @@
           <a:effectLst/>
           <a:extLst>
             <a:ext uri="{909E8E84-426E-40dd-AFC4-6F175D3DCCD1}">
-              <a14:hiddenFill xmlns="" xmlns:a14="http://schemas.microsoft.com/office/drawing/2010/main">
+              <a14:hiddenFill xmlns:a14="http://schemas.microsoft.com/office/drawing/2010/main" xmlns="">
                 <a:blipFill dpi="0" rotWithShape="0">
                   <a:blip/>
                   <a:srcRect/>
@@ -13943,7 +13943,7 @@
               </a14:hiddenFill>
             </a:ext>
             <a:ext uri="{91240B29-F687-4f45-9708-019B960494DF}">
-              <a14:hiddenLine xmlns="" xmlns:a14="http://schemas.microsoft.com/office/drawing/2010/main" w="9525">
+              <a14:hiddenLine xmlns:a14="http://schemas.microsoft.com/office/drawing/2010/main" xmlns="" w="9525">
                 <a:solidFill>
                   <a:srgbClr val="000000"/>
                 </a:solidFill>
@@ -13953,7 +13953,7 @@
               </a14:hiddenLine>
             </a:ext>
             <a:ext uri="{AF507438-7753-43e0-B8FC-AC1667EBCBE1}">
-              <a14:hiddenEffects xmlns="" xmlns:a14="http://schemas.microsoft.com/office/drawing/2010/main">
+              <a14:hiddenEffects xmlns:a14="http://schemas.microsoft.com/office/drawing/2010/main" xmlns="">
                 <a:effectLst>
                   <a:outerShdw blurRad="63500" dist="38099" dir="2700000" algn="ctr" rotWithShape="0">
                     <a:srgbClr val="000000">
@@ -14038,7 +14038,7 @@
           <a:effectLst/>
           <a:extLst>
             <a:ext uri="{909E8E84-426E-40dd-AFC4-6F175D3DCCD1}">
-              <a14:hiddenFill xmlns="" xmlns:a14="http://schemas.microsoft.com/office/drawing/2010/main">
+              <a14:hiddenFill xmlns:a14="http://schemas.microsoft.com/office/drawing/2010/main" xmlns="">
                 <a:blipFill dpi="0" rotWithShape="0">
                   <a:blip/>
                   <a:srcRect/>
@@ -14049,7 +14049,7 @@
               </a14:hiddenFill>
             </a:ext>
             <a:ext uri="{91240B29-F687-4f45-9708-019B960494DF}">
-              <a14:hiddenLine xmlns="" xmlns:a14="http://schemas.microsoft.com/office/drawing/2010/main" w="9525">
+              <a14:hiddenLine xmlns:a14="http://schemas.microsoft.com/office/drawing/2010/main" xmlns="" w="9525">
                 <a:solidFill>
                   <a:srgbClr val="000000"/>
                 </a:solidFill>
@@ -14059,7 +14059,7 @@
               </a14:hiddenLine>
             </a:ext>
             <a:ext uri="{AF507438-7753-43e0-B8FC-AC1667EBCBE1}">
-              <a14:hiddenEffects xmlns="" xmlns:a14="http://schemas.microsoft.com/office/drawing/2010/main">
+              <a14:hiddenEffects xmlns:a14="http://schemas.microsoft.com/office/drawing/2010/main" xmlns="">
                 <a:effectLst>
                   <a:outerShdw blurRad="63500" dist="38099" dir="2700000" algn="ctr" rotWithShape="0">
                     <a:srgbClr val="000000">
@@ -14238,7 +14238,7 @@
           <a:effectLst/>
           <a:extLst>
             <a:ext uri="{909E8E84-426E-40dd-AFC4-6F175D3DCCD1}">
-              <a14:hiddenFill xmlns="" xmlns:a14="http://schemas.microsoft.com/office/drawing/2010/main">
+              <a14:hiddenFill xmlns:a14="http://schemas.microsoft.com/office/drawing/2010/main" xmlns="">
                 <a:blipFill dpi="0" rotWithShape="0">
                   <a:blip/>
                   <a:srcRect/>
@@ -14249,7 +14249,7 @@
               </a14:hiddenFill>
             </a:ext>
             <a:ext uri="{91240B29-F687-4f45-9708-019B960494DF}">
-              <a14:hiddenLine xmlns="" xmlns:a14="http://schemas.microsoft.com/office/drawing/2010/main" w="9525">
+              <a14:hiddenLine xmlns:a14="http://schemas.microsoft.com/office/drawing/2010/main" xmlns="" w="9525">
                 <a:solidFill>
                   <a:srgbClr val="000000"/>
                 </a:solidFill>
@@ -14259,7 +14259,7 @@
               </a14:hiddenLine>
             </a:ext>
             <a:ext uri="{AF507438-7753-43e0-B8FC-AC1667EBCBE1}">
-              <a14:hiddenEffects xmlns="" xmlns:a14="http://schemas.microsoft.com/office/drawing/2010/main">
+              <a14:hiddenEffects xmlns:a14="http://schemas.microsoft.com/office/drawing/2010/main" xmlns="">
                 <a:effectLst>
                   <a:outerShdw blurRad="63500" dist="38099" dir="2700000" algn="ctr" rotWithShape="0">
                     <a:srgbClr val="000000">
@@ -14337,7 +14337,7 @@
           <a:effectLst/>
           <a:extLst>
             <a:ext uri="{909E8E84-426E-40dd-AFC4-6F175D3DCCD1}">
-              <a14:hiddenFill xmlns="" xmlns:a14="http://schemas.microsoft.com/office/drawing/2010/main">
+              <a14:hiddenFill xmlns:a14="http://schemas.microsoft.com/office/drawing/2010/main" xmlns="">
                 <a:blipFill dpi="0" rotWithShape="0">
                   <a:blip/>
                   <a:srcRect/>
@@ -14348,7 +14348,7 @@
               </a14:hiddenFill>
             </a:ext>
             <a:ext uri="{91240B29-F687-4f45-9708-019B960494DF}">
-              <a14:hiddenLine xmlns="" xmlns:a14="http://schemas.microsoft.com/office/drawing/2010/main" w="9525">
+              <a14:hiddenLine xmlns:a14="http://schemas.microsoft.com/office/drawing/2010/main" xmlns="" w="9525">
                 <a:solidFill>
                   <a:srgbClr val="000000"/>
                 </a:solidFill>
@@ -14358,7 +14358,7 @@
               </a14:hiddenLine>
             </a:ext>
             <a:ext uri="{AF507438-7753-43e0-B8FC-AC1667EBCBE1}">
-              <a14:hiddenEffects xmlns="" xmlns:a14="http://schemas.microsoft.com/office/drawing/2010/main">
+              <a14:hiddenEffects xmlns:a14="http://schemas.microsoft.com/office/drawing/2010/main" xmlns="">
                 <a:effectLst>
                   <a:outerShdw blurRad="63500" dist="38099" dir="2700000" algn="ctr" rotWithShape="0">
                     <a:srgbClr val="000000">
@@ -16223,7 +16223,7 @@
           <a:effectLst/>
           <a:extLst>
             <a:ext uri="{909E8E84-426E-40dd-AFC4-6F175D3DCCD1}">
-              <a14:hiddenFill xmlns:a14="http://schemas.microsoft.com/office/drawing/2010/main" xmlns="">
+              <a14:hiddenFill xmlns="" xmlns:a14="http://schemas.microsoft.com/office/drawing/2010/main">
                 <a:blipFill dpi="0" rotWithShape="0">
                   <a:blip/>
                   <a:srcRect/>
@@ -16234,7 +16234,7 @@
               </a14:hiddenFill>
             </a:ext>
             <a:ext uri="{91240B29-F687-4f45-9708-019B960494DF}">
-              <a14:hiddenLine xmlns:a14="http://schemas.microsoft.com/office/drawing/2010/main" xmlns="" w="9525">
+              <a14:hiddenLine xmlns="" xmlns:a14="http://schemas.microsoft.com/office/drawing/2010/main" w="9525">
                 <a:solidFill>
                   <a:srgbClr val="000000"/>
                 </a:solidFill>
@@ -16244,7 +16244,7 @@
               </a14:hiddenLine>
             </a:ext>
             <a:ext uri="{AF507438-7753-43e0-B8FC-AC1667EBCBE1}">
-              <a14:hiddenEffects xmlns:a14="http://schemas.microsoft.com/office/drawing/2010/main" xmlns="">
+              <a14:hiddenEffects xmlns="" xmlns:a14="http://schemas.microsoft.com/office/drawing/2010/main">
                 <a:effectLst>
                   <a:outerShdw blurRad="63500" dist="38099" dir="2700000" algn="ctr" rotWithShape="0">
                     <a:srgbClr val="000000">
@@ -16404,7 +16404,7 @@
           <a:effectLst/>
           <a:extLst>
             <a:ext uri="{909E8E84-426E-40dd-AFC4-6F175D3DCCD1}">
-              <a14:hiddenFill xmlns:a14="http://schemas.microsoft.com/office/drawing/2010/main" xmlns="">
+              <a14:hiddenFill xmlns="" xmlns:a14="http://schemas.microsoft.com/office/drawing/2010/main">
                 <a:blipFill dpi="0" rotWithShape="0">
                   <a:blip/>
                   <a:srcRect/>
@@ -16415,7 +16415,7 @@
               </a14:hiddenFill>
             </a:ext>
             <a:ext uri="{91240B29-F687-4f45-9708-019B960494DF}">
-              <a14:hiddenLine xmlns:a14="http://schemas.microsoft.com/office/drawing/2010/main" xmlns="" w="9525">
+              <a14:hiddenLine xmlns="" xmlns:a14="http://schemas.microsoft.com/office/drawing/2010/main" w="9525">
                 <a:solidFill>
                   <a:srgbClr val="000000"/>
                 </a:solidFill>
@@ -16425,7 +16425,7 @@
               </a14:hiddenLine>
             </a:ext>
             <a:ext uri="{AF507438-7753-43e0-B8FC-AC1667EBCBE1}">
-              <a14:hiddenEffects xmlns:a14="http://schemas.microsoft.com/office/drawing/2010/main" xmlns="">
+              <a14:hiddenEffects xmlns="" xmlns:a14="http://schemas.microsoft.com/office/drawing/2010/main">
                 <a:effectLst>
                   <a:outerShdw blurRad="63500" dist="38099" dir="2700000" algn="ctr" rotWithShape="0">
                     <a:srgbClr val="000000">
@@ -18224,7 +18224,7 @@
           <a:effectLst/>
           <a:extLst>
             <a:ext uri="{909E8E84-426E-40dd-AFC4-6F175D3DCCD1}">
-              <a14:hiddenFill xmlns:a14="http://schemas.microsoft.com/office/drawing/2010/main" xmlns="">
+              <a14:hiddenFill xmlns="" xmlns:a14="http://schemas.microsoft.com/office/drawing/2010/main">
                 <a:blipFill dpi="0" rotWithShape="0">
                   <a:blip/>
                   <a:srcRect/>
@@ -18235,7 +18235,7 @@
               </a14:hiddenFill>
             </a:ext>
             <a:ext uri="{91240B29-F687-4f45-9708-019B960494DF}">
-              <a14:hiddenLine xmlns:a14="http://schemas.microsoft.com/office/drawing/2010/main" xmlns="" w="9525">
+              <a14:hiddenLine xmlns="" xmlns:a14="http://schemas.microsoft.com/office/drawing/2010/main" w="9525">
                 <a:solidFill>
                   <a:srgbClr val="000000"/>
                 </a:solidFill>
@@ -18245,7 +18245,7 @@
               </a14:hiddenLine>
             </a:ext>
             <a:ext uri="{AF507438-7753-43e0-B8FC-AC1667EBCBE1}">
-              <a14:hiddenEffects xmlns:a14="http://schemas.microsoft.com/office/drawing/2010/main" xmlns="">
+              <a14:hiddenEffects xmlns="" xmlns:a14="http://schemas.microsoft.com/office/drawing/2010/main">
                 <a:effectLst>
                   <a:outerShdw blurRad="63500" dist="38099" dir="2700000" algn="ctr" rotWithShape="0">
                     <a:srgbClr val="000000">
@@ -18338,7 +18338,7 @@
           <a:effectLst/>
           <a:extLst>
             <a:ext uri="{909E8E84-426E-40dd-AFC4-6F175D3DCCD1}">
-              <a14:hiddenFill xmlns:a14="http://schemas.microsoft.com/office/drawing/2010/main" xmlns="">
+              <a14:hiddenFill xmlns="" xmlns:a14="http://schemas.microsoft.com/office/drawing/2010/main">
                 <a:blipFill dpi="0" rotWithShape="0">
                   <a:blip/>
                   <a:srcRect/>
@@ -18349,7 +18349,7 @@
               </a14:hiddenFill>
             </a:ext>
             <a:ext uri="{91240B29-F687-4f45-9708-019B960494DF}">
-              <a14:hiddenLine xmlns:a14="http://schemas.microsoft.com/office/drawing/2010/main" xmlns="" w="9525">
+              <a14:hiddenLine xmlns="" xmlns:a14="http://schemas.microsoft.com/office/drawing/2010/main" w="9525">
                 <a:solidFill>
                   <a:srgbClr val="000000"/>
                 </a:solidFill>
@@ -18359,7 +18359,7 @@
               </a14:hiddenLine>
             </a:ext>
             <a:ext uri="{AF507438-7753-43e0-B8FC-AC1667EBCBE1}">
-              <a14:hiddenEffects xmlns:a14="http://schemas.microsoft.com/office/drawing/2010/main" xmlns="">
+              <a14:hiddenEffects xmlns="" xmlns:a14="http://schemas.microsoft.com/office/drawing/2010/main">
                 <a:effectLst>
                   <a:outerShdw blurRad="63500" dist="38099" dir="2700000" algn="ctr" rotWithShape="0">
                     <a:srgbClr val="000000">
@@ -21231,7 +21231,7 @@
           <a:effectLst/>
           <a:extLst>
             <a:ext uri="{909E8E84-426E-40dd-AFC4-6F175D3DCCD1}">
-              <a14:hiddenFill xmlns:a14="http://schemas.microsoft.com/office/drawing/2010/main" xmlns="">
+              <a14:hiddenFill xmlns="" xmlns:a14="http://schemas.microsoft.com/office/drawing/2010/main">
                 <a:blipFill dpi="0" rotWithShape="0">
                   <a:blip/>
                   <a:srcRect/>
@@ -21242,7 +21242,7 @@
               </a14:hiddenFill>
             </a:ext>
             <a:ext uri="{91240B29-F687-4f45-9708-019B960494DF}">
-              <a14:hiddenLine xmlns:a14="http://schemas.microsoft.com/office/drawing/2010/main" xmlns="" w="9525">
+              <a14:hiddenLine xmlns="" xmlns:a14="http://schemas.microsoft.com/office/drawing/2010/main" w="9525">
                 <a:solidFill>
                   <a:srgbClr val="000000"/>
                 </a:solidFill>
@@ -21252,7 +21252,7 @@
               </a14:hiddenLine>
             </a:ext>
             <a:ext uri="{AF507438-7753-43e0-B8FC-AC1667EBCBE1}">
-              <a14:hiddenEffects xmlns:a14="http://schemas.microsoft.com/office/drawing/2010/main" xmlns="">
+              <a14:hiddenEffects xmlns="" xmlns:a14="http://schemas.microsoft.com/office/drawing/2010/main">
                 <a:effectLst>
                   <a:outerShdw blurRad="63500" dist="38099" dir="2700000" algn="ctr" rotWithShape="0">
                     <a:srgbClr val="000000">
@@ -21331,7 +21331,7 @@
           <a:effectLst/>
           <a:extLst>
             <a:ext uri="{909E8E84-426E-40dd-AFC4-6F175D3DCCD1}">
-              <a14:hiddenFill xmlns:a14="http://schemas.microsoft.com/office/drawing/2010/main" xmlns="">
+              <a14:hiddenFill xmlns="" xmlns:a14="http://schemas.microsoft.com/office/drawing/2010/main">
                 <a:blipFill dpi="0" rotWithShape="0">
                   <a:blip/>
                   <a:srcRect/>
@@ -21342,7 +21342,7 @@
               </a14:hiddenFill>
             </a:ext>
             <a:ext uri="{91240B29-F687-4f45-9708-019B960494DF}">
-              <a14:hiddenLine xmlns:a14="http://schemas.microsoft.com/office/drawing/2010/main" xmlns="" w="9525">
+              <a14:hiddenLine xmlns="" xmlns:a14="http://schemas.microsoft.com/office/drawing/2010/main" w="9525">
                 <a:solidFill>
                   <a:srgbClr val="000000"/>
                 </a:solidFill>
@@ -21352,7 +21352,7 @@
               </a14:hiddenLine>
             </a:ext>
             <a:ext uri="{AF507438-7753-43e0-B8FC-AC1667EBCBE1}">
-              <a14:hiddenEffects xmlns:a14="http://schemas.microsoft.com/office/drawing/2010/main" xmlns="">
+              <a14:hiddenEffects xmlns="" xmlns:a14="http://schemas.microsoft.com/office/drawing/2010/main">
                 <a:effectLst>
                   <a:outerShdw blurRad="63500" dist="38099" dir="2700000" algn="ctr" rotWithShape="0">
                     <a:srgbClr val="000000">
@@ -22935,7 +22935,7 @@
           <a:effectLst/>
           <a:extLst>
             <a:ext uri="{909E8E84-426E-40dd-AFC4-6F175D3DCCD1}">
-              <a14:hiddenFill xmlns:a14="http://schemas.microsoft.com/office/drawing/2010/main" xmlns="">
+              <a14:hiddenFill xmlns="" xmlns:a14="http://schemas.microsoft.com/office/drawing/2010/main">
                 <a:blipFill dpi="0" rotWithShape="0">
                   <a:blip/>
                   <a:srcRect/>
@@ -22946,7 +22946,7 @@
               </a14:hiddenFill>
             </a:ext>
             <a:ext uri="{91240B29-F687-4f45-9708-019B960494DF}">
-              <a14:hiddenLine xmlns:a14="http://schemas.microsoft.com/office/drawing/2010/main" xmlns="" w="9525">
+              <a14:hiddenLine xmlns="" xmlns:a14="http://schemas.microsoft.com/office/drawing/2010/main" w="9525">
                 <a:solidFill>
                   <a:srgbClr val="000000"/>
                 </a:solidFill>
@@ -22956,7 +22956,7 @@
               </a14:hiddenLine>
             </a:ext>
             <a:ext uri="{AF507438-7753-43e0-B8FC-AC1667EBCBE1}">
-              <a14:hiddenEffects xmlns:a14="http://schemas.microsoft.com/office/drawing/2010/main" xmlns="">
+              <a14:hiddenEffects xmlns="" xmlns:a14="http://schemas.microsoft.com/office/drawing/2010/main">
                 <a:effectLst>
                   <a:outerShdw blurRad="63500" dist="38099" dir="2700000" algn="ctr" rotWithShape="0">
                     <a:srgbClr val="000000">
@@ -24604,7 +24604,7 @@
           <a:effectLst/>
           <a:extLst>
             <a:ext uri="{909E8E84-426E-40dd-AFC4-6F175D3DCCD1}">
-              <a14:hiddenFill xmlns:a14="http://schemas.microsoft.com/office/drawing/2010/main" xmlns="">
+              <a14:hiddenFill xmlns="" xmlns:a14="http://schemas.microsoft.com/office/drawing/2010/main">
                 <a:blipFill dpi="0" rotWithShape="0">
                   <a:blip/>
                   <a:srcRect/>
@@ -24615,7 +24615,7 @@
               </a14:hiddenFill>
             </a:ext>
             <a:ext uri="{91240B29-F687-4f45-9708-019B960494DF}">
-              <a14:hiddenLine xmlns:a14="http://schemas.microsoft.com/office/drawing/2010/main" xmlns="" w="9525">
+              <a14:hiddenLine xmlns="" xmlns:a14="http://schemas.microsoft.com/office/drawing/2010/main" w="9525">
                 <a:solidFill>
                   <a:srgbClr val="000000"/>
                 </a:solidFill>
@@ -24625,7 +24625,7 @@
               </a14:hiddenLine>
             </a:ext>
             <a:ext uri="{AF507438-7753-43e0-B8FC-AC1667EBCBE1}">
-              <a14:hiddenEffects xmlns:a14="http://schemas.microsoft.com/office/drawing/2010/main" xmlns="">
+              <a14:hiddenEffects xmlns="" xmlns:a14="http://schemas.microsoft.com/office/drawing/2010/main">
                 <a:effectLst>
                   <a:outerShdw blurRad="63500" dist="38099" dir="2700000" algn="ctr" rotWithShape="0">
                     <a:srgbClr val="000000">
@@ -25987,7 +25987,7 @@
           <a:effectLst/>
           <a:extLst>
             <a:ext uri="{909E8E84-426E-40dd-AFC4-6F175D3DCCD1}">
-              <a14:hiddenFill xmlns:a14="http://schemas.microsoft.com/office/drawing/2010/main" xmlns="">
+              <a14:hiddenFill xmlns="" xmlns:a14="http://schemas.microsoft.com/office/drawing/2010/main">
                 <a:blipFill dpi="0" rotWithShape="0">
                   <a:blip/>
                   <a:srcRect/>
@@ -25998,7 +25998,7 @@
               </a14:hiddenFill>
             </a:ext>
             <a:ext uri="{91240B29-F687-4f45-9708-019B960494DF}">
-              <a14:hiddenLine xmlns:a14="http://schemas.microsoft.com/office/drawing/2010/main" xmlns="" w="9525">
+              <a14:hiddenLine xmlns="" xmlns:a14="http://schemas.microsoft.com/office/drawing/2010/main" w="9525">
                 <a:solidFill>
                   <a:srgbClr val="000000"/>
                 </a:solidFill>
@@ -26008,7 +26008,7 @@
               </a14:hiddenLine>
             </a:ext>
             <a:ext uri="{AF507438-7753-43e0-B8FC-AC1667EBCBE1}">
-              <a14:hiddenEffects xmlns:a14="http://schemas.microsoft.com/office/drawing/2010/main" xmlns="">
+              <a14:hiddenEffects xmlns="" xmlns:a14="http://schemas.microsoft.com/office/drawing/2010/main">
                 <a:effectLst>
                   <a:outerShdw blurRad="63500" dist="38099" dir="2700000" algn="ctr" rotWithShape="0">
                     <a:srgbClr val="000000">
@@ -26139,7 +26139,7 @@
           <a:effectLst/>
           <a:extLst>
             <a:ext uri="{909E8E84-426E-40dd-AFC4-6F175D3DCCD1}">
-              <a14:hiddenFill xmlns:a14="http://schemas.microsoft.com/office/drawing/2010/main" xmlns="">
+              <a14:hiddenFill xmlns="" xmlns:a14="http://schemas.microsoft.com/office/drawing/2010/main">
                 <a:blipFill dpi="0" rotWithShape="0">
                   <a:blip/>
                   <a:srcRect/>
@@ -26150,7 +26150,7 @@
               </a14:hiddenFill>
             </a:ext>
             <a:ext uri="{91240B29-F687-4f45-9708-019B960494DF}">
-              <a14:hiddenLine xmlns:a14="http://schemas.microsoft.com/office/drawing/2010/main" xmlns="" w="9525">
+              <a14:hiddenLine xmlns="" xmlns:a14="http://schemas.microsoft.com/office/drawing/2010/main" w="9525">
                 <a:solidFill>
                   <a:srgbClr val="000000"/>
                 </a:solidFill>
@@ -26160,7 +26160,7 @@
               </a14:hiddenLine>
             </a:ext>
             <a:ext uri="{AF507438-7753-43e0-B8FC-AC1667EBCBE1}">
-              <a14:hiddenEffects xmlns:a14="http://schemas.microsoft.com/office/drawing/2010/main" xmlns="">
+              <a14:hiddenEffects xmlns="" xmlns:a14="http://schemas.microsoft.com/office/drawing/2010/main">
                 <a:effectLst>
                   <a:outerShdw blurRad="63500" dist="38099" dir="2700000" algn="ctr" rotWithShape="0">
                     <a:srgbClr val="000000">
@@ -28890,8 +28890,8 @@
           </a:p>
         </p:txBody>
       </p:sp>
-      <mc:AlternateContent xmlns:mc="http://schemas.openxmlformats.org/markup-compatibility/2006">
-        <mc:Choice xmlns:a14="http://schemas.microsoft.com/office/drawing/2010/main" Requires="a14">
+      <mc:AlternateContent xmlns:mc="http://schemas.openxmlformats.org/markup-compatibility/2006" xmlns:a14="http://schemas.microsoft.com/office/drawing/2010/main">
+        <mc:Choice Requires="a14">
           <p:sp>
             <p:nvSpPr>
               <p:cNvPr id="3" name="Content Placeholder 2"/>
@@ -29700,7 +29700,7 @@
             </p:txBody>
           </p:sp>
         </mc:Choice>
-        <mc:Fallback>
+        <mc:Fallback xmlns="">
           <p:sp>
             <p:nvSpPr>
               <p:cNvPr id="3" name="Content Placeholder 2"/>
@@ -33880,7 +33880,7 @@
           <a:effectLst/>
           <a:extLst>
             <a:ext uri="{909E8E84-426E-40dd-AFC4-6F175D3DCCD1}">
-              <a14:hiddenFill xmlns="" xmlns:a14="http://schemas.microsoft.com/office/drawing/2010/main">
+              <a14:hiddenFill xmlns:a14="http://schemas.microsoft.com/office/drawing/2010/main" xmlns="">
                 <a:blipFill dpi="0" rotWithShape="0">
                   <a:blip/>
                   <a:srcRect/>
@@ -33891,7 +33891,7 @@
               </a14:hiddenFill>
             </a:ext>
             <a:ext uri="{91240B29-F687-4f45-9708-019B960494DF}">
-              <a14:hiddenLine xmlns="" xmlns:a14="http://schemas.microsoft.com/office/drawing/2010/main" w="9525">
+              <a14:hiddenLine xmlns:a14="http://schemas.microsoft.com/office/drawing/2010/main" xmlns="" w="9525">
                 <a:solidFill>
                   <a:srgbClr val="000000"/>
                 </a:solidFill>
@@ -33901,7 +33901,7 @@
               </a14:hiddenLine>
             </a:ext>
             <a:ext uri="{AF507438-7753-43e0-B8FC-AC1667EBCBE1}">
-              <a14:hiddenEffects xmlns="" xmlns:a14="http://schemas.microsoft.com/office/drawing/2010/main">
+              <a14:hiddenEffects xmlns:a14="http://schemas.microsoft.com/office/drawing/2010/main" xmlns="">
                 <a:effectLst>
                   <a:outerShdw blurRad="63500" dist="38099" dir="2700000" algn="ctr" rotWithShape="0">
                     <a:srgbClr val="000000">
@@ -37702,7 +37702,7 @@
             </a:pPr>
             <a:r>
               <a:rPr lang="en-US" dirty="0"/>
-              <a:t>Core language construct: streams of tuples</a:t>
+              <a:t>Core language construct: streams of packets</a:t>
             </a:r>
           </a:p>
           <a:p>

</xml_diff>

<commit_message>
Fix terminology in cache eviction evaluation.
</commit_message>
<xml_diff>
--- a/marple.pptx
+++ b/marple.pptx
@@ -12190,7 +12190,7 @@
           <a:effectLst/>
           <a:extLst>
             <a:ext uri="{909E8E84-426E-40dd-AFC4-6F175D3DCCD1}">
-              <a14:hiddenFill xmlns:a14="http://schemas.microsoft.com/office/drawing/2010/main" xmlns="">
+              <a14:hiddenFill xmlns="" xmlns:a14="http://schemas.microsoft.com/office/drawing/2010/main">
                 <a:blipFill dpi="0" rotWithShape="0">
                   <a:blip/>
                   <a:srcRect/>
@@ -12201,7 +12201,7 @@
               </a14:hiddenFill>
             </a:ext>
             <a:ext uri="{91240B29-F687-4f45-9708-019B960494DF}">
-              <a14:hiddenLine xmlns:a14="http://schemas.microsoft.com/office/drawing/2010/main" xmlns="" w="9525">
+              <a14:hiddenLine xmlns="" xmlns:a14="http://schemas.microsoft.com/office/drawing/2010/main" w="9525">
                 <a:solidFill>
                   <a:srgbClr val="000000"/>
                 </a:solidFill>
@@ -12211,7 +12211,7 @@
               </a14:hiddenLine>
             </a:ext>
             <a:ext uri="{AF507438-7753-43e0-B8FC-AC1667EBCBE1}">
-              <a14:hiddenEffects xmlns:a14="http://schemas.microsoft.com/office/drawing/2010/main" xmlns="">
+              <a14:hiddenEffects xmlns="" xmlns:a14="http://schemas.microsoft.com/office/drawing/2010/main">
                 <a:effectLst>
                   <a:outerShdw blurRad="63500" dist="38099" dir="2700000" algn="ctr" rotWithShape="0">
                     <a:srgbClr val="000000">
@@ -12260,7 +12260,7 @@
           <a:effectLst/>
           <a:extLst>
             <a:ext uri="{909E8E84-426E-40dd-AFC4-6F175D3DCCD1}">
-              <a14:hiddenFill xmlns:a14="http://schemas.microsoft.com/office/drawing/2010/main" xmlns="">
+              <a14:hiddenFill xmlns="" xmlns:a14="http://schemas.microsoft.com/office/drawing/2010/main">
                 <a:blipFill dpi="0" rotWithShape="0">
                   <a:blip/>
                   <a:srcRect/>
@@ -12271,7 +12271,7 @@
               </a14:hiddenFill>
             </a:ext>
             <a:ext uri="{91240B29-F687-4f45-9708-019B960494DF}">
-              <a14:hiddenLine xmlns:a14="http://schemas.microsoft.com/office/drawing/2010/main" xmlns="" w="9525">
+              <a14:hiddenLine xmlns="" xmlns:a14="http://schemas.microsoft.com/office/drawing/2010/main" w="9525">
                 <a:solidFill>
                   <a:srgbClr val="000000"/>
                 </a:solidFill>
@@ -12281,7 +12281,7 @@
               </a14:hiddenLine>
             </a:ext>
             <a:ext uri="{AF507438-7753-43e0-B8FC-AC1667EBCBE1}">
-              <a14:hiddenEffects xmlns:a14="http://schemas.microsoft.com/office/drawing/2010/main" xmlns="">
+              <a14:hiddenEffects xmlns="" xmlns:a14="http://schemas.microsoft.com/office/drawing/2010/main">
                 <a:effectLst>
                   <a:outerShdw blurRad="63500" dist="38099" dir="2700000" algn="ctr" rotWithShape="0">
                     <a:srgbClr val="000000">
@@ -12416,7 +12416,7 @@
             <a:effectLst/>
             <a:extLst>
               <a:ext uri="{909E8E84-426E-40dd-AFC4-6F175D3DCCD1}">
-                <a14:hiddenFill xmlns="" xmlns:a14="http://schemas.microsoft.com/office/drawing/2010/main">
+                <a14:hiddenFill xmlns:a14="http://schemas.microsoft.com/office/drawing/2010/main" xmlns="">
                   <a:blipFill dpi="0" rotWithShape="0">
                     <a:blip/>
                     <a:srcRect/>
@@ -12427,7 +12427,7 @@
                 </a14:hiddenFill>
               </a:ext>
               <a:ext uri="{91240B29-F687-4f45-9708-019B960494DF}">
-                <a14:hiddenLine xmlns="" xmlns:a14="http://schemas.microsoft.com/office/drawing/2010/main" w="9525">
+                <a14:hiddenLine xmlns:a14="http://schemas.microsoft.com/office/drawing/2010/main" xmlns="" w="9525">
                   <a:solidFill>
                     <a:srgbClr val="000000"/>
                   </a:solidFill>
@@ -12437,7 +12437,7 @@
                 </a14:hiddenLine>
               </a:ext>
               <a:ext uri="{AF507438-7753-43e0-B8FC-AC1667EBCBE1}">
-                <a14:hiddenEffects xmlns="" xmlns:a14="http://schemas.microsoft.com/office/drawing/2010/main">
+                <a14:hiddenEffects xmlns:a14="http://schemas.microsoft.com/office/drawing/2010/main" xmlns="">
                   <a:effectLst>
                     <a:outerShdw blurRad="63500" dist="38099" dir="2700000" algn="ctr" rotWithShape="0">
                       <a:srgbClr val="000000">
@@ -12486,7 +12486,7 @@
             <a:effectLst/>
             <a:extLst>
               <a:ext uri="{909E8E84-426E-40dd-AFC4-6F175D3DCCD1}">
-                <a14:hiddenFill xmlns="" xmlns:a14="http://schemas.microsoft.com/office/drawing/2010/main">
+                <a14:hiddenFill xmlns:a14="http://schemas.microsoft.com/office/drawing/2010/main" xmlns="">
                   <a:blipFill dpi="0" rotWithShape="0">
                     <a:blip/>
                     <a:srcRect/>
@@ -12497,7 +12497,7 @@
                 </a14:hiddenFill>
               </a:ext>
               <a:ext uri="{91240B29-F687-4f45-9708-019B960494DF}">
-                <a14:hiddenLine xmlns="" xmlns:a14="http://schemas.microsoft.com/office/drawing/2010/main" w="9525">
+                <a14:hiddenLine xmlns:a14="http://schemas.microsoft.com/office/drawing/2010/main" xmlns="" w="9525">
                   <a:solidFill>
                     <a:srgbClr val="000000"/>
                   </a:solidFill>
@@ -12507,7 +12507,7 @@
                 </a14:hiddenLine>
               </a:ext>
               <a:ext uri="{AF507438-7753-43e0-B8FC-AC1667EBCBE1}">
-                <a14:hiddenEffects xmlns="" xmlns:a14="http://schemas.microsoft.com/office/drawing/2010/main">
+                <a14:hiddenEffects xmlns:a14="http://schemas.microsoft.com/office/drawing/2010/main" xmlns="">
                   <a:effectLst>
                     <a:outerShdw blurRad="63500" dist="38099" dir="2700000" algn="ctr" rotWithShape="0">
                       <a:srgbClr val="000000">
@@ -12556,7 +12556,7 @@
             <a:effectLst/>
             <a:extLst>
               <a:ext uri="{909E8E84-426E-40dd-AFC4-6F175D3DCCD1}">
-                <a14:hiddenFill xmlns="" xmlns:a14="http://schemas.microsoft.com/office/drawing/2010/main">
+                <a14:hiddenFill xmlns:a14="http://schemas.microsoft.com/office/drawing/2010/main" xmlns="">
                   <a:blipFill dpi="0" rotWithShape="0">
                     <a:blip/>
                     <a:srcRect/>
@@ -12567,7 +12567,7 @@
                 </a14:hiddenFill>
               </a:ext>
               <a:ext uri="{91240B29-F687-4f45-9708-019B960494DF}">
-                <a14:hiddenLine xmlns="" xmlns:a14="http://schemas.microsoft.com/office/drawing/2010/main" w="9525">
+                <a14:hiddenLine xmlns:a14="http://schemas.microsoft.com/office/drawing/2010/main" xmlns="" w="9525">
                   <a:solidFill>
                     <a:srgbClr val="000000"/>
                   </a:solidFill>
@@ -12577,7 +12577,7 @@
                 </a14:hiddenLine>
               </a:ext>
               <a:ext uri="{AF507438-7753-43e0-B8FC-AC1667EBCBE1}">
-                <a14:hiddenEffects xmlns="" xmlns:a14="http://schemas.microsoft.com/office/drawing/2010/main">
+                <a14:hiddenEffects xmlns:a14="http://schemas.microsoft.com/office/drawing/2010/main" xmlns="">
                   <a:effectLst>
                     <a:outerShdw blurRad="63500" dist="38099" dir="2700000" algn="ctr" rotWithShape="0">
                       <a:srgbClr val="000000">
@@ -12618,12 +12618,12 @@
             <a:effectLst/>
             <a:extLst>
               <a:ext uri="{909E8E84-426E-40dd-AFC4-6F175D3DCCD1}">
-                <a14:hiddenFill xmlns="" xmlns:a14="http://schemas.microsoft.com/office/drawing/2010/main">
+                <a14:hiddenFill xmlns:a14="http://schemas.microsoft.com/office/drawing/2010/main" xmlns="">
                   <a:noFill/>
                 </a14:hiddenFill>
               </a:ext>
               <a:ext uri="{AF507438-7753-43e0-B8FC-AC1667EBCBE1}">
-                <a14:hiddenEffects xmlns="" xmlns:a14="http://schemas.microsoft.com/office/drawing/2010/main">
+                <a14:hiddenEffects xmlns:a14="http://schemas.microsoft.com/office/drawing/2010/main" xmlns="">
                   <a:effectLst>
                     <a:outerShdw blurRad="63500" dist="38099" dir="2700000" algn="ctr" rotWithShape="0">
                       <a:srgbClr val="000000">
@@ -12676,12 +12676,12 @@
             <a:effectLst/>
             <a:extLst>
               <a:ext uri="{909E8E84-426E-40dd-AFC4-6F175D3DCCD1}">
-                <a14:hiddenFill xmlns="" xmlns:a14="http://schemas.microsoft.com/office/drawing/2010/main">
+                <a14:hiddenFill xmlns:a14="http://schemas.microsoft.com/office/drawing/2010/main" xmlns="">
                   <a:noFill/>
                 </a14:hiddenFill>
               </a:ext>
               <a:ext uri="{AF507438-7753-43e0-B8FC-AC1667EBCBE1}">
-                <a14:hiddenEffects xmlns="" xmlns:a14="http://schemas.microsoft.com/office/drawing/2010/main">
+                <a14:hiddenEffects xmlns:a14="http://schemas.microsoft.com/office/drawing/2010/main" xmlns="">
                   <a:effectLst>
                     <a:outerShdw blurRad="63500" dist="38099" dir="2700000" algn="ctr" rotWithShape="0">
                       <a:srgbClr val="000000">
@@ -12734,12 +12734,12 @@
             <a:effectLst/>
             <a:extLst>
               <a:ext uri="{909E8E84-426E-40dd-AFC4-6F175D3DCCD1}">
-                <a14:hiddenFill xmlns="" xmlns:a14="http://schemas.microsoft.com/office/drawing/2010/main">
+                <a14:hiddenFill xmlns:a14="http://schemas.microsoft.com/office/drawing/2010/main" xmlns="">
                   <a:noFill/>
                 </a14:hiddenFill>
               </a:ext>
               <a:ext uri="{AF507438-7753-43e0-B8FC-AC1667EBCBE1}">
-                <a14:hiddenEffects xmlns="" xmlns:a14="http://schemas.microsoft.com/office/drawing/2010/main">
+                <a14:hiddenEffects xmlns:a14="http://schemas.microsoft.com/office/drawing/2010/main" xmlns="">
                   <a:effectLst>
                     <a:outerShdw blurRad="63500" dist="38099" dir="2700000" algn="ctr" rotWithShape="0">
                       <a:srgbClr val="000000">
@@ -12792,12 +12792,12 @@
             <a:effectLst/>
             <a:extLst>
               <a:ext uri="{909E8E84-426E-40dd-AFC4-6F175D3DCCD1}">
-                <a14:hiddenFill xmlns="" xmlns:a14="http://schemas.microsoft.com/office/drawing/2010/main">
+                <a14:hiddenFill xmlns:a14="http://schemas.microsoft.com/office/drawing/2010/main" xmlns="">
                   <a:noFill/>
                 </a14:hiddenFill>
               </a:ext>
               <a:ext uri="{AF507438-7753-43e0-B8FC-AC1667EBCBE1}">
-                <a14:hiddenEffects xmlns="" xmlns:a14="http://schemas.microsoft.com/office/drawing/2010/main">
+                <a14:hiddenEffects xmlns:a14="http://schemas.microsoft.com/office/drawing/2010/main" xmlns="">
                   <a:effectLst>
                     <a:outerShdw blurRad="63500" dist="38099" dir="2700000" algn="ctr" rotWithShape="0">
                       <a:srgbClr val="000000">
@@ -12850,12 +12850,12 @@
             <a:effectLst/>
             <a:extLst>
               <a:ext uri="{909E8E84-426E-40dd-AFC4-6F175D3DCCD1}">
-                <a14:hiddenFill xmlns="" xmlns:a14="http://schemas.microsoft.com/office/drawing/2010/main">
+                <a14:hiddenFill xmlns:a14="http://schemas.microsoft.com/office/drawing/2010/main" xmlns="">
                   <a:noFill/>
                 </a14:hiddenFill>
               </a:ext>
               <a:ext uri="{AF507438-7753-43e0-B8FC-AC1667EBCBE1}">
-                <a14:hiddenEffects xmlns="" xmlns:a14="http://schemas.microsoft.com/office/drawing/2010/main">
+                <a14:hiddenEffects xmlns:a14="http://schemas.microsoft.com/office/drawing/2010/main" xmlns="">
                   <a:effectLst>
                     <a:outerShdw blurRad="63500" dist="38099" dir="2700000" algn="ctr" rotWithShape="0">
                       <a:srgbClr val="000000">
@@ -12908,12 +12908,12 @@
             <a:effectLst/>
             <a:extLst>
               <a:ext uri="{909E8E84-426E-40dd-AFC4-6F175D3DCCD1}">
-                <a14:hiddenFill xmlns="" xmlns:a14="http://schemas.microsoft.com/office/drawing/2010/main">
+                <a14:hiddenFill xmlns:a14="http://schemas.microsoft.com/office/drawing/2010/main" xmlns="">
                   <a:noFill/>
                 </a14:hiddenFill>
               </a:ext>
               <a:ext uri="{AF507438-7753-43e0-B8FC-AC1667EBCBE1}">
-                <a14:hiddenEffects xmlns="" xmlns:a14="http://schemas.microsoft.com/office/drawing/2010/main">
+                <a14:hiddenEffects xmlns:a14="http://schemas.microsoft.com/office/drawing/2010/main" xmlns="">
                   <a:effectLst>
                     <a:outerShdw blurRad="63500" dist="38099" dir="2700000" algn="ctr" rotWithShape="0">
                       <a:srgbClr val="000000">
@@ -12966,12 +12966,12 @@
             <a:effectLst/>
             <a:extLst>
               <a:ext uri="{909E8E84-426E-40dd-AFC4-6F175D3DCCD1}">
-                <a14:hiddenFill xmlns="" xmlns:a14="http://schemas.microsoft.com/office/drawing/2010/main">
+                <a14:hiddenFill xmlns:a14="http://schemas.microsoft.com/office/drawing/2010/main" xmlns="">
                   <a:noFill/>
                 </a14:hiddenFill>
               </a:ext>
               <a:ext uri="{AF507438-7753-43e0-B8FC-AC1667EBCBE1}">
-                <a14:hiddenEffects xmlns="" xmlns:a14="http://schemas.microsoft.com/office/drawing/2010/main">
+                <a14:hiddenEffects xmlns:a14="http://schemas.microsoft.com/office/drawing/2010/main" xmlns="">
                   <a:effectLst>
                     <a:outerShdw blurRad="63500" dist="38099" dir="2700000" algn="ctr" rotWithShape="0">
                       <a:srgbClr val="000000">
@@ -13024,12 +13024,12 @@
             <a:effectLst/>
             <a:extLst>
               <a:ext uri="{909E8E84-426E-40dd-AFC4-6F175D3DCCD1}">
-                <a14:hiddenFill xmlns="" xmlns:a14="http://schemas.microsoft.com/office/drawing/2010/main">
+                <a14:hiddenFill xmlns:a14="http://schemas.microsoft.com/office/drawing/2010/main" xmlns="">
                   <a:noFill/>
                 </a14:hiddenFill>
               </a:ext>
               <a:ext uri="{AF507438-7753-43e0-B8FC-AC1667EBCBE1}">
-                <a14:hiddenEffects xmlns="" xmlns:a14="http://schemas.microsoft.com/office/drawing/2010/main">
+                <a14:hiddenEffects xmlns:a14="http://schemas.microsoft.com/office/drawing/2010/main" xmlns="">
                   <a:effectLst>
                     <a:outerShdw blurRad="63500" dist="38099" dir="2700000" algn="ctr" rotWithShape="0">
                       <a:srgbClr val="000000">
@@ -13082,12 +13082,12 @@
             <a:effectLst/>
             <a:extLst>
               <a:ext uri="{909E8E84-426E-40dd-AFC4-6F175D3DCCD1}">
-                <a14:hiddenFill xmlns="" xmlns:a14="http://schemas.microsoft.com/office/drawing/2010/main">
+                <a14:hiddenFill xmlns:a14="http://schemas.microsoft.com/office/drawing/2010/main" xmlns="">
                   <a:noFill/>
                 </a14:hiddenFill>
               </a:ext>
               <a:ext uri="{AF507438-7753-43e0-B8FC-AC1667EBCBE1}">
-                <a14:hiddenEffects xmlns="" xmlns:a14="http://schemas.microsoft.com/office/drawing/2010/main">
+                <a14:hiddenEffects xmlns:a14="http://schemas.microsoft.com/office/drawing/2010/main" xmlns="">
                   <a:effectLst>
                     <a:outerShdw blurRad="63500" dist="38099" dir="2700000" algn="ctr" rotWithShape="0">
                       <a:srgbClr val="000000">
@@ -13140,12 +13140,12 @@
             <a:effectLst/>
             <a:extLst>
               <a:ext uri="{909E8E84-426E-40dd-AFC4-6F175D3DCCD1}">
-                <a14:hiddenFill xmlns="" xmlns:a14="http://schemas.microsoft.com/office/drawing/2010/main">
+                <a14:hiddenFill xmlns:a14="http://schemas.microsoft.com/office/drawing/2010/main" xmlns="">
                   <a:noFill/>
                 </a14:hiddenFill>
               </a:ext>
               <a:ext uri="{AF507438-7753-43e0-B8FC-AC1667EBCBE1}">
-                <a14:hiddenEffects xmlns="" xmlns:a14="http://schemas.microsoft.com/office/drawing/2010/main">
+                <a14:hiddenEffects xmlns:a14="http://schemas.microsoft.com/office/drawing/2010/main" xmlns="">
                   <a:effectLst>
                     <a:outerShdw blurRad="63500" dist="38099" dir="2700000" algn="ctr" rotWithShape="0">
                       <a:srgbClr val="000000">
@@ -13206,7 +13206,7 @@
             <a:effectLst/>
             <a:extLst>
               <a:ext uri="{909E8E84-426E-40dd-AFC4-6F175D3DCCD1}">
-                <a14:hiddenFill xmlns="" xmlns:a14="http://schemas.microsoft.com/office/drawing/2010/main">
+                <a14:hiddenFill xmlns:a14="http://schemas.microsoft.com/office/drawing/2010/main" xmlns="">
                   <a:blipFill dpi="0" rotWithShape="0">
                     <a:blip/>
                     <a:srcRect/>
@@ -13217,7 +13217,7 @@
                 </a14:hiddenFill>
               </a:ext>
               <a:ext uri="{91240B29-F687-4f45-9708-019B960494DF}">
-                <a14:hiddenLine xmlns="" xmlns:a14="http://schemas.microsoft.com/office/drawing/2010/main" w="9525">
+                <a14:hiddenLine xmlns:a14="http://schemas.microsoft.com/office/drawing/2010/main" xmlns="" w="9525">
                   <a:solidFill>
                     <a:srgbClr val="000000"/>
                   </a:solidFill>
@@ -13227,7 +13227,7 @@
                 </a14:hiddenLine>
               </a:ext>
               <a:ext uri="{AF507438-7753-43e0-B8FC-AC1667EBCBE1}">
-                <a14:hiddenEffects xmlns="" xmlns:a14="http://schemas.microsoft.com/office/drawing/2010/main">
+                <a14:hiddenEffects xmlns:a14="http://schemas.microsoft.com/office/drawing/2010/main" xmlns="">
                   <a:effectLst>
                     <a:outerShdw blurRad="63500" dist="38099" dir="2700000" algn="ctr" rotWithShape="0">
                       <a:srgbClr val="000000">
@@ -13276,7 +13276,7 @@
             <a:effectLst/>
             <a:extLst>
               <a:ext uri="{909E8E84-426E-40dd-AFC4-6F175D3DCCD1}">
-                <a14:hiddenFill xmlns="" xmlns:a14="http://schemas.microsoft.com/office/drawing/2010/main">
+                <a14:hiddenFill xmlns:a14="http://schemas.microsoft.com/office/drawing/2010/main" xmlns="">
                   <a:blipFill dpi="0" rotWithShape="0">
                     <a:blip/>
                     <a:srcRect/>
@@ -13287,7 +13287,7 @@
                 </a14:hiddenFill>
               </a:ext>
               <a:ext uri="{91240B29-F687-4f45-9708-019B960494DF}">
-                <a14:hiddenLine xmlns="" xmlns:a14="http://schemas.microsoft.com/office/drawing/2010/main" w="9525">
+                <a14:hiddenLine xmlns:a14="http://schemas.microsoft.com/office/drawing/2010/main" xmlns="" w="9525">
                   <a:solidFill>
                     <a:srgbClr val="000000"/>
                   </a:solidFill>
@@ -13297,7 +13297,7 @@
                 </a14:hiddenLine>
               </a:ext>
               <a:ext uri="{AF507438-7753-43e0-B8FC-AC1667EBCBE1}">
-                <a14:hiddenEffects xmlns="" xmlns:a14="http://schemas.microsoft.com/office/drawing/2010/main">
+                <a14:hiddenEffects xmlns:a14="http://schemas.microsoft.com/office/drawing/2010/main" xmlns="">
                   <a:effectLst>
                     <a:outerShdw blurRad="63500" dist="38099" dir="2700000" algn="ctr" rotWithShape="0">
                       <a:srgbClr val="000000">
@@ -13346,7 +13346,7 @@
             <a:effectLst/>
             <a:extLst>
               <a:ext uri="{909E8E84-426E-40dd-AFC4-6F175D3DCCD1}">
-                <a14:hiddenFill xmlns="" xmlns:a14="http://schemas.microsoft.com/office/drawing/2010/main">
+                <a14:hiddenFill xmlns:a14="http://schemas.microsoft.com/office/drawing/2010/main" xmlns="">
                   <a:blipFill dpi="0" rotWithShape="0">
                     <a:blip/>
                     <a:srcRect/>
@@ -13357,7 +13357,7 @@
                 </a14:hiddenFill>
               </a:ext>
               <a:ext uri="{91240B29-F687-4f45-9708-019B960494DF}">
-                <a14:hiddenLine xmlns="" xmlns:a14="http://schemas.microsoft.com/office/drawing/2010/main" w="9525">
+                <a14:hiddenLine xmlns:a14="http://schemas.microsoft.com/office/drawing/2010/main" xmlns="" w="9525">
                   <a:solidFill>
                     <a:srgbClr val="000000"/>
                   </a:solidFill>
@@ -13367,7 +13367,7 @@
                 </a14:hiddenLine>
               </a:ext>
               <a:ext uri="{AF507438-7753-43e0-B8FC-AC1667EBCBE1}">
-                <a14:hiddenEffects xmlns="" xmlns:a14="http://schemas.microsoft.com/office/drawing/2010/main">
+                <a14:hiddenEffects xmlns:a14="http://schemas.microsoft.com/office/drawing/2010/main" xmlns="">
                   <a:effectLst>
                     <a:outerShdw blurRad="63500" dist="38099" dir="2700000" algn="ctr" rotWithShape="0">
                       <a:srgbClr val="000000">
@@ -13416,7 +13416,7 @@
             <a:effectLst/>
             <a:extLst>
               <a:ext uri="{909E8E84-426E-40dd-AFC4-6F175D3DCCD1}">
-                <a14:hiddenFill xmlns="" xmlns:a14="http://schemas.microsoft.com/office/drawing/2010/main">
+                <a14:hiddenFill xmlns:a14="http://schemas.microsoft.com/office/drawing/2010/main" xmlns="">
                   <a:blipFill dpi="0" rotWithShape="0">
                     <a:blip/>
                     <a:srcRect/>
@@ -13427,7 +13427,7 @@
                 </a14:hiddenFill>
               </a:ext>
               <a:ext uri="{91240B29-F687-4f45-9708-019B960494DF}">
-                <a14:hiddenLine xmlns="" xmlns:a14="http://schemas.microsoft.com/office/drawing/2010/main" w="9525">
+                <a14:hiddenLine xmlns:a14="http://schemas.microsoft.com/office/drawing/2010/main" xmlns="" w="9525">
                   <a:solidFill>
                     <a:srgbClr val="000000"/>
                   </a:solidFill>
@@ -13437,7 +13437,7 @@
                 </a14:hiddenLine>
               </a:ext>
               <a:ext uri="{AF507438-7753-43e0-B8FC-AC1667EBCBE1}">
-                <a14:hiddenEffects xmlns="" xmlns:a14="http://schemas.microsoft.com/office/drawing/2010/main">
+                <a14:hiddenEffects xmlns:a14="http://schemas.microsoft.com/office/drawing/2010/main" xmlns="">
                   <a:effectLst>
                     <a:outerShdw blurRad="63500" dist="38099" dir="2700000" algn="ctr" rotWithShape="0">
                       <a:srgbClr val="000000">
@@ -13486,7 +13486,7 @@
             <a:effectLst/>
             <a:extLst>
               <a:ext uri="{909E8E84-426E-40dd-AFC4-6F175D3DCCD1}">
-                <a14:hiddenFill xmlns="" xmlns:a14="http://schemas.microsoft.com/office/drawing/2010/main">
+                <a14:hiddenFill xmlns:a14="http://schemas.microsoft.com/office/drawing/2010/main" xmlns="">
                   <a:blipFill dpi="0" rotWithShape="0">
                     <a:blip/>
                     <a:srcRect/>
@@ -13497,7 +13497,7 @@
                 </a14:hiddenFill>
               </a:ext>
               <a:ext uri="{91240B29-F687-4f45-9708-019B960494DF}">
-                <a14:hiddenLine xmlns="" xmlns:a14="http://schemas.microsoft.com/office/drawing/2010/main" w="9525">
+                <a14:hiddenLine xmlns:a14="http://schemas.microsoft.com/office/drawing/2010/main" xmlns="" w="9525">
                   <a:solidFill>
                     <a:srgbClr val="000000"/>
                   </a:solidFill>
@@ -13507,7 +13507,7 @@
                 </a14:hiddenLine>
               </a:ext>
               <a:ext uri="{AF507438-7753-43e0-B8FC-AC1667EBCBE1}">
-                <a14:hiddenEffects xmlns="" xmlns:a14="http://schemas.microsoft.com/office/drawing/2010/main">
+                <a14:hiddenEffects xmlns:a14="http://schemas.microsoft.com/office/drawing/2010/main" xmlns="">
                   <a:effectLst>
                     <a:outerShdw blurRad="63500" dist="38099" dir="2700000" algn="ctr" rotWithShape="0">
                       <a:srgbClr val="000000">
@@ -13548,12 +13548,12 @@
             <a:effectLst/>
             <a:extLst>
               <a:ext uri="{909E8E84-426E-40dd-AFC4-6F175D3DCCD1}">
-                <a14:hiddenFill xmlns="" xmlns:a14="http://schemas.microsoft.com/office/drawing/2010/main">
+                <a14:hiddenFill xmlns:a14="http://schemas.microsoft.com/office/drawing/2010/main" xmlns="">
                   <a:noFill/>
                 </a14:hiddenFill>
               </a:ext>
               <a:ext uri="{AF507438-7753-43e0-B8FC-AC1667EBCBE1}">
-                <a14:hiddenEffects xmlns="" xmlns:a14="http://schemas.microsoft.com/office/drawing/2010/main">
+                <a14:hiddenEffects xmlns:a14="http://schemas.microsoft.com/office/drawing/2010/main" xmlns="">
                   <a:effectLst>
                     <a:outerShdw blurRad="63500" dist="38099" dir="2700000" algn="ctr" rotWithShape="0">
                       <a:srgbClr val="000000">
@@ -13606,12 +13606,12 @@
             <a:effectLst/>
             <a:extLst>
               <a:ext uri="{909E8E84-426E-40dd-AFC4-6F175D3DCCD1}">
-                <a14:hiddenFill xmlns="" xmlns:a14="http://schemas.microsoft.com/office/drawing/2010/main">
+                <a14:hiddenFill xmlns:a14="http://schemas.microsoft.com/office/drawing/2010/main" xmlns="">
                   <a:noFill/>
                 </a14:hiddenFill>
               </a:ext>
               <a:ext uri="{AF507438-7753-43e0-B8FC-AC1667EBCBE1}">
-                <a14:hiddenEffects xmlns="" xmlns:a14="http://schemas.microsoft.com/office/drawing/2010/main">
+                <a14:hiddenEffects xmlns:a14="http://schemas.microsoft.com/office/drawing/2010/main" xmlns="">
                   <a:effectLst>
                     <a:outerShdw blurRad="63500" dist="38099" dir="2700000" algn="ctr" rotWithShape="0">
                       <a:srgbClr val="000000">
@@ -13672,7 +13672,7 @@
             <a:effectLst/>
             <a:extLst>
               <a:ext uri="{909E8E84-426E-40dd-AFC4-6F175D3DCCD1}">
-                <a14:hiddenFill xmlns="" xmlns:a14="http://schemas.microsoft.com/office/drawing/2010/main">
+                <a14:hiddenFill xmlns:a14="http://schemas.microsoft.com/office/drawing/2010/main" xmlns="">
                   <a:blipFill dpi="0" rotWithShape="0">
                     <a:blip/>
                     <a:srcRect/>
@@ -13683,7 +13683,7 @@
                 </a14:hiddenFill>
               </a:ext>
               <a:ext uri="{91240B29-F687-4f45-9708-019B960494DF}">
-                <a14:hiddenLine xmlns="" xmlns:a14="http://schemas.microsoft.com/office/drawing/2010/main" w="9525">
+                <a14:hiddenLine xmlns:a14="http://schemas.microsoft.com/office/drawing/2010/main" xmlns="" w="9525">
                   <a:solidFill>
                     <a:srgbClr val="000000"/>
                   </a:solidFill>
@@ -13693,7 +13693,7 @@
                 </a14:hiddenLine>
               </a:ext>
               <a:ext uri="{AF507438-7753-43e0-B8FC-AC1667EBCBE1}">
-                <a14:hiddenEffects xmlns="" xmlns:a14="http://schemas.microsoft.com/office/drawing/2010/main">
+                <a14:hiddenEffects xmlns:a14="http://schemas.microsoft.com/office/drawing/2010/main" xmlns="">
                   <a:effectLst>
                     <a:outerShdw blurRad="63500" dist="38099" dir="2700000" algn="ctr" rotWithShape="0">
                       <a:srgbClr val="000000">
@@ -13826,7 +13826,7 @@
           <a:effectLst/>
           <a:extLst>
             <a:ext uri="{909E8E84-426E-40dd-AFC4-6F175D3DCCD1}">
-              <a14:hiddenFill xmlns:a14="http://schemas.microsoft.com/office/drawing/2010/main" xmlns="">
+              <a14:hiddenFill xmlns="" xmlns:a14="http://schemas.microsoft.com/office/drawing/2010/main">
                 <a:blipFill dpi="0" rotWithShape="0">
                   <a:blip/>
                   <a:srcRect/>
@@ -13837,7 +13837,7 @@
               </a14:hiddenFill>
             </a:ext>
             <a:ext uri="{91240B29-F687-4f45-9708-019B960494DF}">
-              <a14:hiddenLine xmlns:a14="http://schemas.microsoft.com/office/drawing/2010/main" xmlns="" w="9525">
+              <a14:hiddenLine xmlns="" xmlns:a14="http://schemas.microsoft.com/office/drawing/2010/main" w="9525">
                 <a:solidFill>
                   <a:srgbClr val="000000"/>
                 </a:solidFill>
@@ -13847,7 +13847,7 @@
               </a14:hiddenLine>
             </a:ext>
             <a:ext uri="{AF507438-7753-43e0-B8FC-AC1667EBCBE1}">
-              <a14:hiddenEffects xmlns:a14="http://schemas.microsoft.com/office/drawing/2010/main" xmlns="">
+              <a14:hiddenEffects xmlns="" xmlns:a14="http://schemas.microsoft.com/office/drawing/2010/main">
                 <a:effectLst>
                   <a:outerShdw blurRad="63500" dist="38099" dir="2700000" algn="ctr" rotWithShape="0">
                     <a:srgbClr val="000000">
@@ -13932,7 +13932,7 @@
           <a:effectLst/>
           <a:extLst>
             <a:ext uri="{909E8E84-426E-40dd-AFC4-6F175D3DCCD1}">
-              <a14:hiddenFill xmlns:a14="http://schemas.microsoft.com/office/drawing/2010/main" xmlns="">
+              <a14:hiddenFill xmlns="" xmlns:a14="http://schemas.microsoft.com/office/drawing/2010/main">
                 <a:blipFill dpi="0" rotWithShape="0">
                   <a:blip/>
                   <a:srcRect/>
@@ -13943,7 +13943,7 @@
               </a14:hiddenFill>
             </a:ext>
             <a:ext uri="{91240B29-F687-4f45-9708-019B960494DF}">
-              <a14:hiddenLine xmlns:a14="http://schemas.microsoft.com/office/drawing/2010/main" xmlns="" w="9525">
+              <a14:hiddenLine xmlns="" xmlns:a14="http://schemas.microsoft.com/office/drawing/2010/main" w="9525">
                 <a:solidFill>
                   <a:srgbClr val="000000"/>
                 </a:solidFill>
@@ -13953,7 +13953,7 @@
               </a14:hiddenLine>
             </a:ext>
             <a:ext uri="{AF507438-7753-43e0-B8FC-AC1667EBCBE1}">
-              <a14:hiddenEffects xmlns:a14="http://schemas.microsoft.com/office/drawing/2010/main" xmlns="">
+              <a14:hiddenEffects xmlns="" xmlns:a14="http://schemas.microsoft.com/office/drawing/2010/main">
                 <a:effectLst>
                   <a:outerShdw blurRad="63500" dist="38099" dir="2700000" algn="ctr" rotWithShape="0">
                     <a:srgbClr val="000000">
@@ -14038,7 +14038,7 @@
           <a:effectLst/>
           <a:extLst>
             <a:ext uri="{909E8E84-426E-40dd-AFC4-6F175D3DCCD1}">
-              <a14:hiddenFill xmlns:a14="http://schemas.microsoft.com/office/drawing/2010/main" xmlns="">
+              <a14:hiddenFill xmlns="" xmlns:a14="http://schemas.microsoft.com/office/drawing/2010/main">
                 <a:blipFill dpi="0" rotWithShape="0">
                   <a:blip/>
                   <a:srcRect/>
@@ -14049,7 +14049,7 @@
               </a14:hiddenFill>
             </a:ext>
             <a:ext uri="{91240B29-F687-4f45-9708-019B960494DF}">
-              <a14:hiddenLine xmlns:a14="http://schemas.microsoft.com/office/drawing/2010/main" xmlns="" w="9525">
+              <a14:hiddenLine xmlns="" xmlns:a14="http://schemas.microsoft.com/office/drawing/2010/main" w="9525">
                 <a:solidFill>
                   <a:srgbClr val="000000"/>
                 </a:solidFill>
@@ -14059,7 +14059,7 @@
               </a14:hiddenLine>
             </a:ext>
             <a:ext uri="{AF507438-7753-43e0-B8FC-AC1667EBCBE1}">
-              <a14:hiddenEffects xmlns:a14="http://schemas.microsoft.com/office/drawing/2010/main" xmlns="">
+              <a14:hiddenEffects xmlns="" xmlns:a14="http://schemas.microsoft.com/office/drawing/2010/main">
                 <a:effectLst>
                   <a:outerShdw blurRad="63500" dist="38099" dir="2700000" algn="ctr" rotWithShape="0">
                     <a:srgbClr val="000000">
@@ -14238,7 +14238,7 @@
           <a:effectLst/>
           <a:extLst>
             <a:ext uri="{909E8E84-426E-40dd-AFC4-6F175D3DCCD1}">
-              <a14:hiddenFill xmlns:a14="http://schemas.microsoft.com/office/drawing/2010/main" xmlns="">
+              <a14:hiddenFill xmlns="" xmlns:a14="http://schemas.microsoft.com/office/drawing/2010/main">
                 <a:blipFill dpi="0" rotWithShape="0">
                   <a:blip/>
                   <a:srcRect/>
@@ -14249,7 +14249,7 @@
               </a14:hiddenFill>
             </a:ext>
             <a:ext uri="{91240B29-F687-4f45-9708-019B960494DF}">
-              <a14:hiddenLine xmlns:a14="http://schemas.microsoft.com/office/drawing/2010/main" xmlns="" w="9525">
+              <a14:hiddenLine xmlns="" xmlns:a14="http://schemas.microsoft.com/office/drawing/2010/main" w="9525">
                 <a:solidFill>
                   <a:srgbClr val="000000"/>
                 </a:solidFill>
@@ -14259,7 +14259,7 @@
               </a14:hiddenLine>
             </a:ext>
             <a:ext uri="{AF507438-7753-43e0-B8FC-AC1667EBCBE1}">
-              <a14:hiddenEffects xmlns:a14="http://schemas.microsoft.com/office/drawing/2010/main" xmlns="">
+              <a14:hiddenEffects xmlns="" xmlns:a14="http://schemas.microsoft.com/office/drawing/2010/main">
                 <a:effectLst>
                   <a:outerShdw blurRad="63500" dist="38099" dir="2700000" algn="ctr" rotWithShape="0">
                     <a:srgbClr val="000000">
@@ -14337,7 +14337,7 @@
           <a:effectLst/>
           <a:extLst>
             <a:ext uri="{909E8E84-426E-40dd-AFC4-6F175D3DCCD1}">
-              <a14:hiddenFill xmlns:a14="http://schemas.microsoft.com/office/drawing/2010/main" xmlns="">
+              <a14:hiddenFill xmlns="" xmlns:a14="http://schemas.microsoft.com/office/drawing/2010/main">
                 <a:blipFill dpi="0" rotWithShape="0">
                   <a:blip/>
                   <a:srcRect/>
@@ -14348,7 +14348,7 @@
               </a14:hiddenFill>
             </a:ext>
             <a:ext uri="{91240B29-F687-4f45-9708-019B960494DF}">
-              <a14:hiddenLine xmlns:a14="http://schemas.microsoft.com/office/drawing/2010/main" xmlns="" w="9525">
+              <a14:hiddenLine xmlns="" xmlns:a14="http://schemas.microsoft.com/office/drawing/2010/main" w="9525">
                 <a:solidFill>
                   <a:srgbClr val="000000"/>
                 </a:solidFill>
@@ -14358,7 +14358,7 @@
               </a14:hiddenLine>
             </a:ext>
             <a:ext uri="{AF507438-7753-43e0-B8FC-AC1667EBCBE1}">
-              <a14:hiddenEffects xmlns:a14="http://schemas.microsoft.com/office/drawing/2010/main" xmlns="">
+              <a14:hiddenEffects xmlns="" xmlns:a14="http://schemas.microsoft.com/office/drawing/2010/main">
                 <a:effectLst>
                   <a:outerShdw blurRad="63500" dist="38099" dir="2700000" algn="ctr" rotWithShape="0">
                     <a:srgbClr val="000000">
@@ -16223,7 +16223,7 @@
           <a:effectLst/>
           <a:extLst>
             <a:ext uri="{909E8E84-426E-40dd-AFC4-6F175D3DCCD1}">
-              <a14:hiddenFill xmlns="" xmlns:a14="http://schemas.microsoft.com/office/drawing/2010/main">
+              <a14:hiddenFill xmlns:a14="http://schemas.microsoft.com/office/drawing/2010/main" xmlns="">
                 <a:blipFill dpi="0" rotWithShape="0">
                   <a:blip/>
                   <a:srcRect/>
@@ -16234,7 +16234,7 @@
               </a14:hiddenFill>
             </a:ext>
             <a:ext uri="{91240B29-F687-4f45-9708-019B960494DF}">
-              <a14:hiddenLine xmlns="" xmlns:a14="http://schemas.microsoft.com/office/drawing/2010/main" w="9525">
+              <a14:hiddenLine xmlns:a14="http://schemas.microsoft.com/office/drawing/2010/main" xmlns="" w="9525">
                 <a:solidFill>
                   <a:srgbClr val="000000"/>
                 </a:solidFill>
@@ -16244,7 +16244,7 @@
               </a14:hiddenLine>
             </a:ext>
             <a:ext uri="{AF507438-7753-43e0-B8FC-AC1667EBCBE1}">
-              <a14:hiddenEffects xmlns="" xmlns:a14="http://schemas.microsoft.com/office/drawing/2010/main">
+              <a14:hiddenEffects xmlns:a14="http://schemas.microsoft.com/office/drawing/2010/main" xmlns="">
                 <a:effectLst>
                   <a:outerShdw blurRad="63500" dist="38099" dir="2700000" algn="ctr" rotWithShape="0">
                     <a:srgbClr val="000000">
@@ -16404,7 +16404,7 @@
           <a:effectLst/>
           <a:extLst>
             <a:ext uri="{909E8E84-426E-40dd-AFC4-6F175D3DCCD1}">
-              <a14:hiddenFill xmlns="" xmlns:a14="http://schemas.microsoft.com/office/drawing/2010/main">
+              <a14:hiddenFill xmlns:a14="http://schemas.microsoft.com/office/drawing/2010/main" xmlns="">
                 <a:blipFill dpi="0" rotWithShape="0">
                   <a:blip/>
                   <a:srcRect/>
@@ -16415,7 +16415,7 @@
               </a14:hiddenFill>
             </a:ext>
             <a:ext uri="{91240B29-F687-4f45-9708-019B960494DF}">
-              <a14:hiddenLine xmlns="" xmlns:a14="http://schemas.microsoft.com/office/drawing/2010/main" w="9525">
+              <a14:hiddenLine xmlns:a14="http://schemas.microsoft.com/office/drawing/2010/main" xmlns="" w="9525">
                 <a:solidFill>
                   <a:srgbClr val="000000"/>
                 </a:solidFill>
@@ -16425,7 +16425,7 @@
               </a14:hiddenLine>
             </a:ext>
             <a:ext uri="{AF507438-7753-43e0-B8FC-AC1667EBCBE1}">
-              <a14:hiddenEffects xmlns="" xmlns:a14="http://schemas.microsoft.com/office/drawing/2010/main">
+              <a14:hiddenEffects xmlns:a14="http://schemas.microsoft.com/office/drawing/2010/main" xmlns="">
                 <a:effectLst>
                   <a:outerShdw blurRad="63500" dist="38099" dir="2700000" algn="ctr" rotWithShape="0">
                     <a:srgbClr val="000000">
@@ -18224,7 +18224,7 @@
           <a:effectLst/>
           <a:extLst>
             <a:ext uri="{909E8E84-426E-40dd-AFC4-6F175D3DCCD1}">
-              <a14:hiddenFill xmlns="" xmlns:a14="http://schemas.microsoft.com/office/drawing/2010/main">
+              <a14:hiddenFill xmlns:a14="http://schemas.microsoft.com/office/drawing/2010/main" xmlns="">
                 <a:blipFill dpi="0" rotWithShape="0">
                   <a:blip/>
                   <a:srcRect/>
@@ -18235,7 +18235,7 @@
               </a14:hiddenFill>
             </a:ext>
             <a:ext uri="{91240B29-F687-4f45-9708-019B960494DF}">
-              <a14:hiddenLine xmlns="" xmlns:a14="http://schemas.microsoft.com/office/drawing/2010/main" w="9525">
+              <a14:hiddenLine xmlns:a14="http://schemas.microsoft.com/office/drawing/2010/main" xmlns="" w="9525">
                 <a:solidFill>
                   <a:srgbClr val="000000"/>
                 </a:solidFill>
@@ -18245,7 +18245,7 @@
               </a14:hiddenLine>
             </a:ext>
             <a:ext uri="{AF507438-7753-43e0-B8FC-AC1667EBCBE1}">
-              <a14:hiddenEffects xmlns="" xmlns:a14="http://schemas.microsoft.com/office/drawing/2010/main">
+              <a14:hiddenEffects xmlns:a14="http://schemas.microsoft.com/office/drawing/2010/main" xmlns="">
                 <a:effectLst>
                   <a:outerShdw blurRad="63500" dist="38099" dir="2700000" algn="ctr" rotWithShape="0">
                     <a:srgbClr val="000000">
@@ -18338,7 +18338,7 @@
           <a:effectLst/>
           <a:extLst>
             <a:ext uri="{909E8E84-426E-40dd-AFC4-6F175D3DCCD1}">
-              <a14:hiddenFill xmlns="" xmlns:a14="http://schemas.microsoft.com/office/drawing/2010/main">
+              <a14:hiddenFill xmlns:a14="http://schemas.microsoft.com/office/drawing/2010/main" xmlns="">
                 <a:blipFill dpi="0" rotWithShape="0">
                   <a:blip/>
                   <a:srcRect/>
@@ -18349,7 +18349,7 @@
               </a14:hiddenFill>
             </a:ext>
             <a:ext uri="{91240B29-F687-4f45-9708-019B960494DF}">
-              <a14:hiddenLine xmlns="" xmlns:a14="http://schemas.microsoft.com/office/drawing/2010/main" w="9525">
+              <a14:hiddenLine xmlns:a14="http://schemas.microsoft.com/office/drawing/2010/main" xmlns="" w="9525">
                 <a:solidFill>
                   <a:srgbClr val="000000"/>
                 </a:solidFill>
@@ -18359,7 +18359,7 @@
               </a14:hiddenLine>
             </a:ext>
             <a:ext uri="{AF507438-7753-43e0-B8FC-AC1667EBCBE1}">
-              <a14:hiddenEffects xmlns="" xmlns:a14="http://schemas.microsoft.com/office/drawing/2010/main">
+              <a14:hiddenEffects xmlns:a14="http://schemas.microsoft.com/office/drawing/2010/main" xmlns="">
                 <a:effectLst>
                   <a:outerShdw blurRad="63500" dist="38099" dir="2700000" algn="ctr" rotWithShape="0">
                     <a:srgbClr val="000000">
@@ -21231,7 +21231,7 @@
           <a:effectLst/>
           <a:extLst>
             <a:ext uri="{909E8E84-426E-40dd-AFC4-6F175D3DCCD1}">
-              <a14:hiddenFill xmlns="" xmlns:a14="http://schemas.microsoft.com/office/drawing/2010/main">
+              <a14:hiddenFill xmlns:a14="http://schemas.microsoft.com/office/drawing/2010/main" xmlns="">
                 <a:blipFill dpi="0" rotWithShape="0">
                   <a:blip/>
                   <a:srcRect/>
@@ -21242,7 +21242,7 @@
               </a14:hiddenFill>
             </a:ext>
             <a:ext uri="{91240B29-F687-4f45-9708-019B960494DF}">
-              <a14:hiddenLine xmlns="" xmlns:a14="http://schemas.microsoft.com/office/drawing/2010/main" w="9525">
+              <a14:hiddenLine xmlns:a14="http://schemas.microsoft.com/office/drawing/2010/main" xmlns="" w="9525">
                 <a:solidFill>
                   <a:srgbClr val="000000"/>
                 </a:solidFill>
@@ -21252,7 +21252,7 @@
               </a14:hiddenLine>
             </a:ext>
             <a:ext uri="{AF507438-7753-43e0-B8FC-AC1667EBCBE1}">
-              <a14:hiddenEffects xmlns="" xmlns:a14="http://schemas.microsoft.com/office/drawing/2010/main">
+              <a14:hiddenEffects xmlns:a14="http://schemas.microsoft.com/office/drawing/2010/main" xmlns="">
                 <a:effectLst>
                   <a:outerShdw blurRad="63500" dist="38099" dir="2700000" algn="ctr" rotWithShape="0">
                     <a:srgbClr val="000000">
@@ -21331,7 +21331,7 @@
           <a:effectLst/>
           <a:extLst>
             <a:ext uri="{909E8E84-426E-40dd-AFC4-6F175D3DCCD1}">
-              <a14:hiddenFill xmlns="" xmlns:a14="http://schemas.microsoft.com/office/drawing/2010/main">
+              <a14:hiddenFill xmlns:a14="http://schemas.microsoft.com/office/drawing/2010/main" xmlns="">
                 <a:blipFill dpi="0" rotWithShape="0">
                   <a:blip/>
                   <a:srcRect/>
@@ -21342,7 +21342,7 @@
               </a14:hiddenFill>
             </a:ext>
             <a:ext uri="{91240B29-F687-4f45-9708-019B960494DF}">
-              <a14:hiddenLine xmlns="" xmlns:a14="http://schemas.microsoft.com/office/drawing/2010/main" w="9525">
+              <a14:hiddenLine xmlns:a14="http://schemas.microsoft.com/office/drawing/2010/main" xmlns="" w="9525">
                 <a:solidFill>
                   <a:srgbClr val="000000"/>
                 </a:solidFill>
@@ -21352,7 +21352,7 @@
               </a14:hiddenLine>
             </a:ext>
             <a:ext uri="{AF507438-7753-43e0-B8FC-AC1667EBCBE1}">
-              <a14:hiddenEffects xmlns="" xmlns:a14="http://schemas.microsoft.com/office/drawing/2010/main">
+              <a14:hiddenEffects xmlns:a14="http://schemas.microsoft.com/office/drawing/2010/main" xmlns="">
                 <a:effectLst>
                   <a:outerShdw blurRad="63500" dist="38099" dir="2700000" algn="ctr" rotWithShape="0">
                     <a:srgbClr val="000000">
@@ -22935,7 +22935,7 @@
           <a:effectLst/>
           <a:extLst>
             <a:ext uri="{909E8E84-426E-40dd-AFC4-6F175D3DCCD1}">
-              <a14:hiddenFill xmlns="" xmlns:a14="http://schemas.microsoft.com/office/drawing/2010/main">
+              <a14:hiddenFill xmlns:a14="http://schemas.microsoft.com/office/drawing/2010/main" xmlns="">
                 <a:blipFill dpi="0" rotWithShape="0">
                   <a:blip/>
                   <a:srcRect/>
@@ -22946,7 +22946,7 @@
               </a14:hiddenFill>
             </a:ext>
             <a:ext uri="{91240B29-F687-4f45-9708-019B960494DF}">
-              <a14:hiddenLine xmlns="" xmlns:a14="http://schemas.microsoft.com/office/drawing/2010/main" w="9525">
+              <a14:hiddenLine xmlns:a14="http://schemas.microsoft.com/office/drawing/2010/main" xmlns="" w="9525">
                 <a:solidFill>
                   <a:srgbClr val="000000"/>
                 </a:solidFill>
@@ -22956,7 +22956,7 @@
               </a14:hiddenLine>
             </a:ext>
             <a:ext uri="{AF507438-7753-43e0-B8FC-AC1667EBCBE1}">
-              <a14:hiddenEffects xmlns="" xmlns:a14="http://schemas.microsoft.com/office/drawing/2010/main">
+              <a14:hiddenEffects xmlns:a14="http://schemas.microsoft.com/office/drawing/2010/main" xmlns="">
                 <a:effectLst>
                   <a:outerShdw blurRad="63500" dist="38099" dir="2700000" algn="ctr" rotWithShape="0">
                     <a:srgbClr val="000000">
@@ -24604,7 +24604,7 @@
           <a:effectLst/>
           <a:extLst>
             <a:ext uri="{909E8E84-426E-40dd-AFC4-6F175D3DCCD1}">
-              <a14:hiddenFill xmlns="" xmlns:a14="http://schemas.microsoft.com/office/drawing/2010/main">
+              <a14:hiddenFill xmlns:a14="http://schemas.microsoft.com/office/drawing/2010/main" xmlns="">
                 <a:blipFill dpi="0" rotWithShape="0">
                   <a:blip/>
                   <a:srcRect/>
@@ -24615,7 +24615,7 @@
               </a14:hiddenFill>
             </a:ext>
             <a:ext uri="{91240B29-F687-4f45-9708-019B960494DF}">
-              <a14:hiddenLine xmlns="" xmlns:a14="http://schemas.microsoft.com/office/drawing/2010/main" w="9525">
+              <a14:hiddenLine xmlns:a14="http://schemas.microsoft.com/office/drawing/2010/main" xmlns="" w="9525">
                 <a:solidFill>
                   <a:srgbClr val="000000"/>
                 </a:solidFill>
@@ -24625,7 +24625,7 @@
               </a14:hiddenLine>
             </a:ext>
             <a:ext uri="{AF507438-7753-43e0-B8FC-AC1667EBCBE1}">
-              <a14:hiddenEffects xmlns="" xmlns:a14="http://schemas.microsoft.com/office/drawing/2010/main">
+              <a14:hiddenEffects xmlns:a14="http://schemas.microsoft.com/office/drawing/2010/main" xmlns="">
                 <a:effectLst>
                   <a:outerShdw blurRad="63500" dist="38099" dir="2700000" algn="ctr" rotWithShape="0">
                     <a:srgbClr val="000000">
@@ -25987,7 +25987,7 @@
           <a:effectLst/>
           <a:extLst>
             <a:ext uri="{909E8E84-426E-40dd-AFC4-6F175D3DCCD1}">
-              <a14:hiddenFill xmlns="" xmlns:a14="http://schemas.microsoft.com/office/drawing/2010/main">
+              <a14:hiddenFill xmlns:a14="http://schemas.microsoft.com/office/drawing/2010/main" xmlns="">
                 <a:blipFill dpi="0" rotWithShape="0">
                   <a:blip/>
                   <a:srcRect/>
@@ -25998,7 +25998,7 @@
               </a14:hiddenFill>
             </a:ext>
             <a:ext uri="{91240B29-F687-4f45-9708-019B960494DF}">
-              <a14:hiddenLine xmlns="" xmlns:a14="http://schemas.microsoft.com/office/drawing/2010/main" w="9525">
+              <a14:hiddenLine xmlns:a14="http://schemas.microsoft.com/office/drawing/2010/main" xmlns="" w="9525">
                 <a:solidFill>
                   <a:srgbClr val="000000"/>
                 </a:solidFill>
@@ -26008,7 +26008,7 @@
               </a14:hiddenLine>
             </a:ext>
             <a:ext uri="{AF507438-7753-43e0-B8FC-AC1667EBCBE1}">
-              <a14:hiddenEffects xmlns="" xmlns:a14="http://schemas.microsoft.com/office/drawing/2010/main">
+              <a14:hiddenEffects xmlns:a14="http://schemas.microsoft.com/office/drawing/2010/main" xmlns="">
                 <a:effectLst>
                   <a:outerShdw blurRad="63500" dist="38099" dir="2700000" algn="ctr" rotWithShape="0">
                     <a:srgbClr val="000000">
@@ -26139,7 +26139,7 @@
           <a:effectLst/>
           <a:extLst>
             <a:ext uri="{909E8E84-426E-40dd-AFC4-6F175D3DCCD1}">
-              <a14:hiddenFill xmlns="" xmlns:a14="http://schemas.microsoft.com/office/drawing/2010/main">
+              <a14:hiddenFill xmlns:a14="http://schemas.microsoft.com/office/drawing/2010/main" xmlns="">
                 <a:blipFill dpi="0" rotWithShape="0">
                   <a:blip/>
                   <a:srcRect/>
@@ -26150,7 +26150,7 @@
               </a14:hiddenFill>
             </a:ext>
             <a:ext uri="{91240B29-F687-4f45-9708-019B960494DF}">
-              <a14:hiddenLine xmlns="" xmlns:a14="http://schemas.microsoft.com/office/drawing/2010/main" w="9525">
+              <a14:hiddenLine xmlns:a14="http://schemas.microsoft.com/office/drawing/2010/main" xmlns="" w="9525">
                 <a:solidFill>
                   <a:srgbClr val="000000"/>
                 </a:solidFill>
@@ -26160,7 +26160,7 @@
               </a14:hiddenLine>
             </a:ext>
             <a:ext uri="{AF507438-7753-43e0-B8FC-AC1667EBCBE1}">
-              <a14:hiddenEffects xmlns="" xmlns:a14="http://schemas.microsoft.com/office/drawing/2010/main">
+              <a14:hiddenEffects xmlns:a14="http://schemas.microsoft.com/office/drawing/2010/main" xmlns="">
                 <a:effectLst>
                   <a:outerShdw blurRad="63500" dist="38099" dir="2700000" algn="ctr" rotWithShape="0">
                     <a:srgbClr val="000000">
@@ -33601,11 +33601,11 @@
           <a:p>
             <a:r>
               <a:rPr lang="en-US" sz="2800" dirty="0"/>
-              <a:t>Evict K’,</a:t>
+              <a:t>Evict </a:t>
             </a:r>
             <a:r>
               <a:rPr lang="en-US" sz="2800" dirty="0" err="1"/>
-              <a:t>V’</a:t>
+              <a:t>T,S</a:t>
             </a:r>
             <a:r>
               <a:rPr lang="en-US" sz="2800" baseline="-25000" dirty="0" err="1"/>
@@ -33624,7 +33624,7 @@
         <p:spPr>
           <a:xfrm>
             <a:off x="8811244" y="2839930"/>
-            <a:ext cx="503664" cy="523220"/>
+            <a:ext cx="404278" cy="523220"/>
           </a:xfrm>
           <a:prstGeom prst="rect">
             <a:avLst/>
@@ -33642,7 +33642,7 @@
                 <a:ea typeface="Gadugi" charset="0"/>
                 <a:cs typeface="Gadugi" charset="0"/>
               </a:rPr>
-              <a:t>K’</a:t>
+              <a:t>T</a:t>
             </a:r>
           </a:p>
         </p:txBody>
@@ -33656,7 +33656,7 @@
         <p:spPr>
           <a:xfrm>
             <a:off x="9713689" y="2830092"/>
-            <a:ext cx="1010213" cy="523220"/>
+            <a:ext cx="930063" cy="523220"/>
           </a:xfrm>
           <a:prstGeom prst="rect">
             <a:avLst/>
@@ -33674,7 +33674,7 @@
                 <a:ea typeface="Gadugi" charset="0"/>
                 <a:cs typeface="Gadugi" charset="0"/>
               </a:rPr>
-              <a:t>V’</a:t>
+              <a:t>S</a:t>
             </a:r>
             <a:r>
               <a:rPr lang="en-US" sz="2800" baseline="-25000" dirty="0" err="1">
@@ -33699,7 +33699,7 @@
         <p:spPr>
           <a:xfrm>
             <a:off x="3794525" y="3646847"/>
-            <a:ext cx="444352" cy="523220"/>
+            <a:ext cx="404278" cy="523220"/>
           </a:xfrm>
           <a:prstGeom prst="rect">
             <a:avLst/>
@@ -33717,7 +33717,7 @@
                 <a:ea typeface="Gadugi" charset="0"/>
                 <a:cs typeface="Gadugi" charset="0"/>
               </a:rPr>
-              <a:t>K</a:t>
+              <a:t>T</a:t>
             </a:r>
           </a:p>
         </p:txBody>
@@ -33749,7 +33749,7 @@
                 <a:ea typeface="Gadugi" charset="0"/>
                 <a:cs typeface="Gadugi" charset="0"/>
               </a:rPr>
-              <a:t>V</a:t>
+              <a:t>S</a:t>
             </a:r>
             <a:r>
               <a:rPr lang="en-US" sz="2800" baseline="-25000" dirty="0">
@@ -33880,7 +33880,7 @@
           <a:effectLst/>
           <a:extLst>
             <a:ext uri="{909E8E84-426E-40dd-AFC4-6F175D3DCCD1}">
-              <a14:hiddenFill xmlns:a14="http://schemas.microsoft.com/office/drawing/2010/main" xmlns="">
+              <a14:hiddenFill xmlns="" xmlns:a14="http://schemas.microsoft.com/office/drawing/2010/main">
                 <a:blipFill dpi="0" rotWithShape="0">
                   <a:blip/>
                   <a:srcRect/>
@@ -33891,7 +33891,7 @@
               </a14:hiddenFill>
             </a:ext>
             <a:ext uri="{91240B29-F687-4f45-9708-019B960494DF}">
-              <a14:hiddenLine xmlns:a14="http://schemas.microsoft.com/office/drawing/2010/main" xmlns="" w="9525">
+              <a14:hiddenLine xmlns="" xmlns:a14="http://schemas.microsoft.com/office/drawing/2010/main" w="9525">
                 <a:solidFill>
                   <a:srgbClr val="000000"/>
                 </a:solidFill>
@@ -33901,7 +33901,7 @@
               </a14:hiddenLine>
             </a:ext>
             <a:ext uri="{AF507438-7753-43e0-B8FC-AC1667EBCBE1}">
-              <a14:hiddenEffects xmlns:a14="http://schemas.microsoft.com/office/drawing/2010/main" xmlns="">
+              <a14:hiddenEffects xmlns="" xmlns:a14="http://schemas.microsoft.com/office/drawing/2010/main">
                 <a:effectLst>
                   <a:outerShdw blurRad="63500" dist="38099" dir="2700000" algn="ctr" rotWithShape="0">
                     <a:srgbClr val="000000">

</xml_diff>

<commit_message>
6.4 Tbit/s should be 1 Tbit/s.
</commit_message>
<xml_diff>
--- a/marple.pptx
+++ b/marple.pptx
@@ -12190,7 +12190,7 @@
           <a:effectLst/>
           <a:extLst>
             <a:ext uri="{909E8E84-426E-40dd-AFC4-6F175D3DCCD1}">
-              <a14:hiddenFill xmlns="" xmlns:a14="http://schemas.microsoft.com/office/drawing/2010/main">
+              <a14:hiddenFill xmlns:a14="http://schemas.microsoft.com/office/drawing/2010/main" xmlns="">
                 <a:blipFill dpi="0" rotWithShape="0">
                   <a:blip/>
                   <a:srcRect/>
@@ -12201,7 +12201,7 @@
               </a14:hiddenFill>
             </a:ext>
             <a:ext uri="{91240B29-F687-4f45-9708-019B960494DF}">
-              <a14:hiddenLine xmlns="" xmlns:a14="http://schemas.microsoft.com/office/drawing/2010/main" w="9525">
+              <a14:hiddenLine xmlns:a14="http://schemas.microsoft.com/office/drawing/2010/main" xmlns="" w="9525">
                 <a:solidFill>
                   <a:srgbClr val="000000"/>
                 </a:solidFill>
@@ -12211,7 +12211,7 @@
               </a14:hiddenLine>
             </a:ext>
             <a:ext uri="{AF507438-7753-43e0-B8FC-AC1667EBCBE1}">
-              <a14:hiddenEffects xmlns="" xmlns:a14="http://schemas.microsoft.com/office/drawing/2010/main">
+              <a14:hiddenEffects xmlns:a14="http://schemas.microsoft.com/office/drawing/2010/main" xmlns="">
                 <a:effectLst>
                   <a:outerShdw blurRad="63500" dist="38099" dir="2700000" algn="ctr" rotWithShape="0">
                     <a:srgbClr val="000000">
@@ -12260,7 +12260,7 @@
           <a:effectLst/>
           <a:extLst>
             <a:ext uri="{909E8E84-426E-40dd-AFC4-6F175D3DCCD1}">
-              <a14:hiddenFill xmlns="" xmlns:a14="http://schemas.microsoft.com/office/drawing/2010/main">
+              <a14:hiddenFill xmlns:a14="http://schemas.microsoft.com/office/drawing/2010/main" xmlns="">
                 <a:blipFill dpi="0" rotWithShape="0">
                   <a:blip/>
                   <a:srcRect/>
@@ -12271,7 +12271,7 @@
               </a14:hiddenFill>
             </a:ext>
             <a:ext uri="{91240B29-F687-4f45-9708-019B960494DF}">
-              <a14:hiddenLine xmlns="" xmlns:a14="http://schemas.microsoft.com/office/drawing/2010/main" w="9525">
+              <a14:hiddenLine xmlns:a14="http://schemas.microsoft.com/office/drawing/2010/main" xmlns="" w="9525">
                 <a:solidFill>
                   <a:srgbClr val="000000"/>
                 </a:solidFill>
@@ -12281,7 +12281,7 @@
               </a14:hiddenLine>
             </a:ext>
             <a:ext uri="{AF507438-7753-43e0-B8FC-AC1667EBCBE1}">
-              <a14:hiddenEffects xmlns="" xmlns:a14="http://schemas.microsoft.com/office/drawing/2010/main">
+              <a14:hiddenEffects xmlns:a14="http://schemas.microsoft.com/office/drawing/2010/main" xmlns="">
                 <a:effectLst>
                   <a:outerShdw blurRad="63500" dist="38099" dir="2700000" algn="ctr" rotWithShape="0">
                     <a:srgbClr val="000000">
@@ -12416,7 +12416,7 @@
             <a:effectLst/>
             <a:extLst>
               <a:ext uri="{909E8E84-426E-40dd-AFC4-6F175D3DCCD1}">
-                <a14:hiddenFill xmlns:a14="http://schemas.microsoft.com/office/drawing/2010/main" xmlns="">
+                <a14:hiddenFill xmlns="" xmlns:a14="http://schemas.microsoft.com/office/drawing/2010/main">
                   <a:blipFill dpi="0" rotWithShape="0">
                     <a:blip/>
                     <a:srcRect/>
@@ -12427,7 +12427,7 @@
                 </a14:hiddenFill>
               </a:ext>
               <a:ext uri="{91240B29-F687-4f45-9708-019B960494DF}">
-                <a14:hiddenLine xmlns:a14="http://schemas.microsoft.com/office/drawing/2010/main" xmlns="" w="9525">
+                <a14:hiddenLine xmlns="" xmlns:a14="http://schemas.microsoft.com/office/drawing/2010/main" w="9525">
                   <a:solidFill>
                     <a:srgbClr val="000000"/>
                   </a:solidFill>
@@ -12437,7 +12437,7 @@
                 </a14:hiddenLine>
               </a:ext>
               <a:ext uri="{AF507438-7753-43e0-B8FC-AC1667EBCBE1}">
-                <a14:hiddenEffects xmlns:a14="http://schemas.microsoft.com/office/drawing/2010/main" xmlns="">
+                <a14:hiddenEffects xmlns="" xmlns:a14="http://schemas.microsoft.com/office/drawing/2010/main">
                   <a:effectLst>
                     <a:outerShdw blurRad="63500" dist="38099" dir="2700000" algn="ctr" rotWithShape="0">
                       <a:srgbClr val="000000">
@@ -12486,7 +12486,7 @@
             <a:effectLst/>
             <a:extLst>
               <a:ext uri="{909E8E84-426E-40dd-AFC4-6F175D3DCCD1}">
-                <a14:hiddenFill xmlns:a14="http://schemas.microsoft.com/office/drawing/2010/main" xmlns="">
+                <a14:hiddenFill xmlns="" xmlns:a14="http://schemas.microsoft.com/office/drawing/2010/main">
                   <a:blipFill dpi="0" rotWithShape="0">
                     <a:blip/>
                     <a:srcRect/>
@@ -12497,7 +12497,7 @@
                 </a14:hiddenFill>
               </a:ext>
               <a:ext uri="{91240B29-F687-4f45-9708-019B960494DF}">
-                <a14:hiddenLine xmlns:a14="http://schemas.microsoft.com/office/drawing/2010/main" xmlns="" w="9525">
+                <a14:hiddenLine xmlns="" xmlns:a14="http://schemas.microsoft.com/office/drawing/2010/main" w="9525">
                   <a:solidFill>
                     <a:srgbClr val="000000"/>
                   </a:solidFill>
@@ -12507,7 +12507,7 @@
                 </a14:hiddenLine>
               </a:ext>
               <a:ext uri="{AF507438-7753-43e0-B8FC-AC1667EBCBE1}">
-                <a14:hiddenEffects xmlns:a14="http://schemas.microsoft.com/office/drawing/2010/main" xmlns="">
+                <a14:hiddenEffects xmlns="" xmlns:a14="http://schemas.microsoft.com/office/drawing/2010/main">
                   <a:effectLst>
                     <a:outerShdw blurRad="63500" dist="38099" dir="2700000" algn="ctr" rotWithShape="0">
                       <a:srgbClr val="000000">
@@ -12556,7 +12556,7 @@
             <a:effectLst/>
             <a:extLst>
               <a:ext uri="{909E8E84-426E-40dd-AFC4-6F175D3DCCD1}">
-                <a14:hiddenFill xmlns:a14="http://schemas.microsoft.com/office/drawing/2010/main" xmlns="">
+                <a14:hiddenFill xmlns="" xmlns:a14="http://schemas.microsoft.com/office/drawing/2010/main">
                   <a:blipFill dpi="0" rotWithShape="0">
                     <a:blip/>
                     <a:srcRect/>
@@ -12567,7 +12567,7 @@
                 </a14:hiddenFill>
               </a:ext>
               <a:ext uri="{91240B29-F687-4f45-9708-019B960494DF}">
-                <a14:hiddenLine xmlns:a14="http://schemas.microsoft.com/office/drawing/2010/main" xmlns="" w="9525">
+                <a14:hiddenLine xmlns="" xmlns:a14="http://schemas.microsoft.com/office/drawing/2010/main" w="9525">
                   <a:solidFill>
                     <a:srgbClr val="000000"/>
                   </a:solidFill>
@@ -12577,7 +12577,7 @@
                 </a14:hiddenLine>
               </a:ext>
               <a:ext uri="{AF507438-7753-43e0-B8FC-AC1667EBCBE1}">
-                <a14:hiddenEffects xmlns:a14="http://schemas.microsoft.com/office/drawing/2010/main" xmlns="">
+                <a14:hiddenEffects xmlns="" xmlns:a14="http://schemas.microsoft.com/office/drawing/2010/main">
                   <a:effectLst>
                     <a:outerShdw blurRad="63500" dist="38099" dir="2700000" algn="ctr" rotWithShape="0">
                       <a:srgbClr val="000000">
@@ -12618,12 +12618,12 @@
             <a:effectLst/>
             <a:extLst>
               <a:ext uri="{909E8E84-426E-40dd-AFC4-6F175D3DCCD1}">
-                <a14:hiddenFill xmlns:a14="http://schemas.microsoft.com/office/drawing/2010/main" xmlns="">
+                <a14:hiddenFill xmlns="" xmlns:a14="http://schemas.microsoft.com/office/drawing/2010/main">
                   <a:noFill/>
                 </a14:hiddenFill>
               </a:ext>
               <a:ext uri="{AF507438-7753-43e0-B8FC-AC1667EBCBE1}">
-                <a14:hiddenEffects xmlns:a14="http://schemas.microsoft.com/office/drawing/2010/main" xmlns="">
+                <a14:hiddenEffects xmlns="" xmlns:a14="http://schemas.microsoft.com/office/drawing/2010/main">
                   <a:effectLst>
                     <a:outerShdw blurRad="63500" dist="38099" dir="2700000" algn="ctr" rotWithShape="0">
                       <a:srgbClr val="000000">
@@ -12676,12 +12676,12 @@
             <a:effectLst/>
             <a:extLst>
               <a:ext uri="{909E8E84-426E-40dd-AFC4-6F175D3DCCD1}">
-                <a14:hiddenFill xmlns:a14="http://schemas.microsoft.com/office/drawing/2010/main" xmlns="">
+                <a14:hiddenFill xmlns="" xmlns:a14="http://schemas.microsoft.com/office/drawing/2010/main">
                   <a:noFill/>
                 </a14:hiddenFill>
               </a:ext>
               <a:ext uri="{AF507438-7753-43e0-B8FC-AC1667EBCBE1}">
-                <a14:hiddenEffects xmlns:a14="http://schemas.microsoft.com/office/drawing/2010/main" xmlns="">
+                <a14:hiddenEffects xmlns="" xmlns:a14="http://schemas.microsoft.com/office/drawing/2010/main">
                   <a:effectLst>
                     <a:outerShdw blurRad="63500" dist="38099" dir="2700000" algn="ctr" rotWithShape="0">
                       <a:srgbClr val="000000">
@@ -12734,12 +12734,12 @@
             <a:effectLst/>
             <a:extLst>
               <a:ext uri="{909E8E84-426E-40dd-AFC4-6F175D3DCCD1}">
-                <a14:hiddenFill xmlns:a14="http://schemas.microsoft.com/office/drawing/2010/main" xmlns="">
+                <a14:hiddenFill xmlns="" xmlns:a14="http://schemas.microsoft.com/office/drawing/2010/main">
                   <a:noFill/>
                 </a14:hiddenFill>
               </a:ext>
               <a:ext uri="{AF507438-7753-43e0-B8FC-AC1667EBCBE1}">
-                <a14:hiddenEffects xmlns:a14="http://schemas.microsoft.com/office/drawing/2010/main" xmlns="">
+                <a14:hiddenEffects xmlns="" xmlns:a14="http://schemas.microsoft.com/office/drawing/2010/main">
                   <a:effectLst>
                     <a:outerShdw blurRad="63500" dist="38099" dir="2700000" algn="ctr" rotWithShape="0">
                       <a:srgbClr val="000000">
@@ -12792,12 +12792,12 @@
             <a:effectLst/>
             <a:extLst>
               <a:ext uri="{909E8E84-426E-40dd-AFC4-6F175D3DCCD1}">
-                <a14:hiddenFill xmlns:a14="http://schemas.microsoft.com/office/drawing/2010/main" xmlns="">
+                <a14:hiddenFill xmlns="" xmlns:a14="http://schemas.microsoft.com/office/drawing/2010/main">
                   <a:noFill/>
                 </a14:hiddenFill>
               </a:ext>
               <a:ext uri="{AF507438-7753-43e0-B8FC-AC1667EBCBE1}">
-                <a14:hiddenEffects xmlns:a14="http://schemas.microsoft.com/office/drawing/2010/main" xmlns="">
+                <a14:hiddenEffects xmlns="" xmlns:a14="http://schemas.microsoft.com/office/drawing/2010/main">
                   <a:effectLst>
                     <a:outerShdw blurRad="63500" dist="38099" dir="2700000" algn="ctr" rotWithShape="0">
                       <a:srgbClr val="000000">
@@ -12850,12 +12850,12 @@
             <a:effectLst/>
             <a:extLst>
               <a:ext uri="{909E8E84-426E-40dd-AFC4-6F175D3DCCD1}">
-                <a14:hiddenFill xmlns:a14="http://schemas.microsoft.com/office/drawing/2010/main" xmlns="">
+                <a14:hiddenFill xmlns="" xmlns:a14="http://schemas.microsoft.com/office/drawing/2010/main">
                   <a:noFill/>
                 </a14:hiddenFill>
               </a:ext>
               <a:ext uri="{AF507438-7753-43e0-B8FC-AC1667EBCBE1}">
-                <a14:hiddenEffects xmlns:a14="http://schemas.microsoft.com/office/drawing/2010/main" xmlns="">
+                <a14:hiddenEffects xmlns="" xmlns:a14="http://schemas.microsoft.com/office/drawing/2010/main">
                   <a:effectLst>
                     <a:outerShdw blurRad="63500" dist="38099" dir="2700000" algn="ctr" rotWithShape="0">
                       <a:srgbClr val="000000">
@@ -12908,12 +12908,12 @@
             <a:effectLst/>
             <a:extLst>
               <a:ext uri="{909E8E84-426E-40dd-AFC4-6F175D3DCCD1}">
-                <a14:hiddenFill xmlns:a14="http://schemas.microsoft.com/office/drawing/2010/main" xmlns="">
+                <a14:hiddenFill xmlns="" xmlns:a14="http://schemas.microsoft.com/office/drawing/2010/main">
                   <a:noFill/>
                 </a14:hiddenFill>
               </a:ext>
               <a:ext uri="{AF507438-7753-43e0-B8FC-AC1667EBCBE1}">
-                <a14:hiddenEffects xmlns:a14="http://schemas.microsoft.com/office/drawing/2010/main" xmlns="">
+                <a14:hiddenEffects xmlns="" xmlns:a14="http://schemas.microsoft.com/office/drawing/2010/main">
                   <a:effectLst>
                     <a:outerShdw blurRad="63500" dist="38099" dir="2700000" algn="ctr" rotWithShape="0">
                       <a:srgbClr val="000000">
@@ -12966,12 +12966,12 @@
             <a:effectLst/>
             <a:extLst>
               <a:ext uri="{909E8E84-426E-40dd-AFC4-6F175D3DCCD1}">
-                <a14:hiddenFill xmlns:a14="http://schemas.microsoft.com/office/drawing/2010/main" xmlns="">
+                <a14:hiddenFill xmlns="" xmlns:a14="http://schemas.microsoft.com/office/drawing/2010/main">
                   <a:noFill/>
                 </a14:hiddenFill>
               </a:ext>
               <a:ext uri="{AF507438-7753-43e0-B8FC-AC1667EBCBE1}">
-                <a14:hiddenEffects xmlns:a14="http://schemas.microsoft.com/office/drawing/2010/main" xmlns="">
+                <a14:hiddenEffects xmlns="" xmlns:a14="http://schemas.microsoft.com/office/drawing/2010/main">
                   <a:effectLst>
                     <a:outerShdw blurRad="63500" dist="38099" dir="2700000" algn="ctr" rotWithShape="0">
                       <a:srgbClr val="000000">
@@ -13024,12 +13024,12 @@
             <a:effectLst/>
             <a:extLst>
               <a:ext uri="{909E8E84-426E-40dd-AFC4-6F175D3DCCD1}">
-                <a14:hiddenFill xmlns:a14="http://schemas.microsoft.com/office/drawing/2010/main" xmlns="">
+                <a14:hiddenFill xmlns="" xmlns:a14="http://schemas.microsoft.com/office/drawing/2010/main">
                   <a:noFill/>
                 </a14:hiddenFill>
               </a:ext>
               <a:ext uri="{AF507438-7753-43e0-B8FC-AC1667EBCBE1}">
-                <a14:hiddenEffects xmlns:a14="http://schemas.microsoft.com/office/drawing/2010/main" xmlns="">
+                <a14:hiddenEffects xmlns="" xmlns:a14="http://schemas.microsoft.com/office/drawing/2010/main">
                   <a:effectLst>
                     <a:outerShdw blurRad="63500" dist="38099" dir="2700000" algn="ctr" rotWithShape="0">
                       <a:srgbClr val="000000">
@@ -13082,12 +13082,12 @@
             <a:effectLst/>
             <a:extLst>
               <a:ext uri="{909E8E84-426E-40dd-AFC4-6F175D3DCCD1}">
-                <a14:hiddenFill xmlns:a14="http://schemas.microsoft.com/office/drawing/2010/main" xmlns="">
+                <a14:hiddenFill xmlns="" xmlns:a14="http://schemas.microsoft.com/office/drawing/2010/main">
                   <a:noFill/>
                 </a14:hiddenFill>
               </a:ext>
               <a:ext uri="{AF507438-7753-43e0-B8FC-AC1667EBCBE1}">
-                <a14:hiddenEffects xmlns:a14="http://schemas.microsoft.com/office/drawing/2010/main" xmlns="">
+                <a14:hiddenEffects xmlns="" xmlns:a14="http://schemas.microsoft.com/office/drawing/2010/main">
                   <a:effectLst>
                     <a:outerShdw blurRad="63500" dist="38099" dir="2700000" algn="ctr" rotWithShape="0">
                       <a:srgbClr val="000000">
@@ -13140,12 +13140,12 @@
             <a:effectLst/>
             <a:extLst>
               <a:ext uri="{909E8E84-426E-40dd-AFC4-6F175D3DCCD1}">
-                <a14:hiddenFill xmlns:a14="http://schemas.microsoft.com/office/drawing/2010/main" xmlns="">
+                <a14:hiddenFill xmlns="" xmlns:a14="http://schemas.microsoft.com/office/drawing/2010/main">
                   <a:noFill/>
                 </a14:hiddenFill>
               </a:ext>
               <a:ext uri="{AF507438-7753-43e0-B8FC-AC1667EBCBE1}">
-                <a14:hiddenEffects xmlns:a14="http://schemas.microsoft.com/office/drawing/2010/main" xmlns="">
+                <a14:hiddenEffects xmlns="" xmlns:a14="http://schemas.microsoft.com/office/drawing/2010/main">
                   <a:effectLst>
                     <a:outerShdw blurRad="63500" dist="38099" dir="2700000" algn="ctr" rotWithShape="0">
                       <a:srgbClr val="000000">
@@ -13206,7 +13206,7 @@
             <a:effectLst/>
             <a:extLst>
               <a:ext uri="{909E8E84-426E-40dd-AFC4-6F175D3DCCD1}">
-                <a14:hiddenFill xmlns:a14="http://schemas.microsoft.com/office/drawing/2010/main" xmlns="">
+                <a14:hiddenFill xmlns="" xmlns:a14="http://schemas.microsoft.com/office/drawing/2010/main">
                   <a:blipFill dpi="0" rotWithShape="0">
                     <a:blip/>
                     <a:srcRect/>
@@ -13217,7 +13217,7 @@
                 </a14:hiddenFill>
               </a:ext>
               <a:ext uri="{91240B29-F687-4f45-9708-019B960494DF}">
-                <a14:hiddenLine xmlns:a14="http://schemas.microsoft.com/office/drawing/2010/main" xmlns="" w="9525">
+                <a14:hiddenLine xmlns="" xmlns:a14="http://schemas.microsoft.com/office/drawing/2010/main" w="9525">
                   <a:solidFill>
                     <a:srgbClr val="000000"/>
                   </a:solidFill>
@@ -13227,7 +13227,7 @@
                 </a14:hiddenLine>
               </a:ext>
               <a:ext uri="{AF507438-7753-43e0-B8FC-AC1667EBCBE1}">
-                <a14:hiddenEffects xmlns:a14="http://schemas.microsoft.com/office/drawing/2010/main" xmlns="">
+                <a14:hiddenEffects xmlns="" xmlns:a14="http://schemas.microsoft.com/office/drawing/2010/main">
                   <a:effectLst>
                     <a:outerShdw blurRad="63500" dist="38099" dir="2700000" algn="ctr" rotWithShape="0">
                       <a:srgbClr val="000000">
@@ -13276,7 +13276,7 @@
             <a:effectLst/>
             <a:extLst>
               <a:ext uri="{909E8E84-426E-40dd-AFC4-6F175D3DCCD1}">
-                <a14:hiddenFill xmlns:a14="http://schemas.microsoft.com/office/drawing/2010/main" xmlns="">
+                <a14:hiddenFill xmlns="" xmlns:a14="http://schemas.microsoft.com/office/drawing/2010/main">
                   <a:blipFill dpi="0" rotWithShape="0">
                     <a:blip/>
                     <a:srcRect/>
@@ -13287,7 +13287,7 @@
                 </a14:hiddenFill>
               </a:ext>
               <a:ext uri="{91240B29-F687-4f45-9708-019B960494DF}">
-                <a14:hiddenLine xmlns:a14="http://schemas.microsoft.com/office/drawing/2010/main" xmlns="" w="9525">
+                <a14:hiddenLine xmlns="" xmlns:a14="http://schemas.microsoft.com/office/drawing/2010/main" w="9525">
                   <a:solidFill>
                     <a:srgbClr val="000000"/>
                   </a:solidFill>
@@ -13297,7 +13297,7 @@
                 </a14:hiddenLine>
               </a:ext>
               <a:ext uri="{AF507438-7753-43e0-B8FC-AC1667EBCBE1}">
-                <a14:hiddenEffects xmlns:a14="http://schemas.microsoft.com/office/drawing/2010/main" xmlns="">
+                <a14:hiddenEffects xmlns="" xmlns:a14="http://schemas.microsoft.com/office/drawing/2010/main">
                   <a:effectLst>
                     <a:outerShdw blurRad="63500" dist="38099" dir="2700000" algn="ctr" rotWithShape="0">
                       <a:srgbClr val="000000">
@@ -13346,7 +13346,7 @@
             <a:effectLst/>
             <a:extLst>
               <a:ext uri="{909E8E84-426E-40dd-AFC4-6F175D3DCCD1}">
-                <a14:hiddenFill xmlns:a14="http://schemas.microsoft.com/office/drawing/2010/main" xmlns="">
+                <a14:hiddenFill xmlns="" xmlns:a14="http://schemas.microsoft.com/office/drawing/2010/main">
                   <a:blipFill dpi="0" rotWithShape="0">
                     <a:blip/>
                     <a:srcRect/>
@@ -13357,7 +13357,7 @@
                 </a14:hiddenFill>
               </a:ext>
               <a:ext uri="{91240B29-F687-4f45-9708-019B960494DF}">
-                <a14:hiddenLine xmlns:a14="http://schemas.microsoft.com/office/drawing/2010/main" xmlns="" w="9525">
+                <a14:hiddenLine xmlns="" xmlns:a14="http://schemas.microsoft.com/office/drawing/2010/main" w="9525">
                   <a:solidFill>
                     <a:srgbClr val="000000"/>
                   </a:solidFill>
@@ -13367,7 +13367,7 @@
                 </a14:hiddenLine>
               </a:ext>
               <a:ext uri="{AF507438-7753-43e0-B8FC-AC1667EBCBE1}">
-                <a14:hiddenEffects xmlns:a14="http://schemas.microsoft.com/office/drawing/2010/main" xmlns="">
+                <a14:hiddenEffects xmlns="" xmlns:a14="http://schemas.microsoft.com/office/drawing/2010/main">
                   <a:effectLst>
                     <a:outerShdw blurRad="63500" dist="38099" dir="2700000" algn="ctr" rotWithShape="0">
                       <a:srgbClr val="000000">
@@ -13416,7 +13416,7 @@
             <a:effectLst/>
             <a:extLst>
               <a:ext uri="{909E8E84-426E-40dd-AFC4-6F175D3DCCD1}">
-                <a14:hiddenFill xmlns:a14="http://schemas.microsoft.com/office/drawing/2010/main" xmlns="">
+                <a14:hiddenFill xmlns="" xmlns:a14="http://schemas.microsoft.com/office/drawing/2010/main">
                   <a:blipFill dpi="0" rotWithShape="0">
                     <a:blip/>
                     <a:srcRect/>
@@ -13427,7 +13427,7 @@
                 </a14:hiddenFill>
               </a:ext>
               <a:ext uri="{91240B29-F687-4f45-9708-019B960494DF}">
-                <a14:hiddenLine xmlns:a14="http://schemas.microsoft.com/office/drawing/2010/main" xmlns="" w="9525">
+                <a14:hiddenLine xmlns="" xmlns:a14="http://schemas.microsoft.com/office/drawing/2010/main" w="9525">
                   <a:solidFill>
                     <a:srgbClr val="000000"/>
                   </a:solidFill>
@@ -13437,7 +13437,7 @@
                 </a14:hiddenLine>
               </a:ext>
               <a:ext uri="{AF507438-7753-43e0-B8FC-AC1667EBCBE1}">
-                <a14:hiddenEffects xmlns:a14="http://schemas.microsoft.com/office/drawing/2010/main" xmlns="">
+                <a14:hiddenEffects xmlns="" xmlns:a14="http://schemas.microsoft.com/office/drawing/2010/main">
                   <a:effectLst>
                     <a:outerShdw blurRad="63500" dist="38099" dir="2700000" algn="ctr" rotWithShape="0">
                       <a:srgbClr val="000000">
@@ -13486,7 +13486,7 @@
             <a:effectLst/>
             <a:extLst>
               <a:ext uri="{909E8E84-426E-40dd-AFC4-6F175D3DCCD1}">
-                <a14:hiddenFill xmlns:a14="http://schemas.microsoft.com/office/drawing/2010/main" xmlns="">
+                <a14:hiddenFill xmlns="" xmlns:a14="http://schemas.microsoft.com/office/drawing/2010/main">
                   <a:blipFill dpi="0" rotWithShape="0">
                     <a:blip/>
                     <a:srcRect/>
@@ -13497,7 +13497,7 @@
                 </a14:hiddenFill>
               </a:ext>
               <a:ext uri="{91240B29-F687-4f45-9708-019B960494DF}">
-                <a14:hiddenLine xmlns:a14="http://schemas.microsoft.com/office/drawing/2010/main" xmlns="" w="9525">
+                <a14:hiddenLine xmlns="" xmlns:a14="http://schemas.microsoft.com/office/drawing/2010/main" w="9525">
                   <a:solidFill>
                     <a:srgbClr val="000000"/>
                   </a:solidFill>
@@ -13507,7 +13507,7 @@
                 </a14:hiddenLine>
               </a:ext>
               <a:ext uri="{AF507438-7753-43e0-B8FC-AC1667EBCBE1}">
-                <a14:hiddenEffects xmlns:a14="http://schemas.microsoft.com/office/drawing/2010/main" xmlns="">
+                <a14:hiddenEffects xmlns="" xmlns:a14="http://schemas.microsoft.com/office/drawing/2010/main">
                   <a:effectLst>
                     <a:outerShdw blurRad="63500" dist="38099" dir="2700000" algn="ctr" rotWithShape="0">
                       <a:srgbClr val="000000">
@@ -13548,12 +13548,12 @@
             <a:effectLst/>
             <a:extLst>
               <a:ext uri="{909E8E84-426E-40dd-AFC4-6F175D3DCCD1}">
-                <a14:hiddenFill xmlns:a14="http://schemas.microsoft.com/office/drawing/2010/main" xmlns="">
+                <a14:hiddenFill xmlns="" xmlns:a14="http://schemas.microsoft.com/office/drawing/2010/main">
                   <a:noFill/>
                 </a14:hiddenFill>
               </a:ext>
               <a:ext uri="{AF507438-7753-43e0-B8FC-AC1667EBCBE1}">
-                <a14:hiddenEffects xmlns:a14="http://schemas.microsoft.com/office/drawing/2010/main" xmlns="">
+                <a14:hiddenEffects xmlns="" xmlns:a14="http://schemas.microsoft.com/office/drawing/2010/main">
                   <a:effectLst>
                     <a:outerShdw blurRad="63500" dist="38099" dir="2700000" algn="ctr" rotWithShape="0">
                       <a:srgbClr val="000000">
@@ -13606,12 +13606,12 @@
             <a:effectLst/>
             <a:extLst>
               <a:ext uri="{909E8E84-426E-40dd-AFC4-6F175D3DCCD1}">
-                <a14:hiddenFill xmlns:a14="http://schemas.microsoft.com/office/drawing/2010/main" xmlns="">
+                <a14:hiddenFill xmlns="" xmlns:a14="http://schemas.microsoft.com/office/drawing/2010/main">
                   <a:noFill/>
                 </a14:hiddenFill>
               </a:ext>
               <a:ext uri="{AF507438-7753-43e0-B8FC-AC1667EBCBE1}">
-                <a14:hiddenEffects xmlns:a14="http://schemas.microsoft.com/office/drawing/2010/main" xmlns="">
+                <a14:hiddenEffects xmlns="" xmlns:a14="http://schemas.microsoft.com/office/drawing/2010/main">
                   <a:effectLst>
                     <a:outerShdw blurRad="63500" dist="38099" dir="2700000" algn="ctr" rotWithShape="0">
                       <a:srgbClr val="000000">
@@ -13672,7 +13672,7 @@
             <a:effectLst/>
             <a:extLst>
               <a:ext uri="{909E8E84-426E-40dd-AFC4-6F175D3DCCD1}">
-                <a14:hiddenFill xmlns:a14="http://schemas.microsoft.com/office/drawing/2010/main" xmlns="">
+                <a14:hiddenFill xmlns="" xmlns:a14="http://schemas.microsoft.com/office/drawing/2010/main">
                   <a:blipFill dpi="0" rotWithShape="0">
                     <a:blip/>
                     <a:srcRect/>
@@ -13683,7 +13683,7 @@
                 </a14:hiddenFill>
               </a:ext>
               <a:ext uri="{91240B29-F687-4f45-9708-019B960494DF}">
-                <a14:hiddenLine xmlns:a14="http://schemas.microsoft.com/office/drawing/2010/main" xmlns="" w="9525">
+                <a14:hiddenLine xmlns="" xmlns:a14="http://schemas.microsoft.com/office/drawing/2010/main" w="9525">
                   <a:solidFill>
                     <a:srgbClr val="000000"/>
                   </a:solidFill>
@@ -13693,7 +13693,7 @@
                 </a14:hiddenLine>
               </a:ext>
               <a:ext uri="{AF507438-7753-43e0-B8FC-AC1667EBCBE1}">
-                <a14:hiddenEffects xmlns:a14="http://schemas.microsoft.com/office/drawing/2010/main" xmlns="">
+                <a14:hiddenEffects xmlns="" xmlns:a14="http://schemas.microsoft.com/office/drawing/2010/main">
                   <a:effectLst>
                     <a:outerShdw blurRad="63500" dist="38099" dir="2700000" algn="ctr" rotWithShape="0">
                       <a:srgbClr val="000000">
@@ -13826,7 +13826,7 @@
           <a:effectLst/>
           <a:extLst>
             <a:ext uri="{909E8E84-426E-40dd-AFC4-6F175D3DCCD1}">
-              <a14:hiddenFill xmlns="" xmlns:a14="http://schemas.microsoft.com/office/drawing/2010/main">
+              <a14:hiddenFill xmlns:a14="http://schemas.microsoft.com/office/drawing/2010/main" xmlns="">
                 <a:blipFill dpi="0" rotWithShape="0">
                   <a:blip/>
                   <a:srcRect/>
@@ -13837,7 +13837,7 @@
               </a14:hiddenFill>
             </a:ext>
             <a:ext uri="{91240B29-F687-4f45-9708-019B960494DF}">
-              <a14:hiddenLine xmlns="" xmlns:a14="http://schemas.microsoft.com/office/drawing/2010/main" w="9525">
+              <a14:hiddenLine xmlns:a14="http://schemas.microsoft.com/office/drawing/2010/main" xmlns="" w="9525">
                 <a:solidFill>
                   <a:srgbClr val="000000"/>
                 </a:solidFill>
@@ -13847,7 +13847,7 @@
               </a14:hiddenLine>
             </a:ext>
             <a:ext uri="{AF507438-7753-43e0-B8FC-AC1667EBCBE1}">
-              <a14:hiddenEffects xmlns="" xmlns:a14="http://schemas.microsoft.com/office/drawing/2010/main">
+              <a14:hiddenEffects xmlns:a14="http://schemas.microsoft.com/office/drawing/2010/main" xmlns="">
                 <a:effectLst>
                   <a:outerShdw blurRad="63500" dist="38099" dir="2700000" algn="ctr" rotWithShape="0">
                     <a:srgbClr val="000000">
@@ -13932,7 +13932,7 @@
           <a:effectLst/>
           <a:extLst>
             <a:ext uri="{909E8E84-426E-40dd-AFC4-6F175D3DCCD1}">
-              <a14:hiddenFill xmlns="" xmlns:a14="http://schemas.microsoft.com/office/drawing/2010/main">
+              <a14:hiddenFill xmlns:a14="http://schemas.microsoft.com/office/drawing/2010/main" xmlns="">
                 <a:blipFill dpi="0" rotWithShape="0">
                   <a:blip/>
                   <a:srcRect/>
@@ -13943,7 +13943,7 @@
               </a14:hiddenFill>
             </a:ext>
             <a:ext uri="{91240B29-F687-4f45-9708-019B960494DF}">
-              <a14:hiddenLine xmlns="" xmlns:a14="http://schemas.microsoft.com/office/drawing/2010/main" w="9525">
+              <a14:hiddenLine xmlns:a14="http://schemas.microsoft.com/office/drawing/2010/main" xmlns="" w="9525">
                 <a:solidFill>
                   <a:srgbClr val="000000"/>
                 </a:solidFill>
@@ -13953,7 +13953,7 @@
               </a14:hiddenLine>
             </a:ext>
             <a:ext uri="{AF507438-7753-43e0-B8FC-AC1667EBCBE1}">
-              <a14:hiddenEffects xmlns="" xmlns:a14="http://schemas.microsoft.com/office/drawing/2010/main">
+              <a14:hiddenEffects xmlns:a14="http://schemas.microsoft.com/office/drawing/2010/main" xmlns="">
                 <a:effectLst>
                   <a:outerShdw blurRad="63500" dist="38099" dir="2700000" algn="ctr" rotWithShape="0">
                     <a:srgbClr val="000000">
@@ -14038,7 +14038,7 @@
           <a:effectLst/>
           <a:extLst>
             <a:ext uri="{909E8E84-426E-40dd-AFC4-6F175D3DCCD1}">
-              <a14:hiddenFill xmlns="" xmlns:a14="http://schemas.microsoft.com/office/drawing/2010/main">
+              <a14:hiddenFill xmlns:a14="http://schemas.microsoft.com/office/drawing/2010/main" xmlns="">
                 <a:blipFill dpi="0" rotWithShape="0">
                   <a:blip/>
                   <a:srcRect/>
@@ -14049,7 +14049,7 @@
               </a14:hiddenFill>
             </a:ext>
             <a:ext uri="{91240B29-F687-4f45-9708-019B960494DF}">
-              <a14:hiddenLine xmlns="" xmlns:a14="http://schemas.microsoft.com/office/drawing/2010/main" w="9525">
+              <a14:hiddenLine xmlns:a14="http://schemas.microsoft.com/office/drawing/2010/main" xmlns="" w="9525">
                 <a:solidFill>
                   <a:srgbClr val="000000"/>
                 </a:solidFill>
@@ -14059,7 +14059,7 @@
               </a14:hiddenLine>
             </a:ext>
             <a:ext uri="{AF507438-7753-43e0-B8FC-AC1667EBCBE1}">
-              <a14:hiddenEffects xmlns="" xmlns:a14="http://schemas.microsoft.com/office/drawing/2010/main">
+              <a14:hiddenEffects xmlns:a14="http://schemas.microsoft.com/office/drawing/2010/main" xmlns="">
                 <a:effectLst>
                   <a:outerShdw blurRad="63500" dist="38099" dir="2700000" algn="ctr" rotWithShape="0">
                     <a:srgbClr val="000000">
@@ -14163,7 +14163,19 @@
               <a:rPr lang="en-US" sz="2400" dirty="0">
                 <a:sym typeface="Wingdings"/>
               </a:rPr>
-              <a:t>6.4Tbit/s switch: Need </a:t>
+              <a:t>1 </a:t>
+            </a:r>
+            <a:r>
+              <a:rPr lang="en-US" sz="2400" dirty="0" err="1">
+                <a:sym typeface="Wingdings"/>
+              </a:rPr>
+              <a:t>Tbit</a:t>
+            </a:r>
+            <a:r>
+              <a:rPr lang="en-US" sz="2400" dirty="0">
+                <a:sym typeface="Wingdings"/>
+              </a:rPr>
+              <a:t>/s switch: Need </a:t>
             </a:r>
             <a:r>
               <a:rPr lang="en-US" sz="2400" dirty="0">
@@ -14238,7 +14250,7 @@
           <a:effectLst/>
           <a:extLst>
             <a:ext uri="{909E8E84-426E-40dd-AFC4-6F175D3DCCD1}">
-              <a14:hiddenFill xmlns="" xmlns:a14="http://schemas.microsoft.com/office/drawing/2010/main">
+              <a14:hiddenFill xmlns:a14="http://schemas.microsoft.com/office/drawing/2010/main" xmlns="">
                 <a:blipFill dpi="0" rotWithShape="0">
                   <a:blip/>
                   <a:srcRect/>
@@ -14249,7 +14261,7 @@
               </a14:hiddenFill>
             </a:ext>
             <a:ext uri="{91240B29-F687-4f45-9708-019B960494DF}">
-              <a14:hiddenLine xmlns="" xmlns:a14="http://schemas.microsoft.com/office/drawing/2010/main" w="9525">
+              <a14:hiddenLine xmlns:a14="http://schemas.microsoft.com/office/drawing/2010/main" xmlns="" w="9525">
                 <a:solidFill>
                   <a:srgbClr val="000000"/>
                 </a:solidFill>
@@ -14259,7 +14271,7 @@
               </a14:hiddenLine>
             </a:ext>
             <a:ext uri="{AF507438-7753-43e0-B8FC-AC1667EBCBE1}">
-              <a14:hiddenEffects xmlns="" xmlns:a14="http://schemas.microsoft.com/office/drawing/2010/main">
+              <a14:hiddenEffects xmlns:a14="http://schemas.microsoft.com/office/drawing/2010/main" xmlns="">
                 <a:effectLst>
                   <a:outerShdw blurRad="63500" dist="38099" dir="2700000" algn="ctr" rotWithShape="0">
                     <a:srgbClr val="000000">
@@ -14337,7 +14349,7 @@
           <a:effectLst/>
           <a:extLst>
             <a:ext uri="{909E8E84-426E-40dd-AFC4-6F175D3DCCD1}">
-              <a14:hiddenFill xmlns="" xmlns:a14="http://schemas.microsoft.com/office/drawing/2010/main">
+              <a14:hiddenFill xmlns:a14="http://schemas.microsoft.com/office/drawing/2010/main" xmlns="">
                 <a:blipFill dpi="0" rotWithShape="0">
                   <a:blip/>
                   <a:srcRect/>
@@ -14348,7 +14360,7 @@
               </a14:hiddenFill>
             </a:ext>
             <a:ext uri="{91240B29-F687-4f45-9708-019B960494DF}">
-              <a14:hiddenLine xmlns="" xmlns:a14="http://schemas.microsoft.com/office/drawing/2010/main" w="9525">
+              <a14:hiddenLine xmlns:a14="http://schemas.microsoft.com/office/drawing/2010/main" xmlns="" w="9525">
                 <a:solidFill>
                   <a:srgbClr val="000000"/>
                 </a:solidFill>
@@ -14358,7 +14370,7 @@
               </a14:hiddenLine>
             </a:ext>
             <a:ext uri="{AF507438-7753-43e0-B8FC-AC1667EBCBE1}">
-              <a14:hiddenEffects xmlns="" xmlns:a14="http://schemas.microsoft.com/office/drawing/2010/main">
+              <a14:hiddenEffects xmlns:a14="http://schemas.microsoft.com/office/drawing/2010/main" xmlns="">
                 <a:effectLst>
                   <a:outerShdw blurRad="63500" dist="38099" dir="2700000" algn="ctr" rotWithShape="0">
                     <a:srgbClr val="000000">
@@ -16223,7 +16235,7 @@
           <a:effectLst/>
           <a:extLst>
             <a:ext uri="{909E8E84-426E-40dd-AFC4-6F175D3DCCD1}">
-              <a14:hiddenFill xmlns:a14="http://schemas.microsoft.com/office/drawing/2010/main" xmlns="">
+              <a14:hiddenFill xmlns="" xmlns:a14="http://schemas.microsoft.com/office/drawing/2010/main">
                 <a:blipFill dpi="0" rotWithShape="0">
                   <a:blip/>
                   <a:srcRect/>
@@ -16234,7 +16246,7 @@
               </a14:hiddenFill>
             </a:ext>
             <a:ext uri="{91240B29-F687-4f45-9708-019B960494DF}">
-              <a14:hiddenLine xmlns:a14="http://schemas.microsoft.com/office/drawing/2010/main" xmlns="" w="9525">
+              <a14:hiddenLine xmlns="" xmlns:a14="http://schemas.microsoft.com/office/drawing/2010/main" w="9525">
                 <a:solidFill>
                   <a:srgbClr val="000000"/>
                 </a:solidFill>
@@ -16244,7 +16256,7 @@
               </a14:hiddenLine>
             </a:ext>
             <a:ext uri="{AF507438-7753-43e0-B8FC-AC1667EBCBE1}">
-              <a14:hiddenEffects xmlns:a14="http://schemas.microsoft.com/office/drawing/2010/main" xmlns="">
+              <a14:hiddenEffects xmlns="" xmlns:a14="http://schemas.microsoft.com/office/drawing/2010/main">
                 <a:effectLst>
                   <a:outerShdw blurRad="63500" dist="38099" dir="2700000" algn="ctr" rotWithShape="0">
                     <a:srgbClr val="000000">
@@ -16404,7 +16416,7 @@
           <a:effectLst/>
           <a:extLst>
             <a:ext uri="{909E8E84-426E-40dd-AFC4-6F175D3DCCD1}">
-              <a14:hiddenFill xmlns:a14="http://schemas.microsoft.com/office/drawing/2010/main" xmlns="">
+              <a14:hiddenFill xmlns="" xmlns:a14="http://schemas.microsoft.com/office/drawing/2010/main">
                 <a:blipFill dpi="0" rotWithShape="0">
                   <a:blip/>
                   <a:srcRect/>
@@ -16415,7 +16427,7 @@
               </a14:hiddenFill>
             </a:ext>
             <a:ext uri="{91240B29-F687-4f45-9708-019B960494DF}">
-              <a14:hiddenLine xmlns:a14="http://schemas.microsoft.com/office/drawing/2010/main" xmlns="" w="9525">
+              <a14:hiddenLine xmlns="" xmlns:a14="http://schemas.microsoft.com/office/drawing/2010/main" w="9525">
                 <a:solidFill>
                   <a:srgbClr val="000000"/>
                 </a:solidFill>
@@ -16425,7 +16437,7 @@
               </a14:hiddenLine>
             </a:ext>
             <a:ext uri="{AF507438-7753-43e0-B8FC-AC1667EBCBE1}">
-              <a14:hiddenEffects xmlns:a14="http://schemas.microsoft.com/office/drawing/2010/main" xmlns="">
+              <a14:hiddenEffects xmlns="" xmlns:a14="http://schemas.microsoft.com/office/drawing/2010/main">
                 <a:effectLst>
                   <a:outerShdw blurRad="63500" dist="38099" dir="2700000" algn="ctr" rotWithShape="0">
                     <a:srgbClr val="000000">
@@ -18224,7 +18236,7 @@
           <a:effectLst/>
           <a:extLst>
             <a:ext uri="{909E8E84-426E-40dd-AFC4-6F175D3DCCD1}">
-              <a14:hiddenFill xmlns:a14="http://schemas.microsoft.com/office/drawing/2010/main" xmlns="">
+              <a14:hiddenFill xmlns="" xmlns:a14="http://schemas.microsoft.com/office/drawing/2010/main">
                 <a:blipFill dpi="0" rotWithShape="0">
                   <a:blip/>
                   <a:srcRect/>
@@ -18235,7 +18247,7 @@
               </a14:hiddenFill>
             </a:ext>
             <a:ext uri="{91240B29-F687-4f45-9708-019B960494DF}">
-              <a14:hiddenLine xmlns:a14="http://schemas.microsoft.com/office/drawing/2010/main" xmlns="" w="9525">
+              <a14:hiddenLine xmlns="" xmlns:a14="http://schemas.microsoft.com/office/drawing/2010/main" w="9525">
                 <a:solidFill>
                   <a:srgbClr val="000000"/>
                 </a:solidFill>
@@ -18245,7 +18257,7 @@
               </a14:hiddenLine>
             </a:ext>
             <a:ext uri="{AF507438-7753-43e0-B8FC-AC1667EBCBE1}">
-              <a14:hiddenEffects xmlns:a14="http://schemas.microsoft.com/office/drawing/2010/main" xmlns="">
+              <a14:hiddenEffects xmlns="" xmlns:a14="http://schemas.microsoft.com/office/drawing/2010/main">
                 <a:effectLst>
                   <a:outerShdw blurRad="63500" dist="38099" dir="2700000" algn="ctr" rotWithShape="0">
                     <a:srgbClr val="000000">
@@ -18338,7 +18350,7 @@
           <a:effectLst/>
           <a:extLst>
             <a:ext uri="{909E8E84-426E-40dd-AFC4-6F175D3DCCD1}">
-              <a14:hiddenFill xmlns:a14="http://schemas.microsoft.com/office/drawing/2010/main" xmlns="">
+              <a14:hiddenFill xmlns="" xmlns:a14="http://schemas.microsoft.com/office/drawing/2010/main">
                 <a:blipFill dpi="0" rotWithShape="0">
                   <a:blip/>
                   <a:srcRect/>
@@ -18349,7 +18361,7 @@
               </a14:hiddenFill>
             </a:ext>
             <a:ext uri="{91240B29-F687-4f45-9708-019B960494DF}">
-              <a14:hiddenLine xmlns:a14="http://schemas.microsoft.com/office/drawing/2010/main" xmlns="" w="9525">
+              <a14:hiddenLine xmlns="" xmlns:a14="http://schemas.microsoft.com/office/drawing/2010/main" w="9525">
                 <a:solidFill>
                   <a:srgbClr val="000000"/>
                 </a:solidFill>
@@ -18359,7 +18371,7 @@
               </a14:hiddenLine>
             </a:ext>
             <a:ext uri="{AF507438-7753-43e0-B8FC-AC1667EBCBE1}">
-              <a14:hiddenEffects xmlns:a14="http://schemas.microsoft.com/office/drawing/2010/main" xmlns="">
+              <a14:hiddenEffects xmlns="" xmlns:a14="http://schemas.microsoft.com/office/drawing/2010/main">
                 <a:effectLst>
                   <a:outerShdw blurRad="63500" dist="38099" dir="2700000" algn="ctr" rotWithShape="0">
                     <a:srgbClr val="000000">
@@ -21231,7 +21243,7 @@
           <a:effectLst/>
           <a:extLst>
             <a:ext uri="{909E8E84-426E-40dd-AFC4-6F175D3DCCD1}">
-              <a14:hiddenFill xmlns:a14="http://schemas.microsoft.com/office/drawing/2010/main" xmlns="">
+              <a14:hiddenFill xmlns="" xmlns:a14="http://schemas.microsoft.com/office/drawing/2010/main">
                 <a:blipFill dpi="0" rotWithShape="0">
                   <a:blip/>
                   <a:srcRect/>
@@ -21242,7 +21254,7 @@
               </a14:hiddenFill>
             </a:ext>
             <a:ext uri="{91240B29-F687-4f45-9708-019B960494DF}">
-              <a14:hiddenLine xmlns:a14="http://schemas.microsoft.com/office/drawing/2010/main" xmlns="" w="9525">
+              <a14:hiddenLine xmlns="" xmlns:a14="http://schemas.microsoft.com/office/drawing/2010/main" w="9525">
                 <a:solidFill>
                   <a:srgbClr val="000000"/>
                 </a:solidFill>
@@ -21252,7 +21264,7 @@
               </a14:hiddenLine>
             </a:ext>
             <a:ext uri="{AF507438-7753-43e0-B8FC-AC1667EBCBE1}">
-              <a14:hiddenEffects xmlns:a14="http://schemas.microsoft.com/office/drawing/2010/main" xmlns="">
+              <a14:hiddenEffects xmlns="" xmlns:a14="http://schemas.microsoft.com/office/drawing/2010/main">
                 <a:effectLst>
                   <a:outerShdw blurRad="63500" dist="38099" dir="2700000" algn="ctr" rotWithShape="0">
                     <a:srgbClr val="000000">
@@ -21331,7 +21343,7 @@
           <a:effectLst/>
           <a:extLst>
             <a:ext uri="{909E8E84-426E-40dd-AFC4-6F175D3DCCD1}">
-              <a14:hiddenFill xmlns:a14="http://schemas.microsoft.com/office/drawing/2010/main" xmlns="">
+              <a14:hiddenFill xmlns="" xmlns:a14="http://schemas.microsoft.com/office/drawing/2010/main">
                 <a:blipFill dpi="0" rotWithShape="0">
                   <a:blip/>
                   <a:srcRect/>
@@ -21342,7 +21354,7 @@
               </a14:hiddenFill>
             </a:ext>
             <a:ext uri="{91240B29-F687-4f45-9708-019B960494DF}">
-              <a14:hiddenLine xmlns:a14="http://schemas.microsoft.com/office/drawing/2010/main" xmlns="" w="9525">
+              <a14:hiddenLine xmlns="" xmlns:a14="http://schemas.microsoft.com/office/drawing/2010/main" w="9525">
                 <a:solidFill>
                   <a:srgbClr val="000000"/>
                 </a:solidFill>
@@ -21352,7 +21364,7 @@
               </a14:hiddenLine>
             </a:ext>
             <a:ext uri="{AF507438-7753-43e0-B8FC-AC1667EBCBE1}">
-              <a14:hiddenEffects xmlns:a14="http://schemas.microsoft.com/office/drawing/2010/main" xmlns="">
+              <a14:hiddenEffects xmlns="" xmlns:a14="http://schemas.microsoft.com/office/drawing/2010/main">
                 <a:effectLst>
                   <a:outerShdw blurRad="63500" dist="38099" dir="2700000" algn="ctr" rotWithShape="0">
                     <a:srgbClr val="000000">
@@ -22935,7 +22947,7 @@
           <a:effectLst/>
           <a:extLst>
             <a:ext uri="{909E8E84-426E-40dd-AFC4-6F175D3DCCD1}">
-              <a14:hiddenFill xmlns:a14="http://schemas.microsoft.com/office/drawing/2010/main" xmlns="">
+              <a14:hiddenFill xmlns="" xmlns:a14="http://schemas.microsoft.com/office/drawing/2010/main">
                 <a:blipFill dpi="0" rotWithShape="0">
                   <a:blip/>
                   <a:srcRect/>
@@ -22946,7 +22958,7 @@
               </a14:hiddenFill>
             </a:ext>
             <a:ext uri="{91240B29-F687-4f45-9708-019B960494DF}">
-              <a14:hiddenLine xmlns:a14="http://schemas.microsoft.com/office/drawing/2010/main" xmlns="" w="9525">
+              <a14:hiddenLine xmlns="" xmlns:a14="http://schemas.microsoft.com/office/drawing/2010/main" w="9525">
                 <a:solidFill>
                   <a:srgbClr val="000000"/>
                 </a:solidFill>
@@ -22956,7 +22968,7 @@
               </a14:hiddenLine>
             </a:ext>
             <a:ext uri="{AF507438-7753-43e0-B8FC-AC1667EBCBE1}">
-              <a14:hiddenEffects xmlns:a14="http://schemas.microsoft.com/office/drawing/2010/main" xmlns="">
+              <a14:hiddenEffects xmlns="" xmlns:a14="http://schemas.microsoft.com/office/drawing/2010/main">
                 <a:effectLst>
                   <a:outerShdw blurRad="63500" dist="38099" dir="2700000" algn="ctr" rotWithShape="0">
                     <a:srgbClr val="000000">
@@ -24604,7 +24616,7 @@
           <a:effectLst/>
           <a:extLst>
             <a:ext uri="{909E8E84-426E-40dd-AFC4-6F175D3DCCD1}">
-              <a14:hiddenFill xmlns:a14="http://schemas.microsoft.com/office/drawing/2010/main" xmlns="">
+              <a14:hiddenFill xmlns="" xmlns:a14="http://schemas.microsoft.com/office/drawing/2010/main">
                 <a:blipFill dpi="0" rotWithShape="0">
                   <a:blip/>
                   <a:srcRect/>
@@ -24615,7 +24627,7 @@
               </a14:hiddenFill>
             </a:ext>
             <a:ext uri="{91240B29-F687-4f45-9708-019B960494DF}">
-              <a14:hiddenLine xmlns:a14="http://schemas.microsoft.com/office/drawing/2010/main" xmlns="" w="9525">
+              <a14:hiddenLine xmlns="" xmlns:a14="http://schemas.microsoft.com/office/drawing/2010/main" w="9525">
                 <a:solidFill>
                   <a:srgbClr val="000000"/>
                 </a:solidFill>
@@ -24625,7 +24637,7 @@
               </a14:hiddenLine>
             </a:ext>
             <a:ext uri="{AF507438-7753-43e0-B8FC-AC1667EBCBE1}">
-              <a14:hiddenEffects xmlns:a14="http://schemas.microsoft.com/office/drawing/2010/main" xmlns="">
+              <a14:hiddenEffects xmlns="" xmlns:a14="http://schemas.microsoft.com/office/drawing/2010/main">
                 <a:effectLst>
                   <a:outerShdw blurRad="63500" dist="38099" dir="2700000" algn="ctr" rotWithShape="0">
                     <a:srgbClr val="000000">
@@ -25987,7 +25999,7 @@
           <a:effectLst/>
           <a:extLst>
             <a:ext uri="{909E8E84-426E-40dd-AFC4-6F175D3DCCD1}">
-              <a14:hiddenFill xmlns:a14="http://schemas.microsoft.com/office/drawing/2010/main" xmlns="">
+              <a14:hiddenFill xmlns="" xmlns:a14="http://schemas.microsoft.com/office/drawing/2010/main">
                 <a:blipFill dpi="0" rotWithShape="0">
                   <a:blip/>
                   <a:srcRect/>
@@ -25998,7 +26010,7 @@
               </a14:hiddenFill>
             </a:ext>
             <a:ext uri="{91240B29-F687-4f45-9708-019B960494DF}">
-              <a14:hiddenLine xmlns:a14="http://schemas.microsoft.com/office/drawing/2010/main" xmlns="" w="9525">
+              <a14:hiddenLine xmlns="" xmlns:a14="http://schemas.microsoft.com/office/drawing/2010/main" w="9525">
                 <a:solidFill>
                   <a:srgbClr val="000000"/>
                 </a:solidFill>
@@ -26008,7 +26020,7 @@
               </a14:hiddenLine>
             </a:ext>
             <a:ext uri="{AF507438-7753-43e0-B8FC-AC1667EBCBE1}">
-              <a14:hiddenEffects xmlns:a14="http://schemas.microsoft.com/office/drawing/2010/main" xmlns="">
+              <a14:hiddenEffects xmlns="" xmlns:a14="http://schemas.microsoft.com/office/drawing/2010/main">
                 <a:effectLst>
                   <a:outerShdw blurRad="63500" dist="38099" dir="2700000" algn="ctr" rotWithShape="0">
                     <a:srgbClr val="000000">
@@ -26139,7 +26151,7 @@
           <a:effectLst/>
           <a:extLst>
             <a:ext uri="{909E8E84-426E-40dd-AFC4-6F175D3DCCD1}">
-              <a14:hiddenFill xmlns:a14="http://schemas.microsoft.com/office/drawing/2010/main" xmlns="">
+              <a14:hiddenFill xmlns="" xmlns:a14="http://schemas.microsoft.com/office/drawing/2010/main">
                 <a:blipFill dpi="0" rotWithShape="0">
                   <a:blip/>
                   <a:srcRect/>
@@ -26150,7 +26162,7 @@
               </a14:hiddenFill>
             </a:ext>
             <a:ext uri="{91240B29-F687-4f45-9708-019B960494DF}">
-              <a14:hiddenLine xmlns:a14="http://schemas.microsoft.com/office/drawing/2010/main" xmlns="" w="9525">
+              <a14:hiddenLine xmlns="" xmlns:a14="http://schemas.microsoft.com/office/drawing/2010/main" w="9525">
                 <a:solidFill>
                   <a:srgbClr val="000000"/>
                 </a:solidFill>
@@ -26160,7 +26172,7 @@
               </a14:hiddenLine>
             </a:ext>
             <a:ext uri="{AF507438-7753-43e0-B8FC-AC1667EBCBE1}">
-              <a14:hiddenEffects xmlns:a14="http://schemas.microsoft.com/office/drawing/2010/main" xmlns="">
+              <a14:hiddenEffects xmlns="" xmlns:a14="http://schemas.microsoft.com/office/drawing/2010/main">
                 <a:effectLst>
                   <a:outerShdw blurRad="63500" dist="38099" dir="2700000" algn="ctr" rotWithShape="0">
                     <a:srgbClr val="000000">
@@ -33880,7 +33892,7 @@
           <a:effectLst/>
           <a:extLst>
             <a:ext uri="{909E8E84-426E-40dd-AFC4-6F175D3DCCD1}">
-              <a14:hiddenFill xmlns="" xmlns:a14="http://schemas.microsoft.com/office/drawing/2010/main">
+              <a14:hiddenFill xmlns:a14="http://schemas.microsoft.com/office/drawing/2010/main" xmlns="">
                 <a:blipFill dpi="0" rotWithShape="0">
                   <a:blip/>
                   <a:srcRect/>
@@ -33891,7 +33903,7 @@
               </a14:hiddenFill>
             </a:ext>
             <a:ext uri="{91240B29-F687-4f45-9708-019B960494DF}">
-              <a14:hiddenLine xmlns="" xmlns:a14="http://schemas.microsoft.com/office/drawing/2010/main" w="9525">
+              <a14:hiddenLine xmlns:a14="http://schemas.microsoft.com/office/drawing/2010/main" xmlns="" w="9525">
                 <a:solidFill>
                   <a:srgbClr val="000000"/>
                 </a:solidFill>
@@ -33901,7 +33913,7 @@
               </a14:hiddenLine>
             </a:ext>
             <a:ext uri="{AF507438-7753-43e0-B8FC-AC1667EBCBE1}">
-              <a14:hiddenEffects xmlns="" xmlns:a14="http://schemas.microsoft.com/office/drawing/2010/main">
+              <a14:hiddenEffects xmlns:a14="http://schemas.microsoft.com/office/drawing/2010/main" xmlns="">
                 <a:effectLst>
                   <a:outerShdw blurRad="63500" dist="38099" dir="2700000" algn="ctr" rotWithShape="0">
                     <a:srgbClr val="000000">

</xml_diff>

<commit_message>
Run through slides once.
</commit_message>
<xml_diff>
--- a/marple.pptx
+++ b/marple.pptx
@@ -12190,7 +12190,7 @@
           <a:effectLst/>
           <a:extLst>
             <a:ext uri="{909E8E84-426E-40dd-AFC4-6F175D3DCCD1}">
-              <a14:hiddenFill xmlns:a14="http://schemas.microsoft.com/office/drawing/2010/main" xmlns="">
+              <a14:hiddenFill xmlns="" xmlns:a14="http://schemas.microsoft.com/office/drawing/2010/main">
                 <a:blipFill dpi="0" rotWithShape="0">
                   <a:blip/>
                   <a:srcRect/>
@@ -12201,7 +12201,7 @@
               </a14:hiddenFill>
             </a:ext>
             <a:ext uri="{91240B29-F687-4f45-9708-019B960494DF}">
-              <a14:hiddenLine xmlns:a14="http://schemas.microsoft.com/office/drawing/2010/main" xmlns="" w="9525">
+              <a14:hiddenLine xmlns="" xmlns:a14="http://schemas.microsoft.com/office/drawing/2010/main" w="9525">
                 <a:solidFill>
                   <a:srgbClr val="000000"/>
                 </a:solidFill>
@@ -12211,7 +12211,7 @@
               </a14:hiddenLine>
             </a:ext>
             <a:ext uri="{AF507438-7753-43e0-B8FC-AC1667EBCBE1}">
-              <a14:hiddenEffects xmlns:a14="http://schemas.microsoft.com/office/drawing/2010/main" xmlns="">
+              <a14:hiddenEffects xmlns="" xmlns:a14="http://schemas.microsoft.com/office/drawing/2010/main">
                 <a:effectLst>
                   <a:outerShdw blurRad="63500" dist="38099" dir="2700000" algn="ctr" rotWithShape="0">
                     <a:srgbClr val="000000">
@@ -12260,7 +12260,7 @@
           <a:effectLst/>
           <a:extLst>
             <a:ext uri="{909E8E84-426E-40dd-AFC4-6F175D3DCCD1}">
-              <a14:hiddenFill xmlns:a14="http://schemas.microsoft.com/office/drawing/2010/main" xmlns="">
+              <a14:hiddenFill xmlns="" xmlns:a14="http://schemas.microsoft.com/office/drawing/2010/main">
                 <a:blipFill dpi="0" rotWithShape="0">
                   <a:blip/>
                   <a:srcRect/>
@@ -12271,7 +12271,7 @@
               </a14:hiddenFill>
             </a:ext>
             <a:ext uri="{91240B29-F687-4f45-9708-019B960494DF}">
-              <a14:hiddenLine xmlns:a14="http://schemas.microsoft.com/office/drawing/2010/main" xmlns="" w="9525">
+              <a14:hiddenLine xmlns="" xmlns:a14="http://schemas.microsoft.com/office/drawing/2010/main" w="9525">
                 <a:solidFill>
                   <a:srgbClr val="000000"/>
                 </a:solidFill>
@@ -12281,7 +12281,7 @@
               </a14:hiddenLine>
             </a:ext>
             <a:ext uri="{AF507438-7753-43e0-B8FC-AC1667EBCBE1}">
-              <a14:hiddenEffects xmlns:a14="http://schemas.microsoft.com/office/drawing/2010/main" xmlns="">
+              <a14:hiddenEffects xmlns="" xmlns:a14="http://schemas.microsoft.com/office/drawing/2010/main">
                 <a:effectLst>
                   <a:outerShdw blurRad="63500" dist="38099" dir="2700000" algn="ctr" rotWithShape="0">
                     <a:srgbClr val="000000">
@@ -12416,7 +12416,7 @@
             <a:effectLst/>
             <a:extLst>
               <a:ext uri="{909E8E84-426E-40dd-AFC4-6F175D3DCCD1}">
-                <a14:hiddenFill xmlns="" xmlns:a14="http://schemas.microsoft.com/office/drawing/2010/main">
+                <a14:hiddenFill xmlns:a14="http://schemas.microsoft.com/office/drawing/2010/main" xmlns="">
                   <a:blipFill dpi="0" rotWithShape="0">
                     <a:blip/>
                     <a:srcRect/>
@@ -12427,7 +12427,7 @@
                 </a14:hiddenFill>
               </a:ext>
               <a:ext uri="{91240B29-F687-4f45-9708-019B960494DF}">
-                <a14:hiddenLine xmlns="" xmlns:a14="http://schemas.microsoft.com/office/drawing/2010/main" w="9525">
+                <a14:hiddenLine xmlns:a14="http://schemas.microsoft.com/office/drawing/2010/main" xmlns="" w="9525">
                   <a:solidFill>
                     <a:srgbClr val="000000"/>
                   </a:solidFill>
@@ -12437,7 +12437,7 @@
                 </a14:hiddenLine>
               </a:ext>
               <a:ext uri="{AF507438-7753-43e0-B8FC-AC1667EBCBE1}">
-                <a14:hiddenEffects xmlns="" xmlns:a14="http://schemas.microsoft.com/office/drawing/2010/main">
+                <a14:hiddenEffects xmlns:a14="http://schemas.microsoft.com/office/drawing/2010/main" xmlns="">
                   <a:effectLst>
                     <a:outerShdw blurRad="63500" dist="38099" dir="2700000" algn="ctr" rotWithShape="0">
                       <a:srgbClr val="000000">
@@ -12486,7 +12486,7 @@
             <a:effectLst/>
             <a:extLst>
               <a:ext uri="{909E8E84-426E-40dd-AFC4-6F175D3DCCD1}">
-                <a14:hiddenFill xmlns="" xmlns:a14="http://schemas.microsoft.com/office/drawing/2010/main">
+                <a14:hiddenFill xmlns:a14="http://schemas.microsoft.com/office/drawing/2010/main" xmlns="">
                   <a:blipFill dpi="0" rotWithShape="0">
                     <a:blip/>
                     <a:srcRect/>
@@ -12497,7 +12497,7 @@
                 </a14:hiddenFill>
               </a:ext>
               <a:ext uri="{91240B29-F687-4f45-9708-019B960494DF}">
-                <a14:hiddenLine xmlns="" xmlns:a14="http://schemas.microsoft.com/office/drawing/2010/main" w="9525">
+                <a14:hiddenLine xmlns:a14="http://schemas.microsoft.com/office/drawing/2010/main" xmlns="" w="9525">
                   <a:solidFill>
                     <a:srgbClr val="000000"/>
                   </a:solidFill>
@@ -12507,7 +12507,7 @@
                 </a14:hiddenLine>
               </a:ext>
               <a:ext uri="{AF507438-7753-43e0-B8FC-AC1667EBCBE1}">
-                <a14:hiddenEffects xmlns="" xmlns:a14="http://schemas.microsoft.com/office/drawing/2010/main">
+                <a14:hiddenEffects xmlns:a14="http://schemas.microsoft.com/office/drawing/2010/main" xmlns="">
                   <a:effectLst>
                     <a:outerShdw blurRad="63500" dist="38099" dir="2700000" algn="ctr" rotWithShape="0">
                       <a:srgbClr val="000000">
@@ -12556,7 +12556,7 @@
             <a:effectLst/>
             <a:extLst>
               <a:ext uri="{909E8E84-426E-40dd-AFC4-6F175D3DCCD1}">
-                <a14:hiddenFill xmlns="" xmlns:a14="http://schemas.microsoft.com/office/drawing/2010/main">
+                <a14:hiddenFill xmlns:a14="http://schemas.microsoft.com/office/drawing/2010/main" xmlns="">
                   <a:blipFill dpi="0" rotWithShape="0">
                     <a:blip/>
                     <a:srcRect/>
@@ -12567,7 +12567,7 @@
                 </a14:hiddenFill>
               </a:ext>
               <a:ext uri="{91240B29-F687-4f45-9708-019B960494DF}">
-                <a14:hiddenLine xmlns="" xmlns:a14="http://schemas.microsoft.com/office/drawing/2010/main" w="9525">
+                <a14:hiddenLine xmlns:a14="http://schemas.microsoft.com/office/drawing/2010/main" xmlns="" w="9525">
                   <a:solidFill>
                     <a:srgbClr val="000000"/>
                   </a:solidFill>
@@ -12577,7 +12577,7 @@
                 </a14:hiddenLine>
               </a:ext>
               <a:ext uri="{AF507438-7753-43e0-B8FC-AC1667EBCBE1}">
-                <a14:hiddenEffects xmlns="" xmlns:a14="http://schemas.microsoft.com/office/drawing/2010/main">
+                <a14:hiddenEffects xmlns:a14="http://schemas.microsoft.com/office/drawing/2010/main" xmlns="">
                   <a:effectLst>
                     <a:outerShdw blurRad="63500" dist="38099" dir="2700000" algn="ctr" rotWithShape="0">
                       <a:srgbClr val="000000">
@@ -12618,12 +12618,12 @@
             <a:effectLst/>
             <a:extLst>
               <a:ext uri="{909E8E84-426E-40dd-AFC4-6F175D3DCCD1}">
-                <a14:hiddenFill xmlns="" xmlns:a14="http://schemas.microsoft.com/office/drawing/2010/main">
+                <a14:hiddenFill xmlns:a14="http://schemas.microsoft.com/office/drawing/2010/main" xmlns="">
                   <a:noFill/>
                 </a14:hiddenFill>
               </a:ext>
               <a:ext uri="{AF507438-7753-43e0-B8FC-AC1667EBCBE1}">
-                <a14:hiddenEffects xmlns="" xmlns:a14="http://schemas.microsoft.com/office/drawing/2010/main">
+                <a14:hiddenEffects xmlns:a14="http://schemas.microsoft.com/office/drawing/2010/main" xmlns="">
                   <a:effectLst>
                     <a:outerShdw blurRad="63500" dist="38099" dir="2700000" algn="ctr" rotWithShape="0">
                       <a:srgbClr val="000000">
@@ -12676,12 +12676,12 @@
             <a:effectLst/>
             <a:extLst>
               <a:ext uri="{909E8E84-426E-40dd-AFC4-6F175D3DCCD1}">
-                <a14:hiddenFill xmlns="" xmlns:a14="http://schemas.microsoft.com/office/drawing/2010/main">
+                <a14:hiddenFill xmlns:a14="http://schemas.microsoft.com/office/drawing/2010/main" xmlns="">
                   <a:noFill/>
                 </a14:hiddenFill>
               </a:ext>
               <a:ext uri="{AF507438-7753-43e0-B8FC-AC1667EBCBE1}">
-                <a14:hiddenEffects xmlns="" xmlns:a14="http://schemas.microsoft.com/office/drawing/2010/main">
+                <a14:hiddenEffects xmlns:a14="http://schemas.microsoft.com/office/drawing/2010/main" xmlns="">
                   <a:effectLst>
                     <a:outerShdw blurRad="63500" dist="38099" dir="2700000" algn="ctr" rotWithShape="0">
                       <a:srgbClr val="000000">
@@ -12734,12 +12734,12 @@
             <a:effectLst/>
             <a:extLst>
               <a:ext uri="{909E8E84-426E-40dd-AFC4-6F175D3DCCD1}">
-                <a14:hiddenFill xmlns="" xmlns:a14="http://schemas.microsoft.com/office/drawing/2010/main">
+                <a14:hiddenFill xmlns:a14="http://schemas.microsoft.com/office/drawing/2010/main" xmlns="">
                   <a:noFill/>
                 </a14:hiddenFill>
               </a:ext>
               <a:ext uri="{AF507438-7753-43e0-B8FC-AC1667EBCBE1}">
-                <a14:hiddenEffects xmlns="" xmlns:a14="http://schemas.microsoft.com/office/drawing/2010/main">
+                <a14:hiddenEffects xmlns:a14="http://schemas.microsoft.com/office/drawing/2010/main" xmlns="">
                   <a:effectLst>
                     <a:outerShdw blurRad="63500" dist="38099" dir="2700000" algn="ctr" rotWithShape="0">
                       <a:srgbClr val="000000">
@@ -12792,12 +12792,12 @@
             <a:effectLst/>
             <a:extLst>
               <a:ext uri="{909E8E84-426E-40dd-AFC4-6F175D3DCCD1}">
-                <a14:hiddenFill xmlns="" xmlns:a14="http://schemas.microsoft.com/office/drawing/2010/main">
+                <a14:hiddenFill xmlns:a14="http://schemas.microsoft.com/office/drawing/2010/main" xmlns="">
                   <a:noFill/>
                 </a14:hiddenFill>
               </a:ext>
               <a:ext uri="{AF507438-7753-43e0-B8FC-AC1667EBCBE1}">
-                <a14:hiddenEffects xmlns="" xmlns:a14="http://schemas.microsoft.com/office/drawing/2010/main">
+                <a14:hiddenEffects xmlns:a14="http://schemas.microsoft.com/office/drawing/2010/main" xmlns="">
                   <a:effectLst>
                     <a:outerShdw blurRad="63500" dist="38099" dir="2700000" algn="ctr" rotWithShape="0">
                       <a:srgbClr val="000000">
@@ -12850,12 +12850,12 @@
             <a:effectLst/>
             <a:extLst>
               <a:ext uri="{909E8E84-426E-40dd-AFC4-6F175D3DCCD1}">
-                <a14:hiddenFill xmlns="" xmlns:a14="http://schemas.microsoft.com/office/drawing/2010/main">
+                <a14:hiddenFill xmlns:a14="http://schemas.microsoft.com/office/drawing/2010/main" xmlns="">
                   <a:noFill/>
                 </a14:hiddenFill>
               </a:ext>
               <a:ext uri="{AF507438-7753-43e0-B8FC-AC1667EBCBE1}">
-                <a14:hiddenEffects xmlns="" xmlns:a14="http://schemas.microsoft.com/office/drawing/2010/main">
+                <a14:hiddenEffects xmlns:a14="http://schemas.microsoft.com/office/drawing/2010/main" xmlns="">
                   <a:effectLst>
                     <a:outerShdw blurRad="63500" dist="38099" dir="2700000" algn="ctr" rotWithShape="0">
                       <a:srgbClr val="000000">
@@ -12908,12 +12908,12 @@
             <a:effectLst/>
             <a:extLst>
               <a:ext uri="{909E8E84-426E-40dd-AFC4-6F175D3DCCD1}">
-                <a14:hiddenFill xmlns="" xmlns:a14="http://schemas.microsoft.com/office/drawing/2010/main">
+                <a14:hiddenFill xmlns:a14="http://schemas.microsoft.com/office/drawing/2010/main" xmlns="">
                   <a:noFill/>
                 </a14:hiddenFill>
               </a:ext>
               <a:ext uri="{AF507438-7753-43e0-B8FC-AC1667EBCBE1}">
-                <a14:hiddenEffects xmlns="" xmlns:a14="http://schemas.microsoft.com/office/drawing/2010/main">
+                <a14:hiddenEffects xmlns:a14="http://schemas.microsoft.com/office/drawing/2010/main" xmlns="">
                   <a:effectLst>
                     <a:outerShdw blurRad="63500" dist="38099" dir="2700000" algn="ctr" rotWithShape="0">
                       <a:srgbClr val="000000">
@@ -12966,12 +12966,12 @@
             <a:effectLst/>
             <a:extLst>
               <a:ext uri="{909E8E84-426E-40dd-AFC4-6F175D3DCCD1}">
-                <a14:hiddenFill xmlns="" xmlns:a14="http://schemas.microsoft.com/office/drawing/2010/main">
+                <a14:hiddenFill xmlns:a14="http://schemas.microsoft.com/office/drawing/2010/main" xmlns="">
                   <a:noFill/>
                 </a14:hiddenFill>
               </a:ext>
               <a:ext uri="{AF507438-7753-43e0-B8FC-AC1667EBCBE1}">
-                <a14:hiddenEffects xmlns="" xmlns:a14="http://schemas.microsoft.com/office/drawing/2010/main">
+                <a14:hiddenEffects xmlns:a14="http://schemas.microsoft.com/office/drawing/2010/main" xmlns="">
                   <a:effectLst>
                     <a:outerShdw blurRad="63500" dist="38099" dir="2700000" algn="ctr" rotWithShape="0">
                       <a:srgbClr val="000000">
@@ -13024,12 +13024,12 @@
             <a:effectLst/>
             <a:extLst>
               <a:ext uri="{909E8E84-426E-40dd-AFC4-6F175D3DCCD1}">
-                <a14:hiddenFill xmlns="" xmlns:a14="http://schemas.microsoft.com/office/drawing/2010/main">
+                <a14:hiddenFill xmlns:a14="http://schemas.microsoft.com/office/drawing/2010/main" xmlns="">
                   <a:noFill/>
                 </a14:hiddenFill>
               </a:ext>
               <a:ext uri="{AF507438-7753-43e0-B8FC-AC1667EBCBE1}">
-                <a14:hiddenEffects xmlns="" xmlns:a14="http://schemas.microsoft.com/office/drawing/2010/main">
+                <a14:hiddenEffects xmlns:a14="http://schemas.microsoft.com/office/drawing/2010/main" xmlns="">
                   <a:effectLst>
                     <a:outerShdw blurRad="63500" dist="38099" dir="2700000" algn="ctr" rotWithShape="0">
                       <a:srgbClr val="000000">
@@ -13082,12 +13082,12 @@
             <a:effectLst/>
             <a:extLst>
               <a:ext uri="{909E8E84-426E-40dd-AFC4-6F175D3DCCD1}">
-                <a14:hiddenFill xmlns="" xmlns:a14="http://schemas.microsoft.com/office/drawing/2010/main">
+                <a14:hiddenFill xmlns:a14="http://schemas.microsoft.com/office/drawing/2010/main" xmlns="">
                   <a:noFill/>
                 </a14:hiddenFill>
               </a:ext>
               <a:ext uri="{AF507438-7753-43e0-B8FC-AC1667EBCBE1}">
-                <a14:hiddenEffects xmlns="" xmlns:a14="http://schemas.microsoft.com/office/drawing/2010/main">
+                <a14:hiddenEffects xmlns:a14="http://schemas.microsoft.com/office/drawing/2010/main" xmlns="">
                   <a:effectLst>
                     <a:outerShdw blurRad="63500" dist="38099" dir="2700000" algn="ctr" rotWithShape="0">
                       <a:srgbClr val="000000">
@@ -13140,12 +13140,12 @@
             <a:effectLst/>
             <a:extLst>
               <a:ext uri="{909E8E84-426E-40dd-AFC4-6F175D3DCCD1}">
-                <a14:hiddenFill xmlns="" xmlns:a14="http://schemas.microsoft.com/office/drawing/2010/main">
+                <a14:hiddenFill xmlns:a14="http://schemas.microsoft.com/office/drawing/2010/main" xmlns="">
                   <a:noFill/>
                 </a14:hiddenFill>
               </a:ext>
               <a:ext uri="{AF507438-7753-43e0-B8FC-AC1667EBCBE1}">
-                <a14:hiddenEffects xmlns="" xmlns:a14="http://schemas.microsoft.com/office/drawing/2010/main">
+                <a14:hiddenEffects xmlns:a14="http://schemas.microsoft.com/office/drawing/2010/main" xmlns="">
                   <a:effectLst>
                     <a:outerShdw blurRad="63500" dist="38099" dir="2700000" algn="ctr" rotWithShape="0">
                       <a:srgbClr val="000000">
@@ -13206,7 +13206,7 @@
             <a:effectLst/>
             <a:extLst>
               <a:ext uri="{909E8E84-426E-40dd-AFC4-6F175D3DCCD1}">
-                <a14:hiddenFill xmlns="" xmlns:a14="http://schemas.microsoft.com/office/drawing/2010/main">
+                <a14:hiddenFill xmlns:a14="http://schemas.microsoft.com/office/drawing/2010/main" xmlns="">
                   <a:blipFill dpi="0" rotWithShape="0">
                     <a:blip/>
                     <a:srcRect/>
@@ -13217,7 +13217,7 @@
                 </a14:hiddenFill>
               </a:ext>
               <a:ext uri="{91240B29-F687-4f45-9708-019B960494DF}">
-                <a14:hiddenLine xmlns="" xmlns:a14="http://schemas.microsoft.com/office/drawing/2010/main" w="9525">
+                <a14:hiddenLine xmlns:a14="http://schemas.microsoft.com/office/drawing/2010/main" xmlns="" w="9525">
                   <a:solidFill>
                     <a:srgbClr val="000000"/>
                   </a:solidFill>
@@ -13227,7 +13227,7 @@
                 </a14:hiddenLine>
               </a:ext>
               <a:ext uri="{AF507438-7753-43e0-B8FC-AC1667EBCBE1}">
-                <a14:hiddenEffects xmlns="" xmlns:a14="http://schemas.microsoft.com/office/drawing/2010/main">
+                <a14:hiddenEffects xmlns:a14="http://schemas.microsoft.com/office/drawing/2010/main" xmlns="">
                   <a:effectLst>
                     <a:outerShdw blurRad="63500" dist="38099" dir="2700000" algn="ctr" rotWithShape="0">
                       <a:srgbClr val="000000">
@@ -13276,7 +13276,7 @@
             <a:effectLst/>
             <a:extLst>
               <a:ext uri="{909E8E84-426E-40dd-AFC4-6F175D3DCCD1}">
-                <a14:hiddenFill xmlns="" xmlns:a14="http://schemas.microsoft.com/office/drawing/2010/main">
+                <a14:hiddenFill xmlns:a14="http://schemas.microsoft.com/office/drawing/2010/main" xmlns="">
                   <a:blipFill dpi="0" rotWithShape="0">
                     <a:blip/>
                     <a:srcRect/>
@@ -13287,7 +13287,7 @@
                 </a14:hiddenFill>
               </a:ext>
               <a:ext uri="{91240B29-F687-4f45-9708-019B960494DF}">
-                <a14:hiddenLine xmlns="" xmlns:a14="http://schemas.microsoft.com/office/drawing/2010/main" w="9525">
+                <a14:hiddenLine xmlns:a14="http://schemas.microsoft.com/office/drawing/2010/main" xmlns="" w="9525">
                   <a:solidFill>
                     <a:srgbClr val="000000"/>
                   </a:solidFill>
@@ -13297,7 +13297,7 @@
                 </a14:hiddenLine>
               </a:ext>
               <a:ext uri="{AF507438-7753-43e0-B8FC-AC1667EBCBE1}">
-                <a14:hiddenEffects xmlns="" xmlns:a14="http://schemas.microsoft.com/office/drawing/2010/main">
+                <a14:hiddenEffects xmlns:a14="http://schemas.microsoft.com/office/drawing/2010/main" xmlns="">
                   <a:effectLst>
                     <a:outerShdw blurRad="63500" dist="38099" dir="2700000" algn="ctr" rotWithShape="0">
                       <a:srgbClr val="000000">
@@ -13346,7 +13346,7 @@
             <a:effectLst/>
             <a:extLst>
               <a:ext uri="{909E8E84-426E-40dd-AFC4-6F175D3DCCD1}">
-                <a14:hiddenFill xmlns="" xmlns:a14="http://schemas.microsoft.com/office/drawing/2010/main">
+                <a14:hiddenFill xmlns:a14="http://schemas.microsoft.com/office/drawing/2010/main" xmlns="">
                   <a:blipFill dpi="0" rotWithShape="0">
                     <a:blip/>
                     <a:srcRect/>
@@ -13357,7 +13357,7 @@
                 </a14:hiddenFill>
               </a:ext>
               <a:ext uri="{91240B29-F687-4f45-9708-019B960494DF}">
-                <a14:hiddenLine xmlns="" xmlns:a14="http://schemas.microsoft.com/office/drawing/2010/main" w="9525">
+                <a14:hiddenLine xmlns:a14="http://schemas.microsoft.com/office/drawing/2010/main" xmlns="" w="9525">
                   <a:solidFill>
                     <a:srgbClr val="000000"/>
                   </a:solidFill>
@@ -13367,7 +13367,7 @@
                 </a14:hiddenLine>
               </a:ext>
               <a:ext uri="{AF507438-7753-43e0-B8FC-AC1667EBCBE1}">
-                <a14:hiddenEffects xmlns="" xmlns:a14="http://schemas.microsoft.com/office/drawing/2010/main">
+                <a14:hiddenEffects xmlns:a14="http://schemas.microsoft.com/office/drawing/2010/main" xmlns="">
                   <a:effectLst>
                     <a:outerShdw blurRad="63500" dist="38099" dir="2700000" algn="ctr" rotWithShape="0">
                       <a:srgbClr val="000000">
@@ -13416,7 +13416,7 @@
             <a:effectLst/>
             <a:extLst>
               <a:ext uri="{909E8E84-426E-40dd-AFC4-6F175D3DCCD1}">
-                <a14:hiddenFill xmlns="" xmlns:a14="http://schemas.microsoft.com/office/drawing/2010/main">
+                <a14:hiddenFill xmlns:a14="http://schemas.microsoft.com/office/drawing/2010/main" xmlns="">
                   <a:blipFill dpi="0" rotWithShape="0">
                     <a:blip/>
                     <a:srcRect/>
@@ -13427,7 +13427,7 @@
                 </a14:hiddenFill>
               </a:ext>
               <a:ext uri="{91240B29-F687-4f45-9708-019B960494DF}">
-                <a14:hiddenLine xmlns="" xmlns:a14="http://schemas.microsoft.com/office/drawing/2010/main" w="9525">
+                <a14:hiddenLine xmlns:a14="http://schemas.microsoft.com/office/drawing/2010/main" xmlns="" w="9525">
                   <a:solidFill>
                     <a:srgbClr val="000000"/>
                   </a:solidFill>
@@ -13437,7 +13437,7 @@
                 </a14:hiddenLine>
               </a:ext>
               <a:ext uri="{AF507438-7753-43e0-B8FC-AC1667EBCBE1}">
-                <a14:hiddenEffects xmlns="" xmlns:a14="http://schemas.microsoft.com/office/drawing/2010/main">
+                <a14:hiddenEffects xmlns:a14="http://schemas.microsoft.com/office/drawing/2010/main" xmlns="">
                   <a:effectLst>
                     <a:outerShdw blurRad="63500" dist="38099" dir="2700000" algn="ctr" rotWithShape="0">
                       <a:srgbClr val="000000">
@@ -13486,7 +13486,7 @@
             <a:effectLst/>
             <a:extLst>
               <a:ext uri="{909E8E84-426E-40dd-AFC4-6F175D3DCCD1}">
-                <a14:hiddenFill xmlns="" xmlns:a14="http://schemas.microsoft.com/office/drawing/2010/main">
+                <a14:hiddenFill xmlns:a14="http://schemas.microsoft.com/office/drawing/2010/main" xmlns="">
                   <a:blipFill dpi="0" rotWithShape="0">
                     <a:blip/>
                     <a:srcRect/>
@@ -13497,7 +13497,7 @@
                 </a14:hiddenFill>
               </a:ext>
               <a:ext uri="{91240B29-F687-4f45-9708-019B960494DF}">
-                <a14:hiddenLine xmlns="" xmlns:a14="http://schemas.microsoft.com/office/drawing/2010/main" w="9525">
+                <a14:hiddenLine xmlns:a14="http://schemas.microsoft.com/office/drawing/2010/main" xmlns="" w="9525">
                   <a:solidFill>
                     <a:srgbClr val="000000"/>
                   </a:solidFill>
@@ -13507,7 +13507,7 @@
                 </a14:hiddenLine>
               </a:ext>
               <a:ext uri="{AF507438-7753-43e0-B8FC-AC1667EBCBE1}">
-                <a14:hiddenEffects xmlns="" xmlns:a14="http://schemas.microsoft.com/office/drawing/2010/main">
+                <a14:hiddenEffects xmlns:a14="http://schemas.microsoft.com/office/drawing/2010/main" xmlns="">
                   <a:effectLst>
                     <a:outerShdw blurRad="63500" dist="38099" dir="2700000" algn="ctr" rotWithShape="0">
                       <a:srgbClr val="000000">
@@ -13548,12 +13548,12 @@
             <a:effectLst/>
             <a:extLst>
               <a:ext uri="{909E8E84-426E-40dd-AFC4-6F175D3DCCD1}">
-                <a14:hiddenFill xmlns="" xmlns:a14="http://schemas.microsoft.com/office/drawing/2010/main">
+                <a14:hiddenFill xmlns:a14="http://schemas.microsoft.com/office/drawing/2010/main" xmlns="">
                   <a:noFill/>
                 </a14:hiddenFill>
               </a:ext>
               <a:ext uri="{AF507438-7753-43e0-B8FC-AC1667EBCBE1}">
-                <a14:hiddenEffects xmlns="" xmlns:a14="http://schemas.microsoft.com/office/drawing/2010/main">
+                <a14:hiddenEffects xmlns:a14="http://schemas.microsoft.com/office/drawing/2010/main" xmlns="">
                   <a:effectLst>
                     <a:outerShdw blurRad="63500" dist="38099" dir="2700000" algn="ctr" rotWithShape="0">
                       <a:srgbClr val="000000">
@@ -13606,12 +13606,12 @@
             <a:effectLst/>
             <a:extLst>
               <a:ext uri="{909E8E84-426E-40dd-AFC4-6F175D3DCCD1}">
-                <a14:hiddenFill xmlns="" xmlns:a14="http://schemas.microsoft.com/office/drawing/2010/main">
+                <a14:hiddenFill xmlns:a14="http://schemas.microsoft.com/office/drawing/2010/main" xmlns="">
                   <a:noFill/>
                 </a14:hiddenFill>
               </a:ext>
               <a:ext uri="{AF507438-7753-43e0-B8FC-AC1667EBCBE1}">
-                <a14:hiddenEffects xmlns="" xmlns:a14="http://schemas.microsoft.com/office/drawing/2010/main">
+                <a14:hiddenEffects xmlns:a14="http://schemas.microsoft.com/office/drawing/2010/main" xmlns="">
                   <a:effectLst>
                     <a:outerShdw blurRad="63500" dist="38099" dir="2700000" algn="ctr" rotWithShape="0">
                       <a:srgbClr val="000000">
@@ -13672,7 +13672,7 @@
             <a:effectLst/>
             <a:extLst>
               <a:ext uri="{909E8E84-426E-40dd-AFC4-6F175D3DCCD1}">
-                <a14:hiddenFill xmlns="" xmlns:a14="http://schemas.microsoft.com/office/drawing/2010/main">
+                <a14:hiddenFill xmlns:a14="http://schemas.microsoft.com/office/drawing/2010/main" xmlns="">
                   <a:blipFill dpi="0" rotWithShape="0">
                     <a:blip/>
                     <a:srcRect/>
@@ -13683,7 +13683,7 @@
                 </a14:hiddenFill>
               </a:ext>
               <a:ext uri="{91240B29-F687-4f45-9708-019B960494DF}">
-                <a14:hiddenLine xmlns="" xmlns:a14="http://schemas.microsoft.com/office/drawing/2010/main" w="9525">
+                <a14:hiddenLine xmlns:a14="http://schemas.microsoft.com/office/drawing/2010/main" xmlns="" w="9525">
                   <a:solidFill>
                     <a:srgbClr val="000000"/>
                   </a:solidFill>
@@ -13693,7 +13693,7 @@
                 </a14:hiddenLine>
               </a:ext>
               <a:ext uri="{AF507438-7753-43e0-B8FC-AC1667EBCBE1}">
-                <a14:hiddenEffects xmlns="" xmlns:a14="http://schemas.microsoft.com/office/drawing/2010/main">
+                <a14:hiddenEffects xmlns:a14="http://schemas.microsoft.com/office/drawing/2010/main" xmlns="">
                   <a:effectLst>
                     <a:outerShdw blurRad="63500" dist="38099" dir="2700000" algn="ctr" rotWithShape="0">
                       <a:srgbClr val="000000">
@@ -13826,7 +13826,7 @@
           <a:effectLst/>
           <a:extLst>
             <a:ext uri="{909E8E84-426E-40dd-AFC4-6F175D3DCCD1}">
-              <a14:hiddenFill xmlns:a14="http://schemas.microsoft.com/office/drawing/2010/main" xmlns="">
+              <a14:hiddenFill xmlns="" xmlns:a14="http://schemas.microsoft.com/office/drawing/2010/main">
                 <a:blipFill dpi="0" rotWithShape="0">
                   <a:blip/>
                   <a:srcRect/>
@@ -13837,7 +13837,7 @@
               </a14:hiddenFill>
             </a:ext>
             <a:ext uri="{91240B29-F687-4f45-9708-019B960494DF}">
-              <a14:hiddenLine xmlns:a14="http://schemas.microsoft.com/office/drawing/2010/main" xmlns="" w="9525">
+              <a14:hiddenLine xmlns="" xmlns:a14="http://schemas.microsoft.com/office/drawing/2010/main" w="9525">
                 <a:solidFill>
                   <a:srgbClr val="000000"/>
                 </a:solidFill>
@@ -13847,7 +13847,7 @@
               </a14:hiddenLine>
             </a:ext>
             <a:ext uri="{AF507438-7753-43e0-B8FC-AC1667EBCBE1}">
-              <a14:hiddenEffects xmlns:a14="http://schemas.microsoft.com/office/drawing/2010/main" xmlns="">
+              <a14:hiddenEffects xmlns="" xmlns:a14="http://schemas.microsoft.com/office/drawing/2010/main">
                 <a:effectLst>
                   <a:outerShdw blurRad="63500" dist="38099" dir="2700000" algn="ctr" rotWithShape="0">
                     <a:srgbClr val="000000">
@@ -13932,7 +13932,7 @@
           <a:effectLst/>
           <a:extLst>
             <a:ext uri="{909E8E84-426E-40dd-AFC4-6F175D3DCCD1}">
-              <a14:hiddenFill xmlns:a14="http://schemas.microsoft.com/office/drawing/2010/main" xmlns="">
+              <a14:hiddenFill xmlns="" xmlns:a14="http://schemas.microsoft.com/office/drawing/2010/main">
                 <a:blipFill dpi="0" rotWithShape="0">
                   <a:blip/>
                   <a:srcRect/>
@@ -13943,7 +13943,7 @@
               </a14:hiddenFill>
             </a:ext>
             <a:ext uri="{91240B29-F687-4f45-9708-019B960494DF}">
-              <a14:hiddenLine xmlns:a14="http://schemas.microsoft.com/office/drawing/2010/main" xmlns="" w="9525">
+              <a14:hiddenLine xmlns="" xmlns:a14="http://schemas.microsoft.com/office/drawing/2010/main" w="9525">
                 <a:solidFill>
                   <a:srgbClr val="000000"/>
                 </a:solidFill>
@@ -13953,7 +13953,7 @@
               </a14:hiddenLine>
             </a:ext>
             <a:ext uri="{AF507438-7753-43e0-B8FC-AC1667EBCBE1}">
-              <a14:hiddenEffects xmlns:a14="http://schemas.microsoft.com/office/drawing/2010/main" xmlns="">
+              <a14:hiddenEffects xmlns="" xmlns:a14="http://schemas.microsoft.com/office/drawing/2010/main">
                 <a:effectLst>
                   <a:outerShdw blurRad="63500" dist="38099" dir="2700000" algn="ctr" rotWithShape="0">
                     <a:srgbClr val="000000">
@@ -14038,7 +14038,7 @@
           <a:effectLst/>
           <a:extLst>
             <a:ext uri="{909E8E84-426E-40dd-AFC4-6F175D3DCCD1}">
-              <a14:hiddenFill xmlns:a14="http://schemas.microsoft.com/office/drawing/2010/main" xmlns="">
+              <a14:hiddenFill xmlns="" xmlns:a14="http://schemas.microsoft.com/office/drawing/2010/main">
                 <a:blipFill dpi="0" rotWithShape="0">
                   <a:blip/>
                   <a:srcRect/>
@@ -14049,7 +14049,7 @@
               </a14:hiddenFill>
             </a:ext>
             <a:ext uri="{91240B29-F687-4f45-9708-019B960494DF}">
-              <a14:hiddenLine xmlns:a14="http://schemas.microsoft.com/office/drawing/2010/main" xmlns="" w="9525">
+              <a14:hiddenLine xmlns="" xmlns:a14="http://schemas.microsoft.com/office/drawing/2010/main" w="9525">
                 <a:solidFill>
                   <a:srgbClr val="000000"/>
                 </a:solidFill>
@@ -14059,7 +14059,7 @@
               </a14:hiddenLine>
             </a:ext>
             <a:ext uri="{AF507438-7753-43e0-B8FC-AC1667EBCBE1}">
-              <a14:hiddenEffects xmlns:a14="http://schemas.microsoft.com/office/drawing/2010/main" xmlns="">
+              <a14:hiddenEffects xmlns="" xmlns:a14="http://schemas.microsoft.com/office/drawing/2010/main">
                 <a:effectLst>
                   <a:outerShdw blurRad="63500" dist="38099" dir="2700000" algn="ctr" rotWithShape="0">
                     <a:srgbClr val="000000">
@@ -14250,7 +14250,7 @@
           <a:effectLst/>
           <a:extLst>
             <a:ext uri="{909E8E84-426E-40dd-AFC4-6F175D3DCCD1}">
-              <a14:hiddenFill xmlns:a14="http://schemas.microsoft.com/office/drawing/2010/main" xmlns="">
+              <a14:hiddenFill xmlns="" xmlns:a14="http://schemas.microsoft.com/office/drawing/2010/main">
                 <a:blipFill dpi="0" rotWithShape="0">
                   <a:blip/>
                   <a:srcRect/>
@@ -14261,7 +14261,7 @@
               </a14:hiddenFill>
             </a:ext>
             <a:ext uri="{91240B29-F687-4f45-9708-019B960494DF}">
-              <a14:hiddenLine xmlns:a14="http://schemas.microsoft.com/office/drawing/2010/main" xmlns="" w="9525">
+              <a14:hiddenLine xmlns="" xmlns:a14="http://schemas.microsoft.com/office/drawing/2010/main" w="9525">
                 <a:solidFill>
                   <a:srgbClr val="000000"/>
                 </a:solidFill>
@@ -14271,7 +14271,7 @@
               </a14:hiddenLine>
             </a:ext>
             <a:ext uri="{AF507438-7753-43e0-B8FC-AC1667EBCBE1}">
-              <a14:hiddenEffects xmlns:a14="http://schemas.microsoft.com/office/drawing/2010/main" xmlns="">
+              <a14:hiddenEffects xmlns="" xmlns:a14="http://schemas.microsoft.com/office/drawing/2010/main">
                 <a:effectLst>
                   <a:outerShdw blurRad="63500" dist="38099" dir="2700000" algn="ctr" rotWithShape="0">
                     <a:srgbClr val="000000">
@@ -14349,7 +14349,7 @@
           <a:effectLst/>
           <a:extLst>
             <a:ext uri="{909E8E84-426E-40dd-AFC4-6F175D3DCCD1}">
-              <a14:hiddenFill xmlns:a14="http://schemas.microsoft.com/office/drawing/2010/main" xmlns="">
+              <a14:hiddenFill xmlns="" xmlns:a14="http://schemas.microsoft.com/office/drawing/2010/main">
                 <a:blipFill dpi="0" rotWithShape="0">
                   <a:blip/>
                   <a:srcRect/>
@@ -14360,7 +14360,7 @@
               </a14:hiddenFill>
             </a:ext>
             <a:ext uri="{91240B29-F687-4f45-9708-019B960494DF}">
-              <a14:hiddenLine xmlns:a14="http://schemas.microsoft.com/office/drawing/2010/main" xmlns="" w="9525">
+              <a14:hiddenLine xmlns="" xmlns:a14="http://schemas.microsoft.com/office/drawing/2010/main" w="9525">
                 <a:solidFill>
                   <a:srgbClr val="000000"/>
                 </a:solidFill>
@@ -14370,7 +14370,7 @@
               </a14:hiddenLine>
             </a:ext>
             <a:ext uri="{AF507438-7753-43e0-B8FC-AC1667EBCBE1}">
-              <a14:hiddenEffects xmlns:a14="http://schemas.microsoft.com/office/drawing/2010/main" xmlns="">
+              <a14:hiddenEffects xmlns="" xmlns:a14="http://schemas.microsoft.com/office/drawing/2010/main">
                 <a:effectLst>
                   <a:outerShdw blurRad="63500" dist="38099" dir="2700000" algn="ctr" rotWithShape="0">
                     <a:srgbClr val="000000">
@@ -16235,7 +16235,7 @@
           <a:effectLst/>
           <a:extLst>
             <a:ext uri="{909E8E84-426E-40dd-AFC4-6F175D3DCCD1}">
-              <a14:hiddenFill xmlns="" xmlns:a14="http://schemas.microsoft.com/office/drawing/2010/main">
+              <a14:hiddenFill xmlns:a14="http://schemas.microsoft.com/office/drawing/2010/main" xmlns="">
                 <a:blipFill dpi="0" rotWithShape="0">
                   <a:blip/>
                   <a:srcRect/>
@@ -16246,7 +16246,7 @@
               </a14:hiddenFill>
             </a:ext>
             <a:ext uri="{91240B29-F687-4f45-9708-019B960494DF}">
-              <a14:hiddenLine xmlns="" xmlns:a14="http://schemas.microsoft.com/office/drawing/2010/main" w="9525">
+              <a14:hiddenLine xmlns:a14="http://schemas.microsoft.com/office/drawing/2010/main" xmlns="" w="9525">
                 <a:solidFill>
                   <a:srgbClr val="000000"/>
                 </a:solidFill>
@@ -16256,7 +16256,7 @@
               </a14:hiddenLine>
             </a:ext>
             <a:ext uri="{AF507438-7753-43e0-B8FC-AC1667EBCBE1}">
-              <a14:hiddenEffects xmlns="" xmlns:a14="http://schemas.microsoft.com/office/drawing/2010/main">
+              <a14:hiddenEffects xmlns:a14="http://schemas.microsoft.com/office/drawing/2010/main" xmlns="">
                 <a:effectLst>
                   <a:outerShdw blurRad="63500" dist="38099" dir="2700000" algn="ctr" rotWithShape="0">
                     <a:srgbClr val="000000">
@@ -16416,7 +16416,7 @@
           <a:effectLst/>
           <a:extLst>
             <a:ext uri="{909E8E84-426E-40dd-AFC4-6F175D3DCCD1}">
-              <a14:hiddenFill xmlns="" xmlns:a14="http://schemas.microsoft.com/office/drawing/2010/main">
+              <a14:hiddenFill xmlns:a14="http://schemas.microsoft.com/office/drawing/2010/main" xmlns="">
                 <a:blipFill dpi="0" rotWithShape="0">
                   <a:blip/>
                   <a:srcRect/>
@@ -16427,7 +16427,7 @@
               </a14:hiddenFill>
             </a:ext>
             <a:ext uri="{91240B29-F687-4f45-9708-019B960494DF}">
-              <a14:hiddenLine xmlns="" xmlns:a14="http://schemas.microsoft.com/office/drawing/2010/main" w="9525">
+              <a14:hiddenLine xmlns:a14="http://schemas.microsoft.com/office/drawing/2010/main" xmlns="" w="9525">
                 <a:solidFill>
                   <a:srgbClr val="000000"/>
                 </a:solidFill>
@@ -16437,7 +16437,7 @@
               </a14:hiddenLine>
             </a:ext>
             <a:ext uri="{AF507438-7753-43e0-B8FC-AC1667EBCBE1}">
-              <a14:hiddenEffects xmlns="" xmlns:a14="http://schemas.microsoft.com/office/drawing/2010/main">
+              <a14:hiddenEffects xmlns:a14="http://schemas.microsoft.com/office/drawing/2010/main" xmlns="">
                 <a:effectLst>
                   <a:outerShdw blurRad="63500" dist="38099" dir="2700000" algn="ctr" rotWithShape="0">
                     <a:srgbClr val="000000">
@@ -18236,7 +18236,7 @@
           <a:effectLst/>
           <a:extLst>
             <a:ext uri="{909E8E84-426E-40dd-AFC4-6F175D3DCCD1}">
-              <a14:hiddenFill xmlns="" xmlns:a14="http://schemas.microsoft.com/office/drawing/2010/main">
+              <a14:hiddenFill xmlns:a14="http://schemas.microsoft.com/office/drawing/2010/main" xmlns="">
                 <a:blipFill dpi="0" rotWithShape="0">
                   <a:blip/>
                   <a:srcRect/>
@@ -18247,7 +18247,7 @@
               </a14:hiddenFill>
             </a:ext>
             <a:ext uri="{91240B29-F687-4f45-9708-019B960494DF}">
-              <a14:hiddenLine xmlns="" xmlns:a14="http://schemas.microsoft.com/office/drawing/2010/main" w="9525">
+              <a14:hiddenLine xmlns:a14="http://schemas.microsoft.com/office/drawing/2010/main" xmlns="" w="9525">
                 <a:solidFill>
                   <a:srgbClr val="000000"/>
                 </a:solidFill>
@@ -18257,7 +18257,7 @@
               </a14:hiddenLine>
             </a:ext>
             <a:ext uri="{AF507438-7753-43e0-B8FC-AC1667EBCBE1}">
-              <a14:hiddenEffects xmlns="" xmlns:a14="http://schemas.microsoft.com/office/drawing/2010/main">
+              <a14:hiddenEffects xmlns:a14="http://schemas.microsoft.com/office/drawing/2010/main" xmlns="">
                 <a:effectLst>
                   <a:outerShdw blurRad="63500" dist="38099" dir="2700000" algn="ctr" rotWithShape="0">
                     <a:srgbClr val="000000">
@@ -18350,7 +18350,7 @@
           <a:effectLst/>
           <a:extLst>
             <a:ext uri="{909E8E84-426E-40dd-AFC4-6F175D3DCCD1}">
-              <a14:hiddenFill xmlns="" xmlns:a14="http://schemas.microsoft.com/office/drawing/2010/main">
+              <a14:hiddenFill xmlns:a14="http://schemas.microsoft.com/office/drawing/2010/main" xmlns="">
                 <a:blipFill dpi="0" rotWithShape="0">
                   <a:blip/>
                   <a:srcRect/>
@@ -18361,7 +18361,7 @@
               </a14:hiddenFill>
             </a:ext>
             <a:ext uri="{91240B29-F687-4f45-9708-019B960494DF}">
-              <a14:hiddenLine xmlns="" xmlns:a14="http://schemas.microsoft.com/office/drawing/2010/main" w="9525">
+              <a14:hiddenLine xmlns:a14="http://schemas.microsoft.com/office/drawing/2010/main" xmlns="" w="9525">
                 <a:solidFill>
                   <a:srgbClr val="000000"/>
                 </a:solidFill>
@@ -18371,7 +18371,7 @@
               </a14:hiddenLine>
             </a:ext>
             <a:ext uri="{AF507438-7753-43e0-B8FC-AC1667EBCBE1}">
-              <a14:hiddenEffects xmlns="" xmlns:a14="http://schemas.microsoft.com/office/drawing/2010/main">
+              <a14:hiddenEffects xmlns:a14="http://schemas.microsoft.com/office/drawing/2010/main" xmlns="">
                 <a:effectLst>
                   <a:outerShdw blurRad="63500" dist="38099" dir="2700000" algn="ctr" rotWithShape="0">
                     <a:srgbClr val="000000">
@@ -21243,7 +21243,7 @@
           <a:effectLst/>
           <a:extLst>
             <a:ext uri="{909E8E84-426E-40dd-AFC4-6F175D3DCCD1}">
-              <a14:hiddenFill xmlns="" xmlns:a14="http://schemas.microsoft.com/office/drawing/2010/main">
+              <a14:hiddenFill xmlns:a14="http://schemas.microsoft.com/office/drawing/2010/main" xmlns="">
                 <a:blipFill dpi="0" rotWithShape="0">
                   <a:blip/>
                   <a:srcRect/>
@@ -21254,7 +21254,7 @@
               </a14:hiddenFill>
             </a:ext>
             <a:ext uri="{91240B29-F687-4f45-9708-019B960494DF}">
-              <a14:hiddenLine xmlns="" xmlns:a14="http://schemas.microsoft.com/office/drawing/2010/main" w="9525">
+              <a14:hiddenLine xmlns:a14="http://schemas.microsoft.com/office/drawing/2010/main" xmlns="" w="9525">
                 <a:solidFill>
                   <a:srgbClr val="000000"/>
                 </a:solidFill>
@@ -21264,7 +21264,7 @@
               </a14:hiddenLine>
             </a:ext>
             <a:ext uri="{AF507438-7753-43e0-B8FC-AC1667EBCBE1}">
-              <a14:hiddenEffects xmlns="" xmlns:a14="http://schemas.microsoft.com/office/drawing/2010/main">
+              <a14:hiddenEffects xmlns:a14="http://schemas.microsoft.com/office/drawing/2010/main" xmlns="">
                 <a:effectLst>
                   <a:outerShdw blurRad="63500" dist="38099" dir="2700000" algn="ctr" rotWithShape="0">
                     <a:srgbClr val="000000">
@@ -21343,7 +21343,7 @@
           <a:effectLst/>
           <a:extLst>
             <a:ext uri="{909E8E84-426E-40dd-AFC4-6F175D3DCCD1}">
-              <a14:hiddenFill xmlns="" xmlns:a14="http://schemas.microsoft.com/office/drawing/2010/main">
+              <a14:hiddenFill xmlns:a14="http://schemas.microsoft.com/office/drawing/2010/main" xmlns="">
                 <a:blipFill dpi="0" rotWithShape="0">
                   <a:blip/>
                   <a:srcRect/>
@@ -21354,7 +21354,7 @@
               </a14:hiddenFill>
             </a:ext>
             <a:ext uri="{91240B29-F687-4f45-9708-019B960494DF}">
-              <a14:hiddenLine xmlns="" xmlns:a14="http://schemas.microsoft.com/office/drawing/2010/main" w="9525">
+              <a14:hiddenLine xmlns:a14="http://schemas.microsoft.com/office/drawing/2010/main" xmlns="" w="9525">
                 <a:solidFill>
                   <a:srgbClr val="000000"/>
                 </a:solidFill>
@@ -21364,7 +21364,7 @@
               </a14:hiddenLine>
             </a:ext>
             <a:ext uri="{AF507438-7753-43e0-B8FC-AC1667EBCBE1}">
-              <a14:hiddenEffects xmlns="" xmlns:a14="http://schemas.microsoft.com/office/drawing/2010/main">
+              <a14:hiddenEffects xmlns:a14="http://schemas.microsoft.com/office/drawing/2010/main" xmlns="">
                 <a:effectLst>
                   <a:outerShdw blurRad="63500" dist="38099" dir="2700000" algn="ctr" rotWithShape="0">
                     <a:srgbClr val="000000">
@@ -22947,7 +22947,7 @@
           <a:effectLst/>
           <a:extLst>
             <a:ext uri="{909E8E84-426E-40dd-AFC4-6F175D3DCCD1}">
-              <a14:hiddenFill xmlns="" xmlns:a14="http://schemas.microsoft.com/office/drawing/2010/main">
+              <a14:hiddenFill xmlns:a14="http://schemas.microsoft.com/office/drawing/2010/main" xmlns="">
                 <a:blipFill dpi="0" rotWithShape="0">
                   <a:blip/>
                   <a:srcRect/>
@@ -22958,7 +22958,7 @@
               </a14:hiddenFill>
             </a:ext>
             <a:ext uri="{91240B29-F687-4f45-9708-019B960494DF}">
-              <a14:hiddenLine xmlns="" xmlns:a14="http://schemas.microsoft.com/office/drawing/2010/main" w="9525">
+              <a14:hiddenLine xmlns:a14="http://schemas.microsoft.com/office/drawing/2010/main" xmlns="" w="9525">
                 <a:solidFill>
                   <a:srgbClr val="000000"/>
                 </a:solidFill>
@@ -22968,7 +22968,7 @@
               </a14:hiddenLine>
             </a:ext>
             <a:ext uri="{AF507438-7753-43e0-B8FC-AC1667EBCBE1}">
-              <a14:hiddenEffects xmlns="" xmlns:a14="http://schemas.microsoft.com/office/drawing/2010/main">
+              <a14:hiddenEffects xmlns:a14="http://schemas.microsoft.com/office/drawing/2010/main" xmlns="">
                 <a:effectLst>
                   <a:outerShdw blurRad="63500" dist="38099" dir="2700000" algn="ctr" rotWithShape="0">
                     <a:srgbClr val="000000">
@@ -24616,7 +24616,7 @@
           <a:effectLst/>
           <a:extLst>
             <a:ext uri="{909E8E84-426E-40dd-AFC4-6F175D3DCCD1}">
-              <a14:hiddenFill xmlns="" xmlns:a14="http://schemas.microsoft.com/office/drawing/2010/main">
+              <a14:hiddenFill xmlns:a14="http://schemas.microsoft.com/office/drawing/2010/main" xmlns="">
                 <a:blipFill dpi="0" rotWithShape="0">
                   <a:blip/>
                   <a:srcRect/>
@@ -24627,7 +24627,7 @@
               </a14:hiddenFill>
             </a:ext>
             <a:ext uri="{91240B29-F687-4f45-9708-019B960494DF}">
-              <a14:hiddenLine xmlns="" xmlns:a14="http://schemas.microsoft.com/office/drawing/2010/main" w="9525">
+              <a14:hiddenLine xmlns:a14="http://schemas.microsoft.com/office/drawing/2010/main" xmlns="" w="9525">
                 <a:solidFill>
                   <a:srgbClr val="000000"/>
                 </a:solidFill>
@@ -24637,7 +24637,7 @@
               </a14:hiddenLine>
             </a:ext>
             <a:ext uri="{AF507438-7753-43e0-B8FC-AC1667EBCBE1}">
-              <a14:hiddenEffects xmlns="" xmlns:a14="http://schemas.microsoft.com/office/drawing/2010/main">
+              <a14:hiddenEffects xmlns:a14="http://schemas.microsoft.com/office/drawing/2010/main" xmlns="">
                 <a:effectLst>
                   <a:outerShdw blurRad="63500" dist="38099" dir="2700000" algn="ctr" rotWithShape="0">
                     <a:srgbClr val="000000">
@@ -25999,7 +25999,7 @@
           <a:effectLst/>
           <a:extLst>
             <a:ext uri="{909E8E84-426E-40dd-AFC4-6F175D3DCCD1}">
-              <a14:hiddenFill xmlns="" xmlns:a14="http://schemas.microsoft.com/office/drawing/2010/main">
+              <a14:hiddenFill xmlns:a14="http://schemas.microsoft.com/office/drawing/2010/main" xmlns="">
                 <a:blipFill dpi="0" rotWithShape="0">
                   <a:blip/>
                   <a:srcRect/>
@@ -26010,7 +26010,7 @@
               </a14:hiddenFill>
             </a:ext>
             <a:ext uri="{91240B29-F687-4f45-9708-019B960494DF}">
-              <a14:hiddenLine xmlns="" xmlns:a14="http://schemas.microsoft.com/office/drawing/2010/main" w="9525">
+              <a14:hiddenLine xmlns:a14="http://schemas.microsoft.com/office/drawing/2010/main" xmlns="" w="9525">
                 <a:solidFill>
                   <a:srgbClr val="000000"/>
                 </a:solidFill>
@@ -26020,7 +26020,7 @@
               </a14:hiddenLine>
             </a:ext>
             <a:ext uri="{AF507438-7753-43e0-B8FC-AC1667EBCBE1}">
-              <a14:hiddenEffects xmlns="" xmlns:a14="http://schemas.microsoft.com/office/drawing/2010/main">
+              <a14:hiddenEffects xmlns:a14="http://schemas.microsoft.com/office/drawing/2010/main" xmlns="">
                 <a:effectLst>
                   <a:outerShdw blurRad="63500" dist="38099" dir="2700000" algn="ctr" rotWithShape="0">
                     <a:srgbClr val="000000">
@@ -26151,7 +26151,7 @@
           <a:effectLst/>
           <a:extLst>
             <a:ext uri="{909E8E84-426E-40dd-AFC4-6F175D3DCCD1}">
-              <a14:hiddenFill xmlns="" xmlns:a14="http://schemas.microsoft.com/office/drawing/2010/main">
+              <a14:hiddenFill xmlns:a14="http://schemas.microsoft.com/office/drawing/2010/main" xmlns="">
                 <a:blipFill dpi="0" rotWithShape="0">
                   <a:blip/>
                   <a:srcRect/>
@@ -26162,7 +26162,7 @@
               </a14:hiddenFill>
             </a:ext>
             <a:ext uri="{91240B29-F687-4f45-9708-019B960494DF}">
-              <a14:hiddenLine xmlns="" xmlns:a14="http://schemas.microsoft.com/office/drawing/2010/main" w="9525">
+              <a14:hiddenLine xmlns:a14="http://schemas.microsoft.com/office/drawing/2010/main" xmlns="" w="9525">
                 <a:solidFill>
                   <a:srgbClr val="000000"/>
                 </a:solidFill>
@@ -26172,7 +26172,7 @@
               </a14:hiddenLine>
             </a:ext>
             <a:ext uri="{AF507438-7753-43e0-B8FC-AC1667EBCBE1}">
-              <a14:hiddenEffects xmlns="" xmlns:a14="http://schemas.microsoft.com/office/drawing/2010/main">
+              <a14:hiddenEffects xmlns:a14="http://schemas.microsoft.com/office/drawing/2010/main" xmlns="">
                 <a:effectLst>
                   <a:outerShdw blurRad="63500" dist="38099" dir="2700000" algn="ctr" rotWithShape="0">
                     <a:srgbClr val="000000">
@@ -28902,8 +28902,8 @@
           </a:p>
         </p:txBody>
       </p:sp>
-      <mc:AlternateContent xmlns:mc="http://schemas.openxmlformats.org/markup-compatibility/2006" xmlns:a14="http://schemas.microsoft.com/office/drawing/2010/main">
-        <mc:Choice Requires="a14">
+      <mc:AlternateContent xmlns:mc="http://schemas.openxmlformats.org/markup-compatibility/2006">
+        <mc:Choice xmlns:a14="http://schemas.microsoft.com/office/drawing/2010/main" Requires="a14">
           <p:sp>
             <p:nvSpPr>
               <p:cNvPr id="3" name="Content Placeholder 2"/>
@@ -29712,7 +29712,7 @@
             </p:txBody>
           </p:sp>
         </mc:Choice>
-        <mc:Fallback xmlns="">
+        <mc:Fallback>
           <p:sp>
             <p:nvSpPr>
               <p:cNvPr id="3" name="Content Placeholder 2"/>
@@ -30254,26 +30254,39 @@
                                   </p:childTnLst>
                                 </p:cTn>
                               </p:par>
-                            </p:childTnLst>
-                          </p:cTn>
-                        </p:par>
-                      </p:childTnLst>
-                    </p:cTn>
-                  </p:par>
-                  <p:par>
-                    <p:cTn id="15" fill="hold">
-                      <p:stCondLst>
-                        <p:cond delay="indefinite"/>
-                      </p:stCondLst>
-                      <p:childTnLst>
-                        <p:par>
-                          <p:cTn id="16" fill="hold">
-                            <p:stCondLst>
-                              <p:cond delay="0"/>
-                            </p:stCondLst>
-                            <p:childTnLst>
                               <p:par>
-                                <p:cTn id="17" presetID="1" presetClass="entr" presetSubtype="0" fill="hold" nodeType="clickEffect">
+                                <p:cTn id="15" presetID="1" presetClass="entr" presetSubtype="0" fill="hold" nodeType="withEffect">
+                                  <p:stCondLst>
+                                    <p:cond delay="0"/>
+                                  </p:stCondLst>
+                                  <p:childTnLst>
+                                    <p:set>
+                                      <p:cBhvr>
+                                        <p:cTn id="16" dur="1" fill="hold">
+                                          <p:stCondLst>
+                                            <p:cond delay="0"/>
+                                          </p:stCondLst>
+                                        </p:cTn>
+                                        <p:tgtEl>
+                                          <p:spTgt spid="3">
+                                            <p:txEl>
+                                              <p:pRg st="4" end="4"/>
+                                            </p:txEl>
+                                          </p:spTgt>
+                                        </p:tgtEl>
+                                        <p:attrNameLst>
+                                          <p:attrName>style.visibility</p:attrName>
+                                        </p:attrNameLst>
+                                      </p:cBhvr>
+                                      <p:to>
+                                        <p:strVal val="visible"/>
+                                      </p:to>
+                                    </p:set>
+                                  </p:childTnLst>
+                                </p:cTn>
+                              </p:par>
+                              <p:par>
+                                <p:cTn id="17" presetID="1" presetClass="entr" presetSubtype="0" fill="hold" nodeType="withEffect">
                                   <p:stCondLst>
                                     <p:cond delay="0"/>
                                   </p:stCondLst>
@@ -30286,11 +30299,7 @@
                                           </p:stCondLst>
                                         </p:cTn>
                                         <p:tgtEl>
-                                          <p:spTgt spid="3">
-                                            <p:txEl>
-                                              <p:pRg st="4" end="4"/>
-                                            </p:txEl>
-                                          </p:spTgt>
+                                          <p:spTgt spid="12"/>
                                         </p:tgtEl>
                                         <p:attrNameLst>
                                           <p:attrName>style.visibility</p:attrName>
@@ -30487,33 +30496,6 @@
                                               <p:pRg st="8" end="8"/>
                                             </p:txEl>
                                           </p:spTgt>
-                                        </p:tgtEl>
-                                        <p:attrNameLst>
-                                          <p:attrName>style.visibility</p:attrName>
-                                        </p:attrNameLst>
-                                      </p:cBhvr>
-                                      <p:to>
-                                        <p:strVal val="visible"/>
-                                      </p:to>
-                                    </p:set>
-                                  </p:childTnLst>
-                                </p:cTn>
-                              </p:par>
-                              <p:par>
-                                <p:cTn id="35" presetID="1" presetClass="entr" presetSubtype="0" fill="hold" nodeType="withEffect">
-                                  <p:stCondLst>
-                                    <p:cond delay="0"/>
-                                  </p:stCondLst>
-                                  <p:childTnLst>
-                                    <p:set>
-                                      <p:cBhvr>
-                                        <p:cTn id="36" dur="1" fill="hold">
-                                          <p:stCondLst>
-                                            <p:cond delay="0"/>
-                                          </p:stCondLst>
-                                        </p:cTn>
-                                        <p:tgtEl>
-                                          <p:spTgt spid="12"/>
                                         </p:tgtEl>
                                         <p:attrNameLst>
                                           <p:attrName>style.visibility</p:attrName>
@@ -33892,7 +33874,7 @@
           <a:effectLst/>
           <a:extLst>
             <a:ext uri="{909E8E84-426E-40dd-AFC4-6F175D3DCCD1}">
-              <a14:hiddenFill xmlns:a14="http://schemas.microsoft.com/office/drawing/2010/main" xmlns="">
+              <a14:hiddenFill xmlns="" xmlns:a14="http://schemas.microsoft.com/office/drawing/2010/main">
                 <a:blipFill dpi="0" rotWithShape="0">
                   <a:blip/>
                   <a:srcRect/>
@@ -33903,7 +33885,7 @@
               </a14:hiddenFill>
             </a:ext>
             <a:ext uri="{91240B29-F687-4f45-9708-019B960494DF}">
-              <a14:hiddenLine xmlns:a14="http://schemas.microsoft.com/office/drawing/2010/main" xmlns="" w="9525">
+              <a14:hiddenLine xmlns="" xmlns:a14="http://schemas.microsoft.com/office/drawing/2010/main" w="9525">
                 <a:solidFill>
                   <a:srgbClr val="000000"/>
                 </a:solidFill>
@@ -33913,7 +33895,7 @@
               </a14:hiddenLine>
             </a:ext>
             <a:ext uri="{AF507438-7753-43e0-B8FC-AC1667EBCBE1}">
-              <a14:hiddenEffects xmlns:a14="http://schemas.microsoft.com/office/drawing/2010/main" xmlns="">
+              <a14:hiddenEffects xmlns="" xmlns:a14="http://schemas.microsoft.com/office/drawing/2010/main">
                 <a:effectLst>
                   <a:outerShdw blurRad="63500" dist="38099" dir="2700000" algn="ctr" rotWithShape="0">
                     <a:srgbClr val="000000">

</xml_diff>

<commit_message>
Run through slides again.
</commit_message>
<xml_diff>
--- a/marple.pptx
+++ b/marple.pptx
@@ -12180,7 +12180,7 @@
           <a:effectLst/>
           <a:extLst>
             <a:ext uri="{909E8E84-426E-40dd-AFC4-6F175D3DCCD1}">
-              <a14:hiddenFill xmlns:a14="http://schemas.microsoft.com/office/drawing/2010/main" xmlns="">
+              <a14:hiddenFill xmlns="" xmlns:a14="http://schemas.microsoft.com/office/drawing/2010/main">
                 <a:blipFill dpi="0" rotWithShape="0">
                   <a:blip/>
                   <a:srcRect/>
@@ -12191,7 +12191,7 @@
               </a14:hiddenFill>
             </a:ext>
             <a:ext uri="{91240B29-F687-4f45-9708-019B960494DF}">
-              <a14:hiddenLine xmlns:a14="http://schemas.microsoft.com/office/drawing/2010/main" xmlns="" w="9525">
+              <a14:hiddenLine xmlns="" xmlns:a14="http://schemas.microsoft.com/office/drawing/2010/main" w="9525">
                 <a:solidFill>
                   <a:srgbClr val="000000"/>
                 </a:solidFill>
@@ -12201,7 +12201,7 @@
               </a14:hiddenLine>
             </a:ext>
             <a:ext uri="{AF507438-7753-43e0-B8FC-AC1667EBCBE1}">
-              <a14:hiddenEffects xmlns:a14="http://schemas.microsoft.com/office/drawing/2010/main" xmlns="">
+              <a14:hiddenEffects xmlns="" xmlns:a14="http://schemas.microsoft.com/office/drawing/2010/main">
                 <a:effectLst>
                   <a:outerShdw blurRad="63500" dist="38099" dir="2700000" algn="ctr" rotWithShape="0">
                     <a:srgbClr val="000000">
@@ -12250,7 +12250,7 @@
           <a:effectLst/>
           <a:extLst>
             <a:ext uri="{909E8E84-426E-40dd-AFC4-6F175D3DCCD1}">
-              <a14:hiddenFill xmlns:a14="http://schemas.microsoft.com/office/drawing/2010/main" xmlns="">
+              <a14:hiddenFill xmlns="" xmlns:a14="http://schemas.microsoft.com/office/drawing/2010/main">
                 <a:blipFill dpi="0" rotWithShape="0">
                   <a:blip/>
                   <a:srcRect/>
@@ -12261,7 +12261,7 @@
               </a14:hiddenFill>
             </a:ext>
             <a:ext uri="{91240B29-F687-4f45-9708-019B960494DF}">
-              <a14:hiddenLine xmlns:a14="http://schemas.microsoft.com/office/drawing/2010/main" xmlns="" w="9525">
+              <a14:hiddenLine xmlns="" xmlns:a14="http://schemas.microsoft.com/office/drawing/2010/main" w="9525">
                 <a:solidFill>
                   <a:srgbClr val="000000"/>
                 </a:solidFill>
@@ -12271,7 +12271,7 @@
               </a14:hiddenLine>
             </a:ext>
             <a:ext uri="{AF507438-7753-43e0-B8FC-AC1667EBCBE1}">
-              <a14:hiddenEffects xmlns:a14="http://schemas.microsoft.com/office/drawing/2010/main" xmlns="">
+              <a14:hiddenEffects xmlns="" xmlns:a14="http://schemas.microsoft.com/office/drawing/2010/main">
                 <a:effectLst>
                   <a:outerShdw blurRad="63500" dist="38099" dir="2700000" algn="ctr" rotWithShape="0">
                     <a:srgbClr val="000000">
@@ -12406,7 +12406,7 @@
             <a:effectLst/>
             <a:extLst>
               <a:ext uri="{909E8E84-426E-40dd-AFC4-6F175D3DCCD1}">
-                <a14:hiddenFill xmlns="" xmlns:a14="http://schemas.microsoft.com/office/drawing/2010/main">
+                <a14:hiddenFill xmlns:a14="http://schemas.microsoft.com/office/drawing/2010/main" xmlns="">
                   <a:blipFill dpi="0" rotWithShape="0">
                     <a:blip/>
                     <a:srcRect/>
@@ -12417,7 +12417,7 @@
                 </a14:hiddenFill>
               </a:ext>
               <a:ext uri="{91240B29-F687-4f45-9708-019B960494DF}">
-                <a14:hiddenLine xmlns="" xmlns:a14="http://schemas.microsoft.com/office/drawing/2010/main" w="9525">
+                <a14:hiddenLine xmlns:a14="http://schemas.microsoft.com/office/drawing/2010/main" xmlns="" w="9525">
                   <a:solidFill>
                     <a:srgbClr val="000000"/>
                   </a:solidFill>
@@ -12427,7 +12427,7 @@
                 </a14:hiddenLine>
               </a:ext>
               <a:ext uri="{AF507438-7753-43e0-B8FC-AC1667EBCBE1}">
-                <a14:hiddenEffects xmlns="" xmlns:a14="http://schemas.microsoft.com/office/drawing/2010/main">
+                <a14:hiddenEffects xmlns:a14="http://schemas.microsoft.com/office/drawing/2010/main" xmlns="">
                   <a:effectLst>
                     <a:outerShdw blurRad="63500" dist="38099" dir="2700000" algn="ctr" rotWithShape="0">
                       <a:srgbClr val="000000">
@@ -12476,7 +12476,7 @@
             <a:effectLst/>
             <a:extLst>
               <a:ext uri="{909E8E84-426E-40dd-AFC4-6F175D3DCCD1}">
-                <a14:hiddenFill xmlns="" xmlns:a14="http://schemas.microsoft.com/office/drawing/2010/main">
+                <a14:hiddenFill xmlns:a14="http://schemas.microsoft.com/office/drawing/2010/main" xmlns="">
                   <a:blipFill dpi="0" rotWithShape="0">
                     <a:blip/>
                     <a:srcRect/>
@@ -12487,7 +12487,7 @@
                 </a14:hiddenFill>
               </a:ext>
               <a:ext uri="{91240B29-F687-4f45-9708-019B960494DF}">
-                <a14:hiddenLine xmlns="" xmlns:a14="http://schemas.microsoft.com/office/drawing/2010/main" w="9525">
+                <a14:hiddenLine xmlns:a14="http://schemas.microsoft.com/office/drawing/2010/main" xmlns="" w="9525">
                   <a:solidFill>
                     <a:srgbClr val="000000"/>
                   </a:solidFill>
@@ -12497,7 +12497,7 @@
                 </a14:hiddenLine>
               </a:ext>
               <a:ext uri="{AF507438-7753-43e0-B8FC-AC1667EBCBE1}">
-                <a14:hiddenEffects xmlns="" xmlns:a14="http://schemas.microsoft.com/office/drawing/2010/main">
+                <a14:hiddenEffects xmlns:a14="http://schemas.microsoft.com/office/drawing/2010/main" xmlns="">
                   <a:effectLst>
                     <a:outerShdw blurRad="63500" dist="38099" dir="2700000" algn="ctr" rotWithShape="0">
                       <a:srgbClr val="000000">
@@ -12546,7 +12546,7 @@
             <a:effectLst/>
             <a:extLst>
               <a:ext uri="{909E8E84-426E-40dd-AFC4-6F175D3DCCD1}">
-                <a14:hiddenFill xmlns="" xmlns:a14="http://schemas.microsoft.com/office/drawing/2010/main">
+                <a14:hiddenFill xmlns:a14="http://schemas.microsoft.com/office/drawing/2010/main" xmlns="">
                   <a:blipFill dpi="0" rotWithShape="0">
                     <a:blip/>
                     <a:srcRect/>
@@ -12557,7 +12557,7 @@
                 </a14:hiddenFill>
               </a:ext>
               <a:ext uri="{91240B29-F687-4f45-9708-019B960494DF}">
-                <a14:hiddenLine xmlns="" xmlns:a14="http://schemas.microsoft.com/office/drawing/2010/main" w="9525">
+                <a14:hiddenLine xmlns:a14="http://schemas.microsoft.com/office/drawing/2010/main" xmlns="" w="9525">
                   <a:solidFill>
                     <a:srgbClr val="000000"/>
                   </a:solidFill>
@@ -12567,7 +12567,7 @@
                 </a14:hiddenLine>
               </a:ext>
               <a:ext uri="{AF507438-7753-43e0-B8FC-AC1667EBCBE1}">
-                <a14:hiddenEffects xmlns="" xmlns:a14="http://schemas.microsoft.com/office/drawing/2010/main">
+                <a14:hiddenEffects xmlns:a14="http://schemas.microsoft.com/office/drawing/2010/main" xmlns="">
                   <a:effectLst>
                     <a:outerShdw blurRad="63500" dist="38099" dir="2700000" algn="ctr" rotWithShape="0">
                       <a:srgbClr val="000000">
@@ -12608,12 +12608,12 @@
             <a:effectLst/>
             <a:extLst>
               <a:ext uri="{909E8E84-426E-40dd-AFC4-6F175D3DCCD1}">
-                <a14:hiddenFill xmlns="" xmlns:a14="http://schemas.microsoft.com/office/drawing/2010/main">
+                <a14:hiddenFill xmlns:a14="http://schemas.microsoft.com/office/drawing/2010/main" xmlns="">
                   <a:noFill/>
                 </a14:hiddenFill>
               </a:ext>
               <a:ext uri="{AF507438-7753-43e0-B8FC-AC1667EBCBE1}">
-                <a14:hiddenEffects xmlns="" xmlns:a14="http://schemas.microsoft.com/office/drawing/2010/main">
+                <a14:hiddenEffects xmlns:a14="http://schemas.microsoft.com/office/drawing/2010/main" xmlns="">
                   <a:effectLst>
                     <a:outerShdw blurRad="63500" dist="38099" dir="2700000" algn="ctr" rotWithShape="0">
                       <a:srgbClr val="000000">
@@ -12666,12 +12666,12 @@
             <a:effectLst/>
             <a:extLst>
               <a:ext uri="{909E8E84-426E-40dd-AFC4-6F175D3DCCD1}">
-                <a14:hiddenFill xmlns="" xmlns:a14="http://schemas.microsoft.com/office/drawing/2010/main">
+                <a14:hiddenFill xmlns:a14="http://schemas.microsoft.com/office/drawing/2010/main" xmlns="">
                   <a:noFill/>
                 </a14:hiddenFill>
               </a:ext>
               <a:ext uri="{AF507438-7753-43e0-B8FC-AC1667EBCBE1}">
-                <a14:hiddenEffects xmlns="" xmlns:a14="http://schemas.microsoft.com/office/drawing/2010/main">
+                <a14:hiddenEffects xmlns:a14="http://schemas.microsoft.com/office/drawing/2010/main" xmlns="">
                   <a:effectLst>
                     <a:outerShdw blurRad="63500" dist="38099" dir="2700000" algn="ctr" rotWithShape="0">
                       <a:srgbClr val="000000">
@@ -12724,12 +12724,12 @@
             <a:effectLst/>
             <a:extLst>
               <a:ext uri="{909E8E84-426E-40dd-AFC4-6F175D3DCCD1}">
-                <a14:hiddenFill xmlns="" xmlns:a14="http://schemas.microsoft.com/office/drawing/2010/main">
+                <a14:hiddenFill xmlns:a14="http://schemas.microsoft.com/office/drawing/2010/main" xmlns="">
                   <a:noFill/>
                 </a14:hiddenFill>
               </a:ext>
               <a:ext uri="{AF507438-7753-43e0-B8FC-AC1667EBCBE1}">
-                <a14:hiddenEffects xmlns="" xmlns:a14="http://schemas.microsoft.com/office/drawing/2010/main">
+                <a14:hiddenEffects xmlns:a14="http://schemas.microsoft.com/office/drawing/2010/main" xmlns="">
                   <a:effectLst>
                     <a:outerShdw blurRad="63500" dist="38099" dir="2700000" algn="ctr" rotWithShape="0">
                       <a:srgbClr val="000000">
@@ -12782,12 +12782,12 @@
             <a:effectLst/>
             <a:extLst>
               <a:ext uri="{909E8E84-426E-40dd-AFC4-6F175D3DCCD1}">
-                <a14:hiddenFill xmlns="" xmlns:a14="http://schemas.microsoft.com/office/drawing/2010/main">
+                <a14:hiddenFill xmlns:a14="http://schemas.microsoft.com/office/drawing/2010/main" xmlns="">
                   <a:noFill/>
                 </a14:hiddenFill>
               </a:ext>
               <a:ext uri="{AF507438-7753-43e0-B8FC-AC1667EBCBE1}">
-                <a14:hiddenEffects xmlns="" xmlns:a14="http://schemas.microsoft.com/office/drawing/2010/main">
+                <a14:hiddenEffects xmlns:a14="http://schemas.microsoft.com/office/drawing/2010/main" xmlns="">
                   <a:effectLst>
                     <a:outerShdw blurRad="63500" dist="38099" dir="2700000" algn="ctr" rotWithShape="0">
                       <a:srgbClr val="000000">
@@ -12840,12 +12840,12 @@
             <a:effectLst/>
             <a:extLst>
               <a:ext uri="{909E8E84-426E-40dd-AFC4-6F175D3DCCD1}">
-                <a14:hiddenFill xmlns="" xmlns:a14="http://schemas.microsoft.com/office/drawing/2010/main">
+                <a14:hiddenFill xmlns:a14="http://schemas.microsoft.com/office/drawing/2010/main" xmlns="">
                   <a:noFill/>
                 </a14:hiddenFill>
               </a:ext>
               <a:ext uri="{AF507438-7753-43e0-B8FC-AC1667EBCBE1}">
-                <a14:hiddenEffects xmlns="" xmlns:a14="http://schemas.microsoft.com/office/drawing/2010/main">
+                <a14:hiddenEffects xmlns:a14="http://schemas.microsoft.com/office/drawing/2010/main" xmlns="">
                   <a:effectLst>
                     <a:outerShdw blurRad="63500" dist="38099" dir="2700000" algn="ctr" rotWithShape="0">
                       <a:srgbClr val="000000">
@@ -12898,12 +12898,12 @@
             <a:effectLst/>
             <a:extLst>
               <a:ext uri="{909E8E84-426E-40dd-AFC4-6F175D3DCCD1}">
-                <a14:hiddenFill xmlns="" xmlns:a14="http://schemas.microsoft.com/office/drawing/2010/main">
+                <a14:hiddenFill xmlns:a14="http://schemas.microsoft.com/office/drawing/2010/main" xmlns="">
                   <a:noFill/>
                 </a14:hiddenFill>
               </a:ext>
               <a:ext uri="{AF507438-7753-43e0-B8FC-AC1667EBCBE1}">
-                <a14:hiddenEffects xmlns="" xmlns:a14="http://schemas.microsoft.com/office/drawing/2010/main">
+                <a14:hiddenEffects xmlns:a14="http://schemas.microsoft.com/office/drawing/2010/main" xmlns="">
                   <a:effectLst>
                     <a:outerShdw blurRad="63500" dist="38099" dir="2700000" algn="ctr" rotWithShape="0">
                       <a:srgbClr val="000000">
@@ -12956,12 +12956,12 @@
             <a:effectLst/>
             <a:extLst>
               <a:ext uri="{909E8E84-426E-40dd-AFC4-6F175D3DCCD1}">
-                <a14:hiddenFill xmlns="" xmlns:a14="http://schemas.microsoft.com/office/drawing/2010/main">
+                <a14:hiddenFill xmlns:a14="http://schemas.microsoft.com/office/drawing/2010/main" xmlns="">
                   <a:noFill/>
                 </a14:hiddenFill>
               </a:ext>
               <a:ext uri="{AF507438-7753-43e0-B8FC-AC1667EBCBE1}">
-                <a14:hiddenEffects xmlns="" xmlns:a14="http://schemas.microsoft.com/office/drawing/2010/main">
+                <a14:hiddenEffects xmlns:a14="http://schemas.microsoft.com/office/drawing/2010/main" xmlns="">
                   <a:effectLst>
                     <a:outerShdw blurRad="63500" dist="38099" dir="2700000" algn="ctr" rotWithShape="0">
                       <a:srgbClr val="000000">
@@ -13014,12 +13014,12 @@
             <a:effectLst/>
             <a:extLst>
               <a:ext uri="{909E8E84-426E-40dd-AFC4-6F175D3DCCD1}">
-                <a14:hiddenFill xmlns="" xmlns:a14="http://schemas.microsoft.com/office/drawing/2010/main">
+                <a14:hiddenFill xmlns:a14="http://schemas.microsoft.com/office/drawing/2010/main" xmlns="">
                   <a:noFill/>
                 </a14:hiddenFill>
               </a:ext>
               <a:ext uri="{AF507438-7753-43e0-B8FC-AC1667EBCBE1}">
-                <a14:hiddenEffects xmlns="" xmlns:a14="http://schemas.microsoft.com/office/drawing/2010/main">
+                <a14:hiddenEffects xmlns:a14="http://schemas.microsoft.com/office/drawing/2010/main" xmlns="">
                   <a:effectLst>
                     <a:outerShdw blurRad="63500" dist="38099" dir="2700000" algn="ctr" rotWithShape="0">
                       <a:srgbClr val="000000">
@@ -13072,12 +13072,12 @@
             <a:effectLst/>
             <a:extLst>
               <a:ext uri="{909E8E84-426E-40dd-AFC4-6F175D3DCCD1}">
-                <a14:hiddenFill xmlns="" xmlns:a14="http://schemas.microsoft.com/office/drawing/2010/main">
+                <a14:hiddenFill xmlns:a14="http://schemas.microsoft.com/office/drawing/2010/main" xmlns="">
                   <a:noFill/>
                 </a14:hiddenFill>
               </a:ext>
               <a:ext uri="{AF507438-7753-43e0-B8FC-AC1667EBCBE1}">
-                <a14:hiddenEffects xmlns="" xmlns:a14="http://schemas.microsoft.com/office/drawing/2010/main">
+                <a14:hiddenEffects xmlns:a14="http://schemas.microsoft.com/office/drawing/2010/main" xmlns="">
                   <a:effectLst>
                     <a:outerShdw blurRad="63500" dist="38099" dir="2700000" algn="ctr" rotWithShape="0">
                       <a:srgbClr val="000000">
@@ -13130,12 +13130,12 @@
             <a:effectLst/>
             <a:extLst>
               <a:ext uri="{909E8E84-426E-40dd-AFC4-6F175D3DCCD1}">
-                <a14:hiddenFill xmlns="" xmlns:a14="http://schemas.microsoft.com/office/drawing/2010/main">
+                <a14:hiddenFill xmlns:a14="http://schemas.microsoft.com/office/drawing/2010/main" xmlns="">
                   <a:noFill/>
                 </a14:hiddenFill>
               </a:ext>
               <a:ext uri="{AF507438-7753-43e0-B8FC-AC1667EBCBE1}">
-                <a14:hiddenEffects xmlns="" xmlns:a14="http://schemas.microsoft.com/office/drawing/2010/main">
+                <a14:hiddenEffects xmlns:a14="http://schemas.microsoft.com/office/drawing/2010/main" xmlns="">
                   <a:effectLst>
                     <a:outerShdw blurRad="63500" dist="38099" dir="2700000" algn="ctr" rotWithShape="0">
                       <a:srgbClr val="000000">
@@ -13196,7 +13196,7 @@
             <a:effectLst/>
             <a:extLst>
               <a:ext uri="{909E8E84-426E-40dd-AFC4-6F175D3DCCD1}">
-                <a14:hiddenFill xmlns="" xmlns:a14="http://schemas.microsoft.com/office/drawing/2010/main">
+                <a14:hiddenFill xmlns:a14="http://schemas.microsoft.com/office/drawing/2010/main" xmlns="">
                   <a:blipFill dpi="0" rotWithShape="0">
                     <a:blip/>
                     <a:srcRect/>
@@ -13207,7 +13207,7 @@
                 </a14:hiddenFill>
               </a:ext>
               <a:ext uri="{91240B29-F687-4f45-9708-019B960494DF}">
-                <a14:hiddenLine xmlns="" xmlns:a14="http://schemas.microsoft.com/office/drawing/2010/main" w="9525">
+                <a14:hiddenLine xmlns:a14="http://schemas.microsoft.com/office/drawing/2010/main" xmlns="" w="9525">
                   <a:solidFill>
                     <a:srgbClr val="000000"/>
                   </a:solidFill>
@@ -13217,7 +13217,7 @@
                 </a14:hiddenLine>
               </a:ext>
               <a:ext uri="{AF507438-7753-43e0-B8FC-AC1667EBCBE1}">
-                <a14:hiddenEffects xmlns="" xmlns:a14="http://schemas.microsoft.com/office/drawing/2010/main">
+                <a14:hiddenEffects xmlns:a14="http://schemas.microsoft.com/office/drawing/2010/main" xmlns="">
                   <a:effectLst>
                     <a:outerShdw blurRad="63500" dist="38099" dir="2700000" algn="ctr" rotWithShape="0">
                       <a:srgbClr val="000000">
@@ -13266,7 +13266,7 @@
             <a:effectLst/>
             <a:extLst>
               <a:ext uri="{909E8E84-426E-40dd-AFC4-6F175D3DCCD1}">
-                <a14:hiddenFill xmlns="" xmlns:a14="http://schemas.microsoft.com/office/drawing/2010/main">
+                <a14:hiddenFill xmlns:a14="http://schemas.microsoft.com/office/drawing/2010/main" xmlns="">
                   <a:blipFill dpi="0" rotWithShape="0">
                     <a:blip/>
                     <a:srcRect/>
@@ -13277,7 +13277,7 @@
                 </a14:hiddenFill>
               </a:ext>
               <a:ext uri="{91240B29-F687-4f45-9708-019B960494DF}">
-                <a14:hiddenLine xmlns="" xmlns:a14="http://schemas.microsoft.com/office/drawing/2010/main" w="9525">
+                <a14:hiddenLine xmlns:a14="http://schemas.microsoft.com/office/drawing/2010/main" xmlns="" w="9525">
                   <a:solidFill>
                     <a:srgbClr val="000000"/>
                   </a:solidFill>
@@ -13287,7 +13287,7 @@
                 </a14:hiddenLine>
               </a:ext>
               <a:ext uri="{AF507438-7753-43e0-B8FC-AC1667EBCBE1}">
-                <a14:hiddenEffects xmlns="" xmlns:a14="http://schemas.microsoft.com/office/drawing/2010/main">
+                <a14:hiddenEffects xmlns:a14="http://schemas.microsoft.com/office/drawing/2010/main" xmlns="">
                   <a:effectLst>
                     <a:outerShdw blurRad="63500" dist="38099" dir="2700000" algn="ctr" rotWithShape="0">
                       <a:srgbClr val="000000">
@@ -13336,7 +13336,7 @@
             <a:effectLst/>
             <a:extLst>
               <a:ext uri="{909E8E84-426E-40dd-AFC4-6F175D3DCCD1}">
-                <a14:hiddenFill xmlns="" xmlns:a14="http://schemas.microsoft.com/office/drawing/2010/main">
+                <a14:hiddenFill xmlns:a14="http://schemas.microsoft.com/office/drawing/2010/main" xmlns="">
                   <a:blipFill dpi="0" rotWithShape="0">
                     <a:blip/>
                     <a:srcRect/>
@@ -13347,7 +13347,7 @@
                 </a14:hiddenFill>
               </a:ext>
               <a:ext uri="{91240B29-F687-4f45-9708-019B960494DF}">
-                <a14:hiddenLine xmlns="" xmlns:a14="http://schemas.microsoft.com/office/drawing/2010/main" w="9525">
+                <a14:hiddenLine xmlns:a14="http://schemas.microsoft.com/office/drawing/2010/main" xmlns="" w="9525">
                   <a:solidFill>
                     <a:srgbClr val="000000"/>
                   </a:solidFill>
@@ -13357,7 +13357,7 @@
                 </a14:hiddenLine>
               </a:ext>
               <a:ext uri="{AF507438-7753-43e0-B8FC-AC1667EBCBE1}">
-                <a14:hiddenEffects xmlns="" xmlns:a14="http://schemas.microsoft.com/office/drawing/2010/main">
+                <a14:hiddenEffects xmlns:a14="http://schemas.microsoft.com/office/drawing/2010/main" xmlns="">
                   <a:effectLst>
                     <a:outerShdw blurRad="63500" dist="38099" dir="2700000" algn="ctr" rotWithShape="0">
                       <a:srgbClr val="000000">
@@ -13406,7 +13406,7 @@
             <a:effectLst/>
             <a:extLst>
               <a:ext uri="{909E8E84-426E-40dd-AFC4-6F175D3DCCD1}">
-                <a14:hiddenFill xmlns="" xmlns:a14="http://schemas.microsoft.com/office/drawing/2010/main">
+                <a14:hiddenFill xmlns:a14="http://schemas.microsoft.com/office/drawing/2010/main" xmlns="">
                   <a:blipFill dpi="0" rotWithShape="0">
                     <a:blip/>
                     <a:srcRect/>
@@ -13417,7 +13417,7 @@
                 </a14:hiddenFill>
               </a:ext>
               <a:ext uri="{91240B29-F687-4f45-9708-019B960494DF}">
-                <a14:hiddenLine xmlns="" xmlns:a14="http://schemas.microsoft.com/office/drawing/2010/main" w="9525">
+                <a14:hiddenLine xmlns:a14="http://schemas.microsoft.com/office/drawing/2010/main" xmlns="" w="9525">
                   <a:solidFill>
                     <a:srgbClr val="000000"/>
                   </a:solidFill>
@@ -13427,7 +13427,7 @@
                 </a14:hiddenLine>
               </a:ext>
               <a:ext uri="{AF507438-7753-43e0-B8FC-AC1667EBCBE1}">
-                <a14:hiddenEffects xmlns="" xmlns:a14="http://schemas.microsoft.com/office/drawing/2010/main">
+                <a14:hiddenEffects xmlns:a14="http://schemas.microsoft.com/office/drawing/2010/main" xmlns="">
                   <a:effectLst>
                     <a:outerShdw blurRad="63500" dist="38099" dir="2700000" algn="ctr" rotWithShape="0">
                       <a:srgbClr val="000000">
@@ -13476,7 +13476,7 @@
             <a:effectLst/>
             <a:extLst>
               <a:ext uri="{909E8E84-426E-40dd-AFC4-6F175D3DCCD1}">
-                <a14:hiddenFill xmlns="" xmlns:a14="http://schemas.microsoft.com/office/drawing/2010/main">
+                <a14:hiddenFill xmlns:a14="http://schemas.microsoft.com/office/drawing/2010/main" xmlns="">
                   <a:blipFill dpi="0" rotWithShape="0">
                     <a:blip/>
                     <a:srcRect/>
@@ -13487,7 +13487,7 @@
                 </a14:hiddenFill>
               </a:ext>
               <a:ext uri="{91240B29-F687-4f45-9708-019B960494DF}">
-                <a14:hiddenLine xmlns="" xmlns:a14="http://schemas.microsoft.com/office/drawing/2010/main" w="9525">
+                <a14:hiddenLine xmlns:a14="http://schemas.microsoft.com/office/drawing/2010/main" xmlns="" w="9525">
                   <a:solidFill>
                     <a:srgbClr val="000000"/>
                   </a:solidFill>
@@ -13497,7 +13497,7 @@
                 </a14:hiddenLine>
               </a:ext>
               <a:ext uri="{AF507438-7753-43e0-B8FC-AC1667EBCBE1}">
-                <a14:hiddenEffects xmlns="" xmlns:a14="http://schemas.microsoft.com/office/drawing/2010/main">
+                <a14:hiddenEffects xmlns:a14="http://schemas.microsoft.com/office/drawing/2010/main" xmlns="">
                   <a:effectLst>
                     <a:outerShdw blurRad="63500" dist="38099" dir="2700000" algn="ctr" rotWithShape="0">
                       <a:srgbClr val="000000">
@@ -13538,12 +13538,12 @@
             <a:effectLst/>
             <a:extLst>
               <a:ext uri="{909E8E84-426E-40dd-AFC4-6F175D3DCCD1}">
-                <a14:hiddenFill xmlns="" xmlns:a14="http://schemas.microsoft.com/office/drawing/2010/main">
+                <a14:hiddenFill xmlns:a14="http://schemas.microsoft.com/office/drawing/2010/main" xmlns="">
                   <a:noFill/>
                 </a14:hiddenFill>
               </a:ext>
               <a:ext uri="{AF507438-7753-43e0-B8FC-AC1667EBCBE1}">
-                <a14:hiddenEffects xmlns="" xmlns:a14="http://schemas.microsoft.com/office/drawing/2010/main">
+                <a14:hiddenEffects xmlns:a14="http://schemas.microsoft.com/office/drawing/2010/main" xmlns="">
                   <a:effectLst>
                     <a:outerShdw blurRad="63500" dist="38099" dir="2700000" algn="ctr" rotWithShape="0">
                       <a:srgbClr val="000000">
@@ -13596,12 +13596,12 @@
             <a:effectLst/>
             <a:extLst>
               <a:ext uri="{909E8E84-426E-40dd-AFC4-6F175D3DCCD1}">
-                <a14:hiddenFill xmlns="" xmlns:a14="http://schemas.microsoft.com/office/drawing/2010/main">
+                <a14:hiddenFill xmlns:a14="http://schemas.microsoft.com/office/drawing/2010/main" xmlns="">
                   <a:noFill/>
                 </a14:hiddenFill>
               </a:ext>
               <a:ext uri="{AF507438-7753-43e0-B8FC-AC1667EBCBE1}">
-                <a14:hiddenEffects xmlns="" xmlns:a14="http://schemas.microsoft.com/office/drawing/2010/main">
+                <a14:hiddenEffects xmlns:a14="http://schemas.microsoft.com/office/drawing/2010/main" xmlns="">
                   <a:effectLst>
                     <a:outerShdw blurRad="63500" dist="38099" dir="2700000" algn="ctr" rotWithShape="0">
                       <a:srgbClr val="000000">
@@ -13662,7 +13662,7 @@
             <a:effectLst/>
             <a:extLst>
               <a:ext uri="{909E8E84-426E-40dd-AFC4-6F175D3DCCD1}">
-                <a14:hiddenFill xmlns="" xmlns:a14="http://schemas.microsoft.com/office/drawing/2010/main">
+                <a14:hiddenFill xmlns:a14="http://schemas.microsoft.com/office/drawing/2010/main" xmlns="">
                   <a:blipFill dpi="0" rotWithShape="0">
                     <a:blip/>
                     <a:srcRect/>
@@ -13673,7 +13673,7 @@
                 </a14:hiddenFill>
               </a:ext>
               <a:ext uri="{91240B29-F687-4f45-9708-019B960494DF}">
-                <a14:hiddenLine xmlns="" xmlns:a14="http://schemas.microsoft.com/office/drawing/2010/main" w="9525">
+                <a14:hiddenLine xmlns:a14="http://schemas.microsoft.com/office/drawing/2010/main" xmlns="" w="9525">
                   <a:solidFill>
                     <a:srgbClr val="000000"/>
                   </a:solidFill>
@@ -13683,7 +13683,7 @@
                 </a14:hiddenLine>
               </a:ext>
               <a:ext uri="{AF507438-7753-43e0-B8FC-AC1667EBCBE1}">
-                <a14:hiddenEffects xmlns="" xmlns:a14="http://schemas.microsoft.com/office/drawing/2010/main">
+                <a14:hiddenEffects xmlns:a14="http://schemas.microsoft.com/office/drawing/2010/main" xmlns="">
                   <a:effectLst>
                     <a:outerShdw blurRad="63500" dist="38099" dir="2700000" algn="ctr" rotWithShape="0">
                       <a:srgbClr val="000000">
@@ -13816,7 +13816,7 @@
           <a:effectLst/>
           <a:extLst>
             <a:ext uri="{909E8E84-426E-40dd-AFC4-6F175D3DCCD1}">
-              <a14:hiddenFill xmlns:a14="http://schemas.microsoft.com/office/drawing/2010/main" xmlns="">
+              <a14:hiddenFill xmlns="" xmlns:a14="http://schemas.microsoft.com/office/drawing/2010/main">
                 <a:blipFill dpi="0" rotWithShape="0">
                   <a:blip/>
                   <a:srcRect/>
@@ -13827,7 +13827,7 @@
               </a14:hiddenFill>
             </a:ext>
             <a:ext uri="{91240B29-F687-4f45-9708-019B960494DF}">
-              <a14:hiddenLine xmlns:a14="http://schemas.microsoft.com/office/drawing/2010/main" xmlns="" w="9525">
+              <a14:hiddenLine xmlns="" xmlns:a14="http://schemas.microsoft.com/office/drawing/2010/main" w="9525">
                 <a:solidFill>
                   <a:srgbClr val="000000"/>
                 </a:solidFill>
@@ -13837,7 +13837,7 @@
               </a14:hiddenLine>
             </a:ext>
             <a:ext uri="{AF507438-7753-43e0-B8FC-AC1667EBCBE1}">
-              <a14:hiddenEffects xmlns:a14="http://schemas.microsoft.com/office/drawing/2010/main" xmlns="">
+              <a14:hiddenEffects xmlns="" xmlns:a14="http://schemas.microsoft.com/office/drawing/2010/main">
                 <a:effectLst>
                   <a:outerShdw blurRad="63500" dist="38099" dir="2700000" algn="ctr" rotWithShape="0">
                     <a:srgbClr val="000000">
@@ -13922,7 +13922,7 @@
           <a:effectLst/>
           <a:extLst>
             <a:ext uri="{909E8E84-426E-40dd-AFC4-6F175D3DCCD1}">
-              <a14:hiddenFill xmlns:a14="http://schemas.microsoft.com/office/drawing/2010/main" xmlns="">
+              <a14:hiddenFill xmlns="" xmlns:a14="http://schemas.microsoft.com/office/drawing/2010/main">
                 <a:blipFill dpi="0" rotWithShape="0">
                   <a:blip/>
                   <a:srcRect/>
@@ -13933,7 +13933,7 @@
               </a14:hiddenFill>
             </a:ext>
             <a:ext uri="{91240B29-F687-4f45-9708-019B960494DF}">
-              <a14:hiddenLine xmlns:a14="http://schemas.microsoft.com/office/drawing/2010/main" xmlns="" w="9525">
+              <a14:hiddenLine xmlns="" xmlns:a14="http://schemas.microsoft.com/office/drawing/2010/main" w="9525">
                 <a:solidFill>
                   <a:srgbClr val="000000"/>
                 </a:solidFill>
@@ -13943,7 +13943,7 @@
               </a14:hiddenLine>
             </a:ext>
             <a:ext uri="{AF507438-7753-43e0-B8FC-AC1667EBCBE1}">
-              <a14:hiddenEffects xmlns:a14="http://schemas.microsoft.com/office/drawing/2010/main" xmlns="">
+              <a14:hiddenEffects xmlns="" xmlns:a14="http://schemas.microsoft.com/office/drawing/2010/main">
                 <a:effectLst>
                   <a:outerShdw blurRad="63500" dist="38099" dir="2700000" algn="ctr" rotWithShape="0">
                     <a:srgbClr val="000000">
@@ -14028,7 +14028,7 @@
           <a:effectLst/>
           <a:extLst>
             <a:ext uri="{909E8E84-426E-40dd-AFC4-6F175D3DCCD1}">
-              <a14:hiddenFill xmlns:a14="http://schemas.microsoft.com/office/drawing/2010/main" xmlns="">
+              <a14:hiddenFill xmlns="" xmlns:a14="http://schemas.microsoft.com/office/drawing/2010/main">
                 <a:blipFill dpi="0" rotWithShape="0">
                   <a:blip/>
                   <a:srcRect/>
@@ -14039,7 +14039,7 @@
               </a14:hiddenFill>
             </a:ext>
             <a:ext uri="{91240B29-F687-4f45-9708-019B960494DF}">
-              <a14:hiddenLine xmlns:a14="http://schemas.microsoft.com/office/drawing/2010/main" xmlns="" w="9525">
+              <a14:hiddenLine xmlns="" xmlns:a14="http://schemas.microsoft.com/office/drawing/2010/main" w="9525">
                 <a:solidFill>
                   <a:srgbClr val="000000"/>
                 </a:solidFill>
@@ -14049,7 +14049,7 @@
               </a14:hiddenLine>
             </a:ext>
             <a:ext uri="{AF507438-7753-43e0-B8FC-AC1667EBCBE1}">
-              <a14:hiddenEffects xmlns:a14="http://schemas.microsoft.com/office/drawing/2010/main" xmlns="">
+              <a14:hiddenEffects xmlns="" xmlns:a14="http://schemas.microsoft.com/office/drawing/2010/main">
                 <a:effectLst>
                   <a:outerShdw blurRad="63500" dist="38099" dir="2700000" algn="ctr" rotWithShape="0">
                     <a:srgbClr val="000000">
@@ -14240,7 +14240,7 @@
           <a:effectLst/>
           <a:extLst>
             <a:ext uri="{909E8E84-426E-40dd-AFC4-6F175D3DCCD1}">
-              <a14:hiddenFill xmlns:a14="http://schemas.microsoft.com/office/drawing/2010/main" xmlns="">
+              <a14:hiddenFill xmlns="" xmlns:a14="http://schemas.microsoft.com/office/drawing/2010/main">
                 <a:blipFill dpi="0" rotWithShape="0">
                   <a:blip/>
                   <a:srcRect/>
@@ -14251,7 +14251,7 @@
               </a14:hiddenFill>
             </a:ext>
             <a:ext uri="{91240B29-F687-4f45-9708-019B960494DF}">
-              <a14:hiddenLine xmlns:a14="http://schemas.microsoft.com/office/drawing/2010/main" xmlns="" w="9525">
+              <a14:hiddenLine xmlns="" xmlns:a14="http://schemas.microsoft.com/office/drawing/2010/main" w="9525">
                 <a:solidFill>
                   <a:srgbClr val="000000"/>
                 </a:solidFill>
@@ -14261,7 +14261,7 @@
               </a14:hiddenLine>
             </a:ext>
             <a:ext uri="{AF507438-7753-43e0-B8FC-AC1667EBCBE1}">
-              <a14:hiddenEffects xmlns:a14="http://schemas.microsoft.com/office/drawing/2010/main" xmlns="">
+              <a14:hiddenEffects xmlns="" xmlns:a14="http://schemas.microsoft.com/office/drawing/2010/main">
                 <a:effectLst>
                   <a:outerShdw blurRad="63500" dist="38099" dir="2700000" algn="ctr" rotWithShape="0">
                     <a:srgbClr val="000000">
@@ -14339,7 +14339,7 @@
           <a:effectLst/>
           <a:extLst>
             <a:ext uri="{909E8E84-426E-40dd-AFC4-6F175D3DCCD1}">
-              <a14:hiddenFill xmlns:a14="http://schemas.microsoft.com/office/drawing/2010/main" xmlns="">
+              <a14:hiddenFill xmlns="" xmlns:a14="http://schemas.microsoft.com/office/drawing/2010/main">
                 <a:blipFill dpi="0" rotWithShape="0">
                   <a:blip/>
                   <a:srcRect/>
@@ -14350,7 +14350,7 @@
               </a14:hiddenFill>
             </a:ext>
             <a:ext uri="{91240B29-F687-4f45-9708-019B960494DF}">
-              <a14:hiddenLine xmlns:a14="http://schemas.microsoft.com/office/drawing/2010/main" xmlns="" w="9525">
+              <a14:hiddenLine xmlns="" xmlns:a14="http://schemas.microsoft.com/office/drawing/2010/main" w="9525">
                 <a:solidFill>
                   <a:srgbClr val="000000"/>
                 </a:solidFill>
@@ -14360,7 +14360,7 @@
               </a14:hiddenLine>
             </a:ext>
             <a:ext uri="{AF507438-7753-43e0-B8FC-AC1667EBCBE1}">
-              <a14:hiddenEffects xmlns:a14="http://schemas.microsoft.com/office/drawing/2010/main" xmlns="">
+              <a14:hiddenEffects xmlns="" xmlns:a14="http://schemas.microsoft.com/office/drawing/2010/main">
                 <a:effectLst>
                   <a:outerShdw blurRad="63500" dist="38099" dir="2700000" algn="ctr" rotWithShape="0">
                     <a:srgbClr val="000000">
@@ -16225,7 +16225,7 @@
           <a:effectLst/>
           <a:extLst>
             <a:ext uri="{909E8E84-426E-40dd-AFC4-6F175D3DCCD1}">
-              <a14:hiddenFill xmlns="" xmlns:a14="http://schemas.microsoft.com/office/drawing/2010/main">
+              <a14:hiddenFill xmlns:a14="http://schemas.microsoft.com/office/drawing/2010/main" xmlns="">
                 <a:blipFill dpi="0" rotWithShape="0">
                   <a:blip/>
                   <a:srcRect/>
@@ -16236,7 +16236,7 @@
               </a14:hiddenFill>
             </a:ext>
             <a:ext uri="{91240B29-F687-4f45-9708-019B960494DF}">
-              <a14:hiddenLine xmlns="" xmlns:a14="http://schemas.microsoft.com/office/drawing/2010/main" w="9525">
+              <a14:hiddenLine xmlns:a14="http://schemas.microsoft.com/office/drawing/2010/main" xmlns="" w="9525">
                 <a:solidFill>
                   <a:srgbClr val="000000"/>
                 </a:solidFill>
@@ -16246,7 +16246,7 @@
               </a14:hiddenLine>
             </a:ext>
             <a:ext uri="{AF507438-7753-43e0-B8FC-AC1667EBCBE1}">
-              <a14:hiddenEffects xmlns="" xmlns:a14="http://schemas.microsoft.com/office/drawing/2010/main">
+              <a14:hiddenEffects xmlns:a14="http://schemas.microsoft.com/office/drawing/2010/main" xmlns="">
                 <a:effectLst>
                   <a:outerShdw blurRad="63500" dist="38099" dir="2700000" algn="ctr" rotWithShape="0">
                     <a:srgbClr val="000000">
@@ -16406,7 +16406,7 @@
           <a:effectLst/>
           <a:extLst>
             <a:ext uri="{909E8E84-426E-40dd-AFC4-6F175D3DCCD1}">
-              <a14:hiddenFill xmlns="" xmlns:a14="http://schemas.microsoft.com/office/drawing/2010/main">
+              <a14:hiddenFill xmlns:a14="http://schemas.microsoft.com/office/drawing/2010/main" xmlns="">
                 <a:blipFill dpi="0" rotWithShape="0">
                   <a:blip/>
                   <a:srcRect/>
@@ -16417,7 +16417,7 @@
               </a14:hiddenFill>
             </a:ext>
             <a:ext uri="{91240B29-F687-4f45-9708-019B960494DF}">
-              <a14:hiddenLine xmlns="" xmlns:a14="http://schemas.microsoft.com/office/drawing/2010/main" w="9525">
+              <a14:hiddenLine xmlns:a14="http://schemas.microsoft.com/office/drawing/2010/main" xmlns="" w="9525">
                 <a:solidFill>
                   <a:srgbClr val="000000"/>
                 </a:solidFill>
@@ -16427,7 +16427,7 @@
               </a14:hiddenLine>
             </a:ext>
             <a:ext uri="{AF507438-7753-43e0-B8FC-AC1667EBCBE1}">
-              <a14:hiddenEffects xmlns="" xmlns:a14="http://schemas.microsoft.com/office/drawing/2010/main">
+              <a14:hiddenEffects xmlns:a14="http://schemas.microsoft.com/office/drawing/2010/main" xmlns="">
                 <a:effectLst>
                   <a:outerShdw blurRad="63500" dist="38099" dir="2700000" algn="ctr" rotWithShape="0">
                     <a:srgbClr val="000000">
@@ -18226,7 +18226,7 @@
           <a:effectLst/>
           <a:extLst>
             <a:ext uri="{909E8E84-426E-40dd-AFC4-6F175D3DCCD1}">
-              <a14:hiddenFill xmlns="" xmlns:a14="http://schemas.microsoft.com/office/drawing/2010/main">
+              <a14:hiddenFill xmlns:a14="http://schemas.microsoft.com/office/drawing/2010/main" xmlns="">
                 <a:blipFill dpi="0" rotWithShape="0">
                   <a:blip/>
                   <a:srcRect/>
@@ -18237,7 +18237,7 @@
               </a14:hiddenFill>
             </a:ext>
             <a:ext uri="{91240B29-F687-4f45-9708-019B960494DF}">
-              <a14:hiddenLine xmlns="" xmlns:a14="http://schemas.microsoft.com/office/drawing/2010/main" w="9525">
+              <a14:hiddenLine xmlns:a14="http://schemas.microsoft.com/office/drawing/2010/main" xmlns="" w="9525">
                 <a:solidFill>
                   <a:srgbClr val="000000"/>
                 </a:solidFill>
@@ -18247,7 +18247,7 @@
               </a14:hiddenLine>
             </a:ext>
             <a:ext uri="{AF507438-7753-43e0-B8FC-AC1667EBCBE1}">
-              <a14:hiddenEffects xmlns="" xmlns:a14="http://schemas.microsoft.com/office/drawing/2010/main">
+              <a14:hiddenEffects xmlns:a14="http://schemas.microsoft.com/office/drawing/2010/main" xmlns="">
                 <a:effectLst>
                   <a:outerShdw blurRad="63500" dist="38099" dir="2700000" algn="ctr" rotWithShape="0">
                     <a:srgbClr val="000000">
@@ -18340,7 +18340,7 @@
           <a:effectLst/>
           <a:extLst>
             <a:ext uri="{909E8E84-426E-40dd-AFC4-6F175D3DCCD1}">
-              <a14:hiddenFill xmlns="" xmlns:a14="http://schemas.microsoft.com/office/drawing/2010/main">
+              <a14:hiddenFill xmlns:a14="http://schemas.microsoft.com/office/drawing/2010/main" xmlns="">
                 <a:blipFill dpi="0" rotWithShape="0">
                   <a:blip/>
                   <a:srcRect/>
@@ -18351,7 +18351,7 @@
               </a14:hiddenFill>
             </a:ext>
             <a:ext uri="{91240B29-F687-4f45-9708-019B960494DF}">
-              <a14:hiddenLine xmlns="" xmlns:a14="http://schemas.microsoft.com/office/drawing/2010/main" w="9525">
+              <a14:hiddenLine xmlns:a14="http://schemas.microsoft.com/office/drawing/2010/main" xmlns="" w="9525">
                 <a:solidFill>
                   <a:srgbClr val="000000"/>
                 </a:solidFill>
@@ -18361,7 +18361,7 @@
               </a14:hiddenLine>
             </a:ext>
             <a:ext uri="{AF507438-7753-43e0-B8FC-AC1667EBCBE1}">
-              <a14:hiddenEffects xmlns="" xmlns:a14="http://schemas.microsoft.com/office/drawing/2010/main">
+              <a14:hiddenEffects xmlns:a14="http://schemas.microsoft.com/office/drawing/2010/main" xmlns="">
                 <a:effectLst>
                   <a:outerShdw blurRad="63500" dist="38099" dir="2700000" algn="ctr" rotWithShape="0">
                     <a:srgbClr val="000000">
@@ -21233,7 +21233,7 @@
           <a:effectLst/>
           <a:extLst>
             <a:ext uri="{909E8E84-426E-40dd-AFC4-6F175D3DCCD1}">
-              <a14:hiddenFill xmlns="" xmlns:a14="http://schemas.microsoft.com/office/drawing/2010/main">
+              <a14:hiddenFill xmlns:a14="http://schemas.microsoft.com/office/drawing/2010/main" xmlns="">
                 <a:blipFill dpi="0" rotWithShape="0">
                   <a:blip/>
                   <a:srcRect/>
@@ -21244,7 +21244,7 @@
               </a14:hiddenFill>
             </a:ext>
             <a:ext uri="{91240B29-F687-4f45-9708-019B960494DF}">
-              <a14:hiddenLine xmlns="" xmlns:a14="http://schemas.microsoft.com/office/drawing/2010/main" w="9525">
+              <a14:hiddenLine xmlns:a14="http://schemas.microsoft.com/office/drawing/2010/main" xmlns="" w="9525">
                 <a:solidFill>
                   <a:srgbClr val="000000"/>
                 </a:solidFill>
@@ -21254,7 +21254,7 @@
               </a14:hiddenLine>
             </a:ext>
             <a:ext uri="{AF507438-7753-43e0-B8FC-AC1667EBCBE1}">
-              <a14:hiddenEffects xmlns="" xmlns:a14="http://schemas.microsoft.com/office/drawing/2010/main">
+              <a14:hiddenEffects xmlns:a14="http://schemas.microsoft.com/office/drawing/2010/main" xmlns="">
                 <a:effectLst>
                   <a:outerShdw blurRad="63500" dist="38099" dir="2700000" algn="ctr" rotWithShape="0">
                     <a:srgbClr val="000000">
@@ -21333,7 +21333,7 @@
           <a:effectLst/>
           <a:extLst>
             <a:ext uri="{909E8E84-426E-40dd-AFC4-6F175D3DCCD1}">
-              <a14:hiddenFill xmlns="" xmlns:a14="http://schemas.microsoft.com/office/drawing/2010/main">
+              <a14:hiddenFill xmlns:a14="http://schemas.microsoft.com/office/drawing/2010/main" xmlns="">
                 <a:blipFill dpi="0" rotWithShape="0">
                   <a:blip/>
                   <a:srcRect/>
@@ -21344,7 +21344,7 @@
               </a14:hiddenFill>
             </a:ext>
             <a:ext uri="{91240B29-F687-4f45-9708-019B960494DF}">
-              <a14:hiddenLine xmlns="" xmlns:a14="http://schemas.microsoft.com/office/drawing/2010/main" w="9525">
+              <a14:hiddenLine xmlns:a14="http://schemas.microsoft.com/office/drawing/2010/main" xmlns="" w="9525">
                 <a:solidFill>
                   <a:srgbClr val="000000"/>
                 </a:solidFill>
@@ -21354,7 +21354,7 @@
               </a14:hiddenLine>
             </a:ext>
             <a:ext uri="{AF507438-7753-43e0-B8FC-AC1667EBCBE1}">
-              <a14:hiddenEffects xmlns="" xmlns:a14="http://schemas.microsoft.com/office/drawing/2010/main">
+              <a14:hiddenEffects xmlns:a14="http://schemas.microsoft.com/office/drawing/2010/main" xmlns="">
                 <a:effectLst>
                   <a:outerShdw blurRad="63500" dist="38099" dir="2700000" algn="ctr" rotWithShape="0">
                     <a:srgbClr val="000000">
@@ -22937,7 +22937,7 @@
           <a:effectLst/>
           <a:extLst>
             <a:ext uri="{909E8E84-426E-40dd-AFC4-6F175D3DCCD1}">
-              <a14:hiddenFill xmlns="" xmlns:a14="http://schemas.microsoft.com/office/drawing/2010/main">
+              <a14:hiddenFill xmlns:a14="http://schemas.microsoft.com/office/drawing/2010/main" xmlns="">
                 <a:blipFill dpi="0" rotWithShape="0">
                   <a:blip/>
                   <a:srcRect/>
@@ -22948,7 +22948,7 @@
               </a14:hiddenFill>
             </a:ext>
             <a:ext uri="{91240B29-F687-4f45-9708-019B960494DF}">
-              <a14:hiddenLine xmlns="" xmlns:a14="http://schemas.microsoft.com/office/drawing/2010/main" w="9525">
+              <a14:hiddenLine xmlns:a14="http://schemas.microsoft.com/office/drawing/2010/main" xmlns="" w="9525">
                 <a:solidFill>
                   <a:srgbClr val="000000"/>
                 </a:solidFill>
@@ -22958,7 +22958,7 @@
               </a14:hiddenLine>
             </a:ext>
             <a:ext uri="{AF507438-7753-43e0-B8FC-AC1667EBCBE1}">
-              <a14:hiddenEffects xmlns="" xmlns:a14="http://schemas.microsoft.com/office/drawing/2010/main">
+              <a14:hiddenEffects xmlns:a14="http://schemas.microsoft.com/office/drawing/2010/main" xmlns="">
                 <a:effectLst>
                   <a:outerShdw blurRad="63500" dist="38099" dir="2700000" algn="ctr" rotWithShape="0">
                     <a:srgbClr val="000000">
@@ -24606,7 +24606,7 @@
           <a:effectLst/>
           <a:extLst>
             <a:ext uri="{909E8E84-426E-40dd-AFC4-6F175D3DCCD1}">
-              <a14:hiddenFill xmlns="" xmlns:a14="http://schemas.microsoft.com/office/drawing/2010/main">
+              <a14:hiddenFill xmlns:a14="http://schemas.microsoft.com/office/drawing/2010/main" xmlns="">
                 <a:blipFill dpi="0" rotWithShape="0">
                   <a:blip/>
                   <a:srcRect/>
@@ -24617,7 +24617,7 @@
               </a14:hiddenFill>
             </a:ext>
             <a:ext uri="{91240B29-F687-4f45-9708-019B960494DF}">
-              <a14:hiddenLine xmlns="" xmlns:a14="http://schemas.microsoft.com/office/drawing/2010/main" w="9525">
+              <a14:hiddenLine xmlns:a14="http://schemas.microsoft.com/office/drawing/2010/main" xmlns="" w="9525">
                 <a:solidFill>
                   <a:srgbClr val="000000"/>
                 </a:solidFill>
@@ -24627,7 +24627,7 @@
               </a14:hiddenLine>
             </a:ext>
             <a:ext uri="{AF507438-7753-43e0-B8FC-AC1667EBCBE1}">
-              <a14:hiddenEffects xmlns="" xmlns:a14="http://schemas.microsoft.com/office/drawing/2010/main">
+              <a14:hiddenEffects xmlns:a14="http://schemas.microsoft.com/office/drawing/2010/main" xmlns="">
                 <a:effectLst>
                   <a:outerShdw blurRad="63500" dist="38099" dir="2700000" algn="ctr" rotWithShape="0">
                     <a:srgbClr val="000000">
@@ -25989,7 +25989,7 @@
           <a:effectLst/>
           <a:extLst>
             <a:ext uri="{909E8E84-426E-40dd-AFC4-6F175D3DCCD1}">
-              <a14:hiddenFill xmlns="" xmlns:a14="http://schemas.microsoft.com/office/drawing/2010/main">
+              <a14:hiddenFill xmlns:a14="http://schemas.microsoft.com/office/drawing/2010/main" xmlns="">
                 <a:blipFill dpi="0" rotWithShape="0">
                   <a:blip/>
                   <a:srcRect/>
@@ -26000,7 +26000,7 @@
               </a14:hiddenFill>
             </a:ext>
             <a:ext uri="{91240B29-F687-4f45-9708-019B960494DF}">
-              <a14:hiddenLine xmlns="" xmlns:a14="http://schemas.microsoft.com/office/drawing/2010/main" w="9525">
+              <a14:hiddenLine xmlns:a14="http://schemas.microsoft.com/office/drawing/2010/main" xmlns="" w="9525">
                 <a:solidFill>
                   <a:srgbClr val="000000"/>
                 </a:solidFill>
@@ -26010,7 +26010,7 @@
               </a14:hiddenLine>
             </a:ext>
             <a:ext uri="{AF507438-7753-43e0-B8FC-AC1667EBCBE1}">
-              <a14:hiddenEffects xmlns="" xmlns:a14="http://schemas.microsoft.com/office/drawing/2010/main">
+              <a14:hiddenEffects xmlns:a14="http://schemas.microsoft.com/office/drawing/2010/main" xmlns="">
                 <a:effectLst>
                   <a:outerShdw blurRad="63500" dist="38099" dir="2700000" algn="ctr" rotWithShape="0">
                     <a:srgbClr val="000000">
@@ -26141,7 +26141,7 @@
           <a:effectLst/>
           <a:extLst>
             <a:ext uri="{909E8E84-426E-40dd-AFC4-6F175D3DCCD1}">
-              <a14:hiddenFill xmlns="" xmlns:a14="http://schemas.microsoft.com/office/drawing/2010/main">
+              <a14:hiddenFill xmlns:a14="http://schemas.microsoft.com/office/drawing/2010/main" xmlns="">
                 <a:blipFill dpi="0" rotWithShape="0">
                   <a:blip/>
                   <a:srcRect/>
@@ -26152,7 +26152,7 @@
               </a14:hiddenFill>
             </a:ext>
             <a:ext uri="{91240B29-F687-4f45-9708-019B960494DF}">
-              <a14:hiddenLine xmlns="" xmlns:a14="http://schemas.microsoft.com/office/drawing/2010/main" w="9525">
+              <a14:hiddenLine xmlns:a14="http://schemas.microsoft.com/office/drawing/2010/main" xmlns="" w="9525">
                 <a:solidFill>
                   <a:srgbClr val="000000"/>
                 </a:solidFill>
@@ -26162,7 +26162,7 @@
               </a14:hiddenLine>
             </a:ext>
             <a:ext uri="{AF507438-7753-43e0-B8FC-AC1667EBCBE1}">
-              <a14:hiddenEffects xmlns="" xmlns:a14="http://schemas.microsoft.com/office/drawing/2010/main">
+              <a14:hiddenEffects xmlns:a14="http://schemas.microsoft.com/office/drawing/2010/main" xmlns="">
                 <a:effectLst>
                   <a:outerShdw blurRad="63500" dist="38099" dir="2700000" algn="ctr" rotWithShape="0">
                     <a:srgbClr val="000000">
@@ -33831,7 +33831,7 @@
           <a:effectLst/>
           <a:extLst>
             <a:ext uri="{909E8E84-426E-40dd-AFC4-6F175D3DCCD1}">
-              <a14:hiddenFill xmlns:a14="http://schemas.microsoft.com/office/drawing/2010/main" xmlns="">
+              <a14:hiddenFill xmlns="" xmlns:a14="http://schemas.microsoft.com/office/drawing/2010/main">
                 <a:blipFill dpi="0" rotWithShape="0">
                   <a:blip/>
                   <a:srcRect/>
@@ -33842,7 +33842,7 @@
               </a14:hiddenFill>
             </a:ext>
             <a:ext uri="{91240B29-F687-4f45-9708-019B960494DF}">
-              <a14:hiddenLine xmlns:a14="http://schemas.microsoft.com/office/drawing/2010/main" xmlns="" w="9525">
+              <a14:hiddenLine xmlns="" xmlns:a14="http://schemas.microsoft.com/office/drawing/2010/main" w="9525">
                 <a:solidFill>
                   <a:srgbClr val="000000"/>
                 </a:solidFill>
@@ -33852,7 +33852,7 @@
               </a14:hiddenLine>
             </a:ext>
             <a:ext uri="{AF507438-7753-43e0-B8FC-AC1667EBCBE1}">
-              <a14:hiddenEffects xmlns:a14="http://schemas.microsoft.com/office/drawing/2010/main" xmlns="">
+              <a14:hiddenEffects xmlns="" xmlns:a14="http://schemas.microsoft.com/office/drawing/2010/main">
                 <a:effectLst>
                   <a:outerShdw blurRad="63500" dist="38099" dir="2700000" algn="ctr" rotWithShape="0">
                     <a:srgbClr val="000000">

</xml_diff>

<commit_message>
Version used at Madison workshop; clean up notes
</commit_message>
<xml_diff>
--- a/marple.pptx
+++ b/marple.pptx
@@ -2554,38 +2554,8 @@
           <a:p>
             <a:r>
               <a:rPr lang="en-US" dirty="0"/>
-              <a:t>Let’s take a simple example. If g is a counter, the merge is a simple addition. You can probably see that this is easily generalizable to other associative </a:t>
-            </a:r>
-            <a:r>
-              <a:rPr lang="en-US" dirty="0" err="1"/>
-              <a:t>statisticss</a:t>
-            </a:r>
-            <a:r>
-              <a:rPr lang="en-US" dirty="0"/>
-              <a:t> such as min/max/product, etc. Essentially, you track the minimum in the cache and take the minimum of the new value in the cache and the old value in the backing store.</a:t>
-            </a:r>
-          </a:p>
-          <a:p>
-            <a:endParaRPr lang="en-US" dirty="0"/>
-          </a:p>
-          <a:p>
-            <a:r>
-              <a:rPr lang="en-US" dirty="0"/>
-              <a:t>TODO: Diagram for </a:t>
-            </a:r>
-            <a:r>
-              <a:rPr lang="en-US" dirty="0" err="1"/>
-              <a:t>V_back</a:t>
-            </a:r>
-            <a:r>
-              <a:rPr lang="en-US" dirty="0"/>
-              <a:t> and </a:t>
-            </a:r>
-            <a:r>
-              <a:rPr lang="en-US" dirty="0" err="1"/>
-              <a:t>V_cache</a:t>
-            </a:r>
-            <a:endParaRPr lang="en-US" dirty="0"/>
+              <a:t>Let’s take a simple example. If g is a counter, the merge is a simple addition. You can probably see that this is easily generalizable to other associative statistics such as min/max/product, etc. Essentially, you track the minimum in the cache and take the minimum of the new value in the cache and the old value in the backing store.</a:t>
+            </a:r>
           </a:p>
         </p:txBody>
       </p:sp>
@@ -3114,38 +3084,6 @@
               <a:t>The key point is that this additional state is small. It is only the number of packets (N), and doesn’t include some value per packet.</a:t>
             </a:r>
           </a:p>
-          <a:p>
-            <a:endParaRPr lang="en-US" dirty="0"/>
-          </a:p>
-          <a:p>
-            <a:endParaRPr lang="en-US" dirty="0"/>
-          </a:p>
-          <a:p>
-            <a:r>
-              <a:rPr lang="en-US" dirty="0"/>
-              <a:t>TODO: Diagram for </a:t>
-            </a:r>
-            <a:r>
-              <a:rPr lang="en-US" dirty="0" err="1"/>
-              <a:t>V_back</a:t>
-            </a:r>
-            <a:r>
-              <a:rPr lang="en-US" dirty="0"/>
-              <a:t> and </a:t>
-            </a:r>
-            <a:r>
-              <a:rPr lang="en-US" dirty="0" err="1"/>
-              <a:t>V</a:t>
-            </a:r>
-            <a:r>
-              <a:rPr lang="en-US" err="1"/>
-              <a:t>_</a:t>
-            </a:r>
-            <a:r>
-              <a:rPr lang="en-US"/>
-              <a:t>cache</a:t>
-            </a:r>
-          </a:p>
         </p:txBody>
       </p:sp>
       <p:sp>
@@ -3800,7 +3738,7 @@
           <a:p>
             <a:r>
               <a:rPr lang="en-US" dirty="0"/>
-              <a:t>TO put this into context. For a 64-poort 100-Gbits/switch, if we assume 2**20 slots, that’s a memory requirement of 256 </a:t>
+              <a:t>To put this into context. For a 64-poort 100-Gbits/switch, if we assume 2**20 slots, that’s a memory requirement of 256 </a:t>
             </a:r>
             <a:r>
               <a:rPr lang="en-US" dirty="0" err="1"/>
@@ -3808,7 +3746,15 @@
             </a:r>
             <a:r>
               <a:rPr lang="en-US" dirty="0"/>
-              <a:t>, which is about 7.5% of the switching chip’s area. Assuming typical traffic patterns for this switch, this translates into an eviction rate of 8M records every second, which we estimate can be handled by a 32-core server. So the way to think about this is that we can service the eviction rate for a 64 server cluster connected to a TOR switch by using a single 32-core server for typical workloads. This is a simplified summary of the results. The paper has many more details on this.</a:t>
+              <a:t>, which is about 7.5% of the switching chip’s area. Assuming typical traffic patterns for this switch, this translates into an eviction rate of 8M records every second, which we estimate can be handled by a 32-core server. So the way to think about this is that we can service the eviction rate for a 64 server cluster connected to a TOR switch by using a single 32-core server for typical workloads. This is a simplified summary of the results. The </a:t>
+            </a:r>
+            <a:r>
+              <a:rPr lang="en-US"/>
+              <a:t>paper has </a:t>
+            </a:r>
+            <a:r>
+              <a:rPr lang="en-US" dirty="0"/>
+              <a:t>more details on this.</a:t>
             </a:r>
           </a:p>
         </p:txBody>
@@ -12180,7 +12126,7 @@
           <a:effectLst/>
           <a:extLst>
             <a:ext uri="{909E8E84-426E-40dd-AFC4-6F175D3DCCD1}">
-              <a14:hiddenFill xmlns="" xmlns:a14="http://schemas.microsoft.com/office/drawing/2010/main">
+              <a14:hiddenFill xmlns:a14="http://schemas.microsoft.com/office/drawing/2010/main" xmlns="">
                 <a:blipFill dpi="0" rotWithShape="0">
                   <a:blip/>
                   <a:srcRect/>
@@ -12191,7 +12137,7 @@
               </a14:hiddenFill>
             </a:ext>
             <a:ext uri="{91240B29-F687-4f45-9708-019B960494DF}">
-              <a14:hiddenLine xmlns="" xmlns:a14="http://schemas.microsoft.com/office/drawing/2010/main" w="9525">
+              <a14:hiddenLine xmlns:a14="http://schemas.microsoft.com/office/drawing/2010/main" xmlns="" w="9525">
                 <a:solidFill>
                   <a:srgbClr val="000000"/>
                 </a:solidFill>
@@ -12201,7 +12147,7 @@
               </a14:hiddenLine>
             </a:ext>
             <a:ext uri="{AF507438-7753-43e0-B8FC-AC1667EBCBE1}">
-              <a14:hiddenEffects xmlns="" xmlns:a14="http://schemas.microsoft.com/office/drawing/2010/main">
+              <a14:hiddenEffects xmlns:a14="http://schemas.microsoft.com/office/drawing/2010/main" xmlns="">
                 <a:effectLst>
                   <a:outerShdw blurRad="63500" dist="38099" dir="2700000" algn="ctr" rotWithShape="0">
                     <a:srgbClr val="000000">
@@ -12250,7 +12196,7 @@
           <a:effectLst/>
           <a:extLst>
             <a:ext uri="{909E8E84-426E-40dd-AFC4-6F175D3DCCD1}">
-              <a14:hiddenFill xmlns="" xmlns:a14="http://schemas.microsoft.com/office/drawing/2010/main">
+              <a14:hiddenFill xmlns:a14="http://schemas.microsoft.com/office/drawing/2010/main" xmlns="">
                 <a:blipFill dpi="0" rotWithShape="0">
                   <a:blip/>
                   <a:srcRect/>
@@ -12261,7 +12207,7 @@
               </a14:hiddenFill>
             </a:ext>
             <a:ext uri="{91240B29-F687-4f45-9708-019B960494DF}">
-              <a14:hiddenLine xmlns="" xmlns:a14="http://schemas.microsoft.com/office/drawing/2010/main" w="9525">
+              <a14:hiddenLine xmlns:a14="http://schemas.microsoft.com/office/drawing/2010/main" xmlns="" w="9525">
                 <a:solidFill>
                   <a:srgbClr val="000000"/>
                 </a:solidFill>
@@ -12271,7 +12217,7 @@
               </a14:hiddenLine>
             </a:ext>
             <a:ext uri="{AF507438-7753-43e0-B8FC-AC1667EBCBE1}">
-              <a14:hiddenEffects xmlns="" xmlns:a14="http://schemas.microsoft.com/office/drawing/2010/main">
+              <a14:hiddenEffects xmlns:a14="http://schemas.microsoft.com/office/drawing/2010/main" xmlns="">
                 <a:effectLst>
                   <a:outerShdw blurRad="63500" dist="38099" dir="2700000" algn="ctr" rotWithShape="0">
                     <a:srgbClr val="000000">
@@ -12406,7 +12352,7 @@
             <a:effectLst/>
             <a:extLst>
               <a:ext uri="{909E8E84-426E-40dd-AFC4-6F175D3DCCD1}">
-                <a14:hiddenFill xmlns:a14="http://schemas.microsoft.com/office/drawing/2010/main" xmlns="">
+                <a14:hiddenFill xmlns="" xmlns:a14="http://schemas.microsoft.com/office/drawing/2010/main">
                   <a:blipFill dpi="0" rotWithShape="0">
                     <a:blip/>
                     <a:srcRect/>
@@ -12417,7 +12363,7 @@
                 </a14:hiddenFill>
               </a:ext>
               <a:ext uri="{91240B29-F687-4f45-9708-019B960494DF}">
-                <a14:hiddenLine xmlns:a14="http://schemas.microsoft.com/office/drawing/2010/main" xmlns="" w="9525">
+                <a14:hiddenLine xmlns="" xmlns:a14="http://schemas.microsoft.com/office/drawing/2010/main" w="9525">
                   <a:solidFill>
                     <a:srgbClr val="000000"/>
                   </a:solidFill>
@@ -12427,7 +12373,7 @@
                 </a14:hiddenLine>
               </a:ext>
               <a:ext uri="{AF507438-7753-43e0-B8FC-AC1667EBCBE1}">
-                <a14:hiddenEffects xmlns:a14="http://schemas.microsoft.com/office/drawing/2010/main" xmlns="">
+                <a14:hiddenEffects xmlns="" xmlns:a14="http://schemas.microsoft.com/office/drawing/2010/main">
                   <a:effectLst>
                     <a:outerShdw blurRad="63500" dist="38099" dir="2700000" algn="ctr" rotWithShape="0">
                       <a:srgbClr val="000000">
@@ -12476,7 +12422,7 @@
             <a:effectLst/>
             <a:extLst>
               <a:ext uri="{909E8E84-426E-40dd-AFC4-6F175D3DCCD1}">
-                <a14:hiddenFill xmlns:a14="http://schemas.microsoft.com/office/drawing/2010/main" xmlns="">
+                <a14:hiddenFill xmlns="" xmlns:a14="http://schemas.microsoft.com/office/drawing/2010/main">
                   <a:blipFill dpi="0" rotWithShape="0">
                     <a:blip/>
                     <a:srcRect/>
@@ -12487,7 +12433,7 @@
                 </a14:hiddenFill>
               </a:ext>
               <a:ext uri="{91240B29-F687-4f45-9708-019B960494DF}">
-                <a14:hiddenLine xmlns:a14="http://schemas.microsoft.com/office/drawing/2010/main" xmlns="" w="9525">
+                <a14:hiddenLine xmlns="" xmlns:a14="http://schemas.microsoft.com/office/drawing/2010/main" w="9525">
                   <a:solidFill>
                     <a:srgbClr val="000000"/>
                   </a:solidFill>
@@ -12497,7 +12443,7 @@
                 </a14:hiddenLine>
               </a:ext>
               <a:ext uri="{AF507438-7753-43e0-B8FC-AC1667EBCBE1}">
-                <a14:hiddenEffects xmlns:a14="http://schemas.microsoft.com/office/drawing/2010/main" xmlns="">
+                <a14:hiddenEffects xmlns="" xmlns:a14="http://schemas.microsoft.com/office/drawing/2010/main">
                   <a:effectLst>
                     <a:outerShdw blurRad="63500" dist="38099" dir="2700000" algn="ctr" rotWithShape="0">
                       <a:srgbClr val="000000">
@@ -12546,7 +12492,7 @@
             <a:effectLst/>
             <a:extLst>
               <a:ext uri="{909E8E84-426E-40dd-AFC4-6F175D3DCCD1}">
-                <a14:hiddenFill xmlns:a14="http://schemas.microsoft.com/office/drawing/2010/main" xmlns="">
+                <a14:hiddenFill xmlns="" xmlns:a14="http://schemas.microsoft.com/office/drawing/2010/main">
                   <a:blipFill dpi="0" rotWithShape="0">
                     <a:blip/>
                     <a:srcRect/>
@@ -12557,7 +12503,7 @@
                 </a14:hiddenFill>
               </a:ext>
               <a:ext uri="{91240B29-F687-4f45-9708-019B960494DF}">
-                <a14:hiddenLine xmlns:a14="http://schemas.microsoft.com/office/drawing/2010/main" xmlns="" w="9525">
+                <a14:hiddenLine xmlns="" xmlns:a14="http://schemas.microsoft.com/office/drawing/2010/main" w="9525">
                   <a:solidFill>
                     <a:srgbClr val="000000"/>
                   </a:solidFill>
@@ -12567,7 +12513,7 @@
                 </a14:hiddenLine>
               </a:ext>
               <a:ext uri="{AF507438-7753-43e0-B8FC-AC1667EBCBE1}">
-                <a14:hiddenEffects xmlns:a14="http://schemas.microsoft.com/office/drawing/2010/main" xmlns="">
+                <a14:hiddenEffects xmlns="" xmlns:a14="http://schemas.microsoft.com/office/drawing/2010/main">
                   <a:effectLst>
                     <a:outerShdw blurRad="63500" dist="38099" dir="2700000" algn="ctr" rotWithShape="0">
                       <a:srgbClr val="000000">
@@ -12608,12 +12554,12 @@
             <a:effectLst/>
             <a:extLst>
               <a:ext uri="{909E8E84-426E-40dd-AFC4-6F175D3DCCD1}">
-                <a14:hiddenFill xmlns:a14="http://schemas.microsoft.com/office/drawing/2010/main" xmlns="">
+                <a14:hiddenFill xmlns="" xmlns:a14="http://schemas.microsoft.com/office/drawing/2010/main">
                   <a:noFill/>
                 </a14:hiddenFill>
               </a:ext>
               <a:ext uri="{AF507438-7753-43e0-B8FC-AC1667EBCBE1}">
-                <a14:hiddenEffects xmlns:a14="http://schemas.microsoft.com/office/drawing/2010/main" xmlns="">
+                <a14:hiddenEffects xmlns="" xmlns:a14="http://schemas.microsoft.com/office/drawing/2010/main">
                   <a:effectLst>
                     <a:outerShdw blurRad="63500" dist="38099" dir="2700000" algn="ctr" rotWithShape="0">
                       <a:srgbClr val="000000">
@@ -12666,12 +12612,12 @@
             <a:effectLst/>
             <a:extLst>
               <a:ext uri="{909E8E84-426E-40dd-AFC4-6F175D3DCCD1}">
-                <a14:hiddenFill xmlns:a14="http://schemas.microsoft.com/office/drawing/2010/main" xmlns="">
+                <a14:hiddenFill xmlns="" xmlns:a14="http://schemas.microsoft.com/office/drawing/2010/main">
                   <a:noFill/>
                 </a14:hiddenFill>
               </a:ext>
               <a:ext uri="{AF507438-7753-43e0-B8FC-AC1667EBCBE1}">
-                <a14:hiddenEffects xmlns:a14="http://schemas.microsoft.com/office/drawing/2010/main" xmlns="">
+                <a14:hiddenEffects xmlns="" xmlns:a14="http://schemas.microsoft.com/office/drawing/2010/main">
                   <a:effectLst>
                     <a:outerShdw blurRad="63500" dist="38099" dir="2700000" algn="ctr" rotWithShape="0">
                       <a:srgbClr val="000000">
@@ -12724,12 +12670,12 @@
             <a:effectLst/>
             <a:extLst>
               <a:ext uri="{909E8E84-426E-40dd-AFC4-6F175D3DCCD1}">
-                <a14:hiddenFill xmlns:a14="http://schemas.microsoft.com/office/drawing/2010/main" xmlns="">
+                <a14:hiddenFill xmlns="" xmlns:a14="http://schemas.microsoft.com/office/drawing/2010/main">
                   <a:noFill/>
                 </a14:hiddenFill>
               </a:ext>
               <a:ext uri="{AF507438-7753-43e0-B8FC-AC1667EBCBE1}">
-                <a14:hiddenEffects xmlns:a14="http://schemas.microsoft.com/office/drawing/2010/main" xmlns="">
+                <a14:hiddenEffects xmlns="" xmlns:a14="http://schemas.microsoft.com/office/drawing/2010/main">
                   <a:effectLst>
                     <a:outerShdw blurRad="63500" dist="38099" dir="2700000" algn="ctr" rotWithShape="0">
                       <a:srgbClr val="000000">
@@ -12782,12 +12728,12 @@
             <a:effectLst/>
             <a:extLst>
               <a:ext uri="{909E8E84-426E-40dd-AFC4-6F175D3DCCD1}">
-                <a14:hiddenFill xmlns:a14="http://schemas.microsoft.com/office/drawing/2010/main" xmlns="">
+                <a14:hiddenFill xmlns="" xmlns:a14="http://schemas.microsoft.com/office/drawing/2010/main">
                   <a:noFill/>
                 </a14:hiddenFill>
               </a:ext>
               <a:ext uri="{AF507438-7753-43e0-B8FC-AC1667EBCBE1}">
-                <a14:hiddenEffects xmlns:a14="http://schemas.microsoft.com/office/drawing/2010/main" xmlns="">
+                <a14:hiddenEffects xmlns="" xmlns:a14="http://schemas.microsoft.com/office/drawing/2010/main">
                   <a:effectLst>
                     <a:outerShdw blurRad="63500" dist="38099" dir="2700000" algn="ctr" rotWithShape="0">
                       <a:srgbClr val="000000">
@@ -12840,12 +12786,12 @@
             <a:effectLst/>
             <a:extLst>
               <a:ext uri="{909E8E84-426E-40dd-AFC4-6F175D3DCCD1}">
-                <a14:hiddenFill xmlns:a14="http://schemas.microsoft.com/office/drawing/2010/main" xmlns="">
+                <a14:hiddenFill xmlns="" xmlns:a14="http://schemas.microsoft.com/office/drawing/2010/main">
                   <a:noFill/>
                 </a14:hiddenFill>
               </a:ext>
               <a:ext uri="{AF507438-7753-43e0-B8FC-AC1667EBCBE1}">
-                <a14:hiddenEffects xmlns:a14="http://schemas.microsoft.com/office/drawing/2010/main" xmlns="">
+                <a14:hiddenEffects xmlns="" xmlns:a14="http://schemas.microsoft.com/office/drawing/2010/main">
                   <a:effectLst>
                     <a:outerShdw blurRad="63500" dist="38099" dir="2700000" algn="ctr" rotWithShape="0">
                       <a:srgbClr val="000000">
@@ -12898,12 +12844,12 @@
             <a:effectLst/>
             <a:extLst>
               <a:ext uri="{909E8E84-426E-40dd-AFC4-6F175D3DCCD1}">
-                <a14:hiddenFill xmlns:a14="http://schemas.microsoft.com/office/drawing/2010/main" xmlns="">
+                <a14:hiddenFill xmlns="" xmlns:a14="http://schemas.microsoft.com/office/drawing/2010/main">
                   <a:noFill/>
                 </a14:hiddenFill>
               </a:ext>
               <a:ext uri="{AF507438-7753-43e0-B8FC-AC1667EBCBE1}">
-                <a14:hiddenEffects xmlns:a14="http://schemas.microsoft.com/office/drawing/2010/main" xmlns="">
+                <a14:hiddenEffects xmlns="" xmlns:a14="http://schemas.microsoft.com/office/drawing/2010/main">
                   <a:effectLst>
                     <a:outerShdw blurRad="63500" dist="38099" dir="2700000" algn="ctr" rotWithShape="0">
                       <a:srgbClr val="000000">
@@ -12956,12 +12902,12 @@
             <a:effectLst/>
             <a:extLst>
               <a:ext uri="{909E8E84-426E-40dd-AFC4-6F175D3DCCD1}">
-                <a14:hiddenFill xmlns:a14="http://schemas.microsoft.com/office/drawing/2010/main" xmlns="">
+                <a14:hiddenFill xmlns="" xmlns:a14="http://schemas.microsoft.com/office/drawing/2010/main">
                   <a:noFill/>
                 </a14:hiddenFill>
               </a:ext>
               <a:ext uri="{AF507438-7753-43e0-B8FC-AC1667EBCBE1}">
-                <a14:hiddenEffects xmlns:a14="http://schemas.microsoft.com/office/drawing/2010/main" xmlns="">
+                <a14:hiddenEffects xmlns="" xmlns:a14="http://schemas.microsoft.com/office/drawing/2010/main">
                   <a:effectLst>
                     <a:outerShdw blurRad="63500" dist="38099" dir="2700000" algn="ctr" rotWithShape="0">
                       <a:srgbClr val="000000">
@@ -13014,12 +12960,12 @@
             <a:effectLst/>
             <a:extLst>
               <a:ext uri="{909E8E84-426E-40dd-AFC4-6F175D3DCCD1}">
-                <a14:hiddenFill xmlns:a14="http://schemas.microsoft.com/office/drawing/2010/main" xmlns="">
+                <a14:hiddenFill xmlns="" xmlns:a14="http://schemas.microsoft.com/office/drawing/2010/main">
                   <a:noFill/>
                 </a14:hiddenFill>
               </a:ext>
               <a:ext uri="{AF507438-7753-43e0-B8FC-AC1667EBCBE1}">
-                <a14:hiddenEffects xmlns:a14="http://schemas.microsoft.com/office/drawing/2010/main" xmlns="">
+                <a14:hiddenEffects xmlns="" xmlns:a14="http://schemas.microsoft.com/office/drawing/2010/main">
                   <a:effectLst>
                     <a:outerShdw blurRad="63500" dist="38099" dir="2700000" algn="ctr" rotWithShape="0">
                       <a:srgbClr val="000000">
@@ -13072,12 +13018,12 @@
             <a:effectLst/>
             <a:extLst>
               <a:ext uri="{909E8E84-426E-40dd-AFC4-6F175D3DCCD1}">
-                <a14:hiddenFill xmlns:a14="http://schemas.microsoft.com/office/drawing/2010/main" xmlns="">
+                <a14:hiddenFill xmlns="" xmlns:a14="http://schemas.microsoft.com/office/drawing/2010/main">
                   <a:noFill/>
                 </a14:hiddenFill>
               </a:ext>
               <a:ext uri="{AF507438-7753-43e0-B8FC-AC1667EBCBE1}">
-                <a14:hiddenEffects xmlns:a14="http://schemas.microsoft.com/office/drawing/2010/main" xmlns="">
+                <a14:hiddenEffects xmlns="" xmlns:a14="http://schemas.microsoft.com/office/drawing/2010/main">
                   <a:effectLst>
                     <a:outerShdw blurRad="63500" dist="38099" dir="2700000" algn="ctr" rotWithShape="0">
                       <a:srgbClr val="000000">
@@ -13130,12 +13076,12 @@
             <a:effectLst/>
             <a:extLst>
               <a:ext uri="{909E8E84-426E-40dd-AFC4-6F175D3DCCD1}">
-                <a14:hiddenFill xmlns:a14="http://schemas.microsoft.com/office/drawing/2010/main" xmlns="">
+                <a14:hiddenFill xmlns="" xmlns:a14="http://schemas.microsoft.com/office/drawing/2010/main">
                   <a:noFill/>
                 </a14:hiddenFill>
               </a:ext>
               <a:ext uri="{AF507438-7753-43e0-B8FC-AC1667EBCBE1}">
-                <a14:hiddenEffects xmlns:a14="http://schemas.microsoft.com/office/drawing/2010/main" xmlns="">
+                <a14:hiddenEffects xmlns="" xmlns:a14="http://schemas.microsoft.com/office/drawing/2010/main">
                   <a:effectLst>
                     <a:outerShdw blurRad="63500" dist="38099" dir="2700000" algn="ctr" rotWithShape="0">
                       <a:srgbClr val="000000">
@@ -13196,7 +13142,7 @@
             <a:effectLst/>
             <a:extLst>
               <a:ext uri="{909E8E84-426E-40dd-AFC4-6F175D3DCCD1}">
-                <a14:hiddenFill xmlns:a14="http://schemas.microsoft.com/office/drawing/2010/main" xmlns="">
+                <a14:hiddenFill xmlns="" xmlns:a14="http://schemas.microsoft.com/office/drawing/2010/main">
                   <a:blipFill dpi="0" rotWithShape="0">
                     <a:blip/>
                     <a:srcRect/>
@@ -13207,7 +13153,7 @@
                 </a14:hiddenFill>
               </a:ext>
               <a:ext uri="{91240B29-F687-4f45-9708-019B960494DF}">
-                <a14:hiddenLine xmlns:a14="http://schemas.microsoft.com/office/drawing/2010/main" xmlns="" w="9525">
+                <a14:hiddenLine xmlns="" xmlns:a14="http://schemas.microsoft.com/office/drawing/2010/main" w="9525">
                   <a:solidFill>
                     <a:srgbClr val="000000"/>
                   </a:solidFill>
@@ -13217,7 +13163,7 @@
                 </a14:hiddenLine>
               </a:ext>
               <a:ext uri="{AF507438-7753-43e0-B8FC-AC1667EBCBE1}">
-                <a14:hiddenEffects xmlns:a14="http://schemas.microsoft.com/office/drawing/2010/main" xmlns="">
+                <a14:hiddenEffects xmlns="" xmlns:a14="http://schemas.microsoft.com/office/drawing/2010/main">
                   <a:effectLst>
                     <a:outerShdw blurRad="63500" dist="38099" dir="2700000" algn="ctr" rotWithShape="0">
                       <a:srgbClr val="000000">
@@ -13266,7 +13212,7 @@
             <a:effectLst/>
             <a:extLst>
               <a:ext uri="{909E8E84-426E-40dd-AFC4-6F175D3DCCD1}">
-                <a14:hiddenFill xmlns:a14="http://schemas.microsoft.com/office/drawing/2010/main" xmlns="">
+                <a14:hiddenFill xmlns="" xmlns:a14="http://schemas.microsoft.com/office/drawing/2010/main">
                   <a:blipFill dpi="0" rotWithShape="0">
                     <a:blip/>
                     <a:srcRect/>
@@ -13277,7 +13223,7 @@
                 </a14:hiddenFill>
               </a:ext>
               <a:ext uri="{91240B29-F687-4f45-9708-019B960494DF}">
-                <a14:hiddenLine xmlns:a14="http://schemas.microsoft.com/office/drawing/2010/main" xmlns="" w="9525">
+                <a14:hiddenLine xmlns="" xmlns:a14="http://schemas.microsoft.com/office/drawing/2010/main" w="9525">
                   <a:solidFill>
                     <a:srgbClr val="000000"/>
                   </a:solidFill>
@@ -13287,7 +13233,7 @@
                 </a14:hiddenLine>
               </a:ext>
               <a:ext uri="{AF507438-7753-43e0-B8FC-AC1667EBCBE1}">
-                <a14:hiddenEffects xmlns:a14="http://schemas.microsoft.com/office/drawing/2010/main" xmlns="">
+                <a14:hiddenEffects xmlns="" xmlns:a14="http://schemas.microsoft.com/office/drawing/2010/main">
                   <a:effectLst>
                     <a:outerShdw blurRad="63500" dist="38099" dir="2700000" algn="ctr" rotWithShape="0">
                       <a:srgbClr val="000000">
@@ -13336,7 +13282,7 @@
             <a:effectLst/>
             <a:extLst>
               <a:ext uri="{909E8E84-426E-40dd-AFC4-6F175D3DCCD1}">
-                <a14:hiddenFill xmlns:a14="http://schemas.microsoft.com/office/drawing/2010/main" xmlns="">
+                <a14:hiddenFill xmlns="" xmlns:a14="http://schemas.microsoft.com/office/drawing/2010/main">
                   <a:blipFill dpi="0" rotWithShape="0">
                     <a:blip/>
                     <a:srcRect/>
@@ -13347,7 +13293,7 @@
                 </a14:hiddenFill>
               </a:ext>
               <a:ext uri="{91240B29-F687-4f45-9708-019B960494DF}">
-                <a14:hiddenLine xmlns:a14="http://schemas.microsoft.com/office/drawing/2010/main" xmlns="" w="9525">
+                <a14:hiddenLine xmlns="" xmlns:a14="http://schemas.microsoft.com/office/drawing/2010/main" w="9525">
                   <a:solidFill>
                     <a:srgbClr val="000000"/>
                   </a:solidFill>
@@ -13357,7 +13303,7 @@
                 </a14:hiddenLine>
               </a:ext>
               <a:ext uri="{AF507438-7753-43e0-B8FC-AC1667EBCBE1}">
-                <a14:hiddenEffects xmlns:a14="http://schemas.microsoft.com/office/drawing/2010/main" xmlns="">
+                <a14:hiddenEffects xmlns="" xmlns:a14="http://schemas.microsoft.com/office/drawing/2010/main">
                   <a:effectLst>
                     <a:outerShdw blurRad="63500" dist="38099" dir="2700000" algn="ctr" rotWithShape="0">
                       <a:srgbClr val="000000">
@@ -13406,7 +13352,7 @@
             <a:effectLst/>
             <a:extLst>
               <a:ext uri="{909E8E84-426E-40dd-AFC4-6F175D3DCCD1}">
-                <a14:hiddenFill xmlns:a14="http://schemas.microsoft.com/office/drawing/2010/main" xmlns="">
+                <a14:hiddenFill xmlns="" xmlns:a14="http://schemas.microsoft.com/office/drawing/2010/main">
                   <a:blipFill dpi="0" rotWithShape="0">
                     <a:blip/>
                     <a:srcRect/>
@@ -13417,7 +13363,7 @@
                 </a14:hiddenFill>
               </a:ext>
               <a:ext uri="{91240B29-F687-4f45-9708-019B960494DF}">
-                <a14:hiddenLine xmlns:a14="http://schemas.microsoft.com/office/drawing/2010/main" xmlns="" w="9525">
+                <a14:hiddenLine xmlns="" xmlns:a14="http://schemas.microsoft.com/office/drawing/2010/main" w="9525">
                   <a:solidFill>
                     <a:srgbClr val="000000"/>
                   </a:solidFill>
@@ -13427,7 +13373,7 @@
                 </a14:hiddenLine>
               </a:ext>
               <a:ext uri="{AF507438-7753-43e0-B8FC-AC1667EBCBE1}">
-                <a14:hiddenEffects xmlns:a14="http://schemas.microsoft.com/office/drawing/2010/main" xmlns="">
+                <a14:hiddenEffects xmlns="" xmlns:a14="http://schemas.microsoft.com/office/drawing/2010/main">
                   <a:effectLst>
                     <a:outerShdw blurRad="63500" dist="38099" dir="2700000" algn="ctr" rotWithShape="0">
                       <a:srgbClr val="000000">
@@ -13476,7 +13422,7 @@
             <a:effectLst/>
             <a:extLst>
               <a:ext uri="{909E8E84-426E-40dd-AFC4-6F175D3DCCD1}">
-                <a14:hiddenFill xmlns:a14="http://schemas.microsoft.com/office/drawing/2010/main" xmlns="">
+                <a14:hiddenFill xmlns="" xmlns:a14="http://schemas.microsoft.com/office/drawing/2010/main">
                   <a:blipFill dpi="0" rotWithShape="0">
                     <a:blip/>
                     <a:srcRect/>
@@ -13487,7 +13433,7 @@
                 </a14:hiddenFill>
               </a:ext>
               <a:ext uri="{91240B29-F687-4f45-9708-019B960494DF}">
-                <a14:hiddenLine xmlns:a14="http://schemas.microsoft.com/office/drawing/2010/main" xmlns="" w="9525">
+                <a14:hiddenLine xmlns="" xmlns:a14="http://schemas.microsoft.com/office/drawing/2010/main" w="9525">
                   <a:solidFill>
                     <a:srgbClr val="000000"/>
                   </a:solidFill>
@@ -13497,7 +13443,7 @@
                 </a14:hiddenLine>
               </a:ext>
               <a:ext uri="{AF507438-7753-43e0-B8FC-AC1667EBCBE1}">
-                <a14:hiddenEffects xmlns:a14="http://schemas.microsoft.com/office/drawing/2010/main" xmlns="">
+                <a14:hiddenEffects xmlns="" xmlns:a14="http://schemas.microsoft.com/office/drawing/2010/main">
                   <a:effectLst>
                     <a:outerShdw blurRad="63500" dist="38099" dir="2700000" algn="ctr" rotWithShape="0">
                       <a:srgbClr val="000000">
@@ -13538,12 +13484,12 @@
             <a:effectLst/>
             <a:extLst>
               <a:ext uri="{909E8E84-426E-40dd-AFC4-6F175D3DCCD1}">
-                <a14:hiddenFill xmlns:a14="http://schemas.microsoft.com/office/drawing/2010/main" xmlns="">
+                <a14:hiddenFill xmlns="" xmlns:a14="http://schemas.microsoft.com/office/drawing/2010/main">
                   <a:noFill/>
                 </a14:hiddenFill>
               </a:ext>
               <a:ext uri="{AF507438-7753-43e0-B8FC-AC1667EBCBE1}">
-                <a14:hiddenEffects xmlns:a14="http://schemas.microsoft.com/office/drawing/2010/main" xmlns="">
+                <a14:hiddenEffects xmlns="" xmlns:a14="http://schemas.microsoft.com/office/drawing/2010/main">
                   <a:effectLst>
                     <a:outerShdw blurRad="63500" dist="38099" dir="2700000" algn="ctr" rotWithShape="0">
                       <a:srgbClr val="000000">
@@ -13596,12 +13542,12 @@
             <a:effectLst/>
             <a:extLst>
               <a:ext uri="{909E8E84-426E-40dd-AFC4-6F175D3DCCD1}">
-                <a14:hiddenFill xmlns:a14="http://schemas.microsoft.com/office/drawing/2010/main" xmlns="">
+                <a14:hiddenFill xmlns="" xmlns:a14="http://schemas.microsoft.com/office/drawing/2010/main">
                   <a:noFill/>
                 </a14:hiddenFill>
               </a:ext>
               <a:ext uri="{AF507438-7753-43e0-B8FC-AC1667EBCBE1}">
-                <a14:hiddenEffects xmlns:a14="http://schemas.microsoft.com/office/drawing/2010/main" xmlns="">
+                <a14:hiddenEffects xmlns="" xmlns:a14="http://schemas.microsoft.com/office/drawing/2010/main">
                   <a:effectLst>
                     <a:outerShdw blurRad="63500" dist="38099" dir="2700000" algn="ctr" rotWithShape="0">
                       <a:srgbClr val="000000">
@@ -13662,7 +13608,7 @@
             <a:effectLst/>
             <a:extLst>
               <a:ext uri="{909E8E84-426E-40dd-AFC4-6F175D3DCCD1}">
-                <a14:hiddenFill xmlns:a14="http://schemas.microsoft.com/office/drawing/2010/main" xmlns="">
+                <a14:hiddenFill xmlns="" xmlns:a14="http://schemas.microsoft.com/office/drawing/2010/main">
                   <a:blipFill dpi="0" rotWithShape="0">
                     <a:blip/>
                     <a:srcRect/>
@@ -13673,7 +13619,7 @@
                 </a14:hiddenFill>
               </a:ext>
               <a:ext uri="{91240B29-F687-4f45-9708-019B960494DF}">
-                <a14:hiddenLine xmlns:a14="http://schemas.microsoft.com/office/drawing/2010/main" xmlns="" w="9525">
+                <a14:hiddenLine xmlns="" xmlns:a14="http://schemas.microsoft.com/office/drawing/2010/main" w="9525">
                   <a:solidFill>
                     <a:srgbClr val="000000"/>
                   </a:solidFill>
@@ -13683,7 +13629,7 @@
                 </a14:hiddenLine>
               </a:ext>
               <a:ext uri="{AF507438-7753-43e0-B8FC-AC1667EBCBE1}">
-                <a14:hiddenEffects xmlns:a14="http://schemas.microsoft.com/office/drawing/2010/main" xmlns="">
+                <a14:hiddenEffects xmlns="" xmlns:a14="http://schemas.microsoft.com/office/drawing/2010/main">
                   <a:effectLst>
                     <a:outerShdw blurRad="63500" dist="38099" dir="2700000" algn="ctr" rotWithShape="0">
                       <a:srgbClr val="000000">
@@ -13816,7 +13762,7 @@
           <a:effectLst/>
           <a:extLst>
             <a:ext uri="{909E8E84-426E-40dd-AFC4-6F175D3DCCD1}">
-              <a14:hiddenFill xmlns="" xmlns:a14="http://schemas.microsoft.com/office/drawing/2010/main">
+              <a14:hiddenFill xmlns:a14="http://schemas.microsoft.com/office/drawing/2010/main" xmlns="">
                 <a:blipFill dpi="0" rotWithShape="0">
                   <a:blip/>
                   <a:srcRect/>
@@ -13827,7 +13773,7 @@
               </a14:hiddenFill>
             </a:ext>
             <a:ext uri="{91240B29-F687-4f45-9708-019B960494DF}">
-              <a14:hiddenLine xmlns="" xmlns:a14="http://schemas.microsoft.com/office/drawing/2010/main" w="9525">
+              <a14:hiddenLine xmlns:a14="http://schemas.microsoft.com/office/drawing/2010/main" xmlns="" w="9525">
                 <a:solidFill>
                   <a:srgbClr val="000000"/>
                 </a:solidFill>
@@ -13837,7 +13783,7 @@
               </a14:hiddenLine>
             </a:ext>
             <a:ext uri="{AF507438-7753-43e0-B8FC-AC1667EBCBE1}">
-              <a14:hiddenEffects xmlns="" xmlns:a14="http://schemas.microsoft.com/office/drawing/2010/main">
+              <a14:hiddenEffects xmlns:a14="http://schemas.microsoft.com/office/drawing/2010/main" xmlns="">
                 <a:effectLst>
                   <a:outerShdw blurRad="63500" dist="38099" dir="2700000" algn="ctr" rotWithShape="0">
                     <a:srgbClr val="000000">
@@ -13922,7 +13868,7 @@
           <a:effectLst/>
           <a:extLst>
             <a:ext uri="{909E8E84-426E-40dd-AFC4-6F175D3DCCD1}">
-              <a14:hiddenFill xmlns="" xmlns:a14="http://schemas.microsoft.com/office/drawing/2010/main">
+              <a14:hiddenFill xmlns:a14="http://schemas.microsoft.com/office/drawing/2010/main" xmlns="">
                 <a:blipFill dpi="0" rotWithShape="0">
                   <a:blip/>
                   <a:srcRect/>
@@ -13933,7 +13879,7 @@
               </a14:hiddenFill>
             </a:ext>
             <a:ext uri="{91240B29-F687-4f45-9708-019B960494DF}">
-              <a14:hiddenLine xmlns="" xmlns:a14="http://schemas.microsoft.com/office/drawing/2010/main" w="9525">
+              <a14:hiddenLine xmlns:a14="http://schemas.microsoft.com/office/drawing/2010/main" xmlns="" w="9525">
                 <a:solidFill>
                   <a:srgbClr val="000000"/>
                 </a:solidFill>
@@ -13943,7 +13889,7 @@
               </a14:hiddenLine>
             </a:ext>
             <a:ext uri="{AF507438-7753-43e0-B8FC-AC1667EBCBE1}">
-              <a14:hiddenEffects xmlns="" xmlns:a14="http://schemas.microsoft.com/office/drawing/2010/main">
+              <a14:hiddenEffects xmlns:a14="http://schemas.microsoft.com/office/drawing/2010/main" xmlns="">
                 <a:effectLst>
                   <a:outerShdw blurRad="63500" dist="38099" dir="2700000" algn="ctr" rotWithShape="0">
                     <a:srgbClr val="000000">
@@ -14028,7 +13974,7 @@
           <a:effectLst/>
           <a:extLst>
             <a:ext uri="{909E8E84-426E-40dd-AFC4-6F175D3DCCD1}">
-              <a14:hiddenFill xmlns="" xmlns:a14="http://schemas.microsoft.com/office/drawing/2010/main">
+              <a14:hiddenFill xmlns:a14="http://schemas.microsoft.com/office/drawing/2010/main" xmlns="">
                 <a:blipFill dpi="0" rotWithShape="0">
                   <a:blip/>
                   <a:srcRect/>
@@ -14039,7 +13985,7 @@
               </a14:hiddenFill>
             </a:ext>
             <a:ext uri="{91240B29-F687-4f45-9708-019B960494DF}">
-              <a14:hiddenLine xmlns="" xmlns:a14="http://schemas.microsoft.com/office/drawing/2010/main" w="9525">
+              <a14:hiddenLine xmlns:a14="http://schemas.microsoft.com/office/drawing/2010/main" xmlns="" w="9525">
                 <a:solidFill>
                   <a:srgbClr val="000000"/>
                 </a:solidFill>
@@ -14049,7 +13995,7 @@
               </a14:hiddenLine>
             </a:ext>
             <a:ext uri="{AF507438-7753-43e0-B8FC-AC1667EBCBE1}">
-              <a14:hiddenEffects xmlns="" xmlns:a14="http://schemas.microsoft.com/office/drawing/2010/main">
+              <a14:hiddenEffects xmlns:a14="http://schemas.microsoft.com/office/drawing/2010/main" xmlns="">
                 <a:effectLst>
                   <a:outerShdw blurRad="63500" dist="38099" dir="2700000" algn="ctr" rotWithShape="0">
                     <a:srgbClr val="000000">
@@ -14240,7 +14186,7 @@
           <a:effectLst/>
           <a:extLst>
             <a:ext uri="{909E8E84-426E-40dd-AFC4-6F175D3DCCD1}">
-              <a14:hiddenFill xmlns="" xmlns:a14="http://schemas.microsoft.com/office/drawing/2010/main">
+              <a14:hiddenFill xmlns:a14="http://schemas.microsoft.com/office/drawing/2010/main" xmlns="">
                 <a:blipFill dpi="0" rotWithShape="0">
                   <a:blip/>
                   <a:srcRect/>
@@ -14251,7 +14197,7 @@
               </a14:hiddenFill>
             </a:ext>
             <a:ext uri="{91240B29-F687-4f45-9708-019B960494DF}">
-              <a14:hiddenLine xmlns="" xmlns:a14="http://schemas.microsoft.com/office/drawing/2010/main" w="9525">
+              <a14:hiddenLine xmlns:a14="http://schemas.microsoft.com/office/drawing/2010/main" xmlns="" w="9525">
                 <a:solidFill>
                   <a:srgbClr val="000000"/>
                 </a:solidFill>
@@ -14261,7 +14207,7 @@
               </a14:hiddenLine>
             </a:ext>
             <a:ext uri="{AF507438-7753-43e0-B8FC-AC1667EBCBE1}">
-              <a14:hiddenEffects xmlns="" xmlns:a14="http://schemas.microsoft.com/office/drawing/2010/main">
+              <a14:hiddenEffects xmlns:a14="http://schemas.microsoft.com/office/drawing/2010/main" xmlns="">
                 <a:effectLst>
                   <a:outerShdw blurRad="63500" dist="38099" dir="2700000" algn="ctr" rotWithShape="0">
                     <a:srgbClr val="000000">
@@ -14339,7 +14285,7 @@
           <a:effectLst/>
           <a:extLst>
             <a:ext uri="{909E8E84-426E-40dd-AFC4-6F175D3DCCD1}">
-              <a14:hiddenFill xmlns="" xmlns:a14="http://schemas.microsoft.com/office/drawing/2010/main">
+              <a14:hiddenFill xmlns:a14="http://schemas.microsoft.com/office/drawing/2010/main" xmlns="">
                 <a:blipFill dpi="0" rotWithShape="0">
                   <a:blip/>
                   <a:srcRect/>
@@ -14350,7 +14296,7 @@
               </a14:hiddenFill>
             </a:ext>
             <a:ext uri="{91240B29-F687-4f45-9708-019B960494DF}">
-              <a14:hiddenLine xmlns="" xmlns:a14="http://schemas.microsoft.com/office/drawing/2010/main" w="9525">
+              <a14:hiddenLine xmlns:a14="http://schemas.microsoft.com/office/drawing/2010/main" xmlns="" w="9525">
                 <a:solidFill>
                   <a:srgbClr val="000000"/>
                 </a:solidFill>
@@ -14360,7 +14306,7 @@
               </a14:hiddenLine>
             </a:ext>
             <a:ext uri="{AF507438-7753-43e0-B8FC-AC1667EBCBE1}">
-              <a14:hiddenEffects xmlns="" xmlns:a14="http://schemas.microsoft.com/office/drawing/2010/main">
+              <a14:hiddenEffects xmlns:a14="http://schemas.microsoft.com/office/drawing/2010/main" xmlns="">
                 <a:effectLst>
                   <a:outerShdw blurRad="63500" dist="38099" dir="2700000" algn="ctr" rotWithShape="0">
                     <a:srgbClr val="000000">
@@ -16225,7 +16171,7 @@
           <a:effectLst/>
           <a:extLst>
             <a:ext uri="{909E8E84-426E-40dd-AFC4-6F175D3DCCD1}">
-              <a14:hiddenFill xmlns:a14="http://schemas.microsoft.com/office/drawing/2010/main" xmlns="">
+              <a14:hiddenFill xmlns="" xmlns:a14="http://schemas.microsoft.com/office/drawing/2010/main">
                 <a:blipFill dpi="0" rotWithShape="0">
                   <a:blip/>
                   <a:srcRect/>
@@ -16236,7 +16182,7 @@
               </a14:hiddenFill>
             </a:ext>
             <a:ext uri="{91240B29-F687-4f45-9708-019B960494DF}">
-              <a14:hiddenLine xmlns:a14="http://schemas.microsoft.com/office/drawing/2010/main" xmlns="" w="9525">
+              <a14:hiddenLine xmlns="" xmlns:a14="http://schemas.microsoft.com/office/drawing/2010/main" w="9525">
                 <a:solidFill>
                   <a:srgbClr val="000000"/>
                 </a:solidFill>
@@ -16246,7 +16192,7 @@
               </a14:hiddenLine>
             </a:ext>
             <a:ext uri="{AF507438-7753-43e0-B8FC-AC1667EBCBE1}">
-              <a14:hiddenEffects xmlns:a14="http://schemas.microsoft.com/office/drawing/2010/main" xmlns="">
+              <a14:hiddenEffects xmlns="" xmlns:a14="http://schemas.microsoft.com/office/drawing/2010/main">
                 <a:effectLst>
                   <a:outerShdw blurRad="63500" dist="38099" dir="2700000" algn="ctr" rotWithShape="0">
                     <a:srgbClr val="000000">
@@ -16406,7 +16352,7 @@
           <a:effectLst/>
           <a:extLst>
             <a:ext uri="{909E8E84-426E-40dd-AFC4-6F175D3DCCD1}">
-              <a14:hiddenFill xmlns:a14="http://schemas.microsoft.com/office/drawing/2010/main" xmlns="">
+              <a14:hiddenFill xmlns="" xmlns:a14="http://schemas.microsoft.com/office/drawing/2010/main">
                 <a:blipFill dpi="0" rotWithShape="0">
                   <a:blip/>
                   <a:srcRect/>
@@ -16417,7 +16363,7 @@
               </a14:hiddenFill>
             </a:ext>
             <a:ext uri="{91240B29-F687-4f45-9708-019B960494DF}">
-              <a14:hiddenLine xmlns:a14="http://schemas.microsoft.com/office/drawing/2010/main" xmlns="" w="9525">
+              <a14:hiddenLine xmlns="" xmlns:a14="http://schemas.microsoft.com/office/drawing/2010/main" w="9525">
                 <a:solidFill>
                   <a:srgbClr val="000000"/>
                 </a:solidFill>
@@ -16427,7 +16373,7 @@
               </a14:hiddenLine>
             </a:ext>
             <a:ext uri="{AF507438-7753-43e0-B8FC-AC1667EBCBE1}">
-              <a14:hiddenEffects xmlns:a14="http://schemas.microsoft.com/office/drawing/2010/main" xmlns="">
+              <a14:hiddenEffects xmlns="" xmlns:a14="http://schemas.microsoft.com/office/drawing/2010/main">
                 <a:effectLst>
                   <a:outerShdw blurRad="63500" dist="38099" dir="2700000" algn="ctr" rotWithShape="0">
                     <a:srgbClr val="000000">
@@ -18226,7 +18172,7 @@
           <a:effectLst/>
           <a:extLst>
             <a:ext uri="{909E8E84-426E-40dd-AFC4-6F175D3DCCD1}">
-              <a14:hiddenFill xmlns:a14="http://schemas.microsoft.com/office/drawing/2010/main" xmlns="">
+              <a14:hiddenFill xmlns="" xmlns:a14="http://schemas.microsoft.com/office/drawing/2010/main">
                 <a:blipFill dpi="0" rotWithShape="0">
                   <a:blip/>
                   <a:srcRect/>
@@ -18237,7 +18183,7 @@
               </a14:hiddenFill>
             </a:ext>
             <a:ext uri="{91240B29-F687-4f45-9708-019B960494DF}">
-              <a14:hiddenLine xmlns:a14="http://schemas.microsoft.com/office/drawing/2010/main" xmlns="" w="9525">
+              <a14:hiddenLine xmlns="" xmlns:a14="http://schemas.microsoft.com/office/drawing/2010/main" w="9525">
                 <a:solidFill>
                   <a:srgbClr val="000000"/>
                 </a:solidFill>
@@ -18247,7 +18193,7 @@
               </a14:hiddenLine>
             </a:ext>
             <a:ext uri="{AF507438-7753-43e0-B8FC-AC1667EBCBE1}">
-              <a14:hiddenEffects xmlns:a14="http://schemas.microsoft.com/office/drawing/2010/main" xmlns="">
+              <a14:hiddenEffects xmlns="" xmlns:a14="http://schemas.microsoft.com/office/drawing/2010/main">
                 <a:effectLst>
                   <a:outerShdw blurRad="63500" dist="38099" dir="2700000" algn="ctr" rotWithShape="0">
                     <a:srgbClr val="000000">
@@ -18340,7 +18286,7 @@
           <a:effectLst/>
           <a:extLst>
             <a:ext uri="{909E8E84-426E-40dd-AFC4-6F175D3DCCD1}">
-              <a14:hiddenFill xmlns:a14="http://schemas.microsoft.com/office/drawing/2010/main" xmlns="">
+              <a14:hiddenFill xmlns="" xmlns:a14="http://schemas.microsoft.com/office/drawing/2010/main">
                 <a:blipFill dpi="0" rotWithShape="0">
                   <a:blip/>
                   <a:srcRect/>
@@ -18351,7 +18297,7 @@
               </a14:hiddenFill>
             </a:ext>
             <a:ext uri="{91240B29-F687-4f45-9708-019B960494DF}">
-              <a14:hiddenLine xmlns:a14="http://schemas.microsoft.com/office/drawing/2010/main" xmlns="" w="9525">
+              <a14:hiddenLine xmlns="" xmlns:a14="http://schemas.microsoft.com/office/drawing/2010/main" w="9525">
                 <a:solidFill>
                   <a:srgbClr val="000000"/>
                 </a:solidFill>
@@ -18361,7 +18307,7 @@
               </a14:hiddenLine>
             </a:ext>
             <a:ext uri="{AF507438-7753-43e0-B8FC-AC1667EBCBE1}">
-              <a14:hiddenEffects xmlns:a14="http://schemas.microsoft.com/office/drawing/2010/main" xmlns="">
+              <a14:hiddenEffects xmlns="" xmlns:a14="http://schemas.microsoft.com/office/drawing/2010/main">
                 <a:effectLst>
                   <a:outerShdw blurRad="63500" dist="38099" dir="2700000" algn="ctr" rotWithShape="0">
                     <a:srgbClr val="000000">
@@ -21233,7 +21179,7 @@
           <a:effectLst/>
           <a:extLst>
             <a:ext uri="{909E8E84-426E-40dd-AFC4-6F175D3DCCD1}">
-              <a14:hiddenFill xmlns:a14="http://schemas.microsoft.com/office/drawing/2010/main" xmlns="">
+              <a14:hiddenFill xmlns="" xmlns:a14="http://schemas.microsoft.com/office/drawing/2010/main">
                 <a:blipFill dpi="0" rotWithShape="0">
                   <a:blip/>
                   <a:srcRect/>
@@ -21244,7 +21190,7 @@
               </a14:hiddenFill>
             </a:ext>
             <a:ext uri="{91240B29-F687-4f45-9708-019B960494DF}">
-              <a14:hiddenLine xmlns:a14="http://schemas.microsoft.com/office/drawing/2010/main" xmlns="" w="9525">
+              <a14:hiddenLine xmlns="" xmlns:a14="http://schemas.microsoft.com/office/drawing/2010/main" w="9525">
                 <a:solidFill>
                   <a:srgbClr val="000000"/>
                 </a:solidFill>
@@ -21254,7 +21200,7 @@
               </a14:hiddenLine>
             </a:ext>
             <a:ext uri="{AF507438-7753-43e0-B8FC-AC1667EBCBE1}">
-              <a14:hiddenEffects xmlns:a14="http://schemas.microsoft.com/office/drawing/2010/main" xmlns="">
+              <a14:hiddenEffects xmlns="" xmlns:a14="http://schemas.microsoft.com/office/drawing/2010/main">
                 <a:effectLst>
                   <a:outerShdw blurRad="63500" dist="38099" dir="2700000" algn="ctr" rotWithShape="0">
                     <a:srgbClr val="000000">
@@ -21333,7 +21279,7 @@
           <a:effectLst/>
           <a:extLst>
             <a:ext uri="{909E8E84-426E-40dd-AFC4-6F175D3DCCD1}">
-              <a14:hiddenFill xmlns:a14="http://schemas.microsoft.com/office/drawing/2010/main" xmlns="">
+              <a14:hiddenFill xmlns="" xmlns:a14="http://schemas.microsoft.com/office/drawing/2010/main">
                 <a:blipFill dpi="0" rotWithShape="0">
                   <a:blip/>
                   <a:srcRect/>
@@ -21344,7 +21290,7 @@
               </a14:hiddenFill>
             </a:ext>
             <a:ext uri="{91240B29-F687-4f45-9708-019B960494DF}">
-              <a14:hiddenLine xmlns:a14="http://schemas.microsoft.com/office/drawing/2010/main" xmlns="" w="9525">
+              <a14:hiddenLine xmlns="" xmlns:a14="http://schemas.microsoft.com/office/drawing/2010/main" w="9525">
                 <a:solidFill>
                   <a:srgbClr val="000000"/>
                 </a:solidFill>
@@ -21354,7 +21300,7 @@
               </a14:hiddenLine>
             </a:ext>
             <a:ext uri="{AF507438-7753-43e0-B8FC-AC1667EBCBE1}">
-              <a14:hiddenEffects xmlns:a14="http://schemas.microsoft.com/office/drawing/2010/main" xmlns="">
+              <a14:hiddenEffects xmlns="" xmlns:a14="http://schemas.microsoft.com/office/drawing/2010/main">
                 <a:effectLst>
                   <a:outerShdw blurRad="63500" dist="38099" dir="2700000" algn="ctr" rotWithShape="0">
                     <a:srgbClr val="000000">
@@ -22937,7 +22883,7 @@
           <a:effectLst/>
           <a:extLst>
             <a:ext uri="{909E8E84-426E-40dd-AFC4-6F175D3DCCD1}">
-              <a14:hiddenFill xmlns:a14="http://schemas.microsoft.com/office/drawing/2010/main" xmlns="">
+              <a14:hiddenFill xmlns="" xmlns:a14="http://schemas.microsoft.com/office/drawing/2010/main">
                 <a:blipFill dpi="0" rotWithShape="0">
                   <a:blip/>
                   <a:srcRect/>
@@ -22948,7 +22894,7 @@
               </a14:hiddenFill>
             </a:ext>
             <a:ext uri="{91240B29-F687-4f45-9708-019B960494DF}">
-              <a14:hiddenLine xmlns:a14="http://schemas.microsoft.com/office/drawing/2010/main" xmlns="" w="9525">
+              <a14:hiddenLine xmlns="" xmlns:a14="http://schemas.microsoft.com/office/drawing/2010/main" w="9525">
                 <a:solidFill>
                   <a:srgbClr val="000000"/>
                 </a:solidFill>
@@ -22958,7 +22904,7 @@
               </a14:hiddenLine>
             </a:ext>
             <a:ext uri="{AF507438-7753-43e0-B8FC-AC1667EBCBE1}">
-              <a14:hiddenEffects xmlns:a14="http://schemas.microsoft.com/office/drawing/2010/main" xmlns="">
+              <a14:hiddenEffects xmlns="" xmlns:a14="http://schemas.microsoft.com/office/drawing/2010/main">
                 <a:effectLst>
                   <a:outerShdw blurRad="63500" dist="38099" dir="2700000" algn="ctr" rotWithShape="0">
                     <a:srgbClr val="000000">
@@ -24606,7 +24552,7 @@
           <a:effectLst/>
           <a:extLst>
             <a:ext uri="{909E8E84-426E-40dd-AFC4-6F175D3DCCD1}">
-              <a14:hiddenFill xmlns:a14="http://schemas.microsoft.com/office/drawing/2010/main" xmlns="">
+              <a14:hiddenFill xmlns="" xmlns:a14="http://schemas.microsoft.com/office/drawing/2010/main">
                 <a:blipFill dpi="0" rotWithShape="0">
                   <a:blip/>
                   <a:srcRect/>
@@ -24617,7 +24563,7 @@
               </a14:hiddenFill>
             </a:ext>
             <a:ext uri="{91240B29-F687-4f45-9708-019B960494DF}">
-              <a14:hiddenLine xmlns:a14="http://schemas.microsoft.com/office/drawing/2010/main" xmlns="" w="9525">
+              <a14:hiddenLine xmlns="" xmlns:a14="http://schemas.microsoft.com/office/drawing/2010/main" w="9525">
                 <a:solidFill>
                   <a:srgbClr val="000000"/>
                 </a:solidFill>
@@ -24627,7 +24573,7 @@
               </a14:hiddenLine>
             </a:ext>
             <a:ext uri="{AF507438-7753-43e0-B8FC-AC1667EBCBE1}">
-              <a14:hiddenEffects xmlns:a14="http://schemas.microsoft.com/office/drawing/2010/main" xmlns="">
+              <a14:hiddenEffects xmlns="" xmlns:a14="http://schemas.microsoft.com/office/drawing/2010/main">
                 <a:effectLst>
                   <a:outerShdw blurRad="63500" dist="38099" dir="2700000" algn="ctr" rotWithShape="0">
                     <a:srgbClr val="000000">
@@ -25989,7 +25935,7 @@
           <a:effectLst/>
           <a:extLst>
             <a:ext uri="{909E8E84-426E-40dd-AFC4-6F175D3DCCD1}">
-              <a14:hiddenFill xmlns:a14="http://schemas.microsoft.com/office/drawing/2010/main" xmlns="">
+              <a14:hiddenFill xmlns="" xmlns:a14="http://schemas.microsoft.com/office/drawing/2010/main">
                 <a:blipFill dpi="0" rotWithShape="0">
                   <a:blip/>
                   <a:srcRect/>
@@ -26000,7 +25946,7 @@
               </a14:hiddenFill>
             </a:ext>
             <a:ext uri="{91240B29-F687-4f45-9708-019B960494DF}">
-              <a14:hiddenLine xmlns:a14="http://schemas.microsoft.com/office/drawing/2010/main" xmlns="" w="9525">
+              <a14:hiddenLine xmlns="" xmlns:a14="http://schemas.microsoft.com/office/drawing/2010/main" w="9525">
                 <a:solidFill>
                   <a:srgbClr val="000000"/>
                 </a:solidFill>
@@ -26010,7 +25956,7 @@
               </a14:hiddenLine>
             </a:ext>
             <a:ext uri="{AF507438-7753-43e0-B8FC-AC1667EBCBE1}">
-              <a14:hiddenEffects xmlns:a14="http://schemas.microsoft.com/office/drawing/2010/main" xmlns="">
+              <a14:hiddenEffects xmlns="" xmlns:a14="http://schemas.microsoft.com/office/drawing/2010/main">
                 <a:effectLst>
                   <a:outerShdw blurRad="63500" dist="38099" dir="2700000" algn="ctr" rotWithShape="0">
                     <a:srgbClr val="000000">
@@ -26141,7 +26087,7 @@
           <a:effectLst/>
           <a:extLst>
             <a:ext uri="{909E8E84-426E-40dd-AFC4-6F175D3DCCD1}">
-              <a14:hiddenFill xmlns:a14="http://schemas.microsoft.com/office/drawing/2010/main" xmlns="">
+              <a14:hiddenFill xmlns="" xmlns:a14="http://schemas.microsoft.com/office/drawing/2010/main">
                 <a:blipFill dpi="0" rotWithShape="0">
                   <a:blip/>
                   <a:srcRect/>
@@ -26152,7 +26098,7 @@
               </a14:hiddenFill>
             </a:ext>
             <a:ext uri="{91240B29-F687-4f45-9708-019B960494DF}">
-              <a14:hiddenLine xmlns:a14="http://schemas.microsoft.com/office/drawing/2010/main" xmlns="" w="9525">
+              <a14:hiddenLine xmlns="" xmlns:a14="http://schemas.microsoft.com/office/drawing/2010/main" w="9525">
                 <a:solidFill>
                   <a:srgbClr val="000000"/>
                 </a:solidFill>
@@ -26162,7 +26108,7 @@
               </a14:hiddenLine>
             </a:ext>
             <a:ext uri="{AF507438-7753-43e0-B8FC-AC1667EBCBE1}">
-              <a14:hiddenEffects xmlns:a14="http://schemas.microsoft.com/office/drawing/2010/main" xmlns="">
+              <a14:hiddenEffects xmlns="" xmlns:a14="http://schemas.microsoft.com/office/drawing/2010/main">
                 <a:effectLst>
                   <a:outerShdw blurRad="63500" dist="38099" dir="2700000" algn="ctr" rotWithShape="0">
                     <a:srgbClr val="000000">
@@ -33831,7 +33777,7 @@
           <a:effectLst/>
           <a:extLst>
             <a:ext uri="{909E8E84-426E-40dd-AFC4-6F175D3DCCD1}">
-              <a14:hiddenFill xmlns="" xmlns:a14="http://schemas.microsoft.com/office/drawing/2010/main">
+              <a14:hiddenFill xmlns:a14="http://schemas.microsoft.com/office/drawing/2010/main" xmlns="">
                 <a:blipFill dpi="0" rotWithShape="0">
                   <a:blip/>
                   <a:srcRect/>
@@ -33842,7 +33788,7 @@
               </a14:hiddenFill>
             </a:ext>
             <a:ext uri="{91240B29-F687-4f45-9708-019B960494DF}">
-              <a14:hiddenLine xmlns="" xmlns:a14="http://schemas.microsoft.com/office/drawing/2010/main" w="9525">
+              <a14:hiddenLine xmlns:a14="http://schemas.microsoft.com/office/drawing/2010/main" xmlns="" w="9525">
                 <a:solidFill>
                   <a:srgbClr val="000000"/>
                 </a:solidFill>
@@ -33852,7 +33798,7 @@
               </a14:hiddenLine>
             </a:ext>
             <a:ext uri="{AF507438-7753-43e0-B8FC-AC1667EBCBE1}">
-              <a14:hiddenEffects xmlns="" xmlns:a14="http://schemas.microsoft.com/office/drawing/2010/main">
+              <a14:hiddenEffects xmlns:a14="http://schemas.microsoft.com/office/drawing/2010/main" xmlns="">
                 <a:effectLst>
                   <a:outerShdw blurRad="63500" dist="38099" dir="2700000" algn="ctr" rotWithShape="0">
                     <a:srgbClr val="000000">

</xml_diff>

<commit_message>
Change statistics to aggregation function everywhere.
</commit_message>
<xml_diff>
--- a/marple.pptx
+++ b/marple.pptx
@@ -874,8 +874,13 @@
             </a:r>
             <a:r>
               <a:rPr lang="en-US" dirty="0"/>
-              <a:t> tells you how to partition the original stream into sub-streams. Here, you partition the filtered stream R1 using the packet’s 5 tuple. Then you supply a function that tells you what per-sub-stream state to maintain and how to update it when a new packet arrives. Here, the function maintains an exponentially weighted moving average filter over the packets of each sub stream by applying a gain of alpha to the queuing latency of each packet and a gain of 1-alpha to the previous value of the exponentially weight moving average.</a:t>
-            </a:r>
+              <a:t> tells you how to partition the original stream into sub-streams. Here, you partition the filtered stream R1 using the packet’s 5 tuple. Then you supply a aggregation function that tells you what per-sub-stream state to maintain and how to update it when a new packet arrives. Here, the function maintains an exponentially weighted moving average filter over the packets of each sub stream by applying a gain of alpha to the queuing latency of each packet and a gain of 1-alpha to the previous value of the exponentially weight moving average. The aggregation function is exactly like a reduce function from a functional </a:t>
+            </a:r>
+            <a:r>
+              <a:rPr lang="en-US"/>
+              <a:t>programming language.</a:t>
+            </a:r>
+            <a:endParaRPr lang="en-US" dirty="0"/>
           </a:p>
         </p:txBody>
       </p:sp>
@@ -2590,7 +2595,7 @@
           <a:p>
             <a:r>
               <a:rPr lang="en-US" dirty="0"/>
-              <a:t>But how do I merge an old and new value for a given key? What does that even mean? Let’s look at this problem more formally. We want to merge the two values, old and new, so that it is as if the statistics function ran over the entire packet stream without any evictions. That way we can retain full accuracy while merging. Let’s introduce some notation for this. Let’s represent the statistics function as a function g over the packet sequence. For a simple counter, the function is the sum of the packet lengths (or any other packet header).</a:t>
+              <a:t>But how do I merge an old and new value for a given key? What does that even mean? Let’s look at this problem more formally. We want to merge the two values, old and new, so that it is as if the aggregation function ran over the entire packet stream without any evictions. That way we can retain full accuracy while merging. Let’s introduce some notation for this. Let’s represent the aggregation function as a function g over the packet sequence. For a simple counter, the function is the sum of the packet lengths (or any other packet header).</a:t>
             </a:r>
           </a:p>
         </p:txBody>
@@ -2683,7 +2688,7 @@
           <a:p>
             <a:r>
               <a:rPr lang="en-US" dirty="0"/>
-              <a:t>Mathematically, it means this. That if you computed the statistics function over the first sequence of packets and computed the statistics over the second sequence of the packets and then merged them, it is equivalent to computing the statistics over the entire packet sequence.</a:t>
+              <a:t>Mathematically, it means this. That if you computed the aggregation function over the first sequence of packets and computed the aggregation function over the second sequence of the packets and then merged the values together, it is equivalent to computing the aggregation function over the entire packet sequence.</a:t>
             </a:r>
           </a:p>
           <a:p>
@@ -2701,7 +2706,7 @@
           <a:p>
             <a:r>
               <a:rPr lang="en-US" dirty="0"/>
-              <a:t>Let’s take a simple example. If g is a counter, the merge is a simple addition. You can probably see that this is easily generalizable to other associative statistics such as min/max/product, etc. Essentially, you track the minimum in the cache and take the minimum of the new value in the cache and the old value in the backing store.</a:t>
+              <a:t>Let’s take a simple example. If g is a counter, the merge is a simple addition. You can probably see that this is easily generalizable to other associative aggregation functions such as min/max/product, etc. Essentially, you track the minimum in the cache and take the minimum of the new value in the cache and the old value in the backing store.</a:t>
             </a:r>
           </a:p>
         </p:txBody>
@@ -2875,7 +2880,7 @@
           <a:p>
             <a:r>
               <a:rPr lang="en-US" dirty="0"/>
-              <a:t>But what about operations that are not associative? Let’s think about this for a bit. We can merge any arbitrary statistic by storing the entire sequence of packets in the cache, sending this sequence of packets to the backing store upon eviction, and merging by simply replaying the statistics computation over this sequence of packets.</a:t>
+              <a:t>But what about operations that are not associative? Let’s think about this for a bit. We can merge any arbitrary statistic by storing the entire sequence of packets in the cache, sending this sequence of packets to the backing store upon eviction, and merging by simply replaying the aggregation function over this sequence of packets.</a:t>
             </a:r>
           </a:p>
           <a:p>
@@ -2893,7 +2898,7 @@
           <a:p>
             <a:r>
               <a:rPr lang="en-US" dirty="0"/>
-              <a:t>So the real question is whether we can merge with a small amount of extra state over and above the state that is being tracked by the statistics function itself? More precisely, we want the extra state to have size similar to the state being tracked.</a:t>
+              <a:t>So the real question is whether we can merge with a small amount of extra state over and above the state that is being tracked by the aggregation function itself? More precisely, we want the extra state to have size similar to the state being tracked.</a:t>
             </a:r>
           </a:p>
           <a:p>
@@ -2986,7 +2991,7 @@
           <a:p>
             <a:r>
               <a:rPr lang="en-US" dirty="0"/>
-              <a:t>One theoretical contribution of this work was identifying a class of statistics functions where we could in fact carry out the merge using a small amount of additional state. This class we call the linear-in-state class of statistics functions. The reason for this name should be clear from looking at the form of the state update in these statistics functions: the updated state is a linear function of the previous state. Here the coefficients A and B can either be constants or functions of a bounded number of packets in the past starting from the current packet. S can also be generalized to a vector and A and B can be matrices.</a:t>
+              <a:t>One theoretical contribution of this work was identifying a class of aggregation functions where we could in fact carry out the merge using a small amount of additional state. This class we call the linear-in-state class of aggregation functions. The reason for this name should be clear from looking at the form of the state update in these aggregation functions: the updated state is a linear function of the previous state. Here the coefficients A and B can either be constants or functions of a bounded number of packets in the past starting from the current packet. S can also be generalized to a vector and A and B can be matrices.</a:t>
             </a:r>
           </a:p>
           <a:p>
@@ -12286,7 +12291,7 @@
           <a:effectLst/>
           <a:extLst>
             <a:ext uri="{909E8E84-426E-40dd-AFC4-6F175D3DCCD1}">
-              <a14:hiddenFill xmlns="" xmlns:a14="http://schemas.microsoft.com/office/drawing/2010/main">
+              <a14:hiddenFill xmlns:a14="http://schemas.microsoft.com/office/drawing/2010/main" xmlns="">
                 <a:blipFill dpi="0" rotWithShape="0">
                   <a:blip/>
                   <a:srcRect/>
@@ -12297,7 +12302,7 @@
               </a14:hiddenFill>
             </a:ext>
             <a:ext uri="{91240B29-F687-4f45-9708-019B960494DF}">
-              <a14:hiddenLine xmlns="" xmlns:a14="http://schemas.microsoft.com/office/drawing/2010/main" w="9525">
+              <a14:hiddenLine xmlns:a14="http://schemas.microsoft.com/office/drawing/2010/main" xmlns="" w="9525">
                 <a:solidFill>
                   <a:srgbClr val="000000"/>
                 </a:solidFill>
@@ -12307,7 +12312,7 @@
               </a14:hiddenLine>
             </a:ext>
             <a:ext uri="{AF507438-7753-43e0-B8FC-AC1667EBCBE1}">
-              <a14:hiddenEffects xmlns="" xmlns:a14="http://schemas.microsoft.com/office/drawing/2010/main">
+              <a14:hiddenEffects xmlns:a14="http://schemas.microsoft.com/office/drawing/2010/main" xmlns="">
                 <a:effectLst>
                   <a:outerShdw blurRad="63500" dist="38099" dir="2700000" algn="ctr" rotWithShape="0">
                     <a:srgbClr val="000000">
@@ -12356,7 +12361,7 @@
           <a:effectLst/>
           <a:extLst>
             <a:ext uri="{909E8E84-426E-40dd-AFC4-6F175D3DCCD1}">
-              <a14:hiddenFill xmlns="" xmlns:a14="http://schemas.microsoft.com/office/drawing/2010/main">
+              <a14:hiddenFill xmlns:a14="http://schemas.microsoft.com/office/drawing/2010/main" xmlns="">
                 <a:blipFill dpi="0" rotWithShape="0">
                   <a:blip/>
                   <a:srcRect/>
@@ -12367,7 +12372,7 @@
               </a14:hiddenFill>
             </a:ext>
             <a:ext uri="{91240B29-F687-4f45-9708-019B960494DF}">
-              <a14:hiddenLine xmlns="" xmlns:a14="http://schemas.microsoft.com/office/drawing/2010/main" w="9525">
+              <a14:hiddenLine xmlns:a14="http://schemas.microsoft.com/office/drawing/2010/main" xmlns="" w="9525">
                 <a:solidFill>
                   <a:srgbClr val="000000"/>
                 </a:solidFill>
@@ -12377,7 +12382,7 @@
               </a14:hiddenLine>
             </a:ext>
             <a:ext uri="{AF507438-7753-43e0-B8FC-AC1667EBCBE1}">
-              <a14:hiddenEffects xmlns="" xmlns:a14="http://schemas.microsoft.com/office/drawing/2010/main">
+              <a14:hiddenEffects xmlns:a14="http://schemas.microsoft.com/office/drawing/2010/main" xmlns="">
                 <a:effectLst>
                   <a:outerShdw blurRad="63500" dist="38099" dir="2700000" algn="ctr" rotWithShape="0">
                     <a:srgbClr val="000000">
@@ -12512,7 +12517,7 @@
             <a:effectLst/>
             <a:extLst>
               <a:ext uri="{909E8E84-426E-40dd-AFC4-6F175D3DCCD1}">
-                <a14:hiddenFill xmlns:a14="http://schemas.microsoft.com/office/drawing/2010/main" xmlns="">
+                <a14:hiddenFill xmlns="" xmlns:a14="http://schemas.microsoft.com/office/drawing/2010/main">
                   <a:blipFill dpi="0" rotWithShape="0">
                     <a:blip/>
                     <a:srcRect/>
@@ -12523,7 +12528,7 @@
                 </a14:hiddenFill>
               </a:ext>
               <a:ext uri="{91240B29-F687-4f45-9708-019B960494DF}">
-                <a14:hiddenLine xmlns:a14="http://schemas.microsoft.com/office/drawing/2010/main" xmlns="" w="9525">
+                <a14:hiddenLine xmlns="" xmlns:a14="http://schemas.microsoft.com/office/drawing/2010/main" w="9525">
                   <a:solidFill>
                     <a:srgbClr val="000000"/>
                   </a:solidFill>
@@ -12533,7 +12538,7 @@
                 </a14:hiddenLine>
               </a:ext>
               <a:ext uri="{AF507438-7753-43e0-B8FC-AC1667EBCBE1}">
-                <a14:hiddenEffects xmlns:a14="http://schemas.microsoft.com/office/drawing/2010/main" xmlns="">
+                <a14:hiddenEffects xmlns="" xmlns:a14="http://schemas.microsoft.com/office/drawing/2010/main">
                   <a:effectLst>
                     <a:outerShdw blurRad="63500" dist="38099" dir="2700000" algn="ctr" rotWithShape="0">
                       <a:srgbClr val="000000">
@@ -12582,7 +12587,7 @@
             <a:effectLst/>
             <a:extLst>
               <a:ext uri="{909E8E84-426E-40dd-AFC4-6F175D3DCCD1}">
-                <a14:hiddenFill xmlns:a14="http://schemas.microsoft.com/office/drawing/2010/main" xmlns="">
+                <a14:hiddenFill xmlns="" xmlns:a14="http://schemas.microsoft.com/office/drawing/2010/main">
                   <a:blipFill dpi="0" rotWithShape="0">
                     <a:blip/>
                     <a:srcRect/>
@@ -12593,7 +12598,7 @@
                 </a14:hiddenFill>
               </a:ext>
               <a:ext uri="{91240B29-F687-4f45-9708-019B960494DF}">
-                <a14:hiddenLine xmlns:a14="http://schemas.microsoft.com/office/drawing/2010/main" xmlns="" w="9525">
+                <a14:hiddenLine xmlns="" xmlns:a14="http://schemas.microsoft.com/office/drawing/2010/main" w="9525">
                   <a:solidFill>
                     <a:srgbClr val="000000"/>
                   </a:solidFill>
@@ -12603,7 +12608,7 @@
                 </a14:hiddenLine>
               </a:ext>
               <a:ext uri="{AF507438-7753-43e0-B8FC-AC1667EBCBE1}">
-                <a14:hiddenEffects xmlns:a14="http://schemas.microsoft.com/office/drawing/2010/main" xmlns="">
+                <a14:hiddenEffects xmlns="" xmlns:a14="http://schemas.microsoft.com/office/drawing/2010/main">
                   <a:effectLst>
                     <a:outerShdw blurRad="63500" dist="38099" dir="2700000" algn="ctr" rotWithShape="0">
                       <a:srgbClr val="000000">
@@ -12652,7 +12657,7 @@
             <a:effectLst/>
             <a:extLst>
               <a:ext uri="{909E8E84-426E-40dd-AFC4-6F175D3DCCD1}">
-                <a14:hiddenFill xmlns:a14="http://schemas.microsoft.com/office/drawing/2010/main" xmlns="">
+                <a14:hiddenFill xmlns="" xmlns:a14="http://schemas.microsoft.com/office/drawing/2010/main">
                   <a:blipFill dpi="0" rotWithShape="0">
                     <a:blip/>
                     <a:srcRect/>
@@ -12663,7 +12668,7 @@
                 </a14:hiddenFill>
               </a:ext>
               <a:ext uri="{91240B29-F687-4f45-9708-019B960494DF}">
-                <a14:hiddenLine xmlns:a14="http://schemas.microsoft.com/office/drawing/2010/main" xmlns="" w="9525">
+                <a14:hiddenLine xmlns="" xmlns:a14="http://schemas.microsoft.com/office/drawing/2010/main" w="9525">
                   <a:solidFill>
                     <a:srgbClr val="000000"/>
                   </a:solidFill>
@@ -12673,7 +12678,7 @@
                 </a14:hiddenLine>
               </a:ext>
               <a:ext uri="{AF507438-7753-43e0-B8FC-AC1667EBCBE1}">
-                <a14:hiddenEffects xmlns:a14="http://schemas.microsoft.com/office/drawing/2010/main" xmlns="">
+                <a14:hiddenEffects xmlns="" xmlns:a14="http://schemas.microsoft.com/office/drawing/2010/main">
                   <a:effectLst>
                     <a:outerShdw blurRad="63500" dist="38099" dir="2700000" algn="ctr" rotWithShape="0">
                       <a:srgbClr val="000000">
@@ -12714,12 +12719,12 @@
             <a:effectLst/>
             <a:extLst>
               <a:ext uri="{909E8E84-426E-40dd-AFC4-6F175D3DCCD1}">
-                <a14:hiddenFill xmlns:a14="http://schemas.microsoft.com/office/drawing/2010/main" xmlns="">
+                <a14:hiddenFill xmlns="" xmlns:a14="http://schemas.microsoft.com/office/drawing/2010/main">
                   <a:noFill/>
                 </a14:hiddenFill>
               </a:ext>
               <a:ext uri="{AF507438-7753-43e0-B8FC-AC1667EBCBE1}">
-                <a14:hiddenEffects xmlns:a14="http://schemas.microsoft.com/office/drawing/2010/main" xmlns="">
+                <a14:hiddenEffects xmlns="" xmlns:a14="http://schemas.microsoft.com/office/drawing/2010/main">
                   <a:effectLst>
                     <a:outerShdw blurRad="63500" dist="38099" dir="2700000" algn="ctr" rotWithShape="0">
                       <a:srgbClr val="000000">
@@ -12772,12 +12777,12 @@
             <a:effectLst/>
             <a:extLst>
               <a:ext uri="{909E8E84-426E-40dd-AFC4-6F175D3DCCD1}">
-                <a14:hiddenFill xmlns:a14="http://schemas.microsoft.com/office/drawing/2010/main" xmlns="">
+                <a14:hiddenFill xmlns="" xmlns:a14="http://schemas.microsoft.com/office/drawing/2010/main">
                   <a:noFill/>
                 </a14:hiddenFill>
               </a:ext>
               <a:ext uri="{AF507438-7753-43e0-B8FC-AC1667EBCBE1}">
-                <a14:hiddenEffects xmlns:a14="http://schemas.microsoft.com/office/drawing/2010/main" xmlns="">
+                <a14:hiddenEffects xmlns="" xmlns:a14="http://schemas.microsoft.com/office/drawing/2010/main">
                   <a:effectLst>
                     <a:outerShdw blurRad="63500" dist="38099" dir="2700000" algn="ctr" rotWithShape="0">
                       <a:srgbClr val="000000">
@@ -12830,12 +12835,12 @@
             <a:effectLst/>
             <a:extLst>
               <a:ext uri="{909E8E84-426E-40dd-AFC4-6F175D3DCCD1}">
-                <a14:hiddenFill xmlns:a14="http://schemas.microsoft.com/office/drawing/2010/main" xmlns="">
+                <a14:hiddenFill xmlns="" xmlns:a14="http://schemas.microsoft.com/office/drawing/2010/main">
                   <a:noFill/>
                 </a14:hiddenFill>
               </a:ext>
               <a:ext uri="{AF507438-7753-43e0-B8FC-AC1667EBCBE1}">
-                <a14:hiddenEffects xmlns:a14="http://schemas.microsoft.com/office/drawing/2010/main" xmlns="">
+                <a14:hiddenEffects xmlns="" xmlns:a14="http://schemas.microsoft.com/office/drawing/2010/main">
                   <a:effectLst>
                     <a:outerShdw blurRad="63500" dist="38099" dir="2700000" algn="ctr" rotWithShape="0">
                       <a:srgbClr val="000000">
@@ -12888,12 +12893,12 @@
             <a:effectLst/>
             <a:extLst>
               <a:ext uri="{909E8E84-426E-40dd-AFC4-6F175D3DCCD1}">
-                <a14:hiddenFill xmlns:a14="http://schemas.microsoft.com/office/drawing/2010/main" xmlns="">
+                <a14:hiddenFill xmlns="" xmlns:a14="http://schemas.microsoft.com/office/drawing/2010/main">
                   <a:noFill/>
                 </a14:hiddenFill>
               </a:ext>
               <a:ext uri="{AF507438-7753-43e0-B8FC-AC1667EBCBE1}">
-                <a14:hiddenEffects xmlns:a14="http://schemas.microsoft.com/office/drawing/2010/main" xmlns="">
+                <a14:hiddenEffects xmlns="" xmlns:a14="http://schemas.microsoft.com/office/drawing/2010/main">
                   <a:effectLst>
                     <a:outerShdw blurRad="63500" dist="38099" dir="2700000" algn="ctr" rotWithShape="0">
                       <a:srgbClr val="000000">
@@ -12946,12 +12951,12 @@
             <a:effectLst/>
             <a:extLst>
               <a:ext uri="{909E8E84-426E-40dd-AFC4-6F175D3DCCD1}">
-                <a14:hiddenFill xmlns:a14="http://schemas.microsoft.com/office/drawing/2010/main" xmlns="">
+                <a14:hiddenFill xmlns="" xmlns:a14="http://schemas.microsoft.com/office/drawing/2010/main">
                   <a:noFill/>
                 </a14:hiddenFill>
               </a:ext>
               <a:ext uri="{AF507438-7753-43e0-B8FC-AC1667EBCBE1}">
-                <a14:hiddenEffects xmlns:a14="http://schemas.microsoft.com/office/drawing/2010/main" xmlns="">
+                <a14:hiddenEffects xmlns="" xmlns:a14="http://schemas.microsoft.com/office/drawing/2010/main">
                   <a:effectLst>
                     <a:outerShdw blurRad="63500" dist="38099" dir="2700000" algn="ctr" rotWithShape="0">
                       <a:srgbClr val="000000">
@@ -13004,12 +13009,12 @@
             <a:effectLst/>
             <a:extLst>
               <a:ext uri="{909E8E84-426E-40dd-AFC4-6F175D3DCCD1}">
-                <a14:hiddenFill xmlns:a14="http://schemas.microsoft.com/office/drawing/2010/main" xmlns="">
+                <a14:hiddenFill xmlns="" xmlns:a14="http://schemas.microsoft.com/office/drawing/2010/main">
                   <a:noFill/>
                 </a14:hiddenFill>
               </a:ext>
               <a:ext uri="{AF507438-7753-43e0-B8FC-AC1667EBCBE1}">
-                <a14:hiddenEffects xmlns:a14="http://schemas.microsoft.com/office/drawing/2010/main" xmlns="">
+                <a14:hiddenEffects xmlns="" xmlns:a14="http://schemas.microsoft.com/office/drawing/2010/main">
                   <a:effectLst>
                     <a:outerShdw blurRad="63500" dist="38099" dir="2700000" algn="ctr" rotWithShape="0">
                       <a:srgbClr val="000000">
@@ -13062,12 +13067,12 @@
             <a:effectLst/>
             <a:extLst>
               <a:ext uri="{909E8E84-426E-40dd-AFC4-6F175D3DCCD1}">
-                <a14:hiddenFill xmlns:a14="http://schemas.microsoft.com/office/drawing/2010/main" xmlns="">
+                <a14:hiddenFill xmlns="" xmlns:a14="http://schemas.microsoft.com/office/drawing/2010/main">
                   <a:noFill/>
                 </a14:hiddenFill>
               </a:ext>
               <a:ext uri="{AF507438-7753-43e0-B8FC-AC1667EBCBE1}">
-                <a14:hiddenEffects xmlns:a14="http://schemas.microsoft.com/office/drawing/2010/main" xmlns="">
+                <a14:hiddenEffects xmlns="" xmlns:a14="http://schemas.microsoft.com/office/drawing/2010/main">
                   <a:effectLst>
                     <a:outerShdw blurRad="63500" dist="38099" dir="2700000" algn="ctr" rotWithShape="0">
                       <a:srgbClr val="000000">
@@ -13120,12 +13125,12 @@
             <a:effectLst/>
             <a:extLst>
               <a:ext uri="{909E8E84-426E-40dd-AFC4-6F175D3DCCD1}">
-                <a14:hiddenFill xmlns:a14="http://schemas.microsoft.com/office/drawing/2010/main" xmlns="">
+                <a14:hiddenFill xmlns="" xmlns:a14="http://schemas.microsoft.com/office/drawing/2010/main">
                   <a:noFill/>
                 </a14:hiddenFill>
               </a:ext>
               <a:ext uri="{AF507438-7753-43e0-B8FC-AC1667EBCBE1}">
-                <a14:hiddenEffects xmlns:a14="http://schemas.microsoft.com/office/drawing/2010/main" xmlns="">
+                <a14:hiddenEffects xmlns="" xmlns:a14="http://schemas.microsoft.com/office/drawing/2010/main">
                   <a:effectLst>
                     <a:outerShdw blurRad="63500" dist="38099" dir="2700000" algn="ctr" rotWithShape="0">
                       <a:srgbClr val="000000">
@@ -13178,12 +13183,12 @@
             <a:effectLst/>
             <a:extLst>
               <a:ext uri="{909E8E84-426E-40dd-AFC4-6F175D3DCCD1}">
-                <a14:hiddenFill xmlns:a14="http://schemas.microsoft.com/office/drawing/2010/main" xmlns="">
+                <a14:hiddenFill xmlns="" xmlns:a14="http://schemas.microsoft.com/office/drawing/2010/main">
                   <a:noFill/>
                 </a14:hiddenFill>
               </a:ext>
               <a:ext uri="{AF507438-7753-43e0-B8FC-AC1667EBCBE1}">
-                <a14:hiddenEffects xmlns:a14="http://schemas.microsoft.com/office/drawing/2010/main" xmlns="">
+                <a14:hiddenEffects xmlns="" xmlns:a14="http://schemas.microsoft.com/office/drawing/2010/main">
                   <a:effectLst>
                     <a:outerShdw blurRad="63500" dist="38099" dir="2700000" algn="ctr" rotWithShape="0">
                       <a:srgbClr val="000000">
@@ -13236,12 +13241,12 @@
             <a:effectLst/>
             <a:extLst>
               <a:ext uri="{909E8E84-426E-40dd-AFC4-6F175D3DCCD1}">
-                <a14:hiddenFill xmlns:a14="http://schemas.microsoft.com/office/drawing/2010/main" xmlns="">
+                <a14:hiddenFill xmlns="" xmlns:a14="http://schemas.microsoft.com/office/drawing/2010/main">
                   <a:noFill/>
                 </a14:hiddenFill>
               </a:ext>
               <a:ext uri="{AF507438-7753-43e0-B8FC-AC1667EBCBE1}">
-                <a14:hiddenEffects xmlns:a14="http://schemas.microsoft.com/office/drawing/2010/main" xmlns="">
+                <a14:hiddenEffects xmlns="" xmlns:a14="http://schemas.microsoft.com/office/drawing/2010/main">
                   <a:effectLst>
                     <a:outerShdw blurRad="63500" dist="38099" dir="2700000" algn="ctr" rotWithShape="0">
                       <a:srgbClr val="000000">
@@ -13302,7 +13307,7 @@
             <a:effectLst/>
             <a:extLst>
               <a:ext uri="{909E8E84-426E-40dd-AFC4-6F175D3DCCD1}">
-                <a14:hiddenFill xmlns:a14="http://schemas.microsoft.com/office/drawing/2010/main" xmlns="">
+                <a14:hiddenFill xmlns="" xmlns:a14="http://schemas.microsoft.com/office/drawing/2010/main">
                   <a:blipFill dpi="0" rotWithShape="0">
                     <a:blip/>
                     <a:srcRect/>
@@ -13313,7 +13318,7 @@
                 </a14:hiddenFill>
               </a:ext>
               <a:ext uri="{91240B29-F687-4f45-9708-019B960494DF}">
-                <a14:hiddenLine xmlns:a14="http://schemas.microsoft.com/office/drawing/2010/main" xmlns="" w="9525">
+                <a14:hiddenLine xmlns="" xmlns:a14="http://schemas.microsoft.com/office/drawing/2010/main" w="9525">
                   <a:solidFill>
                     <a:srgbClr val="000000"/>
                   </a:solidFill>
@@ -13323,7 +13328,7 @@
                 </a14:hiddenLine>
               </a:ext>
               <a:ext uri="{AF507438-7753-43e0-B8FC-AC1667EBCBE1}">
-                <a14:hiddenEffects xmlns:a14="http://schemas.microsoft.com/office/drawing/2010/main" xmlns="">
+                <a14:hiddenEffects xmlns="" xmlns:a14="http://schemas.microsoft.com/office/drawing/2010/main">
                   <a:effectLst>
                     <a:outerShdw blurRad="63500" dist="38099" dir="2700000" algn="ctr" rotWithShape="0">
                       <a:srgbClr val="000000">
@@ -13372,7 +13377,7 @@
             <a:effectLst/>
             <a:extLst>
               <a:ext uri="{909E8E84-426E-40dd-AFC4-6F175D3DCCD1}">
-                <a14:hiddenFill xmlns:a14="http://schemas.microsoft.com/office/drawing/2010/main" xmlns="">
+                <a14:hiddenFill xmlns="" xmlns:a14="http://schemas.microsoft.com/office/drawing/2010/main">
                   <a:blipFill dpi="0" rotWithShape="0">
                     <a:blip/>
                     <a:srcRect/>
@@ -13383,7 +13388,7 @@
                 </a14:hiddenFill>
               </a:ext>
               <a:ext uri="{91240B29-F687-4f45-9708-019B960494DF}">
-                <a14:hiddenLine xmlns:a14="http://schemas.microsoft.com/office/drawing/2010/main" xmlns="" w="9525">
+                <a14:hiddenLine xmlns="" xmlns:a14="http://schemas.microsoft.com/office/drawing/2010/main" w="9525">
                   <a:solidFill>
                     <a:srgbClr val="000000"/>
                   </a:solidFill>
@@ -13393,7 +13398,7 @@
                 </a14:hiddenLine>
               </a:ext>
               <a:ext uri="{AF507438-7753-43e0-B8FC-AC1667EBCBE1}">
-                <a14:hiddenEffects xmlns:a14="http://schemas.microsoft.com/office/drawing/2010/main" xmlns="">
+                <a14:hiddenEffects xmlns="" xmlns:a14="http://schemas.microsoft.com/office/drawing/2010/main">
                   <a:effectLst>
                     <a:outerShdw blurRad="63500" dist="38099" dir="2700000" algn="ctr" rotWithShape="0">
                       <a:srgbClr val="000000">
@@ -13442,7 +13447,7 @@
             <a:effectLst/>
             <a:extLst>
               <a:ext uri="{909E8E84-426E-40dd-AFC4-6F175D3DCCD1}">
-                <a14:hiddenFill xmlns:a14="http://schemas.microsoft.com/office/drawing/2010/main" xmlns="">
+                <a14:hiddenFill xmlns="" xmlns:a14="http://schemas.microsoft.com/office/drawing/2010/main">
                   <a:blipFill dpi="0" rotWithShape="0">
                     <a:blip/>
                     <a:srcRect/>
@@ -13453,7 +13458,7 @@
                 </a14:hiddenFill>
               </a:ext>
               <a:ext uri="{91240B29-F687-4f45-9708-019B960494DF}">
-                <a14:hiddenLine xmlns:a14="http://schemas.microsoft.com/office/drawing/2010/main" xmlns="" w="9525">
+                <a14:hiddenLine xmlns="" xmlns:a14="http://schemas.microsoft.com/office/drawing/2010/main" w="9525">
                   <a:solidFill>
                     <a:srgbClr val="000000"/>
                   </a:solidFill>
@@ -13463,7 +13468,7 @@
                 </a14:hiddenLine>
               </a:ext>
               <a:ext uri="{AF507438-7753-43e0-B8FC-AC1667EBCBE1}">
-                <a14:hiddenEffects xmlns:a14="http://schemas.microsoft.com/office/drawing/2010/main" xmlns="">
+                <a14:hiddenEffects xmlns="" xmlns:a14="http://schemas.microsoft.com/office/drawing/2010/main">
                   <a:effectLst>
                     <a:outerShdw blurRad="63500" dist="38099" dir="2700000" algn="ctr" rotWithShape="0">
                       <a:srgbClr val="000000">
@@ -13512,7 +13517,7 @@
             <a:effectLst/>
             <a:extLst>
               <a:ext uri="{909E8E84-426E-40dd-AFC4-6F175D3DCCD1}">
-                <a14:hiddenFill xmlns:a14="http://schemas.microsoft.com/office/drawing/2010/main" xmlns="">
+                <a14:hiddenFill xmlns="" xmlns:a14="http://schemas.microsoft.com/office/drawing/2010/main">
                   <a:blipFill dpi="0" rotWithShape="0">
                     <a:blip/>
                     <a:srcRect/>
@@ -13523,7 +13528,7 @@
                 </a14:hiddenFill>
               </a:ext>
               <a:ext uri="{91240B29-F687-4f45-9708-019B960494DF}">
-                <a14:hiddenLine xmlns:a14="http://schemas.microsoft.com/office/drawing/2010/main" xmlns="" w="9525">
+                <a14:hiddenLine xmlns="" xmlns:a14="http://schemas.microsoft.com/office/drawing/2010/main" w="9525">
                   <a:solidFill>
                     <a:srgbClr val="000000"/>
                   </a:solidFill>
@@ -13533,7 +13538,7 @@
                 </a14:hiddenLine>
               </a:ext>
               <a:ext uri="{AF507438-7753-43e0-B8FC-AC1667EBCBE1}">
-                <a14:hiddenEffects xmlns:a14="http://schemas.microsoft.com/office/drawing/2010/main" xmlns="">
+                <a14:hiddenEffects xmlns="" xmlns:a14="http://schemas.microsoft.com/office/drawing/2010/main">
                   <a:effectLst>
                     <a:outerShdw blurRad="63500" dist="38099" dir="2700000" algn="ctr" rotWithShape="0">
                       <a:srgbClr val="000000">
@@ -13582,7 +13587,7 @@
             <a:effectLst/>
             <a:extLst>
               <a:ext uri="{909E8E84-426E-40dd-AFC4-6F175D3DCCD1}">
-                <a14:hiddenFill xmlns:a14="http://schemas.microsoft.com/office/drawing/2010/main" xmlns="">
+                <a14:hiddenFill xmlns="" xmlns:a14="http://schemas.microsoft.com/office/drawing/2010/main">
                   <a:blipFill dpi="0" rotWithShape="0">
                     <a:blip/>
                     <a:srcRect/>
@@ -13593,7 +13598,7 @@
                 </a14:hiddenFill>
               </a:ext>
               <a:ext uri="{91240B29-F687-4f45-9708-019B960494DF}">
-                <a14:hiddenLine xmlns:a14="http://schemas.microsoft.com/office/drawing/2010/main" xmlns="" w="9525">
+                <a14:hiddenLine xmlns="" xmlns:a14="http://schemas.microsoft.com/office/drawing/2010/main" w="9525">
                   <a:solidFill>
                     <a:srgbClr val="000000"/>
                   </a:solidFill>
@@ -13603,7 +13608,7 @@
                 </a14:hiddenLine>
               </a:ext>
               <a:ext uri="{AF507438-7753-43e0-B8FC-AC1667EBCBE1}">
-                <a14:hiddenEffects xmlns:a14="http://schemas.microsoft.com/office/drawing/2010/main" xmlns="">
+                <a14:hiddenEffects xmlns="" xmlns:a14="http://schemas.microsoft.com/office/drawing/2010/main">
                   <a:effectLst>
                     <a:outerShdw blurRad="63500" dist="38099" dir="2700000" algn="ctr" rotWithShape="0">
                       <a:srgbClr val="000000">
@@ -13644,12 +13649,12 @@
             <a:effectLst/>
             <a:extLst>
               <a:ext uri="{909E8E84-426E-40dd-AFC4-6F175D3DCCD1}">
-                <a14:hiddenFill xmlns:a14="http://schemas.microsoft.com/office/drawing/2010/main" xmlns="">
+                <a14:hiddenFill xmlns="" xmlns:a14="http://schemas.microsoft.com/office/drawing/2010/main">
                   <a:noFill/>
                 </a14:hiddenFill>
               </a:ext>
               <a:ext uri="{AF507438-7753-43e0-B8FC-AC1667EBCBE1}">
-                <a14:hiddenEffects xmlns:a14="http://schemas.microsoft.com/office/drawing/2010/main" xmlns="">
+                <a14:hiddenEffects xmlns="" xmlns:a14="http://schemas.microsoft.com/office/drawing/2010/main">
                   <a:effectLst>
                     <a:outerShdw blurRad="63500" dist="38099" dir="2700000" algn="ctr" rotWithShape="0">
                       <a:srgbClr val="000000">
@@ -13702,12 +13707,12 @@
             <a:effectLst/>
             <a:extLst>
               <a:ext uri="{909E8E84-426E-40dd-AFC4-6F175D3DCCD1}">
-                <a14:hiddenFill xmlns:a14="http://schemas.microsoft.com/office/drawing/2010/main" xmlns="">
+                <a14:hiddenFill xmlns="" xmlns:a14="http://schemas.microsoft.com/office/drawing/2010/main">
                   <a:noFill/>
                 </a14:hiddenFill>
               </a:ext>
               <a:ext uri="{AF507438-7753-43e0-B8FC-AC1667EBCBE1}">
-                <a14:hiddenEffects xmlns:a14="http://schemas.microsoft.com/office/drawing/2010/main" xmlns="">
+                <a14:hiddenEffects xmlns="" xmlns:a14="http://schemas.microsoft.com/office/drawing/2010/main">
                   <a:effectLst>
                     <a:outerShdw blurRad="63500" dist="38099" dir="2700000" algn="ctr" rotWithShape="0">
                       <a:srgbClr val="000000">
@@ -13768,7 +13773,7 @@
             <a:effectLst/>
             <a:extLst>
               <a:ext uri="{909E8E84-426E-40dd-AFC4-6F175D3DCCD1}">
-                <a14:hiddenFill xmlns:a14="http://schemas.microsoft.com/office/drawing/2010/main" xmlns="">
+                <a14:hiddenFill xmlns="" xmlns:a14="http://schemas.microsoft.com/office/drawing/2010/main">
                   <a:blipFill dpi="0" rotWithShape="0">
                     <a:blip/>
                     <a:srcRect/>
@@ -13779,7 +13784,7 @@
                 </a14:hiddenFill>
               </a:ext>
               <a:ext uri="{91240B29-F687-4f45-9708-019B960494DF}">
-                <a14:hiddenLine xmlns:a14="http://schemas.microsoft.com/office/drawing/2010/main" xmlns="" w="9525">
+                <a14:hiddenLine xmlns="" xmlns:a14="http://schemas.microsoft.com/office/drawing/2010/main" w="9525">
                   <a:solidFill>
                     <a:srgbClr val="000000"/>
                   </a:solidFill>
@@ -13789,7 +13794,7 @@
                 </a14:hiddenLine>
               </a:ext>
               <a:ext uri="{AF507438-7753-43e0-B8FC-AC1667EBCBE1}">
-                <a14:hiddenEffects xmlns:a14="http://schemas.microsoft.com/office/drawing/2010/main" xmlns="">
+                <a14:hiddenEffects xmlns="" xmlns:a14="http://schemas.microsoft.com/office/drawing/2010/main">
                   <a:effectLst>
                     <a:outerShdw blurRad="63500" dist="38099" dir="2700000" algn="ctr" rotWithShape="0">
                       <a:srgbClr val="000000">
@@ -13922,7 +13927,7 @@
           <a:effectLst/>
           <a:extLst>
             <a:ext uri="{909E8E84-426E-40dd-AFC4-6F175D3DCCD1}">
-              <a14:hiddenFill xmlns="" xmlns:a14="http://schemas.microsoft.com/office/drawing/2010/main">
+              <a14:hiddenFill xmlns:a14="http://schemas.microsoft.com/office/drawing/2010/main" xmlns="">
                 <a:blipFill dpi="0" rotWithShape="0">
                   <a:blip/>
                   <a:srcRect/>
@@ -13933,7 +13938,7 @@
               </a14:hiddenFill>
             </a:ext>
             <a:ext uri="{91240B29-F687-4f45-9708-019B960494DF}">
-              <a14:hiddenLine xmlns="" xmlns:a14="http://schemas.microsoft.com/office/drawing/2010/main" w="9525">
+              <a14:hiddenLine xmlns:a14="http://schemas.microsoft.com/office/drawing/2010/main" xmlns="" w="9525">
                 <a:solidFill>
                   <a:srgbClr val="000000"/>
                 </a:solidFill>
@@ -13943,7 +13948,7 @@
               </a14:hiddenLine>
             </a:ext>
             <a:ext uri="{AF507438-7753-43e0-B8FC-AC1667EBCBE1}">
-              <a14:hiddenEffects xmlns="" xmlns:a14="http://schemas.microsoft.com/office/drawing/2010/main">
+              <a14:hiddenEffects xmlns:a14="http://schemas.microsoft.com/office/drawing/2010/main" xmlns="">
                 <a:effectLst>
                   <a:outerShdw blurRad="63500" dist="38099" dir="2700000" algn="ctr" rotWithShape="0">
                     <a:srgbClr val="000000">
@@ -14028,7 +14033,7 @@
           <a:effectLst/>
           <a:extLst>
             <a:ext uri="{909E8E84-426E-40dd-AFC4-6F175D3DCCD1}">
-              <a14:hiddenFill xmlns="" xmlns:a14="http://schemas.microsoft.com/office/drawing/2010/main">
+              <a14:hiddenFill xmlns:a14="http://schemas.microsoft.com/office/drawing/2010/main" xmlns="">
                 <a:blipFill dpi="0" rotWithShape="0">
                   <a:blip/>
                   <a:srcRect/>
@@ -14039,7 +14044,7 @@
               </a14:hiddenFill>
             </a:ext>
             <a:ext uri="{91240B29-F687-4f45-9708-019B960494DF}">
-              <a14:hiddenLine xmlns="" xmlns:a14="http://schemas.microsoft.com/office/drawing/2010/main" w="9525">
+              <a14:hiddenLine xmlns:a14="http://schemas.microsoft.com/office/drawing/2010/main" xmlns="" w="9525">
                 <a:solidFill>
                   <a:srgbClr val="000000"/>
                 </a:solidFill>
@@ -14049,7 +14054,7 @@
               </a14:hiddenLine>
             </a:ext>
             <a:ext uri="{AF507438-7753-43e0-B8FC-AC1667EBCBE1}">
-              <a14:hiddenEffects xmlns="" xmlns:a14="http://schemas.microsoft.com/office/drawing/2010/main">
+              <a14:hiddenEffects xmlns:a14="http://schemas.microsoft.com/office/drawing/2010/main" xmlns="">
                 <a:effectLst>
                   <a:outerShdw blurRad="63500" dist="38099" dir="2700000" algn="ctr" rotWithShape="0">
                     <a:srgbClr val="000000">
@@ -14134,7 +14139,7 @@
           <a:effectLst/>
           <a:extLst>
             <a:ext uri="{909E8E84-426E-40dd-AFC4-6F175D3DCCD1}">
-              <a14:hiddenFill xmlns="" xmlns:a14="http://schemas.microsoft.com/office/drawing/2010/main">
+              <a14:hiddenFill xmlns:a14="http://schemas.microsoft.com/office/drawing/2010/main" xmlns="">
                 <a:blipFill dpi="0" rotWithShape="0">
                   <a:blip/>
                   <a:srcRect/>
@@ -14145,7 +14150,7 @@
               </a14:hiddenFill>
             </a:ext>
             <a:ext uri="{91240B29-F687-4f45-9708-019B960494DF}">
-              <a14:hiddenLine xmlns="" xmlns:a14="http://schemas.microsoft.com/office/drawing/2010/main" w="9525">
+              <a14:hiddenLine xmlns:a14="http://schemas.microsoft.com/office/drawing/2010/main" xmlns="" w="9525">
                 <a:solidFill>
                   <a:srgbClr val="000000"/>
                 </a:solidFill>
@@ -14155,7 +14160,7 @@
               </a14:hiddenLine>
             </a:ext>
             <a:ext uri="{AF507438-7753-43e0-B8FC-AC1667EBCBE1}">
-              <a14:hiddenEffects xmlns="" xmlns:a14="http://schemas.microsoft.com/office/drawing/2010/main">
+              <a14:hiddenEffects xmlns:a14="http://schemas.microsoft.com/office/drawing/2010/main" xmlns="">
                 <a:effectLst>
                   <a:outerShdw blurRad="63500" dist="38099" dir="2700000" algn="ctr" rotWithShape="0">
                     <a:srgbClr val="000000">
@@ -14346,7 +14351,7 @@
           <a:effectLst/>
           <a:extLst>
             <a:ext uri="{909E8E84-426E-40dd-AFC4-6F175D3DCCD1}">
-              <a14:hiddenFill xmlns="" xmlns:a14="http://schemas.microsoft.com/office/drawing/2010/main">
+              <a14:hiddenFill xmlns:a14="http://schemas.microsoft.com/office/drawing/2010/main" xmlns="">
                 <a:blipFill dpi="0" rotWithShape="0">
                   <a:blip/>
                   <a:srcRect/>
@@ -14357,7 +14362,7 @@
               </a14:hiddenFill>
             </a:ext>
             <a:ext uri="{91240B29-F687-4f45-9708-019B960494DF}">
-              <a14:hiddenLine xmlns="" xmlns:a14="http://schemas.microsoft.com/office/drawing/2010/main" w="9525">
+              <a14:hiddenLine xmlns:a14="http://schemas.microsoft.com/office/drawing/2010/main" xmlns="" w="9525">
                 <a:solidFill>
                   <a:srgbClr val="000000"/>
                 </a:solidFill>
@@ -14367,7 +14372,7 @@
               </a14:hiddenLine>
             </a:ext>
             <a:ext uri="{AF507438-7753-43e0-B8FC-AC1667EBCBE1}">
-              <a14:hiddenEffects xmlns="" xmlns:a14="http://schemas.microsoft.com/office/drawing/2010/main">
+              <a14:hiddenEffects xmlns:a14="http://schemas.microsoft.com/office/drawing/2010/main" xmlns="">
                 <a:effectLst>
                   <a:outerShdw blurRad="63500" dist="38099" dir="2700000" algn="ctr" rotWithShape="0">
                     <a:srgbClr val="000000">
@@ -14445,7 +14450,7 @@
           <a:effectLst/>
           <a:extLst>
             <a:ext uri="{909E8E84-426E-40dd-AFC4-6F175D3DCCD1}">
-              <a14:hiddenFill xmlns="" xmlns:a14="http://schemas.microsoft.com/office/drawing/2010/main">
+              <a14:hiddenFill xmlns:a14="http://schemas.microsoft.com/office/drawing/2010/main" xmlns="">
                 <a:blipFill dpi="0" rotWithShape="0">
                   <a:blip/>
                   <a:srcRect/>
@@ -14456,7 +14461,7 @@
               </a14:hiddenFill>
             </a:ext>
             <a:ext uri="{91240B29-F687-4f45-9708-019B960494DF}">
-              <a14:hiddenLine xmlns="" xmlns:a14="http://schemas.microsoft.com/office/drawing/2010/main" w="9525">
+              <a14:hiddenLine xmlns:a14="http://schemas.microsoft.com/office/drawing/2010/main" xmlns="" w="9525">
                 <a:solidFill>
                   <a:srgbClr val="000000"/>
                 </a:solidFill>
@@ -14466,7 +14471,7 @@
               </a14:hiddenLine>
             </a:ext>
             <a:ext uri="{AF507438-7753-43e0-B8FC-AC1667EBCBE1}">
-              <a14:hiddenEffects xmlns="" xmlns:a14="http://schemas.microsoft.com/office/drawing/2010/main">
+              <a14:hiddenEffects xmlns:a14="http://schemas.microsoft.com/office/drawing/2010/main" xmlns="">
                 <a:effectLst>
                   <a:outerShdw blurRad="63500" dist="38099" dir="2700000" algn="ctr" rotWithShape="0">
                     <a:srgbClr val="000000">
@@ -16331,7 +16336,7 @@
           <a:effectLst/>
           <a:extLst>
             <a:ext uri="{909E8E84-426E-40dd-AFC4-6F175D3DCCD1}">
-              <a14:hiddenFill xmlns:a14="http://schemas.microsoft.com/office/drawing/2010/main" xmlns="">
+              <a14:hiddenFill xmlns="" xmlns:a14="http://schemas.microsoft.com/office/drawing/2010/main">
                 <a:blipFill dpi="0" rotWithShape="0">
                   <a:blip/>
                   <a:srcRect/>
@@ -16342,7 +16347,7 @@
               </a14:hiddenFill>
             </a:ext>
             <a:ext uri="{91240B29-F687-4f45-9708-019B960494DF}">
-              <a14:hiddenLine xmlns:a14="http://schemas.microsoft.com/office/drawing/2010/main" xmlns="" w="9525">
+              <a14:hiddenLine xmlns="" xmlns:a14="http://schemas.microsoft.com/office/drawing/2010/main" w="9525">
                 <a:solidFill>
                   <a:srgbClr val="000000"/>
                 </a:solidFill>
@@ -16352,7 +16357,7 @@
               </a14:hiddenLine>
             </a:ext>
             <a:ext uri="{AF507438-7753-43e0-B8FC-AC1667EBCBE1}">
-              <a14:hiddenEffects xmlns:a14="http://schemas.microsoft.com/office/drawing/2010/main" xmlns="">
+              <a14:hiddenEffects xmlns="" xmlns:a14="http://schemas.microsoft.com/office/drawing/2010/main">
                 <a:effectLst>
                   <a:outerShdw blurRad="63500" dist="38099" dir="2700000" algn="ctr" rotWithShape="0">
                     <a:srgbClr val="000000">
@@ -16512,7 +16517,7 @@
           <a:effectLst/>
           <a:extLst>
             <a:ext uri="{909E8E84-426E-40dd-AFC4-6F175D3DCCD1}">
-              <a14:hiddenFill xmlns:a14="http://schemas.microsoft.com/office/drawing/2010/main" xmlns="">
+              <a14:hiddenFill xmlns="" xmlns:a14="http://schemas.microsoft.com/office/drawing/2010/main">
                 <a:blipFill dpi="0" rotWithShape="0">
                   <a:blip/>
                   <a:srcRect/>
@@ -16523,7 +16528,7 @@
               </a14:hiddenFill>
             </a:ext>
             <a:ext uri="{91240B29-F687-4f45-9708-019B960494DF}">
-              <a14:hiddenLine xmlns:a14="http://schemas.microsoft.com/office/drawing/2010/main" xmlns="" w="9525">
+              <a14:hiddenLine xmlns="" xmlns:a14="http://schemas.microsoft.com/office/drawing/2010/main" w="9525">
                 <a:solidFill>
                   <a:srgbClr val="000000"/>
                 </a:solidFill>
@@ -16533,7 +16538,7 @@
               </a14:hiddenLine>
             </a:ext>
             <a:ext uri="{AF507438-7753-43e0-B8FC-AC1667EBCBE1}">
-              <a14:hiddenEffects xmlns:a14="http://schemas.microsoft.com/office/drawing/2010/main" xmlns="">
+              <a14:hiddenEffects xmlns="" xmlns:a14="http://schemas.microsoft.com/office/drawing/2010/main">
                 <a:effectLst>
                   <a:outerShdw blurRad="63500" dist="38099" dir="2700000" algn="ctr" rotWithShape="0">
                     <a:srgbClr val="000000">
@@ -18332,7 +18337,7 @@
           <a:effectLst/>
           <a:extLst>
             <a:ext uri="{909E8E84-426E-40dd-AFC4-6F175D3DCCD1}">
-              <a14:hiddenFill xmlns:a14="http://schemas.microsoft.com/office/drawing/2010/main" xmlns="">
+              <a14:hiddenFill xmlns="" xmlns:a14="http://schemas.microsoft.com/office/drawing/2010/main">
                 <a:blipFill dpi="0" rotWithShape="0">
                   <a:blip/>
                   <a:srcRect/>
@@ -18343,7 +18348,7 @@
               </a14:hiddenFill>
             </a:ext>
             <a:ext uri="{91240B29-F687-4f45-9708-019B960494DF}">
-              <a14:hiddenLine xmlns:a14="http://schemas.microsoft.com/office/drawing/2010/main" xmlns="" w="9525">
+              <a14:hiddenLine xmlns="" xmlns:a14="http://schemas.microsoft.com/office/drawing/2010/main" w="9525">
                 <a:solidFill>
                   <a:srgbClr val="000000"/>
                 </a:solidFill>
@@ -18353,7 +18358,7 @@
               </a14:hiddenLine>
             </a:ext>
             <a:ext uri="{AF507438-7753-43e0-B8FC-AC1667EBCBE1}">
-              <a14:hiddenEffects xmlns:a14="http://schemas.microsoft.com/office/drawing/2010/main" xmlns="">
+              <a14:hiddenEffects xmlns="" xmlns:a14="http://schemas.microsoft.com/office/drawing/2010/main">
                 <a:effectLst>
                   <a:outerShdw blurRad="63500" dist="38099" dir="2700000" algn="ctr" rotWithShape="0">
                     <a:srgbClr val="000000">
@@ -18446,7 +18451,7 @@
           <a:effectLst/>
           <a:extLst>
             <a:ext uri="{909E8E84-426E-40dd-AFC4-6F175D3DCCD1}">
-              <a14:hiddenFill xmlns:a14="http://schemas.microsoft.com/office/drawing/2010/main" xmlns="">
+              <a14:hiddenFill xmlns="" xmlns:a14="http://schemas.microsoft.com/office/drawing/2010/main">
                 <a:blipFill dpi="0" rotWithShape="0">
                   <a:blip/>
                   <a:srcRect/>
@@ -18457,7 +18462,7 @@
               </a14:hiddenFill>
             </a:ext>
             <a:ext uri="{91240B29-F687-4f45-9708-019B960494DF}">
-              <a14:hiddenLine xmlns:a14="http://schemas.microsoft.com/office/drawing/2010/main" xmlns="" w="9525">
+              <a14:hiddenLine xmlns="" xmlns:a14="http://schemas.microsoft.com/office/drawing/2010/main" w="9525">
                 <a:solidFill>
                   <a:srgbClr val="000000"/>
                 </a:solidFill>
@@ -18467,7 +18472,7 @@
               </a14:hiddenLine>
             </a:ext>
             <a:ext uri="{AF507438-7753-43e0-B8FC-AC1667EBCBE1}">
-              <a14:hiddenEffects xmlns:a14="http://schemas.microsoft.com/office/drawing/2010/main" xmlns="">
+              <a14:hiddenEffects xmlns="" xmlns:a14="http://schemas.microsoft.com/office/drawing/2010/main">
                 <a:effectLst>
                   <a:outerShdw blurRad="63500" dist="38099" dir="2700000" algn="ctr" rotWithShape="0">
                     <a:srgbClr val="000000">
@@ -21339,7 +21344,7 @@
           <a:effectLst/>
           <a:extLst>
             <a:ext uri="{909E8E84-426E-40dd-AFC4-6F175D3DCCD1}">
-              <a14:hiddenFill xmlns:a14="http://schemas.microsoft.com/office/drawing/2010/main" xmlns="">
+              <a14:hiddenFill xmlns="" xmlns:a14="http://schemas.microsoft.com/office/drawing/2010/main">
                 <a:blipFill dpi="0" rotWithShape="0">
                   <a:blip/>
                   <a:srcRect/>
@@ -21350,7 +21355,7 @@
               </a14:hiddenFill>
             </a:ext>
             <a:ext uri="{91240B29-F687-4f45-9708-019B960494DF}">
-              <a14:hiddenLine xmlns:a14="http://schemas.microsoft.com/office/drawing/2010/main" xmlns="" w="9525">
+              <a14:hiddenLine xmlns="" xmlns:a14="http://schemas.microsoft.com/office/drawing/2010/main" w="9525">
                 <a:solidFill>
                   <a:srgbClr val="000000"/>
                 </a:solidFill>
@@ -21360,7 +21365,7 @@
               </a14:hiddenLine>
             </a:ext>
             <a:ext uri="{AF507438-7753-43e0-B8FC-AC1667EBCBE1}">
-              <a14:hiddenEffects xmlns:a14="http://schemas.microsoft.com/office/drawing/2010/main" xmlns="">
+              <a14:hiddenEffects xmlns="" xmlns:a14="http://schemas.microsoft.com/office/drawing/2010/main">
                 <a:effectLst>
                   <a:outerShdw blurRad="63500" dist="38099" dir="2700000" algn="ctr" rotWithShape="0">
                     <a:srgbClr val="000000">
@@ -21439,7 +21444,7 @@
           <a:effectLst/>
           <a:extLst>
             <a:ext uri="{909E8E84-426E-40dd-AFC4-6F175D3DCCD1}">
-              <a14:hiddenFill xmlns:a14="http://schemas.microsoft.com/office/drawing/2010/main" xmlns="">
+              <a14:hiddenFill xmlns="" xmlns:a14="http://schemas.microsoft.com/office/drawing/2010/main">
                 <a:blipFill dpi="0" rotWithShape="0">
                   <a:blip/>
                   <a:srcRect/>
@@ -21450,7 +21455,7 @@
               </a14:hiddenFill>
             </a:ext>
             <a:ext uri="{91240B29-F687-4f45-9708-019B960494DF}">
-              <a14:hiddenLine xmlns:a14="http://schemas.microsoft.com/office/drawing/2010/main" xmlns="" w="9525">
+              <a14:hiddenLine xmlns="" xmlns:a14="http://schemas.microsoft.com/office/drawing/2010/main" w="9525">
                 <a:solidFill>
                   <a:srgbClr val="000000"/>
                 </a:solidFill>
@@ -21460,7 +21465,7 @@
               </a14:hiddenLine>
             </a:ext>
             <a:ext uri="{AF507438-7753-43e0-B8FC-AC1667EBCBE1}">
-              <a14:hiddenEffects xmlns:a14="http://schemas.microsoft.com/office/drawing/2010/main" xmlns="">
+              <a14:hiddenEffects xmlns="" xmlns:a14="http://schemas.microsoft.com/office/drawing/2010/main">
                 <a:effectLst>
                   <a:outerShdw blurRad="63500" dist="38099" dir="2700000" algn="ctr" rotWithShape="0">
                     <a:srgbClr val="000000">
@@ -23043,7 +23048,7 @@
           <a:effectLst/>
           <a:extLst>
             <a:ext uri="{909E8E84-426E-40dd-AFC4-6F175D3DCCD1}">
-              <a14:hiddenFill xmlns:a14="http://schemas.microsoft.com/office/drawing/2010/main" xmlns="">
+              <a14:hiddenFill xmlns="" xmlns:a14="http://schemas.microsoft.com/office/drawing/2010/main">
                 <a:blipFill dpi="0" rotWithShape="0">
                   <a:blip/>
                   <a:srcRect/>
@@ -23054,7 +23059,7 @@
               </a14:hiddenFill>
             </a:ext>
             <a:ext uri="{91240B29-F687-4f45-9708-019B960494DF}">
-              <a14:hiddenLine xmlns:a14="http://schemas.microsoft.com/office/drawing/2010/main" xmlns="" w="9525">
+              <a14:hiddenLine xmlns="" xmlns:a14="http://schemas.microsoft.com/office/drawing/2010/main" w="9525">
                 <a:solidFill>
                   <a:srgbClr val="000000"/>
                 </a:solidFill>
@@ -23064,7 +23069,7 @@
               </a14:hiddenLine>
             </a:ext>
             <a:ext uri="{AF507438-7753-43e0-B8FC-AC1667EBCBE1}">
-              <a14:hiddenEffects xmlns:a14="http://schemas.microsoft.com/office/drawing/2010/main" xmlns="">
+              <a14:hiddenEffects xmlns="" xmlns:a14="http://schemas.microsoft.com/office/drawing/2010/main">
                 <a:effectLst>
                   <a:outerShdw blurRad="63500" dist="38099" dir="2700000" algn="ctr" rotWithShape="0">
                     <a:srgbClr val="000000">
@@ -24712,7 +24717,7 @@
           <a:effectLst/>
           <a:extLst>
             <a:ext uri="{909E8E84-426E-40dd-AFC4-6F175D3DCCD1}">
-              <a14:hiddenFill xmlns:a14="http://schemas.microsoft.com/office/drawing/2010/main" xmlns="">
+              <a14:hiddenFill xmlns="" xmlns:a14="http://schemas.microsoft.com/office/drawing/2010/main">
                 <a:blipFill dpi="0" rotWithShape="0">
                   <a:blip/>
                   <a:srcRect/>
@@ -24723,7 +24728,7 @@
               </a14:hiddenFill>
             </a:ext>
             <a:ext uri="{91240B29-F687-4f45-9708-019B960494DF}">
-              <a14:hiddenLine xmlns:a14="http://schemas.microsoft.com/office/drawing/2010/main" xmlns="" w="9525">
+              <a14:hiddenLine xmlns="" xmlns:a14="http://schemas.microsoft.com/office/drawing/2010/main" w="9525">
                 <a:solidFill>
                   <a:srgbClr val="000000"/>
                 </a:solidFill>
@@ -24733,7 +24738,7 @@
               </a14:hiddenLine>
             </a:ext>
             <a:ext uri="{AF507438-7753-43e0-B8FC-AC1667EBCBE1}">
-              <a14:hiddenEffects xmlns:a14="http://schemas.microsoft.com/office/drawing/2010/main" xmlns="">
+              <a14:hiddenEffects xmlns="" xmlns:a14="http://schemas.microsoft.com/office/drawing/2010/main">
                 <a:effectLst>
                   <a:outerShdw blurRad="63500" dist="38099" dir="2700000" algn="ctr" rotWithShape="0">
                     <a:srgbClr val="000000">
@@ -26095,7 +26100,7 @@
           <a:effectLst/>
           <a:extLst>
             <a:ext uri="{909E8E84-426E-40dd-AFC4-6F175D3DCCD1}">
-              <a14:hiddenFill xmlns:a14="http://schemas.microsoft.com/office/drawing/2010/main" xmlns="">
+              <a14:hiddenFill xmlns="" xmlns:a14="http://schemas.microsoft.com/office/drawing/2010/main">
                 <a:blipFill dpi="0" rotWithShape="0">
                   <a:blip/>
                   <a:srcRect/>
@@ -26106,7 +26111,7 @@
               </a14:hiddenFill>
             </a:ext>
             <a:ext uri="{91240B29-F687-4f45-9708-019B960494DF}">
-              <a14:hiddenLine xmlns:a14="http://schemas.microsoft.com/office/drawing/2010/main" xmlns="" w="9525">
+              <a14:hiddenLine xmlns="" xmlns:a14="http://schemas.microsoft.com/office/drawing/2010/main" w="9525">
                 <a:solidFill>
                   <a:srgbClr val="000000"/>
                 </a:solidFill>
@@ -26116,7 +26121,7 @@
               </a14:hiddenLine>
             </a:ext>
             <a:ext uri="{AF507438-7753-43e0-B8FC-AC1667EBCBE1}">
-              <a14:hiddenEffects xmlns:a14="http://schemas.microsoft.com/office/drawing/2010/main" xmlns="">
+              <a14:hiddenEffects xmlns="" xmlns:a14="http://schemas.microsoft.com/office/drawing/2010/main">
                 <a:effectLst>
                   <a:outerShdw blurRad="63500" dist="38099" dir="2700000" algn="ctr" rotWithShape="0">
                     <a:srgbClr val="000000">
@@ -26247,7 +26252,7 @@
           <a:effectLst/>
           <a:extLst>
             <a:ext uri="{909E8E84-426E-40dd-AFC4-6F175D3DCCD1}">
-              <a14:hiddenFill xmlns:a14="http://schemas.microsoft.com/office/drawing/2010/main" xmlns="">
+              <a14:hiddenFill xmlns="" xmlns:a14="http://schemas.microsoft.com/office/drawing/2010/main">
                 <a:blipFill dpi="0" rotWithShape="0">
                   <a:blip/>
                   <a:srcRect/>
@@ -26258,7 +26263,7 @@
               </a14:hiddenFill>
             </a:ext>
             <a:ext uri="{91240B29-F687-4f45-9708-019B960494DF}">
-              <a14:hiddenLine xmlns:a14="http://schemas.microsoft.com/office/drawing/2010/main" xmlns="" w="9525">
+              <a14:hiddenLine xmlns="" xmlns:a14="http://schemas.microsoft.com/office/drawing/2010/main" w="9525">
                 <a:solidFill>
                   <a:srgbClr val="000000"/>
                 </a:solidFill>
@@ -26268,7 +26273,7 @@
               </a14:hiddenLine>
             </a:ext>
             <a:ext uri="{AF507438-7753-43e0-B8FC-AC1667EBCBE1}">
-              <a14:hiddenEffects xmlns:a14="http://schemas.microsoft.com/office/drawing/2010/main" xmlns="">
+              <a14:hiddenEffects xmlns="" xmlns:a14="http://schemas.microsoft.com/office/drawing/2010/main">
                 <a:effectLst>
                   <a:outerShdw blurRad="63500" dist="38099" dir="2700000" algn="ctr" rotWithShape="0">
                     <a:srgbClr val="000000">
@@ -33937,7 +33942,7 @@
           <a:effectLst/>
           <a:extLst>
             <a:ext uri="{909E8E84-426E-40dd-AFC4-6F175D3DCCD1}">
-              <a14:hiddenFill xmlns="" xmlns:a14="http://schemas.microsoft.com/office/drawing/2010/main">
+              <a14:hiddenFill xmlns:a14="http://schemas.microsoft.com/office/drawing/2010/main" xmlns="">
                 <a:blipFill dpi="0" rotWithShape="0">
                   <a:blip/>
                   <a:srcRect/>
@@ -33948,7 +33953,7 @@
               </a14:hiddenFill>
             </a:ext>
             <a:ext uri="{91240B29-F687-4f45-9708-019B960494DF}">
-              <a14:hiddenLine xmlns="" xmlns:a14="http://schemas.microsoft.com/office/drawing/2010/main" w="9525">
+              <a14:hiddenLine xmlns:a14="http://schemas.microsoft.com/office/drawing/2010/main" xmlns="" w="9525">
                 <a:solidFill>
                   <a:srgbClr val="000000"/>
                 </a:solidFill>
@@ -33958,7 +33963,7 @@
               </a14:hiddenLine>
             </a:ext>
             <a:ext uri="{AF507438-7753-43e0-B8FC-AC1667EBCBE1}">
-              <a14:hiddenEffects xmlns="" xmlns:a14="http://schemas.microsoft.com/office/drawing/2010/main">
+              <a14:hiddenEffects xmlns:a14="http://schemas.microsoft.com/office/drawing/2010/main" xmlns="">
                 <a:effectLst>
                   <a:outerShdw blurRad="63500" dist="38099" dir="2700000" algn="ctr" rotWithShape="0">
                     <a:srgbClr val="000000">

</xml_diff>

<commit_message>
Rehearsed once to 40 minutes.
</commit_message>
<xml_diff>
--- a/marple.pptx
+++ b/marple.pptx
@@ -26540,19 +26540,7 @@
             </a:pPr>
             <a:r>
               <a:rPr lang="en-US" dirty="0"/>
-              <a:t>Action of </a:t>
-            </a:r>
-            <a:r>
-              <a:rPr lang="en-US" dirty="0">
-                <a:latin typeface="Ayuthaya" charset="-34"/>
-                <a:ea typeface="Ayuthaya" charset="-34"/>
-                <a:cs typeface="Ayuthaya" charset="-34"/>
-              </a:rPr>
-              <a:t>g</a:t>
-            </a:r>
-            <a:r>
-              <a:rPr lang="en-US" dirty="0"/>
-              <a:t> over a packet sequence,</a:t>
+              <a:t>Effect of aggregation function over a packet sequence,</a:t>
             </a:r>
           </a:p>
           <a:p>

</xml_diff>